<commit_message>
Added decision tree example beautiful graphviz
</commit_message>
<xml_diff>
--- a/Sklearn/DecisionTrees/powerpoint/DecisionComparison.pptx
+++ b/Sklearn/DecisionTrees/powerpoint/DecisionComparison.pptx
@@ -7,6 +7,7 @@
   <p:sldIdLst>
     <p:sldId id="256" r:id="rId2"/>
     <p:sldId id="257" r:id="rId3"/>
+    <p:sldId id="258" r:id="rId4"/>
   </p:sldIdLst>
   <p:sldSz cx="12192000" cy="6858000"/>
   <p:notesSz cx="6858000" cy="9144000"/>
@@ -244,7 +245,7 @@
           <a:p>
             <a:fld id="{B66C5E5C-AFE9-2848-A01D-417298715EDA}" type="datetimeFigureOut">
               <a:rPr lang="en-US" smtClean="0"/>
-              <a:t>9/18/18</a:t>
+              <a:t>9/20/18</a:t>
             </a:fld>
             <a:endParaRPr lang="en-US"/>
           </a:p>
@@ -414,7 +415,7 @@
           <a:p>
             <a:fld id="{B66C5E5C-AFE9-2848-A01D-417298715EDA}" type="datetimeFigureOut">
               <a:rPr lang="en-US" smtClean="0"/>
-              <a:t>9/18/18</a:t>
+              <a:t>9/20/18</a:t>
             </a:fld>
             <a:endParaRPr lang="en-US"/>
           </a:p>
@@ -594,7 +595,7 @@
           <a:p>
             <a:fld id="{B66C5E5C-AFE9-2848-A01D-417298715EDA}" type="datetimeFigureOut">
               <a:rPr lang="en-US" smtClean="0"/>
-              <a:t>9/18/18</a:t>
+              <a:t>9/20/18</a:t>
             </a:fld>
             <a:endParaRPr lang="en-US"/>
           </a:p>
@@ -764,7 +765,7 @@
           <a:p>
             <a:fld id="{B66C5E5C-AFE9-2848-A01D-417298715EDA}" type="datetimeFigureOut">
               <a:rPr lang="en-US" smtClean="0"/>
-              <a:t>9/18/18</a:t>
+              <a:t>9/20/18</a:t>
             </a:fld>
             <a:endParaRPr lang="en-US"/>
           </a:p>
@@ -1010,7 +1011,7 @@
           <a:p>
             <a:fld id="{B66C5E5C-AFE9-2848-A01D-417298715EDA}" type="datetimeFigureOut">
               <a:rPr lang="en-US" smtClean="0"/>
-              <a:t>9/18/18</a:t>
+              <a:t>9/20/18</a:t>
             </a:fld>
             <a:endParaRPr lang="en-US"/>
           </a:p>
@@ -1242,7 +1243,7 @@
           <a:p>
             <a:fld id="{B66C5E5C-AFE9-2848-A01D-417298715EDA}" type="datetimeFigureOut">
               <a:rPr lang="en-US" smtClean="0"/>
-              <a:t>9/18/18</a:t>
+              <a:t>9/20/18</a:t>
             </a:fld>
             <a:endParaRPr lang="en-US"/>
           </a:p>
@@ -1609,7 +1610,7 @@
           <a:p>
             <a:fld id="{B66C5E5C-AFE9-2848-A01D-417298715EDA}" type="datetimeFigureOut">
               <a:rPr lang="en-US" smtClean="0"/>
-              <a:t>9/18/18</a:t>
+              <a:t>9/20/18</a:t>
             </a:fld>
             <a:endParaRPr lang="en-US"/>
           </a:p>
@@ -1727,7 +1728,7 @@
           <a:p>
             <a:fld id="{B66C5E5C-AFE9-2848-A01D-417298715EDA}" type="datetimeFigureOut">
               <a:rPr lang="en-US" smtClean="0"/>
-              <a:t>9/18/18</a:t>
+              <a:t>9/20/18</a:t>
             </a:fld>
             <a:endParaRPr lang="en-US"/>
           </a:p>
@@ -1822,7 +1823,7 @@
           <a:p>
             <a:fld id="{B66C5E5C-AFE9-2848-A01D-417298715EDA}" type="datetimeFigureOut">
               <a:rPr lang="en-US" smtClean="0"/>
-              <a:t>9/18/18</a:t>
+              <a:t>9/20/18</a:t>
             </a:fld>
             <a:endParaRPr lang="en-US"/>
           </a:p>
@@ -2099,7 +2100,7 @@
           <a:p>
             <a:fld id="{B66C5E5C-AFE9-2848-A01D-417298715EDA}" type="datetimeFigureOut">
               <a:rPr lang="en-US" smtClean="0"/>
-              <a:t>9/18/18</a:t>
+              <a:t>9/20/18</a:t>
             </a:fld>
             <a:endParaRPr lang="en-US"/>
           </a:p>
@@ -2352,7 +2353,7 @@
           <a:p>
             <a:fld id="{B66C5E5C-AFE9-2848-A01D-417298715EDA}" type="datetimeFigureOut">
               <a:rPr lang="en-US" smtClean="0"/>
-              <a:t>9/18/18</a:t>
+              <a:t>9/20/18</a:t>
             </a:fld>
             <a:endParaRPr lang="en-US"/>
           </a:p>
@@ -2565,7 +2566,7 @@
           <a:p>
             <a:fld id="{B66C5E5C-AFE9-2848-A01D-417298715EDA}" type="datetimeFigureOut">
               <a:rPr lang="en-US" smtClean="0"/>
-              <a:t>9/18/18</a:t>
+              <a:t>9/20/18</a:t>
             </a:fld>
             <a:endParaRPr lang="en-US"/>
           </a:p>
@@ -3453,10 +3454,410 @@
           </a:prstGeom>
         </p:spPr>
       </p:pic>
+      <p:grpSp>
+        <p:nvGrpSpPr>
+          <p:cNvPr id="12" name="Group 11"/>
+          <p:cNvGrpSpPr/>
+          <p:nvPr/>
+        </p:nvGrpSpPr>
+        <p:grpSpPr>
+          <a:xfrm>
+            <a:off x="3263466" y="4684608"/>
+            <a:ext cx="3435858" cy="3825790"/>
+            <a:chOff x="4280337" y="6124788"/>
+            <a:chExt cx="3435858" cy="3825790"/>
+          </a:xfrm>
+        </p:grpSpPr>
+        <p:pic>
+          <p:nvPicPr>
+            <p:cNvPr id="13" name="Picture 12"/>
+            <p:cNvPicPr>
+              <a:picLocks noChangeAspect="1"/>
+            </p:cNvPicPr>
+            <p:nvPr/>
+          </p:nvPicPr>
+          <p:blipFill>
+            <a:blip r:embed="rId8">
+              <a:extLst>
+                <a:ext uri="{28A0092B-C50C-407E-A947-70E740481C1C}">
+                  <a14:useLocalDpi xmlns:a14="http://schemas.microsoft.com/office/drawing/2010/main" val="0"/>
+                </a:ext>
+              </a:extLst>
+            </a:blip>
+            <a:stretch>
+              <a:fillRect/>
+            </a:stretch>
+          </p:blipFill>
+          <p:spPr>
+            <a:xfrm>
+              <a:off x="4280337" y="6124788"/>
+              <a:ext cx="3435858" cy="3054096"/>
+            </a:xfrm>
+            <a:prstGeom prst="rect">
+              <a:avLst/>
+            </a:prstGeom>
+            <a:ln w="25400">
+              <a:noFill/>
+            </a:ln>
+          </p:spPr>
+        </p:pic>
+        <p:pic>
+          <p:nvPicPr>
+            <p:cNvPr id="14" name="Picture 13"/>
+            <p:cNvPicPr>
+              <a:picLocks noChangeAspect="1"/>
+            </p:cNvPicPr>
+            <p:nvPr/>
+          </p:nvPicPr>
+          <p:blipFill rotWithShape="1">
+            <a:blip r:embed="rId9">
+              <a:extLst>
+                <a:ext uri="{28A0092B-C50C-407E-A947-70E740481C1C}">
+                  <a14:useLocalDpi xmlns:a14="http://schemas.microsoft.com/office/drawing/2010/main" val="0"/>
+                </a:ext>
+              </a:extLst>
+            </a:blip>
+            <a:srcRect l="68876"/>
+            <a:stretch/>
+          </p:blipFill>
+          <p:spPr>
+            <a:xfrm>
+              <a:off x="6794500" y="9183174"/>
+              <a:ext cx="716036" cy="766877"/>
+            </a:xfrm>
+            <a:prstGeom prst="rect">
+              <a:avLst/>
+            </a:prstGeom>
+          </p:spPr>
+        </p:pic>
+        <p:pic>
+          <p:nvPicPr>
+            <p:cNvPr id="15" name="Picture 14"/>
+            <p:cNvPicPr>
+              <a:picLocks noChangeAspect="1"/>
+            </p:cNvPicPr>
+            <p:nvPr/>
+          </p:nvPicPr>
+          <p:blipFill rotWithShape="1">
+            <a:blip r:embed="rId9">
+              <a:extLst>
+                <a:ext uri="{28A0092B-C50C-407E-A947-70E740481C1C}">
+                  <a14:useLocalDpi xmlns:a14="http://schemas.microsoft.com/office/drawing/2010/main" val="0"/>
+                </a:ext>
+              </a:extLst>
+            </a:blip>
+            <a:srcRect l="33873" r="35004"/>
+            <a:stretch/>
+          </p:blipFill>
+          <p:spPr>
+            <a:xfrm>
+              <a:off x="4280337" y="8085539"/>
+              <a:ext cx="712331" cy="762909"/>
+            </a:xfrm>
+            <a:prstGeom prst="rect">
+              <a:avLst/>
+            </a:prstGeom>
+          </p:spPr>
+        </p:pic>
+        <p:pic>
+          <p:nvPicPr>
+            <p:cNvPr id="16" name="Picture 15"/>
+            <p:cNvPicPr>
+              <a:picLocks noChangeAspect="1"/>
+            </p:cNvPicPr>
+            <p:nvPr/>
+          </p:nvPicPr>
+          <p:blipFill rotWithShape="1">
+            <a:blip r:embed="rId9">
+              <a:extLst>
+                <a:ext uri="{28A0092B-C50C-407E-A947-70E740481C1C}">
+                  <a14:useLocalDpi xmlns:a14="http://schemas.microsoft.com/office/drawing/2010/main" val="0"/>
+                </a:ext>
+              </a:extLst>
+            </a:blip>
+            <a:srcRect r="68876"/>
+            <a:stretch/>
+          </p:blipFill>
+          <p:spPr>
+            <a:xfrm>
+              <a:off x="5422900" y="9182646"/>
+              <a:ext cx="717021" cy="767932"/>
+            </a:xfrm>
+            <a:prstGeom prst="rect">
+              <a:avLst/>
+            </a:prstGeom>
+          </p:spPr>
+        </p:pic>
+      </p:grpSp>
     </p:spTree>
     <p:extLst>
       <p:ext uri="{BB962C8B-B14F-4D97-AF65-F5344CB8AC3E}">
         <p14:creationId xmlns:p14="http://schemas.microsoft.com/office/powerpoint/2010/main" val="611213031"/>
+      </p:ext>
+    </p:extLst>
+  </p:cSld>
+  <p:clrMapOvr>
+    <a:masterClrMapping/>
+  </p:clrMapOvr>
+</p:sld>
+</file>
+
+<file path=ppt/slides/slide3.xml><?xml version="1.0" encoding="utf-8"?>
+<p:sld xmlns:a="http://schemas.openxmlformats.org/drawingml/2006/main" xmlns:r="http://schemas.openxmlformats.org/officeDocument/2006/relationships" xmlns:p="http://schemas.openxmlformats.org/presentationml/2006/main">
+  <p:cSld>
+    <p:spTree>
+      <p:nvGrpSpPr>
+        <p:cNvPr id="1" name=""/>
+        <p:cNvGrpSpPr/>
+        <p:nvPr/>
+      </p:nvGrpSpPr>
+      <p:grpSpPr>
+        <a:xfrm>
+          <a:off x="0" y="0"/>
+          <a:ext cx="0" cy="0"/>
+          <a:chOff x="0" y="0"/>
+          <a:chExt cx="0" cy="0"/>
+        </a:xfrm>
+      </p:grpSpPr>
+      <p:grpSp>
+        <p:nvGrpSpPr>
+          <p:cNvPr id="13" name="Group 12"/>
+          <p:cNvGrpSpPr/>
+          <p:nvPr/>
+        </p:nvGrpSpPr>
+        <p:grpSpPr>
+          <a:xfrm>
+            <a:off x="395419" y="703472"/>
+            <a:ext cx="8570781" cy="6706756"/>
+            <a:chOff x="395419" y="703472"/>
+            <a:chExt cx="8570781" cy="6706756"/>
+          </a:xfrm>
+        </p:grpSpPr>
+        <p:pic>
+          <p:nvPicPr>
+            <p:cNvPr id="11" name="Picture 10"/>
+            <p:cNvPicPr>
+              <a:picLocks noChangeAspect="1"/>
+            </p:cNvPicPr>
+            <p:nvPr/>
+          </p:nvPicPr>
+          <p:blipFill>
+            <a:blip r:embed="rId2">
+              <a:extLst>
+                <a:ext uri="{28A0092B-C50C-407E-A947-70E740481C1C}">
+                  <a14:useLocalDpi xmlns:a14="http://schemas.microsoft.com/office/drawing/2010/main" val="0"/>
+                </a:ext>
+              </a:extLst>
+            </a:blip>
+            <a:stretch>
+              <a:fillRect/>
+            </a:stretch>
+          </p:blipFill>
+          <p:spPr>
+            <a:xfrm>
+              <a:off x="3213100" y="703472"/>
+              <a:ext cx="5753100" cy="5080000"/>
+            </a:xfrm>
+            <a:prstGeom prst="rect">
+              <a:avLst/>
+            </a:prstGeom>
+          </p:spPr>
+        </p:pic>
+        <p:pic>
+          <p:nvPicPr>
+            <p:cNvPr id="7" name="Picture 6"/>
+            <p:cNvPicPr>
+              <a:picLocks noChangeAspect="1"/>
+            </p:cNvPicPr>
+            <p:nvPr/>
+          </p:nvPicPr>
+          <p:blipFill rotWithShape="1">
+            <a:blip r:embed="rId3">
+              <a:extLst>
+                <a:ext uri="{28A0092B-C50C-407E-A947-70E740481C1C}">
+                  <a14:useLocalDpi xmlns:a14="http://schemas.microsoft.com/office/drawing/2010/main" val="0"/>
+                </a:ext>
+              </a:extLst>
+            </a:blip>
+            <a:srcRect l="68876"/>
+            <a:stretch/>
+          </p:blipFill>
+          <p:spPr>
+            <a:xfrm>
+              <a:off x="7523301" y="5755762"/>
+              <a:ext cx="990383" cy="1060704"/>
+            </a:xfrm>
+            <a:prstGeom prst="rect">
+              <a:avLst/>
+            </a:prstGeom>
+          </p:spPr>
+        </p:pic>
+        <p:pic>
+          <p:nvPicPr>
+            <p:cNvPr id="8" name="Picture 7"/>
+            <p:cNvPicPr>
+              <a:picLocks noChangeAspect="1"/>
+            </p:cNvPicPr>
+            <p:nvPr/>
+          </p:nvPicPr>
+          <p:blipFill rotWithShape="1">
+            <a:blip r:embed="rId3">
+              <a:extLst>
+                <a:ext uri="{28A0092B-C50C-407E-A947-70E740481C1C}">
+                  <a14:useLocalDpi xmlns:a14="http://schemas.microsoft.com/office/drawing/2010/main" val="0"/>
+                </a:ext>
+              </a:extLst>
+            </a:blip>
+            <a:srcRect l="33873" r="35004"/>
+            <a:stretch/>
+          </p:blipFill>
+          <p:spPr>
+            <a:xfrm>
+              <a:off x="3639316" y="3952158"/>
+              <a:ext cx="987643" cy="1057769"/>
+            </a:xfrm>
+            <a:prstGeom prst="rect">
+              <a:avLst/>
+            </a:prstGeom>
+          </p:spPr>
+        </p:pic>
+        <p:pic>
+          <p:nvPicPr>
+            <p:cNvPr id="9" name="Picture 8"/>
+            <p:cNvPicPr>
+              <a:picLocks noChangeAspect="1"/>
+            </p:cNvPicPr>
+            <p:nvPr/>
+          </p:nvPicPr>
+          <p:blipFill rotWithShape="1">
+            <a:blip r:embed="rId3">
+              <a:extLst>
+                <a:ext uri="{28A0092B-C50C-407E-A947-70E740481C1C}">
+                  <a14:useLocalDpi xmlns:a14="http://schemas.microsoft.com/office/drawing/2010/main" val="0"/>
+                </a:ext>
+              </a:extLst>
+            </a:blip>
+            <a:srcRect r="68876"/>
+            <a:stretch/>
+          </p:blipFill>
+          <p:spPr>
+            <a:xfrm>
+              <a:off x="5237301" y="5755762"/>
+              <a:ext cx="990383" cy="1060704"/>
+            </a:xfrm>
+            <a:prstGeom prst="rect">
+              <a:avLst/>
+            </a:prstGeom>
+          </p:spPr>
+        </p:pic>
+        <p:sp>
+          <p:nvSpPr>
+            <p:cNvPr id="10" name="TextBox 9"/>
+            <p:cNvSpPr txBox="1"/>
+            <p:nvPr/>
+          </p:nvSpPr>
+          <p:spPr>
+            <a:xfrm>
+              <a:off x="395419" y="889000"/>
+              <a:ext cx="2817681" cy="3539430"/>
+            </a:xfrm>
+            <a:prstGeom prst="rect">
+              <a:avLst/>
+            </a:prstGeom>
+            <a:noFill/>
+          </p:spPr>
+          <p:txBody>
+            <a:bodyPr wrap="square" rtlCol="0">
+              <a:spAutoFit/>
+            </a:bodyPr>
+            <a:lstStyle/>
+            <a:p>
+              <a:r>
+                <a:rPr lang="en-US" sz="2400" b="1" dirty="0" smtClean="0"/>
+                <a:t>What class (species) is a flower with the following features? </a:t>
+              </a:r>
+            </a:p>
+            <a:p>
+              <a:endParaRPr lang="en-US" dirty="0" smtClean="0"/>
+            </a:p>
+            <a:p>
+              <a:r>
+                <a:rPr lang="en-US" sz="2000" dirty="0" smtClean="0"/>
+                <a:t>sepal length (cm): 5.8</a:t>
+              </a:r>
+            </a:p>
+            <a:p>
+              <a:r>
+                <a:rPr lang="en-US" sz="2000" dirty="0" smtClean="0"/>
+                <a:t>sepal width (cm): 2.8</a:t>
+              </a:r>
+            </a:p>
+            <a:p>
+              <a:r>
+                <a:rPr lang="en-US" sz="2000" dirty="0" smtClean="0"/>
+                <a:t>petal length (cm): 5.1</a:t>
+              </a:r>
+            </a:p>
+            <a:p>
+              <a:r>
+                <a:rPr lang="en-US" sz="2000" dirty="0" smtClean="0"/>
+                <a:t>petal width (cm): 2.4</a:t>
+              </a:r>
+              <a:endParaRPr lang="en-US" sz="2000" dirty="0"/>
+            </a:p>
+            <a:p>
+              <a:endParaRPr lang="en-US" dirty="0" smtClean="0"/>
+            </a:p>
+            <a:p>
+              <a:endParaRPr lang="en-US" dirty="0"/>
+            </a:p>
+            <a:p>
+              <a:endParaRPr lang="en-US" dirty="0"/>
+            </a:p>
+          </p:txBody>
+        </p:sp>
+        <p:sp>
+          <p:nvSpPr>
+            <p:cNvPr id="12" name="Rectangle 11"/>
+            <p:cNvSpPr/>
+            <p:nvPr/>
+          </p:nvSpPr>
+          <p:spPr>
+            <a:xfrm>
+              <a:off x="2189301" y="7010118"/>
+              <a:ext cx="6096000" cy="400110"/>
+            </a:xfrm>
+            <a:prstGeom prst="rect">
+              <a:avLst/>
+            </a:prstGeom>
+          </p:spPr>
+          <p:txBody>
+            <a:bodyPr>
+              <a:spAutoFit/>
+            </a:bodyPr>
+            <a:lstStyle/>
+            <a:p>
+              <a:r>
+                <a:rPr lang="en-US" sz="2000" dirty="0" smtClean="0"/>
+                <a:t>The prediction is </a:t>
+              </a:r>
+              <a:r>
+                <a:rPr lang="en-US" sz="2000" dirty="0" err="1" smtClean="0"/>
+                <a:t>virginica</a:t>
+              </a:r>
+              <a:r>
+                <a:rPr lang="en-US" sz="2000" dirty="0" smtClean="0"/>
+                <a:t> as it is the majority class. </a:t>
+              </a:r>
+              <a:endParaRPr lang="en-US" sz="2000" dirty="0"/>
+            </a:p>
+          </p:txBody>
+        </p:sp>
+      </p:grpSp>
+    </p:spTree>
+    <p:extLst>
+      <p:ext uri="{BB962C8B-B14F-4D97-AF65-F5344CB8AC3E}">
+        <p14:creationId xmlns:p14="http://schemas.microsoft.com/office/powerpoint/2010/main" val="1777933550"/>
       </p:ext>
     </p:extLst>
   </p:cSld>

</xml_diff>

<commit_message>
Added a decision surface of sorts to explain prediction
</commit_message>
<xml_diff>
--- a/Sklearn/DecisionTrees/powerpoint/DecisionComparison.pptx
+++ b/Sklearn/DecisionTrees/powerpoint/DecisionComparison.pptx
@@ -8,6 +8,8 @@
     <p:sldId id="256" r:id="rId2"/>
     <p:sldId id="257" r:id="rId3"/>
     <p:sldId id="258" r:id="rId4"/>
+    <p:sldId id="259" r:id="rId5"/>
+    <p:sldId id="260" r:id="rId6"/>
   </p:sldIdLst>
   <p:sldSz cx="12192000" cy="6858000"/>
   <p:notesSz cx="6858000" cy="9144000"/>
@@ -3076,155 +3078,140 @@
           </a:ln>
         </p:spPr>
       </p:pic>
-      <p:grpSp>
-        <p:nvGrpSpPr>
-          <p:cNvPr id="8" name="Group 7"/>
-          <p:cNvGrpSpPr/>
+      <p:pic>
+        <p:nvPicPr>
+          <p:cNvPr id="7" name="Picture 6"/>
+          <p:cNvPicPr>
+            <a:picLocks noChangeAspect="1"/>
+          </p:cNvPicPr>
           <p:nvPr/>
-        </p:nvGrpSpPr>
-        <p:grpSpPr>
+        </p:nvPicPr>
+        <p:blipFill>
+          <a:blip r:embed="rId5">
+            <a:extLst>
+              <a:ext uri="{28A0092B-C50C-407E-A947-70E740481C1C}">
+                <a14:useLocalDpi xmlns:a14="http://schemas.microsoft.com/office/drawing/2010/main" val="0"/>
+              </a:ext>
+            </a:extLst>
+          </a:blip>
+          <a:stretch>
+            <a:fillRect/>
+          </a:stretch>
+        </p:blipFill>
+        <p:spPr>
+          <a:xfrm>
+            <a:off x="437830" y="-2468380"/>
+            <a:ext cx="3590163" cy="3191256"/>
+          </a:xfrm>
+          <a:prstGeom prst="rect">
+            <a:avLst/>
+          </a:prstGeom>
+          <a:ln w="12700">
+            <a:solidFill>
+              <a:schemeClr val="tx1"/>
+            </a:solidFill>
+          </a:ln>
+        </p:spPr>
+      </p:pic>
+      <p:pic>
+        <p:nvPicPr>
+          <p:cNvPr id="9" name="Picture 8"/>
+          <p:cNvPicPr>
+            <a:picLocks noChangeAspect="1"/>
+          </p:cNvPicPr>
+          <p:nvPr/>
+        </p:nvPicPr>
+        <p:blipFill>
+          <a:blip r:embed="rId6">
+            <a:extLst>
+              <a:ext uri="{28A0092B-C50C-407E-A947-70E740481C1C}">
+                <a14:useLocalDpi xmlns:a14="http://schemas.microsoft.com/office/drawing/2010/main" val="0"/>
+              </a:ext>
+            </a:extLst>
+          </a:blip>
+          <a:stretch>
+            <a:fillRect/>
+          </a:stretch>
+        </p:blipFill>
+        <p:spPr>
           <a:xfrm>
             <a:off x="317170" y="-2565439"/>
-            <a:ext cx="8565911" cy="3288315"/>
-            <a:chOff x="71844" y="-2771625"/>
-            <a:chExt cx="8565911" cy="3288315"/>
+            <a:ext cx="833887" cy="914400"/>
           </a:xfrm>
-        </p:grpSpPr>
-        <p:pic>
-          <p:nvPicPr>
-            <p:cNvPr id="7" name="Picture 6"/>
-            <p:cNvPicPr>
-              <a:picLocks noChangeAspect="1"/>
-            </p:cNvPicPr>
-            <p:nvPr/>
-          </p:nvPicPr>
-          <p:blipFill>
-            <a:blip r:embed="rId5">
-              <a:extLst>
-                <a:ext uri="{28A0092B-C50C-407E-A947-70E740481C1C}">
-                  <a14:useLocalDpi xmlns:a14="http://schemas.microsoft.com/office/drawing/2010/main" val="0"/>
-                </a:ext>
-              </a:extLst>
-            </a:blip>
-            <a:stretch>
-              <a:fillRect/>
-            </a:stretch>
-          </p:blipFill>
-          <p:spPr>
-            <a:xfrm>
-              <a:off x="192504" y="-2674566"/>
-              <a:ext cx="3590163" cy="3191256"/>
-            </a:xfrm>
-            <a:prstGeom prst="rect">
-              <a:avLst/>
-            </a:prstGeom>
-            <a:ln w="12700">
-              <a:solidFill>
-                <a:schemeClr val="tx1"/>
-              </a:solidFill>
-            </a:ln>
-          </p:spPr>
-        </p:pic>
-        <p:pic>
-          <p:nvPicPr>
-            <p:cNvPr id="9" name="Picture 8"/>
-            <p:cNvPicPr>
-              <a:picLocks noChangeAspect="1"/>
-            </p:cNvPicPr>
-            <p:nvPr/>
-          </p:nvPicPr>
-          <p:blipFill>
-            <a:blip r:embed="rId6">
-              <a:extLst>
-                <a:ext uri="{28A0092B-C50C-407E-A947-70E740481C1C}">
-                  <a14:useLocalDpi xmlns:a14="http://schemas.microsoft.com/office/drawing/2010/main" val="0"/>
-                </a:ext>
-              </a:extLst>
-            </a:blip>
-            <a:stretch>
-              <a:fillRect/>
-            </a:stretch>
-          </p:blipFill>
-          <p:spPr>
-            <a:xfrm>
-              <a:off x="71844" y="-2771625"/>
-              <a:ext cx="833887" cy="914400"/>
-            </a:xfrm>
-            <a:prstGeom prst="rect">
-              <a:avLst/>
-            </a:prstGeom>
-          </p:spPr>
-        </p:pic>
-        <p:pic>
-          <p:nvPicPr>
-            <p:cNvPr id="2" name="Picture 1"/>
-            <p:cNvPicPr>
-              <a:picLocks noChangeAspect="1"/>
-            </p:cNvPicPr>
-            <p:nvPr/>
-          </p:nvPicPr>
-          <p:blipFill>
-            <a:blip r:embed="rId3">
-              <a:extLst>
-                <a:ext uri="{28A0092B-C50C-407E-A947-70E740481C1C}">
-                  <a14:useLocalDpi xmlns:a14="http://schemas.microsoft.com/office/drawing/2010/main" val="0"/>
-                </a:ext>
-              </a:extLst>
-            </a:blip>
-            <a:stretch>
-              <a:fillRect/>
-            </a:stretch>
-          </p:blipFill>
-          <p:spPr>
-            <a:xfrm>
-              <a:off x="3951455" y="-2671010"/>
-              <a:ext cx="4686300" cy="3187700"/>
-            </a:xfrm>
-            <a:prstGeom prst="rect">
-              <a:avLst/>
-            </a:prstGeom>
-            <a:ln w="12700">
-              <a:solidFill>
-                <a:schemeClr val="tx1"/>
-              </a:solidFill>
-            </a:ln>
-          </p:spPr>
-        </p:pic>
-        <p:pic>
-          <p:nvPicPr>
-            <p:cNvPr id="12" name="Picture 11"/>
-            <p:cNvPicPr>
-              <a:picLocks noChangeAspect="1"/>
-            </p:cNvPicPr>
-            <p:nvPr/>
-          </p:nvPicPr>
-          <p:blipFill>
-            <a:blip r:embed="rId4">
-              <a:extLst>
-                <a:ext uri="{28A0092B-C50C-407E-A947-70E740481C1C}">
-                  <a14:useLocalDpi xmlns:a14="http://schemas.microsoft.com/office/drawing/2010/main" val="0"/>
-                </a:ext>
-              </a:extLst>
-            </a:blip>
-            <a:stretch>
-              <a:fillRect/>
-            </a:stretch>
-          </p:blipFill>
-          <p:spPr>
-            <a:xfrm>
-              <a:off x="3830794" y="-2771625"/>
-              <a:ext cx="833887" cy="914400"/>
-            </a:xfrm>
-            <a:prstGeom prst="rect">
-              <a:avLst/>
-            </a:prstGeom>
+          <a:prstGeom prst="rect">
+            <a:avLst/>
+          </a:prstGeom>
+        </p:spPr>
+      </p:pic>
+      <p:pic>
+        <p:nvPicPr>
+          <p:cNvPr id="2" name="Picture 1"/>
+          <p:cNvPicPr>
+            <a:picLocks noChangeAspect="1"/>
+          </p:cNvPicPr>
+          <p:nvPr/>
+        </p:nvPicPr>
+        <p:blipFill>
+          <a:blip r:embed="rId3">
+            <a:extLst>
+              <a:ext uri="{28A0092B-C50C-407E-A947-70E740481C1C}">
+                <a14:useLocalDpi xmlns:a14="http://schemas.microsoft.com/office/drawing/2010/main" val="0"/>
+              </a:ext>
+            </a:extLst>
+          </a:blip>
+          <a:stretch>
+            <a:fillRect/>
+          </a:stretch>
+        </p:blipFill>
+        <p:spPr>
+          <a:xfrm>
+            <a:off x="4196781" y="-2464824"/>
+            <a:ext cx="4686300" cy="3187700"/>
+          </a:xfrm>
+          <a:prstGeom prst="rect">
+            <a:avLst/>
+          </a:prstGeom>
+          <a:ln w="12700">
+            <a:solidFill>
+              <a:schemeClr val="tx1"/>
+            </a:solidFill>
+          </a:ln>
+        </p:spPr>
+      </p:pic>
+      <p:pic>
+        <p:nvPicPr>
+          <p:cNvPr id="12" name="Picture 11"/>
+          <p:cNvPicPr>
+            <a:picLocks noChangeAspect="1"/>
+          </p:cNvPicPr>
+          <p:nvPr/>
+        </p:nvPicPr>
+        <p:blipFill>
+          <a:blip r:embed="rId4">
+            <a:extLst>
+              <a:ext uri="{28A0092B-C50C-407E-A947-70E740481C1C}">
+                <a14:useLocalDpi xmlns:a14="http://schemas.microsoft.com/office/drawing/2010/main" val="0"/>
+              </a:ext>
+            </a:extLst>
+          </a:blip>
+          <a:stretch>
+            <a:fillRect/>
+          </a:stretch>
+        </p:blipFill>
+        <p:spPr>
+          <a:xfrm>
+            <a:off x="4076120" y="-2565439"/>
+            <a:ext cx="833887" cy="914400"/>
+          </a:xfrm>
+          <a:prstGeom prst="rect">
+            <a:avLst/>
+          </a:prstGeom>
+          <a:noFill/>
+          <a:ln w="57150">
             <a:noFill/>
-            <a:ln w="57150">
-              <a:noFill/>
-            </a:ln>
-          </p:spPr>
-        </p:pic>
-      </p:grpSp>
+          </a:ln>
+        </p:spPr>
+      </p:pic>
     </p:spTree>
     <p:extLst>
       <p:ext uri="{BB962C8B-B14F-4D97-AF65-F5344CB8AC3E}">
@@ -3854,10 +3841,370 @@
           </p:txBody>
         </p:sp>
       </p:grpSp>
+      <p:pic>
+        <p:nvPicPr>
+          <p:cNvPr id="14" name="Picture 13"/>
+          <p:cNvPicPr>
+            <a:picLocks noChangeAspect="1"/>
+          </p:cNvPicPr>
+          <p:nvPr/>
+        </p:nvPicPr>
+        <p:blipFill>
+          <a:blip r:embed="rId4">
+            <a:extLst>
+              <a:ext uri="{28A0092B-C50C-407E-A947-70E740481C1C}">
+                <a14:useLocalDpi xmlns:a14="http://schemas.microsoft.com/office/drawing/2010/main" val="0"/>
+              </a:ext>
+            </a:extLst>
+          </a:blip>
+          <a:stretch>
+            <a:fillRect/>
+          </a:stretch>
+        </p:blipFill>
+        <p:spPr>
+          <a:xfrm>
+            <a:off x="9440731" y="1649622"/>
+            <a:ext cx="4686300" cy="3187700"/>
+          </a:xfrm>
+          <a:prstGeom prst="rect">
+            <a:avLst/>
+          </a:prstGeom>
+          <a:ln w="12700">
+            <a:solidFill>
+              <a:schemeClr val="tx1"/>
+            </a:solidFill>
+          </a:ln>
+        </p:spPr>
+      </p:pic>
     </p:spTree>
     <p:extLst>
       <p:ext uri="{BB962C8B-B14F-4D97-AF65-F5344CB8AC3E}">
         <p14:creationId xmlns:p14="http://schemas.microsoft.com/office/powerpoint/2010/main" val="1777933550"/>
+      </p:ext>
+    </p:extLst>
+  </p:cSld>
+  <p:clrMapOvr>
+    <a:masterClrMapping/>
+  </p:clrMapOvr>
+</p:sld>
+</file>
+
+<file path=ppt/slides/slide4.xml><?xml version="1.0" encoding="utf-8"?>
+<p:sld xmlns:a="http://schemas.openxmlformats.org/drawingml/2006/main" xmlns:r="http://schemas.openxmlformats.org/officeDocument/2006/relationships" xmlns:p="http://schemas.openxmlformats.org/presentationml/2006/main">
+  <p:cSld>
+    <p:spTree>
+      <p:nvGrpSpPr>
+        <p:cNvPr id="1" name=""/>
+        <p:cNvGrpSpPr/>
+        <p:nvPr/>
+      </p:nvGrpSpPr>
+      <p:grpSpPr>
+        <a:xfrm>
+          <a:off x="0" y="0"/>
+          <a:ext cx="0" cy="0"/>
+          <a:chOff x="0" y="0"/>
+          <a:chExt cx="0" cy="0"/>
+        </a:xfrm>
+      </p:grpSpPr>
+      <p:grpSp>
+        <p:nvGrpSpPr>
+          <p:cNvPr id="13" name="Group 12"/>
+          <p:cNvGrpSpPr/>
+          <p:nvPr/>
+        </p:nvGrpSpPr>
+        <p:grpSpPr>
+          <a:xfrm>
+            <a:off x="395419" y="703472"/>
+            <a:ext cx="8570781" cy="6706756"/>
+            <a:chOff x="395419" y="703472"/>
+            <a:chExt cx="8570781" cy="6706756"/>
+          </a:xfrm>
+        </p:grpSpPr>
+        <p:pic>
+          <p:nvPicPr>
+            <p:cNvPr id="11" name="Picture 10"/>
+            <p:cNvPicPr>
+              <a:picLocks noChangeAspect="1"/>
+            </p:cNvPicPr>
+            <p:nvPr/>
+          </p:nvPicPr>
+          <p:blipFill>
+            <a:blip r:embed="rId2">
+              <a:extLst>
+                <a:ext uri="{28A0092B-C50C-407E-A947-70E740481C1C}">
+                  <a14:useLocalDpi xmlns:a14="http://schemas.microsoft.com/office/drawing/2010/main" val="0"/>
+                </a:ext>
+              </a:extLst>
+            </a:blip>
+            <a:stretch>
+              <a:fillRect/>
+            </a:stretch>
+          </p:blipFill>
+          <p:spPr>
+            <a:xfrm>
+              <a:off x="3213100" y="703472"/>
+              <a:ext cx="5753100" cy="5080000"/>
+            </a:xfrm>
+            <a:prstGeom prst="rect">
+              <a:avLst/>
+            </a:prstGeom>
+          </p:spPr>
+        </p:pic>
+        <p:pic>
+          <p:nvPicPr>
+            <p:cNvPr id="7" name="Picture 6"/>
+            <p:cNvPicPr>
+              <a:picLocks noChangeAspect="1"/>
+            </p:cNvPicPr>
+            <p:nvPr/>
+          </p:nvPicPr>
+          <p:blipFill rotWithShape="1">
+            <a:blip r:embed="rId3">
+              <a:extLst>
+                <a:ext uri="{28A0092B-C50C-407E-A947-70E740481C1C}">
+                  <a14:useLocalDpi xmlns:a14="http://schemas.microsoft.com/office/drawing/2010/main" val="0"/>
+                </a:ext>
+              </a:extLst>
+            </a:blip>
+            <a:srcRect l="68876"/>
+            <a:stretch/>
+          </p:blipFill>
+          <p:spPr>
+            <a:xfrm>
+              <a:off x="7523301" y="5755762"/>
+              <a:ext cx="990383" cy="1060704"/>
+            </a:xfrm>
+            <a:prstGeom prst="rect">
+              <a:avLst/>
+            </a:prstGeom>
+          </p:spPr>
+        </p:pic>
+        <p:pic>
+          <p:nvPicPr>
+            <p:cNvPr id="8" name="Picture 7"/>
+            <p:cNvPicPr>
+              <a:picLocks noChangeAspect="1"/>
+            </p:cNvPicPr>
+            <p:nvPr/>
+          </p:nvPicPr>
+          <p:blipFill rotWithShape="1">
+            <a:blip r:embed="rId3">
+              <a:extLst>
+                <a:ext uri="{28A0092B-C50C-407E-A947-70E740481C1C}">
+                  <a14:useLocalDpi xmlns:a14="http://schemas.microsoft.com/office/drawing/2010/main" val="0"/>
+                </a:ext>
+              </a:extLst>
+            </a:blip>
+            <a:srcRect l="33873" r="35004"/>
+            <a:stretch/>
+          </p:blipFill>
+          <p:spPr>
+            <a:xfrm>
+              <a:off x="3639316" y="3952158"/>
+              <a:ext cx="987643" cy="1057769"/>
+            </a:xfrm>
+            <a:prstGeom prst="rect">
+              <a:avLst/>
+            </a:prstGeom>
+          </p:spPr>
+        </p:pic>
+        <p:pic>
+          <p:nvPicPr>
+            <p:cNvPr id="9" name="Picture 8"/>
+            <p:cNvPicPr>
+              <a:picLocks noChangeAspect="1"/>
+            </p:cNvPicPr>
+            <p:nvPr/>
+          </p:nvPicPr>
+          <p:blipFill rotWithShape="1">
+            <a:blip r:embed="rId3">
+              <a:extLst>
+                <a:ext uri="{28A0092B-C50C-407E-A947-70E740481C1C}">
+                  <a14:useLocalDpi xmlns:a14="http://schemas.microsoft.com/office/drawing/2010/main" val="0"/>
+                </a:ext>
+              </a:extLst>
+            </a:blip>
+            <a:srcRect r="68876"/>
+            <a:stretch/>
+          </p:blipFill>
+          <p:spPr>
+            <a:xfrm>
+              <a:off x="5237301" y="5755762"/>
+              <a:ext cx="990383" cy="1060704"/>
+            </a:xfrm>
+            <a:prstGeom prst="rect">
+              <a:avLst/>
+            </a:prstGeom>
+          </p:spPr>
+        </p:pic>
+        <p:sp>
+          <p:nvSpPr>
+            <p:cNvPr id="10" name="TextBox 9"/>
+            <p:cNvSpPr txBox="1"/>
+            <p:nvPr/>
+          </p:nvSpPr>
+          <p:spPr>
+            <a:xfrm>
+              <a:off x="395419" y="889000"/>
+              <a:ext cx="2817681" cy="3539430"/>
+            </a:xfrm>
+            <a:prstGeom prst="rect">
+              <a:avLst/>
+            </a:prstGeom>
+            <a:noFill/>
+          </p:spPr>
+          <p:txBody>
+            <a:bodyPr wrap="square" rtlCol="0">
+              <a:spAutoFit/>
+            </a:bodyPr>
+            <a:lstStyle/>
+            <a:p>
+              <a:r>
+                <a:rPr lang="en-US" sz="2400" b="1" dirty="0" smtClean="0"/>
+                <a:t>What class (species) is a flower with the following features? </a:t>
+              </a:r>
+            </a:p>
+            <a:p>
+              <a:endParaRPr lang="en-US" dirty="0" smtClean="0"/>
+            </a:p>
+            <a:p>
+              <a:r>
+                <a:rPr lang="en-US" sz="2000" dirty="0" smtClean="0"/>
+                <a:t>sepal length (cm): 5.8</a:t>
+              </a:r>
+            </a:p>
+            <a:p>
+              <a:r>
+                <a:rPr lang="en-US" sz="2000" dirty="0" smtClean="0"/>
+                <a:t>sepal width (cm): 2.8</a:t>
+              </a:r>
+            </a:p>
+            <a:p>
+              <a:r>
+                <a:rPr lang="en-US" sz="2000" dirty="0" smtClean="0"/>
+                <a:t>petal length (cm): 5.1</a:t>
+              </a:r>
+            </a:p>
+            <a:p>
+              <a:r>
+                <a:rPr lang="en-US" sz="2000" dirty="0" smtClean="0"/>
+                <a:t>petal width (cm): 2.4</a:t>
+              </a:r>
+              <a:endParaRPr lang="en-US" sz="2000" dirty="0"/>
+            </a:p>
+            <a:p>
+              <a:endParaRPr lang="en-US" dirty="0" smtClean="0"/>
+            </a:p>
+            <a:p>
+              <a:endParaRPr lang="en-US" dirty="0"/>
+            </a:p>
+            <a:p>
+              <a:endParaRPr lang="en-US" dirty="0"/>
+            </a:p>
+          </p:txBody>
+        </p:sp>
+        <p:sp>
+          <p:nvSpPr>
+            <p:cNvPr id="12" name="Rectangle 11"/>
+            <p:cNvSpPr/>
+            <p:nvPr/>
+          </p:nvSpPr>
+          <p:spPr>
+            <a:xfrm>
+              <a:off x="2189301" y="7010118"/>
+              <a:ext cx="6096000" cy="400110"/>
+            </a:xfrm>
+            <a:prstGeom prst="rect">
+              <a:avLst/>
+            </a:prstGeom>
+          </p:spPr>
+          <p:txBody>
+            <a:bodyPr>
+              <a:spAutoFit/>
+            </a:bodyPr>
+            <a:lstStyle/>
+            <a:p>
+              <a:r>
+                <a:rPr lang="en-US" sz="2000" dirty="0" smtClean="0"/>
+                <a:t>The prediction is </a:t>
+              </a:r>
+              <a:r>
+                <a:rPr lang="en-US" sz="2000" dirty="0" err="1" smtClean="0"/>
+                <a:t>virginica</a:t>
+              </a:r>
+              <a:r>
+                <a:rPr lang="en-US" sz="2000" dirty="0" smtClean="0"/>
+                <a:t> as it is the majority class. </a:t>
+              </a:r>
+              <a:endParaRPr lang="en-US" sz="2000" dirty="0"/>
+            </a:p>
+          </p:txBody>
+        </p:sp>
+      </p:grpSp>
+    </p:spTree>
+    <p:extLst>
+      <p:ext uri="{BB962C8B-B14F-4D97-AF65-F5344CB8AC3E}">
+        <p14:creationId xmlns:p14="http://schemas.microsoft.com/office/powerpoint/2010/main" val="1759434061"/>
+      </p:ext>
+    </p:extLst>
+  </p:cSld>
+  <p:clrMapOvr>
+    <a:masterClrMapping/>
+  </p:clrMapOvr>
+</p:sld>
+</file>
+
+<file path=ppt/slides/slide5.xml><?xml version="1.0" encoding="utf-8"?>
+<p:sld xmlns:a="http://schemas.openxmlformats.org/drawingml/2006/main" xmlns:r="http://schemas.openxmlformats.org/officeDocument/2006/relationships" xmlns:p="http://schemas.openxmlformats.org/presentationml/2006/main">
+  <p:cSld>
+    <p:spTree>
+      <p:nvGrpSpPr>
+        <p:cNvPr id="1" name=""/>
+        <p:cNvGrpSpPr/>
+        <p:nvPr/>
+      </p:nvGrpSpPr>
+      <p:grpSpPr>
+        <a:xfrm>
+          <a:off x="0" y="0"/>
+          <a:ext cx="0" cy="0"/>
+          <a:chOff x="0" y="0"/>
+          <a:chExt cx="0" cy="0"/>
+        </a:xfrm>
+      </p:grpSpPr>
+      <p:pic>
+        <p:nvPicPr>
+          <p:cNvPr id="4" name="Picture 3"/>
+          <p:cNvPicPr>
+            <a:picLocks noChangeAspect="1"/>
+          </p:cNvPicPr>
+          <p:nvPr/>
+        </p:nvPicPr>
+        <p:blipFill>
+          <a:blip r:embed="rId2">
+            <a:extLst>
+              <a:ext uri="{28A0092B-C50C-407E-A947-70E740481C1C}">
+                <a14:useLocalDpi xmlns:a14="http://schemas.microsoft.com/office/drawing/2010/main" val="0"/>
+              </a:ext>
+            </a:extLst>
+          </a:blip>
+          <a:stretch>
+            <a:fillRect/>
+          </a:stretch>
+        </p:blipFill>
+        <p:spPr>
+          <a:xfrm>
+            <a:off x="3759200" y="1828800"/>
+            <a:ext cx="4660900" cy="3187700"/>
+          </a:xfrm>
+          <a:prstGeom prst="rect">
+            <a:avLst/>
+          </a:prstGeom>
+        </p:spPr>
+      </p:pic>
+    </p:spTree>
+    <p:extLst>
+      <p:ext uri="{BB962C8B-B14F-4D97-AF65-F5344CB8AC3E}">
+        <p14:creationId xmlns:p14="http://schemas.microsoft.com/office/powerpoint/2010/main" val="1165698673"/>
       </p:ext>
     </p:extLst>
   </p:cSld>

</xml_diff>

<commit_message>
Updated decision tree tutorial for partial classification boundary
</commit_message>
<xml_diff>
--- a/Sklearn/DecisionTrees/powerpoint/DecisionComparison.pptx
+++ b/Sklearn/DecisionTrees/powerpoint/DecisionComparison.pptx
@@ -10,6 +10,7 @@
     <p:sldId id="258" r:id="rId4"/>
     <p:sldId id="259" r:id="rId5"/>
     <p:sldId id="260" r:id="rId6"/>
+    <p:sldId id="261" r:id="rId7"/>
   </p:sldIdLst>
   <p:sldSz cx="12192000" cy="6858000"/>
   <p:notesSz cx="6858000" cy="9144000"/>
@@ -247,7 +248,7 @@
           <a:p>
             <a:fld id="{B66C5E5C-AFE9-2848-A01D-417298715EDA}" type="datetimeFigureOut">
               <a:rPr lang="en-US" smtClean="0"/>
-              <a:t>9/20/18</a:t>
+              <a:t>9/24/18</a:t>
             </a:fld>
             <a:endParaRPr lang="en-US"/>
           </a:p>
@@ -417,7 +418,7 @@
           <a:p>
             <a:fld id="{B66C5E5C-AFE9-2848-A01D-417298715EDA}" type="datetimeFigureOut">
               <a:rPr lang="en-US" smtClean="0"/>
-              <a:t>9/20/18</a:t>
+              <a:t>9/24/18</a:t>
             </a:fld>
             <a:endParaRPr lang="en-US"/>
           </a:p>
@@ -597,7 +598,7 @@
           <a:p>
             <a:fld id="{B66C5E5C-AFE9-2848-A01D-417298715EDA}" type="datetimeFigureOut">
               <a:rPr lang="en-US" smtClean="0"/>
-              <a:t>9/20/18</a:t>
+              <a:t>9/24/18</a:t>
             </a:fld>
             <a:endParaRPr lang="en-US"/>
           </a:p>
@@ -767,7 +768,7 @@
           <a:p>
             <a:fld id="{B66C5E5C-AFE9-2848-A01D-417298715EDA}" type="datetimeFigureOut">
               <a:rPr lang="en-US" smtClean="0"/>
-              <a:t>9/20/18</a:t>
+              <a:t>9/24/18</a:t>
             </a:fld>
             <a:endParaRPr lang="en-US"/>
           </a:p>
@@ -1013,7 +1014,7 @@
           <a:p>
             <a:fld id="{B66C5E5C-AFE9-2848-A01D-417298715EDA}" type="datetimeFigureOut">
               <a:rPr lang="en-US" smtClean="0"/>
-              <a:t>9/20/18</a:t>
+              <a:t>9/24/18</a:t>
             </a:fld>
             <a:endParaRPr lang="en-US"/>
           </a:p>
@@ -1245,7 +1246,7 @@
           <a:p>
             <a:fld id="{B66C5E5C-AFE9-2848-A01D-417298715EDA}" type="datetimeFigureOut">
               <a:rPr lang="en-US" smtClean="0"/>
-              <a:t>9/20/18</a:t>
+              <a:t>9/24/18</a:t>
             </a:fld>
             <a:endParaRPr lang="en-US"/>
           </a:p>
@@ -1612,7 +1613,7 @@
           <a:p>
             <a:fld id="{B66C5E5C-AFE9-2848-A01D-417298715EDA}" type="datetimeFigureOut">
               <a:rPr lang="en-US" smtClean="0"/>
-              <a:t>9/20/18</a:t>
+              <a:t>9/24/18</a:t>
             </a:fld>
             <a:endParaRPr lang="en-US"/>
           </a:p>
@@ -1730,7 +1731,7 @@
           <a:p>
             <a:fld id="{B66C5E5C-AFE9-2848-A01D-417298715EDA}" type="datetimeFigureOut">
               <a:rPr lang="en-US" smtClean="0"/>
-              <a:t>9/20/18</a:t>
+              <a:t>9/24/18</a:t>
             </a:fld>
             <a:endParaRPr lang="en-US"/>
           </a:p>
@@ -1825,7 +1826,7 @@
           <a:p>
             <a:fld id="{B66C5E5C-AFE9-2848-A01D-417298715EDA}" type="datetimeFigureOut">
               <a:rPr lang="en-US" smtClean="0"/>
-              <a:t>9/20/18</a:t>
+              <a:t>9/24/18</a:t>
             </a:fld>
             <a:endParaRPr lang="en-US"/>
           </a:p>
@@ -2102,7 +2103,7 @@
           <a:p>
             <a:fld id="{B66C5E5C-AFE9-2848-A01D-417298715EDA}" type="datetimeFigureOut">
               <a:rPr lang="en-US" smtClean="0"/>
-              <a:t>9/20/18</a:t>
+              <a:t>9/24/18</a:t>
             </a:fld>
             <a:endParaRPr lang="en-US"/>
           </a:p>
@@ -2355,7 +2356,7 @@
           <a:p>
             <a:fld id="{B66C5E5C-AFE9-2848-A01D-417298715EDA}" type="datetimeFigureOut">
               <a:rPr lang="en-US" smtClean="0"/>
-              <a:t>9/20/18</a:t>
+              <a:t>9/24/18</a:t>
             </a:fld>
             <a:endParaRPr lang="en-US"/>
           </a:p>
@@ -2568,7 +2569,7 @@
           <a:p>
             <a:fld id="{B66C5E5C-AFE9-2848-A01D-417298715EDA}" type="datetimeFigureOut">
               <a:rPr lang="en-US" smtClean="0"/>
-              <a:t>9/20/18</a:t>
+              <a:t>9/24/18</a:t>
             </a:fld>
             <a:endParaRPr lang="en-US"/>
           </a:p>
@@ -4214,6 +4215,36 @@
 </p:sld>
 </file>
 
+<file path=ppt/slides/slide6.xml><?xml version="1.0" encoding="utf-8"?>
+<p:sld xmlns:a="http://schemas.openxmlformats.org/drawingml/2006/main" xmlns:r="http://schemas.openxmlformats.org/officeDocument/2006/relationships" xmlns:p="http://schemas.openxmlformats.org/presentationml/2006/main">
+  <p:cSld>
+    <p:spTree>
+      <p:nvGrpSpPr>
+        <p:cNvPr id="1" name=""/>
+        <p:cNvGrpSpPr/>
+        <p:nvPr/>
+      </p:nvGrpSpPr>
+      <p:grpSpPr>
+        <a:xfrm>
+          <a:off x="0" y="0"/>
+          <a:ext cx="0" cy="0"/>
+          <a:chOff x="0" y="0"/>
+          <a:chExt cx="0" cy="0"/>
+        </a:xfrm>
+      </p:grpSpPr>
+    </p:spTree>
+    <p:extLst>
+      <p:ext uri="{BB962C8B-B14F-4D97-AF65-F5344CB8AC3E}">
+        <p14:creationId xmlns:p14="http://schemas.microsoft.com/office/powerpoint/2010/main" val="1437185423"/>
+      </p:ext>
+    </p:extLst>
+  </p:cSld>
+  <p:clrMapOvr>
+    <a:masterClrMapping/>
+  </p:clrMapOvr>
+</p:sld>
+</file>
+
 <file path=ppt/theme/theme1.xml><?xml version="1.0" encoding="utf-8"?>
 <a:theme xmlns:a="http://schemas.openxmlformats.org/drawingml/2006/main" name="Office Theme">
   <a:themeElements>

</xml_diff>

<commit_message>
Updated decision tutorial for decision node 1
</commit_message>
<xml_diff>
--- a/Sklearn/DecisionTrees/powerpoint/DecisionComparison.pptx
+++ b/Sklearn/DecisionTrees/powerpoint/DecisionComparison.pptx
@@ -7,10 +7,12 @@
   <p:sldIdLst>
     <p:sldId id="256" r:id="rId2"/>
     <p:sldId id="257" r:id="rId3"/>
-    <p:sldId id="258" r:id="rId4"/>
-    <p:sldId id="259" r:id="rId5"/>
-    <p:sldId id="260" r:id="rId6"/>
-    <p:sldId id="261" r:id="rId7"/>
+    <p:sldId id="263" r:id="rId4"/>
+    <p:sldId id="258" r:id="rId5"/>
+    <p:sldId id="262" r:id="rId6"/>
+    <p:sldId id="259" r:id="rId7"/>
+    <p:sldId id="260" r:id="rId8"/>
+    <p:sldId id="261" r:id="rId9"/>
   </p:sldIdLst>
   <p:sldSz cx="12192000" cy="6858000"/>
   <p:notesSz cx="6858000" cy="9144000"/>
@@ -248,7 +250,7 @@
           <a:p>
             <a:fld id="{B66C5E5C-AFE9-2848-A01D-417298715EDA}" type="datetimeFigureOut">
               <a:rPr lang="en-US" smtClean="0"/>
-              <a:t>9/24/18</a:t>
+              <a:t>9/25/18</a:t>
             </a:fld>
             <a:endParaRPr lang="en-US"/>
           </a:p>
@@ -418,7 +420,7 @@
           <a:p>
             <a:fld id="{B66C5E5C-AFE9-2848-A01D-417298715EDA}" type="datetimeFigureOut">
               <a:rPr lang="en-US" smtClean="0"/>
-              <a:t>9/24/18</a:t>
+              <a:t>9/25/18</a:t>
             </a:fld>
             <a:endParaRPr lang="en-US"/>
           </a:p>
@@ -598,7 +600,7 @@
           <a:p>
             <a:fld id="{B66C5E5C-AFE9-2848-A01D-417298715EDA}" type="datetimeFigureOut">
               <a:rPr lang="en-US" smtClean="0"/>
-              <a:t>9/24/18</a:t>
+              <a:t>9/25/18</a:t>
             </a:fld>
             <a:endParaRPr lang="en-US"/>
           </a:p>
@@ -768,7 +770,7 @@
           <a:p>
             <a:fld id="{B66C5E5C-AFE9-2848-A01D-417298715EDA}" type="datetimeFigureOut">
               <a:rPr lang="en-US" smtClean="0"/>
-              <a:t>9/24/18</a:t>
+              <a:t>9/25/18</a:t>
             </a:fld>
             <a:endParaRPr lang="en-US"/>
           </a:p>
@@ -1014,7 +1016,7 @@
           <a:p>
             <a:fld id="{B66C5E5C-AFE9-2848-A01D-417298715EDA}" type="datetimeFigureOut">
               <a:rPr lang="en-US" smtClean="0"/>
-              <a:t>9/24/18</a:t>
+              <a:t>9/25/18</a:t>
             </a:fld>
             <a:endParaRPr lang="en-US"/>
           </a:p>
@@ -1246,7 +1248,7 @@
           <a:p>
             <a:fld id="{B66C5E5C-AFE9-2848-A01D-417298715EDA}" type="datetimeFigureOut">
               <a:rPr lang="en-US" smtClean="0"/>
-              <a:t>9/24/18</a:t>
+              <a:t>9/25/18</a:t>
             </a:fld>
             <a:endParaRPr lang="en-US"/>
           </a:p>
@@ -1613,7 +1615,7 @@
           <a:p>
             <a:fld id="{B66C5E5C-AFE9-2848-A01D-417298715EDA}" type="datetimeFigureOut">
               <a:rPr lang="en-US" smtClean="0"/>
-              <a:t>9/24/18</a:t>
+              <a:t>9/25/18</a:t>
             </a:fld>
             <a:endParaRPr lang="en-US"/>
           </a:p>
@@ -1731,7 +1733,7 @@
           <a:p>
             <a:fld id="{B66C5E5C-AFE9-2848-A01D-417298715EDA}" type="datetimeFigureOut">
               <a:rPr lang="en-US" smtClean="0"/>
-              <a:t>9/24/18</a:t>
+              <a:t>9/25/18</a:t>
             </a:fld>
             <a:endParaRPr lang="en-US"/>
           </a:p>
@@ -1826,7 +1828,7 @@
           <a:p>
             <a:fld id="{B66C5E5C-AFE9-2848-A01D-417298715EDA}" type="datetimeFigureOut">
               <a:rPr lang="en-US" smtClean="0"/>
-              <a:t>9/24/18</a:t>
+              <a:t>9/25/18</a:t>
             </a:fld>
             <a:endParaRPr lang="en-US"/>
           </a:p>
@@ -2103,7 +2105,7 @@
           <a:p>
             <a:fld id="{B66C5E5C-AFE9-2848-A01D-417298715EDA}" type="datetimeFigureOut">
               <a:rPr lang="en-US" smtClean="0"/>
-              <a:t>9/24/18</a:t>
+              <a:t>9/25/18</a:t>
             </a:fld>
             <a:endParaRPr lang="en-US"/>
           </a:p>
@@ -2356,7 +2358,7 @@
           <a:p>
             <a:fld id="{B66C5E5C-AFE9-2848-A01D-417298715EDA}" type="datetimeFigureOut">
               <a:rPr lang="en-US" smtClean="0"/>
-              <a:t>9/24/18</a:t>
+              <a:t>9/25/18</a:t>
             </a:fld>
             <a:endParaRPr lang="en-US"/>
           </a:p>
@@ -2569,7 +2571,7 @@
           <a:p>
             <a:fld id="{B66C5E5C-AFE9-2848-A01D-417298715EDA}" type="datetimeFigureOut">
               <a:rPr lang="en-US" smtClean="0"/>
-              <a:t>9/24/18</a:t>
+              <a:t>9/25/18</a:t>
             </a:fld>
             <a:endParaRPr lang="en-US"/>
           </a:p>
@@ -3607,6 +3609,66 @@
           <a:chExt cx="0" cy="0"/>
         </a:xfrm>
       </p:grpSpPr>
+      <p:pic>
+        <p:nvPicPr>
+          <p:cNvPr id="4" name="Picture 3"/>
+          <p:cNvPicPr>
+            <a:picLocks noChangeAspect="1"/>
+          </p:cNvPicPr>
+          <p:nvPr/>
+        </p:nvPicPr>
+        <p:blipFill>
+          <a:blip r:embed="rId2">
+            <a:extLst>
+              <a:ext uri="{28A0092B-C50C-407E-A947-70E740481C1C}">
+                <a14:useLocalDpi xmlns:a14="http://schemas.microsoft.com/office/drawing/2010/main" val="0"/>
+              </a:ext>
+            </a:extLst>
+          </a:blip>
+          <a:stretch>
+            <a:fillRect/>
+          </a:stretch>
+        </p:blipFill>
+        <p:spPr>
+          <a:xfrm>
+            <a:off x="3213100" y="889000"/>
+            <a:ext cx="5753100" cy="5080000"/>
+          </a:xfrm>
+          <a:prstGeom prst="rect">
+            <a:avLst/>
+          </a:prstGeom>
+        </p:spPr>
+      </p:pic>
+    </p:spTree>
+    <p:extLst>
+      <p:ext uri="{BB962C8B-B14F-4D97-AF65-F5344CB8AC3E}">
+        <p14:creationId xmlns:p14="http://schemas.microsoft.com/office/powerpoint/2010/main" val="227746033"/>
+      </p:ext>
+    </p:extLst>
+  </p:cSld>
+  <p:clrMapOvr>
+    <a:masterClrMapping/>
+  </p:clrMapOvr>
+</p:sld>
+</file>
+
+<file path=ppt/slides/slide4.xml><?xml version="1.0" encoding="utf-8"?>
+<p:sld xmlns:a="http://schemas.openxmlformats.org/drawingml/2006/main" xmlns:r="http://schemas.openxmlformats.org/officeDocument/2006/relationships" xmlns:p="http://schemas.openxmlformats.org/presentationml/2006/main">
+  <p:cSld>
+    <p:spTree>
+      <p:nvGrpSpPr>
+        <p:cNvPr id="1" name=""/>
+        <p:cNvGrpSpPr/>
+        <p:nvPr/>
+      </p:nvGrpSpPr>
+      <p:grpSpPr>
+        <a:xfrm>
+          <a:off x="0" y="0"/>
+          <a:ext cx="0" cy="0"/>
+          <a:chOff x="0" y="0"/>
+          <a:chExt cx="0" cy="0"/>
+        </a:xfrm>
+      </p:grpSpPr>
       <p:grpSp>
         <p:nvGrpSpPr>
           <p:cNvPr id="13" name="Group 12"/>
@@ -3890,7 +3952,307 @@
 </p:sld>
 </file>
 
-<file path=ppt/slides/slide4.xml><?xml version="1.0" encoding="utf-8"?>
+<file path=ppt/slides/slide5.xml><?xml version="1.0" encoding="utf-8"?>
+<p:sld xmlns:a="http://schemas.openxmlformats.org/drawingml/2006/main" xmlns:r="http://schemas.openxmlformats.org/officeDocument/2006/relationships" xmlns:p="http://schemas.openxmlformats.org/presentationml/2006/main">
+  <p:cSld>
+    <p:spTree>
+      <p:nvGrpSpPr>
+        <p:cNvPr id="1" name=""/>
+        <p:cNvGrpSpPr/>
+        <p:nvPr/>
+      </p:nvGrpSpPr>
+      <p:grpSpPr>
+        <a:xfrm>
+          <a:off x="0" y="0"/>
+          <a:ext cx="0" cy="0"/>
+          <a:chOff x="0" y="0"/>
+          <a:chExt cx="0" cy="0"/>
+        </a:xfrm>
+      </p:grpSpPr>
+      <p:grpSp>
+        <p:nvGrpSpPr>
+          <p:cNvPr id="13" name="Group 12"/>
+          <p:cNvGrpSpPr/>
+          <p:nvPr/>
+        </p:nvGrpSpPr>
+        <p:grpSpPr>
+          <a:xfrm>
+            <a:off x="-2253996" y="1899139"/>
+            <a:ext cx="8570781" cy="6706756"/>
+            <a:chOff x="395419" y="703472"/>
+            <a:chExt cx="8570781" cy="6706756"/>
+          </a:xfrm>
+        </p:grpSpPr>
+        <p:pic>
+          <p:nvPicPr>
+            <p:cNvPr id="11" name="Picture 10"/>
+            <p:cNvPicPr>
+              <a:picLocks noChangeAspect="1"/>
+            </p:cNvPicPr>
+            <p:nvPr/>
+          </p:nvPicPr>
+          <p:blipFill>
+            <a:blip r:embed="rId2">
+              <a:extLst>
+                <a:ext uri="{28A0092B-C50C-407E-A947-70E740481C1C}">
+                  <a14:useLocalDpi xmlns:a14="http://schemas.microsoft.com/office/drawing/2010/main" val="0"/>
+                </a:ext>
+              </a:extLst>
+            </a:blip>
+            <a:stretch>
+              <a:fillRect/>
+            </a:stretch>
+          </p:blipFill>
+          <p:spPr>
+            <a:xfrm>
+              <a:off x="3213100" y="703472"/>
+              <a:ext cx="5753100" cy="5080000"/>
+            </a:xfrm>
+            <a:prstGeom prst="rect">
+              <a:avLst/>
+            </a:prstGeom>
+          </p:spPr>
+        </p:pic>
+        <p:pic>
+          <p:nvPicPr>
+            <p:cNvPr id="7" name="Picture 6"/>
+            <p:cNvPicPr>
+              <a:picLocks noChangeAspect="1"/>
+            </p:cNvPicPr>
+            <p:nvPr/>
+          </p:nvPicPr>
+          <p:blipFill rotWithShape="1">
+            <a:blip r:embed="rId3">
+              <a:extLst>
+                <a:ext uri="{28A0092B-C50C-407E-A947-70E740481C1C}">
+                  <a14:useLocalDpi xmlns:a14="http://schemas.microsoft.com/office/drawing/2010/main" val="0"/>
+                </a:ext>
+              </a:extLst>
+            </a:blip>
+            <a:srcRect l="68876"/>
+            <a:stretch/>
+          </p:blipFill>
+          <p:spPr>
+            <a:xfrm>
+              <a:off x="7523301" y="5755762"/>
+              <a:ext cx="990383" cy="1060704"/>
+            </a:xfrm>
+            <a:prstGeom prst="rect">
+              <a:avLst/>
+            </a:prstGeom>
+          </p:spPr>
+        </p:pic>
+        <p:pic>
+          <p:nvPicPr>
+            <p:cNvPr id="8" name="Picture 7"/>
+            <p:cNvPicPr>
+              <a:picLocks noChangeAspect="1"/>
+            </p:cNvPicPr>
+            <p:nvPr/>
+          </p:nvPicPr>
+          <p:blipFill rotWithShape="1">
+            <a:blip r:embed="rId3">
+              <a:extLst>
+                <a:ext uri="{28A0092B-C50C-407E-A947-70E740481C1C}">
+                  <a14:useLocalDpi xmlns:a14="http://schemas.microsoft.com/office/drawing/2010/main" val="0"/>
+                </a:ext>
+              </a:extLst>
+            </a:blip>
+            <a:srcRect l="33873" r="35004"/>
+            <a:stretch/>
+          </p:blipFill>
+          <p:spPr>
+            <a:xfrm>
+              <a:off x="3639316" y="3952158"/>
+              <a:ext cx="987643" cy="1057769"/>
+            </a:xfrm>
+            <a:prstGeom prst="rect">
+              <a:avLst/>
+            </a:prstGeom>
+          </p:spPr>
+        </p:pic>
+        <p:pic>
+          <p:nvPicPr>
+            <p:cNvPr id="9" name="Picture 8"/>
+            <p:cNvPicPr>
+              <a:picLocks noChangeAspect="1"/>
+            </p:cNvPicPr>
+            <p:nvPr/>
+          </p:nvPicPr>
+          <p:blipFill rotWithShape="1">
+            <a:blip r:embed="rId3">
+              <a:extLst>
+                <a:ext uri="{28A0092B-C50C-407E-A947-70E740481C1C}">
+                  <a14:useLocalDpi xmlns:a14="http://schemas.microsoft.com/office/drawing/2010/main" val="0"/>
+                </a:ext>
+              </a:extLst>
+            </a:blip>
+            <a:srcRect r="68876"/>
+            <a:stretch/>
+          </p:blipFill>
+          <p:spPr>
+            <a:xfrm>
+              <a:off x="5237301" y="5755762"/>
+              <a:ext cx="990383" cy="1060704"/>
+            </a:xfrm>
+            <a:prstGeom prst="rect">
+              <a:avLst/>
+            </a:prstGeom>
+          </p:spPr>
+        </p:pic>
+        <p:sp>
+          <p:nvSpPr>
+            <p:cNvPr id="10" name="TextBox 9"/>
+            <p:cNvSpPr txBox="1"/>
+            <p:nvPr/>
+          </p:nvSpPr>
+          <p:spPr>
+            <a:xfrm>
+              <a:off x="395419" y="889000"/>
+              <a:ext cx="2817681" cy="3539430"/>
+            </a:xfrm>
+            <a:prstGeom prst="rect">
+              <a:avLst/>
+            </a:prstGeom>
+            <a:noFill/>
+          </p:spPr>
+          <p:txBody>
+            <a:bodyPr wrap="square" rtlCol="0">
+              <a:spAutoFit/>
+            </a:bodyPr>
+            <a:lstStyle/>
+            <a:p>
+              <a:r>
+                <a:rPr lang="en-US" sz="2400" b="1" dirty="0" smtClean="0"/>
+                <a:t>What class (species) is a flower with the following features? </a:t>
+              </a:r>
+            </a:p>
+            <a:p>
+              <a:endParaRPr lang="en-US" dirty="0" smtClean="0"/>
+            </a:p>
+            <a:p>
+              <a:r>
+                <a:rPr lang="en-US" sz="2000" dirty="0" smtClean="0"/>
+                <a:t>sepal length (cm): 5.8</a:t>
+              </a:r>
+            </a:p>
+            <a:p>
+              <a:r>
+                <a:rPr lang="en-US" sz="2000" dirty="0" smtClean="0"/>
+                <a:t>sepal width (cm): 2.8</a:t>
+              </a:r>
+            </a:p>
+            <a:p>
+              <a:r>
+                <a:rPr lang="en-US" sz="2000" dirty="0" smtClean="0"/>
+                <a:t>petal length (cm): 5.1</a:t>
+              </a:r>
+            </a:p>
+            <a:p>
+              <a:r>
+                <a:rPr lang="en-US" sz="2000" dirty="0" smtClean="0"/>
+                <a:t>petal width (cm): 2.4</a:t>
+              </a:r>
+              <a:endParaRPr lang="en-US" sz="2000" dirty="0"/>
+            </a:p>
+            <a:p>
+              <a:endParaRPr lang="en-US" dirty="0" smtClean="0"/>
+            </a:p>
+            <a:p>
+              <a:endParaRPr lang="en-US" dirty="0"/>
+            </a:p>
+            <a:p>
+              <a:endParaRPr lang="en-US" dirty="0"/>
+            </a:p>
+          </p:txBody>
+        </p:sp>
+        <p:sp>
+          <p:nvSpPr>
+            <p:cNvPr id="12" name="Rectangle 11"/>
+            <p:cNvSpPr/>
+            <p:nvPr/>
+          </p:nvSpPr>
+          <p:spPr>
+            <a:xfrm>
+              <a:off x="2189301" y="7010118"/>
+              <a:ext cx="6096000" cy="400110"/>
+            </a:xfrm>
+            <a:prstGeom prst="rect">
+              <a:avLst/>
+            </a:prstGeom>
+          </p:spPr>
+          <p:txBody>
+            <a:bodyPr>
+              <a:spAutoFit/>
+            </a:bodyPr>
+            <a:lstStyle/>
+            <a:p>
+              <a:r>
+                <a:rPr lang="en-US" sz="2000" dirty="0" smtClean="0"/>
+                <a:t>The prediction is </a:t>
+              </a:r>
+              <a:r>
+                <a:rPr lang="en-US" sz="2000" dirty="0" err="1" smtClean="0"/>
+                <a:t>virginica</a:t>
+              </a:r>
+              <a:r>
+                <a:rPr lang="en-US" sz="2000" dirty="0" smtClean="0"/>
+                <a:t> as it is the majority class. </a:t>
+              </a:r>
+              <a:endParaRPr lang="en-US" sz="2000" dirty="0"/>
+            </a:p>
+          </p:txBody>
+        </p:sp>
+      </p:grpSp>
+      <p:pic>
+        <p:nvPicPr>
+          <p:cNvPr id="14" name="Picture 13"/>
+          <p:cNvPicPr>
+            <a:picLocks noChangeAspect="1"/>
+          </p:cNvPicPr>
+          <p:nvPr/>
+        </p:nvPicPr>
+        <p:blipFill>
+          <a:blip r:embed="rId4">
+            <a:extLst>
+              <a:ext uri="{28A0092B-C50C-407E-A947-70E740481C1C}">
+                <a14:useLocalDpi xmlns:a14="http://schemas.microsoft.com/office/drawing/2010/main" val="0"/>
+              </a:ext>
+            </a:extLst>
+          </a:blip>
+          <a:stretch>
+            <a:fillRect/>
+          </a:stretch>
+        </p:blipFill>
+        <p:spPr>
+          <a:xfrm>
+            <a:off x="9312319" y="-3494753"/>
+            <a:ext cx="4686300" cy="3187700"/>
+          </a:xfrm>
+          <a:prstGeom prst="rect">
+            <a:avLst/>
+          </a:prstGeom>
+          <a:ln w="12700">
+            <a:solidFill>
+              <a:schemeClr val="tx1"/>
+            </a:solidFill>
+          </a:ln>
+        </p:spPr>
+      </p:pic>
+    </p:spTree>
+    <p:extLst>
+      <p:ext uri="{BB962C8B-B14F-4D97-AF65-F5344CB8AC3E}">
+        <p14:creationId xmlns:p14="http://schemas.microsoft.com/office/powerpoint/2010/main" val="461695872"/>
+      </p:ext>
+    </p:extLst>
+  </p:cSld>
+  <p:clrMapOvr>
+    <a:masterClrMapping/>
+  </p:clrMapOvr>
+</p:sld>
+</file>
+
+<file path=ppt/slides/slide6.xml><?xml version="1.0" encoding="utf-8"?>
 <p:sld xmlns:a="http://schemas.openxmlformats.org/drawingml/2006/main" xmlns:r="http://schemas.openxmlformats.org/officeDocument/2006/relationships" xmlns:p="http://schemas.openxmlformats.org/presentationml/2006/main">
   <p:cSld>
     <p:spTree>
@@ -4155,7 +4517,7 @@
 </p:sld>
 </file>
 
-<file path=ppt/slides/slide5.xml><?xml version="1.0" encoding="utf-8"?>
+<file path=ppt/slides/slide7.xml><?xml version="1.0" encoding="utf-8"?>
 <p:sld xmlns:a="http://schemas.openxmlformats.org/drawingml/2006/main" xmlns:r="http://schemas.openxmlformats.org/officeDocument/2006/relationships" xmlns:p="http://schemas.openxmlformats.org/presentationml/2006/main">
   <p:cSld>
     <p:spTree>
@@ -4215,7 +4577,7 @@
 </p:sld>
 </file>
 
-<file path=ppt/slides/slide6.xml><?xml version="1.0" encoding="utf-8"?>
+<file path=ppt/slides/slide8.xml><?xml version="1.0" encoding="utf-8"?>
 <p:sld xmlns:a="http://schemas.openxmlformats.org/drawingml/2006/main" xmlns:r="http://schemas.openxmlformats.org/officeDocument/2006/relationships" xmlns:p="http://schemas.openxmlformats.org/presentationml/2006/main">
   <p:cSld>
     <p:spTree>

</xml_diff>

<commit_message>
Updated decision tree to separate setosa
</commit_message>
<xml_diff>
--- a/Sklearn/DecisionTrees/powerpoint/DecisionComparison.pptx
+++ b/Sklearn/DecisionTrees/powerpoint/DecisionComparison.pptx
@@ -9,10 +9,11 @@
     <p:sldId id="257" r:id="rId3"/>
     <p:sldId id="263" r:id="rId4"/>
     <p:sldId id="258" r:id="rId5"/>
-    <p:sldId id="262" r:id="rId6"/>
-    <p:sldId id="259" r:id="rId7"/>
-    <p:sldId id="260" r:id="rId8"/>
-    <p:sldId id="261" r:id="rId9"/>
+    <p:sldId id="264" r:id="rId6"/>
+    <p:sldId id="262" r:id="rId7"/>
+    <p:sldId id="259" r:id="rId8"/>
+    <p:sldId id="260" r:id="rId9"/>
+    <p:sldId id="261" r:id="rId10"/>
   </p:sldIdLst>
   <p:sldSz cx="12192000" cy="6858000"/>
   <p:notesSz cx="6858000" cy="9144000"/>
@@ -3611,7 +3612,7 @@
       </p:grpSpPr>
       <p:pic>
         <p:nvPicPr>
-          <p:cNvPr id="4" name="Picture 3"/>
+          <p:cNvPr id="2" name="Picture 1"/>
           <p:cNvPicPr>
             <a:picLocks noChangeAspect="1"/>
           </p:cNvPicPr>
@@ -3671,135 +3672,152 @@
       </p:grpSpPr>
       <p:grpSp>
         <p:nvGrpSpPr>
-          <p:cNvPr id="13" name="Group 12"/>
-          <p:cNvGrpSpPr/>
+          <p:cNvPr id="17" name="Group 16"/>
+          <p:cNvGrpSpPr>
+            <a:grpSpLocks noChangeAspect="1"/>
+          </p:cNvGrpSpPr>
           <p:nvPr/>
         </p:nvGrpSpPr>
         <p:grpSpPr>
           <a:xfrm>
-            <a:off x="395419" y="703472"/>
-            <a:ext cx="8570781" cy="6706756"/>
-            <a:chOff x="395419" y="703472"/>
-            <a:chExt cx="8570781" cy="6706756"/>
+            <a:off x="184403" y="703472"/>
+            <a:ext cx="8781797" cy="6925101"/>
+            <a:chOff x="184403" y="703472"/>
+            <a:chExt cx="8781797" cy="6925101"/>
           </a:xfrm>
         </p:grpSpPr>
-        <p:pic>
-          <p:nvPicPr>
-            <p:cNvPr id="11" name="Picture 10"/>
-            <p:cNvPicPr>
-              <a:picLocks noChangeAspect="1"/>
-            </p:cNvPicPr>
+        <p:grpSp>
+          <p:nvGrpSpPr>
+            <p:cNvPr id="6" name="Group 5"/>
+            <p:cNvGrpSpPr/>
             <p:nvPr/>
-          </p:nvPicPr>
-          <p:blipFill>
-            <a:blip r:embed="rId2">
-              <a:extLst>
-                <a:ext uri="{28A0092B-C50C-407E-A947-70E740481C1C}">
-                  <a14:useLocalDpi xmlns:a14="http://schemas.microsoft.com/office/drawing/2010/main" val="0"/>
-                </a:ext>
-              </a:extLst>
-            </a:blip>
-            <a:stretch>
-              <a:fillRect/>
-            </a:stretch>
-          </p:blipFill>
-          <p:spPr>
+          </p:nvGrpSpPr>
+          <p:grpSpPr>
             <a:xfrm>
-              <a:off x="3213100" y="703472"/>
-              <a:ext cx="5753100" cy="5080000"/>
+              <a:off x="3213100" y="891040"/>
+              <a:ext cx="5753100" cy="6159886"/>
+              <a:chOff x="3213100" y="703472"/>
+              <a:chExt cx="5753100" cy="6159886"/>
             </a:xfrm>
-            <a:prstGeom prst="rect">
-              <a:avLst/>
-            </a:prstGeom>
-          </p:spPr>
-        </p:pic>
-        <p:pic>
-          <p:nvPicPr>
-            <p:cNvPr id="7" name="Picture 6"/>
-            <p:cNvPicPr>
-              <a:picLocks noChangeAspect="1"/>
-            </p:cNvPicPr>
-            <p:nvPr/>
-          </p:nvPicPr>
-          <p:blipFill rotWithShape="1">
-            <a:blip r:embed="rId3">
-              <a:extLst>
-                <a:ext uri="{28A0092B-C50C-407E-A947-70E740481C1C}">
-                  <a14:useLocalDpi xmlns:a14="http://schemas.microsoft.com/office/drawing/2010/main" val="0"/>
-                </a:ext>
-              </a:extLst>
-            </a:blip>
-            <a:srcRect l="68876"/>
-            <a:stretch/>
-          </p:blipFill>
-          <p:spPr>
-            <a:xfrm>
-              <a:off x="7523301" y="5755762"/>
-              <a:ext cx="990383" cy="1060704"/>
-            </a:xfrm>
-            <a:prstGeom prst="rect">
-              <a:avLst/>
-            </a:prstGeom>
-          </p:spPr>
-        </p:pic>
-        <p:pic>
-          <p:nvPicPr>
-            <p:cNvPr id="8" name="Picture 7"/>
-            <p:cNvPicPr>
-              <a:picLocks noChangeAspect="1"/>
-            </p:cNvPicPr>
-            <p:nvPr/>
-          </p:nvPicPr>
-          <p:blipFill rotWithShape="1">
-            <a:blip r:embed="rId3">
-              <a:extLst>
-                <a:ext uri="{28A0092B-C50C-407E-A947-70E740481C1C}">
-                  <a14:useLocalDpi xmlns:a14="http://schemas.microsoft.com/office/drawing/2010/main" val="0"/>
-                </a:ext>
-              </a:extLst>
-            </a:blip>
-            <a:srcRect l="33873" r="35004"/>
-            <a:stretch/>
-          </p:blipFill>
-          <p:spPr>
-            <a:xfrm>
-              <a:off x="3639316" y="3952158"/>
-              <a:ext cx="987643" cy="1057769"/>
-            </a:xfrm>
-            <a:prstGeom prst="rect">
-              <a:avLst/>
-            </a:prstGeom>
-          </p:spPr>
-        </p:pic>
-        <p:pic>
-          <p:nvPicPr>
-            <p:cNvPr id="9" name="Picture 8"/>
-            <p:cNvPicPr>
-              <a:picLocks noChangeAspect="1"/>
-            </p:cNvPicPr>
-            <p:nvPr/>
-          </p:nvPicPr>
-          <p:blipFill rotWithShape="1">
-            <a:blip r:embed="rId3">
-              <a:extLst>
-                <a:ext uri="{28A0092B-C50C-407E-A947-70E740481C1C}">
-                  <a14:useLocalDpi xmlns:a14="http://schemas.microsoft.com/office/drawing/2010/main" val="0"/>
-                </a:ext>
-              </a:extLst>
-            </a:blip>
-            <a:srcRect r="68876"/>
-            <a:stretch/>
-          </p:blipFill>
-          <p:spPr>
-            <a:xfrm>
-              <a:off x="5237301" y="5755762"/>
-              <a:ext cx="990383" cy="1060704"/>
-            </a:xfrm>
-            <a:prstGeom prst="rect">
-              <a:avLst/>
-            </a:prstGeom>
-          </p:spPr>
-        </p:pic>
+          </p:grpSpPr>
+          <p:pic>
+            <p:nvPicPr>
+              <p:cNvPr id="2" name="Picture 1"/>
+              <p:cNvPicPr>
+                <a:picLocks noChangeAspect="1"/>
+              </p:cNvPicPr>
+              <p:nvPr/>
+            </p:nvPicPr>
+            <p:blipFill>
+              <a:blip r:embed="rId2">
+                <a:extLst>
+                  <a:ext uri="{28A0092B-C50C-407E-A947-70E740481C1C}">
+                    <a14:useLocalDpi xmlns:a14="http://schemas.microsoft.com/office/drawing/2010/main" val="0"/>
+                  </a:ext>
+                </a:extLst>
+              </a:blip>
+              <a:stretch>
+                <a:fillRect/>
+              </a:stretch>
+            </p:blipFill>
+            <p:spPr>
+              <a:xfrm>
+                <a:off x="3213100" y="703472"/>
+                <a:ext cx="5753100" cy="5080000"/>
+              </a:xfrm>
+              <a:prstGeom prst="rect">
+                <a:avLst/>
+              </a:prstGeom>
+            </p:spPr>
+          </p:pic>
+          <p:pic>
+            <p:nvPicPr>
+              <p:cNvPr id="7" name="Picture 6"/>
+              <p:cNvPicPr>
+                <a:picLocks noChangeAspect="1"/>
+              </p:cNvPicPr>
+              <p:nvPr/>
+            </p:nvPicPr>
+            <p:blipFill rotWithShape="1">
+              <a:blip r:embed="rId3">
+                <a:extLst>
+                  <a:ext uri="{28A0092B-C50C-407E-A947-70E740481C1C}">
+                    <a14:useLocalDpi xmlns:a14="http://schemas.microsoft.com/office/drawing/2010/main" val="0"/>
+                  </a:ext>
+                </a:extLst>
+              </a:blip>
+              <a:srcRect l="68876"/>
+              <a:stretch/>
+            </p:blipFill>
+            <p:spPr>
+              <a:xfrm>
+                <a:off x="7523301" y="5802654"/>
+                <a:ext cx="990383" cy="1060704"/>
+              </a:xfrm>
+              <a:prstGeom prst="rect">
+                <a:avLst/>
+              </a:prstGeom>
+            </p:spPr>
+          </p:pic>
+          <p:pic>
+            <p:nvPicPr>
+              <p:cNvPr id="8" name="Picture 7"/>
+              <p:cNvPicPr>
+                <a:picLocks noChangeAspect="1"/>
+              </p:cNvPicPr>
+              <p:nvPr/>
+            </p:nvPicPr>
+            <p:blipFill rotWithShape="1">
+              <a:blip r:embed="rId3">
+                <a:extLst>
+                  <a:ext uri="{28A0092B-C50C-407E-A947-70E740481C1C}">
+                    <a14:useLocalDpi xmlns:a14="http://schemas.microsoft.com/office/drawing/2010/main" val="0"/>
+                  </a:ext>
+                </a:extLst>
+              </a:blip>
+              <a:srcRect l="33873" r="35004"/>
+              <a:stretch/>
+            </p:blipFill>
+            <p:spPr>
+              <a:xfrm>
+                <a:off x="3639316" y="3952158"/>
+                <a:ext cx="987643" cy="1057769"/>
+              </a:xfrm>
+              <a:prstGeom prst="rect">
+                <a:avLst/>
+              </a:prstGeom>
+            </p:spPr>
+          </p:pic>
+          <p:pic>
+            <p:nvPicPr>
+              <p:cNvPr id="9" name="Picture 8"/>
+              <p:cNvPicPr>
+                <a:picLocks noChangeAspect="1"/>
+              </p:cNvPicPr>
+              <p:nvPr/>
+            </p:nvPicPr>
+            <p:blipFill rotWithShape="1">
+              <a:blip r:embed="rId3">
+                <a:extLst>
+                  <a:ext uri="{28A0092B-C50C-407E-A947-70E740481C1C}">
+                    <a14:useLocalDpi xmlns:a14="http://schemas.microsoft.com/office/drawing/2010/main" val="0"/>
+                  </a:ext>
+                </a:extLst>
+              </a:blip>
+              <a:srcRect r="68876"/>
+              <a:stretch/>
+            </p:blipFill>
+            <p:spPr>
+              <a:xfrm>
+                <a:off x="5237301" y="5802654"/>
+                <a:ext cx="990383" cy="1060704"/>
+              </a:xfrm>
+              <a:prstGeom prst="rect">
+                <a:avLst/>
+              </a:prstGeom>
+            </p:spPr>
+          </p:pic>
+        </p:grpSp>
         <p:sp>
           <p:nvSpPr>
             <p:cNvPr id="10" name="TextBox 9"/>
@@ -3808,8 +3826,8 @@
           </p:nvSpPr>
           <p:spPr>
             <a:xfrm>
-              <a:off x="395419" y="889000"/>
-              <a:ext cx="2817681" cy="3539430"/>
+              <a:off x="184403" y="703472"/>
+              <a:ext cx="2817681" cy="2369880"/>
             </a:xfrm>
             <a:prstGeom prst="rect">
               <a:avLst/>
@@ -3824,39 +3842,31 @@
             <a:p>
               <a:r>
                 <a:rPr lang="en-US" sz="2400" b="1" dirty="0" smtClean="0"/>
-                <a:t>What class (species) is a flower with the following features? </a:t>
+                <a:t>What class (species) is a flower with the following </a:t>
               </a:r>
+              <a:r>
+                <a:rPr lang="en-US" sz="2400" b="1" dirty="0" smtClean="0"/>
+                <a:t>feature? </a:t>
+              </a:r>
+              <a:endParaRPr lang="en-US" sz="2400" b="1" dirty="0" smtClean="0"/>
             </a:p>
             <a:p>
               <a:endParaRPr lang="en-US" dirty="0" smtClean="0"/>
             </a:p>
             <a:p>
               <a:r>
-                <a:rPr lang="en-US" sz="2000" dirty="0" smtClean="0"/>
-                <a:t>sepal length (cm): 5.8</a:t>
+                <a:rPr lang="en-US" sz="2200" dirty="0" smtClean="0"/>
+                <a:t>petal </a:t>
               </a:r>
-            </a:p>
-            <a:p>
               <a:r>
-                <a:rPr lang="en-US" sz="2000" dirty="0" smtClean="0"/>
-                <a:t>sepal width (cm): 2.8</a:t>
+                <a:rPr lang="en-US" sz="2200" dirty="0" smtClean="0"/>
+                <a:t>length (cm): </a:t>
               </a:r>
-            </a:p>
-            <a:p>
               <a:r>
-                <a:rPr lang="en-US" sz="2000" dirty="0" smtClean="0"/>
-                <a:t>petal length (cm): 5.1</a:t>
+                <a:rPr lang="en-US" sz="2200" dirty="0" smtClean="0"/>
+                <a:t>4.5</a:t>
               </a:r>
-            </a:p>
-            <a:p>
-              <a:r>
-                <a:rPr lang="en-US" sz="2000" dirty="0" smtClean="0"/>
-                <a:t>petal width (cm): 2.4</a:t>
-              </a:r>
-              <a:endParaRPr lang="en-US" sz="2000" dirty="0"/>
-            </a:p>
-            <a:p>
-              <a:endParaRPr lang="en-US" dirty="0" smtClean="0"/>
+              <a:endParaRPr lang="en-US" sz="2200" dirty="0" smtClean="0"/>
             </a:p>
             <a:p>
               <a:endParaRPr lang="en-US" dirty="0"/>
@@ -3874,32 +3884,29 @@
           </p:nvSpPr>
           <p:spPr>
             <a:xfrm>
-              <a:off x="2189301" y="7010118"/>
-              <a:ext cx="6096000" cy="400110"/>
+              <a:off x="1415583" y="7197686"/>
+              <a:ext cx="7165714" cy="430887"/>
             </a:xfrm>
             <a:prstGeom prst="rect">
               <a:avLst/>
             </a:prstGeom>
           </p:spPr>
           <p:txBody>
-            <a:bodyPr>
+            <a:bodyPr wrap="square">
               <a:spAutoFit/>
             </a:bodyPr>
             <a:lstStyle/>
             <a:p>
+              <a:pPr algn="ctr"/>
               <a:r>
-                <a:rPr lang="en-US" sz="2000" dirty="0" smtClean="0"/>
+                <a:rPr lang="en-US" sz="2200" dirty="0" smtClean="0"/>
                 <a:t>The prediction is </a:t>
               </a:r>
               <a:r>
-                <a:rPr lang="en-US" sz="2000" dirty="0" err="1" smtClean="0"/>
-                <a:t>virginica</a:t>
+                <a:rPr lang="en-US" sz="2200" dirty="0" smtClean="0"/>
+                <a:t>versicolor</a:t>
               </a:r>
-              <a:r>
-                <a:rPr lang="en-US" sz="2000" dirty="0" smtClean="0"/>
-                <a:t> as it is the majority class. </a:t>
-              </a:r>
-              <a:endParaRPr lang="en-US" sz="2000" dirty="0"/>
+              <a:endParaRPr lang="en-US" sz="2200" dirty="0"/>
             </a:p>
           </p:txBody>
         </p:sp>
@@ -3926,7 +3933,7 @@
         </p:blipFill>
         <p:spPr>
           <a:xfrm>
-            <a:off x="9440731" y="1649622"/>
+            <a:off x="9135931" y="-3789886"/>
             <a:ext cx="4686300" cy="3187700"/>
           </a:xfrm>
           <a:prstGeom prst="rect">
@@ -3953,6 +3960,215 @@
 </file>
 
 <file path=ppt/slides/slide5.xml><?xml version="1.0" encoding="utf-8"?>
+<p:sld xmlns:a="http://schemas.openxmlformats.org/drawingml/2006/main" xmlns:r="http://schemas.openxmlformats.org/officeDocument/2006/relationships" xmlns:p="http://schemas.openxmlformats.org/presentationml/2006/main">
+  <p:cSld>
+    <p:spTree>
+      <p:nvGrpSpPr>
+        <p:cNvPr id="1" name=""/>
+        <p:cNvGrpSpPr/>
+        <p:nvPr/>
+      </p:nvGrpSpPr>
+      <p:grpSpPr>
+        <a:xfrm>
+          <a:off x="0" y="0"/>
+          <a:ext cx="0" cy="0"/>
+          <a:chOff x="0" y="0"/>
+          <a:chExt cx="0" cy="0"/>
+        </a:xfrm>
+      </p:grpSpPr>
+      <p:grpSp>
+        <p:nvGrpSpPr>
+          <p:cNvPr id="13" name="Group 12"/>
+          <p:cNvGrpSpPr/>
+          <p:nvPr/>
+        </p:nvGrpSpPr>
+        <p:grpSpPr>
+          <a:xfrm>
+            <a:off x="1148862" y="3346049"/>
+            <a:ext cx="11216054" cy="4176672"/>
+            <a:chOff x="1148862" y="3346049"/>
+            <a:chExt cx="11216054" cy="4176672"/>
+          </a:xfrm>
+        </p:grpSpPr>
+        <p:pic>
+          <p:nvPicPr>
+            <p:cNvPr id="11" name="Picture 10"/>
+            <p:cNvPicPr>
+              <a:picLocks noChangeAspect="1"/>
+            </p:cNvPicPr>
+            <p:nvPr/>
+          </p:nvPicPr>
+          <p:blipFill>
+            <a:blip r:embed="rId2">
+              <a:extLst>
+                <a:ext uri="{28A0092B-C50C-407E-A947-70E740481C1C}">
+                  <a14:useLocalDpi xmlns:a14="http://schemas.microsoft.com/office/drawing/2010/main" val="0"/>
+                </a:ext>
+              </a:extLst>
+            </a:blip>
+            <a:stretch>
+              <a:fillRect/>
+            </a:stretch>
+          </p:blipFill>
+          <p:spPr>
+            <a:xfrm>
+              <a:off x="5049716" y="3346049"/>
+              <a:ext cx="7315200" cy="2743200"/>
+            </a:xfrm>
+            <a:prstGeom prst="rect">
+              <a:avLst/>
+            </a:prstGeom>
+          </p:spPr>
+        </p:pic>
+        <p:grpSp>
+          <p:nvGrpSpPr>
+            <p:cNvPr id="12" name="Group 11"/>
+            <p:cNvGrpSpPr>
+              <a:grpSpLocks noChangeAspect="1"/>
+            </p:cNvGrpSpPr>
+            <p:nvPr/>
+          </p:nvGrpSpPr>
+          <p:grpSpPr>
+            <a:xfrm>
+              <a:off x="1148862" y="3346049"/>
+              <a:ext cx="3900854" cy="4176672"/>
+              <a:chOff x="1032608" y="492457"/>
+              <a:chExt cx="5753100" cy="6159886"/>
+            </a:xfrm>
+          </p:grpSpPr>
+          <p:pic>
+            <p:nvPicPr>
+              <p:cNvPr id="5" name="Picture 4"/>
+              <p:cNvPicPr>
+                <a:picLocks noChangeAspect="1"/>
+              </p:cNvPicPr>
+              <p:nvPr/>
+            </p:nvPicPr>
+            <p:blipFill>
+              <a:blip r:embed="rId3">
+                <a:extLst>
+                  <a:ext uri="{28A0092B-C50C-407E-A947-70E740481C1C}">
+                    <a14:useLocalDpi xmlns:a14="http://schemas.microsoft.com/office/drawing/2010/main" val="0"/>
+                  </a:ext>
+                </a:extLst>
+              </a:blip>
+              <a:stretch>
+                <a:fillRect/>
+              </a:stretch>
+            </p:blipFill>
+            <p:spPr>
+              <a:xfrm>
+                <a:off x="1032608" y="492457"/>
+                <a:ext cx="5753100" cy="5080000"/>
+              </a:xfrm>
+              <a:prstGeom prst="rect">
+                <a:avLst/>
+              </a:prstGeom>
+            </p:spPr>
+          </p:pic>
+          <p:pic>
+            <p:nvPicPr>
+              <p:cNvPr id="6" name="Picture 5"/>
+              <p:cNvPicPr>
+                <a:picLocks noChangeAspect="1"/>
+              </p:cNvPicPr>
+              <p:nvPr/>
+            </p:nvPicPr>
+            <p:blipFill rotWithShape="1">
+              <a:blip r:embed="rId4">
+                <a:extLst>
+                  <a:ext uri="{28A0092B-C50C-407E-A947-70E740481C1C}">
+                    <a14:useLocalDpi xmlns:a14="http://schemas.microsoft.com/office/drawing/2010/main" val="0"/>
+                  </a:ext>
+                </a:extLst>
+              </a:blip>
+              <a:srcRect l="68876"/>
+              <a:stretch/>
+            </p:blipFill>
+            <p:spPr>
+              <a:xfrm>
+                <a:off x="5342809" y="5591639"/>
+                <a:ext cx="990383" cy="1060704"/>
+              </a:xfrm>
+              <a:prstGeom prst="rect">
+                <a:avLst/>
+              </a:prstGeom>
+            </p:spPr>
+          </p:pic>
+          <p:pic>
+            <p:nvPicPr>
+              <p:cNvPr id="7" name="Picture 6"/>
+              <p:cNvPicPr>
+                <a:picLocks noChangeAspect="1"/>
+              </p:cNvPicPr>
+              <p:nvPr/>
+            </p:nvPicPr>
+            <p:blipFill rotWithShape="1">
+              <a:blip r:embed="rId4">
+                <a:extLst>
+                  <a:ext uri="{28A0092B-C50C-407E-A947-70E740481C1C}">
+                    <a14:useLocalDpi xmlns:a14="http://schemas.microsoft.com/office/drawing/2010/main" val="0"/>
+                  </a:ext>
+                </a:extLst>
+              </a:blip>
+              <a:srcRect l="33873" r="35004"/>
+              <a:stretch/>
+            </p:blipFill>
+            <p:spPr>
+              <a:xfrm>
+                <a:off x="1458824" y="3741143"/>
+                <a:ext cx="987643" cy="1057769"/>
+              </a:xfrm>
+              <a:prstGeom prst="rect">
+                <a:avLst/>
+              </a:prstGeom>
+            </p:spPr>
+          </p:pic>
+          <p:pic>
+            <p:nvPicPr>
+              <p:cNvPr id="8" name="Picture 7"/>
+              <p:cNvPicPr>
+                <a:picLocks noChangeAspect="1"/>
+              </p:cNvPicPr>
+              <p:nvPr/>
+            </p:nvPicPr>
+            <p:blipFill rotWithShape="1">
+              <a:blip r:embed="rId4">
+                <a:extLst>
+                  <a:ext uri="{28A0092B-C50C-407E-A947-70E740481C1C}">
+                    <a14:useLocalDpi xmlns:a14="http://schemas.microsoft.com/office/drawing/2010/main" val="0"/>
+                  </a:ext>
+                </a:extLst>
+              </a:blip>
+              <a:srcRect r="68876"/>
+              <a:stretch/>
+            </p:blipFill>
+            <p:spPr>
+              <a:xfrm>
+                <a:off x="3056809" y="5591639"/>
+                <a:ext cx="990383" cy="1060704"/>
+              </a:xfrm>
+              <a:prstGeom prst="rect">
+                <a:avLst/>
+              </a:prstGeom>
+            </p:spPr>
+          </p:pic>
+        </p:grpSp>
+      </p:grpSp>
+    </p:spTree>
+    <p:extLst>
+      <p:ext uri="{BB962C8B-B14F-4D97-AF65-F5344CB8AC3E}">
+        <p14:creationId xmlns:p14="http://schemas.microsoft.com/office/powerpoint/2010/main" val="239750048"/>
+      </p:ext>
+    </p:extLst>
+  </p:cSld>
+  <p:clrMapOvr>
+    <a:masterClrMapping/>
+  </p:clrMapOvr>
+</p:sld>
+</file>
+
+<file path=ppt/slides/slide6.xml><?xml version="1.0" encoding="utf-8"?>
 <p:sld xmlns:a="http://schemas.openxmlformats.org/drawingml/2006/main" xmlns:r="http://schemas.openxmlformats.org/officeDocument/2006/relationships" xmlns:p="http://schemas.openxmlformats.org/presentationml/2006/main">
   <p:cSld>
     <p:spTree>
@@ -4252,7 +4468,7 @@
 </p:sld>
 </file>
 
-<file path=ppt/slides/slide6.xml><?xml version="1.0" encoding="utf-8"?>
+<file path=ppt/slides/slide7.xml><?xml version="1.0" encoding="utf-8"?>
 <p:sld xmlns:a="http://schemas.openxmlformats.org/drawingml/2006/main" xmlns:r="http://schemas.openxmlformats.org/officeDocument/2006/relationships" xmlns:p="http://schemas.openxmlformats.org/presentationml/2006/main">
   <p:cSld>
     <p:spTree>
@@ -4517,7 +4733,7 @@
 </p:sld>
 </file>
 
-<file path=ppt/slides/slide7.xml><?xml version="1.0" encoding="utf-8"?>
+<file path=ppt/slides/slide8.xml><?xml version="1.0" encoding="utf-8"?>
 <p:sld xmlns:a="http://schemas.openxmlformats.org/drawingml/2006/main" xmlns:r="http://schemas.openxmlformats.org/officeDocument/2006/relationships" xmlns:p="http://schemas.openxmlformats.org/presentationml/2006/main">
   <p:cSld>
     <p:spTree>
@@ -4577,7 +4793,7 @@
 </p:sld>
 </file>
 
-<file path=ppt/slides/slide8.xml><?xml version="1.0" encoding="utf-8"?>
+<file path=ppt/slides/slide9.xml><?xml version="1.0" encoding="utf-8"?>
 <p:sld xmlns:a="http://schemas.openxmlformats.org/drawingml/2006/main" xmlns:r="http://schemas.openxmlformats.org/officeDocument/2006/relationships" xmlns:p="http://schemas.openxmlformats.org/presentationml/2006/main">
   <p:cSld>
     <p:spTree>

</xml_diff>

<commit_message>
Updated main decision tree to be uniform with second image. Text is now color coded according to decision root
</commit_message>
<xml_diff>
--- a/Sklearn/DecisionTrees/powerpoint/DecisionComparison.pptx
+++ b/Sklearn/DecisionTrees/powerpoint/DecisionComparison.pptx
@@ -8,12 +8,14 @@
     <p:sldId id="256" r:id="rId2"/>
     <p:sldId id="257" r:id="rId3"/>
     <p:sldId id="263" r:id="rId4"/>
-    <p:sldId id="258" r:id="rId5"/>
-    <p:sldId id="264" r:id="rId6"/>
-    <p:sldId id="262" r:id="rId7"/>
-    <p:sldId id="259" r:id="rId8"/>
-    <p:sldId id="260" r:id="rId9"/>
-    <p:sldId id="261" r:id="rId10"/>
+    <p:sldId id="266" r:id="rId5"/>
+    <p:sldId id="259" r:id="rId6"/>
+    <p:sldId id="260" r:id="rId7"/>
+    <p:sldId id="261" r:id="rId8"/>
+    <p:sldId id="262" r:id="rId9"/>
+    <p:sldId id="264" r:id="rId10"/>
+    <p:sldId id="258" r:id="rId11"/>
+    <p:sldId id="265" r:id="rId12"/>
   </p:sldIdLst>
   <p:sldSz cx="12192000" cy="6858000"/>
   <p:notesSz cx="6858000" cy="9144000"/>
@@ -251,7 +253,7 @@
           <a:p>
             <a:fld id="{B66C5E5C-AFE9-2848-A01D-417298715EDA}" type="datetimeFigureOut">
               <a:rPr lang="en-US" smtClean="0"/>
-              <a:t>9/25/18</a:t>
+              <a:t>9/29/18</a:t>
             </a:fld>
             <a:endParaRPr lang="en-US"/>
           </a:p>
@@ -421,7 +423,7 @@
           <a:p>
             <a:fld id="{B66C5E5C-AFE9-2848-A01D-417298715EDA}" type="datetimeFigureOut">
               <a:rPr lang="en-US" smtClean="0"/>
-              <a:t>9/25/18</a:t>
+              <a:t>9/29/18</a:t>
             </a:fld>
             <a:endParaRPr lang="en-US"/>
           </a:p>
@@ -601,7 +603,7 @@
           <a:p>
             <a:fld id="{B66C5E5C-AFE9-2848-A01D-417298715EDA}" type="datetimeFigureOut">
               <a:rPr lang="en-US" smtClean="0"/>
-              <a:t>9/25/18</a:t>
+              <a:t>9/29/18</a:t>
             </a:fld>
             <a:endParaRPr lang="en-US"/>
           </a:p>
@@ -771,7 +773,7 @@
           <a:p>
             <a:fld id="{B66C5E5C-AFE9-2848-A01D-417298715EDA}" type="datetimeFigureOut">
               <a:rPr lang="en-US" smtClean="0"/>
-              <a:t>9/25/18</a:t>
+              <a:t>9/29/18</a:t>
             </a:fld>
             <a:endParaRPr lang="en-US"/>
           </a:p>
@@ -1017,7 +1019,7 @@
           <a:p>
             <a:fld id="{B66C5E5C-AFE9-2848-A01D-417298715EDA}" type="datetimeFigureOut">
               <a:rPr lang="en-US" smtClean="0"/>
-              <a:t>9/25/18</a:t>
+              <a:t>9/29/18</a:t>
             </a:fld>
             <a:endParaRPr lang="en-US"/>
           </a:p>
@@ -1249,7 +1251,7 @@
           <a:p>
             <a:fld id="{B66C5E5C-AFE9-2848-A01D-417298715EDA}" type="datetimeFigureOut">
               <a:rPr lang="en-US" smtClean="0"/>
-              <a:t>9/25/18</a:t>
+              <a:t>9/29/18</a:t>
             </a:fld>
             <a:endParaRPr lang="en-US"/>
           </a:p>
@@ -1616,7 +1618,7 @@
           <a:p>
             <a:fld id="{B66C5E5C-AFE9-2848-A01D-417298715EDA}" type="datetimeFigureOut">
               <a:rPr lang="en-US" smtClean="0"/>
-              <a:t>9/25/18</a:t>
+              <a:t>9/29/18</a:t>
             </a:fld>
             <a:endParaRPr lang="en-US"/>
           </a:p>
@@ -1734,7 +1736,7 @@
           <a:p>
             <a:fld id="{B66C5E5C-AFE9-2848-A01D-417298715EDA}" type="datetimeFigureOut">
               <a:rPr lang="en-US" smtClean="0"/>
-              <a:t>9/25/18</a:t>
+              <a:t>9/29/18</a:t>
             </a:fld>
             <a:endParaRPr lang="en-US"/>
           </a:p>
@@ -1829,7 +1831,7 @@
           <a:p>
             <a:fld id="{B66C5E5C-AFE9-2848-A01D-417298715EDA}" type="datetimeFigureOut">
               <a:rPr lang="en-US" smtClean="0"/>
-              <a:t>9/25/18</a:t>
+              <a:t>9/29/18</a:t>
             </a:fld>
             <a:endParaRPr lang="en-US"/>
           </a:p>
@@ -2106,7 +2108,7 @@
           <a:p>
             <a:fld id="{B66C5E5C-AFE9-2848-A01D-417298715EDA}" type="datetimeFigureOut">
               <a:rPr lang="en-US" smtClean="0"/>
-              <a:t>9/25/18</a:t>
+              <a:t>9/29/18</a:t>
             </a:fld>
             <a:endParaRPr lang="en-US"/>
           </a:p>
@@ -2359,7 +2361,7 @@
           <a:p>
             <a:fld id="{B66C5E5C-AFE9-2848-A01D-417298715EDA}" type="datetimeFigureOut">
               <a:rPr lang="en-US" smtClean="0"/>
-              <a:t>9/25/18</a:t>
+              <a:t>9/29/18</a:t>
             </a:fld>
             <a:endParaRPr lang="en-US"/>
           </a:p>
@@ -2572,7 +2574,7 @@
           <a:p>
             <a:fld id="{B66C5E5C-AFE9-2848-A01D-417298715EDA}" type="datetimeFigureOut">
               <a:rPr lang="en-US" smtClean="0"/>
-              <a:t>9/25/18</a:t>
+              <a:t>9/29/18</a:t>
             </a:fld>
             <a:endParaRPr lang="en-US"/>
           </a:p>
@@ -3229,6 +3231,542 @@
 </p:sld>
 </file>
 
+<file path=ppt/slides/slide10.xml><?xml version="1.0" encoding="utf-8"?>
+<p:sld xmlns:a="http://schemas.openxmlformats.org/drawingml/2006/main" xmlns:r="http://schemas.openxmlformats.org/officeDocument/2006/relationships" xmlns:p="http://schemas.openxmlformats.org/presentationml/2006/main">
+  <p:cSld>
+    <p:spTree>
+      <p:nvGrpSpPr>
+        <p:cNvPr id="1" name=""/>
+        <p:cNvGrpSpPr/>
+        <p:nvPr/>
+      </p:nvGrpSpPr>
+      <p:grpSpPr>
+        <a:xfrm>
+          <a:off x="0" y="0"/>
+          <a:ext cx="0" cy="0"/>
+          <a:chOff x="0" y="0"/>
+          <a:chExt cx="0" cy="0"/>
+        </a:xfrm>
+      </p:grpSpPr>
+      <p:grpSp>
+        <p:nvGrpSpPr>
+          <p:cNvPr id="6" name="Group 5"/>
+          <p:cNvGrpSpPr/>
+          <p:nvPr/>
+        </p:nvGrpSpPr>
+        <p:grpSpPr>
+          <a:xfrm>
+            <a:off x="3213100" y="891040"/>
+            <a:ext cx="5753100" cy="6159886"/>
+            <a:chOff x="3213100" y="703472"/>
+            <a:chExt cx="5753100" cy="6159886"/>
+          </a:xfrm>
+        </p:grpSpPr>
+        <p:pic>
+          <p:nvPicPr>
+            <p:cNvPr id="2" name="Picture 1"/>
+            <p:cNvPicPr>
+              <a:picLocks noChangeAspect="1"/>
+            </p:cNvPicPr>
+            <p:nvPr/>
+          </p:nvPicPr>
+          <p:blipFill>
+            <a:blip r:embed="rId2">
+              <a:extLst>
+                <a:ext uri="{28A0092B-C50C-407E-A947-70E740481C1C}">
+                  <a14:useLocalDpi xmlns:a14="http://schemas.microsoft.com/office/drawing/2010/main" val="0"/>
+                </a:ext>
+              </a:extLst>
+            </a:blip>
+            <a:stretch>
+              <a:fillRect/>
+            </a:stretch>
+          </p:blipFill>
+          <p:spPr>
+            <a:xfrm>
+              <a:off x="3213100" y="703472"/>
+              <a:ext cx="5753100" cy="5080000"/>
+            </a:xfrm>
+            <a:prstGeom prst="rect">
+              <a:avLst/>
+            </a:prstGeom>
+          </p:spPr>
+        </p:pic>
+        <p:pic>
+          <p:nvPicPr>
+            <p:cNvPr id="7" name="Picture 6"/>
+            <p:cNvPicPr>
+              <a:picLocks noChangeAspect="1"/>
+            </p:cNvPicPr>
+            <p:nvPr/>
+          </p:nvPicPr>
+          <p:blipFill rotWithShape="1">
+            <a:blip r:embed="rId3">
+              <a:extLst>
+                <a:ext uri="{28A0092B-C50C-407E-A947-70E740481C1C}">
+                  <a14:useLocalDpi xmlns:a14="http://schemas.microsoft.com/office/drawing/2010/main" val="0"/>
+                </a:ext>
+              </a:extLst>
+            </a:blip>
+            <a:srcRect l="68876"/>
+            <a:stretch/>
+          </p:blipFill>
+          <p:spPr>
+            <a:xfrm>
+              <a:off x="7523301" y="5802654"/>
+              <a:ext cx="990383" cy="1060704"/>
+            </a:xfrm>
+            <a:prstGeom prst="rect">
+              <a:avLst/>
+            </a:prstGeom>
+          </p:spPr>
+        </p:pic>
+        <p:pic>
+          <p:nvPicPr>
+            <p:cNvPr id="8" name="Picture 7"/>
+            <p:cNvPicPr>
+              <a:picLocks noChangeAspect="1"/>
+            </p:cNvPicPr>
+            <p:nvPr/>
+          </p:nvPicPr>
+          <p:blipFill rotWithShape="1">
+            <a:blip r:embed="rId3">
+              <a:extLst>
+                <a:ext uri="{28A0092B-C50C-407E-A947-70E740481C1C}">
+                  <a14:useLocalDpi xmlns:a14="http://schemas.microsoft.com/office/drawing/2010/main" val="0"/>
+                </a:ext>
+              </a:extLst>
+            </a:blip>
+            <a:srcRect l="33873" r="35004"/>
+            <a:stretch/>
+          </p:blipFill>
+          <p:spPr>
+            <a:xfrm>
+              <a:off x="3639316" y="3952158"/>
+              <a:ext cx="987643" cy="1057769"/>
+            </a:xfrm>
+            <a:prstGeom prst="rect">
+              <a:avLst/>
+            </a:prstGeom>
+          </p:spPr>
+        </p:pic>
+        <p:pic>
+          <p:nvPicPr>
+            <p:cNvPr id="9" name="Picture 8"/>
+            <p:cNvPicPr>
+              <a:picLocks noChangeAspect="1"/>
+            </p:cNvPicPr>
+            <p:nvPr/>
+          </p:nvPicPr>
+          <p:blipFill rotWithShape="1">
+            <a:blip r:embed="rId3">
+              <a:extLst>
+                <a:ext uri="{28A0092B-C50C-407E-A947-70E740481C1C}">
+                  <a14:useLocalDpi xmlns:a14="http://schemas.microsoft.com/office/drawing/2010/main" val="0"/>
+                </a:ext>
+              </a:extLst>
+            </a:blip>
+            <a:srcRect r="68876"/>
+            <a:stretch/>
+          </p:blipFill>
+          <p:spPr>
+            <a:xfrm>
+              <a:off x="5237301" y="5802654"/>
+              <a:ext cx="990383" cy="1060704"/>
+            </a:xfrm>
+            <a:prstGeom prst="rect">
+              <a:avLst/>
+            </a:prstGeom>
+          </p:spPr>
+        </p:pic>
+      </p:grpSp>
+      <p:sp>
+        <p:nvSpPr>
+          <p:cNvPr id="10" name="TextBox 9"/>
+          <p:cNvSpPr txBox="1"/>
+          <p:nvPr/>
+        </p:nvSpPr>
+        <p:spPr>
+          <a:xfrm>
+            <a:off x="184403" y="703472"/>
+            <a:ext cx="2817681" cy="2369880"/>
+          </a:xfrm>
+          <a:prstGeom prst="rect">
+            <a:avLst/>
+          </a:prstGeom>
+          <a:noFill/>
+        </p:spPr>
+        <p:txBody>
+          <a:bodyPr wrap="square" rtlCol="0">
+            <a:spAutoFit/>
+          </a:bodyPr>
+          <a:lstStyle/>
+          <a:p>
+            <a:r>
+              <a:rPr lang="en-US" sz="2400" b="1" dirty="0" smtClean="0"/>
+              <a:t>What class (species) is a flower with the following feature? </a:t>
+            </a:r>
+          </a:p>
+          <a:p>
+            <a:endParaRPr lang="en-US" dirty="0" smtClean="0"/>
+          </a:p>
+          <a:p>
+            <a:r>
+              <a:rPr lang="en-US" sz="2200" dirty="0" smtClean="0"/>
+              <a:t>petal length (cm): 4.5</a:t>
+            </a:r>
+          </a:p>
+          <a:p>
+            <a:endParaRPr lang="en-US" dirty="0"/>
+          </a:p>
+          <a:p>
+            <a:endParaRPr lang="en-US" dirty="0"/>
+          </a:p>
+        </p:txBody>
+      </p:sp>
+      <p:sp>
+        <p:nvSpPr>
+          <p:cNvPr id="12" name="Rectangle 11"/>
+          <p:cNvSpPr/>
+          <p:nvPr/>
+        </p:nvSpPr>
+        <p:spPr>
+          <a:xfrm>
+            <a:off x="1415583" y="7197686"/>
+            <a:ext cx="7165714" cy="430887"/>
+          </a:xfrm>
+          <a:prstGeom prst="rect">
+            <a:avLst/>
+          </a:prstGeom>
+        </p:spPr>
+        <p:txBody>
+          <a:bodyPr wrap="square">
+            <a:spAutoFit/>
+          </a:bodyPr>
+          <a:lstStyle/>
+          <a:p>
+            <a:pPr algn="ctr"/>
+            <a:r>
+              <a:rPr lang="en-US" sz="2200" dirty="0" smtClean="0"/>
+              <a:t>The prediction is versicolor</a:t>
+            </a:r>
+            <a:endParaRPr lang="en-US" sz="2200" dirty="0"/>
+          </a:p>
+        </p:txBody>
+      </p:sp>
+      <p:pic>
+        <p:nvPicPr>
+          <p:cNvPr id="14" name="Picture 13"/>
+          <p:cNvPicPr>
+            <a:picLocks noChangeAspect="1"/>
+          </p:cNvPicPr>
+          <p:nvPr/>
+        </p:nvPicPr>
+        <p:blipFill>
+          <a:blip r:embed="rId4">
+            <a:extLst>
+              <a:ext uri="{28A0092B-C50C-407E-A947-70E740481C1C}">
+                <a14:useLocalDpi xmlns:a14="http://schemas.microsoft.com/office/drawing/2010/main" val="0"/>
+              </a:ext>
+            </a:extLst>
+          </a:blip>
+          <a:stretch>
+            <a:fillRect/>
+          </a:stretch>
+        </p:blipFill>
+        <p:spPr>
+          <a:xfrm>
+            <a:off x="9135931" y="-3789886"/>
+            <a:ext cx="4686300" cy="3187700"/>
+          </a:xfrm>
+          <a:prstGeom prst="rect">
+            <a:avLst/>
+          </a:prstGeom>
+          <a:ln w="12700">
+            <a:solidFill>
+              <a:schemeClr val="tx1"/>
+            </a:solidFill>
+          </a:ln>
+        </p:spPr>
+      </p:pic>
+    </p:spTree>
+    <p:extLst>
+      <p:ext uri="{BB962C8B-B14F-4D97-AF65-F5344CB8AC3E}">
+        <p14:creationId xmlns:p14="http://schemas.microsoft.com/office/powerpoint/2010/main" val="1777933550"/>
+      </p:ext>
+    </p:extLst>
+  </p:cSld>
+  <p:clrMapOvr>
+    <a:masterClrMapping/>
+  </p:clrMapOvr>
+</p:sld>
+</file>
+
+<file path=ppt/slides/slide11.xml><?xml version="1.0" encoding="utf-8"?>
+<p:sld xmlns:a="http://schemas.openxmlformats.org/drawingml/2006/main" xmlns:r="http://schemas.openxmlformats.org/officeDocument/2006/relationships" xmlns:p="http://schemas.openxmlformats.org/presentationml/2006/main">
+  <p:cSld>
+    <p:spTree>
+      <p:nvGrpSpPr>
+        <p:cNvPr id="1" name=""/>
+        <p:cNvGrpSpPr/>
+        <p:nvPr/>
+      </p:nvGrpSpPr>
+      <p:grpSpPr>
+        <a:xfrm>
+          <a:off x="0" y="0"/>
+          <a:ext cx="0" cy="0"/>
+          <a:chOff x="0" y="0"/>
+          <a:chExt cx="0" cy="0"/>
+        </a:xfrm>
+      </p:grpSpPr>
+      <p:grpSp>
+        <p:nvGrpSpPr>
+          <p:cNvPr id="13" name="Group 12"/>
+          <p:cNvGrpSpPr/>
+          <p:nvPr/>
+        </p:nvGrpSpPr>
+        <p:grpSpPr>
+          <a:xfrm>
+            <a:off x="395419" y="703472"/>
+            <a:ext cx="8570781" cy="6706756"/>
+            <a:chOff x="395419" y="703472"/>
+            <a:chExt cx="8570781" cy="6706756"/>
+          </a:xfrm>
+        </p:grpSpPr>
+        <p:pic>
+          <p:nvPicPr>
+            <p:cNvPr id="11" name="Picture 10"/>
+            <p:cNvPicPr>
+              <a:picLocks noChangeAspect="1"/>
+            </p:cNvPicPr>
+            <p:nvPr/>
+          </p:nvPicPr>
+          <p:blipFill>
+            <a:blip r:embed="rId2">
+              <a:extLst>
+                <a:ext uri="{28A0092B-C50C-407E-A947-70E740481C1C}">
+                  <a14:useLocalDpi xmlns:a14="http://schemas.microsoft.com/office/drawing/2010/main" val="0"/>
+                </a:ext>
+              </a:extLst>
+            </a:blip>
+            <a:stretch>
+              <a:fillRect/>
+            </a:stretch>
+          </p:blipFill>
+          <p:spPr>
+            <a:xfrm>
+              <a:off x="3213100" y="703472"/>
+              <a:ext cx="5753100" cy="5080000"/>
+            </a:xfrm>
+            <a:prstGeom prst="rect">
+              <a:avLst/>
+            </a:prstGeom>
+          </p:spPr>
+        </p:pic>
+        <p:pic>
+          <p:nvPicPr>
+            <p:cNvPr id="7" name="Picture 6"/>
+            <p:cNvPicPr>
+              <a:picLocks noChangeAspect="1"/>
+            </p:cNvPicPr>
+            <p:nvPr/>
+          </p:nvPicPr>
+          <p:blipFill rotWithShape="1">
+            <a:blip r:embed="rId3">
+              <a:extLst>
+                <a:ext uri="{28A0092B-C50C-407E-A947-70E740481C1C}">
+                  <a14:useLocalDpi xmlns:a14="http://schemas.microsoft.com/office/drawing/2010/main" val="0"/>
+                </a:ext>
+              </a:extLst>
+            </a:blip>
+            <a:srcRect l="68876"/>
+            <a:stretch/>
+          </p:blipFill>
+          <p:spPr>
+            <a:xfrm>
+              <a:off x="7523301" y="5755762"/>
+              <a:ext cx="990383" cy="1060704"/>
+            </a:xfrm>
+            <a:prstGeom prst="rect">
+              <a:avLst/>
+            </a:prstGeom>
+          </p:spPr>
+        </p:pic>
+        <p:pic>
+          <p:nvPicPr>
+            <p:cNvPr id="8" name="Picture 7"/>
+            <p:cNvPicPr>
+              <a:picLocks noChangeAspect="1"/>
+            </p:cNvPicPr>
+            <p:nvPr/>
+          </p:nvPicPr>
+          <p:blipFill rotWithShape="1">
+            <a:blip r:embed="rId3">
+              <a:extLst>
+                <a:ext uri="{28A0092B-C50C-407E-A947-70E740481C1C}">
+                  <a14:useLocalDpi xmlns:a14="http://schemas.microsoft.com/office/drawing/2010/main" val="0"/>
+                </a:ext>
+              </a:extLst>
+            </a:blip>
+            <a:srcRect l="33873" r="35004"/>
+            <a:stretch/>
+          </p:blipFill>
+          <p:spPr>
+            <a:xfrm>
+              <a:off x="3639316" y="3952158"/>
+              <a:ext cx="987643" cy="1057769"/>
+            </a:xfrm>
+            <a:prstGeom prst="rect">
+              <a:avLst/>
+            </a:prstGeom>
+          </p:spPr>
+        </p:pic>
+        <p:pic>
+          <p:nvPicPr>
+            <p:cNvPr id="9" name="Picture 8"/>
+            <p:cNvPicPr>
+              <a:picLocks noChangeAspect="1"/>
+            </p:cNvPicPr>
+            <p:nvPr/>
+          </p:nvPicPr>
+          <p:blipFill rotWithShape="1">
+            <a:blip r:embed="rId3">
+              <a:extLst>
+                <a:ext uri="{28A0092B-C50C-407E-A947-70E740481C1C}">
+                  <a14:useLocalDpi xmlns:a14="http://schemas.microsoft.com/office/drawing/2010/main" val="0"/>
+                </a:ext>
+              </a:extLst>
+            </a:blip>
+            <a:srcRect r="68876"/>
+            <a:stretch/>
+          </p:blipFill>
+          <p:spPr>
+            <a:xfrm>
+              <a:off x="5237301" y="5755762"/>
+              <a:ext cx="990383" cy="1060704"/>
+            </a:xfrm>
+            <a:prstGeom prst="rect">
+              <a:avLst/>
+            </a:prstGeom>
+          </p:spPr>
+        </p:pic>
+        <p:sp>
+          <p:nvSpPr>
+            <p:cNvPr id="10" name="TextBox 9"/>
+            <p:cNvSpPr txBox="1"/>
+            <p:nvPr/>
+          </p:nvSpPr>
+          <p:spPr>
+            <a:xfrm>
+              <a:off x="395419" y="889000"/>
+              <a:ext cx="2817681" cy="3539430"/>
+            </a:xfrm>
+            <a:prstGeom prst="rect">
+              <a:avLst/>
+            </a:prstGeom>
+            <a:noFill/>
+          </p:spPr>
+          <p:txBody>
+            <a:bodyPr wrap="square" rtlCol="0">
+              <a:spAutoFit/>
+            </a:bodyPr>
+            <a:lstStyle/>
+            <a:p>
+              <a:r>
+                <a:rPr lang="en-US" sz="2400" b="1" dirty="0" smtClean="0"/>
+                <a:t>What class (species) is a flower with the following features? </a:t>
+              </a:r>
+            </a:p>
+            <a:p>
+              <a:endParaRPr lang="en-US" dirty="0" smtClean="0"/>
+            </a:p>
+            <a:p>
+              <a:r>
+                <a:rPr lang="en-US" sz="2000" dirty="0" smtClean="0"/>
+                <a:t>sepal length (cm): 5.8</a:t>
+              </a:r>
+            </a:p>
+            <a:p>
+              <a:r>
+                <a:rPr lang="en-US" sz="2000" dirty="0" smtClean="0"/>
+                <a:t>sepal width (cm): 2.8</a:t>
+              </a:r>
+            </a:p>
+            <a:p>
+              <a:r>
+                <a:rPr lang="en-US" sz="2000" dirty="0" smtClean="0"/>
+                <a:t>petal length (cm): 5.1</a:t>
+              </a:r>
+            </a:p>
+            <a:p>
+              <a:r>
+                <a:rPr lang="en-US" sz="2000" dirty="0" smtClean="0"/>
+                <a:t>petal width (cm): 2.4</a:t>
+              </a:r>
+              <a:endParaRPr lang="en-US" sz="2000" dirty="0"/>
+            </a:p>
+            <a:p>
+              <a:endParaRPr lang="en-US" dirty="0" smtClean="0"/>
+            </a:p>
+            <a:p>
+              <a:endParaRPr lang="en-US" dirty="0"/>
+            </a:p>
+            <a:p>
+              <a:endParaRPr lang="en-US" dirty="0"/>
+            </a:p>
+          </p:txBody>
+        </p:sp>
+        <p:sp>
+          <p:nvSpPr>
+            <p:cNvPr id="12" name="Rectangle 11"/>
+            <p:cNvSpPr/>
+            <p:nvPr/>
+          </p:nvSpPr>
+          <p:spPr>
+            <a:xfrm>
+              <a:off x="2189301" y="7010118"/>
+              <a:ext cx="6096000" cy="400110"/>
+            </a:xfrm>
+            <a:prstGeom prst="rect">
+              <a:avLst/>
+            </a:prstGeom>
+          </p:spPr>
+          <p:txBody>
+            <a:bodyPr>
+              <a:spAutoFit/>
+            </a:bodyPr>
+            <a:lstStyle/>
+            <a:p>
+              <a:r>
+                <a:rPr lang="en-US" sz="2000" dirty="0" smtClean="0"/>
+                <a:t>The prediction is </a:t>
+              </a:r>
+              <a:r>
+                <a:rPr lang="en-US" sz="2000" dirty="0" err="1" smtClean="0"/>
+                <a:t>virginica</a:t>
+              </a:r>
+              <a:r>
+                <a:rPr lang="en-US" sz="2000" dirty="0" smtClean="0"/>
+                <a:t> as it is the majority class. </a:t>
+              </a:r>
+              <a:endParaRPr lang="en-US" sz="2000" dirty="0"/>
+            </a:p>
+          </p:txBody>
+        </p:sp>
+      </p:grpSp>
+    </p:spTree>
+    <p:extLst>
+      <p:ext uri="{BB962C8B-B14F-4D97-AF65-F5344CB8AC3E}">
+        <p14:creationId xmlns:p14="http://schemas.microsoft.com/office/powerpoint/2010/main" val="208845141"/>
+      </p:ext>
+    </p:extLst>
+  </p:cSld>
+  <p:clrMapOvr>
+    <a:masterClrMapping/>
+  </p:clrMapOvr>
+</p:sld>
+</file>
+
 <file path=ppt/slides/slide2.xml><?xml version="1.0" encoding="utf-8"?>
 <p:sld xmlns:a="http://schemas.openxmlformats.org/drawingml/2006/main" xmlns:r="http://schemas.openxmlformats.org/officeDocument/2006/relationships" xmlns:p="http://schemas.openxmlformats.org/presentationml/2006/main">
   <p:cSld>
@@ -3670,39 +4208,74 @@
           <a:chExt cx="0" cy="0"/>
         </a:xfrm>
       </p:grpSpPr>
+      <p:sp>
+        <p:nvSpPr>
+          <p:cNvPr id="12" name="Rectangle 11"/>
+          <p:cNvSpPr/>
+          <p:nvPr/>
+        </p:nvSpPr>
+        <p:spPr>
+          <a:xfrm>
+            <a:off x="2192839" y="7185845"/>
+            <a:ext cx="6096000" cy="400110"/>
+          </a:xfrm>
+          <a:prstGeom prst="rect">
+            <a:avLst/>
+          </a:prstGeom>
+        </p:spPr>
+        <p:txBody>
+          <a:bodyPr>
+            <a:spAutoFit/>
+          </a:bodyPr>
+          <a:lstStyle/>
+          <a:p>
+            <a:r>
+              <a:rPr lang="en-US" sz="2000" dirty="0" smtClean="0"/>
+              <a:t>The prediction is </a:t>
+            </a:r>
+            <a:r>
+              <a:rPr lang="en-US" sz="2000" dirty="0" err="1" smtClean="0"/>
+              <a:t>virginica</a:t>
+            </a:r>
+            <a:r>
+              <a:rPr lang="en-US" sz="2000" dirty="0" smtClean="0"/>
+              <a:t> as it is the majority class. </a:t>
+            </a:r>
+            <a:endParaRPr lang="en-US" sz="2000" dirty="0"/>
+          </a:p>
+        </p:txBody>
+      </p:sp>
       <p:grpSp>
         <p:nvGrpSpPr>
-          <p:cNvPr id="17" name="Group 16"/>
-          <p:cNvGrpSpPr>
-            <a:grpSpLocks noChangeAspect="1"/>
-          </p:cNvGrpSpPr>
+          <p:cNvPr id="5" name="Group 4"/>
+          <p:cNvGrpSpPr/>
           <p:nvPr/>
         </p:nvGrpSpPr>
         <p:grpSpPr>
           <a:xfrm>
-            <a:off x="184403" y="703472"/>
-            <a:ext cx="8781797" cy="6925101"/>
-            <a:chOff x="184403" y="703472"/>
-            <a:chExt cx="8781797" cy="6925101"/>
+            <a:off x="3246641" y="703472"/>
+            <a:ext cx="6695424" cy="4572269"/>
+            <a:chOff x="3246641" y="703472"/>
+            <a:chExt cx="6695424" cy="4572269"/>
           </a:xfrm>
         </p:grpSpPr>
         <p:grpSp>
           <p:nvGrpSpPr>
-            <p:cNvPr id="6" name="Group 5"/>
+            <p:cNvPr id="4" name="Group 3"/>
             <p:cNvGrpSpPr/>
             <p:nvPr/>
           </p:nvGrpSpPr>
           <p:grpSpPr>
             <a:xfrm>
-              <a:off x="3213100" y="891040"/>
-              <a:ext cx="5753100" cy="6159886"/>
-              <a:chOff x="3213100" y="703472"/>
-              <a:chExt cx="5753100" cy="6159886"/>
+              <a:off x="3246641" y="703472"/>
+              <a:ext cx="6304760" cy="4572269"/>
+              <a:chOff x="3246641" y="703472"/>
+              <a:chExt cx="6304760" cy="4572269"/>
             </a:xfrm>
           </p:grpSpPr>
           <p:pic>
             <p:nvPicPr>
-              <p:cNvPr id="2" name="Picture 1"/>
+              <p:cNvPr id="3" name="Picture 2"/>
               <p:cNvPicPr>
                 <a:picLocks noChangeAspect="1"/>
               </p:cNvPicPr>
@@ -3722,8 +4295,8 @@
             </p:blipFill>
             <p:spPr>
               <a:xfrm>
-                <a:off x="3213100" y="703472"/>
-                <a:ext cx="5753100" cy="5080000"/>
+                <a:off x="3246641" y="703472"/>
+                <a:ext cx="4242507" cy="3793372"/>
               </a:xfrm>
               <a:prstGeom prst="rect">
                 <a:avLst/>
@@ -3751,8 +4324,8 @@
             </p:blipFill>
             <p:spPr>
               <a:xfrm>
-                <a:off x="7523301" y="5802654"/>
-                <a:ext cx="990383" cy="1060704"/>
+                <a:off x="6345855" y="4484317"/>
+                <a:ext cx="738954" cy="791423"/>
               </a:xfrm>
               <a:prstGeom prst="rect">
                 <a:avLst/>
@@ -3780,8 +4353,8 @@
             </p:blipFill>
             <p:spPr>
               <a:xfrm>
-                <a:off x="3639316" y="3952158"/>
-                <a:ext cx="987643" cy="1057769"/>
+                <a:off x="3564160" y="3125440"/>
+                <a:ext cx="736910" cy="789233"/>
               </a:xfrm>
               <a:prstGeom prst="rect">
                 <a:avLst/>
@@ -3809,83 +4382,224 @@
             </p:blipFill>
             <p:spPr>
               <a:xfrm>
-                <a:off x="5237301" y="5802654"/>
-                <a:ext cx="990383" cy="1060704"/>
+                <a:off x="4691570" y="4484318"/>
+                <a:ext cx="738954" cy="791423"/>
               </a:xfrm>
               <a:prstGeom prst="rect">
                 <a:avLst/>
               </a:prstGeom>
             </p:spPr>
           </p:pic>
+          <p:sp>
+            <p:nvSpPr>
+              <p:cNvPr id="14" name="Rectangle 13"/>
+              <p:cNvSpPr/>
+              <p:nvPr/>
+            </p:nvSpPr>
+            <p:spPr>
+              <a:xfrm>
+                <a:off x="7494001" y="1283884"/>
+                <a:ext cx="137160" cy="137160"/>
+              </a:xfrm>
+              <a:prstGeom prst="rect">
+                <a:avLst/>
+              </a:prstGeom>
+              <a:solidFill>
+                <a:srgbClr val="0000FF"/>
+              </a:solidFill>
+            </p:spPr>
+            <p:style>
+              <a:lnRef idx="2">
+                <a:schemeClr val="accent1">
+                  <a:shade val="50000"/>
+                </a:schemeClr>
+              </a:lnRef>
+              <a:fillRef idx="1">
+                <a:schemeClr val="accent1"/>
+              </a:fillRef>
+              <a:effectRef idx="0">
+                <a:schemeClr val="accent1"/>
+              </a:effectRef>
+              <a:fontRef idx="minor">
+                <a:schemeClr val="lt1"/>
+              </a:fontRef>
+            </p:style>
+            <p:txBody>
+              <a:bodyPr rtlCol="0" anchor="ctr"/>
+              <a:lstStyle/>
+              <a:p>
+                <a:pPr algn="ctr"/>
+                <a:endParaRPr lang="en-US">
+                  <a:solidFill>
+                    <a:srgbClr val="0000FF"/>
+                  </a:solidFill>
+                </a:endParaRPr>
+              </a:p>
+            </p:txBody>
+          </p:sp>
+          <p:sp>
+            <p:nvSpPr>
+              <p:cNvPr id="15" name="Rectangle 14"/>
+              <p:cNvSpPr/>
+              <p:nvPr/>
+            </p:nvSpPr>
+            <p:spPr>
+              <a:xfrm>
+                <a:off x="7495873" y="1600087"/>
+                <a:ext cx="137160" cy="137160"/>
+              </a:xfrm>
+              <a:prstGeom prst="rect">
+                <a:avLst/>
+              </a:prstGeom>
+              <a:solidFill>
+                <a:srgbClr val="008000"/>
+              </a:solidFill>
+            </p:spPr>
+            <p:style>
+              <a:lnRef idx="2">
+                <a:schemeClr val="accent1">
+                  <a:shade val="50000"/>
+                </a:schemeClr>
+              </a:lnRef>
+              <a:fillRef idx="1">
+                <a:schemeClr val="accent1"/>
+              </a:fillRef>
+              <a:effectRef idx="0">
+                <a:schemeClr val="accent1"/>
+              </a:effectRef>
+              <a:fontRef idx="minor">
+                <a:schemeClr val="lt1"/>
+              </a:fontRef>
+            </p:style>
+            <p:txBody>
+              <a:bodyPr rtlCol="0" anchor="ctr"/>
+              <a:lstStyle/>
+              <a:p>
+                <a:pPr algn="ctr"/>
+                <a:endParaRPr lang="en-US"/>
+              </a:p>
+            </p:txBody>
+          </p:sp>
+          <p:sp>
+            <p:nvSpPr>
+              <p:cNvPr id="16" name="TextBox 15"/>
+              <p:cNvSpPr txBox="1"/>
+              <p:nvPr/>
+            </p:nvSpPr>
+            <p:spPr>
+              <a:xfrm>
+                <a:off x="7568530" y="1206270"/>
+                <a:ext cx="1554480" cy="292388"/>
+              </a:xfrm>
+              <a:prstGeom prst="rect">
+                <a:avLst/>
+              </a:prstGeom>
+              <a:noFill/>
+            </p:spPr>
+            <p:txBody>
+              <a:bodyPr wrap="square" rtlCol="0">
+                <a:spAutoFit/>
+              </a:bodyPr>
+              <a:lstStyle/>
+              <a:p>
+                <a:pPr algn="ctr"/>
+                <a:r>
+                  <a:rPr lang="en-US" sz="1300" dirty="0" smtClean="0"/>
+                  <a:t>Decision Node</a:t>
+                </a:r>
+                <a:endParaRPr lang="en-US" sz="1300" dirty="0"/>
+              </a:p>
+            </p:txBody>
+          </p:sp>
+          <p:sp>
+            <p:nvSpPr>
+              <p:cNvPr id="17" name="TextBox 16"/>
+              <p:cNvSpPr txBox="1"/>
+              <p:nvPr/>
+            </p:nvSpPr>
+            <p:spPr>
+              <a:xfrm>
+                <a:off x="7631161" y="1522473"/>
+                <a:ext cx="1920240" cy="292388"/>
+              </a:xfrm>
+              <a:prstGeom prst="rect">
+                <a:avLst/>
+              </a:prstGeom>
+              <a:noFill/>
+            </p:spPr>
+            <p:txBody>
+              <a:bodyPr wrap="square" rtlCol="0">
+                <a:spAutoFit/>
+              </a:bodyPr>
+              <a:lstStyle/>
+              <a:p>
+                <a:r>
+                  <a:rPr lang="en-US" sz="1300" smtClean="0"/>
+                  <a:t>Leaf/Terminal Node </a:t>
+                </a:r>
+                <a:endParaRPr lang="en-US" sz="1300" dirty="0"/>
+              </a:p>
+            </p:txBody>
+          </p:sp>
+          <p:sp>
+            <p:nvSpPr>
+              <p:cNvPr id="18" name="Rectangle 17"/>
+              <p:cNvSpPr/>
+              <p:nvPr/>
+            </p:nvSpPr>
+            <p:spPr>
+              <a:xfrm>
+                <a:off x="7395419" y="1166867"/>
+                <a:ext cx="1999102" cy="712697"/>
+              </a:xfrm>
+              <a:prstGeom prst="rect">
+                <a:avLst/>
+              </a:prstGeom>
+              <a:noFill/>
+              <a:ln w="6350">
+                <a:solidFill>
+                  <a:schemeClr val="tx1">
+                    <a:alpha val="32000"/>
+                  </a:schemeClr>
+                </a:solidFill>
+              </a:ln>
+            </p:spPr>
+            <p:style>
+              <a:lnRef idx="2">
+                <a:schemeClr val="accent1">
+                  <a:shade val="50000"/>
+                </a:schemeClr>
+              </a:lnRef>
+              <a:fillRef idx="1">
+                <a:schemeClr val="accent1"/>
+              </a:fillRef>
+              <a:effectRef idx="0">
+                <a:schemeClr val="accent1"/>
+              </a:effectRef>
+              <a:fontRef idx="minor">
+                <a:schemeClr val="lt1"/>
+              </a:fontRef>
+            </p:style>
+            <p:txBody>
+              <a:bodyPr rtlCol="0" anchor="ctr"/>
+              <a:lstStyle/>
+              <a:p>
+                <a:pPr algn="ctr"/>
+                <a:endParaRPr lang="en-US"/>
+              </a:p>
+            </p:txBody>
+          </p:sp>
         </p:grpSp>
         <p:sp>
           <p:nvSpPr>
-            <p:cNvPr id="10" name="TextBox 9"/>
-            <p:cNvSpPr txBox="1"/>
-            <p:nvPr/>
-          </p:nvSpPr>
-          <p:spPr>
-            <a:xfrm>
-              <a:off x="184403" y="703472"/>
-              <a:ext cx="2817681" cy="2369880"/>
-            </a:xfrm>
-            <a:prstGeom prst="rect">
-              <a:avLst/>
-            </a:prstGeom>
-            <a:noFill/>
-          </p:spPr>
-          <p:txBody>
-            <a:bodyPr wrap="square" rtlCol="0">
-              <a:spAutoFit/>
-            </a:bodyPr>
-            <a:lstStyle/>
-            <a:p>
-              <a:r>
-                <a:rPr lang="en-US" sz="2400" b="1" dirty="0" smtClean="0"/>
-                <a:t>What class (species) is a flower with the following </a:t>
-              </a:r>
-              <a:r>
-                <a:rPr lang="en-US" sz="2400" b="1" dirty="0" smtClean="0"/>
-                <a:t>feature? </a:t>
-              </a:r>
-              <a:endParaRPr lang="en-US" sz="2400" b="1" dirty="0" smtClean="0"/>
-            </a:p>
-            <a:p>
-              <a:endParaRPr lang="en-US" dirty="0" smtClean="0"/>
-            </a:p>
-            <a:p>
-              <a:r>
-                <a:rPr lang="en-US" sz="2200" dirty="0" smtClean="0"/>
-                <a:t>petal </a:t>
-              </a:r>
-              <a:r>
-                <a:rPr lang="en-US" sz="2200" dirty="0" smtClean="0"/>
-                <a:t>length (cm): </a:t>
-              </a:r>
-              <a:r>
-                <a:rPr lang="en-US" sz="2200" dirty="0" smtClean="0"/>
-                <a:t>4.5</a:t>
-              </a:r>
-              <a:endParaRPr lang="en-US" sz="2200" dirty="0" smtClean="0"/>
-            </a:p>
-            <a:p>
-              <a:endParaRPr lang="en-US" dirty="0"/>
-            </a:p>
-            <a:p>
-              <a:endParaRPr lang="en-US" dirty="0"/>
-            </a:p>
-          </p:txBody>
-        </p:sp>
-        <p:sp>
-          <p:nvSpPr>
-            <p:cNvPr id="12" name="Rectangle 11"/>
+            <p:cNvPr id="19" name="Rectangle 18"/>
             <p:cNvSpPr/>
             <p:nvPr/>
           </p:nvSpPr>
           <p:spPr>
             <a:xfrm>
-              <a:off x="1415583" y="7197686"/>
-              <a:ext cx="7165714" cy="430887"/>
+              <a:off x="6847874" y="741457"/>
+              <a:ext cx="3094191" cy="400110"/>
             </a:xfrm>
             <a:prstGeom prst="rect">
               <a:avLst/>
@@ -3899,57 +4613,18 @@
             <a:p>
               <a:pPr algn="ctr"/>
               <a:r>
-                <a:rPr lang="en-US" sz="2200" dirty="0" smtClean="0"/>
-                <a:t>The prediction is </a:t>
+                <a:rPr lang="en-US" sz="2000" dirty="0" smtClean="0"/>
+                <a:t>Type of Node</a:t>
               </a:r>
-              <a:r>
-                <a:rPr lang="en-US" sz="2200" dirty="0" smtClean="0"/>
-                <a:t>versicolor</a:t>
-              </a:r>
-              <a:endParaRPr lang="en-US" sz="2200" dirty="0"/>
+              <a:endParaRPr lang="en-US" sz="2000" dirty="0"/>
             </a:p>
           </p:txBody>
         </p:sp>
       </p:grpSp>
-      <p:pic>
-        <p:nvPicPr>
-          <p:cNvPr id="14" name="Picture 13"/>
-          <p:cNvPicPr>
-            <a:picLocks noChangeAspect="1"/>
-          </p:cNvPicPr>
-          <p:nvPr/>
-        </p:nvPicPr>
-        <p:blipFill>
-          <a:blip r:embed="rId4">
-            <a:extLst>
-              <a:ext uri="{28A0092B-C50C-407E-A947-70E740481C1C}">
-                <a14:useLocalDpi xmlns:a14="http://schemas.microsoft.com/office/drawing/2010/main" val="0"/>
-              </a:ext>
-            </a:extLst>
-          </a:blip>
-          <a:stretch>
-            <a:fillRect/>
-          </a:stretch>
-        </p:blipFill>
-        <p:spPr>
-          <a:xfrm>
-            <a:off x="9135931" y="-3789886"/>
-            <a:ext cx="4686300" cy="3187700"/>
-          </a:xfrm>
-          <a:prstGeom prst="rect">
-            <a:avLst/>
-          </a:prstGeom>
-          <a:ln w="12700">
-            <a:solidFill>
-              <a:schemeClr val="tx1"/>
-            </a:solidFill>
-          </a:ln>
-        </p:spPr>
-      </p:pic>
     </p:spTree>
     <p:extLst>
       <p:ext uri="{BB962C8B-B14F-4D97-AF65-F5344CB8AC3E}">
-        <p14:creationId xmlns:p14="http://schemas.microsoft.com/office/powerpoint/2010/main" val="1777933550"/>
+        <p14:creationId xmlns:p14="http://schemas.microsoft.com/office/powerpoint/2010/main" val="657757486"/>
       </p:ext>
     </p:extLst>
   </p:cSld>
@@ -3976,23 +4651,60 @@
           <a:chExt cx="0" cy="0"/>
         </a:xfrm>
       </p:grpSpPr>
+      <p:sp>
+        <p:nvSpPr>
+          <p:cNvPr id="12" name="Rectangle 11"/>
+          <p:cNvSpPr/>
+          <p:nvPr/>
+        </p:nvSpPr>
+        <p:spPr>
+          <a:xfrm>
+            <a:off x="2192839" y="7185845"/>
+            <a:ext cx="6096000" cy="400110"/>
+          </a:xfrm>
+          <a:prstGeom prst="rect">
+            <a:avLst/>
+          </a:prstGeom>
+        </p:spPr>
+        <p:txBody>
+          <a:bodyPr>
+            <a:spAutoFit/>
+          </a:bodyPr>
+          <a:lstStyle/>
+          <a:p>
+            <a:r>
+              <a:rPr lang="en-US" sz="2000" dirty="0" smtClean="0"/>
+              <a:t>The prediction is </a:t>
+            </a:r>
+            <a:r>
+              <a:rPr lang="en-US" sz="2000" dirty="0" err="1" smtClean="0"/>
+              <a:t>virginica</a:t>
+            </a:r>
+            <a:r>
+              <a:rPr lang="en-US" sz="2000" dirty="0" smtClean="0"/>
+              <a:t> as it is the majority class. </a:t>
+            </a:r>
+            <a:endParaRPr lang="en-US" sz="2000" dirty="0"/>
+          </a:p>
+        </p:txBody>
+      </p:sp>
       <p:grpSp>
         <p:nvGrpSpPr>
-          <p:cNvPr id="13" name="Group 12"/>
+          <p:cNvPr id="10" name="Group 9"/>
           <p:cNvGrpSpPr/>
           <p:nvPr/>
         </p:nvGrpSpPr>
         <p:grpSpPr>
           <a:xfrm>
-            <a:off x="1148862" y="3346049"/>
-            <a:ext cx="11216054" cy="4176672"/>
-            <a:chOff x="1148862" y="3346049"/>
-            <a:chExt cx="11216054" cy="4176672"/>
+            <a:off x="184403" y="703472"/>
+            <a:ext cx="9757662" cy="5146268"/>
+            <a:chOff x="184403" y="703472"/>
+            <a:chExt cx="9757662" cy="5146268"/>
           </a:xfrm>
         </p:grpSpPr>
         <p:pic>
           <p:nvPicPr>
-            <p:cNvPr id="11" name="Picture 10"/>
+            <p:cNvPr id="6" name="Picture 5"/>
             <p:cNvPicPr>
               <a:picLocks noChangeAspect="1"/>
             </p:cNvPicPr>
@@ -4012,153 +4724,409 @@
           </p:blipFill>
           <p:spPr>
             <a:xfrm>
-              <a:off x="5049716" y="3346049"/>
-              <a:ext cx="7315200" cy="2743200"/>
+              <a:off x="3246120" y="704088"/>
+              <a:ext cx="4244059" cy="3794760"/>
             </a:xfrm>
             <a:prstGeom prst="rect">
               <a:avLst/>
             </a:prstGeom>
           </p:spPr>
         </p:pic>
-        <p:grpSp>
-          <p:nvGrpSpPr>
-            <p:cNvPr id="12" name="Group 11"/>
-            <p:cNvGrpSpPr>
-              <a:grpSpLocks noChangeAspect="1"/>
-            </p:cNvGrpSpPr>
+        <p:pic>
+          <p:nvPicPr>
+            <p:cNvPr id="7" name="Picture 6"/>
+            <p:cNvPicPr>
+              <a:picLocks noChangeAspect="1"/>
+            </p:cNvPicPr>
             <p:nvPr/>
-          </p:nvGrpSpPr>
-          <p:grpSpPr>
+          </p:nvPicPr>
+          <p:blipFill rotWithShape="1">
+            <a:blip r:embed="rId3">
+              <a:extLst>
+                <a:ext uri="{28A0092B-C50C-407E-A947-70E740481C1C}">
+                  <a14:useLocalDpi xmlns:a14="http://schemas.microsoft.com/office/drawing/2010/main" val="0"/>
+                </a:ext>
+              </a:extLst>
+            </a:blip>
+            <a:srcRect l="68876"/>
+            <a:stretch/>
+          </p:blipFill>
+          <p:spPr>
             <a:xfrm>
-              <a:off x="1148862" y="3346049"/>
-              <a:ext cx="3900854" cy="4176672"/>
-              <a:chOff x="1032608" y="492457"/>
-              <a:chExt cx="5753100" cy="6159886"/>
+              <a:off x="6345855" y="4484317"/>
+              <a:ext cx="738954" cy="791423"/>
             </a:xfrm>
-          </p:grpSpPr>
-          <p:pic>
-            <p:nvPicPr>
-              <p:cNvPr id="5" name="Picture 4"/>
-              <p:cNvPicPr>
-                <a:picLocks noChangeAspect="1"/>
-              </p:cNvPicPr>
-              <p:nvPr/>
-            </p:nvPicPr>
-            <p:blipFill>
-              <a:blip r:embed="rId3">
-                <a:extLst>
-                  <a:ext uri="{28A0092B-C50C-407E-A947-70E740481C1C}">
-                    <a14:useLocalDpi xmlns:a14="http://schemas.microsoft.com/office/drawing/2010/main" val="0"/>
-                  </a:ext>
-                </a:extLst>
-              </a:blip>
-              <a:stretch>
-                <a:fillRect/>
-              </a:stretch>
-            </p:blipFill>
-            <p:spPr>
-              <a:xfrm>
-                <a:off x="1032608" y="492457"/>
-                <a:ext cx="5753100" cy="5080000"/>
-              </a:xfrm>
-              <a:prstGeom prst="rect">
-                <a:avLst/>
-              </a:prstGeom>
-            </p:spPr>
-          </p:pic>
-          <p:pic>
-            <p:nvPicPr>
-              <p:cNvPr id="6" name="Picture 5"/>
-              <p:cNvPicPr>
-                <a:picLocks noChangeAspect="1"/>
-              </p:cNvPicPr>
-              <p:nvPr/>
-            </p:nvPicPr>
-            <p:blipFill rotWithShape="1">
-              <a:blip r:embed="rId4">
-                <a:extLst>
-                  <a:ext uri="{28A0092B-C50C-407E-A947-70E740481C1C}">
-                    <a14:useLocalDpi xmlns:a14="http://schemas.microsoft.com/office/drawing/2010/main" val="0"/>
-                  </a:ext>
-                </a:extLst>
-              </a:blip>
-              <a:srcRect l="68876"/>
-              <a:stretch/>
-            </p:blipFill>
-            <p:spPr>
-              <a:xfrm>
-                <a:off x="5342809" y="5591639"/>
-                <a:ext cx="990383" cy="1060704"/>
-              </a:xfrm>
-              <a:prstGeom prst="rect">
-                <a:avLst/>
-              </a:prstGeom>
-            </p:spPr>
-          </p:pic>
-          <p:pic>
-            <p:nvPicPr>
-              <p:cNvPr id="7" name="Picture 6"/>
-              <p:cNvPicPr>
-                <a:picLocks noChangeAspect="1"/>
-              </p:cNvPicPr>
-              <p:nvPr/>
-            </p:nvPicPr>
-            <p:blipFill rotWithShape="1">
-              <a:blip r:embed="rId4">
-                <a:extLst>
-                  <a:ext uri="{28A0092B-C50C-407E-A947-70E740481C1C}">
-                    <a14:useLocalDpi xmlns:a14="http://schemas.microsoft.com/office/drawing/2010/main" val="0"/>
-                  </a:ext>
-                </a:extLst>
-              </a:blip>
-              <a:srcRect l="33873" r="35004"/>
-              <a:stretch/>
-            </p:blipFill>
-            <p:spPr>
-              <a:xfrm>
-                <a:off x="1458824" y="3741143"/>
-                <a:ext cx="987643" cy="1057769"/>
-              </a:xfrm>
-              <a:prstGeom prst="rect">
-                <a:avLst/>
-              </a:prstGeom>
-            </p:spPr>
-          </p:pic>
-          <p:pic>
-            <p:nvPicPr>
-              <p:cNvPr id="8" name="Picture 7"/>
-              <p:cNvPicPr>
-                <a:picLocks noChangeAspect="1"/>
-              </p:cNvPicPr>
-              <p:nvPr/>
-            </p:nvPicPr>
-            <p:blipFill rotWithShape="1">
-              <a:blip r:embed="rId4">
-                <a:extLst>
-                  <a:ext uri="{28A0092B-C50C-407E-A947-70E740481C1C}">
-                    <a14:useLocalDpi xmlns:a14="http://schemas.microsoft.com/office/drawing/2010/main" val="0"/>
-                  </a:ext>
-                </a:extLst>
-              </a:blip>
-              <a:srcRect r="68876"/>
-              <a:stretch/>
-            </p:blipFill>
-            <p:spPr>
-              <a:xfrm>
-                <a:off x="3056809" y="5591639"/>
-                <a:ext cx="990383" cy="1060704"/>
-              </a:xfrm>
-              <a:prstGeom prst="rect">
-                <a:avLst/>
-              </a:prstGeom>
-            </p:spPr>
-          </p:pic>
-        </p:grpSp>
+            <a:prstGeom prst="rect">
+              <a:avLst/>
+            </a:prstGeom>
+          </p:spPr>
+        </p:pic>
+        <p:pic>
+          <p:nvPicPr>
+            <p:cNvPr id="8" name="Picture 7"/>
+            <p:cNvPicPr>
+              <a:picLocks noChangeAspect="1"/>
+            </p:cNvPicPr>
+            <p:nvPr/>
+          </p:nvPicPr>
+          <p:blipFill rotWithShape="1">
+            <a:blip r:embed="rId3">
+              <a:extLst>
+                <a:ext uri="{28A0092B-C50C-407E-A947-70E740481C1C}">
+                  <a14:useLocalDpi xmlns:a14="http://schemas.microsoft.com/office/drawing/2010/main" val="0"/>
+                </a:ext>
+              </a:extLst>
+            </a:blip>
+            <a:srcRect l="33873" r="35004"/>
+            <a:stretch/>
+          </p:blipFill>
+          <p:spPr>
+            <a:xfrm>
+              <a:off x="3564160" y="3125440"/>
+              <a:ext cx="736910" cy="789233"/>
+            </a:xfrm>
+            <a:prstGeom prst="rect">
+              <a:avLst/>
+            </a:prstGeom>
+          </p:spPr>
+        </p:pic>
+        <p:pic>
+          <p:nvPicPr>
+            <p:cNvPr id="9" name="Picture 8"/>
+            <p:cNvPicPr>
+              <a:picLocks noChangeAspect="1"/>
+            </p:cNvPicPr>
+            <p:nvPr/>
+          </p:nvPicPr>
+          <p:blipFill rotWithShape="1">
+            <a:blip r:embed="rId3">
+              <a:extLst>
+                <a:ext uri="{28A0092B-C50C-407E-A947-70E740481C1C}">
+                  <a14:useLocalDpi xmlns:a14="http://schemas.microsoft.com/office/drawing/2010/main" val="0"/>
+                </a:ext>
+              </a:extLst>
+            </a:blip>
+            <a:srcRect r="68876"/>
+            <a:stretch/>
+          </p:blipFill>
+          <p:spPr>
+            <a:xfrm>
+              <a:off x="4691570" y="4484318"/>
+              <a:ext cx="738954" cy="791423"/>
+            </a:xfrm>
+            <a:prstGeom prst="rect">
+              <a:avLst/>
+            </a:prstGeom>
+          </p:spPr>
+        </p:pic>
+        <p:sp>
+          <p:nvSpPr>
+            <p:cNvPr id="14" name="Rectangle 13"/>
+            <p:cNvSpPr/>
+            <p:nvPr/>
+          </p:nvSpPr>
+          <p:spPr>
+            <a:xfrm>
+              <a:off x="7494001" y="1283884"/>
+              <a:ext cx="137160" cy="137160"/>
+            </a:xfrm>
+            <a:prstGeom prst="rect">
+              <a:avLst/>
+            </a:prstGeom>
+            <a:solidFill>
+              <a:srgbClr val="0000FF"/>
+            </a:solidFill>
+          </p:spPr>
+          <p:style>
+            <a:lnRef idx="2">
+              <a:schemeClr val="accent1">
+                <a:shade val="50000"/>
+              </a:schemeClr>
+            </a:lnRef>
+            <a:fillRef idx="1">
+              <a:schemeClr val="accent1"/>
+            </a:fillRef>
+            <a:effectRef idx="0">
+              <a:schemeClr val="accent1"/>
+            </a:effectRef>
+            <a:fontRef idx="minor">
+              <a:schemeClr val="lt1"/>
+            </a:fontRef>
+          </p:style>
+          <p:txBody>
+            <a:bodyPr rtlCol="0" anchor="ctr"/>
+            <a:lstStyle/>
+            <a:p>
+              <a:pPr algn="ctr"/>
+              <a:endParaRPr lang="en-US">
+                <a:solidFill>
+                  <a:srgbClr val="0000FF"/>
+                </a:solidFill>
+              </a:endParaRPr>
+            </a:p>
+          </p:txBody>
+        </p:sp>
+        <p:sp>
+          <p:nvSpPr>
+            <p:cNvPr id="15" name="Rectangle 14"/>
+            <p:cNvSpPr/>
+            <p:nvPr/>
+          </p:nvSpPr>
+          <p:spPr>
+            <a:xfrm>
+              <a:off x="7495873" y="1600087"/>
+              <a:ext cx="137160" cy="137160"/>
+            </a:xfrm>
+            <a:prstGeom prst="rect">
+              <a:avLst/>
+            </a:prstGeom>
+            <a:solidFill>
+              <a:srgbClr val="008000"/>
+            </a:solidFill>
+          </p:spPr>
+          <p:style>
+            <a:lnRef idx="2">
+              <a:schemeClr val="accent1">
+                <a:shade val="50000"/>
+              </a:schemeClr>
+            </a:lnRef>
+            <a:fillRef idx="1">
+              <a:schemeClr val="accent1"/>
+            </a:fillRef>
+            <a:effectRef idx="0">
+              <a:schemeClr val="accent1"/>
+            </a:effectRef>
+            <a:fontRef idx="minor">
+              <a:schemeClr val="lt1"/>
+            </a:fontRef>
+          </p:style>
+          <p:txBody>
+            <a:bodyPr rtlCol="0" anchor="ctr"/>
+            <a:lstStyle/>
+            <a:p>
+              <a:pPr algn="ctr"/>
+              <a:endParaRPr lang="en-US"/>
+            </a:p>
+          </p:txBody>
+        </p:sp>
+        <p:sp>
+          <p:nvSpPr>
+            <p:cNvPr id="16" name="TextBox 15"/>
+            <p:cNvSpPr txBox="1"/>
+            <p:nvPr/>
+          </p:nvSpPr>
+          <p:spPr>
+            <a:xfrm>
+              <a:off x="7568530" y="1206270"/>
+              <a:ext cx="1554480" cy="292388"/>
+            </a:xfrm>
+            <a:prstGeom prst="rect">
+              <a:avLst/>
+            </a:prstGeom>
+            <a:noFill/>
+          </p:spPr>
+          <p:txBody>
+            <a:bodyPr wrap="square" rtlCol="0">
+              <a:spAutoFit/>
+            </a:bodyPr>
+            <a:lstStyle/>
+            <a:p>
+              <a:pPr algn="ctr"/>
+              <a:r>
+                <a:rPr lang="en-US" sz="1300" dirty="0" smtClean="0"/>
+                <a:t>Decision Node</a:t>
+              </a:r>
+              <a:endParaRPr lang="en-US" sz="1300" dirty="0"/>
+            </a:p>
+          </p:txBody>
+        </p:sp>
+        <p:sp>
+          <p:nvSpPr>
+            <p:cNvPr id="17" name="TextBox 16"/>
+            <p:cNvSpPr txBox="1"/>
+            <p:nvPr/>
+          </p:nvSpPr>
+          <p:spPr>
+            <a:xfrm>
+              <a:off x="7631161" y="1522473"/>
+              <a:ext cx="1920240" cy="292388"/>
+            </a:xfrm>
+            <a:prstGeom prst="rect">
+              <a:avLst/>
+            </a:prstGeom>
+            <a:noFill/>
+          </p:spPr>
+          <p:txBody>
+            <a:bodyPr wrap="square" rtlCol="0">
+              <a:spAutoFit/>
+            </a:bodyPr>
+            <a:lstStyle/>
+            <a:p>
+              <a:r>
+                <a:rPr lang="en-US" sz="1300" smtClean="0"/>
+                <a:t>Leaf/Terminal Node </a:t>
+              </a:r>
+              <a:endParaRPr lang="en-US" sz="1300" dirty="0"/>
+            </a:p>
+          </p:txBody>
+        </p:sp>
+        <p:sp>
+          <p:nvSpPr>
+            <p:cNvPr id="18" name="Rectangle 17"/>
+            <p:cNvSpPr/>
+            <p:nvPr/>
+          </p:nvSpPr>
+          <p:spPr>
+            <a:xfrm>
+              <a:off x="7395419" y="1166867"/>
+              <a:ext cx="1999102" cy="712697"/>
+            </a:xfrm>
+            <a:prstGeom prst="rect">
+              <a:avLst/>
+            </a:prstGeom>
+            <a:noFill/>
+            <a:ln w="6350">
+              <a:solidFill>
+                <a:schemeClr val="tx1">
+                  <a:alpha val="32000"/>
+                </a:schemeClr>
+              </a:solidFill>
+            </a:ln>
+          </p:spPr>
+          <p:style>
+            <a:lnRef idx="2">
+              <a:schemeClr val="accent1">
+                <a:shade val="50000"/>
+              </a:schemeClr>
+            </a:lnRef>
+            <a:fillRef idx="1">
+              <a:schemeClr val="accent1"/>
+            </a:fillRef>
+            <a:effectRef idx="0">
+              <a:schemeClr val="accent1"/>
+            </a:effectRef>
+            <a:fontRef idx="minor">
+              <a:schemeClr val="lt1"/>
+            </a:fontRef>
+          </p:style>
+          <p:txBody>
+            <a:bodyPr rtlCol="0" anchor="ctr"/>
+            <a:lstStyle/>
+            <a:p>
+              <a:pPr algn="ctr"/>
+              <a:endParaRPr lang="en-US"/>
+            </a:p>
+          </p:txBody>
+        </p:sp>
+        <p:sp>
+          <p:nvSpPr>
+            <p:cNvPr id="19" name="Rectangle 18"/>
+            <p:cNvSpPr/>
+            <p:nvPr/>
+          </p:nvSpPr>
+          <p:spPr>
+            <a:xfrm>
+              <a:off x="6847874" y="741457"/>
+              <a:ext cx="3094191" cy="400110"/>
+            </a:xfrm>
+            <a:prstGeom prst="rect">
+              <a:avLst/>
+            </a:prstGeom>
+          </p:spPr>
+          <p:txBody>
+            <a:bodyPr wrap="square">
+              <a:spAutoFit/>
+            </a:bodyPr>
+            <a:lstStyle/>
+            <a:p>
+              <a:pPr algn="ctr"/>
+              <a:r>
+                <a:rPr lang="en-US" sz="2000" dirty="0" smtClean="0"/>
+                <a:t>Type of Node</a:t>
+              </a:r>
+              <a:endParaRPr lang="en-US" sz="2000" dirty="0"/>
+            </a:p>
+          </p:txBody>
+        </p:sp>
+        <p:sp>
+          <p:nvSpPr>
+            <p:cNvPr id="20" name="TextBox 19"/>
+            <p:cNvSpPr txBox="1"/>
+            <p:nvPr/>
+          </p:nvSpPr>
+          <p:spPr>
+            <a:xfrm>
+              <a:off x="184403" y="703472"/>
+              <a:ext cx="2817681" cy="2369880"/>
+            </a:xfrm>
+            <a:prstGeom prst="rect">
+              <a:avLst/>
+            </a:prstGeom>
+            <a:noFill/>
+          </p:spPr>
+          <p:txBody>
+            <a:bodyPr wrap="square" rtlCol="0">
+              <a:spAutoFit/>
+            </a:bodyPr>
+            <a:lstStyle/>
+            <a:p>
+              <a:r>
+                <a:rPr lang="en-US" sz="2400" b="1" dirty="0" smtClean="0"/>
+                <a:t>What class (species) is a flower with the following feature? </a:t>
+              </a:r>
+            </a:p>
+            <a:p>
+              <a:endParaRPr lang="en-US" dirty="0" smtClean="0"/>
+            </a:p>
+            <a:p>
+              <a:r>
+                <a:rPr lang="en-US" sz="2200" dirty="0" smtClean="0"/>
+                <a:t>petal length (cm): 4.5</a:t>
+              </a:r>
+            </a:p>
+            <a:p>
+              <a:endParaRPr lang="en-US" dirty="0"/>
+            </a:p>
+            <a:p>
+              <a:endParaRPr lang="en-US" dirty="0"/>
+            </a:p>
+          </p:txBody>
+        </p:sp>
+        <p:sp>
+          <p:nvSpPr>
+            <p:cNvPr id="21" name="Rectangle 20"/>
+            <p:cNvSpPr/>
+            <p:nvPr/>
+          </p:nvSpPr>
+          <p:spPr>
+            <a:xfrm>
+              <a:off x="1229255" y="5418853"/>
+              <a:ext cx="7165714" cy="430887"/>
+            </a:xfrm>
+            <a:prstGeom prst="rect">
+              <a:avLst/>
+            </a:prstGeom>
+          </p:spPr>
+          <p:txBody>
+            <a:bodyPr wrap="square">
+              <a:spAutoFit/>
+            </a:bodyPr>
+            <a:lstStyle/>
+            <a:p>
+              <a:pPr algn="ctr"/>
+              <a:r>
+                <a:rPr lang="en-US" sz="2200" dirty="0" smtClean="0"/>
+                <a:t>The prediction is versicolor</a:t>
+              </a:r>
+              <a:endParaRPr lang="en-US" sz="2200" dirty="0"/>
+            </a:p>
+          </p:txBody>
+        </p:sp>
       </p:grpSp>
     </p:spTree>
     <p:extLst>
       <p:ext uri="{BB962C8B-B14F-4D97-AF65-F5344CB8AC3E}">
-        <p14:creationId xmlns:p14="http://schemas.microsoft.com/office/powerpoint/2010/main" val="239750048"/>
+        <p14:creationId xmlns:p14="http://schemas.microsoft.com/office/powerpoint/2010/main" val="1759434061"/>
       </p:ext>
     </p:extLst>
   </p:cSld>
@@ -4169,6 +5137,96 @@
 </file>
 
 <file path=ppt/slides/slide6.xml><?xml version="1.0" encoding="utf-8"?>
+<p:sld xmlns:a="http://schemas.openxmlformats.org/drawingml/2006/main" xmlns:r="http://schemas.openxmlformats.org/officeDocument/2006/relationships" xmlns:p="http://schemas.openxmlformats.org/presentationml/2006/main">
+  <p:cSld>
+    <p:spTree>
+      <p:nvGrpSpPr>
+        <p:cNvPr id="1" name=""/>
+        <p:cNvGrpSpPr/>
+        <p:nvPr/>
+      </p:nvGrpSpPr>
+      <p:grpSpPr>
+        <a:xfrm>
+          <a:off x="0" y="0"/>
+          <a:ext cx="0" cy="0"/>
+          <a:chOff x="0" y="0"/>
+          <a:chExt cx="0" cy="0"/>
+        </a:xfrm>
+      </p:grpSpPr>
+      <p:pic>
+        <p:nvPicPr>
+          <p:cNvPr id="4" name="Picture 3"/>
+          <p:cNvPicPr>
+            <a:picLocks noChangeAspect="1"/>
+          </p:cNvPicPr>
+          <p:nvPr/>
+        </p:nvPicPr>
+        <p:blipFill>
+          <a:blip r:embed="rId2">
+            <a:extLst>
+              <a:ext uri="{28A0092B-C50C-407E-A947-70E740481C1C}">
+                <a14:useLocalDpi xmlns:a14="http://schemas.microsoft.com/office/drawing/2010/main" val="0"/>
+              </a:ext>
+            </a:extLst>
+          </a:blip>
+          <a:stretch>
+            <a:fillRect/>
+          </a:stretch>
+        </p:blipFill>
+        <p:spPr>
+          <a:xfrm>
+            <a:off x="3759200" y="1828800"/>
+            <a:ext cx="4660900" cy="3187700"/>
+          </a:xfrm>
+          <a:prstGeom prst="rect">
+            <a:avLst/>
+          </a:prstGeom>
+        </p:spPr>
+      </p:pic>
+    </p:spTree>
+    <p:extLst>
+      <p:ext uri="{BB962C8B-B14F-4D97-AF65-F5344CB8AC3E}">
+        <p14:creationId xmlns:p14="http://schemas.microsoft.com/office/powerpoint/2010/main" val="1165698673"/>
+      </p:ext>
+    </p:extLst>
+  </p:cSld>
+  <p:clrMapOvr>
+    <a:masterClrMapping/>
+  </p:clrMapOvr>
+</p:sld>
+</file>
+
+<file path=ppt/slides/slide7.xml><?xml version="1.0" encoding="utf-8"?>
+<p:sld xmlns:a="http://schemas.openxmlformats.org/drawingml/2006/main" xmlns:r="http://schemas.openxmlformats.org/officeDocument/2006/relationships" xmlns:p="http://schemas.openxmlformats.org/presentationml/2006/main">
+  <p:cSld>
+    <p:spTree>
+      <p:nvGrpSpPr>
+        <p:cNvPr id="1" name=""/>
+        <p:cNvGrpSpPr/>
+        <p:nvPr/>
+      </p:nvGrpSpPr>
+      <p:grpSpPr>
+        <a:xfrm>
+          <a:off x="0" y="0"/>
+          <a:ext cx="0" cy="0"/>
+          <a:chOff x="0" y="0"/>
+          <a:chExt cx="0" cy="0"/>
+        </a:xfrm>
+      </p:grpSpPr>
+    </p:spTree>
+    <p:extLst>
+      <p:ext uri="{BB962C8B-B14F-4D97-AF65-F5344CB8AC3E}">
+        <p14:creationId xmlns:p14="http://schemas.microsoft.com/office/powerpoint/2010/main" val="1437185423"/>
+      </p:ext>
+    </p:extLst>
+  </p:cSld>
+  <p:clrMapOvr>
+    <a:masterClrMapping/>
+  </p:clrMapOvr>
+</p:sld>
+</file>
+
+<file path=ppt/slides/slide8.xml><?xml version="1.0" encoding="utf-8"?>
 <p:sld xmlns:a="http://schemas.openxmlformats.org/drawingml/2006/main" xmlns:r="http://schemas.openxmlformats.org/officeDocument/2006/relationships" xmlns:p="http://schemas.openxmlformats.org/presentationml/2006/main">
   <p:cSld>
     <p:spTree>
@@ -4468,7 +5526,7 @@
 </p:sld>
 </file>
 
-<file path=ppt/slides/slide7.xml><?xml version="1.0" encoding="utf-8"?>
+<file path=ppt/slides/slide9.xml><?xml version="1.0" encoding="utf-8"?>
 <p:sld xmlns:a="http://schemas.openxmlformats.org/drawingml/2006/main" xmlns:r="http://schemas.openxmlformats.org/officeDocument/2006/relationships" xmlns:p="http://schemas.openxmlformats.org/presentationml/2006/main">
   <p:cSld>
     <p:spTree>
@@ -4493,10 +5551,10 @@
         </p:nvGrpSpPr>
         <p:grpSpPr>
           <a:xfrm>
-            <a:off x="395419" y="703472"/>
-            <a:ext cx="8570781" cy="6706756"/>
-            <a:chOff x="395419" y="703472"/>
-            <a:chExt cx="8570781" cy="6706756"/>
+            <a:off x="1148862" y="3346049"/>
+            <a:ext cx="11216054" cy="4176672"/>
+            <a:chOff x="1148862" y="3346049"/>
+            <a:chExt cx="11216054" cy="4176672"/>
           </a:xfrm>
         </p:grpSpPr>
         <p:pic>
@@ -4521,299 +5579,153 @@
           </p:blipFill>
           <p:spPr>
             <a:xfrm>
-              <a:off x="3213100" y="703472"/>
-              <a:ext cx="5753100" cy="5080000"/>
+              <a:off x="5049716" y="3346049"/>
+              <a:ext cx="7315200" cy="2743200"/>
             </a:xfrm>
             <a:prstGeom prst="rect">
               <a:avLst/>
             </a:prstGeom>
           </p:spPr>
         </p:pic>
-        <p:pic>
-          <p:nvPicPr>
-            <p:cNvPr id="7" name="Picture 6"/>
-            <p:cNvPicPr>
-              <a:picLocks noChangeAspect="1"/>
-            </p:cNvPicPr>
+        <p:grpSp>
+          <p:nvGrpSpPr>
+            <p:cNvPr id="12" name="Group 11"/>
+            <p:cNvGrpSpPr>
+              <a:grpSpLocks noChangeAspect="1"/>
+            </p:cNvGrpSpPr>
             <p:nvPr/>
-          </p:nvPicPr>
-          <p:blipFill rotWithShape="1">
-            <a:blip r:embed="rId3">
-              <a:extLst>
-                <a:ext uri="{28A0092B-C50C-407E-A947-70E740481C1C}">
-                  <a14:useLocalDpi xmlns:a14="http://schemas.microsoft.com/office/drawing/2010/main" val="0"/>
-                </a:ext>
-              </a:extLst>
-            </a:blip>
-            <a:srcRect l="68876"/>
-            <a:stretch/>
-          </p:blipFill>
-          <p:spPr>
+          </p:nvGrpSpPr>
+          <p:grpSpPr>
             <a:xfrm>
-              <a:off x="7523301" y="5755762"/>
-              <a:ext cx="990383" cy="1060704"/>
+              <a:off x="1148862" y="3346049"/>
+              <a:ext cx="3900854" cy="4176672"/>
+              <a:chOff x="1032608" y="492457"/>
+              <a:chExt cx="5753100" cy="6159886"/>
             </a:xfrm>
-            <a:prstGeom prst="rect">
-              <a:avLst/>
-            </a:prstGeom>
-          </p:spPr>
-        </p:pic>
-        <p:pic>
-          <p:nvPicPr>
-            <p:cNvPr id="8" name="Picture 7"/>
-            <p:cNvPicPr>
-              <a:picLocks noChangeAspect="1"/>
-            </p:cNvPicPr>
-            <p:nvPr/>
-          </p:nvPicPr>
-          <p:blipFill rotWithShape="1">
-            <a:blip r:embed="rId3">
-              <a:extLst>
-                <a:ext uri="{28A0092B-C50C-407E-A947-70E740481C1C}">
-                  <a14:useLocalDpi xmlns:a14="http://schemas.microsoft.com/office/drawing/2010/main" val="0"/>
-                </a:ext>
-              </a:extLst>
-            </a:blip>
-            <a:srcRect l="33873" r="35004"/>
-            <a:stretch/>
-          </p:blipFill>
-          <p:spPr>
-            <a:xfrm>
-              <a:off x="3639316" y="3952158"/>
-              <a:ext cx="987643" cy="1057769"/>
-            </a:xfrm>
-            <a:prstGeom prst="rect">
-              <a:avLst/>
-            </a:prstGeom>
-          </p:spPr>
-        </p:pic>
-        <p:pic>
-          <p:nvPicPr>
-            <p:cNvPr id="9" name="Picture 8"/>
-            <p:cNvPicPr>
-              <a:picLocks noChangeAspect="1"/>
-            </p:cNvPicPr>
-            <p:nvPr/>
-          </p:nvPicPr>
-          <p:blipFill rotWithShape="1">
-            <a:blip r:embed="rId3">
-              <a:extLst>
-                <a:ext uri="{28A0092B-C50C-407E-A947-70E740481C1C}">
-                  <a14:useLocalDpi xmlns:a14="http://schemas.microsoft.com/office/drawing/2010/main" val="0"/>
-                </a:ext>
-              </a:extLst>
-            </a:blip>
-            <a:srcRect r="68876"/>
-            <a:stretch/>
-          </p:blipFill>
-          <p:spPr>
-            <a:xfrm>
-              <a:off x="5237301" y="5755762"/>
-              <a:ext cx="990383" cy="1060704"/>
-            </a:xfrm>
-            <a:prstGeom prst="rect">
-              <a:avLst/>
-            </a:prstGeom>
-          </p:spPr>
-        </p:pic>
-        <p:sp>
-          <p:nvSpPr>
-            <p:cNvPr id="10" name="TextBox 9"/>
-            <p:cNvSpPr txBox="1"/>
-            <p:nvPr/>
-          </p:nvSpPr>
-          <p:spPr>
-            <a:xfrm>
-              <a:off x="395419" y="889000"/>
-              <a:ext cx="2817681" cy="3539430"/>
-            </a:xfrm>
-            <a:prstGeom prst="rect">
-              <a:avLst/>
-            </a:prstGeom>
-            <a:noFill/>
-          </p:spPr>
-          <p:txBody>
-            <a:bodyPr wrap="square" rtlCol="0">
-              <a:spAutoFit/>
-            </a:bodyPr>
-            <a:lstStyle/>
-            <a:p>
-              <a:r>
-                <a:rPr lang="en-US" sz="2400" b="1" dirty="0" smtClean="0"/>
-                <a:t>What class (species) is a flower with the following features? </a:t>
-              </a:r>
-            </a:p>
-            <a:p>
-              <a:endParaRPr lang="en-US" dirty="0" smtClean="0"/>
-            </a:p>
-            <a:p>
-              <a:r>
-                <a:rPr lang="en-US" sz="2000" dirty="0" smtClean="0"/>
-                <a:t>sepal length (cm): 5.8</a:t>
-              </a:r>
-            </a:p>
-            <a:p>
-              <a:r>
-                <a:rPr lang="en-US" sz="2000" dirty="0" smtClean="0"/>
-                <a:t>sepal width (cm): 2.8</a:t>
-              </a:r>
-            </a:p>
-            <a:p>
-              <a:r>
-                <a:rPr lang="en-US" sz="2000" dirty="0" smtClean="0"/>
-                <a:t>petal length (cm): 5.1</a:t>
-              </a:r>
-            </a:p>
-            <a:p>
-              <a:r>
-                <a:rPr lang="en-US" sz="2000" dirty="0" smtClean="0"/>
-                <a:t>petal width (cm): 2.4</a:t>
-              </a:r>
-              <a:endParaRPr lang="en-US" sz="2000" dirty="0"/>
-            </a:p>
-            <a:p>
-              <a:endParaRPr lang="en-US" dirty="0" smtClean="0"/>
-            </a:p>
-            <a:p>
-              <a:endParaRPr lang="en-US" dirty="0"/>
-            </a:p>
-            <a:p>
-              <a:endParaRPr lang="en-US" dirty="0"/>
-            </a:p>
-          </p:txBody>
-        </p:sp>
-        <p:sp>
-          <p:nvSpPr>
-            <p:cNvPr id="12" name="Rectangle 11"/>
-            <p:cNvSpPr/>
-            <p:nvPr/>
-          </p:nvSpPr>
-          <p:spPr>
-            <a:xfrm>
-              <a:off x="2189301" y="7010118"/>
-              <a:ext cx="6096000" cy="400110"/>
-            </a:xfrm>
-            <a:prstGeom prst="rect">
-              <a:avLst/>
-            </a:prstGeom>
-          </p:spPr>
-          <p:txBody>
-            <a:bodyPr>
-              <a:spAutoFit/>
-            </a:bodyPr>
-            <a:lstStyle/>
-            <a:p>
-              <a:r>
-                <a:rPr lang="en-US" sz="2000" dirty="0" smtClean="0"/>
-                <a:t>The prediction is </a:t>
-              </a:r>
-              <a:r>
-                <a:rPr lang="en-US" sz="2000" dirty="0" err="1" smtClean="0"/>
-                <a:t>virginica</a:t>
-              </a:r>
-              <a:r>
-                <a:rPr lang="en-US" sz="2000" dirty="0" smtClean="0"/>
-                <a:t> as it is the majority class. </a:t>
-              </a:r>
-              <a:endParaRPr lang="en-US" sz="2000" dirty="0"/>
-            </a:p>
-          </p:txBody>
-        </p:sp>
+          </p:grpSpPr>
+          <p:pic>
+            <p:nvPicPr>
+              <p:cNvPr id="5" name="Picture 4"/>
+              <p:cNvPicPr>
+                <a:picLocks noChangeAspect="1"/>
+              </p:cNvPicPr>
+              <p:nvPr/>
+            </p:nvPicPr>
+            <p:blipFill>
+              <a:blip r:embed="rId3">
+                <a:extLst>
+                  <a:ext uri="{28A0092B-C50C-407E-A947-70E740481C1C}">
+                    <a14:useLocalDpi xmlns:a14="http://schemas.microsoft.com/office/drawing/2010/main" val="0"/>
+                  </a:ext>
+                </a:extLst>
+              </a:blip>
+              <a:stretch>
+                <a:fillRect/>
+              </a:stretch>
+            </p:blipFill>
+            <p:spPr>
+              <a:xfrm>
+                <a:off x="1032608" y="492457"/>
+                <a:ext cx="5753100" cy="5080000"/>
+              </a:xfrm>
+              <a:prstGeom prst="rect">
+                <a:avLst/>
+              </a:prstGeom>
+            </p:spPr>
+          </p:pic>
+          <p:pic>
+            <p:nvPicPr>
+              <p:cNvPr id="6" name="Picture 5"/>
+              <p:cNvPicPr>
+                <a:picLocks noChangeAspect="1"/>
+              </p:cNvPicPr>
+              <p:nvPr/>
+            </p:nvPicPr>
+            <p:blipFill rotWithShape="1">
+              <a:blip r:embed="rId4">
+                <a:extLst>
+                  <a:ext uri="{28A0092B-C50C-407E-A947-70E740481C1C}">
+                    <a14:useLocalDpi xmlns:a14="http://schemas.microsoft.com/office/drawing/2010/main" val="0"/>
+                  </a:ext>
+                </a:extLst>
+              </a:blip>
+              <a:srcRect l="68876"/>
+              <a:stretch/>
+            </p:blipFill>
+            <p:spPr>
+              <a:xfrm>
+                <a:off x="5342809" y="5591639"/>
+                <a:ext cx="990383" cy="1060704"/>
+              </a:xfrm>
+              <a:prstGeom prst="rect">
+                <a:avLst/>
+              </a:prstGeom>
+            </p:spPr>
+          </p:pic>
+          <p:pic>
+            <p:nvPicPr>
+              <p:cNvPr id="7" name="Picture 6"/>
+              <p:cNvPicPr>
+                <a:picLocks noChangeAspect="1"/>
+              </p:cNvPicPr>
+              <p:nvPr/>
+            </p:nvPicPr>
+            <p:blipFill rotWithShape="1">
+              <a:blip r:embed="rId4">
+                <a:extLst>
+                  <a:ext uri="{28A0092B-C50C-407E-A947-70E740481C1C}">
+                    <a14:useLocalDpi xmlns:a14="http://schemas.microsoft.com/office/drawing/2010/main" val="0"/>
+                  </a:ext>
+                </a:extLst>
+              </a:blip>
+              <a:srcRect l="33873" r="35004"/>
+              <a:stretch/>
+            </p:blipFill>
+            <p:spPr>
+              <a:xfrm>
+                <a:off x="1458824" y="3741143"/>
+                <a:ext cx="987643" cy="1057769"/>
+              </a:xfrm>
+              <a:prstGeom prst="rect">
+                <a:avLst/>
+              </a:prstGeom>
+            </p:spPr>
+          </p:pic>
+          <p:pic>
+            <p:nvPicPr>
+              <p:cNvPr id="8" name="Picture 7"/>
+              <p:cNvPicPr>
+                <a:picLocks noChangeAspect="1"/>
+              </p:cNvPicPr>
+              <p:nvPr/>
+            </p:nvPicPr>
+            <p:blipFill rotWithShape="1">
+              <a:blip r:embed="rId4">
+                <a:extLst>
+                  <a:ext uri="{28A0092B-C50C-407E-A947-70E740481C1C}">
+                    <a14:useLocalDpi xmlns:a14="http://schemas.microsoft.com/office/drawing/2010/main" val="0"/>
+                  </a:ext>
+                </a:extLst>
+              </a:blip>
+              <a:srcRect r="68876"/>
+              <a:stretch/>
+            </p:blipFill>
+            <p:spPr>
+              <a:xfrm>
+                <a:off x="3056809" y="5591639"/>
+                <a:ext cx="990383" cy="1060704"/>
+              </a:xfrm>
+              <a:prstGeom prst="rect">
+                <a:avLst/>
+              </a:prstGeom>
+            </p:spPr>
+          </p:pic>
+        </p:grpSp>
       </p:grpSp>
     </p:spTree>
     <p:extLst>
       <p:ext uri="{BB962C8B-B14F-4D97-AF65-F5344CB8AC3E}">
-        <p14:creationId xmlns:p14="http://schemas.microsoft.com/office/powerpoint/2010/main" val="1759434061"/>
-      </p:ext>
-    </p:extLst>
-  </p:cSld>
-  <p:clrMapOvr>
-    <a:masterClrMapping/>
-  </p:clrMapOvr>
-</p:sld>
-</file>
-
-<file path=ppt/slides/slide8.xml><?xml version="1.0" encoding="utf-8"?>
-<p:sld xmlns:a="http://schemas.openxmlformats.org/drawingml/2006/main" xmlns:r="http://schemas.openxmlformats.org/officeDocument/2006/relationships" xmlns:p="http://schemas.openxmlformats.org/presentationml/2006/main">
-  <p:cSld>
-    <p:spTree>
-      <p:nvGrpSpPr>
-        <p:cNvPr id="1" name=""/>
-        <p:cNvGrpSpPr/>
-        <p:nvPr/>
-      </p:nvGrpSpPr>
-      <p:grpSpPr>
-        <a:xfrm>
-          <a:off x="0" y="0"/>
-          <a:ext cx="0" cy="0"/>
-          <a:chOff x="0" y="0"/>
-          <a:chExt cx="0" cy="0"/>
-        </a:xfrm>
-      </p:grpSpPr>
-      <p:pic>
-        <p:nvPicPr>
-          <p:cNvPr id="4" name="Picture 3"/>
-          <p:cNvPicPr>
-            <a:picLocks noChangeAspect="1"/>
-          </p:cNvPicPr>
-          <p:nvPr/>
-        </p:nvPicPr>
-        <p:blipFill>
-          <a:blip r:embed="rId2">
-            <a:extLst>
-              <a:ext uri="{28A0092B-C50C-407E-A947-70E740481C1C}">
-                <a14:useLocalDpi xmlns:a14="http://schemas.microsoft.com/office/drawing/2010/main" val="0"/>
-              </a:ext>
-            </a:extLst>
-          </a:blip>
-          <a:stretch>
-            <a:fillRect/>
-          </a:stretch>
-        </p:blipFill>
-        <p:spPr>
-          <a:xfrm>
-            <a:off x="3759200" y="1828800"/>
-            <a:ext cx="4660900" cy="3187700"/>
-          </a:xfrm>
-          <a:prstGeom prst="rect">
-            <a:avLst/>
-          </a:prstGeom>
-        </p:spPr>
-      </p:pic>
-    </p:spTree>
-    <p:extLst>
-      <p:ext uri="{BB962C8B-B14F-4D97-AF65-F5344CB8AC3E}">
-        <p14:creationId xmlns:p14="http://schemas.microsoft.com/office/powerpoint/2010/main" val="1165698673"/>
-      </p:ext>
-    </p:extLst>
-  </p:cSld>
-  <p:clrMapOvr>
-    <a:masterClrMapping/>
-  </p:clrMapOvr>
-</p:sld>
-</file>
-
-<file path=ppt/slides/slide9.xml><?xml version="1.0" encoding="utf-8"?>
-<p:sld xmlns:a="http://schemas.openxmlformats.org/drawingml/2006/main" xmlns:r="http://schemas.openxmlformats.org/officeDocument/2006/relationships" xmlns:p="http://schemas.openxmlformats.org/presentationml/2006/main">
-  <p:cSld>
-    <p:spTree>
-      <p:nvGrpSpPr>
-        <p:cNvPr id="1" name=""/>
-        <p:cNvGrpSpPr/>
-        <p:nvPr/>
-      </p:nvGrpSpPr>
-      <p:grpSpPr>
-        <a:xfrm>
-          <a:off x="0" y="0"/>
-          <a:ext cx="0" cy="0"/>
-          <a:chOff x="0" y="0"/>
-          <a:chExt cx="0" cy="0"/>
-        </a:xfrm>
-      </p:grpSpPr>
-    </p:spTree>
-    <p:extLst>
-      <p:ext uri="{BB962C8B-B14F-4D97-AF65-F5344CB8AC3E}">
-        <p14:creationId xmlns:p14="http://schemas.microsoft.com/office/powerpoint/2010/main" val="1437185423"/>
+        <p14:creationId xmlns:p14="http://schemas.microsoft.com/office/powerpoint/2010/main" val="239750048"/>
       </p:ext>
     </p:extLst>
   </p:cSld>

</xml_diff>

<commit_message>
Updated DT to have root node with explanation contained in blog
</commit_message>
<xml_diff>
--- a/Sklearn/DecisionTrees/powerpoint/DecisionComparison.pptx
+++ b/Sklearn/DecisionTrees/powerpoint/DecisionComparison.pptx
@@ -253,7 +253,7 @@
           <a:p>
             <a:fld id="{B66C5E5C-AFE9-2848-A01D-417298715EDA}" type="datetimeFigureOut">
               <a:rPr lang="en-US" smtClean="0"/>
-              <a:t>9/29/18</a:t>
+              <a:t>9/30/18</a:t>
             </a:fld>
             <a:endParaRPr lang="en-US"/>
           </a:p>
@@ -423,7 +423,7 @@
           <a:p>
             <a:fld id="{B66C5E5C-AFE9-2848-A01D-417298715EDA}" type="datetimeFigureOut">
               <a:rPr lang="en-US" smtClean="0"/>
-              <a:t>9/29/18</a:t>
+              <a:t>9/30/18</a:t>
             </a:fld>
             <a:endParaRPr lang="en-US"/>
           </a:p>
@@ -603,7 +603,7 @@
           <a:p>
             <a:fld id="{B66C5E5C-AFE9-2848-A01D-417298715EDA}" type="datetimeFigureOut">
               <a:rPr lang="en-US" smtClean="0"/>
-              <a:t>9/29/18</a:t>
+              <a:t>9/30/18</a:t>
             </a:fld>
             <a:endParaRPr lang="en-US"/>
           </a:p>
@@ -773,7 +773,7 @@
           <a:p>
             <a:fld id="{B66C5E5C-AFE9-2848-A01D-417298715EDA}" type="datetimeFigureOut">
               <a:rPr lang="en-US" smtClean="0"/>
-              <a:t>9/29/18</a:t>
+              <a:t>9/30/18</a:t>
             </a:fld>
             <a:endParaRPr lang="en-US"/>
           </a:p>
@@ -1019,7 +1019,7 @@
           <a:p>
             <a:fld id="{B66C5E5C-AFE9-2848-A01D-417298715EDA}" type="datetimeFigureOut">
               <a:rPr lang="en-US" smtClean="0"/>
-              <a:t>9/29/18</a:t>
+              <a:t>9/30/18</a:t>
             </a:fld>
             <a:endParaRPr lang="en-US"/>
           </a:p>
@@ -1251,7 +1251,7 @@
           <a:p>
             <a:fld id="{B66C5E5C-AFE9-2848-A01D-417298715EDA}" type="datetimeFigureOut">
               <a:rPr lang="en-US" smtClean="0"/>
-              <a:t>9/29/18</a:t>
+              <a:t>9/30/18</a:t>
             </a:fld>
             <a:endParaRPr lang="en-US"/>
           </a:p>
@@ -1618,7 +1618,7 @@
           <a:p>
             <a:fld id="{B66C5E5C-AFE9-2848-A01D-417298715EDA}" type="datetimeFigureOut">
               <a:rPr lang="en-US" smtClean="0"/>
-              <a:t>9/29/18</a:t>
+              <a:t>9/30/18</a:t>
             </a:fld>
             <a:endParaRPr lang="en-US"/>
           </a:p>
@@ -1736,7 +1736,7 @@
           <a:p>
             <a:fld id="{B66C5E5C-AFE9-2848-A01D-417298715EDA}" type="datetimeFigureOut">
               <a:rPr lang="en-US" smtClean="0"/>
-              <a:t>9/29/18</a:t>
+              <a:t>9/30/18</a:t>
             </a:fld>
             <a:endParaRPr lang="en-US"/>
           </a:p>
@@ -1831,7 +1831,7 @@
           <a:p>
             <a:fld id="{B66C5E5C-AFE9-2848-A01D-417298715EDA}" type="datetimeFigureOut">
               <a:rPr lang="en-US" smtClean="0"/>
-              <a:t>9/29/18</a:t>
+              <a:t>9/30/18</a:t>
             </a:fld>
             <a:endParaRPr lang="en-US"/>
           </a:p>
@@ -2108,7 +2108,7 @@
           <a:p>
             <a:fld id="{B66C5E5C-AFE9-2848-A01D-417298715EDA}" type="datetimeFigureOut">
               <a:rPr lang="en-US" smtClean="0"/>
-              <a:t>9/29/18</a:t>
+              <a:t>9/30/18</a:t>
             </a:fld>
             <a:endParaRPr lang="en-US"/>
           </a:p>
@@ -2361,7 +2361,7 @@
           <a:p>
             <a:fld id="{B66C5E5C-AFE9-2848-A01D-417298715EDA}" type="datetimeFigureOut">
               <a:rPr lang="en-US" smtClean="0"/>
-              <a:t>9/29/18</a:t>
+              <a:t>9/30/18</a:t>
             </a:fld>
             <a:endParaRPr lang="en-US"/>
           </a:p>
@@ -2574,7 +2574,7 @@
           <a:p>
             <a:fld id="{B66C5E5C-AFE9-2848-A01D-417298715EDA}" type="datetimeFigureOut">
               <a:rPr lang="en-US" smtClean="0"/>
-              <a:t>9/29/18</a:t>
+              <a:t>9/30/18</a:t>
             </a:fld>
             <a:endParaRPr lang="en-US"/>
           </a:p>
@@ -4208,388 +4208,309 @@
           <a:chExt cx="0" cy="0"/>
         </a:xfrm>
       </p:grpSpPr>
-      <p:sp>
-        <p:nvSpPr>
-          <p:cNvPr id="12" name="Rectangle 11"/>
-          <p:cNvSpPr/>
-          <p:nvPr/>
-        </p:nvSpPr>
-        <p:spPr>
-          <a:xfrm>
-            <a:off x="2192839" y="7185845"/>
-            <a:ext cx="6096000" cy="400110"/>
-          </a:xfrm>
-          <a:prstGeom prst="rect">
-            <a:avLst/>
-          </a:prstGeom>
-        </p:spPr>
-        <p:txBody>
-          <a:bodyPr>
-            <a:spAutoFit/>
-          </a:bodyPr>
-          <a:lstStyle/>
-          <a:p>
-            <a:r>
-              <a:rPr lang="en-US" sz="2000" dirty="0" smtClean="0"/>
-              <a:t>The prediction is </a:t>
-            </a:r>
-            <a:r>
-              <a:rPr lang="en-US" sz="2000" dirty="0" err="1" smtClean="0"/>
-              <a:t>virginica</a:t>
-            </a:r>
-            <a:r>
-              <a:rPr lang="en-US" sz="2000" dirty="0" smtClean="0"/>
-              <a:t> as it is the majority class. </a:t>
-            </a:r>
-            <a:endParaRPr lang="en-US" sz="2000" dirty="0"/>
-          </a:p>
-        </p:txBody>
-      </p:sp>
       <p:grpSp>
         <p:nvGrpSpPr>
-          <p:cNvPr id="5" name="Group 4"/>
+          <p:cNvPr id="13" name="Group 12"/>
           <p:cNvGrpSpPr/>
           <p:nvPr/>
         </p:nvGrpSpPr>
         <p:grpSpPr>
           <a:xfrm>
-            <a:off x="3246641" y="703472"/>
-            <a:ext cx="6695424" cy="4572269"/>
-            <a:chOff x="3246641" y="703472"/>
-            <a:chExt cx="6695424" cy="4572269"/>
+            <a:off x="3246120" y="704088"/>
+            <a:ext cx="6695945" cy="4571653"/>
+            <a:chOff x="3246120" y="704088"/>
+            <a:chExt cx="6695945" cy="4571653"/>
           </a:xfrm>
         </p:grpSpPr>
-        <p:grpSp>
-          <p:nvGrpSpPr>
-            <p:cNvPr id="4" name="Group 3"/>
-            <p:cNvGrpSpPr/>
+        <p:pic>
+          <p:nvPicPr>
+            <p:cNvPr id="2" name="Picture 1"/>
+            <p:cNvPicPr>
+              <a:picLocks noChangeAspect="1"/>
+            </p:cNvPicPr>
             <p:nvPr/>
-          </p:nvGrpSpPr>
-          <p:grpSpPr>
+          </p:nvPicPr>
+          <p:blipFill>
+            <a:blip r:embed="rId2">
+              <a:extLst>
+                <a:ext uri="{28A0092B-C50C-407E-A947-70E740481C1C}">
+                  <a14:useLocalDpi xmlns:a14="http://schemas.microsoft.com/office/drawing/2010/main" val="0"/>
+                </a:ext>
+              </a:extLst>
+            </a:blip>
+            <a:stretch>
+              <a:fillRect/>
+            </a:stretch>
+          </p:blipFill>
+          <p:spPr>
             <a:xfrm>
-              <a:off x="3246641" y="703472"/>
-              <a:ext cx="6304760" cy="4572269"/>
-              <a:chOff x="3246641" y="703472"/>
-              <a:chExt cx="6304760" cy="4572269"/>
+              <a:off x="3246120" y="704088"/>
+              <a:ext cx="4244059" cy="3794760"/>
             </a:xfrm>
-          </p:grpSpPr>
-          <p:pic>
-            <p:nvPicPr>
-              <p:cNvPr id="3" name="Picture 2"/>
-              <p:cNvPicPr>
-                <a:picLocks noChangeAspect="1"/>
-              </p:cNvPicPr>
-              <p:nvPr/>
-            </p:nvPicPr>
-            <p:blipFill>
-              <a:blip r:embed="rId2">
-                <a:extLst>
-                  <a:ext uri="{28A0092B-C50C-407E-A947-70E740481C1C}">
-                    <a14:useLocalDpi xmlns:a14="http://schemas.microsoft.com/office/drawing/2010/main" val="0"/>
-                  </a:ext>
-                </a:extLst>
-              </a:blip>
-              <a:stretch>
-                <a:fillRect/>
-              </a:stretch>
-            </p:blipFill>
-            <p:spPr>
-              <a:xfrm>
-                <a:off x="3246641" y="703472"/>
-                <a:ext cx="4242507" cy="3793372"/>
-              </a:xfrm>
-              <a:prstGeom prst="rect">
-                <a:avLst/>
-              </a:prstGeom>
-            </p:spPr>
-          </p:pic>
-          <p:pic>
-            <p:nvPicPr>
-              <p:cNvPr id="7" name="Picture 6"/>
-              <p:cNvPicPr>
-                <a:picLocks noChangeAspect="1"/>
-              </p:cNvPicPr>
-              <p:nvPr/>
-            </p:nvPicPr>
-            <p:blipFill rotWithShape="1">
-              <a:blip r:embed="rId3">
-                <a:extLst>
-                  <a:ext uri="{28A0092B-C50C-407E-A947-70E740481C1C}">
-                    <a14:useLocalDpi xmlns:a14="http://schemas.microsoft.com/office/drawing/2010/main" val="0"/>
-                  </a:ext>
-                </a:extLst>
-              </a:blip>
-              <a:srcRect l="68876"/>
-              <a:stretch/>
-            </p:blipFill>
-            <p:spPr>
-              <a:xfrm>
-                <a:off x="6345855" y="4484317"/>
-                <a:ext cx="738954" cy="791423"/>
-              </a:xfrm>
-              <a:prstGeom prst="rect">
-                <a:avLst/>
-              </a:prstGeom>
-            </p:spPr>
-          </p:pic>
-          <p:pic>
-            <p:nvPicPr>
-              <p:cNvPr id="8" name="Picture 7"/>
-              <p:cNvPicPr>
-                <a:picLocks noChangeAspect="1"/>
-              </p:cNvPicPr>
-              <p:nvPr/>
-            </p:nvPicPr>
-            <p:blipFill rotWithShape="1">
-              <a:blip r:embed="rId3">
-                <a:extLst>
-                  <a:ext uri="{28A0092B-C50C-407E-A947-70E740481C1C}">
-                    <a14:useLocalDpi xmlns:a14="http://schemas.microsoft.com/office/drawing/2010/main" val="0"/>
-                  </a:ext>
-                </a:extLst>
-              </a:blip>
-              <a:srcRect l="33873" r="35004"/>
-              <a:stretch/>
-            </p:blipFill>
-            <p:spPr>
-              <a:xfrm>
-                <a:off x="3564160" y="3125440"/>
-                <a:ext cx="736910" cy="789233"/>
-              </a:xfrm>
-              <a:prstGeom prst="rect">
-                <a:avLst/>
-              </a:prstGeom>
-            </p:spPr>
-          </p:pic>
-          <p:pic>
-            <p:nvPicPr>
-              <p:cNvPr id="9" name="Picture 8"/>
-              <p:cNvPicPr>
-                <a:picLocks noChangeAspect="1"/>
-              </p:cNvPicPr>
-              <p:nvPr/>
-            </p:nvPicPr>
-            <p:blipFill rotWithShape="1">
-              <a:blip r:embed="rId3">
-                <a:extLst>
-                  <a:ext uri="{28A0092B-C50C-407E-A947-70E740481C1C}">
-                    <a14:useLocalDpi xmlns:a14="http://schemas.microsoft.com/office/drawing/2010/main" val="0"/>
-                  </a:ext>
-                </a:extLst>
-              </a:blip>
-              <a:srcRect r="68876"/>
-              <a:stretch/>
-            </p:blipFill>
-            <p:spPr>
-              <a:xfrm>
-                <a:off x="4691570" y="4484318"/>
-                <a:ext cx="738954" cy="791423"/>
-              </a:xfrm>
-              <a:prstGeom prst="rect">
-                <a:avLst/>
-              </a:prstGeom>
-            </p:spPr>
-          </p:pic>
-          <p:sp>
-            <p:nvSpPr>
-              <p:cNvPr id="14" name="Rectangle 13"/>
-              <p:cNvSpPr/>
-              <p:nvPr/>
-            </p:nvSpPr>
-            <p:spPr>
-              <a:xfrm>
-                <a:off x="7494001" y="1283884"/>
-                <a:ext cx="137160" cy="137160"/>
-              </a:xfrm>
-              <a:prstGeom prst="rect">
-                <a:avLst/>
-              </a:prstGeom>
+            <a:prstGeom prst="rect">
+              <a:avLst/>
+            </a:prstGeom>
+          </p:spPr>
+        </p:pic>
+        <p:sp>
+          <p:nvSpPr>
+            <p:cNvPr id="17" name="TextBox 16"/>
+            <p:cNvSpPr txBox="1"/>
+            <p:nvPr/>
+          </p:nvSpPr>
+          <p:spPr>
+            <a:xfrm>
+              <a:off x="7741978" y="1545051"/>
+              <a:ext cx="1920240" cy="292388"/>
+            </a:xfrm>
+            <a:prstGeom prst="rect">
+              <a:avLst/>
+            </a:prstGeom>
+            <a:noFill/>
+          </p:spPr>
+          <p:txBody>
+            <a:bodyPr wrap="square" rtlCol="0">
+              <a:spAutoFit/>
+            </a:bodyPr>
+            <a:lstStyle/>
+            <a:p>
+              <a:r>
+                <a:rPr lang="en-US" sz="1300" dirty="0" smtClean="0"/>
+                <a:t>Decision </a:t>
+              </a:r>
+              <a:r>
+                <a:rPr lang="en-US" sz="1300" dirty="0" smtClean="0"/>
+                <a:t>Node </a:t>
+              </a:r>
+              <a:endParaRPr lang="en-US" sz="1300" dirty="0"/>
+            </a:p>
+          </p:txBody>
+        </p:sp>
+        <p:sp>
+          <p:nvSpPr>
+            <p:cNvPr id="16" name="TextBox 15"/>
+            <p:cNvSpPr txBox="1"/>
+            <p:nvPr/>
+          </p:nvSpPr>
+          <p:spPr>
+            <a:xfrm>
+              <a:off x="7739097" y="1228848"/>
+              <a:ext cx="1554480" cy="292388"/>
+            </a:xfrm>
+            <a:prstGeom prst="rect">
+              <a:avLst/>
+            </a:prstGeom>
+            <a:noFill/>
+          </p:spPr>
+          <p:txBody>
+            <a:bodyPr wrap="square" rtlCol="0">
+              <a:spAutoFit/>
+            </a:bodyPr>
+            <a:lstStyle/>
+            <a:p>
+              <a:r>
+                <a:rPr lang="en-US" sz="1300" dirty="0" smtClean="0"/>
+                <a:t>Root</a:t>
+              </a:r>
+              <a:r>
+                <a:rPr lang="en-US" sz="1300" dirty="0" smtClean="0"/>
+                <a:t> </a:t>
+              </a:r>
+              <a:r>
+                <a:rPr lang="en-US" sz="1300" dirty="0" smtClean="0"/>
+                <a:t>Node</a:t>
+              </a:r>
+              <a:endParaRPr lang="en-US" sz="1300" dirty="0"/>
+            </a:p>
+          </p:txBody>
+        </p:sp>
+        <p:pic>
+          <p:nvPicPr>
+            <p:cNvPr id="7" name="Picture 6"/>
+            <p:cNvPicPr>
+              <a:picLocks noChangeAspect="1"/>
+            </p:cNvPicPr>
+            <p:nvPr/>
+          </p:nvPicPr>
+          <p:blipFill rotWithShape="1">
+            <a:blip r:embed="rId3">
+              <a:extLst>
+                <a:ext uri="{28A0092B-C50C-407E-A947-70E740481C1C}">
+                  <a14:useLocalDpi xmlns:a14="http://schemas.microsoft.com/office/drawing/2010/main" val="0"/>
+                </a:ext>
+              </a:extLst>
+            </a:blip>
+            <a:srcRect l="68876"/>
+            <a:stretch/>
+          </p:blipFill>
+          <p:spPr>
+            <a:xfrm>
+              <a:off x="6345855" y="4484317"/>
+              <a:ext cx="738954" cy="791423"/>
+            </a:xfrm>
+            <a:prstGeom prst="rect">
+              <a:avLst/>
+            </a:prstGeom>
+          </p:spPr>
+        </p:pic>
+        <p:pic>
+          <p:nvPicPr>
+            <p:cNvPr id="8" name="Picture 7"/>
+            <p:cNvPicPr>
+              <a:picLocks noChangeAspect="1"/>
+            </p:cNvPicPr>
+            <p:nvPr/>
+          </p:nvPicPr>
+          <p:blipFill rotWithShape="1">
+            <a:blip r:embed="rId3">
+              <a:extLst>
+                <a:ext uri="{28A0092B-C50C-407E-A947-70E740481C1C}">
+                  <a14:useLocalDpi xmlns:a14="http://schemas.microsoft.com/office/drawing/2010/main" val="0"/>
+                </a:ext>
+              </a:extLst>
+            </a:blip>
+            <a:srcRect l="33873" r="35004"/>
+            <a:stretch/>
+          </p:blipFill>
+          <p:spPr>
+            <a:xfrm>
+              <a:off x="3564160" y="3125440"/>
+              <a:ext cx="736910" cy="789233"/>
+            </a:xfrm>
+            <a:prstGeom prst="rect">
+              <a:avLst/>
+            </a:prstGeom>
+          </p:spPr>
+        </p:pic>
+        <p:pic>
+          <p:nvPicPr>
+            <p:cNvPr id="9" name="Picture 8"/>
+            <p:cNvPicPr>
+              <a:picLocks noChangeAspect="1"/>
+            </p:cNvPicPr>
+            <p:nvPr/>
+          </p:nvPicPr>
+          <p:blipFill rotWithShape="1">
+            <a:blip r:embed="rId3">
+              <a:extLst>
+                <a:ext uri="{28A0092B-C50C-407E-A947-70E740481C1C}">
+                  <a14:useLocalDpi xmlns:a14="http://schemas.microsoft.com/office/drawing/2010/main" val="0"/>
+                </a:ext>
+              </a:extLst>
+            </a:blip>
+            <a:srcRect r="68876"/>
+            <a:stretch/>
+          </p:blipFill>
+          <p:spPr>
+            <a:xfrm>
+              <a:off x="4691570" y="4484318"/>
+              <a:ext cx="738954" cy="791423"/>
+            </a:xfrm>
+            <a:prstGeom prst="rect">
+              <a:avLst/>
+            </a:prstGeom>
+          </p:spPr>
+        </p:pic>
+        <p:sp>
+          <p:nvSpPr>
+            <p:cNvPr id="14" name="Rectangle 13"/>
+            <p:cNvSpPr/>
+            <p:nvPr/>
+          </p:nvSpPr>
+          <p:spPr>
+            <a:xfrm>
+              <a:off x="7494001" y="1622778"/>
+              <a:ext cx="137160" cy="137160"/>
+            </a:xfrm>
+            <a:prstGeom prst="rect">
+              <a:avLst/>
+            </a:prstGeom>
+            <a:solidFill>
+              <a:srgbClr val="0000FF"/>
+            </a:solidFill>
+            <a:ln>
               <a:solidFill>
-                <a:srgbClr val="0000FF"/>
+                <a:schemeClr val="tx1"/>
               </a:solidFill>
-            </p:spPr>
-            <p:style>
-              <a:lnRef idx="2">
-                <a:schemeClr val="accent1">
-                  <a:shade val="50000"/>
+            </a:ln>
+          </p:spPr>
+          <p:style>
+            <a:lnRef idx="2">
+              <a:schemeClr val="accent1">
+                <a:shade val="50000"/>
+              </a:schemeClr>
+            </a:lnRef>
+            <a:fillRef idx="1">
+              <a:schemeClr val="accent1"/>
+            </a:fillRef>
+            <a:effectRef idx="0">
+              <a:schemeClr val="accent1"/>
+            </a:effectRef>
+            <a:fontRef idx="minor">
+              <a:schemeClr val="lt1"/>
+            </a:fontRef>
+          </p:style>
+          <p:txBody>
+            <a:bodyPr rtlCol="0" anchor="ctr"/>
+            <a:lstStyle/>
+            <a:p>
+              <a:pPr algn="ctr"/>
+              <a:endParaRPr lang="en-US">
+                <a:solidFill>
+                  <a:srgbClr val="0000FF"/>
+                </a:solidFill>
+              </a:endParaRPr>
+            </a:p>
+          </p:txBody>
+        </p:sp>
+        <p:sp>
+          <p:nvSpPr>
+            <p:cNvPr id="18" name="Rectangle 17"/>
+            <p:cNvSpPr/>
+            <p:nvPr/>
+          </p:nvSpPr>
+          <p:spPr>
+            <a:xfrm>
+              <a:off x="7395419" y="1166867"/>
+              <a:ext cx="1999102" cy="1057044"/>
+            </a:xfrm>
+            <a:prstGeom prst="rect">
+              <a:avLst/>
+            </a:prstGeom>
+            <a:noFill/>
+            <a:ln w="6350">
+              <a:solidFill>
+                <a:schemeClr val="tx1">
+                  <a:alpha val="32000"/>
                 </a:schemeClr>
-              </a:lnRef>
-              <a:fillRef idx="1">
-                <a:schemeClr val="accent1"/>
-              </a:fillRef>
-              <a:effectRef idx="0">
-                <a:schemeClr val="accent1"/>
-              </a:effectRef>
-              <a:fontRef idx="minor">
-                <a:schemeClr val="lt1"/>
-              </a:fontRef>
-            </p:style>
-            <p:txBody>
-              <a:bodyPr rtlCol="0" anchor="ctr"/>
-              <a:lstStyle/>
-              <a:p>
-                <a:pPr algn="ctr"/>
-                <a:endParaRPr lang="en-US">
-                  <a:solidFill>
-                    <a:srgbClr val="0000FF"/>
-                  </a:solidFill>
-                </a:endParaRPr>
-              </a:p>
-            </p:txBody>
-          </p:sp>
-          <p:sp>
-            <p:nvSpPr>
-              <p:cNvPr id="15" name="Rectangle 14"/>
-              <p:cNvSpPr/>
-              <p:nvPr/>
-            </p:nvSpPr>
-            <p:spPr>
-              <a:xfrm>
-                <a:off x="7495873" y="1600087"/>
-                <a:ext cx="137160" cy="137160"/>
-              </a:xfrm>
-              <a:prstGeom prst="rect">
-                <a:avLst/>
-              </a:prstGeom>
-              <a:solidFill>
-                <a:srgbClr val="008000"/>
               </a:solidFill>
-            </p:spPr>
-            <p:style>
-              <a:lnRef idx="2">
-                <a:schemeClr val="accent1">
-                  <a:shade val="50000"/>
-                </a:schemeClr>
-              </a:lnRef>
-              <a:fillRef idx="1">
-                <a:schemeClr val="accent1"/>
-              </a:fillRef>
-              <a:effectRef idx="0">
-                <a:schemeClr val="accent1"/>
-              </a:effectRef>
-              <a:fontRef idx="minor">
-                <a:schemeClr val="lt1"/>
-              </a:fontRef>
-            </p:style>
-            <p:txBody>
-              <a:bodyPr rtlCol="0" anchor="ctr"/>
-              <a:lstStyle/>
-              <a:p>
-                <a:pPr algn="ctr"/>
-                <a:endParaRPr lang="en-US"/>
-              </a:p>
-            </p:txBody>
-          </p:sp>
-          <p:sp>
-            <p:nvSpPr>
-              <p:cNvPr id="16" name="TextBox 15"/>
-              <p:cNvSpPr txBox="1"/>
-              <p:nvPr/>
-            </p:nvSpPr>
-            <p:spPr>
-              <a:xfrm>
-                <a:off x="7568530" y="1206270"/>
-                <a:ext cx="1554480" cy="292388"/>
-              </a:xfrm>
-              <a:prstGeom prst="rect">
-                <a:avLst/>
-              </a:prstGeom>
-              <a:noFill/>
-            </p:spPr>
-            <p:txBody>
-              <a:bodyPr wrap="square" rtlCol="0">
-                <a:spAutoFit/>
-              </a:bodyPr>
-              <a:lstStyle/>
-              <a:p>
-                <a:pPr algn="ctr"/>
-                <a:r>
-                  <a:rPr lang="en-US" sz="1300" dirty="0" smtClean="0"/>
-                  <a:t>Decision Node</a:t>
-                </a:r>
-                <a:endParaRPr lang="en-US" sz="1300" dirty="0"/>
-              </a:p>
-            </p:txBody>
-          </p:sp>
-          <p:sp>
-            <p:nvSpPr>
-              <p:cNvPr id="17" name="TextBox 16"/>
-              <p:cNvSpPr txBox="1"/>
-              <p:nvPr/>
-            </p:nvSpPr>
-            <p:spPr>
-              <a:xfrm>
-                <a:off x="7631161" y="1522473"/>
-                <a:ext cx="1920240" cy="292388"/>
-              </a:xfrm>
-              <a:prstGeom prst="rect">
-                <a:avLst/>
-              </a:prstGeom>
-              <a:noFill/>
-            </p:spPr>
-            <p:txBody>
-              <a:bodyPr wrap="square" rtlCol="0">
-                <a:spAutoFit/>
-              </a:bodyPr>
-              <a:lstStyle/>
-              <a:p>
-                <a:r>
-                  <a:rPr lang="en-US" sz="1300" smtClean="0"/>
-                  <a:t>Leaf/Terminal Node </a:t>
-                </a:r>
-                <a:endParaRPr lang="en-US" sz="1300" dirty="0"/>
-              </a:p>
-            </p:txBody>
-          </p:sp>
-          <p:sp>
-            <p:nvSpPr>
-              <p:cNvPr id="18" name="Rectangle 17"/>
-              <p:cNvSpPr/>
-              <p:nvPr/>
-            </p:nvSpPr>
-            <p:spPr>
-              <a:xfrm>
-                <a:off x="7395419" y="1166867"/>
-                <a:ext cx="1999102" cy="712697"/>
-              </a:xfrm>
-              <a:prstGeom prst="rect">
-                <a:avLst/>
-              </a:prstGeom>
-              <a:noFill/>
-              <a:ln w="6350">
-                <a:solidFill>
-                  <a:schemeClr val="tx1">
-                    <a:alpha val="32000"/>
-                  </a:schemeClr>
-                </a:solidFill>
-              </a:ln>
-            </p:spPr>
-            <p:style>
-              <a:lnRef idx="2">
-                <a:schemeClr val="accent1">
-                  <a:shade val="50000"/>
-                </a:schemeClr>
-              </a:lnRef>
-              <a:fillRef idx="1">
-                <a:schemeClr val="accent1"/>
-              </a:fillRef>
-              <a:effectRef idx="0">
-                <a:schemeClr val="accent1"/>
-              </a:effectRef>
-              <a:fontRef idx="minor">
-                <a:schemeClr val="lt1"/>
-              </a:fontRef>
-            </p:style>
-            <p:txBody>
-              <a:bodyPr rtlCol="0" anchor="ctr"/>
-              <a:lstStyle/>
-              <a:p>
-                <a:pPr algn="ctr"/>
-                <a:endParaRPr lang="en-US"/>
-              </a:p>
-            </p:txBody>
-          </p:sp>
-        </p:grpSp>
+            </a:ln>
+          </p:spPr>
+          <p:style>
+            <a:lnRef idx="2">
+              <a:schemeClr val="accent1">
+                <a:shade val="50000"/>
+              </a:schemeClr>
+            </a:lnRef>
+            <a:fillRef idx="1">
+              <a:schemeClr val="accent1"/>
+            </a:fillRef>
+            <a:effectRef idx="0">
+              <a:schemeClr val="accent1"/>
+            </a:effectRef>
+            <a:fontRef idx="minor">
+              <a:schemeClr val="lt1"/>
+            </a:fontRef>
+          </p:style>
+          <p:txBody>
+            <a:bodyPr rtlCol="0" anchor="ctr"/>
+            <a:lstStyle/>
+            <a:p>
+              <a:pPr algn="ctr"/>
+              <a:endParaRPr lang="en-US"/>
+            </a:p>
+          </p:txBody>
+        </p:sp>
         <p:sp>
           <p:nvSpPr>
             <p:cNvPr id="19" name="Rectangle 18"/>
@@ -4617,6 +4538,136 @@
                 <a:t>Type of Node</a:t>
               </a:r>
               <a:endParaRPr lang="en-US" sz="2000" dirty="0"/>
+            </a:p>
+          </p:txBody>
+        </p:sp>
+        <p:sp>
+          <p:nvSpPr>
+            <p:cNvPr id="20" name="Rectangle 19"/>
+            <p:cNvSpPr/>
+            <p:nvPr/>
+          </p:nvSpPr>
+          <p:spPr>
+            <a:xfrm>
+              <a:off x="7498080" y="1942818"/>
+              <a:ext cx="137160" cy="137160"/>
+            </a:xfrm>
+            <a:prstGeom prst="rect">
+              <a:avLst/>
+            </a:prstGeom>
+            <a:solidFill>
+              <a:srgbClr val="008000"/>
+            </a:solidFill>
+            <a:ln>
+              <a:solidFill>
+                <a:schemeClr val="tx1"/>
+              </a:solidFill>
+            </a:ln>
+          </p:spPr>
+          <p:style>
+            <a:lnRef idx="2">
+              <a:schemeClr val="accent1">
+                <a:shade val="50000"/>
+              </a:schemeClr>
+            </a:lnRef>
+            <a:fillRef idx="1">
+              <a:schemeClr val="accent1"/>
+            </a:fillRef>
+            <a:effectRef idx="0">
+              <a:schemeClr val="accent1"/>
+            </a:effectRef>
+            <a:fontRef idx="minor">
+              <a:schemeClr val="lt1"/>
+            </a:fontRef>
+          </p:style>
+          <p:txBody>
+            <a:bodyPr rtlCol="0" anchor="ctr"/>
+            <a:lstStyle/>
+            <a:p>
+              <a:pPr algn="ctr"/>
+              <a:endParaRPr lang="en-US"/>
+            </a:p>
+          </p:txBody>
+        </p:sp>
+        <p:sp>
+          <p:nvSpPr>
+            <p:cNvPr id="21" name="TextBox 20"/>
+            <p:cNvSpPr txBox="1"/>
+            <p:nvPr/>
+          </p:nvSpPr>
+          <p:spPr>
+            <a:xfrm>
+              <a:off x="7739097" y="1868953"/>
+              <a:ext cx="1920240" cy="292388"/>
+            </a:xfrm>
+            <a:prstGeom prst="rect">
+              <a:avLst/>
+            </a:prstGeom>
+            <a:noFill/>
+          </p:spPr>
+          <p:txBody>
+            <a:bodyPr wrap="square" rtlCol="0">
+              <a:spAutoFit/>
+            </a:bodyPr>
+            <a:lstStyle/>
+            <a:p>
+              <a:r>
+                <a:rPr lang="en-US" sz="1300" dirty="0" smtClean="0"/>
+                <a:t>Leaf/Terminal Node </a:t>
+              </a:r>
+              <a:endParaRPr lang="en-US" sz="1300" dirty="0"/>
+            </a:p>
+          </p:txBody>
+        </p:sp>
+        <p:sp>
+          <p:nvSpPr>
+            <p:cNvPr id="23" name="Rectangle 22"/>
+            <p:cNvSpPr/>
+            <p:nvPr/>
+          </p:nvSpPr>
+          <p:spPr>
+            <a:xfrm>
+              <a:off x="7498080" y="1302738"/>
+              <a:ext cx="137160" cy="137160"/>
+            </a:xfrm>
+            <a:prstGeom prst="rect">
+              <a:avLst/>
+            </a:prstGeom>
+            <a:solidFill>
+              <a:srgbClr val="FF8C00"/>
+            </a:solidFill>
+            <a:ln>
+              <a:solidFill>
+                <a:schemeClr val="tx1"/>
+              </a:solidFill>
+            </a:ln>
+          </p:spPr>
+          <p:style>
+            <a:lnRef idx="2">
+              <a:schemeClr val="accent1">
+                <a:shade val="50000"/>
+              </a:schemeClr>
+            </a:lnRef>
+            <a:fillRef idx="1">
+              <a:schemeClr val="accent1"/>
+            </a:fillRef>
+            <a:effectRef idx="0">
+              <a:schemeClr val="accent1"/>
+            </a:effectRef>
+            <a:fontRef idx="minor">
+              <a:schemeClr val="lt1"/>
+            </a:fontRef>
+          </p:style>
+          <p:txBody>
+            <a:bodyPr rtlCol="0" anchor="ctr"/>
+            <a:lstStyle/>
+            <a:p>
+              <a:pPr algn="ctr"/>
+              <a:endParaRPr lang="en-US">
+                <a:solidFill>
+                  <a:srgbClr val="0000FF"/>
+                </a:solidFill>
+              </a:endParaRPr>
             </a:p>
           </p:txBody>
         </p:sp>

</xml_diff>

<commit_message>
Updated DT example to have a root node
</commit_message>
<xml_diff>
--- a/Sklearn/DecisionTrees/powerpoint/DecisionComparison.pptx
+++ b/Sklearn/DecisionTrees/powerpoint/DecisionComparison.pptx
@@ -253,7 +253,7 @@
           <a:p>
             <a:fld id="{B66C5E5C-AFE9-2848-A01D-417298715EDA}" type="datetimeFigureOut">
               <a:rPr lang="en-US" smtClean="0"/>
-              <a:t>9/30/18</a:t>
+              <a:t>10/1/18</a:t>
             </a:fld>
             <a:endParaRPr lang="en-US"/>
           </a:p>
@@ -423,7 +423,7 @@
           <a:p>
             <a:fld id="{B66C5E5C-AFE9-2848-A01D-417298715EDA}" type="datetimeFigureOut">
               <a:rPr lang="en-US" smtClean="0"/>
-              <a:t>9/30/18</a:t>
+              <a:t>10/1/18</a:t>
             </a:fld>
             <a:endParaRPr lang="en-US"/>
           </a:p>
@@ -603,7 +603,7 @@
           <a:p>
             <a:fld id="{B66C5E5C-AFE9-2848-A01D-417298715EDA}" type="datetimeFigureOut">
               <a:rPr lang="en-US" smtClean="0"/>
-              <a:t>9/30/18</a:t>
+              <a:t>10/1/18</a:t>
             </a:fld>
             <a:endParaRPr lang="en-US"/>
           </a:p>
@@ -773,7 +773,7 @@
           <a:p>
             <a:fld id="{B66C5E5C-AFE9-2848-A01D-417298715EDA}" type="datetimeFigureOut">
               <a:rPr lang="en-US" smtClean="0"/>
-              <a:t>9/30/18</a:t>
+              <a:t>10/1/18</a:t>
             </a:fld>
             <a:endParaRPr lang="en-US"/>
           </a:p>
@@ -1019,7 +1019,7 @@
           <a:p>
             <a:fld id="{B66C5E5C-AFE9-2848-A01D-417298715EDA}" type="datetimeFigureOut">
               <a:rPr lang="en-US" smtClean="0"/>
-              <a:t>9/30/18</a:t>
+              <a:t>10/1/18</a:t>
             </a:fld>
             <a:endParaRPr lang="en-US"/>
           </a:p>
@@ -1251,7 +1251,7 @@
           <a:p>
             <a:fld id="{B66C5E5C-AFE9-2848-A01D-417298715EDA}" type="datetimeFigureOut">
               <a:rPr lang="en-US" smtClean="0"/>
-              <a:t>9/30/18</a:t>
+              <a:t>10/1/18</a:t>
             </a:fld>
             <a:endParaRPr lang="en-US"/>
           </a:p>
@@ -1618,7 +1618,7 @@
           <a:p>
             <a:fld id="{B66C5E5C-AFE9-2848-A01D-417298715EDA}" type="datetimeFigureOut">
               <a:rPr lang="en-US" smtClean="0"/>
-              <a:t>9/30/18</a:t>
+              <a:t>10/1/18</a:t>
             </a:fld>
             <a:endParaRPr lang="en-US"/>
           </a:p>
@@ -1736,7 +1736,7 @@
           <a:p>
             <a:fld id="{B66C5E5C-AFE9-2848-A01D-417298715EDA}" type="datetimeFigureOut">
               <a:rPr lang="en-US" smtClean="0"/>
-              <a:t>9/30/18</a:t>
+              <a:t>10/1/18</a:t>
             </a:fld>
             <a:endParaRPr lang="en-US"/>
           </a:p>
@@ -1831,7 +1831,7 @@
           <a:p>
             <a:fld id="{B66C5E5C-AFE9-2848-A01D-417298715EDA}" type="datetimeFigureOut">
               <a:rPr lang="en-US" smtClean="0"/>
-              <a:t>9/30/18</a:t>
+              <a:t>10/1/18</a:t>
             </a:fld>
             <a:endParaRPr lang="en-US"/>
           </a:p>
@@ -2108,7 +2108,7 @@
           <a:p>
             <a:fld id="{B66C5E5C-AFE9-2848-A01D-417298715EDA}" type="datetimeFigureOut">
               <a:rPr lang="en-US" smtClean="0"/>
-              <a:t>9/30/18</a:t>
+              <a:t>10/1/18</a:t>
             </a:fld>
             <a:endParaRPr lang="en-US"/>
           </a:p>
@@ -2361,7 +2361,7 @@
           <a:p>
             <a:fld id="{B66C5E5C-AFE9-2848-A01D-417298715EDA}" type="datetimeFigureOut">
               <a:rPr lang="en-US" smtClean="0"/>
-              <a:t>9/30/18</a:t>
+              <a:t>10/1/18</a:t>
             </a:fld>
             <a:endParaRPr lang="en-US"/>
           </a:p>
@@ -2574,7 +2574,7 @@
           <a:p>
             <a:fld id="{B66C5E5C-AFE9-2848-A01D-417298715EDA}" type="datetimeFigureOut">
               <a:rPr lang="en-US" smtClean="0"/>
-              <a:t>9/30/18</a:t>
+              <a:t>10/1/18</a:t>
             </a:fld>
             <a:endParaRPr lang="en-US"/>
           </a:p>
@@ -4208,23 +4208,490 @@
           <a:chExt cx="0" cy="0"/>
         </a:xfrm>
       </p:grpSpPr>
+      <p:pic>
+        <p:nvPicPr>
+          <p:cNvPr id="24" name="Picture 23"/>
+          <p:cNvPicPr>
+            <a:picLocks noChangeAspect="1"/>
+          </p:cNvPicPr>
+          <p:nvPr/>
+        </p:nvPicPr>
+        <p:blipFill>
+          <a:blip r:embed="rId2">
+            <a:extLst>
+              <a:ext uri="{28A0092B-C50C-407E-A947-70E740481C1C}">
+                <a14:useLocalDpi xmlns:a14="http://schemas.microsoft.com/office/drawing/2010/main" val="0"/>
+              </a:ext>
+            </a:extLst>
+          </a:blip>
+          <a:stretch>
+            <a:fillRect/>
+          </a:stretch>
+        </p:blipFill>
+        <p:spPr>
+          <a:xfrm>
+            <a:off x="3246120" y="704088"/>
+            <a:ext cx="4244059" cy="3794760"/>
+          </a:xfrm>
+          <a:prstGeom prst="rect">
+            <a:avLst/>
+          </a:prstGeom>
+        </p:spPr>
+      </p:pic>
+      <p:sp>
+        <p:nvSpPr>
+          <p:cNvPr id="17" name="TextBox 16"/>
+          <p:cNvSpPr txBox="1"/>
+          <p:nvPr/>
+        </p:nvSpPr>
+        <p:spPr>
+          <a:xfrm>
+            <a:off x="7735824" y="1545051"/>
+            <a:ext cx="1920240" cy="292388"/>
+          </a:xfrm>
+          <a:prstGeom prst="rect">
+            <a:avLst/>
+          </a:prstGeom>
+          <a:noFill/>
+        </p:spPr>
+        <p:txBody>
+          <a:bodyPr wrap="square" rtlCol="0">
+            <a:spAutoFit/>
+          </a:bodyPr>
+          <a:lstStyle/>
+          <a:p>
+            <a:r>
+              <a:rPr lang="en-US" sz="1300" dirty="0" smtClean="0"/>
+              <a:t>Decision Node </a:t>
+            </a:r>
+            <a:endParaRPr lang="en-US" sz="1300" dirty="0"/>
+          </a:p>
+        </p:txBody>
+      </p:sp>
+      <p:sp>
+        <p:nvSpPr>
+          <p:cNvPr id="16" name="TextBox 15"/>
+          <p:cNvSpPr txBox="1"/>
+          <p:nvPr/>
+        </p:nvSpPr>
+        <p:spPr>
+          <a:xfrm>
+            <a:off x="7739097" y="1228848"/>
+            <a:ext cx="1554480" cy="292388"/>
+          </a:xfrm>
+          <a:prstGeom prst="rect">
+            <a:avLst/>
+          </a:prstGeom>
+          <a:noFill/>
+        </p:spPr>
+        <p:txBody>
+          <a:bodyPr wrap="square" rtlCol="0">
+            <a:spAutoFit/>
+          </a:bodyPr>
+          <a:lstStyle/>
+          <a:p>
+            <a:r>
+              <a:rPr lang="en-US" sz="1300" dirty="0" smtClean="0"/>
+              <a:t>Root Node</a:t>
+            </a:r>
+            <a:endParaRPr lang="en-US" sz="1300" dirty="0"/>
+          </a:p>
+        </p:txBody>
+      </p:sp>
+      <p:pic>
+        <p:nvPicPr>
+          <p:cNvPr id="7" name="Picture 6"/>
+          <p:cNvPicPr>
+            <a:picLocks noChangeAspect="1"/>
+          </p:cNvPicPr>
+          <p:nvPr/>
+        </p:nvPicPr>
+        <p:blipFill rotWithShape="1">
+          <a:blip r:embed="rId3">
+            <a:extLst>
+              <a:ext uri="{28A0092B-C50C-407E-A947-70E740481C1C}">
+                <a14:useLocalDpi xmlns:a14="http://schemas.microsoft.com/office/drawing/2010/main" val="0"/>
+              </a:ext>
+            </a:extLst>
+          </a:blip>
+          <a:srcRect l="68876"/>
+          <a:stretch/>
+        </p:blipFill>
+        <p:spPr>
+          <a:xfrm>
+            <a:off x="6345855" y="4484317"/>
+            <a:ext cx="738954" cy="791423"/>
+          </a:xfrm>
+          <a:prstGeom prst="rect">
+            <a:avLst/>
+          </a:prstGeom>
+        </p:spPr>
+      </p:pic>
+      <p:pic>
+        <p:nvPicPr>
+          <p:cNvPr id="8" name="Picture 7"/>
+          <p:cNvPicPr>
+            <a:picLocks noChangeAspect="1"/>
+          </p:cNvPicPr>
+          <p:nvPr/>
+        </p:nvPicPr>
+        <p:blipFill rotWithShape="1">
+          <a:blip r:embed="rId3">
+            <a:extLst>
+              <a:ext uri="{28A0092B-C50C-407E-A947-70E740481C1C}">
+                <a14:useLocalDpi xmlns:a14="http://schemas.microsoft.com/office/drawing/2010/main" val="0"/>
+              </a:ext>
+            </a:extLst>
+          </a:blip>
+          <a:srcRect l="33873" r="35004"/>
+          <a:stretch/>
+        </p:blipFill>
+        <p:spPr>
+          <a:xfrm>
+            <a:off x="3564160" y="3125440"/>
+            <a:ext cx="736910" cy="789233"/>
+          </a:xfrm>
+          <a:prstGeom prst="rect">
+            <a:avLst/>
+          </a:prstGeom>
+        </p:spPr>
+      </p:pic>
+      <p:pic>
+        <p:nvPicPr>
+          <p:cNvPr id="9" name="Picture 8"/>
+          <p:cNvPicPr>
+            <a:picLocks noChangeAspect="1"/>
+          </p:cNvPicPr>
+          <p:nvPr/>
+        </p:nvPicPr>
+        <p:blipFill rotWithShape="1">
+          <a:blip r:embed="rId3">
+            <a:extLst>
+              <a:ext uri="{28A0092B-C50C-407E-A947-70E740481C1C}">
+                <a14:useLocalDpi xmlns:a14="http://schemas.microsoft.com/office/drawing/2010/main" val="0"/>
+              </a:ext>
+            </a:extLst>
+          </a:blip>
+          <a:srcRect r="68876"/>
+          <a:stretch/>
+        </p:blipFill>
+        <p:spPr>
+          <a:xfrm>
+            <a:off x="4691570" y="4484318"/>
+            <a:ext cx="738954" cy="791423"/>
+          </a:xfrm>
+          <a:prstGeom prst="rect">
+            <a:avLst/>
+          </a:prstGeom>
+        </p:spPr>
+      </p:pic>
+      <p:sp>
+        <p:nvSpPr>
+          <p:cNvPr id="14" name="Rectangle 13"/>
+          <p:cNvSpPr/>
+          <p:nvPr/>
+        </p:nvSpPr>
+        <p:spPr>
+          <a:xfrm>
+            <a:off x="7494001" y="1622778"/>
+            <a:ext cx="137160" cy="137160"/>
+          </a:xfrm>
+          <a:prstGeom prst="rect">
+            <a:avLst/>
+          </a:prstGeom>
+          <a:solidFill>
+            <a:srgbClr val="0000FF"/>
+          </a:solidFill>
+          <a:ln>
+            <a:solidFill>
+              <a:schemeClr val="tx1"/>
+            </a:solidFill>
+          </a:ln>
+        </p:spPr>
+        <p:style>
+          <a:lnRef idx="2">
+            <a:schemeClr val="accent1">
+              <a:shade val="50000"/>
+            </a:schemeClr>
+          </a:lnRef>
+          <a:fillRef idx="1">
+            <a:schemeClr val="accent1"/>
+          </a:fillRef>
+          <a:effectRef idx="0">
+            <a:schemeClr val="accent1"/>
+          </a:effectRef>
+          <a:fontRef idx="minor">
+            <a:schemeClr val="lt1"/>
+          </a:fontRef>
+        </p:style>
+        <p:txBody>
+          <a:bodyPr rtlCol="0" anchor="ctr"/>
+          <a:lstStyle/>
+          <a:p>
+            <a:pPr algn="ctr"/>
+            <a:endParaRPr lang="en-US">
+              <a:solidFill>
+                <a:srgbClr val="0000FF"/>
+              </a:solidFill>
+            </a:endParaRPr>
+          </a:p>
+        </p:txBody>
+      </p:sp>
+      <p:sp>
+        <p:nvSpPr>
+          <p:cNvPr id="18" name="Rectangle 17"/>
+          <p:cNvSpPr/>
+          <p:nvPr/>
+        </p:nvSpPr>
+        <p:spPr>
+          <a:xfrm>
+            <a:off x="7395419" y="1166867"/>
+            <a:ext cx="1999102" cy="1057044"/>
+          </a:xfrm>
+          <a:prstGeom prst="rect">
+            <a:avLst/>
+          </a:prstGeom>
+          <a:noFill/>
+          <a:ln w="6350">
+            <a:solidFill>
+              <a:schemeClr val="tx1">
+                <a:alpha val="32000"/>
+              </a:schemeClr>
+            </a:solidFill>
+          </a:ln>
+        </p:spPr>
+        <p:style>
+          <a:lnRef idx="2">
+            <a:schemeClr val="accent1">
+              <a:shade val="50000"/>
+            </a:schemeClr>
+          </a:lnRef>
+          <a:fillRef idx="1">
+            <a:schemeClr val="accent1"/>
+          </a:fillRef>
+          <a:effectRef idx="0">
+            <a:schemeClr val="accent1"/>
+          </a:effectRef>
+          <a:fontRef idx="minor">
+            <a:schemeClr val="lt1"/>
+          </a:fontRef>
+        </p:style>
+        <p:txBody>
+          <a:bodyPr rtlCol="0" anchor="ctr"/>
+          <a:lstStyle/>
+          <a:p>
+            <a:pPr algn="ctr"/>
+            <a:endParaRPr lang="en-US"/>
+          </a:p>
+        </p:txBody>
+      </p:sp>
+      <p:sp>
+        <p:nvSpPr>
+          <p:cNvPr id="19" name="Rectangle 18"/>
+          <p:cNvSpPr/>
+          <p:nvPr/>
+        </p:nvSpPr>
+        <p:spPr>
+          <a:xfrm>
+            <a:off x="6847874" y="741457"/>
+            <a:ext cx="3094191" cy="400110"/>
+          </a:xfrm>
+          <a:prstGeom prst="rect">
+            <a:avLst/>
+          </a:prstGeom>
+        </p:spPr>
+        <p:txBody>
+          <a:bodyPr wrap="square">
+            <a:spAutoFit/>
+          </a:bodyPr>
+          <a:lstStyle/>
+          <a:p>
+            <a:pPr algn="ctr"/>
+            <a:r>
+              <a:rPr lang="en-US" sz="2000" dirty="0" smtClean="0"/>
+              <a:t>Type of Node</a:t>
+            </a:r>
+            <a:endParaRPr lang="en-US" sz="2000" dirty="0"/>
+          </a:p>
+        </p:txBody>
+      </p:sp>
+      <p:sp>
+        <p:nvSpPr>
+          <p:cNvPr id="20" name="Rectangle 19"/>
+          <p:cNvSpPr/>
+          <p:nvPr/>
+        </p:nvSpPr>
+        <p:spPr>
+          <a:xfrm>
+            <a:off x="7498080" y="1942818"/>
+            <a:ext cx="137160" cy="137160"/>
+          </a:xfrm>
+          <a:prstGeom prst="rect">
+            <a:avLst/>
+          </a:prstGeom>
+          <a:solidFill>
+            <a:srgbClr val="008000"/>
+          </a:solidFill>
+          <a:ln>
+            <a:solidFill>
+              <a:schemeClr val="tx1"/>
+            </a:solidFill>
+          </a:ln>
+        </p:spPr>
+        <p:style>
+          <a:lnRef idx="2">
+            <a:schemeClr val="accent1">
+              <a:shade val="50000"/>
+            </a:schemeClr>
+          </a:lnRef>
+          <a:fillRef idx="1">
+            <a:schemeClr val="accent1"/>
+          </a:fillRef>
+          <a:effectRef idx="0">
+            <a:schemeClr val="accent1"/>
+          </a:effectRef>
+          <a:fontRef idx="minor">
+            <a:schemeClr val="lt1"/>
+          </a:fontRef>
+        </p:style>
+        <p:txBody>
+          <a:bodyPr rtlCol="0" anchor="ctr"/>
+          <a:lstStyle/>
+          <a:p>
+            <a:pPr algn="ctr"/>
+            <a:endParaRPr lang="en-US"/>
+          </a:p>
+        </p:txBody>
+      </p:sp>
+      <p:sp>
+        <p:nvSpPr>
+          <p:cNvPr id="21" name="TextBox 20"/>
+          <p:cNvSpPr txBox="1"/>
+          <p:nvPr/>
+        </p:nvSpPr>
+        <p:spPr>
+          <a:xfrm>
+            <a:off x="7739097" y="1868953"/>
+            <a:ext cx="1920240" cy="292388"/>
+          </a:xfrm>
+          <a:prstGeom prst="rect">
+            <a:avLst/>
+          </a:prstGeom>
+          <a:noFill/>
+        </p:spPr>
+        <p:txBody>
+          <a:bodyPr wrap="square" rtlCol="0">
+            <a:spAutoFit/>
+          </a:bodyPr>
+          <a:lstStyle/>
+          <a:p>
+            <a:r>
+              <a:rPr lang="en-US" sz="1300" dirty="0" smtClean="0"/>
+              <a:t>Leaf/Terminal Node </a:t>
+            </a:r>
+            <a:endParaRPr lang="en-US" sz="1300" dirty="0"/>
+          </a:p>
+        </p:txBody>
+      </p:sp>
+      <p:sp>
+        <p:nvSpPr>
+          <p:cNvPr id="23" name="Rectangle 22"/>
+          <p:cNvSpPr/>
+          <p:nvPr/>
+        </p:nvSpPr>
+        <p:spPr>
+          <a:xfrm>
+            <a:off x="7498080" y="1302738"/>
+            <a:ext cx="137160" cy="137160"/>
+          </a:xfrm>
+          <a:prstGeom prst="rect">
+            <a:avLst/>
+          </a:prstGeom>
+          <a:solidFill>
+            <a:srgbClr val="D2691E"/>
+          </a:solidFill>
+          <a:ln>
+            <a:solidFill>
+              <a:schemeClr val="tx1"/>
+            </a:solidFill>
+          </a:ln>
+        </p:spPr>
+        <p:style>
+          <a:lnRef idx="2">
+            <a:schemeClr val="accent1">
+              <a:shade val="50000"/>
+            </a:schemeClr>
+          </a:lnRef>
+          <a:fillRef idx="1">
+            <a:schemeClr val="accent1"/>
+          </a:fillRef>
+          <a:effectRef idx="0">
+            <a:schemeClr val="accent1"/>
+          </a:effectRef>
+          <a:fontRef idx="minor">
+            <a:schemeClr val="lt1"/>
+          </a:fontRef>
+        </p:style>
+        <p:txBody>
+          <a:bodyPr rtlCol="0" anchor="ctr"/>
+          <a:lstStyle/>
+          <a:p>
+            <a:pPr algn="ctr"/>
+            <a:endParaRPr lang="en-US">
+              <a:solidFill>
+                <a:srgbClr val="0000FF"/>
+              </a:solidFill>
+            </a:endParaRPr>
+          </a:p>
+        </p:txBody>
+      </p:sp>
+    </p:spTree>
+    <p:extLst>
+      <p:ext uri="{BB962C8B-B14F-4D97-AF65-F5344CB8AC3E}">
+        <p14:creationId xmlns:p14="http://schemas.microsoft.com/office/powerpoint/2010/main" val="657757486"/>
+      </p:ext>
+    </p:extLst>
+  </p:cSld>
+  <p:clrMapOvr>
+    <a:masterClrMapping/>
+  </p:clrMapOvr>
+</p:sld>
+</file>
+
+<file path=ppt/slides/slide5.xml><?xml version="1.0" encoding="utf-8"?>
+<p:sld xmlns:a="http://schemas.openxmlformats.org/drawingml/2006/main" xmlns:r="http://schemas.openxmlformats.org/officeDocument/2006/relationships" xmlns:p="http://schemas.openxmlformats.org/presentationml/2006/main">
+  <p:cSld>
+    <p:spTree>
+      <p:nvGrpSpPr>
+        <p:cNvPr id="1" name=""/>
+        <p:cNvGrpSpPr/>
+        <p:nvPr/>
+      </p:nvGrpSpPr>
+      <p:grpSpPr>
+        <a:xfrm>
+          <a:off x="0" y="0"/>
+          <a:ext cx="0" cy="0"/>
+          <a:chOff x="0" y="0"/>
+          <a:chExt cx="0" cy="0"/>
+        </a:xfrm>
+      </p:grpSpPr>
       <p:grpSp>
         <p:nvGrpSpPr>
-          <p:cNvPr id="25" name="Group 24"/>
+          <p:cNvPr id="3" name="Group 2"/>
           <p:cNvGrpSpPr/>
           <p:nvPr/>
         </p:nvGrpSpPr>
         <p:grpSpPr>
           <a:xfrm>
-            <a:off x="3246120" y="704088"/>
-            <a:ext cx="6695945" cy="4571653"/>
-            <a:chOff x="3246120" y="704088"/>
-            <a:chExt cx="6695945" cy="4571653"/>
+            <a:off x="139247" y="703472"/>
+            <a:ext cx="9859263" cy="5497794"/>
+            <a:chOff x="139247" y="703472"/>
+            <a:chExt cx="9859263" cy="5497794"/>
           </a:xfrm>
         </p:grpSpPr>
         <p:pic>
           <p:nvPicPr>
-            <p:cNvPr id="24" name="Picture 23"/>
+            <p:cNvPr id="2" name="Picture 1"/>
             <p:cNvPicPr>
               <a:picLocks noChangeAspect="1"/>
             </p:cNvPicPr>
@@ -4252,78 +4719,6 @@
             </a:prstGeom>
           </p:spPr>
         </p:pic>
-        <p:sp>
-          <p:nvSpPr>
-            <p:cNvPr id="17" name="TextBox 16"/>
-            <p:cNvSpPr txBox="1"/>
-            <p:nvPr/>
-          </p:nvSpPr>
-          <p:spPr>
-            <a:xfrm>
-              <a:off x="7735824" y="1545051"/>
-              <a:ext cx="1920240" cy="292388"/>
-            </a:xfrm>
-            <a:prstGeom prst="rect">
-              <a:avLst/>
-            </a:prstGeom>
-            <a:noFill/>
-          </p:spPr>
-          <p:txBody>
-            <a:bodyPr wrap="square" rtlCol="0">
-              <a:spAutoFit/>
-            </a:bodyPr>
-            <a:lstStyle/>
-            <a:p>
-              <a:r>
-                <a:rPr lang="en-US" sz="1300" dirty="0" smtClean="0"/>
-                <a:t>Decision </a:t>
-              </a:r>
-              <a:r>
-                <a:rPr lang="en-US" sz="1300" dirty="0" smtClean="0"/>
-                <a:t>Node </a:t>
-              </a:r>
-              <a:endParaRPr lang="en-US" sz="1300" dirty="0"/>
-            </a:p>
-          </p:txBody>
-        </p:sp>
-        <p:sp>
-          <p:nvSpPr>
-            <p:cNvPr id="16" name="TextBox 15"/>
-            <p:cNvSpPr txBox="1"/>
-            <p:nvPr/>
-          </p:nvSpPr>
-          <p:spPr>
-            <a:xfrm>
-              <a:off x="7739097" y="1228848"/>
-              <a:ext cx="1554480" cy="292388"/>
-            </a:xfrm>
-            <a:prstGeom prst="rect">
-              <a:avLst/>
-            </a:prstGeom>
-            <a:noFill/>
-          </p:spPr>
-          <p:txBody>
-            <a:bodyPr wrap="square" rtlCol="0">
-              <a:spAutoFit/>
-            </a:bodyPr>
-            <a:lstStyle/>
-            <a:p>
-              <a:r>
-                <a:rPr lang="en-US" sz="1300" dirty="0" smtClean="0"/>
-                <a:t>Root</a:t>
-              </a:r>
-              <a:r>
-                <a:rPr lang="en-US" sz="1300" dirty="0" smtClean="0"/>
-                <a:t> </a:t>
-              </a:r>
-              <a:r>
-                <a:rPr lang="en-US" sz="1300" dirty="0" smtClean="0"/>
-                <a:t>Node</a:t>
-              </a:r>
-              <a:endParaRPr lang="en-US" sz="1300" dirty="0"/>
-            </a:p>
-          </p:txBody>
-        </p:sp>
         <p:pic>
           <p:nvPicPr>
             <p:cNvPr id="7" name="Picture 6"/>
@@ -4345,7 +4740,7 @@
           </p:blipFill>
           <p:spPr>
             <a:xfrm>
-              <a:off x="6345855" y="4484317"/>
+              <a:off x="6379722" y="4484317"/>
               <a:ext cx="738954" cy="791423"/>
             </a:xfrm>
             <a:prstGeom prst="rect">
@@ -4403,7 +4798,7 @@
           </p:blipFill>
           <p:spPr>
             <a:xfrm>
-              <a:off x="4691570" y="4484318"/>
+              <a:off x="4714148" y="4484318"/>
               <a:ext cx="738954" cy="791423"/>
             </a:xfrm>
             <a:prstGeom prst="rect">
@@ -4413,13 +4808,185 @@
         </p:pic>
         <p:sp>
           <p:nvSpPr>
-            <p:cNvPr id="14" name="Rectangle 13"/>
+            <p:cNvPr id="20" name="TextBox 19"/>
+            <p:cNvSpPr txBox="1"/>
+            <p:nvPr/>
+          </p:nvSpPr>
+          <p:spPr>
+            <a:xfrm>
+              <a:off x="139247" y="703472"/>
+              <a:ext cx="2817681" cy="2369880"/>
+            </a:xfrm>
+            <a:prstGeom prst="rect">
+              <a:avLst/>
+            </a:prstGeom>
+            <a:noFill/>
+          </p:spPr>
+          <p:txBody>
+            <a:bodyPr wrap="square" rtlCol="0">
+              <a:spAutoFit/>
+            </a:bodyPr>
+            <a:lstStyle/>
+            <a:p>
+              <a:r>
+                <a:rPr lang="en-US" sz="2400" b="1" dirty="0" smtClean="0"/>
+                <a:t>What class (species) is a flower with the following feature? </a:t>
+              </a:r>
+            </a:p>
+            <a:p>
+              <a:endParaRPr lang="en-US" dirty="0" smtClean="0"/>
+            </a:p>
+            <a:p>
+              <a:r>
+                <a:rPr lang="en-US" sz="2200" dirty="0" smtClean="0"/>
+                <a:t>petal length (cm): 4.5</a:t>
+              </a:r>
+            </a:p>
+            <a:p>
+              <a:endParaRPr lang="en-US" dirty="0"/>
+            </a:p>
+            <a:p>
+              <a:endParaRPr lang="en-US" dirty="0"/>
+            </a:p>
+          </p:txBody>
+        </p:sp>
+        <p:sp>
+          <p:nvSpPr>
+            <p:cNvPr id="21" name="Rectangle 20"/>
             <p:cNvSpPr/>
             <p:nvPr/>
           </p:nvSpPr>
           <p:spPr>
             <a:xfrm>
-              <a:off x="7494001" y="1622778"/>
+              <a:off x="1263555" y="5431825"/>
+              <a:ext cx="8209188" cy="769441"/>
+            </a:xfrm>
+            <a:prstGeom prst="rect">
+              <a:avLst/>
+            </a:prstGeom>
+          </p:spPr>
+          <p:txBody>
+            <a:bodyPr wrap="square">
+              <a:spAutoFit/>
+            </a:bodyPr>
+            <a:lstStyle/>
+            <a:p>
+              <a:pPr algn="ctr"/>
+              <a:r>
+                <a:rPr lang="en-US" sz="2200" dirty="0" smtClean="0"/>
+                <a:t>Species counts are: </a:t>
+              </a:r>
+              <a:r>
+                <a:rPr lang="en-US" sz="2200" dirty="0" err="1" smtClean="0"/>
+                <a:t>setosa</a:t>
+              </a:r>
+              <a:r>
+                <a:rPr lang="en-US" sz="2200" dirty="0" smtClean="0"/>
+                <a:t>=0, versicolor=38, </a:t>
+              </a:r>
+              <a:r>
+                <a:rPr lang="en-US" sz="2200" dirty="0" err="1" smtClean="0"/>
+                <a:t>virginica</a:t>
+              </a:r>
+              <a:r>
+                <a:rPr lang="en-US" sz="2200" dirty="0" smtClean="0"/>
+                <a:t>=3</a:t>
+              </a:r>
+            </a:p>
+            <a:p>
+              <a:pPr algn="ctr"/>
+              <a:r>
+                <a:rPr lang="en-US" sz="2200" dirty="0" smtClean="0"/>
+                <a:t>Prediction </a:t>
+              </a:r>
+              <a:r>
+                <a:rPr lang="en-US" sz="2200" smtClean="0"/>
+                <a:t>is </a:t>
+              </a:r>
+              <a:r>
+                <a:rPr lang="en-US" sz="2200" b="1" smtClean="0"/>
+                <a:t>versicolor</a:t>
+              </a:r>
+              <a:r>
+                <a:rPr lang="en-US" sz="2200" smtClean="0"/>
+                <a:t> </a:t>
+              </a:r>
+              <a:r>
+                <a:rPr lang="en-US" sz="2200" dirty="0" smtClean="0"/>
+                <a:t>as it is the majority class</a:t>
+              </a:r>
+            </a:p>
+          </p:txBody>
+        </p:sp>
+        <p:sp>
+          <p:nvSpPr>
+            <p:cNvPr id="22" name="TextBox 21"/>
+            <p:cNvSpPr txBox="1"/>
+            <p:nvPr/>
+          </p:nvSpPr>
+          <p:spPr>
+            <a:xfrm>
+              <a:off x="7792269" y="1507859"/>
+              <a:ext cx="1920240" cy="292388"/>
+            </a:xfrm>
+            <a:prstGeom prst="rect">
+              <a:avLst/>
+            </a:prstGeom>
+            <a:noFill/>
+          </p:spPr>
+          <p:txBody>
+            <a:bodyPr wrap="square" rtlCol="0">
+              <a:spAutoFit/>
+            </a:bodyPr>
+            <a:lstStyle/>
+            <a:p>
+              <a:r>
+                <a:rPr lang="en-US" sz="1300" dirty="0" smtClean="0"/>
+                <a:t>Decision Node </a:t>
+              </a:r>
+              <a:endParaRPr lang="en-US" sz="1300" dirty="0"/>
+            </a:p>
+          </p:txBody>
+        </p:sp>
+        <p:sp>
+          <p:nvSpPr>
+            <p:cNvPr id="23" name="TextBox 22"/>
+            <p:cNvSpPr txBox="1"/>
+            <p:nvPr/>
+          </p:nvSpPr>
+          <p:spPr>
+            <a:xfrm>
+              <a:off x="7795542" y="1191656"/>
+              <a:ext cx="1554480" cy="292388"/>
+            </a:xfrm>
+            <a:prstGeom prst="rect">
+              <a:avLst/>
+            </a:prstGeom>
+            <a:noFill/>
+          </p:spPr>
+          <p:txBody>
+            <a:bodyPr wrap="square" rtlCol="0">
+              <a:spAutoFit/>
+            </a:bodyPr>
+            <a:lstStyle/>
+            <a:p>
+              <a:r>
+                <a:rPr lang="en-US" sz="1300" dirty="0" smtClean="0"/>
+                <a:t>Root Node</a:t>
+              </a:r>
+              <a:endParaRPr lang="en-US" sz="1300" dirty="0"/>
+            </a:p>
+          </p:txBody>
+        </p:sp>
+        <p:sp>
+          <p:nvSpPr>
+            <p:cNvPr id="24" name="Rectangle 23"/>
+            <p:cNvSpPr/>
+            <p:nvPr/>
+          </p:nvSpPr>
+          <p:spPr>
+            <a:xfrm>
+              <a:off x="7550446" y="1585586"/>
               <a:ext cx="137160" cy="137160"/>
             </a:xfrm>
             <a:prstGeom prst="rect">
@@ -4465,13 +5032,13 @@
         </p:sp>
         <p:sp>
           <p:nvSpPr>
-            <p:cNvPr id="18" name="Rectangle 17"/>
+            <p:cNvPr id="25" name="Rectangle 24"/>
             <p:cNvSpPr/>
             <p:nvPr/>
           </p:nvSpPr>
           <p:spPr>
             <a:xfrm>
-              <a:off x="7395419" y="1166867"/>
+              <a:off x="7451864" y="1129675"/>
               <a:ext cx="1999102" cy="1057044"/>
             </a:xfrm>
             <a:prstGeom prst="rect">
@@ -4513,13 +5080,13 @@
         </p:sp>
         <p:sp>
           <p:nvSpPr>
-            <p:cNvPr id="19" name="Rectangle 18"/>
+            <p:cNvPr id="26" name="Rectangle 25"/>
             <p:cNvSpPr/>
             <p:nvPr/>
           </p:nvSpPr>
           <p:spPr>
             <a:xfrm>
-              <a:off x="6847874" y="741457"/>
+              <a:off x="6904319" y="703472"/>
               <a:ext cx="3094191" cy="400110"/>
             </a:xfrm>
             <a:prstGeom prst="rect">
@@ -4543,13 +5110,13 @@
         </p:sp>
         <p:sp>
           <p:nvSpPr>
-            <p:cNvPr id="20" name="Rectangle 19"/>
+            <p:cNvPr id="27" name="Rectangle 26"/>
             <p:cNvSpPr/>
             <p:nvPr/>
           </p:nvSpPr>
           <p:spPr>
             <a:xfrm>
-              <a:off x="7498080" y="1942818"/>
+              <a:off x="7554525" y="1905626"/>
               <a:ext cx="137160" cy="137160"/>
             </a:xfrm>
             <a:prstGeom prst="rect">
@@ -4591,13 +5158,13 @@
         </p:sp>
         <p:sp>
           <p:nvSpPr>
-            <p:cNvPr id="21" name="TextBox 20"/>
+            <p:cNvPr id="28" name="TextBox 27"/>
             <p:cNvSpPr txBox="1"/>
             <p:nvPr/>
           </p:nvSpPr>
           <p:spPr>
             <a:xfrm>
-              <a:off x="7739097" y="1868953"/>
+              <a:off x="7795542" y="1831761"/>
               <a:ext cx="1920240" cy="292388"/>
             </a:xfrm>
             <a:prstGeom prst="rect">
@@ -4621,13 +5188,13 @@
         </p:sp>
         <p:sp>
           <p:nvSpPr>
-            <p:cNvPr id="23" name="Rectangle 22"/>
+            <p:cNvPr id="29" name="Rectangle 28"/>
             <p:cNvSpPr/>
             <p:nvPr/>
           </p:nvSpPr>
           <p:spPr>
             <a:xfrm>
-              <a:off x="7498080" y="1302738"/>
+              <a:off x="7554525" y="1265546"/>
               <a:ext cx="137160" cy="137160"/>
             </a:xfrm>
             <a:prstGeom prst="rect">
@@ -4668,508 +5235,6 @@
                   <a:srgbClr val="0000FF"/>
                 </a:solidFill>
               </a:endParaRPr>
-            </a:p>
-          </p:txBody>
-        </p:sp>
-      </p:grpSp>
-    </p:spTree>
-    <p:extLst>
-      <p:ext uri="{BB962C8B-B14F-4D97-AF65-F5344CB8AC3E}">
-        <p14:creationId xmlns:p14="http://schemas.microsoft.com/office/powerpoint/2010/main" val="657757486"/>
-      </p:ext>
-    </p:extLst>
-  </p:cSld>
-  <p:clrMapOvr>
-    <a:masterClrMapping/>
-  </p:clrMapOvr>
-</p:sld>
-</file>
-
-<file path=ppt/slides/slide5.xml><?xml version="1.0" encoding="utf-8"?>
-<p:sld xmlns:a="http://schemas.openxmlformats.org/drawingml/2006/main" xmlns:r="http://schemas.openxmlformats.org/officeDocument/2006/relationships" xmlns:p="http://schemas.openxmlformats.org/presentationml/2006/main">
-  <p:cSld>
-    <p:spTree>
-      <p:nvGrpSpPr>
-        <p:cNvPr id="1" name=""/>
-        <p:cNvGrpSpPr/>
-        <p:nvPr/>
-      </p:nvGrpSpPr>
-      <p:grpSpPr>
-        <a:xfrm>
-          <a:off x="0" y="0"/>
-          <a:ext cx="0" cy="0"/>
-          <a:chOff x="0" y="0"/>
-          <a:chExt cx="0" cy="0"/>
-        </a:xfrm>
-      </p:grpSpPr>
-      <p:sp>
-        <p:nvSpPr>
-          <p:cNvPr id="12" name="Rectangle 11"/>
-          <p:cNvSpPr/>
-          <p:nvPr/>
-        </p:nvSpPr>
-        <p:spPr>
-          <a:xfrm>
-            <a:off x="2192839" y="7185845"/>
-            <a:ext cx="6096000" cy="400110"/>
-          </a:xfrm>
-          <a:prstGeom prst="rect">
-            <a:avLst/>
-          </a:prstGeom>
-        </p:spPr>
-        <p:txBody>
-          <a:bodyPr>
-            <a:spAutoFit/>
-          </a:bodyPr>
-          <a:lstStyle/>
-          <a:p>
-            <a:r>
-              <a:rPr lang="en-US" sz="2000" dirty="0" smtClean="0"/>
-              <a:t>The prediction is </a:t>
-            </a:r>
-            <a:r>
-              <a:rPr lang="en-US" sz="2000" dirty="0" err="1" smtClean="0"/>
-              <a:t>virginica</a:t>
-            </a:r>
-            <a:r>
-              <a:rPr lang="en-US" sz="2000" dirty="0" smtClean="0"/>
-              <a:t> as it is the majority class. </a:t>
-            </a:r>
-            <a:endParaRPr lang="en-US" sz="2000" dirty="0"/>
-          </a:p>
-        </p:txBody>
-      </p:sp>
-      <p:grpSp>
-        <p:nvGrpSpPr>
-          <p:cNvPr id="10" name="Group 9"/>
-          <p:cNvGrpSpPr/>
-          <p:nvPr/>
-        </p:nvGrpSpPr>
-        <p:grpSpPr>
-          <a:xfrm>
-            <a:off x="184403" y="703472"/>
-            <a:ext cx="9757662" cy="5146268"/>
-            <a:chOff x="184403" y="703472"/>
-            <a:chExt cx="9757662" cy="5146268"/>
-          </a:xfrm>
-        </p:grpSpPr>
-        <p:pic>
-          <p:nvPicPr>
-            <p:cNvPr id="6" name="Picture 5"/>
-            <p:cNvPicPr>
-              <a:picLocks noChangeAspect="1"/>
-            </p:cNvPicPr>
-            <p:nvPr/>
-          </p:nvPicPr>
-          <p:blipFill>
-            <a:blip r:embed="rId2">
-              <a:extLst>
-                <a:ext uri="{28A0092B-C50C-407E-A947-70E740481C1C}">
-                  <a14:useLocalDpi xmlns:a14="http://schemas.microsoft.com/office/drawing/2010/main" val="0"/>
-                </a:ext>
-              </a:extLst>
-            </a:blip>
-            <a:stretch>
-              <a:fillRect/>
-            </a:stretch>
-          </p:blipFill>
-          <p:spPr>
-            <a:xfrm>
-              <a:off x="3246120" y="704088"/>
-              <a:ext cx="4244059" cy="3794760"/>
-            </a:xfrm>
-            <a:prstGeom prst="rect">
-              <a:avLst/>
-            </a:prstGeom>
-          </p:spPr>
-        </p:pic>
-        <p:pic>
-          <p:nvPicPr>
-            <p:cNvPr id="7" name="Picture 6"/>
-            <p:cNvPicPr>
-              <a:picLocks noChangeAspect="1"/>
-            </p:cNvPicPr>
-            <p:nvPr/>
-          </p:nvPicPr>
-          <p:blipFill rotWithShape="1">
-            <a:blip r:embed="rId3">
-              <a:extLst>
-                <a:ext uri="{28A0092B-C50C-407E-A947-70E740481C1C}">
-                  <a14:useLocalDpi xmlns:a14="http://schemas.microsoft.com/office/drawing/2010/main" val="0"/>
-                </a:ext>
-              </a:extLst>
-            </a:blip>
-            <a:srcRect l="68876"/>
-            <a:stretch/>
-          </p:blipFill>
-          <p:spPr>
-            <a:xfrm>
-              <a:off x="6345855" y="4484317"/>
-              <a:ext cx="738954" cy="791423"/>
-            </a:xfrm>
-            <a:prstGeom prst="rect">
-              <a:avLst/>
-            </a:prstGeom>
-          </p:spPr>
-        </p:pic>
-        <p:pic>
-          <p:nvPicPr>
-            <p:cNvPr id="8" name="Picture 7"/>
-            <p:cNvPicPr>
-              <a:picLocks noChangeAspect="1"/>
-            </p:cNvPicPr>
-            <p:nvPr/>
-          </p:nvPicPr>
-          <p:blipFill rotWithShape="1">
-            <a:blip r:embed="rId3">
-              <a:extLst>
-                <a:ext uri="{28A0092B-C50C-407E-A947-70E740481C1C}">
-                  <a14:useLocalDpi xmlns:a14="http://schemas.microsoft.com/office/drawing/2010/main" val="0"/>
-                </a:ext>
-              </a:extLst>
-            </a:blip>
-            <a:srcRect l="33873" r="35004"/>
-            <a:stretch/>
-          </p:blipFill>
-          <p:spPr>
-            <a:xfrm>
-              <a:off x="3564160" y="3125440"/>
-              <a:ext cx="736910" cy="789233"/>
-            </a:xfrm>
-            <a:prstGeom prst="rect">
-              <a:avLst/>
-            </a:prstGeom>
-          </p:spPr>
-        </p:pic>
-        <p:pic>
-          <p:nvPicPr>
-            <p:cNvPr id="9" name="Picture 8"/>
-            <p:cNvPicPr>
-              <a:picLocks noChangeAspect="1"/>
-            </p:cNvPicPr>
-            <p:nvPr/>
-          </p:nvPicPr>
-          <p:blipFill rotWithShape="1">
-            <a:blip r:embed="rId3">
-              <a:extLst>
-                <a:ext uri="{28A0092B-C50C-407E-A947-70E740481C1C}">
-                  <a14:useLocalDpi xmlns:a14="http://schemas.microsoft.com/office/drawing/2010/main" val="0"/>
-                </a:ext>
-              </a:extLst>
-            </a:blip>
-            <a:srcRect r="68876"/>
-            <a:stretch/>
-          </p:blipFill>
-          <p:spPr>
-            <a:xfrm>
-              <a:off x="4691570" y="4484318"/>
-              <a:ext cx="738954" cy="791423"/>
-            </a:xfrm>
-            <a:prstGeom prst="rect">
-              <a:avLst/>
-            </a:prstGeom>
-          </p:spPr>
-        </p:pic>
-        <p:sp>
-          <p:nvSpPr>
-            <p:cNvPr id="14" name="Rectangle 13"/>
-            <p:cNvSpPr/>
-            <p:nvPr/>
-          </p:nvSpPr>
-          <p:spPr>
-            <a:xfrm>
-              <a:off x="7494001" y="1283884"/>
-              <a:ext cx="137160" cy="137160"/>
-            </a:xfrm>
-            <a:prstGeom prst="rect">
-              <a:avLst/>
-            </a:prstGeom>
-            <a:solidFill>
-              <a:srgbClr val="0000FF"/>
-            </a:solidFill>
-          </p:spPr>
-          <p:style>
-            <a:lnRef idx="2">
-              <a:schemeClr val="accent1">
-                <a:shade val="50000"/>
-              </a:schemeClr>
-            </a:lnRef>
-            <a:fillRef idx="1">
-              <a:schemeClr val="accent1"/>
-            </a:fillRef>
-            <a:effectRef idx="0">
-              <a:schemeClr val="accent1"/>
-            </a:effectRef>
-            <a:fontRef idx="minor">
-              <a:schemeClr val="lt1"/>
-            </a:fontRef>
-          </p:style>
-          <p:txBody>
-            <a:bodyPr rtlCol="0" anchor="ctr"/>
-            <a:lstStyle/>
-            <a:p>
-              <a:pPr algn="ctr"/>
-              <a:endParaRPr lang="en-US">
-                <a:solidFill>
-                  <a:srgbClr val="0000FF"/>
-                </a:solidFill>
-              </a:endParaRPr>
-            </a:p>
-          </p:txBody>
-        </p:sp>
-        <p:sp>
-          <p:nvSpPr>
-            <p:cNvPr id="15" name="Rectangle 14"/>
-            <p:cNvSpPr/>
-            <p:nvPr/>
-          </p:nvSpPr>
-          <p:spPr>
-            <a:xfrm>
-              <a:off x="7495873" y="1600087"/>
-              <a:ext cx="137160" cy="137160"/>
-            </a:xfrm>
-            <a:prstGeom prst="rect">
-              <a:avLst/>
-            </a:prstGeom>
-            <a:solidFill>
-              <a:srgbClr val="008000"/>
-            </a:solidFill>
-          </p:spPr>
-          <p:style>
-            <a:lnRef idx="2">
-              <a:schemeClr val="accent1">
-                <a:shade val="50000"/>
-              </a:schemeClr>
-            </a:lnRef>
-            <a:fillRef idx="1">
-              <a:schemeClr val="accent1"/>
-            </a:fillRef>
-            <a:effectRef idx="0">
-              <a:schemeClr val="accent1"/>
-            </a:effectRef>
-            <a:fontRef idx="minor">
-              <a:schemeClr val="lt1"/>
-            </a:fontRef>
-          </p:style>
-          <p:txBody>
-            <a:bodyPr rtlCol="0" anchor="ctr"/>
-            <a:lstStyle/>
-            <a:p>
-              <a:pPr algn="ctr"/>
-              <a:endParaRPr lang="en-US"/>
-            </a:p>
-          </p:txBody>
-        </p:sp>
-        <p:sp>
-          <p:nvSpPr>
-            <p:cNvPr id="16" name="TextBox 15"/>
-            <p:cNvSpPr txBox="1"/>
-            <p:nvPr/>
-          </p:nvSpPr>
-          <p:spPr>
-            <a:xfrm>
-              <a:off x="7568530" y="1206270"/>
-              <a:ext cx="1554480" cy="292388"/>
-            </a:xfrm>
-            <a:prstGeom prst="rect">
-              <a:avLst/>
-            </a:prstGeom>
-            <a:noFill/>
-          </p:spPr>
-          <p:txBody>
-            <a:bodyPr wrap="square" rtlCol="0">
-              <a:spAutoFit/>
-            </a:bodyPr>
-            <a:lstStyle/>
-            <a:p>
-              <a:pPr algn="ctr"/>
-              <a:r>
-                <a:rPr lang="en-US" sz="1300" dirty="0" smtClean="0"/>
-                <a:t>Decision Node</a:t>
-              </a:r>
-              <a:endParaRPr lang="en-US" sz="1300" dirty="0"/>
-            </a:p>
-          </p:txBody>
-        </p:sp>
-        <p:sp>
-          <p:nvSpPr>
-            <p:cNvPr id="17" name="TextBox 16"/>
-            <p:cNvSpPr txBox="1"/>
-            <p:nvPr/>
-          </p:nvSpPr>
-          <p:spPr>
-            <a:xfrm>
-              <a:off x="7631161" y="1522473"/>
-              <a:ext cx="1920240" cy="292388"/>
-            </a:xfrm>
-            <a:prstGeom prst="rect">
-              <a:avLst/>
-            </a:prstGeom>
-            <a:noFill/>
-          </p:spPr>
-          <p:txBody>
-            <a:bodyPr wrap="square" rtlCol="0">
-              <a:spAutoFit/>
-            </a:bodyPr>
-            <a:lstStyle/>
-            <a:p>
-              <a:r>
-                <a:rPr lang="en-US" sz="1300" smtClean="0"/>
-                <a:t>Leaf/Terminal Node </a:t>
-              </a:r>
-              <a:endParaRPr lang="en-US" sz="1300" dirty="0"/>
-            </a:p>
-          </p:txBody>
-        </p:sp>
-        <p:sp>
-          <p:nvSpPr>
-            <p:cNvPr id="18" name="Rectangle 17"/>
-            <p:cNvSpPr/>
-            <p:nvPr/>
-          </p:nvSpPr>
-          <p:spPr>
-            <a:xfrm>
-              <a:off x="7395419" y="1166867"/>
-              <a:ext cx="1999102" cy="712697"/>
-            </a:xfrm>
-            <a:prstGeom prst="rect">
-              <a:avLst/>
-            </a:prstGeom>
-            <a:noFill/>
-            <a:ln w="6350">
-              <a:solidFill>
-                <a:schemeClr val="tx1">
-                  <a:alpha val="32000"/>
-                </a:schemeClr>
-              </a:solidFill>
-            </a:ln>
-          </p:spPr>
-          <p:style>
-            <a:lnRef idx="2">
-              <a:schemeClr val="accent1">
-                <a:shade val="50000"/>
-              </a:schemeClr>
-            </a:lnRef>
-            <a:fillRef idx="1">
-              <a:schemeClr val="accent1"/>
-            </a:fillRef>
-            <a:effectRef idx="0">
-              <a:schemeClr val="accent1"/>
-            </a:effectRef>
-            <a:fontRef idx="minor">
-              <a:schemeClr val="lt1"/>
-            </a:fontRef>
-          </p:style>
-          <p:txBody>
-            <a:bodyPr rtlCol="0" anchor="ctr"/>
-            <a:lstStyle/>
-            <a:p>
-              <a:pPr algn="ctr"/>
-              <a:endParaRPr lang="en-US"/>
-            </a:p>
-          </p:txBody>
-        </p:sp>
-        <p:sp>
-          <p:nvSpPr>
-            <p:cNvPr id="19" name="Rectangle 18"/>
-            <p:cNvSpPr/>
-            <p:nvPr/>
-          </p:nvSpPr>
-          <p:spPr>
-            <a:xfrm>
-              <a:off x="6847874" y="741457"/>
-              <a:ext cx="3094191" cy="400110"/>
-            </a:xfrm>
-            <a:prstGeom prst="rect">
-              <a:avLst/>
-            </a:prstGeom>
-          </p:spPr>
-          <p:txBody>
-            <a:bodyPr wrap="square">
-              <a:spAutoFit/>
-            </a:bodyPr>
-            <a:lstStyle/>
-            <a:p>
-              <a:pPr algn="ctr"/>
-              <a:r>
-                <a:rPr lang="en-US" sz="2000" dirty="0" smtClean="0"/>
-                <a:t>Type of Node</a:t>
-              </a:r>
-              <a:endParaRPr lang="en-US" sz="2000" dirty="0"/>
-            </a:p>
-          </p:txBody>
-        </p:sp>
-        <p:sp>
-          <p:nvSpPr>
-            <p:cNvPr id="20" name="TextBox 19"/>
-            <p:cNvSpPr txBox="1"/>
-            <p:nvPr/>
-          </p:nvSpPr>
-          <p:spPr>
-            <a:xfrm>
-              <a:off x="184403" y="703472"/>
-              <a:ext cx="2817681" cy="2369880"/>
-            </a:xfrm>
-            <a:prstGeom prst="rect">
-              <a:avLst/>
-            </a:prstGeom>
-            <a:noFill/>
-          </p:spPr>
-          <p:txBody>
-            <a:bodyPr wrap="square" rtlCol="0">
-              <a:spAutoFit/>
-            </a:bodyPr>
-            <a:lstStyle/>
-            <a:p>
-              <a:r>
-                <a:rPr lang="en-US" sz="2400" b="1" dirty="0" smtClean="0"/>
-                <a:t>What class (species) is a flower with the following feature? </a:t>
-              </a:r>
-            </a:p>
-            <a:p>
-              <a:endParaRPr lang="en-US" dirty="0" smtClean="0"/>
-            </a:p>
-            <a:p>
-              <a:r>
-                <a:rPr lang="en-US" sz="2200" dirty="0" smtClean="0"/>
-                <a:t>petal length (cm): 4.5</a:t>
-              </a:r>
-            </a:p>
-            <a:p>
-              <a:endParaRPr lang="en-US" dirty="0"/>
-            </a:p>
-            <a:p>
-              <a:endParaRPr lang="en-US" dirty="0"/>
-            </a:p>
-          </p:txBody>
-        </p:sp>
-        <p:sp>
-          <p:nvSpPr>
-            <p:cNvPr id="21" name="Rectangle 20"/>
-            <p:cNvSpPr/>
-            <p:nvPr/>
-          </p:nvSpPr>
-          <p:spPr>
-            <a:xfrm>
-              <a:off x="1229255" y="5418853"/>
-              <a:ext cx="7165714" cy="430887"/>
-            </a:xfrm>
-            <a:prstGeom prst="rect">
-              <a:avLst/>
-            </a:prstGeom>
-          </p:spPr>
-          <p:txBody>
-            <a:bodyPr wrap="square">
-              <a:spAutoFit/>
-            </a:bodyPr>
-            <a:lstStyle/>
-            <a:p>
-              <a:pPr algn="ctr"/>
-              <a:r>
-                <a:rPr lang="en-US" sz="2200" dirty="0" smtClean="0"/>
-                <a:t>The prediction is versicolor</a:t>
-              </a:r>
-              <a:endParaRPr lang="en-US" sz="2200" dirty="0"/>
             </a:p>
           </p:txBody>
         </p:sp>

</xml_diff>

<commit_message>
Updated DT tutorial to account for depth
</commit_message>
<xml_diff>
--- a/Sklearn/DecisionTrees/powerpoint/DecisionComparison.pptx
+++ b/Sklearn/DecisionTrees/powerpoint/DecisionComparison.pptx
@@ -10,12 +10,20 @@
     <p:sldId id="263" r:id="rId4"/>
     <p:sldId id="266" r:id="rId5"/>
     <p:sldId id="259" r:id="rId6"/>
-    <p:sldId id="260" r:id="rId7"/>
-    <p:sldId id="261" r:id="rId8"/>
-    <p:sldId id="262" r:id="rId9"/>
-    <p:sldId id="264" r:id="rId10"/>
-    <p:sldId id="258" r:id="rId11"/>
-    <p:sldId id="265" r:id="rId12"/>
+    <p:sldId id="267" r:id="rId7"/>
+    <p:sldId id="274" r:id="rId8"/>
+    <p:sldId id="273" r:id="rId9"/>
+    <p:sldId id="272" r:id="rId10"/>
+    <p:sldId id="271" r:id="rId11"/>
+    <p:sldId id="270" r:id="rId12"/>
+    <p:sldId id="269" r:id="rId13"/>
+    <p:sldId id="268" r:id="rId14"/>
+    <p:sldId id="261" r:id="rId15"/>
+    <p:sldId id="262" r:id="rId16"/>
+    <p:sldId id="264" r:id="rId17"/>
+    <p:sldId id="258" r:id="rId18"/>
+    <p:sldId id="265" r:id="rId19"/>
+    <p:sldId id="260" r:id="rId20"/>
   </p:sldIdLst>
   <p:sldSz cx="12192000" cy="6858000"/>
   <p:notesSz cx="6858000" cy="9144000"/>
@@ -253,7 +261,7 @@
           <a:p>
             <a:fld id="{B66C5E5C-AFE9-2848-A01D-417298715EDA}" type="datetimeFigureOut">
               <a:rPr lang="en-US" smtClean="0"/>
-              <a:t>10/1/18</a:t>
+              <a:t>10/2/18</a:t>
             </a:fld>
             <a:endParaRPr lang="en-US"/>
           </a:p>
@@ -423,7 +431,7 @@
           <a:p>
             <a:fld id="{B66C5E5C-AFE9-2848-A01D-417298715EDA}" type="datetimeFigureOut">
               <a:rPr lang="en-US" smtClean="0"/>
-              <a:t>10/1/18</a:t>
+              <a:t>10/2/18</a:t>
             </a:fld>
             <a:endParaRPr lang="en-US"/>
           </a:p>
@@ -603,7 +611,7 @@
           <a:p>
             <a:fld id="{B66C5E5C-AFE9-2848-A01D-417298715EDA}" type="datetimeFigureOut">
               <a:rPr lang="en-US" smtClean="0"/>
-              <a:t>10/1/18</a:t>
+              <a:t>10/2/18</a:t>
             </a:fld>
             <a:endParaRPr lang="en-US"/>
           </a:p>
@@ -773,7 +781,7 @@
           <a:p>
             <a:fld id="{B66C5E5C-AFE9-2848-A01D-417298715EDA}" type="datetimeFigureOut">
               <a:rPr lang="en-US" smtClean="0"/>
-              <a:t>10/1/18</a:t>
+              <a:t>10/2/18</a:t>
             </a:fld>
             <a:endParaRPr lang="en-US"/>
           </a:p>
@@ -1019,7 +1027,7 @@
           <a:p>
             <a:fld id="{B66C5E5C-AFE9-2848-A01D-417298715EDA}" type="datetimeFigureOut">
               <a:rPr lang="en-US" smtClean="0"/>
-              <a:t>10/1/18</a:t>
+              <a:t>10/2/18</a:t>
             </a:fld>
             <a:endParaRPr lang="en-US"/>
           </a:p>
@@ -1251,7 +1259,7 @@
           <a:p>
             <a:fld id="{B66C5E5C-AFE9-2848-A01D-417298715EDA}" type="datetimeFigureOut">
               <a:rPr lang="en-US" smtClean="0"/>
-              <a:t>10/1/18</a:t>
+              <a:t>10/2/18</a:t>
             </a:fld>
             <a:endParaRPr lang="en-US"/>
           </a:p>
@@ -1618,7 +1626,7 @@
           <a:p>
             <a:fld id="{B66C5E5C-AFE9-2848-A01D-417298715EDA}" type="datetimeFigureOut">
               <a:rPr lang="en-US" smtClean="0"/>
-              <a:t>10/1/18</a:t>
+              <a:t>10/2/18</a:t>
             </a:fld>
             <a:endParaRPr lang="en-US"/>
           </a:p>
@@ -1736,7 +1744,7 @@
           <a:p>
             <a:fld id="{B66C5E5C-AFE9-2848-A01D-417298715EDA}" type="datetimeFigureOut">
               <a:rPr lang="en-US" smtClean="0"/>
-              <a:t>10/1/18</a:t>
+              <a:t>10/2/18</a:t>
             </a:fld>
             <a:endParaRPr lang="en-US"/>
           </a:p>
@@ -1831,7 +1839,7 @@
           <a:p>
             <a:fld id="{B66C5E5C-AFE9-2848-A01D-417298715EDA}" type="datetimeFigureOut">
               <a:rPr lang="en-US" smtClean="0"/>
-              <a:t>10/1/18</a:t>
+              <a:t>10/2/18</a:t>
             </a:fld>
             <a:endParaRPr lang="en-US"/>
           </a:p>
@@ -2108,7 +2116,7 @@
           <a:p>
             <a:fld id="{B66C5E5C-AFE9-2848-A01D-417298715EDA}" type="datetimeFigureOut">
               <a:rPr lang="en-US" smtClean="0"/>
-              <a:t>10/1/18</a:t>
+              <a:t>10/2/18</a:t>
             </a:fld>
             <a:endParaRPr lang="en-US"/>
           </a:p>
@@ -2361,7 +2369,7 @@
           <a:p>
             <a:fld id="{B66C5E5C-AFE9-2848-A01D-417298715EDA}" type="datetimeFigureOut">
               <a:rPr lang="en-US" smtClean="0"/>
-              <a:t>10/1/18</a:t>
+              <a:t>10/2/18</a:t>
             </a:fld>
             <a:endParaRPr lang="en-US"/>
           </a:p>
@@ -2574,7 +2582,7 @@
           <a:p>
             <a:fld id="{B66C5E5C-AFE9-2848-A01D-417298715EDA}" type="datetimeFigureOut">
               <a:rPr lang="en-US" smtClean="0"/>
-              <a:t>10/1/18</a:t>
+              <a:t>10/2/18</a:t>
             </a:fld>
             <a:endParaRPr lang="en-US"/>
           </a:p>
@@ -3248,6 +3256,817 @@
           <a:chExt cx="0" cy="0"/>
         </a:xfrm>
       </p:grpSpPr>
+      <p:sp>
+        <p:nvSpPr>
+          <p:cNvPr id="2" name="Title 1"/>
+          <p:cNvSpPr>
+            <a:spLocks noGrp="1"/>
+          </p:cNvSpPr>
+          <p:nvPr>
+            <p:ph type="title"/>
+          </p:nvPr>
+        </p:nvSpPr>
+        <p:spPr/>
+        <p:txBody>
+          <a:bodyPr/>
+          <a:lstStyle/>
+          <a:p>
+            <a:endParaRPr lang="en-US"/>
+          </a:p>
+        </p:txBody>
+      </p:sp>
+      <p:sp>
+        <p:nvSpPr>
+          <p:cNvPr id="3" name="Content Placeholder 2"/>
+          <p:cNvSpPr>
+            <a:spLocks noGrp="1"/>
+          </p:cNvSpPr>
+          <p:nvPr>
+            <p:ph idx="1"/>
+          </p:nvPr>
+        </p:nvSpPr>
+        <p:spPr/>
+        <p:txBody>
+          <a:bodyPr/>
+          <a:lstStyle/>
+          <a:p>
+            <a:endParaRPr lang="en-US"/>
+          </a:p>
+        </p:txBody>
+      </p:sp>
+    </p:spTree>
+    <p:extLst>
+      <p:ext uri="{BB962C8B-B14F-4D97-AF65-F5344CB8AC3E}">
+        <p14:creationId xmlns:p14="http://schemas.microsoft.com/office/powerpoint/2010/main" val="1947692910"/>
+      </p:ext>
+    </p:extLst>
+  </p:cSld>
+  <p:clrMapOvr>
+    <a:masterClrMapping/>
+  </p:clrMapOvr>
+</p:sld>
+</file>
+
+<file path=ppt/slides/slide11.xml><?xml version="1.0" encoding="utf-8"?>
+<p:sld xmlns:a="http://schemas.openxmlformats.org/drawingml/2006/main" xmlns:r="http://schemas.openxmlformats.org/officeDocument/2006/relationships" xmlns:p="http://schemas.openxmlformats.org/presentationml/2006/main">
+  <p:cSld>
+    <p:spTree>
+      <p:nvGrpSpPr>
+        <p:cNvPr id="1" name=""/>
+        <p:cNvGrpSpPr/>
+        <p:nvPr/>
+      </p:nvGrpSpPr>
+      <p:grpSpPr>
+        <a:xfrm>
+          <a:off x="0" y="0"/>
+          <a:ext cx="0" cy="0"/>
+          <a:chOff x="0" y="0"/>
+          <a:chExt cx="0" cy="0"/>
+        </a:xfrm>
+      </p:grpSpPr>
+      <p:sp>
+        <p:nvSpPr>
+          <p:cNvPr id="2" name="Title 1"/>
+          <p:cNvSpPr>
+            <a:spLocks noGrp="1"/>
+          </p:cNvSpPr>
+          <p:nvPr>
+            <p:ph type="title"/>
+          </p:nvPr>
+        </p:nvSpPr>
+        <p:spPr/>
+        <p:txBody>
+          <a:bodyPr/>
+          <a:lstStyle/>
+          <a:p>
+            <a:endParaRPr lang="en-US"/>
+          </a:p>
+        </p:txBody>
+      </p:sp>
+      <p:sp>
+        <p:nvSpPr>
+          <p:cNvPr id="3" name="Content Placeholder 2"/>
+          <p:cNvSpPr>
+            <a:spLocks noGrp="1"/>
+          </p:cNvSpPr>
+          <p:nvPr>
+            <p:ph idx="1"/>
+          </p:nvPr>
+        </p:nvSpPr>
+        <p:spPr/>
+        <p:txBody>
+          <a:bodyPr/>
+          <a:lstStyle/>
+          <a:p>
+            <a:endParaRPr lang="en-US"/>
+          </a:p>
+        </p:txBody>
+      </p:sp>
+    </p:spTree>
+    <p:extLst>
+      <p:ext uri="{BB962C8B-B14F-4D97-AF65-F5344CB8AC3E}">
+        <p14:creationId xmlns:p14="http://schemas.microsoft.com/office/powerpoint/2010/main" val="412184355"/>
+      </p:ext>
+    </p:extLst>
+  </p:cSld>
+  <p:clrMapOvr>
+    <a:masterClrMapping/>
+  </p:clrMapOvr>
+</p:sld>
+</file>
+
+<file path=ppt/slides/slide12.xml><?xml version="1.0" encoding="utf-8"?>
+<p:sld xmlns:a="http://schemas.openxmlformats.org/drawingml/2006/main" xmlns:r="http://schemas.openxmlformats.org/officeDocument/2006/relationships" xmlns:p="http://schemas.openxmlformats.org/presentationml/2006/main">
+  <p:cSld>
+    <p:spTree>
+      <p:nvGrpSpPr>
+        <p:cNvPr id="1" name=""/>
+        <p:cNvGrpSpPr/>
+        <p:nvPr/>
+      </p:nvGrpSpPr>
+      <p:grpSpPr>
+        <a:xfrm>
+          <a:off x="0" y="0"/>
+          <a:ext cx="0" cy="0"/>
+          <a:chOff x="0" y="0"/>
+          <a:chExt cx="0" cy="0"/>
+        </a:xfrm>
+      </p:grpSpPr>
+      <p:sp>
+        <p:nvSpPr>
+          <p:cNvPr id="2" name="Title 1"/>
+          <p:cNvSpPr>
+            <a:spLocks noGrp="1"/>
+          </p:cNvSpPr>
+          <p:nvPr>
+            <p:ph type="title"/>
+          </p:nvPr>
+        </p:nvSpPr>
+        <p:spPr/>
+        <p:txBody>
+          <a:bodyPr/>
+          <a:lstStyle/>
+          <a:p>
+            <a:endParaRPr lang="en-US"/>
+          </a:p>
+        </p:txBody>
+      </p:sp>
+      <p:sp>
+        <p:nvSpPr>
+          <p:cNvPr id="3" name="Content Placeholder 2"/>
+          <p:cNvSpPr>
+            <a:spLocks noGrp="1"/>
+          </p:cNvSpPr>
+          <p:nvPr>
+            <p:ph idx="1"/>
+          </p:nvPr>
+        </p:nvSpPr>
+        <p:spPr/>
+        <p:txBody>
+          <a:bodyPr/>
+          <a:lstStyle/>
+          <a:p>
+            <a:endParaRPr lang="en-US"/>
+          </a:p>
+        </p:txBody>
+      </p:sp>
+    </p:spTree>
+    <p:extLst>
+      <p:ext uri="{BB962C8B-B14F-4D97-AF65-F5344CB8AC3E}">
+        <p14:creationId xmlns:p14="http://schemas.microsoft.com/office/powerpoint/2010/main" val="1578406478"/>
+      </p:ext>
+    </p:extLst>
+  </p:cSld>
+  <p:clrMapOvr>
+    <a:masterClrMapping/>
+  </p:clrMapOvr>
+</p:sld>
+</file>
+
+<file path=ppt/slides/slide13.xml><?xml version="1.0" encoding="utf-8"?>
+<p:sld xmlns:a="http://schemas.openxmlformats.org/drawingml/2006/main" xmlns:r="http://schemas.openxmlformats.org/officeDocument/2006/relationships" xmlns:p="http://schemas.openxmlformats.org/presentationml/2006/main">
+  <p:cSld>
+    <p:spTree>
+      <p:nvGrpSpPr>
+        <p:cNvPr id="1" name=""/>
+        <p:cNvGrpSpPr/>
+        <p:nvPr/>
+      </p:nvGrpSpPr>
+      <p:grpSpPr>
+        <a:xfrm>
+          <a:off x="0" y="0"/>
+          <a:ext cx="0" cy="0"/>
+          <a:chOff x="0" y="0"/>
+          <a:chExt cx="0" cy="0"/>
+        </a:xfrm>
+      </p:grpSpPr>
+      <p:sp>
+        <p:nvSpPr>
+          <p:cNvPr id="2" name="Title 1"/>
+          <p:cNvSpPr>
+            <a:spLocks noGrp="1"/>
+          </p:cNvSpPr>
+          <p:nvPr>
+            <p:ph type="title"/>
+          </p:nvPr>
+        </p:nvSpPr>
+        <p:spPr/>
+        <p:txBody>
+          <a:bodyPr/>
+          <a:lstStyle/>
+          <a:p>
+            <a:endParaRPr lang="en-US"/>
+          </a:p>
+        </p:txBody>
+      </p:sp>
+      <p:sp>
+        <p:nvSpPr>
+          <p:cNvPr id="3" name="Content Placeholder 2"/>
+          <p:cNvSpPr>
+            <a:spLocks noGrp="1"/>
+          </p:cNvSpPr>
+          <p:nvPr>
+            <p:ph idx="1"/>
+          </p:nvPr>
+        </p:nvSpPr>
+        <p:spPr/>
+        <p:txBody>
+          <a:bodyPr/>
+          <a:lstStyle/>
+          <a:p>
+            <a:endParaRPr lang="en-US"/>
+          </a:p>
+        </p:txBody>
+      </p:sp>
+    </p:spTree>
+    <p:extLst>
+      <p:ext uri="{BB962C8B-B14F-4D97-AF65-F5344CB8AC3E}">
+        <p14:creationId xmlns:p14="http://schemas.microsoft.com/office/powerpoint/2010/main" val="721245678"/>
+      </p:ext>
+    </p:extLst>
+  </p:cSld>
+  <p:clrMapOvr>
+    <a:masterClrMapping/>
+  </p:clrMapOvr>
+</p:sld>
+</file>
+
+<file path=ppt/slides/slide14.xml><?xml version="1.0" encoding="utf-8"?>
+<p:sld xmlns:a="http://schemas.openxmlformats.org/drawingml/2006/main" xmlns:r="http://schemas.openxmlformats.org/officeDocument/2006/relationships" xmlns:p="http://schemas.openxmlformats.org/presentationml/2006/main">
+  <p:cSld>
+    <p:spTree>
+      <p:nvGrpSpPr>
+        <p:cNvPr id="1" name=""/>
+        <p:cNvGrpSpPr/>
+        <p:nvPr/>
+      </p:nvGrpSpPr>
+      <p:grpSpPr>
+        <a:xfrm>
+          <a:off x="0" y="0"/>
+          <a:ext cx="0" cy="0"/>
+          <a:chOff x="0" y="0"/>
+          <a:chExt cx="0" cy="0"/>
+        </a:xfrm>
+      </p:grpSpPr>
+    </p:spTree>
+    <p:extLst>
+      <p:ext uri="{BB962C8B-B14F-4D97-AF65-F5344CB8AC3E}">
+        <p14:creationId xmlns:p14="http://schemas.microsoft.com/office/powerpoint/2010/main" val="1437185423"/>
+      </p:ext>
+    </p:extLst>
+  </p:cSld>
+  <p:clrMapOvr>
+    <a:masterClrMapping/>
+  </p:clrMapOvr>
+</p:sld>
+</file>
+
+<file path=ppt/slides/slide15.xml><?xml version="1.0" encoding="utf-8"?>
+<p:sld xmlns:a="http://schemas.openxmlformats.org/drawingml/2006/main" xmlns:r="http://schemas.openxmlformats.org/officeDocument/2006/relationships" xmlns:p="http://schemas.openxmlformats.org/presentationml/2006/main">
+  <p:cSld>
+    <p:spTree>
+      <p:nvGrpSpPr>
+        <p:cNvPr id="1" name=""/>
+        <p:cNvGrpSpPr/>
+        <p:nvPr/>
+      </p:nvGrpSpPr>
+      <p:grpSpPr>
+        <a:xfrm>
+          <a:off x="0" y="0"/>
+          <a:ext cx="0" cy="0"/>
+          <a:chOff x="0" y="0"/>
+          <a:chExt cx="0" cy="0"/>
+        </a:xfrm>
+      </p:grpSpPr>
+      <p:grpSp>
+        <p:nvGrpSpPr>
+          <p:cNvPr id="13" name="Group 12"/>
+          <p:cNvGrpSpPr/>
+          <p:nvPr/>
+        </p:nvGrpSpPr>
+        <p:grpSpPr>
+          <a:xfrm>
+            <a:off x="-2253996" y="1899139"/>
+            <a:ext cx="8570781" cy="6706756"/>
+            <a:chOff x="395419" y="703472"/>
+            <a:chExt cx="8570781" cy="6706756"/>
+          </a:xfrm>
+        </p:grpSpPr>
+        <p:pic>
+          <p:nvPicPr>
+            <p:cNvPr id="11" name="Picture 10"/>
+            <p:cNvPicPr>
+              <a:picLocks noChangeAspect="1"/>
+            </p:cNvPicPr>
+            <p:nvPr/>
+          </p:nvPicPr>
+          <p:blipFill>
+            <a:blip r:embed="rId2">
+              <a:extLst>
+                <a:ext uri="{28A0092B-C50C-407E-A947-70E740481C1C}">
+                  <a14:useLocalDpi xmlns:a14="http://schemas.microsoft.com/office/drawing/2010/main" val="0"/>
+                </a:ext>
+              </a:extLst>
+            </a:blip>
+            <a:stretch>
+              <a:fillRect/>
+            </a:stretch>
+          </p:blipFill>
+          <p:spPr>
+            <a:xfrm>
+              <a:off x="3213100" y="703472"/>
+              <a:ext cx="5753100" cy="5080000"/>
+            </a:xfrm>
+            <a:prstGeom prst="rect">
+              <a:avLst/>
+            </a:prstGeom>
+          </p:spPr>
+        </p:pic>
+        <p:pic>
+          <p:nvPicPr>
+            <p:cNvPr id="7" name="Picture 6"/>
+            <p:cNvPicPr>
+              <a:picLocks noChangeAspect="1"/>
+            </p:cNvPicPr>
+            <p:nvPr/>
+          </p:nvPicPr>
+          <p:blipFill rotWithShape="1">
+            <a:blip r:embed="rId3">
+              <a:extLst>
+                <a:ext uri="{28A0092B-C50C-407E-A947-70E740481C1C}">
+                  <a14:useLocalDpi xmlns:a14="http://schemas.microsoft.com/office/drawing/2010/main" val="0"/>
+                </a:ext>
+              </a:extLst>
+            </a:blip>
+            <a:srcRect l="68876"/>
+            <a:stretch/>
+          </p:blipFill>
+          <p:spPr>
+            <a:xfrm>
+              <a:off x="7523301" y="5755762"/>
+              <a:ext cx="990383" cy="1060704"/>
+            </a:xfrm>
+            <a:prstGeom prst="rect">
+              <a:avLst/>
+            </a:prstGeom>
+          </p:spPr>
+        </p:pic>
+        <p:pic>
+          <p:nvPicPr>
+            <p:cNvPr id="8" name="Picture 7"/>
+            <p:cNvPicPr>
+              <a:picLocks noChangeAspect="1"/>
+            </p:cNvPicPr>
+            <p:nvPr/>
+          </p:nvPicPr>
+          <p:blipFill rotWithShape="1">
+            <a:blip r:embed="rId3">
+              <a:extLst>
+                <a:ext uri="{28A0092B-C50C-407E-A947-70E740481C1C}">
+                  <a14:useLocalDpi xmlns:a14="http://schemas.microsoft.com/office/drawing/2010/main" val="0"/>
+                </a:ext>
+              </a:extLst>
+            </a:blip>
+            <a:srcRect l="33873" r="35004"/>
+            <a:stretch/>
+          </p:blipFill>
+          <p:spPr>
+            <a:xfrm>
+              <a:off x="3639316" y="3952158"/>
+              <a:ext cx="987643" cy="1057769"/>
+            </a:xfrm>
+            <a:prstGeom prst="rect">
+              <a:avLst/>
+            </a:prstGeom>
+          </p:spPr>
+        </p:pic>
+        <p:pic>
+          <p:nvPicPr>
+            <p:cNvPr id="9" name="Picture 8"/>
+            <p:cNvPicPr>
+              <a:picLocks noChangeAspect="1"/>
+            </p:cNvPicPr>
+            <p:nvPr/>
+          </p:nvPicPr>
+          <p:blipFill rotWithShape="1">
+            <a:blip r:embed="rId3">
+              <a:extLst>
+                <a:ext uri="{28A0092B-C50C-407E-A947-70E740481C1C}">
+                  <a14:useLocalDpi xmlns:a14="http://schemas.microsoft.com/office/drawing/2010/main" val="0"/>
+                </a:ext>
+              </a:extLst>
+            </a:blip>
+            <a:srcRect r="68876"/>
+            <a:stretch/>
+          </p:blipFill>
+          <p:spPr>
+            <a:xfrm>
+              <a:off x="5237301" y="5755762"/>
+              <a:ext cx="990383" cy="1060704"/>
+            </a:xfrm>
+            <a:prstGeom prst="rect">
+              <a:avLst/>
+            </a:prstGeom>
+          </p:spPr>
+        </p:pic>
+        <p:sp>
+          <p:nvSpPr>
+            <p:cNvPr id="10" name="TextBox 9"/>
+            <p:cNvSpPr txBox="1"/>
+            <p:nvPr/>
+          </p:nvSpPr>
+          <p:spPr>
+            <a:xfrm>
+              <a:off x="395419" y="889000"/>
+              <a:ext cx="2817681" cy="3539430"/>
+            </a:xfrm>
+            <a:prstGeom prst="rect">
+              <a:avLst/>
+            </a:prstGeom>
+            <a:noFill/>
+          </p:spPr>
+          <p:txBody>
+            <a:bodyPr wrap="square" rtlCol="0">
+              <a:spAutoFit/>
+            </a:bodyPr>
+            <a:lstStyle/>
+            <a:p>
+              <a:r>
+                <a:rPr lang="en-US" sz="2400" b="1" dirty="0" smtClean="0"/>
+                <a:t>What class (species) is a flower with the following features? </a:t>
+              </a:r>
+            </a:p>
+            <a:p>
+              <a:endParaRPr lang="en-US" dirty="0" smtClean="0"/>
+            </a:p>
+            <a:p>
+              <a:r>
+                <a:rPr lang="en-US" sz="2000" dirty="0" smtClean="0"/>
+                <a:t>sepal length (cm): 5.8</a:t>
+              </a:r>
+            </a:p>
+            <a:p>
+              <a:r>
+                <a:rPr lang="en-US" sz="2000" dirty="0" smtClean="0"/>
+                <a:t>sepal width (cm): 2.8</a:t>
+              </a:r>
+            </a:p>
+            <a:p>
+              <a:r>
+                <a:rPr lang="en-US" sz="2000" dirty="0" smtClean="0"/>
+                <a:t>petal length (cm): 5.1</a:t>
+              </a:r>
+            </a:p>
+            <a:p>
+              <a:r>
+                <a:rPr lang="en-US" sz="2000" dirty="0" smtClean="0"/>
+                <a:t>petal width (cm): 2.4</a:t>
+              </a:r>
+              <a:endParaRPr lang="en-US" sz="2000" dirty="0"/>
+            </a:p>
+            <a:p>
+              <a:endParaRPr lang="en-US" dirty="0" smtClean="0"/>
+            </a:p>
+            <a:p>
+              <a:endParaRPr lang="en-US" dirty="0"/>
+            </a:p>
+            <a:p>
+              <a:endParaRPr lang="en-US" dirty="0"/>
+            </a:p>
+          </p:txBody>
+        </p:sp>
+        <p:sp>
+          <p:nvSpPr>
+            <p:cNvPr id="12" name="Rectangle 11"/>
+            <p:cNvSpPr/>
+            <p:nvPr/>
+          </p:nvSpPr>
+          <p:spPr>
+            <a:xfrm>
+              <a:off x="2189301" y="7010118"/>
+              <a:ext cx="6096000" cy="400110"/>
+            </a:xfrm>
+            <a:prstGeom prst="rect">
+              <a:avLst/>
+            </a:prstGeom>
+          </p:spPr>
+          <p:txBody>
+            <a:bodyPr>
+              <a:spAutoFit/>
+            </a:bodyPr>
+            <a:lstStyle/>
+            <a:p>
+              <a:r>
+                <a:rPr lang="en-US" sz="2000" dirty="0" smtClean="0"/>
+                <a:t>The prediction is </a:t>
+              </a:r>
+              <a:r>
+                <a:rPr lang="en-US" sz="2000" dirty="0" err="1" smtClean="0"/>
+                <a:t>virginica</a:t>
+              </a:r>
+              <a:r>
+                <a:rPr lang="en-US" sz="2000" dirty="0" smtClean="0"/>
+                <a:t> as it is the majority class. </a:t>
+              </a:r>
+              <a:endParaRPr lang="en-US" sz="2000" dirty="0"/>
+            </a:p>
+          </p:txBody>
+        </p:sp>
+      </p:grpSp>
+      <p:pic>
+        <p:nvPicPr>
+          <p:cNvPr id="14" name="Picture 13"/>
+          <p:cNvPicPr>
+            <a:picLocks noChangeAspect="1"/>
+          </p:cNvPicPr>
+          <p:nvPr/>
+        </p:nvPicPr>
+        <p:blipFill>
+          <a:blip r:embed="rId4">
+            <a:extLst>
+              <a:ext uri="{28A0092B-C50C-407E-A947-70E740481C1C}">
+                <a14:useLocalDpi xmlns:a14="http://schemas.microsoft.com/office/drawing/2010/main" val="0"/>
+              </a:ext>
+            </a:extLst>
+          </a:blip>
+          <a:stretch>
+            <a:fillRect/>
+          </a:stretch>
+        </p:blipFill>
+        <p:spPr>
+          <a:xfrm>
+            <a:off x="9312319" y="-3494753"/>
+            <a:ext cx="4686300" cy="3187700"/>
+          </a:xfrm>
+          <a:prstGeom prst="rect">
+            <a:avLst/>
+          </a:prstGeom>
+          <a:ln w="12700">
+            <a:solidFill>
+              <a:schemeClr val="tx1"/>
+            </a:solidFill>
+          </a:ln>
+        </p:spPr>
+      </p:pic>
+    </p:spTree>
+    <p:extLst>
+      <p:ext uri="{BB962C8B-B14F-4D97-AF65-F5344CB8AC3E}">
+        <p14:creationId xmlns:p14="http://schemas.microsoft.com/office/powerpoint/2010/main" val="461695872"/>
+      </p:ext>
+    </p:extLst>
+  </p:cSld>
+  <p:clrMapOvr>
+    <a:masterClrMapping/>
+  </p:clrMapOvr>
+</p:sld>
+</file>
+
+<file path=ppt/slides/slide16.xml><?xml version="1.0" encoding="utf-8"?>
+<p:sld xmlns:a="http://schemas.openxmlformats.org/drawingml/2006/main" xmlns:r="http://schemas.openxmlformats.org/officeDocument/2006/relationships" xmlns:p="http://schemas.openxmlformats.org/presentationml/2006/main">
+  <p:cSld>
+    <p:spTree>
+      <p:nvGrpSpPr>
+        <p:cNvPr id="1" name=""/>
+        <p:cNvGrpSpPr/>
+        <p:nvPr/>
+      </p:nvGrpSpPr>
+      <p:grpSpPr>
+        <a:xfrm>
+          <a:off x="0" y="0"/>
+          <a:ext cx="0" cy="0"/>
+          <a:chOff x="0" y="0"/>
+          <a:chExt cx="0" cy="0"/>
+        </a:xfrm>
+      </p:grpSpPr>
+      <p:grpSp>
+        <p:nvGrpSpPr>
+          <p:cNvPr id="13" name="Group 12"/>
+          <p:cNvGrpSpPr/>
+          <p:nvPr/>
+        </p:nvGrpSpPr>
+        <p:grpSpPr>
+          <a:xfrm>
+            <a:off x="1148862" y="3346049"/>
+            <a:ext cx="11216054" cy="4176672"/>
+            <a:chOff x="1148862" y="3346049"/>
+            <a:chExt cx="11216054" cy="4176672"/>
+          </a:xfrm>
+        </p:grpSpPr>
+        <p:pic>
+          <p:nvPicPr>
+            <p:cNvPr id="11" name="Picture 10"/>
+            <p:cNvPicPr>
+              <a:picLocks noChangeAspect="1"/>
+            </p:cNvPicPr>
+            <p:nvPr/>
+          </p:nvPicPr>
+          <p:blipFill>
+            <a:blip r:embed="rId2">
+              <a:extLst>
+                <a:ext uri="{28A0092B-C50C-407E-A947-70E740481C1C}">
+                  <a14:useLocalDpi xmlns:a14="http://schemas.microsoft.com/office/drawing/2010/main" val="0"/>
+                </a:ext>
+              </a:extLst>
+            </a:blip>
+            <a:stretch>
+              <a:fillRect/>
+            </a:stretch>
+          </p:blipFill>
+          <p:spPr>
+            <a:xfrm>
+              <a:off x="5049716" y="3346049"/>
+              <a:ext cx="7315200" cy="2743200"/>
+            </a:xfrm>
+            <a:prstGeom prst="rect">
+              <a:avLst/>
+            </a:prstGeom>
+          </p:spPr>
+        </p:pic>
+        <p:grpSp>
+          <p:nvGrpSpPr>
+            <p:cNvPr id="12" name="Group 11"/>
+            <p:cNvGrpSpPr>
+              <a:grpSpLocks noChangeAspect="1"/>
+            </p:cNvGrpSpPr>
+            <p:nvPr/>
+          </p:nvGrpSpPr>
+          <p:grpSpPr>
+            <a:xfrm>
+              <a:off x="1148862" y="3346049"/>
+              <a:ext cx="3900854" cy="4176672"/>
+              <a:chOff x="1032608" y="492457"/>
+              <a:chExt cx="5753100" cy="6159886"/>
+            </a:xfrm>
+          </p:grpSpPr>
+          <p:pic>
+            <p:nvPicPr>
+              <p:cNvPr id="5" name="Picture 4"/>
+              <p:cNvPicPr>
+                <a:picLocks noChangeAspect="1"/>
+              </p:cNvPicPr>
+              <p:nvPr/>
+            </p:nvPicPr>
+            <p:blipFill>
+              <a:blip r:embed="rId3">
+                <a:extLst>
+                  <a:ext uri="{28A0092B-C50C-407E-A947-70E740481C1C}">
+                    <a14:useLocalDpi xmlns:a14="http://schemas.microsoft.com/office/drawing/2010/main" val="0"/>
+                  </a:ext>
+                </a:extLst>
+              </a:blip>
+              <a:stretch>
+                <a:fillRect/>
+              </a:stretch>
+            </p:blipFill>
+            <p:spPr>
+              <a:xfrm>
+                <a:off x="1032608" y="492457"/>
+                <a:ext cx="5753100" cy="5080000"/>
+              </a:xfrm>
+              <a:prstGeom prst="rect">
+                <a:avLst/>
+              </a:prstGeom>
+            </p:spPr>
+          </p:pic>
+          <p:pic>
+            <p:nvPicPr>
+              <p:cNvPr id="6" name="Picture 5"/>
+              <p:cNvPicPr>
+                <a:picLocks noChangeAspect="1"/>
+              </p:cNvPicPr>
+              <p:nvPr/>
+            </p:nvPicPr>
+            <p:blipFill rotWithShape="1">
+              <a:blip r:embed="rId4">
+                <a:extLst>
+                  <a:ext uri="{28A0092B-C50C-407E-A947-70E740481C1C}">
+                    <a14:useLocalDpi xmlns:a14="http://schemas.microsoft.com/office/drawing/2010/main" val="0"/>
+                  </a:ext>
+                </a:extLst>
+              </a:blip>
+              <a:srcRect l="68876"/>
+              <a:stretch/>
+            </p:blipFill>
+            <p:spPr>
+              <a:xfrm>
+                <a:off x="5342809" y="5591639"/>
+                <a:ext cx="990383" cy="1060704"/>
+              </a:xfrm>
+              <a:prstGeom prst="rect">
+                <a:avLst/>
+              </a:prstGeom>
+            </p:spPr>
+          </p:pic>
+          <p:pic>
+            <p:nvPicPr>
+              <p:cNvPr id="7" name="Picture 6"/>
+              <p:cNvPicPr>
+                <a:picLocks noChangeAspect="1"/>
+              </p:cNvPicPr>
+              <p:nvPr/>
+            </p:nvPicPr>
+            <p:blipFill rotWithShape="1">
+              <a:blip r:embed="rId4">
+                <a:extLst>
+                  <a:ext uri="{28A0092B-C50C-407E-A947-70E740481C1C}">
+                    <a14:useLocalDpi xmlns:a14="http://schemas.microsoft.com/office/drawing/2010/main" val="0"/>
+                  </a:ext>
+                </a:extLst>
+              </a:blip>
+              <a:srcRect l="33873" r="35004"/>
+              <a:stretch/>
+            </p:blipFill>
+            <p:spPr>
+              <a:xfrm>
+                <a:off x="1458824" y="3741143"/>
+                <a:ext cx="987643" cy="1057769"/>
+              </a:xfrm>
+              <a:prstGeom prst="rect">
+                <a:avLst/>
+              </a:prstGeom>
+            </p:spPr>
+          </p:pic>
+          <p:pic>
+            <p:nvPicPr>
+              <p:cNvPr id="8" name="Picture 7"/>
+              <p:cNvPicPr>
+                <a:picLocks noChangeAspect="1"/>
+              </p:cNvPicPr>
+              <p:nvPr/>
+            </p:nvPicPr>
+            <p:blipFill rotWithShape="1">
+              <a:blip r:embed="rId4">
+                <a:extLst>
+                  <a:ext uri="{28A0092B-C50C-407E-A947-70E740481C1C}">
+                    <a14:useLocalDpi xmlns:a14="http://schemas.microsoft.com/office/drawing/2010/main" val="0"/>
+                  </a:ext>
+                </a:extLst>
+              </a:blip>
+              <a:srcRect r="68876"/>
+              <a:stretch/>
+            </p:blipFill>
+            <p:spPr>
+              <a:xfrm>
+                <a:off x="3056809" y="5591639"/>
+                <a:ext cx="990383" cy="1060704"/>
+              </a:xfrm>
+              <a:prstGeom prst="rect">
+                <a:avLst/>
+              </a:prstGeom>
+            </p:spPr>
+          </p:pic>
+        </p:grpSp>
+      </p:grpSp>
+    </p:spTree>
+    <p:extLst>
+      <p:ext uri="{BB962C8B-B14F-4D97-AF65-F5344CB8AC3E}">
+        <p14:creationId xmlns:p14="http://schemas.microsoft.com/office/powerpoint/2010/main" val="239750048"/>
+      </p:ext>
+    </p:extLst>
+  </p:cSld>
+  <p:clrMapOvr>
+    <a:masterClrMapping/>
+  </p:clrMapOvr>
+</p:sld>
+</file>
+
+<file path=ppt/slides/slide17.xml><?xml version="1.0" encoding="utf-8"?>
+<p:sld xmlns:a="http://schemas.openxmlformats.org/drawingml/2006/main" xmlns:r="http://schemas.openxmlformats.org/officeDocument/2006/relationships" xmlns:p="http://schemas.openxmlformats.org/presentationml/2006/main">
+  <p:cSld>
+    <p:spTree>
+      <p:nvGrpSpPr>
+        <p:cNvPr id="1" name=""/>
+        <p:cNvGrpSpPr/>
+        <p:nvPr/>
+      </p:nvGrpSpPr>
+      <p:grpSpPr>
+        <a:xfrm>
+          <a:off x="0" y="0"/>
+          <a:ext cx="0" cy="0"/>
+          <a:chOff x="0" y="0"/>
+          <a:chExt cx="0" cy="0"/>
+        </a:xfrm>
+      </p:grpSpPr>
       <p:grpSp>
         <p:nvGrpSpPr>
           <p:cNvPr id="6" name="Group 5"/>
@@ -3502,7 +4321,7 @@
 </p:sld>
 </file>
 
-<file path=ppt/slides/slide11.xml><?xml version="1.0" encoding="utf-8"?>
+<file path=ppt/slides/slide18.xml><?xml version="1.0" encoding="utf-8"?>
 <p:sld xmlns:a="http://schemas.openxmlformats.org/drawingml/2006/main" xmlns:r="http://schemas.openxmlformats.org/officeDocument/2006/relationships" xmlns:p="http://schemas.openxmlformats.org/presentationml/2006/main">
   <p:cSld>
     <p:spTree>
@@ -3758,6 +4577,66 @@
     <p:extLst>
       <p:ext uri="{BB962C8B-B14F-4D97-AF65-F5344CB8AC3E}">
         <p14:creationId xmlns:p14="http://schemas.microsoft.com/office/powerpoint/2010/main" val="208845141"/>
+      </p:ext>
+    </p:extLst>
+  </p:cSld>
+  <p:clrMapOvr>
+    <a:masterClrMapping/>
+  </p:clrMapOvr>
+</p:sld>
+</file>
+
+<file path=ppt/slides/slide19.xml><?xml version="1.0" encoding="utf-8"?>
+<p:sld xmlns:a="http://schemas.openxmlformats.org/drawingml/2006/main" xmlns:r="http://schemas.openxmlformats.org/officeDocument/2006/relationships" xmlns:p="http://schemas.openxmlformats.org/presentationml/2006/main">
+  <p:cSld>
+    <p:spTree>
+      <p:nvGrpSpPr>
+        <p:cNvPr id="1" name=""/>
+        <p:cNvGrpSpPr/>
+        <p:nvPr/>
+      </p:nvGrpSpPr>
+      <p:grpSpPr>
+        <a:xfrm>
+          <a:off x="0" y="0"/>
+          <a:ext cx="0" cy="0"/>
+          <a:chOff x="0" y="0"/>
+          <a:chExt cx="0" cy="0"/>
+        </a:xfrm>
+      </p:grpSpPr>
+      <p:pic>
+        <p:nvPicPr>
+          <p:cNvPr id="4" name="Picture 3"/>
+          <p:cNvPicPr>
+            <a:picLocks noChangeAspect="1"/>
+          </p:cNvPicPr>
+          <p:nvPr/>
+        </p:nvPicPr>
+        <p:blipFill>
+          <a:blip r:embed="rId2">
+            <a:extLst>
+              <a:ext uri="{28A0092B-C50C-407E-A947-70E740481C1C}">
+                <a14:useLocalDpi xmlns:a14="http://schemas.microsoft.com/office/drawing/2010/main" val="0"/>
+              </a:ext>
+            </a:extLst>
+          </a:blip>
+          <a:stretch>
+            <a:fillRect/>
+          </a:stretch>
+        </p:blipFill>
+        <p:spPr>
+          <a:xfrm>
+            <a:off x="3759200" y="1828800"/>
+            <a:ext cx="4660900" cy="3187700"/>
+          </a:xfrm>
+          <a:prstGeom prst="rect">
+            <a:avLst/>
+          </a:prstGeom>
+        </p:spPr>
+      </p:pic>
+    </p:spTree>
+    <p:extLst>
+      <p:ext uri="{BB962C8B-B14F-4D97-AF65-F5344CB8AC3E}">
+        <p14:creationId xmlns:p14="http://schemas.microsoft.com/office/powerpoint/2010/main" val="1165698673"/>
       </p:ext>
     </p:extLst>
   </p:cSld>
@@ -5271,13 +6150,13 @@
       </p:grpSpPr>
       <p:pic>
         <p:nvPicPr>
-          <p:cNvPr id="4" name="Picture 3"/>
+          <p:cNvPr id="10" name="Picture 9"/>
           <p:cNvPicPr>
             <a:picLocks noChangeAspect="1"/>
           </p:cNvPicPr>
           <p:nvPr/>
         </p:nvPicPr>
-        <p:blipFill>
+        <p:blipFill rotWithShape="1">
           <a:blip r:embed="rId2">
             <a:extLst>
               <a:ext uri="{28A0092B-C50C-407E-A947-70E740481C1C}">
@@ -5285,24 +6164,670 @@
               </a:ext>
             </a:extLst>
           </a:blip>
-          <a:stretch>
-            <a:fillRect/>
-          </a:stretch>
+          <a:srcRect l="68876"/>
+          <a:stretch/>
         </p:blipFill>
         <p:spPr>
           <a:xfrm>
-            <a:off x="3759200" y="1828800"/>
-            <a:ext cx="4660900" cy="3187700"/>
+            <a:off x="3731772" y="10466017"/>
+            <a:ext cx="738954" cy="791423"/>
           </a:xfrm>
           <a:prstGeom prst="rect">
             <a:avLst/>
           </a:prstGeom>
         </p:spPr>
       </p:pic>
+      <p:pic>
+        <p:nvPicPr>
+          <p:cNvPr id="12" name="Picture 11"/>
+          <p:cNvPicPr>
+            <a:picLocks noChangeAspect="1"/>
+          </p:cNvPicPr>
+          <p:nvPr/>
+        </p:nvPicPr>
+        <p:blipFill rotWithShape="1">
+          <a:blip r:embed="rId2">
+            <a:extLst>
+              <a:ext uri="{28A0092B-C50C-407E-A947-70E740481C1C}">
+                <a14:useLocalDpi xmlns:a14="http://schemas.microsoft.com/office/drawing/2010/main" val="0"/>
+              </a:ext>
+            </a:extLst>
+          </a:blip>
+          <a:srcRect r="68876"/>
+          <a:stretch/>
+        </p:blipFill>
+        <p:spPr>
+          <a:xfrm>
+            <a:off x="2066198" y="10466018"/>
+            <a:ext cx="738954" cy="791423"/>
+          </a:xfrm>
+          <a:prstGeom prst="rect">
+            <a:avLst/>
+          </a:prstGeom>
+        </p:spPr>
+      </p:pic>
+      <p:sp>
+        <p:nvSpPr>
+          <p:cNvPr id="14" name="Rectangle 13"/>
+          <p:cNvSpPr/>
+          <p:nvPr/>
+        </p:nvSpPr>
+        <p:spPr>
+          <a:xfrm>
+            <a:off x="-1384395" y="11413525"/>
+            <a:ext cx="8209188" cy="769441"/>
+          </a:xfrm>
+          <a:prstGeom prst="rect">
+            <a:avLst/>
+          </a:prstGeom>
+        </p:spPr>
+        <p:txBody>
+          <a:bodyPr wrap="square">
+            <a:spAutoFit/>
+          </a:bodyPr>
+          <a:lstStyle/>
+          <a:p>
+            <a:pPr algn="ctr"/>
+            <a:r>
+              <a:rPr lang="en-US" sz="2200" dirty="0" smtClean="0"/>
+              <a:t>Species counts are: </a:t>
+            </a:r>
+            <a:r>
+              <a:rPr lang="en-US" sz="2200" dirty="0" err="1" smtClean="0"/>
+              <a:t>setosa</a:t>
+            </a:r>
+            <a:r>
+              <a:rPr lang="en-US" sz="2200" dirty="0" smtClean="0"/>
+              <a:t>=0, versicolor=38, </a:t>
+            </a:r>
+            <a:r>
+              <a:rPr lang="en-US" sz="2200" dirty="0" err="1" smtClean="0"/>
+              <a:t>virginica</a:t>
+            </a:r>
+            <a:r>
+              <a:rPr lang="en-US" sz="2200" dirty="0" smtClean="0"/>
+              <a:t>=3</a:t>
+            </a:r>
+          </a:p>
+          <a:p>
+            <a:pPr algn="ctr"/>
+            <a:r>
+              <a:rPr lang="en-US" sz="2200" dirty="0" smtClean="0"/>
+              <a:t>Prediction is </a:t>
+            </a:r>
+            <a:r>
+              <a:rPr lang="en-US" sz="2200" b="1" dirty="0" smtClean="0"/>
+              <a:t>versicolor</a:t>
+            </a:r>
+            <a:r>
+              <a:rPr lang="en-US" sz="2200" dirty="0" smtClean="0"/>
+              <a:t> as it is the majority class</a:t>
+            </a:r>
+          </a:p>
+        </p:txBody>
+      </p:sp>
+      <p:grpSp>
+        <p:nvGrpSpPr>
+          <p:cNvPr id="2" name="Group 1"/>
+          <p:cNvGrpSpPr/>
+          <p:nvPr/>
+        </p:nvGrpSpPr>
+        <p:grpSpPr>
+          <a:xfrm>
+            <a:off x="-2628527" y="-438505"/>
+            <a:ext cx="20328087" cy="6989666"/>
+            <a:chOff x="-2628527" y="-438505"/>
+            <a:chExt cx="20328087" cy="6989666"/>
+          </a:xfrm>
+        </p:grpSpPr>
+        <p:pic>
+          <p:nvPicPr>
+            <p:cNvPr id="23" name="Picture 22"/>
+            <p:cNvPicPr>
+              <a:picLocks noChangeAspect="1"/>
+            </p:cNvPicPr>
+            <p:nvPr/>
+          </p:nvPicPr>
+          <p:blipFill>
+            <a:blip r:embed="rId3">
+              <a:extLst>
+                <a:ext uri="{28A0092B-C50C-407E-A947-70E740481C1C}">
+                  <a14:useLocalDpi xmlns:a14="http://schemas.microsoft.com/office/drawing/2010/main" val="0"/>
+                </a:ext>
+              </a:extLst>
+            </a:blip>
+            <a:stretch>
+              <a:fillRect/>
+            </a:stretch>
+          </p:blipFill>
+          <p:spPr>
+            <a:xfrm>
+              <a:off x="10666236" y="1321027"/>
+              <a:ext cx="5857461" cy="4572920"/>
+            </a:xfrm>
+            <a:prstGeom prst="rect">
+              <a:avLst/>
+            </a:prstGeom>
+            <a:ln w="12700">
+              <a:noFill/>
+            </a:ln>
+          </p:spPr>
+        </p:pic>
+        <p:pic>
+          <p:nvPicPr>
+            <p:cNvPr id="4" name="Picture 3"/>
+            <p:cNvPicPr>
+              <a:picLocks noChangeAspect="1"/>
+            </p:cNvPicPr>
+            <p:nvPr/>
+          </p:nvPicPr>
+          <p:blipFill>
+            <a:blip r:embed="rId4">
+              <a:extLst>
+                <a:ext uri="{28A0092B-C50C-407E-A947-70E740481C1C}">
+                  <a14:useLocalDpi xmlns:a14="http://schemas.microsoft.com/office/drawing/2010/main" val="0"/>
+                </a:ext>
+              </a:extLst>
+            </a:blip>
+            <a:stretch>
+              <a:fillRect/>
+            </a:stretch>
+          </p:blipFill>
+          <p:spPr>
+            <a:xfrm>
+              <a:off x="-1694836" y="1321027"/>
+              <a:ext cx="6341807" cy="4572920"/>
+            </a:xfrm>
+            <a:prstGeom prst="rect">
+              <a:avLst/>
+            </a:prstGeom>
+            <a:ln w="12700">
+              <a:noFill/>
+            </a:ln>
+          </p:spPr>
+        </p:pic>
+        <p:pic>
+          <p:nvPicPr>
+            <p:cNvPr id="5" name="Picture 4"/>
+            <p:cNvPicPr>
+              <a:picLocks noChangeAspect="1"/>
+            </p:cNvPicPr>
+            <p:nvPr/>
+          </p:nvPicPr>
+          <p:blipFill>
+            <a:blip r:embed="rId5">
+              <a:extLst>
+                <a:ext uri="{28A0092B-C50C-407E-A947-70E740481C1C}">
+                  <a14:useLocalDpi xmlns:a14="http://schemas.microsoft.com/office/drawing/2010/main" val="0"/>
+                </a:ext>
+              </a:extLst>
+            </a:blip>
+            <a:stretch>
+              <a:fillRect/>
+            </a:stretch>
+          </p:blipFill>
+          <p:spPr>
+            <a:xfrm>
+              <a:off x="5114572" y="1321027"/>
+              <a:ext cx="5084063" cy="4572920"/>
+            </a:xfrm>
+            <a:prstGeom prst="rect">
+              <a:avLst/>
+            </a:prstGeom>
+            <a:ln w="12700">
+              <a:noFill/>
+            </a:ln>
+          </p:spPr>
+        </p:pic>
+        <p:sp>
+          <p:nvSpPr>
+            <p:cNvPr id="15" name="TextBox 14"/>
+            <p:cNvSpPr txBox="1"/>
+            <p:nvPr/>
+          </p:nvSpPr>
+          <p:spPr>
+            <a:xfrm>
+              <a:off x="14688369" y="990108"/>
+              <a:ext cx="1920240" cy="292447"/>
+            </a:xfrm>
+            <a:prstGeom prst="rect">
+              <a:avLst/>
+            </a:prstGeom>
+            <a:noFill/>
+          </p:spPr>
+          <p:txBody>
+            <a:bodyPr wrap="square" rtlCol="0">
+              <a:spAutoFit/>
+            </a:bodyPr>
+            <a:lstStyle/>
+            <a:p>
+              <a:r>
+                <a:rPr lang="en-US" sz="1300" dirty="0" smtClean="0"/>
+                <a:t>Decision Node </a:t>
+              </a:r>
+              <a:endParaRPr lang="en-US" sz="1300" dirty="0"/>
+            </a:p>
+          </p:txBody>
+        </p:sp>
+        <p:sp>
+          <p:nvSpPr>
+            <p:cNvPr id="16" name="TextBox 15"/>
+            <p:cNvSpPr txBox="1"/>
+            <p:nvPr/>
+          </p:nvSpPr>
+          <p:spPr>
+            <a:xfrm>
+              <a:off x="14691642" y="673841"/>
+              <a:ext cx="1554480" cy="292447"/>
+            </a:xfrm>
+            <a:prstGeom prst="rect">
+              <a:avLst/>
+            </a:prstGeom>
+            <a:noFill/>
+          </p:spPr>
+          <p:txBody>
+            <a:bodyPr wrap="square" rtlCol="0">
+              <a:spAutoFit/>
+            </a:bodyPr>
+            <a:lstStyle/>
+            <a:p>
+              <a:r>
+                <a:rPr lang="en-US" sz="1300" dirty="0" smtClean="0"/>
+                <a:t>Root Node</a:t>
+              </a:r>
+              <a:endParaRPr lang="en-US" sz="1300" dirty="0"/>
+            </a:p>
+          </p:txBody>
+        </p:sp>
+        <p:sp>
+          <p:nvSpPr>
+            <p:cNvPr id="17" name="Rectangle 16"/>
+            <p:cNvSpPr/>
+            <p:nvPr/>
+          </p:nvSpPr>
+          <p:spPr>
+            <a:xfrm>
+              <a:off x="14446546" y="1067850"/>
+              <a:ext cx="137160" cy="137188"/>
+            </a:xfrm>
+            <a:prstGeom prst="rect">
+              <a:avLst/>
+            </a:prstGeom>
+            <a:solidFill>
+              <a:srgbClr val="0000FF"/>
+            </a:solidFill>
+            <a:ln>
+              <a:solidFill>
+                <a:schemeClr val="tx1"/>
+              </a:solidFill>
+            </a:ln>
+          </p:spPr>
+          <p:style>
+            <a:lnRef idx="2">
+              <a:schemeClr val="accent1">
+                <a:shade val="50000"/>
+              </a:schemeClr>
+            </a:lnRef>
+            <a:fillRef idx="1">
+              <a:schemeClr val="accent1"/>
+            </a:fillRef>
+            <a:effectRef idx="0">
+              <a:schemeClr val="accent1"/>
+            </a:effectRef>
+            <a:fontRef idx="minor">
+              <a:schemeClr val="lt1"/>
+            </a:fontRef>
+          </p:style>
+          <p:txBody>
+            <a:bodyPr rtlCol="0" anchor="ctr"/>
+            <a:lstStyle/>
+            <a:p>
+              <a:pPr algn="ctr"/>
+              <a:endParaRPr lang="en-US">
+                <a:solidFill>
+                  <a:srgbClr val="0000FF"/>
+                </a:solidFill>
+              </a:endParaRPr>
+            </a:p>
+          </p:txBody>
+        </p:sp>
+        <p:sp>
+          <p:nvSpPr>
+            <p:cNvPr id="18" name="Rectangle 17"/>
+            <p:cNvSpPr/>
+            <p:nvPr/>
+          </p:nvSpPr>
+          <p:spPr>
+            <a:xfrm>
+              <a:off x="14347964" y="611847"/>
+              <a:ext cx="1999102" cy="1057257"/>
+            </a:xfrm>
+            <a:prstGeom prst="rect">
+              <a:avLst/>
+            </a:prstGeom>
+            <a:noFill/>
+            <a:ln w="6350">
+              <a:solidFill>
+                <a:schemeClr val="tx1">
+                  <a:alpha val="32000"/>
+                </a:schemeClr>
+              </a:solidFill>
+            </a:ln>
+          </p:spPr>
+          <p:style>
+            <a:lnRef idx="2">
+              <a:schemeClr val="accent1">
+                <a:shade val="50000"/>
+              </a:schemeClr>
+            </a:lnRef>
+            <a:fillRef idx="1">
+              <a:schemeClr val="accent1"/>
+            </a:fillRef>
+            <a:effectRef idx="0">
+              <a:schemeClr val="accent1"/>
+            </a:effectRef>
+            <a:fontRef idx="minor">
+              <a:schemeClr val="lt1"/>
+            </a:fontRef>
+          </p:style>
+          <p:txBody>
+            <a:bodyPr rtlCol="0" anchor="ctr"/>
+            <a:lstStyle/>
+            <a:p>
+              <a:pPr algn="ctr"/>
+              <a:endParaRPr lang="en-US"/>
+            </a:p>
+          </p:txBody>
+        </p:sp>
+        <p:sp>
+          <p:nvSpPr>
+            <p:cNvPr id="19" name="Rectangle 18"/>
+            <p:cNvSpPr/>
+            <p:nvPr/>
+          </p:nvSpPr>
+          <p:spPr>
+            <a:xfrm>
+              <a:off x="13800419" y="239564"/>
+              <a:ext cx="3094191" cy="400190"/>
+            </a:xfrm>
+            <a:prstGeom prst="rect">
+              <a:avLst/>
+            </a:prstGeom>
+          </p:spPr>
+          <p:txBody>
+            <a:bodyPr wrap="square">
+              <a:spAutoFit/>
+            </a:bodyPr>
+            <a:lstStyle/>
+            <a:p>
+              <a:pPr algn="ctr"/>
+              <a:r>
+                <a:rPr lang="en-US" sz="2000" dirty="0" smtClean="0"/>
+                <a:t>Type of Node</a:t>
+              </a:r>
+              <a:endParaRPr lang="en-US" sz="2000" dirty="0"/>
+            </a:p>
+          </p:txBody>
+        </p:sp>
+        <p:sp>
+          <p:nvSpPr>
+            <p:cNvPr id="20" name="Rectangle 19"/>
+            <p:cNvSpPr/>
+            <p:nvPr/>
+          </p:nvSpPr>
+          <p:spPr>
+            <a:xfrm>
+              <a:off x="14450625" y="1387955"/>
+              <a:ext cx="137160" cy="137188"/>
+            </a:xfrm>
+            <a:prstGeom prst="rect">
+              <a:avLst/>
+            </a:prstGeom>
+            <a:solidFill>
+              <a:srgbClr val="008000"/>
+            </a:solidFill>
+            <a:ln>
+              <a:solidFill>
+                <a:schemeClr val="tx1"/>
+              </a:solidFill>
+            </a:ln>
+          </p:spPr>
+          <p:style>
+            <a:lnRef idx="2">
+              <a:schemeClr val="accent1">
+                <a:shade val="50000"/>
+              </a:schemeClr>
+            </a:lnRef>
+            <a:fillRef idx="1">
+              <a:schemeClr val="accent1"/>
+            </a:fillRef>
+            <a:effectRef idx="0">
+              <a:schemeClr val="accent1"/>
+            </a:effectRef>
+            <a:fontRef idx="minor">
+              <a:schemeClr val="lt1"/>
+            </a:fontRef>
+          </p:style>
+          <p:txBody>
+            <a:bodyPr rtlCol="0" anchor="ctr"/>
+            <a:lstStyle/>
+            <a:p>
+              <a:pPr algn="ctr"/>
+              <a:endParaRPr lang="en-US"/>
+            </a:p>
+          </p:txBody>
+        </p:sp>
+        <p:sp>
+          <p:nvSpPr>
+            <p:cNvPr id="21" name="TextBox 20"/>
+            <p:cNvSpPr txBox="1"/>
+            <p:nvPr/>
+          </p:nvSpPr>
+          <p:spPr>
+            <a:xfrm>
+              <a:off x="14691642" y="1314075"/>
+              <a:ext cx="1920240" cy="292447"/>
+            </a:xfrm>
+            <a:prstGeom prst="rect">
+              <a:avLst/>
+            </a:prstGeom>
+            <a:noFill/>
+          </p:spPr>
+          <p:txBody>
+            <a:bodyPr wrap="square" rtlCol="0">
+              <a:spAutoFit/>
+            </a:bodyPr>
+            <a:lstStyle/>
+            <a:p>
+              <a:r>
+                <a:rPr lang="en-US" sz="1300" dirty="0" smtClean="0"/>
+                <a:t>Leaf/Terminal Node </a:t>
+              </a:r>
+              <a:endParaRPr lang="en-US" sz="1300" dirty="0"/>
+            </a:p>
+          </p:txBody>
+        </p:sp>
+        <p:sp>
+          <p:nvSpPr>
+            <p:cNvPr id="22" name="Rectangle 21"/>
+            <p:cNvSpPr/>
+            <p:nvPr/>
+          </p:nvSpPr>
+          <p:spPr>
+            <a:xfrm>
+              <a:off x="14450625" y="747746"/>
+              <a:ext cx="137160" cy="137188"/>
+            </a:xfrm>
+            <a:prstGeom prst="rect">
+              <a:avLst/>
+            </a:prstGeom>
+            <a:solidFill>
+              <a:srgbClr val="D2691E"/>
+            </a:solidFill>
+            <a:ln>
+              <a:solidFill>
+                <a:schemeClr val="tx1"/>
+              </a:solidFill>
+            </a:ln>
+          </p:spPr>
+          <p:style>
+            <a:lnRef idx="2">
+              <a:schemeClr val="accent1">
+                <a:shade val="50000"/>
+              </a:schemeClr>
+            </a:lnRef>
+            <a:fillRef idx="1">
+              <a:schemeClr val="accent1"/>
+            </a:fillRef>
+            <a:effectRef idx="0">
+              <a:schemeClr val="accent1"/>
+            </a:effectRef>
+            <a:fontRef idx="minor">
+              <a:schemeClr val="lt1"/>
+            </a:fontRef>
+          </p:style>
+          <p:txBody>
+            <a:bodyPr rtlCol="0" anchor="ctr"/>
+            <a:lstStyle/>
+            <a:p>
+              <a:pPr algn="ctr"/>
+              <a:endParaRPr lang="en-US">
+                <a:solidFill>
+                  <a:srgbClr val="0000FF"/>
+                </a:solidFill>
+              </a:endParaRPr>
+            </a:p>
+          </p:txBody>
+        </p:sp>
+        <p:sp>
+          <p:nvSpPr>
+            <p:cNvPr id="32" name="TextBox 31"/>
+            <p:cNvSpPr txBox="1"/>
+            <p:nvPr/>
+          </p:nvSpPr>
+          <p:spPr>
+            <a:xfrm>
+              <a:off x="3084603" y="-438505"/>
+              <a:ext cx="9144000" cy="1415772"/>
+            </a:xfrm>
+            <a:prstGeom prst="rect">
+              <a:avLst/>
+            </a:prstGeom>
+            <a:noFill/>
+          </p:spPr>
+          <p:txBody>
+            <a:bodyPr wrap="square" rtlCol="0">
+              <a:spAutoFit/>
+            </a:bodyPr>
+            <a:lstStyle/>
+            <a:p>
+              <a:pPr algn="ctr"/>
+              <a:r>
+                <a:rPr lang="en-US" sz="5000" b="1" dirty="0" smtClean="0"/>
+                <a:t>Depth of Classification Trees</a:t>
+              </a:r>
+              <a:endParaRPr lang="en-US" sz="5000" dirty="0" smtClean="0"/>
+            </a:p>
+            <a:p>
+              <a:endParaRPr lang="en-US" dirty="0"/>
+            </a:p>
+            <a:p>
+              <a:endParaRPr lang="en-US" dirty="0"/>
+            </a:p>
+          </p:txBody>
+        </p:sp>
+        <p:sp>
+          <p:nvSpPr>
+            <p:cNvPr id="35" name="Rectangle 34"/>
+            <p:cNvSpPr/>
+            <p:nvPr/>
+          </p:nvSpPr>
+          <p:spPr>
+            <a:xfrm>
+              <a:off x="-2628527" y="5997052"/>
+              <a:ext cx="8209188" cy="554109"/>
+            </a:xfrm>
+            <a:prstGeom prst="rect">
+              <a:avLst/>
+            </a:prstGeom>
+          </p:spPr>
+          <p:txBody>
+            <a:bodyPr wrap="square">
+              <a:spAutoFit/>
+            </a:bodyPr>
+            <a:lstStyle/>
+            <a:p>
+              <a:pPr algn="ctr"/>
+              <a:r>
+                <a:rPr lang="en-US" sz="3000" dirty="0" smtClean="0"/>
+                <a:t>Depth = 1</a:t>
+              </a:r>
+            </a:p>
+          </p:txBody>
+        </p:sp>
+        <p:sp>
+          <p:nvSpPr>
+            <p:cNvPr id="36" name="Rectangle 35"/>
+            <p:cNvSpPr/>
+            <p:nvPr/>
+          </p:nvSpPr>
+          <p:spPr>
+            <a:xfrm>
+              <a:off x="3552009" y="5997051"/>
+              <a:ext cx="8209188" cy="554109"/>
+            </a:xfrm>
+            <a:prstGeom prst="rect">
+              <a:avLst/>
+            </a:prstGeom>
+          </p:spPr>
+          <p:txBody>
+            <a:bodyPr wrap="square">
+              <a:spAutoFit/>
+            </a:bodyPr>
+            <a:lstStyle/>
+            <a:p>
+              <a:pPr algn="ctr"/>
+              <a:r>
+                <a:rPr lang="en-US" sz="3000" dirty="0" smtClean="0"/>
+                <a:t>Depth = 2</a:t>
+              </a:r>
+            </a:p>
+          </p:txBody>
+        </p:sp>
+        <p:sp>
+          <p:nvSpPr>
+            <p:cNvPr id="37" name="Rectangle 36"/>
+            <p:cNvSpPr/>
+            <p:nvPr/>
+          </p:nvSpPr>
+          <p:spPr>
+            <a:xfrm>
+              <a:off x="9490372" y="5960874"/>
+              <a:ext cx="8209188" cy="554109"/>
+            </a:xfrm>
+            <a:prstGeom prst="rect">
+              <a:avLst/>
+            </a:prstGeom>
+          </p:spPr>
+          <p:txBody>
+            <a:bodyPr wrap="square">
+              <a:spAutoFit/>
+            </a:bodyPr>
+            <a:lstStyle/>
+            <a:p>
+              <a:pPr algn="ctr"/>
+              <a:r>
+                <a:rPr lang="en-US" sz="3000" dirty="0" smtClean="0"/>
+                <a:t>Depth = 3</a:t>
+              </a:r>
+            </a:p>
+          </p:txBody>
+        </p:sp>
+      </p:grpSp>
     </p:spTree>
     <p:extLst>
       <p:ext uri="{BB962C8B-B14F-4D97-AF65-F5344CB8AC3E}">
-        <p14:creationId xmlns:p14="http://schemas.microsoft.com/office/powerpoint/2010/main" val="1165698673"/>
+        <p14:creationId xmlns:p14="http://schemas.microsoft.com/office/powerpoint/2010/main" val="930359355"/>
       </p:ext>
     </p:extLst>
   </p:cSld>
@@ -5329,10 +6854,48 @@
           <a:chExt cx="0" cy="0"/>
         </a:xfrm>
       </p:grpSpPr>
+      <p:sp>
+        <p:nvSpPr>
+          <p:cNvPr id="2" name="Title 1"/>
+          <p:cNvSpPr>
+            <a:spLocks noGrp="1"/>
+          </p:cNvSpPr>
+          <p:nvPr>
+            <p:ph type="title"/>
+          </p:nvPr>
+        </p:nvSpPr>
+        <p:spPr/>
+        <p:txBody>
+          <a:bodyPr/>
+          <a:lstStyle/>
+          <a:p>
+            <a:endParaRPr lang="en-US"/>
+          </a:p>
+        </p:txBody>
+      </p:sp>
+      <p:sp>
+        <p:nvSpPr>
+          <p:cNvPr id="3" name="Content Placeholder 2"/>
+          <p:cNvSpPr>
+            <a:spLocks noGrp="1"/>
+          </p:cNvSpPr>
+          <p:nvPr>
+            <p:ph idx="1"/>
+          </p:nvPr>
+        </p:nvSpPr>
+        <p:spPr/>
+        <p:txBody>
+          <a:bodyPr/>
+          <a:lstStyle/>
+          <a:p>
+            <a:endParaRPr lang="en-US"/>
+          </a:p>
+        </p:txBody>
+      </p:sp>
     </p:spTree>
     <p:extLst>
       <p:ext uri="{BB962C8B-B14F-4D97-AF65-F5344CB8AC3E}">
-        <p14:creationId xmlns:p14="http://schemas.microsoft.com/office/powerpoint/2010/main" val="1437185423"/>
+        <p14:creationId xmlns:p14="http://schemas.microsoft.com/office/powerpoint/2010/main" val="1712686614"/>
       </p:ext>
     </p:extLst>
   </p:cSld>
@@ -5359,280 +6922,48 @@
           <a:chExt cx="0" cy="0"/>
         </a:xfrm>
       </p:grpSpPr>
-      <p:grpSp>
-        <p:nvGrpSpPr>
-          <p:cNvPr id="13" name="Group 12"/>
-          <p:cNvGrpSpPr/>
-          <p:nvPr/>
-        </p:nvGrpSpPr>
-        <p:grpSpPr>
-          <a:xfrm>
-            <a:off x="-2253996" y="1899139"/>
-            <a:ext cx="8570781" cy="6706756"/>
-            <a:chOff x="395419" y="703472"/>
-            <a:chExt cx="8570781" cy="6706756"/>
-          </a:xfrm>
-        </p:grpSpPr>
-        <p:pic>
-          <p:nvPicPr>
-            <p:cNvPr id="11" name="Picture 10"/>
-            <p:cNvPicPr>
-              <a:picLocks noChangeAspect="1"/>
-            </p:cNvPicPr>
-            <p:nvPr/>
-          </p:nvPicPr>
-          <p:blipFill>
-            <a:blip r:embed="rId2">
-              <a:extLst>
-                <a:ext uri="{28A0092B-C50C-407E-A947-70E740481C1C}">
-                  <a14:useLocalDpi xmlns:a14="http://schemas.microsoft.com/office/drawing/2010/main" val="0"/>
-                </a:ext>
-              </a:extLst>
-            </a:blip>
-            <a:stretch>
-              <a:fillRect/>
-            </a:stretch>
-          </p:blipFill>
-          <p:spPr>
-            <a:xfrm>
-              <a:off x="3213100" y="703472"/>
-              <a:ext cx="5753100" cy="5080000"/>
-            </a:xfrm>
-            <a:prstGeom prst="rect">
-              <a:avLst/>
-            </a:prstGeom>
-          </p:spPr>
-        </p:pic>
-        <p:pic>
-          <p:nvPicPr>
-            <p:cNvPr id="7" name="Picture 6"/>
-            <p:cNvPicPr>
-              <a:picLocks noChangeAspect="1"/>
-            </p:cNvPicPr>
-            <p:nvPr/>
-          </p:nvPicPr>
-          <p:blipFill rotWithShape="1">
-            <a:blip r:embed="rId3">
-              <a:extLst>
-                <a:ext uri="{28A0092B-C50C-407E-A947-70E740481C1C}">
-                  <a14:useLocalDpi xmlns:a14="http://schemas.microsoft.com/office/drawing/2010/main" val="0"/>
-                </a:ext>
-              </a:extLst>
-            </a:blip>
-            <a:srcRect l="68876"/>
-            <a:stretch/>
-          </p:blipFill>
-          <p:spPr>
-            <a:xfrm>
-              <a:off x="7523301" y="5755762"/>
-              <a:ext cx="990383" cy="1060704"/>
-            </a:xfrm>
-            <a:prstGeom prst="rect">
-              <a:avLst/>
-            </a:prstGeom>
-          </p:spPr>
-        </p:pic>
-        <p:pic>
-          <p:nvPicPr>
-            <p:cNvPr id="8" name="Picture 7"/>
-            <p:cNvPicPr>
-              <a:picLocks noChangeAspect="1"/>
-            </p:cNvPicPr>
-            <p:nvPr/>
-          </p:nvPicPr>
-          <p:blipFill rotWithShape="1">
-            <a:blip r:embed="rId3">
-              <a:extLst>
-                <a:ext uri="{28A0092B-C50C-407E-A947-70E740481C1C}">
-                  <a14:useLocalDpi xmlns:a14="http://schemas.microsoft.com/office/drawing/2010/main" val="0"/>
-                </a:ext>
-              </a:extLst>
-            </a:blip>
-            <a:srcRect l="33873" r="35004"/>
-            <a:stretch/>
-          </p:blipFill>
-          <p:spPr>
-            <a:xfrm>
-              <a:off x="3639316" y="3952158"/>
-              <a:ext cx="987643" cy="1057769"/>
-            </a:xfrm>
-            <a:prstGeom prst="rect">
-              <a:avLst/>
-            </a:prstGeom>
-          </p:spPr>
-        </p:pic>
-        <p:pic>
-          <p:nvPicPr>
-            <p:cNvPr id="9" name="Picture 8"/>
-            <p:cNvPicPr>
-              <a:picLocks noChangeAspect="1"/>
-            </p:cNvPicPr>
-            <p:nvPr/>
-          </p:nvPicPr>
-          <p:blipFill rotWithShape="1">
-            <a:blip r:embed="rId3">
-              <a:extLst>
-                <a:ext uri="{28A0092B-C50C-407E-A947-70E740481C1C}">
-                  <a14:useLocalDpi xmlns:a14="http://schemas.microsoft.com/office/drawing/2010/main" val="0"/>
-                </a:ext>
-              </a:extLst>
-            </a:blip>
-            <a:srcRect r="68876"/>
-            <a:stretch/>
-          </p:blipFill>
-          <p:spPr>
-            <a:xfrm>
-              <a:off x="5237301" y="5755762"/>
-              <a:ext cx="990383" cy="1060704"/>
-            </a:xfrm>
-            <a:prstGeom prst="rect">
-              <a:avLst/>
-            </a:prstGeom>
-          </p:spPr>
-        </p:pic>
-        <p:sp>
-          <p:nvSpPr>
-            <p:cNvPr id="10" name="TextBox 9"/>
-            <p:cNvSpPr txBox="1"/>
-            <p:nvPr/>
-          </p:nvSpPr>
-          <p:spPr>
-            <a:xfrm>
-              <a:off x="395419" y="889000"/>
-              <a:ext cx="2817681" cy="3539430"/>
-            </a:xfrm>
-            <a:prstGeom prst="rect">
-              <a:avLst/>
-            </a:prstGeom>
-            <a:noFill/>
-          </p:spPr>
-          <p:txBody>
-            <a:bodyPr wrap="square" rtlCol="0">
-              <a:spAutoFit/>
-            </a:bodyPr>
-            <a:lstStyle/>
-            <a:p>
-              <a:r>
-                <a:rPr lang="en-US" sz="2400" b="1" dirty="0" smtClean="0"/>
-                <a:t>What class (species) is a flower with the following features? </a:t>
-              </a:r>
-            </a:p>
-            <a:p>
-              <a:endParaRPr lang="en-US" dirty="0" smtClean="0"/>
-            </a:p>
-            <a:p>
-              <a:r>
-                <a:rPr lang="en-US" sz="2000" dirty="0" smtClean="0"/>
-                <a:t>sepal length (cm): 5.8</a:t>
-              </a:r>
-            </a:p>
-            <a:p>
-              <a:r>
-                <a:rPr lang="en-US" sz="2000" dirty="0" smtClean="0"/>
-                <a:t>sepal width (cm): 2.8</a:t>
-              </a:r>
-            </a:p>
-            <a:p>
-              <a:r>
-                <a:rPr lang="en-US" sz="2000" dirty="0" smtClean="0"/>
-                <a:t>petal length (cm): 5.1</a:t>
-              </a:r>
-            </a:p>
-            <a:p>
-              <a:r>
-                <a:rPr lang="en-US" sz="2000" dirty="0" smtClean="0"/>
-                <a:t>petal width (cm): 2.4</a:t>
-              </a:r>
-              <a:endParaRPr lang="en-US" sz="2000" dirty="0"/>
-            </a:p>
-            <a:p>
-              <a:endParaRPr lang="en-US" dirty="0" smtClean="0"/>
-            </a:p>
-            <a:p>
-              <a:endParaRPr lang="en-US" dirty="0"/>
-            </a:p>
-            <a:p>
-              <a:endParaRPr lang="en-US" dirty="0"/>
-            </a:p>
-          </p:txBody>
-        </p:sp>
-        <p:sp>
-          <p:nvSpPr>
-            <p:cNvPr id="12" name="Rectangle 11"/>
-            <p:cNvSpPr/>
-            <p:nvPr/>
-          </p:nvSpPr>
-          <p:spPr>
-            <a:xfrm>
-              <a:off x="2189301" y="7010118"/>
-              <a:ext cx="6096000" cy="400110"/>
-            </a:xfrm>
-            <a:prstGeom prst="rect">
-              <a:avLst/>
-            </a:prstGeom>
-          </p:spPr>
-          <p:txBody>
-            <a:bodyPr>
-              <a:spAutoFit/>
-            </a:bodyPr>
-            <a:lstStyle/>
-            <a:p>
-              <a:r>
-                <a:rPr lang="en-US" sz="2000" dirty="0" smtClean="0"/>
-                <a:t>The prediction is </a:t>
-              </a:r>
-              <a:r>
-                <a:rPr lang="en-US" sz="2000" dirty="0" err="1" smtClean="0"/>
-                <a:t>virginica</a:t>
-              </a:r>
-              <a:r>
-                <a:rPr lang="en-US" sz="2000" dirty="0" smtClean="0"/>
-                <a:t> as it is the majority class. </a:t>
-              </a:r>
-              <a:endParaRPr lang="en-US" sz="2000" dirty="0"/>
-            </a:p>
-          </p:txBody>
-        </p:sp>
-      </p:grpSp>
-      <p:pic>
-        <p:nvPicPr>
-          <p:cNvPr id="14" name="Picture 13"/>
-          <p:cNvPicPr>
-            <a:picLocks noChangeAspect="1"/>
-          </p:cNvPicPr>
-          <p:nvPr/>
-        </p:nvPicPr>
-        <p:blipFill>
-          <a:blip r:embed="rId4">
-            <a:extLst>
-              <a:ext uri="{28A0092B-C50C-407E-A947-70E740481C1C}">
-                <a14:useLocalDpi xmlns:a14="http://schemas.microsoft.com/office/drawing/2010/main" val="0"/>
-              </a:ext>
-            </a:extLst>
-          </a:blip>
-          <a:stretch>
-            <a:fillRect/>
-          </a:stretch>
-        </p:blipFill>
-        <p:spPr>
-          <a:xfrm>
-            <a:off x="9312319" y="-3494753"/>
-            <a:ext cx="4686300" cy="3187700"/>
-          </a:xfrm>
-          <a:prstGeom prst="rect">
-            <a:avLst/>
-          </a:prstGeom>
-          <a:ln w="12700">
-            <a:solidFill>
-              <a:schemeClr val="tx1"/>
-            </a:solidFill>
-          </a:ln>
-        </p:spPr>
-      </p:pic>
+      <p:sp>
+        <p:nvSpPr>
+          <p:cNvPr id="2" name="Title 1"/>
+          <p:cNvSpPr>
+            <a:spLocks noGrp="1"/>
+          </p:cNvSpPr>
+          <p:nvPr>
+            <p:ph type="title"/>
+          </p:nvPr>
+        </p:nvSpPr>
+        <p:spPr/>
+        <p:txBody>
+          <a:bodyPr/>
+          <a:lstStyle/>
+          <a:p>
+            <a:endParaRPr lang="en-US"/>
+          </a:p>
+        </p:txBody>
+      </p:sp>
+      <p:sp>
+        <p:nvSpPr>
+          <p:cNvPr id="3" name="Content Placeholder 2"/>
+          <p:cNvSpPr>
+            <a:spLocks noGrp="1"/>
+          </p:cNvSpPr>
+          <p:nvPr>
+            <p:ph idx="1"/>
+          </p:nvPr>
+        </p:nvSpPr>
+        <p:spPr/>
+        <p:txBody>
+          <a:bodyPr/>
+          <a:lstStyle/>
+          <a:p>
+            <a:endParaRPr lang="en-US"/>
+          </a:p>
+        </p:txBody>
+      </p:sp>
     </p:spTree>
     <p:extLst>
       <p:ext uri="{BB962C8B-B14F-4D97-AF65-F5344CB8AC3E}">
-        <p14:creationId xmlns:p14="http://schemas.microsoft.com/office/powerpoint/2010/main" val="461695872"/>
+        <p14:creationId xmlns:p14="http://schemas.microsoft.com/office/powerpoint/2010/main" val="780668191"/>
       </p:ext>
     </p:extLst>
   </p:cSld>
@@ -5659,189 +6990,48 @@
           <a:chExt cx="0" cy="0"/>
         </a:xfrm>
       </p:grpSpPr>
-      <p:grpSp>
-        <p:nvGrpSpPr>
-          <p:cNvPr id="13" name="Group 12"/>
-          <p:cNvGrpSpPr/>
-          <p:nvPr/>
-        </p:nvGrpSpPr>
-        <p:grpSpPr>
-          <a:xfrm>
-            <a:off x="1148862" y="3346049"/>
-            <a:ext cx="11216054" cy="4176672"/>
-            <a:chOff x="1148862" y="3346049"/>
-            <a:chExt cx="11216054" cy="4176672"/>
-          </a:xfrm>
-        </p:grpSpPr>
-        <p:pic>
-          <p:nvPicPr>
-            <p:cNvPr id="11" name="Picture 10"/>
-            <p:cNvPicPr>
-              <a:picLocks noChangeAspect="1"/>
-            </p:cNvPicPr>
-            <p:nvPr/>
-          </p:nvPicPr>
-          <p:blipFill>
-            <a:blip r:embed="rId2">
-              <a:extLst>
-                <a:ext uri="{28A0092B-C50C-407E-A947-70E740481C1C}">
-                  <a14:useLocalDpi xmlns:a14="http://schemas.microsoft.com/office/drawing/2010/main" val="0"/>
-                </a:ext>
-              </a:extLst>
-            </a:blip>
-            <a:stretch>
-              <a:fillRect/>
-            </a:stretch>
-          </p:blipFill>
-          <p:spPr>
-            <a:xfrm>
-              <a:off x="5049716" y="3346049"/>
-              <a:ext cx="7315200" cy="2743200"/>
-            </a:xfrm>
-            <a:prstGeom prst="rect">
-              <a:avLst/>
-            </a:prstGeom>
-          </p:spPr>
-        </p:pic>
-        <p:grpSp>
-          <p:nvGrpSpPr>
-            <p:cNvPr id="12" name="Group 11"/>
-            <p:cNvGrpSpPr>
-              <a:grpSpLocks noChangeAspect="1"/>
-            </p:cNvGrpSpPr>
-            <p:nvPr/>
-          </p:nvGrpSpPr>
-          <p:grpSpPr>
-            <a:xfrm>
-              <a:off x="1148862" y="3346049"/>
-              <a:ext cx="3900854" cy="4176672"/>
-              <a:chOff x="1032608" y="492457"/>
-              <a:chExt cx="5753100" cy="6159886"/>
-            </a:xfrm>
-          </p:grpSpPr>
-          <p:pic>
-            <p:nvPicPr>
-              <p:cNvPr id="5" name="Picture 4"/>
-              <p:cNvPicPr>
-                <a:picLocks noChangeAspect="1"/>
-              </p:cNvPicPr>
-              <p:nvPr/>
-            </p:nvPicPr>
-            <p:blipFill>
-              <a:blip r:embed="rId3">
-                <a:extLst>
-                  <a:ext uri="{28A0092B-C50C-407E-A947-70E740481C1C}">
-                    <a14:useLocalDpi xmlns:a14="http://schemas.microsoft.com/office/drawing/2010/main" val="0"/>
-                  </a:ext>
-                </a:extLst>
-              </a:blip>
-              <a:stretch>
-                <a:fillRect/>
-              </a:stretch>
-            </p:blipFill>
-            <p:spPr>
-              <a:xfrm>
-                <a:off x="1032608" y="492457"/>
-                <a:ext cx="5753100" cy="5080000"/>
-              </a:xfrm>
-              <a:prstGeom prst="rect">
-                <a:avLst/>
-              </a:prstGeom>
-            </p:spPr>
-          </p:pic>
-          <p:pic>
-            <p:nvPicPr>
-              <p:cNvPr id="6" name="Picture 5"/>
-              <p:cNvPicPr>
-                <a:picLocks noChangeAspect="1"/>
-              </p:cNvPicPr>
-              <p:nvPr/>
-            </p:nvPicPr>
-            <p:blipFill rotWithShape="1">
-              <a:blip r:embed="rId4">
-                <a:extLst>
-                  <a:ext uri="{28A0092B-C50C-407E-A947-70E740481C1C}">
-                    <a14:useLocalDpi xmlns:a14="http://schemas.microsoft.com/office/drawing/2010/main" val="0"/>
-                  </a:ext>
-                </a:extLst>
-              </a:blip>
-              <a:srcRect l="68876"/>
-              <a:stretch/>
-            </p:blipFill>
-            <p:spPr>
-              <a:xfrm>
-                <a:off x="5342809" y="5591639"/>
-                <a:ext cx="990383" cy="1060704"/>
-              </a:xfrm>
-              <a:prstGeom prst="rect">
-                <a:avLst/>
-              </a:prstGeom>
-            </p:spPr>
-          </p:pic>
-          <p:pic>
-            <p:nvPicPr>
-              <p:cNvPr id="7" name="Picture 6"/>
-              <p:cNvPicPr>
-                <a:picLocks noChangeAspect="1"/>
-              </p:cNvPicPr>
-              <p:nvPr/>
-            </p:nvPicPr>
-            <p:blipFill rotWithShape="1">
-              <a:blip r:embed="rId4">
-                <a:extLst>
-                  <a:ext uri="{28A0092B-C50C-407E-A947-70E740481C1C}">
-                    <a14:useLocalDpi xmlns:a14="http://schemas.microsoft.com/office/drawing/2010/main" val="0"/>
-                  </a:ext>
-                </a:extLst>
-              </a:blip>
-              <a:srcRect l="33873" r="35004"/>
-              <a:stretch/>
-            </p:blipFill>
-            <p:spPr>
-              <a:xfrm>
-                <a:off x="1458824" y="3741143"/>
-                <a:ext cx="987643" cy="1057769"/>
-              </a:xfrm>
-              <a:prstGeom prst="rect">
-                <a:avLst/>
-              </a:prstGeom>
-            </p:spPr>
-          </p:pic>
-          <p:pic>
-            <p:nvPicPr>
-              <p:cNvPr id="8" name="Picture 7"/>
-              <p:cNvPicPr>
-                <a:picLocks noChangeAspect="1"/>
-              </p:cNvPicPr>
-              <p:nvPr/>
-            </p:nvPicPr>
-            <p:blipFill rotWithShape="1">
-              <a:blip r:embed="rId4">
-                <a:extLst>
-                  <a:ext uri="{28A0092B-C50C-407E-A947-70E740481C1C}">
-                    <a14:useLocalDpi xmlns:a14="http://schemas.microsoft.com/office/drawing/2010/main" val="0"/>
-                  </a:ext>
-                </a:extLst>
-              </a:blip>
-              <a:srcRect r="68876"/>
-              <a:stretch/>
-            </p:blipFill>
-            <p:spPr>
-              <a:xfrm>
-                <a:off x="3056809" y="5591639"/>
-                <a:ext cx="990383" cy="1060704"/>
-              </a:xfrm>
-              <a:prstGeom prst="rect">
-                <a:avLst/>
-              </a:prstGeom>
-            </p:spPr>
-          </p:pic>
-        </p:grpSp>
-      </p:grpSp>
+      <p:sp>
+        <p:nvSpPr>
+          <p:cNvPr id="2" name="Title 1"/>
+          <p:cNvSpPr>
+            <a:spLocks noGrp="1"/>
+          </p:cNvSpPr>
+          <p:nvPr>
+            <p:ph type="title"/>
+          </p:nvPr>
+        </p:nvSpPr>
+        <p:spPr/>
+        <p:txBody>
+          <a:bodyPr/>
+          <a:lstStyle/>
+          <a:p>
+            <a:endParaRPr lang="en-US"/>
+          </a:p>
+        </p:txBody>
+      </p:sp>
+      <p:sp>
+        <p:nvSpPr>
+          <p:cNvPr id="3" name="Content Placeholder 2"/>
+          <p:cNvSpPr>
+            <a:spLocks noGrp="1"/>
+          </p:cNvSpPr>
+          <p:nvPr>
+            <p:ph idx="1"/>
+          </p:nvPr>
+        </p:nvSpPr>
+        <p:spPr/>
+        <p:txBody>
+          <a:bodyPr/>
+          <a:lstStyle/>
+          <a:p>
+            <a:endParaRPr lang="en-US"/>
+          </a:p>
+        </p:txBody>
+      </p:sp>
     </p:spTree>
     <p:extLst>
       <p:ext uri="{BB962C8B-B14F-4D97-AF65-F5344CB8AC3E}">
-        <p14:creationId xmlns:p14="http://schemas.microsoft.com/office/powerpoint/2010/main" val="239750048"/>
+        <p14:creationId xmlns:p14="http://schemas.microsoft.com/office/powerpoint/2010/main" val="781507149"/>
       </p:ext>
     </p:extLst>
   </p:cSld>

</xml_diff>

<commit_message>
Added minor start to split point for DT blog post
</commit_message>
<xml_diff>
--- a/Sklearn/DecisionTrees/powerpoint/DecisionComparison.pptx
+++ b/Sklearn/DecisionTrees/powerpoint/DecisionComparison.pptx
@@ -10,20 +10,24 @@
     <p:sldId id="263" r:id="rId4"/>
     <p:sldId id="266" r:id="rId5"/>
     <p:sldId id="259" r:id="rId6"/>
-    <p:sldId id="267" r:id="rId7"/>
-    <p:sldId id="274" r:id="rId8"/>
-    <p:sldId id="273" r:id="rId9"/>
-    <p:sldId id="272" r:id="rId10"/>
-    <p:sldId id="271" r:id="rId11"/>
-    <p:sldId id="270" r:id="rId12"/>
-    <p:sldId id="269" r:id="rId13"/>
-    <p:sldId id="268" r:id="rId14"/>
-    <p:sldId id="261" r:id="rId15"/>
-    <p:sldId id="262" r:id="rId16"/>
-    <p:sldId id="264" r:id="rId17"/>
-    <p:sldId id="258" r:id="rId18"/>
-    <p:sldId id="265" r:id="rId19"/>
-    <p:sldId id="260" r:id="rId20"/>
+    <p:sldId id="278" r:id="rId7"/>
+    <p:sldId id="277" r:id="rId8"/>
+    <p:sldId id="276" r:id="rId9"/>
+    <p:sldId id="275" r:id="rId10"/>
+    <p:sldId id="267" r:id="rId11"/>
+    <p:sldId id="274" r:id="rId12"/>
+    <p:sldId id="273" r:id="rId13"/>
+    <p:sldId id="272" r:id="rId14"/>
+    <p:sldId id="271" r:id="rId15"/>
+    <p:sldId id="270" r:id="rId16"/>
+    <p:sldId id="269" r:id="rId17"/>
+    <p:sldId id="268" r:id="rId18"/>
+    <p:sldId id="261" r:id="rId19"/>
+    <p:sldId id="262" r:id="rId20"/>
+    <p:sldId id="264" r:id="rId21"/>
+    <p:sldId id="258" r:id="rId22"/>
+    <p:sldId id="265" r:id="rId23"/>
+    <p:sldId id="260" r:id="rId24"/>
   </p:sldIdLst>
   <p:sldSz cx="12192000" cy="6858000"/>
   <p:notesSz cx="6858000" cy="9144000"/>
@@ -261,7 +265,7 @@
           <a:p>
             <a:fld id="{B66C5E5C-AFE9-2848-A01D-417298715EDA}" type="datetimeFigureOut">
               <a:rPr lang="en-US" smtClean="0"/>
-              <a:t>10/2/18</a:t>
+              <a:t>10/3/18</a:t>
             </a:fld>
             <a:endParaRPr lang="en-US"/>
           </a:p>
@@ -431,7 +435,7 @@
           <a:p>
             <a:fld id="{B66C5E5C-AFE9-2848-A01D-417298715EDA}" type="datetimeFigureOut">
               <a:rPr lang="en-US" smtClean="0"/>
-              <a:t>10/2/18</a:t>
+              <a:t>10/3/18</a:t>
             </a:fld>
             <a:endParaRPr lang="en-US"/>
           </a:p>
@@ -611,7 +615,7 @@
           <a:p>
             <a:fld id="{B66C5E5C-AFE9-2848-A01D-417298715EDA}" type="datetimeFigureOut">
               <a:rPr lang="en-US" smtClean="0"/>
-              <a:t>10/2/18</a:t>
+              <a:t>10/3/18</a:t>
             </a:fld>
             <a:endParaRPr lang="en-US"/>
           </a:p>
@@ -781,7 +785,7 @@
           <a:p>
             <a:fld id="{B66C5E5C-AFE9-2848-A01D-417298715EDA}" type="datetimeFigureOut">
               <a:rPr lang="en-US" smtClean="0"/>
-              <a:t>10/2/18</a:t>
+              <a:t>10/3/18</a:t>
             </a:fld>
             <a:endParaRPr lang="en-US"/>
           </a:p>
@@ -1027,7 +1031,7 @@
           <a:p>
             <a:fld id="{B66C5E5C-AFE9-2848-A01D-417298715EDA}" type="datetimeFigureOut">
               <a:rPr lang="en-US" smtClean="0"/>
-              <a:t>10/2/18</a:t>
+              <a:t>10/3/18</a:t>
             </a:fld>
             <a:endParaRPr lang="en-US"/>
           </a:p>
@@ -1259,7 +1263,7 @@
           <a:p>
             <a:fld id="{B66C5E5C-AFE9-2848-A01D-417298715EDA}" type="datetimeFigureOut">
               <a:rPr lang="en-US" smtClean="0"/>
-              <a:t>10/2/18</a:t>
+              <a:t>10/3/18</a:t>
             </a:fld>
             <a:endParaRPr lang="en-US"/>
           </a:p>
@@ -1626,7 +1630,7 @@
           <a:p>
             <a:fld id="{B66C5E5C-AFE9-2848-A01D-417298715EDA}" type="datetimeFigureOut">
               <a:rPr lang="en-US" smtClean="0"/>
-              <a:t>10/2/18</a:t>
+              <a:t>10/3/18</a:t>
             </a:fld>
             <a:endParaRPr lang="en-US"/>
           </a:p>
@@ -1744,7 +1748,7 @@
           <a:p>
             <a:fld id="{B66C5E5C-AFE9-2848-A01D-417298715EDA}" type="datetimeFigureOut">
               <a:rPr lang="en-US" smtClean="0"/>
-              <a:t>10/2/18</a:t>
+              <a:t>10/3/18</a:t>
             </a:fld>
             <a:endParaRPr lang="en-US"/>
           </a:p>
@@ -1839,7 +1843,7 @@
           <a:p>
             <a:fld id="{B66C5E5C-AFE9-2848-A01D-417298715EDA}" type="datetimeFigureOut">
               <a:rPr lang="en-US" smtClean="0"/>
-              <a:t>10/2/18</a:t>
+              <a:t>10/3/18</a:t>
             </a:fld>
             <a:endParaRPr lang="en-US"/>
           </a:p>
@@ -2116,7 +2120,7 @@
           <a:p>
             <a:fld id="{B66C5E5C-AFE9-2848-A01D-417298715EDA}" type="datetimeFigureOut">
               <a:rPr lang="en-US" smtClean="0"/>
-              <a:t>10/2/18</a:t>
+              <a:t>10/3/18</a:t>
             </a:fld>
             <a:endParaRPr lang="en-US"/>
           </a:p>
@@ -2369,7 +2373,7 @@
           <a:p>
             <a:fld id="{B66C5E5C-AFE9-2848-A01D-417298715EDA}" type="datetimeFigureOut">
               <a:rPr lang="en-US" smtClean="0"/>
-              <a:t>10/2/18</a:t>
+              <a:t>10/3/18</a:t>
             </a:fld>
             <a:endParaRPr lang="en-US"/>
           </a:p>
@@ -2582,7 +2586,7 @@
           <a:p>
             <a:fld id="{B66C5E5C-AFE9-2848-A01D-417298715EDA}" type="datetimeFigureOut">
               <a:rPr lang="en-US" smtClean="0"/>
-              <a:t>10/2/18</a:t>
+              <a:t>10/3/18</a:t>
             </a:fld>
             <a:endParaRPr lang="en-US"/>
           </a:p>
@@ -3256,48 +3260,686 @@
           <a:chExt cx="0" cy="0"/>
         </a:xfrm>
       </p:grpSpPr>
-      <p:sp>
-        <p:nvSpPr>
-          <p:cNvPr id="2" name="Title 1"/>
-          <p:cNvSpPr>
-            <a:spLocks noGrp="1"/>
-          </p:cNvSpPr>
-          <p:nvPr>
-            <p:ph type="title"/>
-          </p:nvPr>
-        </p:nvSpPr>
-        <p:spPr/>
-        <p:txBody>
-          <a:bodyPr/>
+      <p:pic>
+        <p:nvPicPr>
+          <p:cNvPr id="10" name="Picture 9"/>
+          <p:cNvPicPr>
+            <a:picLocks noChangeAspect="1"/>
+          </p:cNvPicPr>
+          <p:nvPr/>
+        </p:nvPicPr>
+        <p:blipFill rotWithShape="1">
+          <a:blip r:embed="rId2">
+            <a:extLst>
+              <a:ext uri="{28A0092B-C50C-407E-A947-70E740481C1C}">
+                <a14:useLocalDpi xmlns:a14="http://schemas.microsoft.com/office/drawing/2010/main" val="0"/>
+              </a:ext>
+            </a:extLst>
+          </a:blip>
+          <a:srcRect l="68876"/>
+          <a:stretch/>
+        </p:blipFill>
+        <p:spPr>
+          <a:xfrm>
+            <a:off x="3731772" y="10466017"/>
+            <a:ext cx="738954" cy="791423"/>
+          </a:xfrm>
+          <a:prstGeom prst="rect">
+            <a:avLst/>
+          </a:prstGeom>
+        </p:spPr>
+      </p:pic>
+      <p:pic>
+        <p:nvPicPr>
+          <p:cNvPr id="12" name="Picture 11"/>
+          <p:cNvPicPr>
+            <a:picLocks noChangeAspect="1"/>
+          </p:cNvPicPr>
+          <p:nvPr/>
+        </p:nvPicPr>
+        <p:blipFill rotWithShape="1">
+          <a:blip r:embed="rId2">
+            <a:extLst>
+              <a:ext uri="{28A0092B-C50C-407E-A947-70E740481C1C}">
+                <a14:useLocalDpi xmlns:a14="http://schemas.microsoft.com/office/drawing/2010/main" val="0"/>
+              </a:ext>
+            </a:extLst>
+          </a:blip>
+          <a:srcRect r="68876"/>
+          <a:stretch/>
+        </p:blipFill>
+        <p:spPr>
+          <a:xfrm>
+            <a:off x="2066198" y="10466018"/>
+            <a:ext cx="738954" cy="791423"/>
+          </a:xfrm>
+          <a:prstGeom prst="rect">
+            <a:avLst/>
+          </a:prstGeom>
+        </p:spPr>
+      </p:pic>
+      <p:sp>
+        <p:nvSpPr>
+          <p:cNvPr id="14" name="Rectangle 13"/>
+          <p:cNvSpPr/>
+          <p:nvPr/>
+        </p:nvSpPr>
+        <p:spPr>
+          <a:xfrm>
+            <a:off x="-1384395" y="11413525"/>
+            <a:ext cx="8209188" cy="769441"/>
+          </a:xfrm>
+          <a:prstGeom prst="rect">
+            <a:avLst/>
+          </a:prstGeom>
+        </p:spPr>
+        <p:txBody>
+          <a:bodyPr wrap="square">
+            <a:spAutoFit/>
+          </a:bodyPr>
           <a:lstStyle/>
           <a:p>
-            <a:endParaRPr lang="en-US"/>
-          </a:p>
-        </p:txBody>
-      </p:sp>
-      <p:sp>
-        <p:nvSpPr>
-          <p:cNvPr id="3" name="Content Placeholder 2"/>
-          <p:cNvSpPr>
-            <a:spLocks noGrp="1"/>
-          </p:cNvSpPr>
-          <p:nvPr>
-            <p:ph idx="1"/>
-          </p:nvPr>
-        </p:nvSpPr>
-        <p:spPr/>
-        <p:txBody>
-          <a:bodyPr/>
-          <a:lstStyle/>
-          <a:p>
-            <a:endParaRPr lang="en-US"/>
-          </a:p>
-        </p:txBody>
-      </p:sp>
+            <a:pPr algn="ctr"/>
+            <a:r>
+              <a:rPr lang="en-US" sz="2200" dirty="0" smtClean="0"/>
+              <a:t>Species counts are: </a:t>
+            </a:r>
+            <a:r>
+              <a:rPr lang="en-US" sz="2200" dirty="0" err="1" smtClean="0"/>
+              <a:t>setosa</a:t>
+            </a:r>
+            <a:r>
+              <a:rPr lang="en-US" sz="2200" dirty="0" smtClean="0"/>
+              <a:t>=0, versicolor=38, </a:t>
+            </a:r>
+            <a:r>
+              <a:rPr lang="en-US" sz="2200" dirty="0" err="1" smtClean="0"/>
+              <a:t>virginica</a:t>
+            </a:r>
+            <a:r>
+              <a:rPr lang="en-US" sz="2200" dirty="0" smtClean="0"/>
+              <a:t>=3</a:t>
+            </a:r>
+          </a:p>
+          <a:p>
+            <a:pPr algn="ctr"/>
+            <a:r>
+              <a:rPr lang="en-US" sz="2200" dirty="0" smtClean="0"/>
+              <a:t>Prediction is </a:t>
+            </a:r>
+            <a:r>
+              <a:rPr lang="en-US" sz="2200" b="1" dirty="0" smtClean="0"/>
+              <a:t>versicolor</a:t>
+            </a:r>
+            <a:r>
+              <a:rPr lang="en-US" sz="2200" dirty="0" smtClean="0"/>
+              <a:t> as it is the majority class</a:t>
+            </a:r>
+          </a:p>
+        </p:txBody>
+      </p:sp>
+      <p:grpSp>
+        <p:nvGrpSpPr>
+          <p:cNvPr id="2" name="Group 1"/>
+          <p:cNvGrpSpPr/>
+          <p:nvPr/>
+        </p:nvGrpSpPr>
+        <p:grpSpPr>
+          <a:xfrm>
+            <a:off x="-2628527" y="-438505"/>
+            <a:ext cx="20328087" cy="6989666"/>
+            <a:chOff x="-2628527" y="-438505"/>
+            <a:chExt cx="20328087" cy="6989666"/>
+          </a:xfrm>
+        </p:grpSpPr>
+        <p:pic>
+          <p:nvPicPr>
+            <p:cNvPr id="23" name="Picture 22"/>
+            <p:cNvPicPr>
+              <a:picLocks noChangeAspect="1"/>
+            </p:cNvPicPr>
+            <p:nvPr/>
+          </p:nvPicPr>
+          <p:blipFill>
+            <a:blip r:embed="rId3">
+              <a:extLst>
+                <a:ext uri="{28A0092B-C50C-407E-A947-70E740481C1C}">
+                  <a14:useLocalDpi xmlns:a14="http://schemas.microsoft.com/office/drawing/2010/main" val="0"/>
+                </a:ext>
+              </a:extLst>
+            </a:blip>
+            <a:stretch>
+              <a:fillRect/>
+            </a:stretch>
+          </p:blipFill>
+          <p:spPr>
+            <a:xfrm>
+              <a:off x="10666236" y="1321027"/>
+              <a:ext cx="5857461" cy="4572920"/>
+            </a:xfrm>
+            <a:prstGeom prst="rect">
+              <a:avLst/>
+            </a:prstGeom>
+            <a:ln w="12700">
+              <a:noFill/>
+            </a:ln>
+          </p:spPr>
+        </p:pic>
+        <p:pic>
+          <p:nvPicPr>
+            <p:cNvPr id="4" name="Picture 3"/>
+            <p:cNvPicPr>
+              <a:picLocks noChangeAspect="1"/>
+            </p:cNvPicPr>
+            <p:nvPr/>
+          </p:nvPicPr>
+          <p:blipFill>
+            <a:blip r:embed="rId4">
+              <a:extLst>
+                <a:ext uri="{28A0092B-C50C-407E-A947-70E740481C1C}">
+                  <a14:useLocalDpi xmlns:a14="http://schemas.microsoft.com/office/drawing/2010/main" val="0"/>
+                </a:ext>
+              </a:extLst>
+            </a:blip>
+            <a:stretch>
+              <a:fillRect/>
+            </a:stretch>
+          </p:blipFill>
+          <p:spPr>
+            <a:xfrm>
+              <a:off x="-1694836" y="1321027"/>
+              <a:ext cx="6341807" cy="4572920"/>
+            </a:xfrm>
+            <a:prstGeom prst="rect">
+              <a:avLst/>
+            </a:prstGeom>
+            <a:ln w="12700">
+              <a:noFill/>
+            </a:ln>
+          </p:spPr>
+        </p:pic>
+        <p:pic>
+          <p:nvPicPr>
+            <p:cNvPr id="5" name="Picture 4"/>
+            <p:cNvPicPr>
+              <a:picLocks noChangeAspect="1"/>
+            </p:cNvPicPr>
+            <p:nvPr/>
+          </p:nvPicPr>
+          <p:blipFill>
+            <a:blip r:embed="rId5">
+              <a:extLst>
+                <a:ext uri="{28A0092B-C50C-407E-A947-70E740481C1C}">
+                  <a14:useLocalDpi xmlns:a14="http://schemas.microsoft.com/office/drawing/2010/main" val="0"/>
+                </a:ext>
+              </a:extLst>
+            </a:blip>
+            <a:stretch>
+              <a:fillRect/>
+            </a:stretch>
+          </p:blipFill>
+          <p:spPr>
+            <a:xfrm>
+              <a:off x="5114572" y="1321027"/>
+              <a:ext cx="5084063" cy="4572920"/>
+            </a:xfrm>
+            <a:prstGeom prst="rect">
+              <a:avLst/>
+            </a:prstGeom>
+            <a:ln w="12700">
+              <a:noFill/>
+            </a:ln>
+          </p:spPr>
+        </p:pic>
+        <p:sp>
+          <p:nvSpPr>
+            <p:cNvPr id="15" name="TextBox 14"/>
+            <p:cNvSpPr txBox="1"/>
+            <p:nvPr/>
+          </p:nvSpPr>
+          <p:spPr>
+            <a:xfrm>
+              <a:off x="14688369" y="990108"/>
+              <a:ext cx="1920240" cy="292447"/>
+            </a:xfrm>
+            <a:prstGeom prst="rect">
+              <a:avLst/>
+            </a:prstGeom>
+            <a:noFill/>
+          </p:spPr>
+          <p:txBody>
+            <a:bodyPr wrap="square" rtlCol="0">
+              <a:spAutoFit/>
+            </a:bodyPr>
+            <a:lstStyle/>
+            <a:p>
+              <a:r>
+                <a:rPr lang="en-US" sz="1300" dirty="0" smtClean="0"/>
+                <a:t>Decision Node </a:t>
+              </a:r>
+              <a:endParaRPr lang="en-US" sz="1300" dirty="0"/>
+            </a:p>
+          </p:txBody>
+        </p:sp>
+        <p:sp>
+          <p:nvSpPr>
+            <p:cNvPr id="16" name="TextBox 15"/>
+            <p:cNvSpPr txBox="1"/>
+            <p:nvPr/>
+          </p:nvSpPr>
+          <p:spPr>
+            <a:xfrm>
+              <a:off x="14691642" y="673841"/>
+              <a:ext cx="1554480" cy="292447"/>
+            </a:xfrm>
+            <a:prstGeom prst="rect">
+              <a:avLst/>
+            </a:prstGeom>
+            <a:noFill/>
+          </p:spPr>
+          <p:txBody>
+            <a:bodyPr wrap="square" rtlCol="0">
+              <a:spAutoFit/>
+            </a:bodyPr>
+            <a:lstStyle/>
+            <a:p>
+              <a:r>
+                <a:rPr lang="en-US" sz="1300" dirty="0" smtClean="0"/>
+                <a:t>Root Node</a:t>
+              </a:r>
+              <a:endParaRPr lang="en-US" sz="1300" dirty="0"/>
+            </a:p>
+          </p:txBody>
+        </p:sp>
+        <p:sp>
+          <p:nvSpPr>
+            <p:cNvPr id="17" name="Rectangle 16"/>
+            <p:cNvSpPr/>
+            <p:nvPr/>
+          </p:nvSpPr>
+          <p:spPr>
+            <a:xfrm>
+              <a:off x="14446546" y="1067850"/>
+              <a:ext cx="137160" cy="137188"/>
+            </a:xfrm>
+            <a:prstGeom prst="rect">
+              <a:avLst/>
+            </a:prstGeom>
+            <a:solidFill>
+              <a:srgbClr val="0000FF"/>
+            </a:solidFill>
+            <a:ln>
+              <a:solidFill>
+                <a:schemeClr val="tx1"/>
+              </a:solidFill>
+            </a:ln>
+          </p:spPr>
+          <p:style>
+            <a:lnRef idx="2">
+              <a:schemeClr val="accent1">
+                <a:shade val="50000"/>
+              </a:schemeClr>
+            </a:lnRef>
+            <a:fillRef idx="1">
+              <a:schemeClr val="accent1"/>
+            </a:fillRef>
+            <a:effectRef idx="0">
+              <a:schemeClr val="accent1"/>
+            </a:effectRef>
+            <a:fontRef idx="minor">
+              <a:schemeClr val="lt1"/>
+            </a:fontRef>
+          </p:style>
+          <p:txBody>
+            <a:bodyPr rtlCol="0" anchor="ctr"/>
+            <a:lstStyle/>
+            <a:p>
+              <a:pPr algn="ctr"/>
+              <a:endParaRPr lang="en-US">
+                <a:solidFill>
+                  <a:srgbClr val="0000FF"/>
+                </a:solidFill>
+              </a:endParaRPr>
+            </a:p>
+          </p:txBody>
+        </p:sp>
+        <p:sp>
+          <p:nvSpPr>
+            <p:cNvPr id="18" name="Rectangle 17"/>
+            <p:cNvSpPr/>
+            <p:nvPr/>
+          </p:nvSpPr>
+          <p:spPr>
+            <a:xfrm>
+              <a:off x="14347964" y="611847"/>
+              <a:ext cx="1999102" cy="1057257"/>
+            </a:xfrm>
+            <a:prstGeom prst="rect">
+              <a:avLst/>
+            </a:prstGeom>
+            <a:noFill/>
+            <a:ln w="6350">
+              <a:solidFill>
+                <a:schemeClr val="tx1">
+                  <a:alpha val="32000"/>
+                </a:schemeClr>
+              </a:solidFill>
+            </a:ln>
+          </p:spPr>
+          <p:style>
+            <a:lnRef idx="2">
+              <a:schemeClr val="accent1">
+                <a:shade val="50000"/>
+              </a:schemeClr>
+            </a:lnRef>
+            <a:fillRef idx="1">
+              <a:schemeClr val="accent1"/>
+            </a:fillRef>
+            <a:effectRef idx="0">
+              <a:schemeClr val="accent1"/>
+            </a:effectRef>
+            <a:fontRef idx="minor">
+              <a:schemeClr val="lt1"/>
+            </a:fontRef>
+          </p:style>
+          <p:txBody>
+            <a:bodyPr rtlCol="0" anchor="ctr"/>
+            <a:lstStyle/>
+            <a:p>
+              <a:pPr algn="ctr"/>
+              <a:endParaRPr lang="en-US"/>
+            </a:p>
+          </p:txBody>
+        </p:sp>
+        <p:sp>
+          <p:nvSpPr>
+            <p:cNvPr id="19" name="Rectangle 18"/>
+            <p:cNvSpPr/>
+            <p:nvPr/>
+          </p:nvSpPr>
+          <p:spPr>
+            <a:xfrm>
+              <a:off x="13800419" y="239564"/>
+              <a:ext cx="3094191" cy="400190"/>
+            </a:xfrm>
+            <a:prstGeom prst="rect">
+              <a:avLst/>
+            </a:prstGeom>
+          </p:spPr>
+          <p:txBody>
+            <a:bodyPr wrap="square">
+              <a:spAutoFit/>
+            </a:bodyPr>
+            <a:lstStyle/>
+            <a:p>
+              <a:pPr algn="ctr"/>
+              <a:r>
+                <a:rPr lang="en-US" sz="2000" dirty="0" smtClean="0"/>
+                <a:t>Type of Node</a:t>
+              </a:r>
+              <a:endParaRPr lang="en-US" sz="2000" dirty="0"/>
+            </a:p>
+          </p:txBody>
+        </p:sp>
+        <p:sp>
+          <p:nvSpPr>
+            <p:cNvPr id="20" name="Rectangle 19"/>
+            <p:cNvSpPr/>
+            <p:nvPr/>
+          </p:nvSpPr>
+          <p:spPr>
+            <a:xfrm>
+              <a:off x="14450625" y="1387955"/>
+              <a:ext cx="137160" cy="137188"/>
+            </a:xfrm>
+            <a:prstGeom prst="rect">
+              <a:avLst/>
+            </a:prstGeom>
+            <a:solidFill>
+              <a:srgbClr val="008000"/>
+            </a:solidFill>
+            <a:ln>
+              <a:solidFill>
+                <a:schemeClr val="tx1"/>
+              </a:solidFill>
+            </a:ln>
+          </p:spPr>
+          <p:style>
+            <a:lnRef idx="2">
+              <a:schemeClr val="accent1">
+                <a:shade val="50000"/>
+              </a:schemeClr>
+            </a:lnRef>
+            <a:fillRef idx="1">
+              <a:schemeClr val="accent1"/>
+            </a:fillRef>
+            <a:effectRef idx="0">
+              <a:schemeClr val="accent1"/>
+            </a:effectRef>
+            <a:fontRef idx="minor">
+              <a:schemeClr val="lt1"/>
+            </a:fontRef>
+          </p:style>
+          <p:txBody>
+            <a:bodyPr rtlCol="0" anchor="ctr"/>
+            <a:lstStyle/>
+            <a:p>
+              <a:pPr algn="ctr"/>
+              <a:endParaRPr lang="en-US"/>
+            </a:p>
+          </p:txBody>
+        </p:sp>
+        <p:sp>
+          <p:nvSpPr>
+            <p:cNvPr id="21" name="TextBox 20"/>
+            <p:cNvSpPr txBox="1"/>
+            <p:nvPr/>
+          </p:nvSpPr>
+          <p:spPr>
+            <a:xfrm>
+              <a:off x="14691642" y="1314075"/>
+              <a:ext cx="1920240" cy="292447"/>
+            </a:xfrm>
+            <a:prstGeom prst="rect">
+              <a:avLst/>
+            </a:prstGeom>
+            <a:noFill/>
+          </p:spPr>
+          <p:txBody>
+            <a:bodyPr wrap="square" rtlCol="0">
+              <a:spAutoFit/>
+            </a:bodyPr>
+            <a:lstStyle/>
+            <a:p>
+              <a:r>
+                <a:rPr lang="en-US" sz="1300" dirty="0" smtClean="0"/>
+                <a:t>Leaf/Terminal Node </a:t>
+              </a:r>
+              <a:endParaRPr lang="en-US" sz="1300" dirty="0"/>
+            </a:p>
+          </p:txBody>
+        </p:sp>
+        <p:sp>
+          <p:nvSpPr>
+            <p:cNvPr id="22" name="Rectangle 21"/>
+            <p:cNvSpPr/>
+            <p:nvPr/>
+          </p:nvSpPr>
+          <p:spPr>
+            <a:xfrm>
+              <a:off x="14450625" y="747746"/>
+              <a:ext cx="137160" cy="137188"/>
+            </a:xfrm>
+            <a:prstGeom prst="rect">
+              <a:avLst/>
+            </a:prstGeom>
+            <a:solidFill>
+              <a:srgbClr val="D2691E"/>
+            </a:solidFill>
+            <a:ln>
+              <a:solidFill>
+                <a:schemeClr val="tx1"/>
+              </a:solidFill>
+            </a:ln>
+          </p:spPr>
+          <p:style>
+            <a:lnRef idx="2">
+              <a:schemeClr val="accent1">
+                <a:shade val="50000"/>
+              </a:schemeClr>
+            </a:lnRef>
+            <a:fillRef idx="1">
+              <a:schemeClr val="accent1"/>
+            </a:fillRef>
+            <a:effectRef idx="0">
+              <a:schemeClr val="accent1"/>
+            </a:effectRef>
+            <a:fontRef idx="minor">
+              <a:schemeClr val="lt1"/>
+            </a:fontRef>
+          </p:style>
+          <p:txBody>
+            <a:bodyPr rtlCol="0" anchor="ctr"/>
+            <a:lstStyle/>
+            <a:p>
+              <a:pPr algn="ctr"/>
+              <a:endParaRPr lang="en-US">
+                <a:solidFill>
+                  <a:srgbClr val="0000FF"/>
+                </a:solidFill>
+              </a:endParaRPr>
+            </a:p>
+          </p:txBody>
+        </p:sp>
+        <p:sp>
+          <p:nvSpPr>
+            <p:cNvPr id="32" name="TextBox 31"/>
+            <p:cNvSpPr txBox="1"/>
+            <p:nvPr/>
+          </p:nvSpPr>
+          <p:spPr>
+            <a:xfrm>
+              <a:off x="3084603" y="-438505"/>
+              <a:ext cx="9144000" cy="1415772"/>
+            </a:xfrm>
+            <a:prstGeom prst="rect">
+              <a:avLst/>
+            </a:prstGeom>
+            <a:noFill/>
+          </p:spPr>
+          <p:txBody>
+            <a:bodyPr wrap="square" rtlCol="0">
+              <a:spAutoFit/>
+            </a:bodyPr>
+            <a:lstStyle/>
+            <a:p>
+              <a:pPr algn="ctr"/>
+              <a:r>
+                <a:rPr lang="en-US" sz="5000" b="1" dirty="0" smtClean="0"/>
+                <a:t>Depth of Classification Trees</a:t>
+              </a:r>
+              <a:endParaRPr lang="en-US" sz="5000" dirty="0" smtClean="0"/>
+            </a:p>
+            <a:p>
+              <a:endParaRPr lang="en-US" dirty="0"/>
+            </a:p>
+            <a:p>
+              <a:endParaRPr lang="en-US" dirty="0"/>
+            </a:p>
+          </p:txBody>
+        </p:sp>
+        <p:sp>
+          <p:nvSpPr>
+            <p:cNvPr id="35" name="Rectangle 34"/>
+            <p:cNvSpPr/>
+            <p:nvPr/>
+          </p:nvSpPr>
+          <p:spPr>
+            <a:xfrm>
+              <a:off x="-2628527" y="5997052"/>
+              <a:ext cx="8209188" cy="554109"/>
+            </a:xfrm>
+            <a:prstGeom prst="rect">
+              <a:avLst/>
+            </a:prstGeom>
+          </p:spPr>
+          <p:txBody>
+            <a:bodyPr wrap="square">
+              <a:spAutoFit/>
+            </a:bodyPr>
+            <a:lstStyle/>
+            <a:p>
+              <a:pPr algn="ctr"/>
+              <a:r>
+                <a:rPr lang="en-US" sz="3000" dirty="0" smtClean="0"/>
+                <a:t>Depth = 1</a:t>
+              </a:r>
+            </a:p>
+          </p:txBody>
+        </p:sp>
+        <p:sp>
+          <p:nvSpPr>
+            <p:cNvPr id="36" name="Rectangle 35"/>
+            <p:cNvSpPr/>
+            <p:nvPr/>
+          </p:nvSpPr>
+          <p:spPr>
+            <a:xfrm>
+              <a:off x="3552009" y="5997051"/>
+              <a:ext cx="8209188" cy="554109"/>
+            </a:xfrm>
+            <a:prstGeom prst="rect">
+              <a:avLst/>
+            </a:prstGeom>
+          </p:spPr>
+          <p:txBody>
+            <a:bodyPr wrap="square">
+              <a:spAutoFit/>
+            </a:bodyPr>
+            <a:lstStyle/>
+            <a:p>
+              <a:pPr algn="ctr"/>
+              <a:r>
+                <a:rPr lang="en-US" sz="3000" dirty="0" smtClean="0"/>
+                <a:t>Depth = 2</a:t>
+              </a:r>
+            </a:p>
+          </p:txBody>
+        </p:sp>
+        <p:sp>
+          <p:nvSpPr>
+            <p:cNvPr id="37" name="Rectangle 36"/>
+            <p:cNvSpPr/>
+            <p:nvPr/>
+          </p:nvSpPr>
+          <p:spPr>
+            <a:xfrm>
+              <a:off x="9490372" y="5960874"/>
+              <a:ext cx="8209188" cy="554109"/>
+            </a:xfrm>
+            <a:prstGeom prst="rect">
+              <a:avLst/>
+            </a:prstGeom>
+          </p:spPr>
+          <p:txBody>
+            <a:bodyPr wrap="square">
+              <a:spAutoFit/>
+            </a:bodyPr>
+            <a:lstStyle/>
+            <a:p>
+              <a:pPr algn="ctr"/>
+              <a:r>
+                <a:rPr lang="en-US" sz="3000" dirty="0" smtClean="0"/>
+                <a:t>Depth = 3</a:t>
+              </a:r>
+            </a:p>
+          </p:txBody>
+        </p:sp>
+      </p:grpSp>
     </p:spTree>
     <p:extLst>
       <p:ext uri="{BB962C8B-B14F-4D97-AF65-F5344CB8AC3E}">
-        <p14:creationId xmlns:p14="http://schemas.microsoft.com/office/powerpoint/2010/main" val="1947692910"/>
+        <p14:creationId xmlns:p14="http://schemas.microsoft.com/office/powerpoint/2010/main" val="930359355"/>
       </p:ext>
     </p:extLst>
   </p:cSld>
@@ -3365,7 +4007,7 @@
     </p:spTree>
     <p:extLst>
       <p:ext uri="{BB962C8B-B14F-4D97-AF65-F5344CB8AC3E}">
-        <p14:creationId xmlns:p14="http://schemas.microsoft.com/office/powerpoint/2010/main" val="412184355"/>
+        <p14:creationId xmlns:p14="http://schemas.microsoft.com/office/powerpoint/2010/main" val="1712686614"/>
       </p:ext>
     </p:extLst>
   </p:cSld>
@@ -3433,7 +4075,7 @@
     </p:spTree>
     <p:extLst>
       <p:ext uri="{BB962C8B-B14F-4D97-AF65-F5344CB8AC3E}">
-        <p14:creationId xmlns:p14="http://schemas.microsoft.com/office/powerpoint/2010/main" val="1578406478"/>
+        <p14:creationId xmlns:p14="http://schemas.microsoft.com/office/powerpoint/2010/main" val="780668191"/>
       </p:ext>
     </p:extLst>
   </p:cSld>
@@ -3501,6 +4143,278 @@
     </p:spTree>
     <p:extLst>
       <p:ext uri="{BB962C8B-B14F-4D97-AF65-F5344CB8AC3E}">
+        <p14:creationId xmlns:p14="http://schemas.microsoft.com/office/powerpoint/2010/main" val="781507149"/>
+      </p:ext>
+    </p:extLst>
+  </p:cSld>
+  <p:clrMapOvr>
+    <a:masterClrMapping/>
+  </p:clrMapOvr>
+</p:sld>
+</file>
+
+<file path=ppt/slides/slide14.xml><?xml version="1.0" encoding="utf-8"?>
+<p:sld xmlns:a="http://schemas.openxmlformats.org/drawingml/2006/main" xmlns:r="http://schemas.openxmlformats.org/officeDocument/2006/relationships" xmlns:p="http://schemas.openxmlformats.org/presentationml/2006/main">
+  <p:cSld>
+    <p:spTree>
+      <p:nvGrpSpPr>
+        <p:cNvPr id="1" name=""/>
+        <p:cNvGrpSpPr/>
+        <p:nvPr/>
+      </p:nvGrpSpPr>
+      <p:grpSpPr>
+        <a:xfrm>
+          <a:off x="0" y="0"/>
+          <a:ext cx="0" cy="0"/>
+          <a:chOff x="0" y="0"/>
+          <a:chExt cx="0" cy="0"/>
+        </a:xfrm>
+      </p:grpSpPr>
+      <p:sp>
+        <p:nvSpPr>
+          <p:cNvPr id="2" name="Title 1"/>
+          <p:cNvSpPr>
+            <a:spLocks noGrp="1"/>
+          </p:cNvSpPr>
+          <p:nvPr>
+            <p:ph type="title"/>
+          </p:nvPr>
+        </p:nvSpPr>
+        <p:spPr/>
+        <p:txBody>
+          <a:bodyPr/>
+          <a:lstStyle/>
+          <a:p>
+            <a:endParaRPr lang="en-US"/>
+          </a:p>
+        </p:txBody>
+      </p:sp>
+      <p:sp>
+        <p:nvSpPr>
+          <p:cNvPr id="3" name="Content Placeholder 2"/>
+          <p:cNvSpPr>
+            <a:spLocks noGrp="1"/>
+          </p:cNvSpPr>
+          <p:nvPr>
+            <p:ph idx="1"/>
+          </p:nvPr>
+        </p:nvSpPr>
+        <p:spPr/>
+        <p:txBody>
+          <a:bodyPr/>
+          <a:lstStyle/>
+          <a:p>
+            <a:endParaRPr lang="en-US"/>
+          </a:p>
+        </p:txBody>
+      </p:sp>
+    </p:spTree>
+    <p:extLst>
+      <p:ext uri="{BB962C8B-B14F-4D97-AF65-F5344CB8AC3E}">
+        <p14:creationId xmlns:p14="http://schemas.microsoft.com/office/powerpoint/2010/main" val="1947692910"/>
+      </p:ext>
+    </p:extLst>
+  </p:cSld>
+  <p:clrMapOvr>
+    <a:masterClrMapping/>
+  </p:clrMapOvr>
+</p:sld>
+</file>
+
+<file path=ppt/slides/slide15.xml><?xml version="1.0" encoding="utf-8"?>
+<p:sld xmlns:a="http://schemas.openxmlformats.org/drawingml/2006/main" xmlns:r="http://schemas.openxmlformats.org/officeDocument/2006/relationships" xmlns:p="http://schemas.openxmlformats.org/presentationml/2006/main">
+  <p:cSld>
+    <p:spTree>
+      <p:nvGrpSpPr>
+        <p:cNvPr id="1" name=""/>
+        <p:cNvGrpSpPr/>
+        <p:nvPr/>
+      </p:nvGrpSpPr>
+      <p:grpSpPr>
+        <a:xfrm>
+          <a:off x="0" y="0"/>
+          <a:ext cx="0" cy="0"/>
+          <a:chOff x="0" y="0"/>
+          <a:chExt cx="0" cy="0"/>
+        </a:xfrm>
+      </p:grpSpPr>
+      <p:sp>
+        <p:nvSpPr>
+          <p:cNvPr id="2" name="Title 1"/>
+          <p:cNvSpPr>
+            <a:spLocks noGrp="1"/>
+          </p:cNvSpPr>
+          <p:nvPr>
+            <p:ph type="title"/>
+          </p:nvPr>
+        </p:nvSpPr>
+        <p:spPr/>
+        <p:txBody>
+          <a:bodyPr/>
+          <a:lstStyle/>
+          <a:p>
+            <a:endParaRPr lang="en-US"/>
+          </a:p>
+        </p:txBody>
+      </p:sp>
+      <p:sp>
+        <p:nvSpPr>
+          <p:cNvPr id="3" name="Content Placeholder 2"/>
+          <p:cNvSpPr>
+            <a:spLocks noGrp="1"/>
+          </p:cNvSpPr>
+          <p:nvPr>
+            <p:ph idx="1"/>
+          </p:nvPr>
+        </p:nvSpPr>
+        <p:spPr/>
+        <p:txBody>
+          <a:bodyPr/>
+          <a:lstStyle/>
+          <a:p>
+            <a:endParaRPr lang="en-US"/>
+          </a:p>
+        </p:txBody>
+      </p:sp>
+    </p:spTree>
+    <p:extLst>
+      <p:ext uri="{BB962C8B-B14F-4D97-AF65-F5344CB8AC3E}">
+        <p14:creationId xmlns:p14="http://schemas.microsoft.com/office/powerpoint/2010/main" val="412184355"/>
+      </p:ext>
+    </p:extLst>
+  </p:cSld>
+  <p:clrMapOvr>
+    <a:masterClrMapping/>
+  </p:clrMapOvr>
+</p:sld>
+</file>
+
+<file path=ppt/slides/slide16.xml><?xml version="1.0" encoding="utf-8"?>
+<p:sld xmlns:a="http://schemas.openxmlformats.org/drawingml/2006/main" xmlns:r="http://schemas.openxmlformats.org/officeDocument/2006/relationships" xmlns:p="http://schemas.openxmlformats.org/presentationml/2006/main">
+  <p:cSld>
+    <p:spTree>
+      <p:nvGrpSpPr>
+        <p:cNvPr id="1" name=""/>
+        <p:cNvGrpSpPr/>
+        <p:nvPr/>
+      </p:nvGrpSpPr>
+      <p:grpSpPr>
+        <a:xfrm>
+          <a:off x="0" y="0"/>
+          <a:ext cx="0" cy="0"/>
+          <a:chOff x="0" y="0"/>
+          <a:chExt cx="0" cy="0"/>
+        </a:xfrm>
+      </p:grpSpPr>
+      <p:sp>
+        <p:nvSpPr>
+          <p:cNvPr id="2" name="Title 1"/>
+          <p:cNvSpPr>
+            <a:spLocks noGrp="1"/>
+          </p:cNvSpPr>
+          <p:nvPr>
+            <p:ph type="title"/>
+          </p:nvPr>
+        </p:nvSpPr>
+        <p:spPr/>
+        <p:txBody>
+          <a:bodyPr/>
+          <a:lstStyle/>
+          <a:p>
+            <a:endParaRPr lang="en-US"/>
+          </a:p>
+        </p:txBody>
+      </p:sp>
+      <p:sp>
+        <p:nvSpPr>
+          <p:cNvPr id="3" name="Content Placeholder 2"/>
+          <p:cNvSpPr>
+            <a:spLocks noGrp="1"/>
+          </p:cNvSpPr>
+          <p:nvPr>
+            <p:ph idx="1"/>
+          </p:nvPr>
+        </p:nvSpPr>
+        <p:spPr/>
+        <p:txBody>
+          <a:bodyPr/>
+          <a:lstStyle/>
+          <a:p>
+            <a:endParaRPr lang="en-US"/>
+          </a:p>
+        </p:txBody>
+      </p:sp>
+    </p:spTree>
+    <p:extLst>
+      <p:ext uri="{BB962C8B-B14F-4D97-AF65-F5344CB8AC3E}">
+        <p14:creationId xmlns:p14="http://schemas.microsoft.com/office/powerpoint/2010/main" val="1578406478"/>
+      </p:ext>
+    </p:extLst>
+  </p:cSld>
+  <p:clrMapOvr>
+    <a:masterClrMapping/>
+  </p:clrMapOvr>
+</p:sld>
+</file>
+
+<file path=ppt/slides/slide17.xml><?xml version="1.0" encoding="utf-8"?>
+<p:sld xmlns:a="http://schemas.openxmlformats.org/drawingml/2006/main" xmlns:r="http://schemas.openxmlformats.org/officeDocument/2006/relationships" xmlns:p="http://schemas.openxmlformats.org/presentationml/2006/main">
+  <p:cSld>
+    <p:spTree>
+      <p:nvGrpSpPr>
+        <p:cNvPr id="1" name=""/>
+        <p:cNvGrpSpPr/>
+        <p:nvPr/>
+      </p:nvGrpSpPr>
+      <p:grpSpPr>
+        <a:xfrm>
+          <a:off x="0" y="0"/>
+          <a:ext cx="0" cy="0"/>
+          <a:chOff x="0" y="0"/>
+          <a:chExt cx="0" cy="0"/>
+        </a:xfrm>
+      </p:grpSpPr>
+      <p:sp>
+        <p:nvSpPr>
+          <p:cNvPr id="2" name="Title 1"/>
+          <p:cNvSpPr>
+            <a:spLocks noGrp="1"/>
+          </p:cNvSpPr>
+          <p:nvPr>
+            <p:ph type="title"/>
+          </p:nvPr>
+        </p:nvSpPr>
+        <p:spPr/>
+        <p:txBody>
+          <a:bodyPr/>
+          <a:lstStyle/>
+          <a:p>
+            <a:endParaRPr lang="en-US"/>
+          </a:p>
+        </p:txBody>
+      </p:sp>
+      <p:sp>
+        <p:nvSpPr>
+          <p:cNvPr id="3" name="Content Placeholder 2"/>
+          <p:cNvSpPr>
+            <a:spLocks noGrp="1"/>
+          </p:cNvSpPr>
+          <p:nvPr>
+            <p:ph idx="1"/>
+          </p:nvPr>
+        </p:nvSpPr>
+        <p:spPr/>
+        <p:txBody>
+          <a:bodyPr/>
+          <a:lstStyle/>
+          <a:p>
+            <a:endParaRPr lang="en-US"/>
+          </a:p>
+        </p:txBody>
+      </p:sp>
+    </p:spTree>
+    <p:extLst>
+      <p:ext uri="{BB962C8B-B14F-4D97-AF65-F5344CB8AC3E}">
         <p14:creationId xmlns:p14="http://schemas.microsoft.com/office/powerpoint/2010/main" val="721245678"/>
       </p:ext>
     </p:extLst>
@@ -3511,7 +4425,7 @@
 </p:sld>
 </file>
 
-<file path=ppt/slides/slide14.xml><?xml version="1.0" encoding="utf-8"?>
+<file path=ppt/slides/slide18.xml><?xml version="1.0" encoding="utf-8"?>
 <p:sld xmlns:a="http://schemas.openxmlformats.org/drawingml/2006/main" xmlns:r="http://schemas.openxmlformats.org/officeDocument/2006/relationships" xmlns:p="http://schemas.openxmlformats.org/presentationml/2006/main">
   <p:cSld>
     <p:spTree>
@@ -3541,7 +4455,7 @@
 </p:sld>
 </file>
 
-<file path=ppt/slides/slide15.xml><?xml version="1.0" encoding="utf-8"?>
+<file path=ppt/slides/slide19.xml><?xml version="1.0" encoding="utf-8"?>
 <p:sld xmlns:a="http://schemas.openxmlformats.org/drawingml/2006/main" xmlns:r="http://schemas.openxmlformats.org/officeDocument/2006/relationships" xmlns:p="http://schemas.openxmlformats.org/presentationml/2006/main">
   <p:cSld>
     <p:spTree>
@@ -3832,811 +4746,6 @@
     <p:extLst>
       <p:ext uri="{BB962C8B-B14F-4D97-AF65-F5344CB8AC3E}">
         <p14:creationId xmlns:p14="http://schemas.microsoft.com/office/powerpoint/2010/main" val="461695872"/>
-      </p:ext>
-    </p:extLst>
-  </p:cSld>
-  <p:clrMapOvr>
-    <a:masterClrMapping/>
-  </p:clrMapOvr>
-</p:sld>
-</file>
-
-<file path=ppt/slides/slide16.xml><?xml version="1.0" encoding="utf-8"?>
-<p:sld xmlns:a="http://schemas.openxmlformats.org/drawingml/2006/main" xmlns:r="http://schemas.openxmlformats.org/officeDocument/2006/relationships" xmlns:p="http://schemas.openxmlformats.org/presentationml/2006/main">
-  <p:cSld>
-    <p:spTree>
-      <p:nvGrpSpPr>
-        <p:cNvPr id="1" name=""/>
-        <p:cNvGrpSpPr/>
-        <p:nvPr/>
-      </p:nvGrpSpPr>
-      <p:grpSpPr>
-        <a:xfrm>
-          <a:off x="0" y="0"/>
-          <a:ext cx="0" cy="0"/>
-          <a:chOff x="0" y="0"/>
-          <a:chExt cx="0" cy="0"/>
-        </a:xfrm>
-      </p:grpSpPr>
-      <p:grpSp>
-        <p:nvGrpSpPr>
-          <p:cNvPr id="13" name="Group 12"/>
-          <p:cNvGrpSpPr/>
-          <p:nvPr/>
-        </p:nvGrpSpPr>
-        <p:grpSpPr>
-          <a:xfrm>
-            <a:off x="1148862" y="3346049"/>
-            <a:ext cx="11216054" cy="4176672"/>
-            <a:chOff x="1148862" y="3346049"/>
-            <a:chExt cx="11216054" cy="4176672"/>
-          </a:xfrm>
-        </p:grpSpPr>
-        <p:pic>
-          <p:nvPicPr>
-            <p:cNvPr id="11" name="Picture 10"/>
-            <p:cNvPicPr>
-              <a:picLocks noChangeAspect="1"/>
-            </p:cNvPicPr>
-            <p:nvPr/>
-          </p:nvPicPr>
-          <p:blipFill>
-            <a:blip r:embed="rId2">
-              <a:extLst>
-                <a:ext uri="{28A0092B-C50C-407E-A947-70E740481C1C}">
-                  <a14:useLocalDpi xmlns:a14="http://schemas.microsoft.com/office/drawing/2010/main" val="0"/>
-                </a:ext>
-              </a:extLst>
-            </a:blip>
-            <a:stretch>
-              <a:fillRect/>
-            </a:stretch>
-          </p:blipFill>
-          <p:spPr>
-            <a:xfrm>
-              <a:off x="5049716" y="3346049"/>
-              <a:ext cx="7315200" cy="2743200"/>
-            </a:xfrm>
-            <a:prstGeom prst="rect">
-              <a:avLst/>
-            </a:prstGeom>
-          </p:spPr>
-        </p:pic>
-        <p:grpSp>
-          <p:nvGrpSpPr>
-            <p:cNvPr id="12" name="Group 11"/>
-            <p:cNvGrpSpPr>
-              <a:grpSpLocks noChangeAspect="1"/>
-            </p:cNvGrpSpPr>
-            <p:nvPr/>
-          </p:nvGrpSpPr>
-          <p:grpSpPr>
-            <a:xfrm>
-              <a:off x="1148862" y="3346049"/>
-              <a:ext cx="3900854" cy="4176672"/>
-              <a:chOff x="1032608" y="492457"/>
-              <a:chExt cx="5753100" cy="6159886"/>
-            </a:xfrm>
-          </p:grpSpPr>
-          <p:pic>
-            <p:nvPicPr>
-              <p:cNvPr id="5" name="Picture 4"/>
-              <p:cNvPicPr>
-                <a:picLocks noChangeAspect="1"/>
-              </p:cNvPicPr>
-              <p:nvPr/>
-            </p:nvPicPr>
-            <p:blipFill>
-              <a:blip r:embed="rId3">
-                <a:extLst>
-                  <a:ext uri="{28A0092B-C50C-407E-A947-70E740481C1C}">
-                    <a14:useLocalDpi xmlns:a14="http://schemas.microsoft.com/office/drawing/2010/main" val="0"/>
-                  </a:ext>
-                </a:extLst>
-              </a:blip>
-              <a:stretch>
-                <a:fillRect/>
-              </a:stretch>
-            </p:blipFill>
-            <p:spPr>
-              <a:xfrm>
-                <a:off x="1032608" y="492457"/>
-                <a:ext cx="5753100" cy="5080000"/>
-              </a:xfrm>
-              <a:prstGeom prst="rect">
-                <a:avLst/>
-              </a:prstGeom>
-            </p:spPr>
-          </p:pic>
-          <p:pic>
-            <p:nvPicPr>
-              <p:cNvPr id="6" name="Picture 5"/>
-              <p:cNvPicPr>
-                <a:picLocks noChangeAspect="1"/>
-              </p:cNvPicPr>
-              <p:nvPr/>
-            </p:nvPicPr>
-            <p:blipFill rotWithShape="1">
-              <a:blip r:embed="rId4">
-                <a:extLst>
-                  <a:ext uri="{28A0092B-C50C-407E-A947-70E740481C1C}">
-                    <a14:useLocalDpi xmlns:a14="http://schemas.microsoft.com/office/drawing/2010/main" val="0"/>
-                  </a:ext>
-                </a:extLst>
-              </a:blip>
-              <a:srcRect l="68876"/>
-              <a:stretch/>
-            </p:blipFill>
-            <p:spPr>
-              <a:xfrm>
-                <a:off x="5342809" y="5591639"/>
-                <a:ext cx="990383" cy="1060704"/>
-              </a:xfrm>
-              <a:prstGeom prst="rect">
-                <a:avLst/>
-              </a:prstGeom>
-            </p:spPr>
-          </p:pic>
-          <p:pic>
-            <p:nvPicPr>
-              <p:cNvPr id="7" name="Picture 6"/>
-              <p:cNvPicPr>
-                <a:picLocks noChangeAspect="1"/>
-              </p:cNvPicPr>
-              <p:nvPr/>
-            </p:nvPicPr>
-            <p:blipFill rotWithShape="1">
-              <a:blip r:embed="rId4">
-                <a:extLst>
-                  <a:ext uri="{28A0092B-C50C-407E-A947-70E740481C1C}">
-                    <a14:useLocalDpi xmlns:a14="http://schemas.microsoft.com/office/drawing/2010/main" val="0"/>
-                  </a:ext>
-                </a:extLst>
-              </a:blip>
-              <a:srcRect l="33873" r="35004"/>
-              <a:stretch/>
-            </p:blipFill>
-            <p:spPr>
-              <a:xfrm>
-                <a:off x="1458824" y="3741143"/>
-                <a:ext cx="987643" cy="1057769"/>
-              </a:xfrm>
-              <a:prstGeom prst="rect">
-                <a:avLst/>
-              </a:prstGeom>
-            </p:spPr>
-          </p:pic>
-          <p:pic>
-            <p:nvPicPr>
-              <p:cNvPr id="8" name="Picture 7"/>
-              <p:cNvPicPr>
-                <a:picLocks noChangeAspect="1"/>
-              </p:cNvPicPr>
-              <p:nvPr/>
-            </p:nvPicPr>
-            <p:blipFill rotWithShape="1">
-              <a:blip r:embed="rId4">
-                <a:extLst>
-                  <a:ext uri="{28A0092B-C50C-407E-A947-70E740481C1C}">
-                    <a14:useLocalDpi xmlns:a14="http://schemas.microsoft.com/office/drawing/2010/main" val="0"/>
-                  </a:ext>
-                </a:extLst>
-              </a:blip>
-              <a:srcRect r="68876"/>
-              <a:stretch/>
-            </p:blipFill>
-            <p:spPr>
-              <a:xfrm>
-                <a:off x="3056809" y="5591639"/>
-                <a:ext cx="990383" cy="1060704"/>
-              </a:xfrm>
-              <a:prstGeom prst="rect">
-                <a:avLst/>
-              </a:prstGeom>
-            </p:spPr>
-          </p:pic>
-        </p:grpSp>
-      </p:grpSp>
-    </p:spTree>
-    <p:extLst>
-      <p:ext uri="{BB962C8B-B14F-4D97-AF65-F5344CB8AC3E}">
-        <p14:creationId xmlns:p14="http://schemas.microsoft.com/office/powerpoint/2010/main" val="239750048"/>
-      </p:ext>
-    </p:extLst>
-  </p:cSld>
-  <p:clrMapOvr>
-    <a:masterClrMapping/>
-  </p:clrMapOvr>
-</p:sld>
-</file>
-
-<file path=ppt/slides/slide17.xml><?xml version="1.0" encoding="utf-8"?>
-<p:sld xmlns:a="http://schemas.openxmlformats.org/drawingml/2006/main" xmlns:r="http://schemas.openxmlformats.org/officeDocument/2006/relationships" xmlns:p="http://schemas.openxmlformats.org/presentationml/2006/main">
-  <p:cSld>
-    <p:spTree>
-      <p:nvGrpSpPr>
-        <p:cNvPr id="1" name=""/>
-        <p:cNvGrpSpPr/>
-        <p:nvPr/>
-      </p:nvGrpSpPr>
-      <p:grpSpPr>
-        <a:xfrm>
-          <a:off x="0" y="0"/>
-          <a:ext cx="0" cy="0"/>
-          <a:chOff x="0" y="0"/>
-          <a:chExt cx="0" cy="0"/>
-        </a:xfrm>
-      </p:grpSpPr>
-      <p:grpSp>
-        <p:nvGrpSpPr>
-          <p:cNvPr id="6" name="Group 5"/>
-          <p:cNvGrpSpPr/>
-          <p:nvPr/>
-        </p:nvGrpSpPr>
-        <p:grpSpPr>
-          <a:xfrm>
-            <a:off x="3213100" y="891040"/>
-            <a:ext cx="5753100" cy="6159886"/>
-            <a:chOff x="3213100" y="703472"/>
-            <a:chExt cx="5753100" cy="6159886"/>
-          </a:xfrm>
-        </p:grpSpPr>
-        <p:pic>
-          <p:nvPicPr>
-            <p:cNvPr id="2" name="Picture 1"/>
-            <p:cNvPicPr>
-              <a:picLocks noChangeAspect="1"/>
-            </p:cNvPicPr>
-            <p:nvPr/>
-          </p:nvPicPr>
-          <p:blipFill>
-            <a:blip r:embed="rId2">
-              <a:extLst>
-                <a:ext uri="{28A0092B-C50C-407E-A947-70E740481C1C}">
-                  <a14:useLocalDpi xmlns:a14="http://schemas.microsoft.com/office/drawing/2010/main" val="0"/>
-                </a:ext>
-              </a:extLst>
-            </a:blip>
-            <a:stretch>
-              <a:fillRect/>
-            </a:stretch>
-          </p:blipFill>
-          <p:spPr>
-            <a:xfrm>
-              <a:off x="3213100" y="703472"/>
-              <a:ext cx="5753100" cy="5080000"/>
-            </a:xfrm>
-            <a:prstGeom prst="rect">
-              <a:avLst/>
-            </a:prstGeom>
-          </p:spPr>
-        </p:pic>
-        <p:pic>
-          <p:nvPicPr>
-            <p:cNvPr id="7" name="Picture 6"/>
-            <p:cNvPicPr>
-              <a:picLocks noChangeAspect="1"/>
-            </p:cNvPicPr>
-            <p:nvPr/>
-          </p:nvPicPr>
-          <p:blipFill rotWithShape="1">
-            <a:blip r:embed="rId3">
-              <a:extLst>
-                <a:ext uri="{28A0092B-C50C-407E-A947-70E740481C1C}">
-                  <a14:useLocalDpi xmlns:a14="http://schemas.microsoft.com/office/drawing/2010/main" val="0"/>
-                </a:ext>
-              </a:extLst>
-            </a:blip>
-            <a:srcRect l="68876"/>
-            <a:stretch/>
-          </p:blipFill>
-          <p:spPr>
-            <a:xfrm>
-              <a:off x="7523301" y="5802654"/>
-              <a:ext cx="990383" cy="1060704"/>
-            </a:xfrm>
-            <a:prstGeom prst="rect">
-              <a:avLst/>
-            </a:prstGeom>
-          </p:spPr>
-        </p:pic>
-        <p:pic>
-          <p:nvPicPr>
-            <p:cNvPr id="8" name="Picture 7"/>
-            <p:cNvPicPr>
-              <a:picLocks noChangeAspect="1"/>
-            </p:cNvPicPr>
-            <p:nvPr/>
-          </p:nvPicPr>
-          <p:blipFill rotWithShape="1">
-            <a:blip r:embed="rId3">
-              <a:extLst>
-                <a:ext uri="{28A0092B-C50C-407E-A947-70E740481C1C}">
-                  <a14:useLocalDpi xmlns:a14="http://schemas.microsoft.com/office/drawing/2010/main" val="0"/>
-                </a:ext>
-              </a:extLst>
-            </a:blip>
-            <a:srcRect l="33873" r="35004"/>
-            <a:stretch/>
-          </p:blipFill>
-          <p:spPr>
-            <a:xfrm>
-              <a:off x="3639316" y="3952158"/>
-              <a:ext cx="987643" cy="1057769"/>
-            </a:xfrm>
-            <a:prstGeom prst="rect">
-              <a:avLst/>
-            </a:prstGeom>
-          </p:spPr>
-        </p:pic>
-        <p:pic>
-          <p:nvPicPr>
-            <p:cNvPr id="9" name="Picture 8"/>
-            <p:cNvPicPr>
-              <a:picLocks noChangeAspect="1"/>
-            </p:cNvPicPr>
-            <p:nvPr/>
-          </p:nvPicPr>
-          <p:blipFill rotWithShape="1">
-            <a:blip r:embed="rId3">
-              <a:extLst>
-                <a:ext uri="{28A0092B-C50C-407E-A947-70E740481C1C}">
-                  <a14:useLocalDpi xmlns:a14="http://schemas.microsoft.com/office/drawing/2010/main" val="0"/>
-                </a:ext>
-              </a:extLst>
-            </a:blip>
-            <a:srcRect r="68876"/>
-            <a:stretch/>
-          </p:blipFill>
-          <p:spPr>
-            <a:xfrm>
-              <a:off x="5237301" y="5802654"/>
-              <a:ext cx="990383" cy="1060704"/>
-            </a:xfrm>
-            <a:prstGeom prst="rect">
-              <a:avLst/>
-            </a:prstGeom>
-          </p:spPr>
-        </p:pic>
-      </p:grpSp>
-      <p:sp>
-        <p:nvSpPr>
-          <p:cNvPr id="10" name="TextBox 9"/>
-          <p:cNvSpPr txBox="1"/>
-          <p:nvPr/>
-        </p:nvSpPr>
-        <p:spPr>
-          <a:xfrm>
-            <a:off x="184403" y="703472"/>
-            <a:ext cx="2817681" cy="2369880"/>
-          </a:xfrm>
-          <a:prstGeom prst="rect">
-            <a:avLst/>
-          </a:prstGeom>
-          <a:noFill/>
-        </p:spPr>
-        <p:txBody>
-          <a:bodyPr wrap="square" rtlCol="0">
-            <a:spAutoFit/>
-          </a:bodyPr>
-          <a:lstStyle/>
-          <a:p>
-            <a:r>
-              <a:rPr lang="en-US" sz="2400" b="1" dirty="0" smtClean="0"/>
-              <a:t>What class (species) is a flower with the following feature? </a:t>
-            </a:r>
-          </a:p>
-          <a:p>
-            <a:endParaRPr lang="en-US" dirty="0" smtClean="0"/>
-          </a:p>
-          <a:p>
-            <a:r>
-              <a:rPr lang="en-US" sz="2200" dirty="0" smtClean="0"/>
-              <a:t>petal length (cm): 4.5</a:t>
-            </a:r>
-          </a:p>
-          <a:p>
-            <a:endParaRPr lang="en-US" dirty="0"/>
-          </a:p>
-          <a:p>
-            <a:endParaRPr lang="en-US" dirty="0"/>
-          </a:p>
-        </p:txBody>
-      </p:sp>
-      <p:sp>
-        <p:nvSpPr>
-          <p:cNvPr id="12" name="Rectangle 11"/>
-          <p:cNvSpPr/>
-          <p:nvPr/>
-        </p:nvSpPr>
-        <p:spPr>
-          <a:xfrm>
-            <a:off x="1415583" y="7197686"/>
-            <a:ext cx="7165714" cy="430887"/>
-          </a:xfrm>
-          <a:prstGeom prst="rect">
-            <a:avLst/>
-          </a:prstGeom>
-        </p:spPr>
-        <p:txBody>
-          <a:bodyPr wrap="square">
-            <a:spAutoFit/>
-          </a:bodyPr>
-          <a:lstStyle/>
-          <a:p>
-            <a:pPr algn="ctr"/>
-            <a:r>
-              <a:rPr lang="en-US" sz="2200" dirty="0" smtClean="0"/>
-              <a:t>The prediction is versicolor</a:t>
-            </a:r>
-            <a:endParaRPr lang="en-US" sz="2200" dirty="0"/>
-          </a:p>
-        </p:txBody>
-      </p:sp>
-      <p:pic>
-        <p:nvPicPr>
-          <p:cNvPr id="14" name="Picture 13"/>
-          <p:cNvPicPr>
-            <a:picLocks noChangeAspect="1"/>
-          </p:cNvPicPr>
-          <p:nvPr/>
-        </p:nvPicPr>
-        <p:blipFill>
-          <a:blip r:embed="rId4">
-            <a:extLst>
-              <a:ext uri="{28A0092B-C50C-407E-A947-70E740481C1C}">
-                <a14:useLocalDpi xmlns:a14="http://schemas.microsoft.com/office/drawing/2010/main" val="0"/>
-              </a:ext>
-            </a:extLst>
-          </a:blip>
-          <a:stretch>
-            <a:fillRect/>
-          </a:stretch>
-        </p:blipFill>
-        <p:spPr>
-          <a:xfrm>
-            <a:off x="9135931" y="-3789886"/>
-            <a:ext cx="4686300" cy="3187700"/>
-          </a:xfrm>
-          <a:prstGeom prst="rect">
-            <a:avLst/>
-          </a:prstGeom>
-          <a:ln w="12700">
-            <a:solidFill>
-              <a:schemeClr val="tx1"/>
-            </a:solidFill>
-          </a:ln>
-        </p:spPr>
-      </p:pic>
-    </p:spTree>
-    <p:extLst>
-      <p:ext uri="{BB962C8B-B14F-4D97-AF65-F5344CB8AC3E}">
-        <p14:creationId xmlns:p14="http://schemas.microsoft.com/office/powerpoint/2010/main" val="1777933550"/>
-      </p:ext>
-    </p:extLst>
-  </p:cSld>
-  <p:clrMapOvr>
-    <a:masterClrMapping/>
-  </p:clrMapOvr>
-</p:sld>
-</file>
-
-<file path=ppt/slides/slide18.xml><?xml version="1.0" encoding="utf-8"?>
-<p:sld xmlns:a="http://schemas.openxmlformats.org/drawingml/2006/main" xmlns:r="http://schemas.openxmlformats.org/officeDocument/2006/relationships" xmlns:p="http://schemas.openxmlformats.org/presentationml/2006/main">
-  <p:cSld>
-    <p:spTree>
-      <p:nvGrpSpPr>
-        <p:cNvPr id="1" name=""/>
-        <p:cNvGrpSpPr/>
-        <p:nvPr/>
-      </p:nvGrpSpPr>
-      <p:grpSpPr>
-        <a:xfrm>
-          <a:off x="0" y="0"/>
-          <a:ext cx="0" cy="0"/>
-          <a:chOff x="0" y="0"/>
-          <a:chExt cx="0" cy="0"/>
-        </a:xfrm>
-      </p:grpSpPr>
-      <p:grpSp>
-        <p:nvGrpSpPr>
-          <p:cNvPr id="13" name="Group 12"/>
-          <p:cNvGrpSpPr/>
-          <p:nvPr/>
-        </p:nvGrpSpPr>
-        <p:grpSpPr>
-          <a:xfrm>
-            <a:off x="395419" y="703472"/>
-            <a:ext cx="8570781" cy="6706756"/>
-            <a:chOff x="395419" y="703472"/>
-            <a:chExt cx="8570781" cy="6706756"/>
-          </a:xfrm>
-        </p:grpSpPr>
-        <p:pic>
-          <p:nvPicPr>
-            <p:cNvPr id="11" name="Picture 10"/>
-            <p:cNvPicPr>
-              <a:picLocks noChangeAspect="1"/>
-            </p:cNvPicPr>
-            <p:nvPr/>
-          </p:nvPicPr>
-          <p:blipFill>
-            <a:blip r:embed="rId2">
-              <a:extLst>
-                <a:ext uri="{28A0092B-C50C-407E-A947-70E740481C1C}">
-                  <a14:useLocalDpi xmlns:a14="http://schemas.microsoft.com/office/drawing/2010/main" val="0"/>
-                </a:ext>
-              </a:extLst>
-            </a:blip>
-            <a:stretch>
-              <a:fillRect/>
-            </a:stretch>
-          </p:blipFill>
-          <p:spPr>
-            <a:xfrm>
-              <a:off x="3213100" y="703472"/>
-              <a:ext cx="5753100" cy="5080000"/>
-            </a:xfrm>
-            <a:prstGeom prst="rect">
-              <a:avLst/>
-            </a:prstGeom>
-          </p:spPr>
-        </p:pic>
-        <p:pic>
-          <p:nvPicPr>
-            <p:cNvPr id="7" name="Picture 6"/>
-            <p:cNvPicPr>
-              <a:picLocks noChangeAspect="1"/>
-            </p:cNvPicPr>
-            <p:nvPr/>
-          </p:nvPicPr>
-          <p:blipFill rotWithShape="1">
-            <a:blip r:embed="rId3">
-              <a:extLst>
-                <a:ext uri="{28A0092B-C50C-407E-A947-70E740481C1C}">
-                  <a14:useLocalDpi xmlns:a14="http://schemas.microsoft.com/office/drawing/2010/main" val="0"/>
-                </a:ext>
-              </a:extLst>
-            </a:blip>
-            <a:srcRect l="68876"/>
-            <a:stretch/>
-          </p:blipFill>
-          <p:spPr>
-            <a:xfrm>
-              <a:off x="7523301" y="5755762"/>
-              <a:ext cx="990383" cy="1060704"/>
-            </a:xfrm>
-            <a:prstGeom prst="rect">
-              <a:avLst/>
-            </a:prstGeom>
-          </p:spPr>
-        </p:pic>
-        <p:pic>
-          <p:nvPicPr>
-            <p:cNvPr id="8" name="Picture 7"/>
-            <p:cNvPicPr>
-              <a:picLocks noChangeAspect="1"/>
-            </p:cNvPicPr>
-            <p:nvPr/>
-          </p:nvPicPr>
-          <p:blipFill rotWithShape="1">
-            <a:blip r:embed="rId3">
-              <a:extLst>
-                <a:ext uri="{28A0092B-C50C-407E-A947-70E740481C1C}">
-                  <a14:useLocalDpi xmlns:a14="http://schemas.microsoft.com/office/drawing/2010/main" val="0"/>
-                </a:ext>
-              </a:extLst>
-            </a:blip>
-            <a:srcRect l="33873" r="35004"/>
-            <a:stretch/>
-          </p:blipFill>
-          <p:spPr>
-            <a:xfrm>
-              <a:off x="3639316" y="3952158"/>
-              <a:ext cx="987643" cy="1057769"/>
-            </a:xfrm>
-            <a:prstGeom prst="rect">
-              <a:avLst/>
-            </a:prstGeom>
-          </p:spPr>
-        </p:pic>
-        <p:pic>
-          <p:nvPicPr>
-            <p:cNvPr id="9" name="Picture 8"/>
-            <p:cNvPicPr>
-              <a:picLocks noChangeAspect="1"/>
-            </p:cNvPicPr>
-            <p:nvPr/>
-          </p:nvPicPr>
-          <p:blipFill rotWithShape="1">
-            <a:blip r:embed="rId3">
-              <a:extLst>
-                <a:ext uri="{28A0092B-C50C-407E-A947-70E740481C1C}">
-                  <a14:useLocalDpi xmlns:a14="http://schemas.microsoft.com/office/drawing/2010/main" val="0"/>
-                </a:ext>
-              </a:extLst>
-            </a:blip>
-            <a:srcRect r="68876"/>
-            <a:stretch/>
-          </p:blipFill>
-          <p:spPr>
-            <a:xfrm>
-              <a:off x="5237301" y="5755762"/>
-              <a:ext cx="990383" cy="1060704"/>
-            </a:xfrm>
-            <a:prstGeom prst="rect">
-              <a:avLst/>
-            </a:prstGeom>
-          </p:spPr>
-        </p:pic>
-        <p:sp>
-          <p:nvSpPr>
-            <p:cNvPr id="10" name="TextBox 9"/>
-            <p:cNvSpPr txBox="1"/>
-            <p:nvPr/>
-          </p:nvSpPr>
-          <p:spPr>
-            <a:xfrm>
-              <a:off x="395419" y="889000"/>
-              <a:ext cx="2817681" cy="3539430"/>
-            </a:xfrm>
-            <a:prstGeom prst="rect">
-              <a:avLst/>
-            </a:prstGeom>
-            <a:noFill/>
-          </p:spPr>
-          <p:txBody>
-            <a:bodyPr wrap="square" rtlCol="0">
-              <a:spAutoFit/>
-            </a:bodyPr>
-            <a:lstStyle/>
-            <a:p>
-              <a:r>
-                <a:rPr lang="en-US" sz="2400" b="1" dirty="0" smtClean="0"/>
-                <a:t>What class (species) is a flower with the following features? </a:t>
-              </a:r>
-            </a:p>
-            <a:p>
-              <a:endParaRPr lang="en-US" dirty="0" smtClean="0"/>
-            </a:p>
-            <a:p>
-              <a:r>
-                <a:rPr lang="en-US" sz="2000" dirty="0" smtClean="0"/>
-                <a:t>sepal length (cm): 5.8</a:t>
-              </a:r>
-            </a:p>
-            <a:p>
-              <a:r>
-                <a:rPr lang="en-US" sz="2000" dirty="0" smtClean="0"/>
-                <a:t>sepal width (cm): 2.8</a:t>
-              </a:r>
-            </a:p>
-            <a:p>
-              <a:r>
-                <a:rPr lang="en-US" sz="2000" dirty="0" smtClean="0"/>
-                <a:t>petal length (cm): 5.1</a:t>
-              </a:r>
-            </a:p>
-            <a:p>
-              <a:r>
-                <a:rPr lang="en-US" sz="2000" dirty="0" smtClean="0"/>
-                <a:t>petal width (cm): 2.4</a:t>
-              </a:r>
-              <a:endParaRPr lang="en-US" sz="2000" dirty="0"/>
-            </a:p>
-            <a:p>
-              <a:endParaRPr lang="en-US" dirty="0" smtClean="0"/>
-            </a:p>
-            <a:p>
-              <a:endParaRPr lang="en-US" dirty="0"/>
-            </a:p>
-            <a:p>
-              <a:endParaRPr lang="en-US" dirty="0"/>
-            </a:p>
-          </p:txBody>
-        </p:sp>
-        <p:sp>
-          <p:nvSpPr>
-            <p:cNvPr id="12" name="Rectangle 11"/>
-            <p:cNvSpPr/>
-            <p:nvPr/>
-          </p:nvSpPr>
-          <p:spPr>
-            <a:xfrm>
-              <a:off x="2189301" y="7010118"/>
-              <a:ext cx="6096000" cy="400110"/>
-            </a:xfrm>
-            <a:prstGeom prst="rect">
-              <a:avLst/>
-            </a:prstGeom>
-          </p:spPr>
-          <p:txBody>
-            <a:bodyPr>
-              <a:spAutoFit/>
-            </a:bodyPr>
-            <a:lstStyle/>
-            <a:p>
-              <a:r>
-                <a:rPr lang="en-US" sz="2000" dirty="0" smtClean="0"/>
-                <a:t>The prediction is </a:t>
-              </a:r>
-              <a:r>
-                <a:rPr lang="en-US" sz="2000" dirty="0" err="1" smtClean="0"/>
-                <a:t>virginica</a:t>
-              </a:r>
-              <a:r>
-                <a:rPr lang="en-US" sz="2000" dirty="0" smtClean="0"/>
-                <a:t> as it is the majority class. </a:t>
-              </a:r>
-              <a:endParaRPr lang="en-US" sz="2000" dirty="0"/>
-            </a:p>
-          </p:txBody>
-        </p:sp>
-      </p:grpSp>
-    </p:spTree>
-    <p:extLst>
-      <p:ext uri="{BB962C8B-B14F-4D97-AF65-F5344CB8AC3E}">
-        <p14:creationId xmlns:p14="http://schemas.microsoft.com/office/powerpoint/2010/main" val="208845141"/>
-      </p:ext>
-    </p:extLst>
-  </p:cSld>
-  <p:clrMapOvr>
-    <a:masterClrMapping/>
-  </p:clrMapOvr>
-</p:sld>
-</file>
-
-<file path=ppt/slides/slide19.xml><?xml version="1.0" encoding="utf-8"?>
-<p:sld xmlns:a="http://schemas.openxmlformats.org/drawingml/2006/main" xmlns:r="http://schemas.openxmlformats.org/officeDocument/2006/relationships" xmlns:p="http://schemas.openxmlformats.org/presentationml/2006/main">
-  <p:cSld>
-    <p:spTree>
-      <p:nvGrpSpPr>
-        <p:cNvPr id="1" name=""/>
-        <p:cNvGrpSpPr/>
-        <p:nvPr/>
-      </p:nvGrpSpPr>
-      <p:grpSpPr>
-        <a:xfrm>
-          <a:off x="0" y="0"/>
-          <a:ext cx="0" cy="0"/>
-          <a:chOff x="0" y="0"/>
-          <a:chExt cx="0" cy="0"/>
-        </a:xfrm>
-      </p:grpSpPr>
-      <p:pic>
-        <p:nvPicPr>
-          <p:cNvPr id="4" name="Picture 3"/>
-          <p:cNvPicPr>
-            <a:picLocks noChangeAspect="1"/>
-          </p:cNvPicPr>
-          <p:nvPr/>
-        </p:nvPicPr>
-        <p:blipFill>
-          <a:blip r:embed="rId2">
-            <a:extLst>
-              <a:ext uri="{28A0092B-C50C-407E-A947-70E740481C1C}">
-                <a14:useLocalDpi xmlns:a14="http://schemas.microsoft.com/office/drawing/2010/main" val="0"/>
-              </a:ext>
-            </a:extLst>
-          </a:blip>
-          <a:stretch>
-            <a:fillRect/>
-          </a:stretch>
-        </p:blipFill>
-        <p:spPr>
-          <a:xfrm>
-            <a:off x="3759200" y="1828800"/>
-            <a:ext cx="4660900" cy="3187700"/>
-          </a:xfrm>
-          <a:prstGeom prst="rect">
-            <a:avLst/>
-          </a:prstGeom>
-        </p:spPr>
-      </p:pic>
-    </p:spTree>
-    <p:extLst>
-      <p:ext uri="{BB962C8B-B14F-4D97-AF65-F5344CB8AC3E}">
-        <p14:creationId xmlns:p14="http://schemas.microsoft.com/office/powerpoint/2010/main" val="1165698673"/>
       </p:ext>
     </p:extLst>
   </p:cSld>
@@ -5001,6 +5110,811 @@
     <p:extLst>
       <p:ext uri="{BB962C8B-B14F-4D97-AF65-F5344CB8AC3E}">
         <p14:creationId xmlns:p14="http://schemas.microsoft.com/office/powerpoint/2010/main" val="611213031"/>
+      </p:ext>
+    </p:extLst>
+  </p:cSld>
+  <p:clrMapOvr>
+    <a:masterClrMapping/>
+  </p:clrMapOvr>
+</p:sld>
+</file>
+
+<file path=ppt/slides/slide20.xml><?xml version="1.0" encoding="utf-8"?>
+<p:sld xmlns:a="http://schemas.openxmlformats.org/drawingml/2006/main" xmlns:r="http://schemas.openxmlformats.org/officeDocument/2006/relationships" xmlns:p="http://schemas.openxmlformats.org/presentationml/2006/main">
+  <p:cSld>
+    <p:spTree>
+      <p:nvGrpSpPr>
+        <p:cNvPr id="1" name=""/>
+        <p:cNvGrpSpPr/>
+        <p:nvPr/>
+      </p:nvGrpSpPr>
+      <p:grpSpPr>
+        <a:xfrm>
+          <a:off x="0" y="0"/>
+          <a:ext cx="0" cy="0"/>
+          <a:chOff x="0" y="0"/>
+          <a:chExt cx="0" cy="0"/>
+        </a:xfrm>
+      </p:grpSpPr>
+      <p:grpSp>
+        <p:nvGrpSpPr>
+          <p:cNvPr id="13" name="Group 12"/>
+          <p:cNvGrpSpPr/>
+          <p:nvPr/>
+        </p:nvGrpSpPr>
+        <p:grpSpPr>
+          <a:xfrm>
+            <a:off x="1148862" y="3346049"/>
+            <a:ext cx="11216054" cy="4176672"/>
+            <a:chOff x="1148862" y="3346049"/>
+            <a:chExt cx="11216054" cy="4176672"/>
+          </a:xfrm>
+        </p:grpSpPr>
+        <p:pic>
+          <p:nvPicPr>
+            <p:cNvPr id="11" name="Picture 10"/>
+            <p:cNvPicPr>
+              <a:picLocks noChangeAspect="1"/>
+            </p:cNvPicPr>
+            <p:nvPr/>
+          </p:nvPicPr>
+          <p:blipFill>
+            <a:blip r:embed="rId2">
+              <a:extLst>
+                <a:ext uri="{28A0092B-C50C-407E-A947-70E740481C1C}">
+                  <a14:useLocalDpi xmlns:a14="http://schemas.microsoft.com/office/drawing/2010/main" val="0"/>
+                </a:ext>
+              </a:extLst>
+            </a:blip>
+            <a:stretch>
+              <a:fillRect/>
+            </a:stretch>
+          </p:blipFill>
+          <p:spPr>
+            <a:xfrm>
+              <a:off x="5049716" y="3346049"/>
+              <a:ext cx="7315200" cy="2743200"/>
+            </a:xfrm>
+            <a:prstGeom prst="rect">
+              <a:avLst/>
+            </a:prstGeom>
+          </p:spPr>
+        </p:pic>
+        <p:grpSp>
+          <p:nvGrpSpPr>
+            <p:cNvPr id="12" name="Group 11"/>
+            <p:cNvGrpSpPr>
+              <a:grpSpLocks noChangeAspect="1"/>
+            </p:cNvGrpSpPr>
+            <p:nvPr/>
+          </p:nvGrpSpPr>
+          <p:grpSpPr>
+            <a:xfrm>
+              <a:off x="1148862" y="3346049"/>
+              <a:ext cx="3900854" cy="4176672"/>
+              <a:chOff x="1032608" y="492457"/>
+              <a:chExt cx="5753100" cy="6159886"/>
+            </a:xfrm>
+          </p:grpSpPr>
+          <p:pic>
+            <p:nvPicPr>
+              <p:cNvPr id="5" name="Picture 4"/>
+              <p:cNvPicPr>
+                <a:picLocks noChangeAspect="1"/>
+              </p:cNvPicPr>
+              <p:nvPr/>
+            </p:nvPicPr>
+            <p:blipFill>
+              <a:blip r:embed="rId3">
+                <a:extLst>
+                  <a:ext uri="{28A0092B-C50C-407E-A947-70E740481C1C}">
+                    <a14:useLocalDpi xmlns:a14="http://schemas.microsoft.com/office/drawing/2010/main" val="0"/>
+                  </a:ext>
+                </a:extLst>
+              </a:blip>
+              <a:stretch>
+                <a:fillRect/>
+              </a:stretch>
+            </p:blipFill>
+            <p:spPr>
+              <a:xfrm>
+                <a:off x="1032608" y="492457"/>
+                <a:ext cx="5753100" cy="5080000"/>
+              </a:xfrm>
+              <a:prstGeom prst="rect">
+                <a:avLst/>
+              </a:prstGeom>
+            </p:spPr>
+          </p:pic>
+          <p:pic>
+            <p:nvPicPr>
+              <p:cNvPr id="6" name="Picture 5"/>
+              <p:cNvPicPr>
+                <a:picLocks noChangeAspect="1"/>
+              </p:cNvPicPr>
+              <p:nvPr/>
+            </p:nvPicPr>
+            <p:blipFill rotWithShape="1">
+              <a:blip r:embed="rId4">
+                <a:extLst>
+                  <a:ext uri="{28A0092B-C50C-407E-A947-70E740481C1C}">
+                    <a14:useLocalDpi xmlns:a14="http://schemas.microsoft.com/office/drawing/2010/main" val="0"/>
+                  </a:ext>
+                </a:extLst>
+              </a:blip>
+              <a:srcRect l="68876"/>
+              <a:stretch/>
+            </p:blipFill>
+            <p:spPr>
+              <a:xfrm>
+                <a:off x="5342809" y="5591639"/>
+                <a:ext cx="990383" cy="1060704"/>
+              </a:xfrm>
+              <a:prstGeom prst="rect">
+                <a:avLst/>
+              </a:prstGeom>
+            </p:spPr>
+          </p:pic>
+          <p:pic>
+            <p:nvPicPr>
+              <p:cNvPr id="7" name="Picture 6"/>
+              <p:cNvPicPr>
+                <a:picLocks noChangeAspect="1"/>
+              </p:cNvPicPr>
+              <p:nvPr/>
+            </p:nvPicPr>
+            <p:blipFill rotWithShape="1">
+              <a:blip r:embed="rId4">
+                <a:extLst>
+                  <a:ext uri="{28A0092B-C50C-407E-A947-70E740481C1C}">
+                    <a14:useLocalDpi xmlns:a14="http://schemas.microsoft.com/office/drawing/2010/main" val="0"/>
+                  </a:ext>
+                </a:extLst>
+              </a:blip>
+              <a:srcRect l="33873" r="35004"/>
+              <a:stretch/>
+            </p:blipFill>
+            <p:spPr>
+              <a:xfrm>
+                <a:off x="1458824" y="3741143"/>
+                <a:ext cx="987643" cy="1057769"/>
+              </a:xfrm>
+              <a:prstGeom prst="rect">
+                <a:avLst/>
+              </a:prstGeom>
+            </p:spPr>
+          </p:pic>
+          <p:pic>
+            <p:nvPicPr>
+              <p:cNvPr id="8" name="Picture 7"/>
+              <p:cNvPicPr>
+                <a:picLocks noChangeAspect="1"/>
+              </p:cNvPicPr>
+              <p:nvPr/>
+            </p:nvPicPr>
+            <p:blipFill rotWithShape="1">
+              <a:blip r:embed="rId4">
+                <a:extLst>
+                  <a:ext uri="{28A0092B-C50C-407E-A947-70E740481C1C}">
+                    <a14:useLocalDpi xmlns:a14="http://schemas.microsoft.com/office/drawing/2010/main" val="0"/>
+                  </a:ext>
+                </a:extLst>
+              </a:blip>
+              <a:srcRect r="68876"/>
+              <a:stretch/>
+            </p:blipFill>
+            <p:spPr>
+              <a:xfrm>
+                <a:off x="3056809" y="5591639"/>
+                <a:ext cx="990383" cy="1060704"/>
+              </a:xfrm>
+              <a:prstGeom prst="rect">
+                <a:avLst/>
+              </a:prstGeom>
+            </p:spPr>
+          </p:pic>
+        </p:grpSp>
+      </p:grpSp>
+    </p:spTree>
+    <p:extLst>
+      <p:ext uri="{BB962C8B-B14F-4D97-AF65-F5344CB8AC3E}">
+        <p14:creationId xmlns:p14="http://schemas.microsoft.com/office/powerpoint/2010/main" val="239750048"/>
+      </p:ext>
+    </p:extLst>
+  </p:cSld>
+  <p:clrMapOvr>
+    <a:masterClrMapping/>
+  </p:clrMapOvr>
+</p:sld>
+</file>
+
+<file path=ppt/slides/slide21.xml><?xml version="1.0" encoding="utf-8"?>
+<p:sld xmlns:a="http://schemas.openxmlformats.org/drawingml/2006/main" xmlns:r="http://schemas.openxmlformats.org/officeDocument/2006/relationships" xmlns:p="http://schemas.openxmlformats.org/presentationml/2006/main">
+  <p:cSld>
+    <p:spTree>
+      <p:nvGrpSpPr>
+        <p:cNvPr id="1" name=""/>
+        <p:cNvGrpSpPr/>
+        <p:nvPr/>
+      </p:nvGrpSpPr>
+      <p:grpSpPr>
+        <a:xfrm>
+          <a:off x="0" y="0"/>
+          <a:ext cx="0" cy="0"/>
+          <a:chOff x="0" y="0"/>
+          <a:chExt cx="0" cy="0"/>
+        </a:xfrm>
+      </p:grpSpPr>
+      <p:grpSp>
+        <p:nvGrpSpPr>
+          <p:cNvPr id="6" name="Group 5"/>
+          <p:cNvGrpSpPr/>
+          <p:nvPr/>
+        </p:nvGrpSpPr>
+        <p:grpSpPr>
+          <a:xfrm>
+            <a:off x="3213100" y="891040"/>
+            <a:ext cx="5753100" cy="6159886"/>
+            <a:chOff x="3213100" y="703472"/>
+            <a:chExt cx="5753100" cy="6159886"/>
+          </a:xfrm>
+        </p:grpSpPr>
+        <p:pic>
+          <p:nvPicPr>
+            <p:cNvPr id="2" name="Picture 1"/>
+            <p:cNvPicPr>
+              <a:picLocks noChangeAspect="1"/>
+            </p:cNvPicPr>
+            <p:nvPr/>
+          </p:nvPicPr>
+          <p:blipFill>
+            <a:blip r:embed="rId2">
+              <a:extLst>
+                <a:ext uri="{28A0092B-C50C-407E-A947-70E740481C1C}">
+                  <a14:useLocalDpi xmlns:a14="http://schemas.microsoft.com/office/drawing/2010/main" val="0"/>
+                </a:ext>
+              </a:extLst>
+            </a:blip>
+            <a:stretch>
+              <a:fillRect/>
+            </a:stretch>
+          </p:blipFill>
+          <p:spPr>
+            <a:xfrm>
+              <a:off x="3213100" y="703472"/>
+              <a:ext cx="5753100" cy="5080000"/>
+            </a:xfrm>
+            <a:prstGeom prst="rect">
+              <a:avLst/>
+            </a:prstGeom>
+          </p:spPr>
+        </p:pic>
+        <p:pic>
+          <p:nvPicPr>
+            <p:cNvPr id="7" name="Picture 6"/>
+            <p:cNvPicPr>
+              <a:picLocks noChangeAspect="1"/>
+            </p:cNvPicPr>
+            <p:nvPr/>
+          </p:nvPicPr>
+          <p:blipFill rotWithShape="1">
+            <a:blip r:embed="rId3">
+              <a:extLst>
+                <a:ext uri="{28A0092B-C50C-407E-A947-70E740481C1C}">
+                  <a14:useLocalDpi xmlns:a14="http://schemas.microsoft.com/office/drawing/2010/main" val="0"/>
+                </a:ext>
+              </a:extLst>
+            </a:blip>
+            <a:srcRect l="68876"/>
+            <a:stretch/>
+          </p:blipFill>
+          <p:spPr>
+            <a:xfrm>
+              <a:off x="7523301" y="5802654"/>
+              <a:ext cx="990383" cy="1060704"/>
+            </a:xfrm>
+            <a:prstGeom prst="rect">
+              <a:avLst/>
+            </a:prstGeom>
+          </p:spPr>
+        </p:pic>
+        <p:pic>
+          <p:nvPicPr>
+            <p:cNvPr id="8" name="Picture 7"/>
+            <p:cNvPicPr>
+              <a:picLocks noChangeAspect="1"/>
+            </p:cNvPicPr>
+            <p:nvPr/>
+          </p:nvPicPr>
+          <p:blipFill rotWithShape="1">
+            <a:blip r:embed="rId3">
+              <a:extLst>
+                <a:ext uri="{28A0092B-C50C-407E-A947-70E740481C1C}">
+                  <a14:useLocalDpi xmlns:a14="http://schemas.microsoft.com/office/drawing/2010/main" val="0"/>
+                </a:ext>
+              </a:extLst>
+            </a:blip>
+            <a:srcRect l="33873" r="35004"/>
+            <a:stretch/>
+          </p:blipFill>
+          <p:spPr>
+            <a:xfrm>
+              <a:off x="3639316" y="3952158"/>
+              <a:ext cx="987643" cy="1057769"/>
+            </a:xfrm>
+            <a:prstGeom prst="rect">
+              <a:avLst/>
+            </a:prstGeom>
+          </p:spPr>
+        </p:pic>
+        <p:pic>
+          <p:nvPicPr>
+            <p:cNvPr id="9" name="Picture 8"/>
+            <p:cNvPicPr>
+              <a:picLocks noChangeAspect="1"/>
+            </p:cNvPicPr>
+            <p:nvPr/>
+          </p:nvPicPr>
+          <p:blipFill rotWithShape="1">
+            <a:blip r:embed="rId3">
+              <a:extLst>
+                <a:ext uri="{28A0092B-C50C-407E-A947-70E740481C1C}">
+                  <a14:useLocalDpi xmlns:a14="http://schemas.microsoft.com/office/drawing/2010/main" val="0"/>
+                </a:ext>
+              </a:extLst>
+            </a:blip>
+            <a:srcRect r="68876"/>
+            <a:stretch/>
+          </p:blipFill>
+          <p:spPr>
+            <a:xfrm>
+              <a:off x="5237301" y="5802654"/>
+              <a:ext cx="990383" cy="1060704"/>
+            </a:xfrm>
+            <a:prstGeom prst="rect">
+              <a:avLst/>
+            </a:prstGeom>
+          </p:spPr>
+        </p:pic>
+      </p:grpSp>
+      <p:sp>
+        <p:nvSpPr>
+          <p:cNvPr id="10" name="TextBox 9"/>
+          <p:cNvSpPr txBox="1"/>
+          <p:nvPr/>
+        </p:nvSpPr>
+        <p:spPr>
+          <a:xfrm>
+            <a:off x="184403" y="703472"/>
+            <a:ext cx="2817681" cy="2369880"/>
+          </a:xfrm>
+          <a:prstGeom prst="rect">
+            <a:avLst/>
+          </a:prstGeom>
+          <a:noFill/>
+        </p:spPr>
+        <p:txBody>
+          <a:bodyPr wrap="square" rtlCol="0">
+            <a:spAutoFit/>
+          </a:bodyPr>
+          <a:lstStyle/>
+          <a:p>
+            <a:r>
+              <a:rPr lang="en-US" sz="2400" b="1" dirty="0" smtClean="0"/>
+              <a:t>What class (species) is a flower with the following feature? </a:t>
+            </a:r>
+          </a:p>
+          <a:p>
+            <a:endParaRPr lang="en-US" dirty="0" smtClean="0"/>
+          </a:p>
+          <a:p>
+            <a:r>
+              <a:rPr lang="en-US" sz="2200" dirty="0" smtClean="0"/>
+              <a:t>petal length (cm): 4.5</a:t>
+            </a:r>
+          </a:p>
+          <a:p>
+            <a:endParaRPr lang="en-US" dirty="0"/>
+          </a:p>
+          <a:p>
+            <a:endParaRPr lang="en-US" dirty="0"/>
+          </a:p>
+        </p:txBody>
+      </p:sp>
+      <p:sp>
+        <p:nvSpPr>
+          <p:cNvPr id="12" name="Rectangle 11"/>
+          <p:cNvSpPr/>
+          <p:nvPr/>
+        </p:nvSpPr>
+        <p:spPr>
+          <a:xfrm>
+            <a:off x="1415583" y="7197686"/>
+            <a:ext cx="7165714" cy="430887"/>
+          </a:xfrm>
+          <a:prstGeom prst="rect">
+            <a:avLst/>
+          </a:prstGeom>
+        </p:spPr>
+        <p:txBody>
+          <a:bodyPr wrap="square">
+            <a:spAutoFit/>
+          </a:bodyPr>
+          <a:lstStyle/>
+          <a:p>
+            <a:pPr algn="ctr"/>
+            <a:r>
+              <a:rPr lang="en-US" sz="2200" dirty="0" smtClean="0"/>
+              <a:t>The prediction is versicolor</a:t>
+            </a:r>
+            <a:endParaRPr lang="en-US" sz="2200" dirty="0"/>
+          </a:p>
+        </p:txBody>
+      </p:sp>
+      <p:pic>
+        <p:nvPicPr>
+          <p:cNvPr id="14" name="Picture 13"/>
+          <p:cNvPicPr>
+            <a:picLocks noChangeAspect="1"/>
+          </p:cNvPicPr>
+          <p:nvPr/>
+        </p:nvPicPr>
+        <p:blipFill>
+          <a:blip r:embed="rId4">
+            <a:extLst>
+              <a:ext uri="{28A0092B-C50C-407E-A947-70E740481C1C}">
+                <a14:useLocalDpi xmlns:a14="http://schemas.microsoft.com/office/drawing/2010/main" val="0"/>
+              </a:ext>
+            </a:extLst>
+          </a:blip>
+          <a:stretch>
+            <a:fillRect/>
+          </a:stretch>
+        </p:blipFill>
+        <p:spPr>
+          <a:xfrm>
+            <a:off x="9135931" y="-3789886"/>
+            <a:ext cx="4686300" cy="3187700"/>
+          </a:xfrm>
+          <a:prstGeom prst="rect">
+            <a:avLst/>
+          </a:prstGeom>
+          <a:ln w="12700">
+            <a:solidFill>
+              <a:schemeClr val="tx1"/>
+            </a:solidFill>
+          </a:ln>
+        </p:spPr>
+      </p:pic>
+    </p:spTree>
+    <p:extLst>
+      <p:ext uri="{BB962C8B-B14F-4D97-AF65-F5344CB8AC3E}">
+        <p14:creationId xmlns:p14="http://schemas.microsoft.com/office/powerpoint/2010/main" val="1777933550"/>
+      </p:ext>
+    </p:extLst>
+  </p:cSld>
+  <p:clrMapOvr>
+    <a:masterClrMapping/>
+  </p:clrMapOvr>
+</p:sld>
+</file>
+
+<file path=ppt/slides/slide22.xml><?xml version="1.0" encoding="utf-8"?>
+<p:sld xmlns:a="http://schemas.openxmlformats.org/drawingml/2006/main" xmlns:r="http://schemas.openxmlformats.org/officeDocument/2006/relationships" xmlns:p="http://schemas.openxmlformats.org/presentationml/2006/main">
+  <p:cSld>
+    <p:spTree>
+      <p:nvGrpSpPr>
+        <p:cNvPr id="1" name=""/>
+        <p:cNvGrpSpPr/>
+        <p:nvPr/>
+      </p:nvGrpSpPr>
+      <p:grpSpPr>
+        <a:xfrm>
+          <a:off x="0" y="0"/>
+          <a:ext cx="0" cy="0"/>
+          <a:chOff x="0" y="0"/>
+          <a:chExt cx="0" cy="0"/>
+        </a:xfrm>
+      </p:grpSpPr>
+      <p:grpSp>
+        <p:nvGrpSpPr>
+          <p:cNvPr id="13" name="Group 12"/>
+          <p:cNvGrpSpPr/>
+          <p:nvPr/>
+        </p:nvGrpSpPr>
+        <p:grpSpPr>
+          <a:xfrm>
+            <a:off x="395419" y="703472"/>
+            <a:ext cx="8570781" cy="6706756"/>
+            <a:chOff x="395419" y="703472"/>
+            <a:chExt cx="8570781" cy="6706756"/>
+          </a:xfrm>
+        </p:grpSpPr>
+        <p:pic>
+          <p:nvPicPr>
+            <p:cNvPr id="11" name="Picture 10"/>
+            <p:cNvPicPr>
+              <a:picLocks noChangeAspect="1"/>
+            </p:cNvPicPr>
+            <p:nvPr/>
+          </p:nvPicPr>
+          <p:blipFill>
+            <a:blip r:embed="rId2">
+              <a:extLst>
+                <a:ext uri="{28A0092B-C50C-407E-A947-70E740481C1C}">
+                  <a14:useLocalDpi xmlns:a14="http://schemas.microsoft.com/office/drawing/2010/main" val="0"/>
+                </a:ext>
+              </a:extLst>
+            </a:blip>
+            <a:stretch>
+              <a:fillRect/>
+            </a:stretch>
+          </p:blipFill>
+          <p:spPr>
+            <a:xfrm>
+              <a:off x="3213100" y="703472"/>
+              <a:ext cx="5753100" cy="5080000"/>
+            </a:xfrm>
+            <a:prstGeom prst="rect">
+              <a:avLst/>
+            </a:prstGeom>
+          </p:spPr>
+        </p:pic>
+        <p:pic>
+          <p:nvPicPr>
+            <p:cNvPr id="7" name="Picture 6"/>
+            <p:cNvPicPr>
+              <a:picLocks noChangeAspect="1"/>
+            </p:cNvPicPr>
+            <p:nvPr/>
+          </p:nvPicPr>
+          <p:blipFill rotWithShape="1">
+            <a:blip r:embed="rId3">
+              <a:extLst>
+                <a:ext uri="{28A0092B-C50C-407E-A947-70E740481C1C}">
+                  <a14:useLocalDpi xmlns:a14="http://schemas.microsoft.com/office/drawing/2010/main" val="0"/>
+                </a:ext>
+              </a:extLst>
+            </a:blip>
+            <a:srcRect l="68876"/>
+            <a:stretch/>
+          </p:blipFill>
+          <p:spPr>
+            <a:xfrm>
+              <a:off x="7523301" y="5755762"/>
+              <a:ext cx="990383" cy="1060704"/>
+            </a:xfrm>
+            <a:prstGeom prst="rect">
+              <a:avLst/>
+            </a:prstGeom>
+          </p:spPr>
+        </p:pic>
+        <p:pic>
+          <p:nvPicPr>
+            <p:cNvPr id="8" name="Picture 7"/>
+            <p:cNvPicPr>
+              <a:picLocks noChangeAspect="1"/>
+            </p:cNvPicPr>
+            <p:nvPr/>
+          </p:nvPicPr>
+          <p:blipFill rotWithShape="1">
+            <a:blip r:embed="rId3">
+              <a:extLst>
+                <a:ext uri="{28A0092B-C50C-407E-A947-70E740481C1C}">
+                  <a14:useLocalDpi xmlns:a14="http://schemas.microsoft.com/office/drawing/2010/main" val="0"/>
+                </a:ext>
+              </a:extLst>
+            </a:blip>
+            <a:srcRect l="33873" r="35004"/>
+            <a:stretch/>
+          </p:blipFill>
+          <p:spPr>
+            <a:xfrm>
+              <a:off x="3639316" y="3952158"/>
+              <a:ext cx="987643" cy="1057769"/>
+            </a:xfrm>
+            <a:prstGeom prst="rect">
+              <a:avLst/>
+            </a:prstGeom>
+          </p:spPr>
+        </p:pic>
+        <p:pic>
+          <p:nvPicPr>
+            <p:cNvPr id="9" name="Picture 8"/>
+            <p:cNvPicPr>
+              <a:picLocks noChangeAspect="1"/>
+            </p:cNvPicPr>
+            <p:nvPr/>
+          </p:nvPicPr>
+          <p:blipFill rotWithShape="1">
+            <a:blip r:embed="rId3">
+              <a:extLst>
+                <a:ext uri="{28A0092B-C50C-407E-A947-70E740481C1C}">
+                  <a14:useLocalDpi xmlns:a14="http://schemas.microsoft.com/office/drawing/2010/main" val="0"/>
+                </a:ext>
+              </a:extLst>
+            </a:blip>
+            <a:srcRect r="68876"/>
+            <a:stretch/>
+          </p:blipFill>
+          <p:spPr>
+            <a:xfrm>
+              <a:off x="5237301" y="5755762"/>
+              <a:ext cx="990383" cy="1060704"/>
+            </a:xfrm>
+            <a:prstGeom prst="rect">
+              <a:avLst/>
+            </a:prstGeom>
+          </p:spPr>
+        </p:pic>
+        <p:sp>
+          <p:nvSpPr>
+            <p:cNvPr id="10" name="TextBox 9"/>
+            <p:cNvSpPr txBox="1"/>
+            <p:nvPr/>
+          </p:nvSpPr>
+          <p:spPr>
+            <a:xfrm>
+              <a:off x="395419" y="889000"/>
+              <a:ext cx="2817681" cy="3539430"/>
+            </a:xfrm>
+            <a:prstGeom prst="rect">
+              <a:avLst/>
+            </a:prstGeom>
+            <a:noFill/>
+          </p:spPr>
+          <p:txBody>
+            <a:bodyPr wrap="square" rtlCol="0">
+              <a:spAutoFit/>
+            </a:bodyPr>
+            <a:lstStyle/>
+            <a:p>
+              <a:r>
+                <a:rPr lang="en-US" sz="2400" b="1" dirty="0" smtClean="0"/>
+                <a:t>What class (species) is a flower with the following features? </a:t>
+              </a:r>
+            </a:p>
+            <a:p>
+              <a:endParaRPr lang="en-US" dirty="0" smtClean="0"/>
+            </a:p>
+            <a:p>
+              <a:r>
+                <a:rPr lang="en-US" sz="2000" dirty="0" smtClean="0"/>
+                <a:t>sepal length (cm): 5.8</a:t>
+              </a:r>
+            </a:p>
+            <a:p>
+              <a:r>
+                <a:rPr lang="en-US" sz="2000" dirty="0" smtClean="0"/>
+                <a:t>sepal width (cm): 2.8</a:t>
+              </a:r>
+            </a:p>
+            <a:p>
+              <a:r>
+                <a:rPr lang="en-US" sz="2000" dirty="0" smtClean="0"/>
+                <a:t>petal length (cm): 5.1</a:t>
+              </a:r>
+            </a:p>
+            <a:p>
+              <a:r>
+                <a:rPr lang="en-US" sz="2000" dirty="0" smtClean="0"/>
+                <a:t>petal width (cm): 2.4</a:t>
+              </a:r>
+              <a:endParaRPr lang="en-US" sz="2000" dirty="0"/>
+            </a:p>
+            <a:p>
+              <a:endParaRPr lang="en-US" dirty="0" smtClean="0"/>
+            </a:p>
+            <a:p>
+              <a:endParaRPr lang="en-US" dirty="0"/>
+            </a:p>
+            <a:p>
+              <a:endParaRPr lang="en-US" dirty="0"/>
+            </a:p>
+          </p:txBody>
+        </p:sp>
+        <p:sp>
+          <p:nvSpPr>
+            <p:cNvPr id="12" name="Rectangle 11"/>
+            <p:cNvSpPr/>
+            <p:nvPr/>
+          </p:nvSpPr>
+          <p:spPr>
+            <a:xfrm>
+              <a:off x="2189301" y="7010118"/>
+              <a:ext cx="6096000" cy="400110"/>
+            </a:xfrm>
+            <a:prstGeom prst="rect">
+              <a:avLst/>
+            </a:prstGeom>
+          </p:spPr>
+          <p:txBody>
+            <a:bodyPr>
+              <a:spAutoFit/>
+            </a:bodyPr>
+            <a:lstStyle/>
+            <a:p>
+              <a:r>
+                <a:rPr lang="en-US" sz="2000" dirty="0" smtClean="0"/>
+                <a:t>The prediction is </a:t>
+              </a:r>
+              <a:r>
+                <a:rPr lang="en-US" sz="2000" dirty="0" err="1" smtClean="0"/>
+                <a:t>virginica</a:t>
+              </a:r>
+              <a:r>
+                <a:rPr lang="en-US" sz="2000" dirty="0" smtClean="0"/>
+                <a:t> as it is the majority class. </a:t>
+              </a:r>
+              <a:endParaRPr lang="en-US" sz="2000" dirty="0"/>
+            </a:p>
+          </p:txBody>
+        </p:sp>
+      </p:grpSp>
+    </p:spTree>
+    <p:extLst>
+      <p:ext uri="{BB962C8B-B14F-4D97-AF65-F5344CB8AC3E}">
+        <p14:creationId xmlns:p14="http://schemas.microsoft.com/office/powerpoint/2010/main" val="208845141"/>
+      </p:ext>
+    </p:extLst>
+  </p:cSld>
+  <p:clrMapOvr>
+    <a:masterClrMapping/>
+  </p:clrMapOvr>
+</p:sld>
+</file>
+
+<file path=ppt/slides/slide23.xml><?xml version="1.0" encoding="utf-8"?>
+<p:sld xmlns:a="http://schemas.openxmlformats.org/drawingml/2006/main" xmlns:r="http://schemas.openxmlformats.org/officeDocument/2006/relationships" xmlns:p="http://schemas.openxmlformats.org/presentationml/2006/main">
+  <p:cSld>
+    <p:spTree>
+      <p:nvGrpSpPr>
+        <p:cNvPr id="1" name=""/>
+        <p:cNvGrpSpPr/>
+        <p:nvPr/>
+      </p:nvGrpSpPr>
+      <p:grpSpPr>
+        <a:xfrm>
+          <a:off x="0" y="0"/>
+          <a:ext cx="0" cy="0"/>
+          <a:chOff x="0" y="0"/>
+          <a:chExt cx="0" cy="0"/>
+        </a:xfrm>
+      </p:grpSpPr>
+      <p:pic>
+        <p:nvPicPr>
+          <p:cNvPr id="4" name="Picture 3"/>
+          <p:cNvPicPr>
+            <a:picLocks noChangeAspect="1"/>
+          </p:cNvPicPr>
+          <p:nvPr/>
+        </p:nvPicPr>
+        <p:blipFill>
+          <a:blip r:embed="rId2">
+            <a:extLst>
+              <a:ext uri="{28A0092B-C50C-407E-A947-70E740481C1C}">
+                <a14:useLocalDpi xmlns:a14="http://schemas.microsoft.com/office/drawing/2010/main" val="0"/>
+              </a:ext>
+            </a:extLst>
+          </a:blip>
+          <a:stretch>
+            <a:fillRect/>
+          </a:stretch>
+        </p:blipFill>
+        <p:spPr>
+          <a:xfrm>
+            <a:off x="3759200" y="1828800"/>
+            <a:ext cx="4660900" cy="3187700"/>
+          </a:xfrm>
+          <a:prstGeom prst="rect">
+            <a:avLst/>
+          </a:prstGeom>
+        </p:spPr>
+      </p:pic>
+    </p:spTree>
+    <p:extLst>
+      <p:ext uri="{BB962C8B-B14F-4D97-AF65-F5344CB8AC3E}">
+        <p14:creationId xmlns:p14="http://schemas.microsoft.com/office/powerpoint/2010/main" val="1165698673"/>
       </p:ext>
     </p:extLst>
   </p:cSld>
@@ -6150,13 +7064,13 @@
       </p:grpSpPr>
       <p:pic>
         <p:nvPicPr>
-          <p:cNvPr id="10" name="Picture 9"/>
+          <p:cNvPr id="4" name="Picture 3"/>
           <p:cNvPicPr>
             <a:picLocks noChangeAspect="1"/>
           </p:cNvPicPr>
           <p:nvPr/>
         </p:nvPicPr>
-        <p:blipFill rotWithShape="1">
+        <p:blipFill>
           <a:blip r:embed="rId2">
             <a:extLst>
               <a:ext uri="{28A0092B-C50C-407E-A947-70E740481C1C}">
@@ -6164,13 +7078,14 @@
               </a:ext>
             </a:extLst>
           </a:blip>
-          <a:srcRect l="68876"/>
-          <a:stretch/>
+          <a:stretch>
+            <a:fillRect/>
+          </a:stretch>
         </p:blipFill>
         <p:spPr>
           <a:xfrm>
-            <a:off x="3731772" y="10466017"/>
-            <a:ext cx="738954" cy="791423"/>
+            <a:off x="514351" y="590550"/>
+            <a:ext cx="3805084" cy="2743200"/>
           </a:xfrm>
           <a:prstGeom prst="rect">
             <a:avLst/>
@@ -6179,27 +7094,28 @@
       </p:pic>
       <p:pic>
         <p:nvPicPr>
-          <p:cNvPr id="12" name="Picture 11"/>
+          <p:cNvPr id="6" name="Picture 5"/>
           <p:cNvPicPr>
             <a:picLocks noChangeAspect="1"/>
           </p:cNvPicPr>
           <p:nvPr/>
         </p:nvPicPr>
-        <p:blipFill rotWithShape="1">
-          <a:blip r:embed="rId2">
+        <p:blipFill>
+          <a:blip r:embed="rId3">
             <a:extLst>
               <a:ext uri="{28A0092B-C50C-407E-A947-70E740481C1C}">
                 <a14:useLocalDpi xmlns:a14="http://schemas.microsoft.com/office/drawing/2010/main" val="0"/>
               </a:ext>
             </a:extLst>
           </a:blip>
-          <a:srcRect r="68876"/>
-          <a:stretch/>
+          <a:stretch>
+            <a:fillRect/>
+          </a:stretch>
         </p:blipFill>
         <p:spPr>
           <a:xfrm>
-            <a:off x="2066198" y="10466018"/>
-            <a:ext cx="738954" cy="791423"/>
+            <a:off x="4319435" y="590550"/>
+            <a:ext cx="7315200" cy="2743200"/>
           </a:xfrm>
           <a:prstGeom prst="rect">
             <a:avLst/>
@@ -6208,626 +7124,108 @@
       </p:pic>
       <p:sp>
         <p:nvSpPr>
-          <p:cNvPr id="14" name="Rectangle 13"/>
-          <p:cNvSpPr/>
+          <p:cNvPr id="7" name="TextBox 6"/>
+          <p:cNvSpPr txBox="1"/>
           <p:nvPr/>
         </p:nvSpPr>
         <p:spPr>
           <a:xfrm>
-            <a:off x="-1384395" y="11413525"/>
-            <a:ext cx="8209188" cy="769441"/>
+            <a:off x="5334000" y="2038350"/>
+            <a:ext cx="1333500" cy="646331"/>
           </a:xfrm>
           <a:prstGeom prst="rect">
             <a:avLst/>
           </a:prstGeom>
+          <a:noFill/>
         </p:spPr>
         <p:txBody>
-          <a:bodyPr wrap="square">
+          <a:bodyPr wrap="square" rtlCol="0">
             <a:spAutoFit/>
           </a:bodyPr>
           <a:lstStyle/>
           <a:p>
             <a:pPr algn="ctr"/>
             <a:r>
-              <a:rPr lang="en-US" sz="2200" dirty="0" smtClean="0"/>
-              <a:t>Species counts are: </a:t>
-            </a:r>
-            <a:r>
-              <a:rPr lang="en-US" sz="2200" dirty="0" err="1" smtClean="0"/>
-              <a:t>setosa</a:t>
-            </a:r>
-            <a:r>
-              <a:rPr lang="en-US" sz="2200" dirty="0" smtClean="0"/>
-              <a:t>=0, versicolor=38, </a:t>
-            </a:r>
-            <a:r>
-              <a:rPr lang="en-US" sz="2200" dirty="0" err="1" smtClean="0"/>
-              <a:t>virginica</a:t>
-            </a:r>
-            <a:r>
-              <a:rPr lang="en-US" sz="2200" dirty="0" smtClean="0"/>
-              <a:t>=3</a:t>
-            </a:r>
-          </a:p>
+              <a:rPr lang="en-US" dirty="0" smtClean="0"/>
+              <a:t>Classified as </a:t>
+            </a:r>
+            <a:r>
+              <a:rPr lang="en-US" dirty="0" err="1" smtClean="0"/>
+              <a:t>Setosa</a:t>
+            </a:r>
+            <a:endParaRPr lang="en-US" dirty="0"/>
+          </a:p>
+        </p:txBody>
+      </p:sp>
+      <p:sp>
+        <p:nvSpPr>
+          <p:cNvPr id="8" name="TextBox 7"/>
+          <p:cNvSpPr txBox="1"/>
+          <p:nvPr/>
+        </p:nvSpPr>
+        <p:spPr>
+          <a:xfrm>
+            <a:off x="8324850" y="2038350"/>
+            <a:ext cx="1333500" cy="646331"/>
+          </a:xfrm>
+          <a:prstGeom prst="rect">
+            <a:avLst/>
+          </a:prstGeom>
+          <a:noFill/>
+        </p:spPr>
+        <p:txBody>
+          <a:bodyPr wrap="square" rtlCol="0">
+            <a:spAutoFit/>
+          </a:bodyPr>
+          <a:lstStyle/>
           <a:p>
             <a:pPr algn="ctr"/>
             <a:r>
-              <a:rPr lang="en-US" sz="2200" dirty="0" smtClean="0"/>
-              <a:t>Prediction is </a:t>
-            </a:r>
-            <a:r>
-              <a:rPr lang="en-US" sz="2200" b="1" dirty="0" smtClean="0"/>
-              <a:t>versicolor</a:t>
-            </a:r>
-            <a:r>
-              <a:rPr lang="en-US" sz="2200" dirty="0" smtClean="0"/>
-              <a:t> as it is the majority class</a:t>
-            </a:r>
-          </a:p>
-        </p:txBody>
-      </p:sp>
-      <p:grpSp>
-        <p:nvGrpSpPr>
-          <p:cNvPr id="2" name="Group 1"/>
-          <p:cNvGrpSpPr/>
+              <a:rPr lang="en-US" dirty="0" smtClean="0"/>
+              <a:t>Classified as </a:t>
+            </a:r>
+            <a:r>
+              <a:rPr lang="en-US" dirty="0" err="1" smtClean="0"/>
+              <a:t>Virginica</a:t>
+            </a:r>
+            <a:endParaRPr lang="en-US" dirty="0"/>
+          </a:p>
+        </p:txBody>
+      </p:sp>
+      <p:sp>
+        <p:nvSpPr>
+          <p:cNvPr id="9" name="TextBox 8"/>
+          <p:cNvSpPr txBox="1"/>
           <p:nvPr/>
-        </p:nvGrpSpPr>
-        <p:grpSpPr>
+        </p:nvSpPr>
+        <p:spPr>
           <a:xfrm>
-            <a:off x="-2628527" y="-438505"/>
-            <a:ext cx="20328087" cy="6989666"/>
-            <a:chOff x="-2628527" y="-438505"/>
-            <a:chExt cx="20328087" cy="6989666"/>
+            <a:off x="6667500" y="4152900"/>
+            <a:ext cx="3429000" cy="923330"/>
           </a:xfrm>
-        </p:grpSpPr>
-        <p:pic>
-          <p:nvPicPr>
-            <p:cNvPr id="23" name="Picture 22"/>
-            <p:cNvPicPr>
-              <a:picLocks noChangeAspect="1"/>
-            </p:cNvPicPr>
-            <p:nvPr/>
-          </p:nvPicPr>
-          <p:blipFill>
-            <a:blip r:embed="rId3">
-              <a:extLst>
-                <a:ext uri="{28A0092B-C50C-407E-A947-70E740481C1C}">
-                  <a14:useLocalDpi xmlns:a14="http://schemas.microsoft.com/office/drawing/2010/main" val="0"/>
-                </a:ext>
-              </a:extLst>
-            </a:blip>
-            <a:stretch>
-              <a:fillRect/>
-            </a:stretch>
-          </p:blipFill>
-          <p:spPr>
-            <a:xfrm>
-              <a:off x="10666236" y="1321027"/>
-              <a:ext cx="5857461" cy="4572920"/>
-            </a:xfrm>
-            <a:prstGeom prst="rect">
-              <a:avLst/>
-            </a:prstGeom>
-            <a:ln w="12700">
-              <a:noFill/>
-            </a:ln>
-          </p:spPr>
-        </p:pic>
-        <p:pic>
-          <p:nvPicPr>
-            <p:cNvPr id="4" name="Picture 3"/>
-            <p:cNvPicPr>
-              <a:picLocks noChangeAspect="1"/>
-            </p:cNvPicPr>
-            <p:nvPr/>
-          </p:nvPicPr>
-          <p:blipFill>
-            <a:blip r:embed="rId4">
-              <a:extLst>
-                <a:ext uri="{28A0092B-C50C-407E-A947-70E740481C1C}">
-                  <a14:useLocalDpi xmlns:a14="http://schemas.microsoft.com/office/drawing/2010/main" val="0"/>
-                </a:ext>
-              </a:extLst>
-            </a:blip>
-            <a:stretch>
-              <a:fillRect/>
-            </a:stretch>
-          </p:blipFill>
-          <p:spPr>
-            <a:xfrm>
-              <a:off x="-1694836" y="1321027"/>
-              <a:ext cx="6341807" cy="4572920"/>
-            </a:xfrm>
-            <a:prstGeom prst="rect">
-              <a:avLst/>
-            </a:prstGeom>
-            <a:ln w="12700">
-              <a:noFill/>
-            </a:ln>
-          </p:spPr>
-        </p:pic>
-        <p:pic>
-          <p:nvPicPr>
-            <p:cNvPr id="5" name="Picture 4"/>
-            <p:cNvPicPr>
-              <a:picLocks noChangeAspect="1"/>
-            </p:cNvPicPr>
-            <p:nvPr/>
-          </p:nvPicPr>
-          <p:blipFill>
-            <a:blip r:embed="rId5">
-              <a:extLst>
-                <a:ext uri="{28A0092B-C50C-407E-A947-70E740481C1C}">
-                  <a14:useLocalDpi xmlns:a14="http://schemas.microsoft.com/office/drawing/2010/main" val="0"/>
-                </a:ext>
-              </a:extLst>
-            </a:blip>
-            <a:stretch>
-              <a:fillRect/>
-            </a:stretch>
-          </p:blipFill>
-          <p:spPr>
-            <a:xfrm>
-              <a:off x="5114572" y="1321027"/>
-              <a:ext cx="5084063" cy="4572920"/>
-            </a:xfrm>
-            <a:prstGeom prst="rect">
-              <a:avLst/>
-            </a:prstGeom>
-            <a:ln w="12700">
-              <a:noFill/>
-            </a:ln>
-          </p:spPr>
-        </p:pic>
-        <p:sp>
-          <p:nvSpPr>
-            <p:cNvPr id="15" name="TextBox 14"/>
-            <p:cNvSpPr txBox="1"/>
-            <p:nvPr/>
-          </p:nvSpPr>
-          <p:spPr>
-            <a:xfrm>
-              <a:off x="14688369" y="990108"/>
-              <a:ext cx="1920240" cy="292447"/>
-            </a:xfrm>
-            <a:prstGeom prst="rect">
-              <a:avLst/>
-            </a:prstGeom>
-            <a:noFill/>
-          </p:spPr>
-          <p:txBody>
-            <a:bodyPr wrap="square" rtlCol="0">
-              <a:spAutoFit/>
-            </a:bodyPr>
-            <a:lstStyle/>
-            <a:p>
-              <a:r>
-                <a:rPr lang="en-US" sz="1300" dirty="0" smtClean="0"/>
-                <a:t>Decision Node </a:t>
-              </a:r>
-              <a:endParaRPr lang="en-US" sz="1300" dirty="0"/>
-            </a:p>
-          </p:txBody>
-        </p:sp>
-        <p:sp>
-          <p:nvSpPr>
-            <p:cNvPr id="16" name="TextBox 15"/>
-            <p:cNvSpPr txBox="1"/>
-            <p:nvPr/>
-          </p:nvSpPr>
-          <p:spPr>
-            <a:xfrm>
-              <a:off x="14691642" y="673841"/>
-              <a:ext cx="1554480" cy="292447"/>
-            </a:xfrm>
-            <a:prstGeom prst="rect">
-              <a:avLst/>
-            </a:prstGeom>
-            <a:noFill/>
-          </p:spPr>
-          <p:txBody>
-            <a:bodyPr wrap="square" rtlCol="0">
-              <a:spAutoFit/>
-            </a:bodyPr>
-            <a:lstStyle/>
-            <a:p>
-              <a:r>
-                <a:rPr lang="en-US" sz="1300" dirty="0" smtClean="0"/>
-                <a:t>Root Node</a:t>
-              </a:r>
-              <a:endParaRPr lang="en-US" sz="1300" dirty="0"/>
-            </a:p>
-          </p:txBody>
-        </p:sp>
-        <p:sp>
-          <p:nvSpPr>
-            <p:cNvPr id="17" name="Rectangle 16"/>
-            <p:cNvSpPr/>
-            <p:nvPr/>
-          </p:nvSpPr>
-          <p:spPr>
-            <a:xfrm>
-              <a:off x="14446546" y="1067850"/>
-              <a:ext cx="137160" cy="137188"/>
-            </a:xfrm>
-            <a:prstGeom prst="rect">
-              <a:avLst/>
-            </a:prstGeom>
-            <a:solidFill>
-              <a:srgbClr val="0000FF"/>
-            </a:solidFill>
-            <a:ln>
-              <a:solidFill>
-                <a:schemeClr val="tx1"/>
-              </a:solidFill>
-            </a:ln>
-          </p:spPr>
-          <p:style>
-            <a:lnRef idx="2">
-              <a:schemeClr val="accent1">
-                <a:shade val="50000"/>
-              </a:schemeClr>
-            </a:lnRef>
-            <a:fillRef idx="1">
-              <a:schemeClr val="accent1"/>
-            </a:fillRef>
-            <a:effectRef idx="0">
-              <a:schemeClr val="accent1"/>
-            </a:effectRef>
-            <a:fontRef idx="minor">
-              <a:schemeClr val="lt1"/>
-            </a:fontRef>
-          </p:style>
-          <p:txBody>
-            <a:bodyPr rtlCol="0" anchor="ctr"/>
-            <a:lstStyle/>
-            <a:p>
-              <a:pPr algn="ctr"/>
-              <a:endParaRPr lang="en-US">
-                <a:solidFill>
-                  <a:srgbClr val="0000FF"/>
-                </a:solidFill>
-              </a:endParaRPr>
-            </a:p>
-          </p:txBody>
-        </p:sp>
-        <p:sp>
-          <p:nvSpPr>
-            <p:cNvPr id="18" name="Rectangle 17"/>
-            <p:cNvSpPr/>
-            <p:nvPr/>
-          </p:nvSpPr>
-          <p:spPr>
-            <a:xfrm>
-              <a:off x="14347964" y="611847"/>
-              <a:ext cx="1999102" cy="1057257"/>
-            </a:xfrm>
-            <a:prstGeom prst="rect">
-              <a:avLst/>
-            </a:prstGeom>
-            <a:noFill/>
-            <a:ln w="6350">
-              <a:solidFill>
-                <a:schemeClr val="tx1">
-                  <a:alpha val="32000"/>
-                </a:schemeClr>
-              </a:solidFill>
-            </a:ln>
-          </p:spPr>
-          <p:style>
-            <a:lnRef idx="2">
-              <a:schemeClr val="accent1">
-                <a:shade val="50000"/>
-              </a:schemeClr>
-            </a:lnRef>
-            <a:fillRef idx="1">
-              <a:schemeClr val="accent1"/>
-            </a:fillRef>
-            <a:effectRef idx="0">
-              <a:schemeClr val="accent1"/>
-            </a:effectRef>
-            <a:fontRef idx="minor">
-              <a:schemeClr val="lt1"/>
-            </a:fontRef>
-          </p:style>
-          <p:txBody>
-            <a:bodyPr rtlCol="0" anchor="ctr"/>
-            <a:lstStyle/>
-            <a:p>
-              <a:pPr algn="ctr"/>
-              <a:endParaRPr lang="en-US"/>
-            </a:p>
-          </p:txBody>
-        </p:sp>
-        <p:sp>
-          <p:nvSpPr>
-            <p:cNvPr id="19" name="Rectangle 18"/>
-            <p:cNvSpPr/>
-            <p:nvPr/>
-          </p:nvSpPr>
-          <p:spPr>
-            <a:xfrm>
-              <a:off x="13800419" y="239564"/>
-              <a:ext cx="3094191" cy="400190"/>
-            </a:xfrm>
-            <a:prstGeom prst="rect">
-              <a:avLst/>
-            </a:prstGeom>
-          </p:spPr>
-          <p:txBody>
-            <a:bodyPr wrap="square">
-              <a:spAutoFit/>
-            </a:bodyPr>
-            <a:lstStyle/>
-            <a:p>
-              <a:pPr algn="ctr"/>
-              <a:r>
-                <a:rPr lang="en-US" sz="2000" dirty="0" smtClean="0"/>
-                <a:t>Type of Node</a:t>
-              </a:r>
-              <a:endParaRPr lang="en-US" sz="2000" dirty="0"/>
-            </a:p>
-          </p:txBody>
-        </p:sp>
-        <p:sp>
-          <p:nvSpPr>
-            <p:cNvPr id="20" name="Rectangle 19"/>
-            <p:cNvSpPr/>
-            <p:nvPr/>
-          </p:nvSpPr>
-          <p:spPr>
-            <a:xfrm>
-              <a:off x="14450625" y="1387955"/>
-              <a:ext cx="137160" cy="137188"/>
-            </a:xfrm>
-            <a:prstGeom prst="rect">
-              <a:avLst/>
-            </a:prstGeom>
-            <a:solidFill>
-              <a:srgbClr val="008000"/>
-            </a:solidFill>
-            <a:ln>
-              <a:solidFill>
-                <a:schemeClr val="tx1"/>
-              </a:solidFill>
-            </a:ln>
-          </p:spPr>
-          <p:style>
-            <a:lnRef idx="2">
-              <a:schemeClr val="accent1">
-                <a:shade val="50000"/>
-              </a:schemeClr>
-            </a:lnRef>
-            <a:fillRef idx="1">
-              <a:schemeClr val="accent1"/>
-            </a:fillRef>
-            <a:effectRef idx="0">
-              <a:schemeClr val="accent1"/>
-            </a:effectRef>
-            <a:fontRef idx="minor">
-              <a:schemeClr val="lt1"/>
-            </a:fontRef>
-          </p:style>
-          <p:txBody>
-            <a:bodyPr rtlCol="0" anchor="ctr"/>
-            <a:lstStyle/>
-            <a:p>
-              <a:pPr algn="ctr"/>
-              <a:endParaRPr lang="en-US"/>
-            </a:p>
-          </p:txBody>
-        </p:sp>
-        <p:sp>
-          <p:nvSpPr>
-            <p:cNvPr id="21" name="TextBox 20"/>
-            <p:cNvSpPr txBox="1"/>
-            <p:nvPr/>
-          </p:nvSpPr>
-          <p:spPr>
-            <a:xfrm>
-              <a:off x="14691642" y="1314075"/>
-              <a:ext cx="1920240" cy="292447"/>
-            </a:xfrm>
-            <a:prstGeom prst="rect">
-              <a:avLst/>
-            </a:prstGeom>
-            <a:noFill/>
-          </p:spPr>
-          <p:txBody>
-            <a:bodyPr wrap="square" rtlCol="0">
-              <a:spAutoFit/>
-            </a:bodyPr>
-            <a:lstStyle/>
-            <a:p>
-              <a:r>
-                <a:rPr lang="en-US" sz="1300" dirty="0" smtClean="0"/>
-                <a:t>Leaf/Terminal Node </a:t>
-              </a:r>
-              <a:endParaRPr lang="en-US" sz="1300" dirty="0"/>
-            </a:p>
-          </p:txBody>
-        </p:sp>
-        <p:sp>
-          <p:nvSpPr>
-            <p:cNvPr id="22" name="Rectangle 21"/>
-            <p:cNvSpPr/>
-            <p:nvPr/>
-          </p:nvSpPr>
-          <p:spPr>
-            <a:xfrm>
-              <a:off x="14450625" y="747746"/>
-              <a:ext cx="137160" cy="137188"/>
-            </a:xfrm>
-            <a:prstGeom prst="rect">
-              <a:avLst/>
-            </a:prstGeom>
-            <a:solidFill>
-              <a:srgbClr val="D2691E"/>
-            </a:solidFill>
-            <a:ln>
-              <a:solidFill>
-                <a:schemeClr val="tx1"/>
-              </a:solidFill>
-            </a:ln>
-          </p:spPr>
-          <p:style>
-            <a:lnRef idx="2">
-              <a:schemeClr val="accent1">
-                <a:shade val="50000"/>
-              </a:schemeClr>
-            </a:lnRef>
-            <a:fillRef idx="1">
-              <a:schemeClr val="accent1"/>
-            </a:fillRef>
-            <a:effectRef idx="0">
-              <a:schemeClr val="accent1"/>
-            </a:effectRef>
-            <a:fontRef idx="minor">
-              <a:schemeClr val="lt1"/>
-            </a:fontRef>
-          </p:style>
-          <p:txBody>
-            <a:bodyPr rtlCol="0" anchor="ctr"/>
-            <a:lstStyle/>
-            <a:p>
-              <a:pPr algn="ctr"/>
-              <a:endParaRPr lang="en-US">
-                <a:solidFill>
-                  <a:srgbClr val="0000FF"/>
-                </a:solidFill>
-              </a:endParaRPr>
-            </a:p>
-          </p:txBody>
-        </p:sp>
-        <p:sp>
-          <p:nvSpPr>
-            <p:cNvPr id="32" name="TextBox 31"/>
-            <p:cNvSpPr txBox="1"/>
-            <p:nvPr/>
-          </p:nvSpPr>
-          <p:spPr>
-            <a:xfrm>
-              <a:off x="3084603" y="-438505"/>
-              <a:ext cx="9144000" cy="1415772"/>
-            </a:xfrm>
-            <a:prstGeom prst="rect">
-              <a:avLst/>
-            </a:prstGeom>
-            <a:noFill/>
-          </p:spPr>
-          <p:txBody>
-            <a:bodyPr wrap="square" rtlCol="0">
-              <a:spAutoFit/>
-            </a:bodyPr>
-            <a:lstStyle/>
-            <a:p>
-              <a:pPr algn="ctr"/>
-              <a:r>
-                <a:rPr lang="en-US" sz="5000" b="1" dirty="0" smtClean="0"/>
-                <a:t>Depth of Classification Trees</a:t>
-              </a:r>
-              <a:endParaRPr lang="en-US" sz="5000" dirty="0" smtClean="0"/>
-            </a:p>
-            <a:p>
-              <a:endParaRPr lang="en-US" dirty="0"/>
-            </a:p>
-            <a:p>
-              <a:endParaRPr lang="en-US" dirty="0"/>
-            </a:p>
-          </p:txBody>
-        </p:sp>
-        <p:sp>
-          <p:nvSpPr>
-            <p:cNvPr id="35" name="Rectangle 34"/>
-            <p:cNvSpPr/>
-            <p:nvPr/>
-          </p:nvSpPr>
-          <p:spPr>
-            <a:xfrm>
-              <a:off x="-2628527" y="5997052"/>
-              <a:ext cx="8209188" cy="554109"/>
-            </a:xfrm>
-            <a:prstGeom prst="rect">
-              <a:avLst/>
-            </a:prstGeom>
-          </p:spPr>
-          <p:txBody>
-            <a:bodyPr wrap="square">
-              <a:spAutoFit/>
-            </a:bodyPr>
-            <a:lstStyle/>
-            <a:p>
-              <a:pPr algn="ctr"/>
-              <a:r>
-                <a:rPr lang="en-US" sz="3000" dirty="0" smtClean="0"/>
-                <a:t>Depth = 1</a:t>
-              </a:r>
-            </a:p>
-          </p:txBody>
-        </p:sp>
-        <p:sp>
-          <p:nvSpPr>
-            <p:cNvPr id="36" name="Rectangle 35"/>
-            <p:cNvSpPr/>
-            <p:nvPr/>
-          </p:nvSpPr>
-          <p:spPr>
-            <a:xfrm>
-              <a:off x="3552009" y="5997051"/>
-              <a:ext cx="8209188" cy="554109"/>
-            </a:xfrm>
-            <a:prstGeom prst="rect">
-              <a:avLst/>
-            </a:prstGeom>
-          </p:spPr>
-          <p:txBody>
-            <a:bodyPr wrap="square">
-              <a:spAutoFit/>
-            </a:bodyPr>
-            <a:lstStyle/>
-            <a:p>
-              <a:pPr algn="ctr"/>
-              <a:r>
-                <a:rPr lang="en-US" sz="3000" dirty="0" smtClean="0"/>
-                <a:t>Depth = 2</a:t>
-              </a:r>
-            </a:p>
-          </p:txBody>
-        </p:sp>
-        <p:sp>
-          <p:nvSpPr>
-            <p:cNvPr id="37" name="Rectangle 36"/>
-            <p:cNvSpPr/>
-            <p:nvPr/>
-          </p:nvSpPr>
-          <p:spPr>
-            <a:xfrm>
-              <a:off x="9490372" y="5960874"/>
-              <a:ext cx="8209188" cy="554109"/>
-            </a:xfrm>
-            <a:prstGeom prst="rect">
-              <a:avLst/>
-            </a:prstGeom>
-          </p:spPr>
-          <p:txBody>
-            <a:bodyPr wrap="square">
-              <a:spAutoFit/>
-            </a:bodyPr>
-            <a:lstStyle/>
-            <a:p>
-              <a:pPr algn="ctr"/>
-              <a:r>
-                <a:rPr lang="en-US" sz="3000" dirty="0" smtClean="0"/>
-                <a:t>Depth = 3</a:t>
-              </a:r>
-            </a:p>
-          </p:txBody>
-        </p:sp>
-      </p:grpSp>
+          <a:prstGeom prst="rect">
+            <a:avLst/>
+          </a:prstGeom>
+          <a:noFill/>
+        </p:spPr>
+        <p:txBody>
+          <a:bodyPr wrap="square" rtlCol="0">
+            <a:spAutoFit/>
+          </a:bodyPr>
+          <a:lstStyle/>
+          <a:p>
+            <a:r>
+              <a:rPr lang="en-US" dirty="0" smtClean="0"/>
+              <a:t>Fix to have split point as 2.45 to be consistent. Put in A and B so it can be labeled </a:t>
+            </a:r>
+            <a:endParaRPr lang="en-US" dirty="0"/>
+          </a:p>
+        </p:txBody>
+      </p:sp>
     </p:spTree>
     <p:extLst>
       <p:ext uri="{BB962C8B-B14F-4D97-AF65-F5344CB8AC3E}">
-        <p14:creationId xmlns:p14="http://schemas.microsoft.com/office/powerpoint/2010/main" val="930359355"/>
+        <p14:creationId xmlns:p14="http://schemas.microsoft.com/office/powerpoint/2010/main" val="1927076588"/>
       </p:ext>
     </p:extLst>
   </p:cSld>
@@ -6854,48 +7252,10 @@
           <a:chExt cx="0" cy="0"/>
         </a:xfrm>
       </p:grpSpPr>
-      <p:sp>
-        <p:nvSpPr>
-          <p:cNvPr id="2" name="Title 1"/>
-          <p:cNvSpPr>
-            <a:spLocks noGrp="1"/>
-          </p:cNvSpPr>
-          <p:nvPr>
-            <p:ph type="title"/>
-          </p:nvPr>
-        </p:nvSpPr>
-        <p:spPr/>
-        <p:txBody>
-          <a:bodyPr/>
-          <a:lstStyle/>
-          <a:p>
-            <a:endParaRPr lang="en-US"/>
-          </a:p>
-        </p:txBody>
-      </p:sp>
-      <p:sp>
-        <p:nvSpPr>
-          <p:cNvPr id="3" name="Content Placeholder 2"/>
-          <p:cNvSpPr>
-            <a:spLocks noGrp="1"/>
-          </p:cNvSpPr>
-          <p:nvPr>
-            <p:ph idx="1"/>
-          </p:nvPr>
-        </p:nvSpPr>
-        <p:spPr/>
-        <p:txBody>
-          <a:bodyPr/>
-          <a:lstStyle/>
-          <a:p>
-            <a:endParaRPr lang="en-US"/>
-          </a:p>
-        </p:txBody>
-      </p:sp>
     </p:spTree>
     <p:extLst>
       <p:ext uri="{BB962C8B-B14F-4D97-AF65-F5344CB8AC3E}">
-        <p14:creationId xmlns:p14="http://schemas.microsoft.com/office/powerpoint/2010/main" val="1712686614"/>
+        <p14:creationId xmlns:p14="http://schemas.microsoft.com/office/powerpoint/2010/main" val="31035766"/>
       </p:ext>
     </p:extLst>
   </p:cSld>
@@ -6922,48 +7282,10 @@
           <a:chExt cx="0" cy="0"/>
         </a:xfrm>
       </p:grpSpPr>
-      <p:sp>
-        <p:nvSpPr>
-          <p:cNvPr id="2" name="Title 1"/>
-          <p:cNvSpPr>
-            <a:spLocks noGrp="1"/>
-          </p:cNvSpPr>
-          <p:nvPr>
-            <p:ph type="title"/>
-          </p:nvPr>
-        </p:nvSpPr>
-        <p:spPr/>
-        <p:txBody>
-          <a:bodyPr/>
-          <a:lstStyle/>
-          <a:p>
-            <a:endParaRPr lang="en-US"/>
-          </a:p>
-        </p:txBody>
-      </p:sp>
-      <p:sp>
-        <p:nvSpPr>
-          <p:cNvPr id="3" name="Content Placeholder 2"/>
-          <p:cNvSpPr>
-            <a:spLocks noGrp="1"/>
-          </p:cNvSpPr>
-          <p:nvPr>
-            <p:ph idx="1"/>
-          </p:nvPr>
-        </p:nvSpPr>
-        <p:spPr/>
-        <p:txBody>
-          <a:bodyPr/>
-          <a:lstStyle/>
-          <a:p>
-            <a:endParaRPr lang="en-US"/>
-          </a:p>
-        </p:txBody>
-      </p:sp>
     </p:spTree>
     <p:extLst>
       <p:ext uri="{BB962C8B-B14F-4D97-AF65-F5344CB8AC3E}">
-        <p14:creationId xmlns:p14="http://schemas.microsoft.com/office/powerpoint/2010/main" val="780668191"/>
+        <p14:creationId xmlns:p14="http://schemas.microsoft.com/office/powerpoint/2010/main" val="1822941645"/>
       </p:ext>
     </p:extLst>
   </p:cSld>
@@ -6990,48 +7312,10 @@
           <a:chExt cx="0" cy="0"/>
         </a:xfrm>
       </p:grpSpPr>
-      <p:sp>
-        <p:nvSpPr>
-          <p:cNvPr id="2" name="Title 1"/>
-          <p:cNvSpPr>
-            <a:spLocks noGrp="1"/>
-          </p:cNvSpPr>
-          <p:nvPr>
-            <p:ph type="title"/>
-          </p:nvPr>
-        </p:nvSpPr>
-        <p:spPr/>
-        <p:txBody>
-          <a:bodyPr/>
-          <a:lstStyle/>
-          <a:p>
-            <a:endParaRPr lang="en-US"/>
-          </a:p>
-        </p:txBody>
-      </p:sp>
-      <p:sp>
-        <p:nvSpPr>
-          <p:cNvPr id="3" name="Content Placeholder 2"/>
-          <p:cNvSpPr>
-            <a:spLocks noGrp="1"/>
-          </p:cNvSpPr>
-          <p:nvPr>
-            <p:ph idx="1"/>
-          </p:nvPr>
-        </p:nvSpPr>
-        <p:spPr/>
-        <p:txBody>
-          <a:bodyPr/>
-          <a:lstStyle/>
-          <a:p>
-            <a:endParaRPr lang="en-US"/>
-          </a:p>
-        </p:txBody>
-      </p:sp>
     </p:spTree>
     <p:extLst>
       <p:ext uri="{BB962C8B-B14F-4D97-AF65-F5344CB8AC3E}">
-        <p14:creationId xmlns:p14="http://schemas.microsoft.com/office/powerpoint/2010/main" val="781507149"/>
+        <p14:creationId xmlns:p14="http://schemas.microsoft.com/office/powerpoint/2010/main" val="1341726735"/>
       </p:ext>
     </p:extLst>
   </p:cSld>

</xml_diff>

<commit_message>
Updated DT first split point
</commit_message>
<xml_diff>
--- a/Sklearn/DecisionTrees/powerpoint/DecisionComparison.pptx
+++ b/Sklearn/DecisionTrees/powerpoint/DecisionComparison.pptx
@@ -7062,166 +7062,293 @@
           <a:chExt cx="0" cy="0"/>
         </a:xfrm>
       </p:grpSpPr>
-      <p:pic>
-        <p:nvPicPr>
-          <p:cNvPr id="4" name="Picture 3"/>
-          <p:cNvPicPr>
-            <a:picLocks noChangeAspect="1"/>
-          </p:cNvPicPr>
+      <p:grpSp>
+        <p:nvGrpSpPr>
+          <p:cNvPr id="29" name="Group 28"/>
+          <p:cNvGrpSpPr/>
           <p:nvPr/>
-        </p:nvPicPr>
-        <p:blipFill>
-          <a:blip r:embed="rId2">
-            <a:extLst>
-              <a:ext uri="{28A0092B-C50C-407E-A947-70E740481C1C}">
-                <a14:useLocalDpi xmlns:a14="http://schemas.microsoft.com/office/drawing/2010/main" val="0"/>
-              </a:ext>
-            </a:extLst>
-          </a:blip>
-          <a:stretch>
-            <a:fillRect/>
-          </a:stretch>
-        </p:blipFill>
-        <p:spPr>
+        </p:nvGrpSpPr>
+        <p:grpSpPr>
           <a:xfrm>
-            <a:off x="514351" y="590550"/>
-            <a:ext cx="3805084" cy="2743200"/>
+            <a:off x="162397" y="122128"/>
+            <a:ext cx="10750766" cy="3501152"/>
+            <a:chOff x="162397" y="122128"/>
+            <a:chExt cx="10750766" cy="3501152"/>
           </a:xfrm>
-          <a:prstGeom prst="rect">
-            <a:avLst/>
-          </a:prstGeom>
-        </p:spPr>
-      </p:pic>
-      <p:pic>
-        <p:nvPicPr>
-          <p:cNvPr id="6" name="Picture 5"/>
-          <p:cNvPicPr>
-            <a:picLocks noChangeAspect="1"/>
-          </p:cNvPicPr>
-          <p:nvPr/>
-        </p:nvPicPr>
-        <p:blipFill>
-          <a:blip r:embed="rId3">
-            <a:extLst>
-              <a:ext uri="{28A0092B-C50C-407E-A947-70E740481C1C}">
-                <a14:useLocalDpi xmlns:a14="http://schemas.microsoft.com/office/drawing/2010/main" val="0"/>
-              </a:ext>
-            </a:extLst>
-          </a:blip>
-          <a:stretch>
-            <a:fillRect/>
-          </a:stretch>
-        </p:blipFill>
-        <p:spPr>
-          <a:xfrm>
-            <a:off x="4319435" y="590550"/>
-            <a:ext cx="7315200" cy="2743200"/>
-          </a:xfrm>
-          <a:prstGeom prst="rect">
-            <a:avLst/>
-          </a:prstGeom>
-        </p:spPr>
-      </p:pic>
-      <p:sp>
-        <p:nvSpPr>
-          <p:cNvPr id="7" name="TextBox 6"/>
-          <p:cNvSpPr txBox="1"/>
-          <p:nvPr/>
-        </p:nvSpPr>
-        <p:spPr>
-          <a:xfrm>
-            <a:off x="5334000" y="2038350"/>
-            <a:ext cx="1333500" cy="646331"/>
-          </a:xfrm>
-          <a:prstGeom prst="rect">
-            <a:avLst/>
-          </a:prstGeom>
-          <a:noFill/>
-        </p:spPr>
-        <p:txBody>
-          <a:bodyPr wrap="square" rtlCol="0">
-            <a:spAutoFit/>
-          </a:bodyPr>
-          <a:lstStyle/>
-          <a:p>
-            <a:pPr algn="ctr"/>
-            <a:r>
-              <a:rPr lang="en-US" dirty="0" smtClean="0"/>
-              <a:t>Classified as </a:t>
-            </a:r>
-            <a:r>
-              <a:rPr lang="en-US" dirty="0" err="1" smtClean="0"/>
-              <a:t>Setosa</a:t>
-            </a:r>
-            <a:endParaRPr lang="en-US" dirty="0"/>
-          </a:p>
-        </p:txBody>
-      </p:sp>
-      <p:sp>
-        <p:nvSpPr>
-          <p:cNvPr id="8" name="TextBox 7"/>
-          <p:cNvSpPr txBox="1"/>
-          <p:nvPr/>
-        </p:nvSpPr>
-        <p:spPr>
-          <a:xfrm>
-            <a:off x="8324850" y="2038350"/>
-            <a:ext cx="1333500" cy="646331"/>
-          </a:xfrm>
-          <a:prstGeom prst="rect">
-            <a:avLst/>
-          </a:prstGeom>
-          <a:noFill/>
-        </p:spPr>
-        <p:txBody>
-          <a:bodyPr wrap="square" rtlCol="0">
-            <a:spAutoFit/>
-          </a:bodyPr>
-          <a:lstStyle/>
-          <a:p>
-            <a:pPr algn="ctr"/>
-            <a:r>
-              <a:rPr lang="en-US" dirty="0" smtClean="0"/>
-              <a:t>Classified as </a:t>
-            </a:r>
-            <a:r>
-              <a:rPr lang="en-US" dirty="0" err="1" smtClean="0"/>
-              <a:t>Virginica</a:t>
-            </a:r>
-            <a:endParaRPr lang="en-US" dirty="0"/>
-          </a:p>
-        </p:txBody>
-      </p:sp>
-      <p:sp>
-        <p:nvSpPr>
-          <p:cNvPr id="9" name="TextBox 8"/>
-          <p:cNvSpPr txBox="1"/>
-          <p:nvPr/>
-        </p:nvSpPr>
-        <p:spPr>
-          <a:xfrm>
-            <a:off x="6667500" y="4152900"/>
-            <a:ext cx="3429000" cy="923330"/>
-          </a:xfrm>
-          <a:prstGeom prst="rect">
-            <a:avLst/>
-          </a:prstGeom>
-          <a:noFill/>
-        </p:spPr>
-        <p:txBody>
-          <a:bodyPr wrap="square" rtlCol="0">
-            <a:spAutoFit/>
-          </a:bodyPr>
-          <a:lstStyle/>
-          <a:p>
-            <a:r>
-              <a:rPr lang="en-US" dirty="0" smtClean="0"/>
-              <a:t>Fix to have split point as 2.45 to be consistent. Put in A and B so it can be labeled </a:t>
-            </a:r>
-            <a:endParaRPr lang="en-US" dirty="0"/>
-          </a:p>
-        </p:txBody>
-      </p:sp>
+        </p:grpSpPr>
+        <p:pic>
+          <p:nvPicPr>
+            <p:cNvPr id="15" name="Picture 14"/>
+            <p:cNvPicPr>
+              <a:picLocks noChangeAspect="1"/>
+            </p:cNvPicPr>
+            <p:nvPr/>
+          </p:nvPicPr>
+          <p:blipFill rotWithShape="1">
+            <a:blip r:embed="rId2">
+              <a:extLst>
+                <a:ext uri="{28A0092B-C50C-407E-A947-70E740481C1C}">
+                  <a14:useLocalDpi xmlns:a14="http://schemas.microsoft.com/office/drawing/2010/main" val="0"/>
+                </a:ext>
+              </a:extLst>
+            </a:blip>
+            <a:srcRect l="8616" r="6058" b="8519"/>
+            <a:stretch/>
+          </p:blipFill>
+          <p:spPr>
+            <a:xfrm>
+              <a:off x="4671389" y="590550"/>
+              <a:ext cx="6241774" cy="2509510"/>
+            </a:xfrm>
+            <a:prstGeom prst="rect">
+              <a:avLst/>
+            </a:prstGeom>
+          </p:spPr>
+        </p:pic>
+        <p:pic>
+          <p:nvPicPr>
+            <p:cNvPr id="4" name="Picture 3"/>
+            <p:cNvPicPr>
+              <a:picLocks noChangeAspect="1"/>
+            </p:cNvPicPr>
+            <p:nvPr/>
+          </p:nvPicPr>
+          <p:blipFill>
+            <a:blip r:embed="rId3">
+              <a:extLst>
+                <a:ext uri="{28A0092B-C50C-407E-A947-70E740481C1C}">
+                  <a14:useLocalDpi xmlns:a14="http://schemas.microsoft.com/office/drawing/2010/main" val="0"/>
+                </a:ext>
+              </a:extLst>
+            </a:blip>
+            <a:stretch>
+              <a:fillRect/>
+            </a:stretch>
+          </p:blipFill>
+          <p:spPr>
+            <a:xfrm>
+              <a:off x="514351" y="590550"/>
+              <a:ext cx="3805084" cy="2743200"/>
+            </a:xfrm>
+            <a:prstGeom prst="rect">
+              <a:avLst/>
+            </a:prstGeom>
+          </p:spPr>
+        </p:pic>
+        <p:sp>
+          <p:nvSpPr>
+            <p:cNvPr id="7" name="TextBox 6"/>
+            <p:cNvSpPr txBox="1"/>
+            <p:nvPr/>
+          </p:nvSpPr>
+          <p:spPr>
+            <a:xfrm>
+              <a:off x="5055702" y="2038350"/>
+              <a:ext cx="1333500" cy="646331"/>
+            </a:xfrm>
+            <a:prstGeom prst="rect">
+              <a:avLst/>
+            </a:prstGeom>
+            <a:noFill/>
+          </p:spPr>
+          <p:txBody>
+            <a:bodyPr wrap="square" rtlCol="0">
+              <a:spAutoFit/>
+            </a:bodyPr>
+            <a:lstStyle/>
+            <a:p>
+              <a:pPr algn="ctr"/>
+              <a:r>
+                <a:rPr lang="en-US" dirty="0" smtClean="0"/>
+                <a:t>Classified as </a:t>
+              </a:r>
+              <a:r>
+                <a:rPr lang="en-US" dirty="0" err="1" smtClean="0"/>
+                <a:t>Setosa</a:t>
+              </a:r>
+              <a:endParaRPr lang="en-US" dirty="0"/>
+            </a:p>
+          </p:txBody>
+        </p:sp>
+        <p:sp>
+          <p:nvSpPr>
+            <p:cNvPr id="8" name="TextBox 7"/>
+            <p:cNvSpPr txBox="1"/>
+            <p:nvPr/>
+          </p:nvSpPr>
+          <p:spPr>
+            <a:xfrm>
+              <a:off x="7236741" y="2038350"/>
+              <a:ext cx="2702389" cy="646331"/>
+            </a:xfrm>
+            <a:prstGeom prst="rect">
+              <a:avLst/>
+            </a:prstGeom>
+            <a:noFill/>
+          </p:spPr>
+          <p:txBody>
+            <a:bodyPr wrap="square" rtlCol="0">
+              <a:spAutoFit/>
+            </a:bodyPr>
+            <a:lstStyle/>
+            <a:p>
+              <a:pPr algn="ctr"/>
+              <a:r>
+                <a:rPr lang="en-US" dirty="0" smtClean="0"/>
+                <a:t>Classified as </a:t>
+              </a:r>
+              <a:endParaRPr lang="en-US" dirty="0" smtClean="0"/>
+            </a:p>
+            <a:p>
+              <a:pPr algn="ctr"/>
+              <a:r>
+                <a:rPr lang="en-US" dirty="0" err="1" smtClean="0"/>
+                <a:t>Virginica</a:t>
+              </a:r>
+              <a:endParaRPr lang="en-US" dirty="0"/>
+            </a:p>
+          </p:txBody>
+        </p:sp>
+        <p:sp>
+          <p:nvSpPr>
+            <p:cNvPr id="13" name="Triangle 12"/>
+            <p:cNvSpPr/>
+            <p:nvPr/>
+          </p:nvSpPr>
+          <p:spPr>
+            <a:xfrm flipH="1">
+              <a:off x="6510169" y="2838450"/>
+              <a:ext cx="180976" cy="247650"/>
+            </a:xfrm>
+            <a:prstGeom prst="triangle">
+              <a:avLst/>
+            </a:prstGeom>
+            <a:solidFill>
+              <a:schemeClr val="tx1"/>
+            </a:solidFill>
+            <a:ln w="50800">
+              <a:solidFill>
+                <a:schemeClr val="tx1"/>
+              </a:solidFill>
+            </a:ln>
+          </p:spPr>
+          <p:style>
+            <a:lnRef idx="2">
+              <a:schemeClr val="accent1">
+                <a:shade val="50000"/>
+              </a:schemeClr>
+            </a:lnRef>
+            <a:fillRef idx="1">
+              <a:schemeClr val="accent1"/>
+            </a:fillRef>
+            <a:effectRef idx="0">
+              <a:schemeClr val="accent1"/>
+            </a:effectRef>
+            <a:fontRef idx="minor">
+              <a:schemeClr val="lt1"/>
+            </a:fontRef>
+          </p:style>
+          <p:txBody>
+            <a:bodyPr rtlCol="0" anchor="ctr"/>
+            <a:lstStyle/>
+            <a:p>
+              <a:pPr algn="ctr"/>
+              <a:endParaRPr lang="en-US"/>
+            </a:p>
+          </p:txBody>
+        </p:sp>
+        <p:sp>
+          <p:nvSpPr>
+            <p:cNvPr id="14" name="TextBox 13"/>
+            <p:cNvSpPr txBox="1"/>
+            <p:nvPr/>
+          </p:nvSpPr>
+          <p:spPr>
+            <a:xfrm>
+              <a:off x="5964573" y="3100060"/>
+              <a:ext cx="1272168" cy="523220"/>
+            </a:xfrm>
+            <a:prstGeom prst="rect">
+              <a:avLst/>
+            </a:prstGeom>
+            <a:noFill/>
+          </p:spPr>
+          <p:txBody>
+            <a:bodyPr wrap="square" rtlCol="0">
+              <a:spAutoFit/>
+            </a:bodyPr>
+            <a:lstStyle/>
+            <a:p>
+              <a:pPr algn="ctr"/>
+              <a:r>
+                <a:rPr lang="en-US" sz="1400" dirty="0" smtClean="0"/>
+                <a:t>Split Point = 2.45</a:t>
+              </a:r>
+              <a:endParaRPr lang="en-US" sz="1400" dirty="0"/>
+            </a:p>
+          </p:txBody>
+        </p:sp>
+        <p:pic>
+          <p:nvPicPr>
+            <p:cNvPr id="24" name="Picture 23"/>
+            <p:cNvPicPr>
+              <a:picLocks noChangeAspect="1"/>
+            </p:cNvPicPr>
+            <p:nvPr/>
+          </p:nvPicPr>
+          <p:blipFill>
+            <a:blip r:embed="rId4">
+              <a:extLst>
+                <a:ext uri="{28A0092B-C50C-407E-A947-70E740481C1C}">
+                  <a14:useLocalDpi xmlns:a14="http://schemas.microsoft.com/office/drawing/2010/main" val="0"/>
+                </a:ext>
+              </a:extLst>
+            </a:blip>
+            <a:stretch>
+              <a:fillRect/>
+            </a:stretch>
+          </p:blipFill>
+          <p:spPr>
+            <a:xfrm>
+              <a:off x="162397" y="122128"/>
+              <a:ext cx="1034019" cy="1133856"/>
+            </a:xfrm>
+            <a:prstGeom prst="rect">
+              <a:avLst/>
+            </a:prstGeom>
+          </p:spPr>
+        </p:pic>
+        <p:pic>
+          <p:nvPicPr>
+            <p:cNvPr id="25" name="Picture 24"/>
+            <p:cNvPicPr>
+              <a:picLocks noChangeAspect="1"/>
+            </p:cNvPicPr>
+            <p:nvPr/>
+          </p:nvPicPr>
+          <p:blipFill>
+            <a:blip r:embed="rId5">
+              <a:extLst>
+                <a:ext uri="{28A0092B-C50C-407E-A947-70E740481C1C}">
+                  <a14:useLocalDpi xmlns:a14="http://schemas.microsoft.com/office/drawing/2010/main" val="0"/>
+                </a:ext>
+              </a:extLst>
+            </a:blip>
+            <a:stretch>
+              <a:fillRect/>
+            </a:stretch>
+          </p:blipFill>
+          <p:spPr>
+            <a:xfrm>
+              <a:off x="3995530" y="122128"/>
+              <a:ext cx="1034080" cy="1133922"/>
+            </a:xfrm>
+            <a:prstGeom prst="rect">
+              <a:avLst/>
+            </a:prstGeom>
+          </p:spPr>
+        </p:pic>
+      </p:grpSp>
     </p:spTree>
     <p:extLst>
       <p:ext uri="{BB962C8B-B14F-4D97-AF65-F5344CB8AC3E}">

</xml_diff>

<commit_message>
Updated decision tree gini and entropy. Initial version and subject to change
</commit_message>
<xml_diff>
--- a/Sklearn/DecisionTrees/powerpoint/DecisionComparison.pptx
+++ b/Sklearn/DecisionTrees/powerpoint/DecisionComparison.pptx
@@ -15,10 +15,10 @@
     <p:sldId id="259" r:id="rId6"/>
     <p:sldId id="278" r:id="rId7"/>
     <p:sldId id="279" r:id="rId8"/>
-    <p:sldId id="277" r:id="rId9"/>
-    <p:sldId id="276" r:id="rId10"/>
-    <p:sldId id="275" r:id="rId11"/>
-    <p:sldId id="267" r:id="rId12"/>
+    <p:sldId id="267" r:id="rId9"/>
+    <p:sldId id="277" r:id="rId10"/>
+    <p:sldId id="276" r:id="rId11"/>
+    <p:sldId id="275" r:id="rId12"/>
     <p:sldId id="274" r:id="rId13"/>
     <p:sldId id="273" r:id="rId14"/>
     <p:sldId id="272" r:id="rId15"/>
@@ -220,7 +220,7 @@
           <a:p>
             <a:fld id="{1257FD7B-4E4A-644A-895D-BAD136711207}" type="datetimeFigureOut">
               <a:rPr lang="en-US" smtClean="0"/>
-              <a:t>10/5/18</a:t>
+              <a:t>10/9/18</a:t>
             </a:fld>
             <a:endParaRPr lang="en-US"/>
           </a:p>
@@ -703,7 +703,7 @@
           <a:p>
             <a:fld id="{B66C5E5C-AFE9-2848-A01D-417298715EDA}" type="datetimeFigureOut">
               <a:rPr lang="en-US" smtClean="0"/>
-              <a:t>10/5/18</a:t>
+              <a:t>10/9/18</a:t>
             </a:fld>
             <a:endParaRPr lang="en-US"/>
           </a:p>
@@ -873,7 +873,7 @@
           <a:p>
             <a:fld id="{B66C5E5C-AFE9-2848-A01D-417298715EDA}" type="datetimeFigureOut">
               <a:rPr lang="en-US" smtClean="0"/>
-              <a:t>10/5/18</a:t>
+              <a:t>10/9/18</a:t>
             </a:fld>
             <a:endParaRPr lang="en-US"/>
           </a:p>
@@ -1053,7 +1053,7 @@
           <a:p>
             <a:fld id="{B66C5E5C-AFE9-2848-A01D-417298715EDA}" type="datetimeFigureOut">
               <a:rPr lang="en-US" smtClean="0"/>
-              <a:t>10/5/18</a:t>
+              <a:t>10/9/18</a:t>
             </a:fld>
             <a:endParaRPr lang="en-US"/>
           </a:p>
@@ -1223,7 +1223,7 @@
           <a:p>
             <a:fld id="{B66C5E5C-AFE9-2848-A01D-417298715EDA}" type="datetimeFigureOut">
               <a:rPr lang="en-US" smtClean="0"/>
-              <a:t>10/5/18</a:t>
+              <a:t>10/9/18</a:t>
             </a:fld>
             <a:endParaRPr lang="en-US"/>
           </a:p>
@@ -1469,7 +1469,7 @@
           <a:p>
             <a:fld id="{B66C5E5C-AFE9-2848-A01D-417298715EDA}" type="datetimeFigureOut">
               <a:rPr lang="en-US" smtClean="0"/>
-              <a:t>10/5/18</a:t>
+              <a:t>10/9/18</a:t>
             </a:fld>
             <a:endParaRPr lang="en-US"/>
           </a:p>
@@ -1701,7 +1701,7 @@
           <a:p>
             <a:fld id="{B66C5E5C-AFE9-2848-A01D-417298715EDA}" type="datetimeFigureOut">
               <a:rPr lang="en-US" smtClean="0"/>
-              <a:t>10/5/18</a:t>
+              <a:t>10/9/18</a:t>
             </a:fld>
             <a:endParaRPr lang="en-US"/>
           </a:p>
@@ -2068,7 +2068,7 @@
           <a:p>
             <a:fld id="{B66C5E5C-AFE9-2848-A01D-417298715EDA}" type="datetimeFigureOut">
               <a:rPr lang="en-US" smtClean="0"/>
-              <a:t>10/5/18</a:t>
+              <a:t>10/9/18</a:t>
             </a:fld>
             <a:endParaRPr lang="en-US"/>
           </a:p>
@@ -2186,7 +2186,7 @@
           <a:p>
             <a:fld id="{B66C5E5C-AFE9-2848-A01D-417298715EDA}" type="datetimeFigureOut">
               <a:rPr lang="en-US" smtClean="0"/>
-              <a:t>10/5/18</a:t>
+              <a:t>10/9/18</a:t>
             </a:fld>
             <a:endParaRPr lang="en-US"/>
           </a:p>
@@ -2281,7 +2281,7 @@
           <a:p>
             <a:fld id="{B66C5E5C-AFE9-2848-A01D-417298715EDA}" type="datetimeFigureOut">
               <a:rPr lang="en-US" smtClean="0"/>
-              <a:t>10/5/18</a:t>
+              <a:t>10/9/18</a:t>
             </a:fld>
             <a:endParaRPr lang="en-US"/>
           </a:p>
@@ -2558,7 +2558,7 @@
           <a:p>
             <a:fld id="{B66C5E5C-AFE9-2848-A01D-417298715EDA}" type="datetimeFigureOut">
               <a:rPr lang="en-US" smtClean="0"/>
-              <a:t>10/5/18</a:t>
+              <a:t>10/9/18</a:t>
             </a:fld>
             <a:endParaRPr lang="en-US"/>
           </a:p>
@@ -2811,7 +2811,7 @@
           <a:p>
             <a:fld id="{B66C5E5C-AFE9-2848-A01D-417298715EDA}" type="datetimeFigureOut">
               <a:rPr lang="en-US" smtClean="0"/>
-              <a:t>10/5/18</a:t>
+              <a:t>10/9/18</a:t>
             </a:fld>
             <a:endParaRPr lang="en-US"/>
           </a:p>
@@ -3024,7 +3024,7 @@
           <a:p>
             <a:fld id="{B66C5E5C-AFE9-2848-A01D-417298715EDA}" type="datetimeFigureOut">
               <a:rPr lang="en-US" smtClean="0"/>
-              <a:t>10/5/18</a:t>
+              <a:t>10/9/18</a:t>
             </a:fld>
             <a:endParaRPr lang="en-US"/>
           </a:p>
@@ -3701,7 +3701,7 @@
     </p:spTree>
     <p:extLst>
       <p:ext uri="{BB962C8B-B14F-4D97-AF65-F5344CB8AC3E}">
-        <p14:creationId xmlns:p14="http://schemas.microsoft.com/office/powerpoint/2010/main" val="1341726735"/>
+        <p14:creationId xmlns:p14="http://schemas.microsoft.com/office/powerpoint/2010/main" val="1822941645"/>
       </p:ext>
     </p:extLst>
   </p:cSld>
@@ -3728,686 +3728,10 @@
           <a:chExt cx="0" cy="0"/>
         </a:xfrm>
       </p:grpSpPr>
-      <p:pic>
-        <p:nvPicPr>
-          <p:cNvPr id="10" name="Picture 9"/>
-          <p:cNvPicPr>
-            <a:picLocks noChangeAspect="1"/>
-          </p:cNvPicPr>
-          <p:nvPr/>
-        </p:nvPicPr>
-        <p:blipFill rotWithShape="1">
-          <a:blip r:embed="rId2">
-            <a:extLst>
-              <a:ext uri="{28A0092B-C50C-407E-A947-70E740481C1C}">
-                <a14:useLocalDpi xmlns:a14="http://schemas.microsoft.com/office/drawing/2010/main" val="0"/>
-              </a:ext>
-            </a:extLst>
-          </a:blip>
-          <a:srcRect l="68876"/>
-          <a:stretch/>
-        </p:blipFill>
-        <p:spPr>
-          <a:xfrm>
-            <a:off x="3731772" y="10466017"/>
-            <a:ext cx="738954" cy="791423"/>
-          </a:xfrm>
-          <a:prstGeom prst="rect">
-            <a:avLst/>
-          </a:prstGeom>
-        </p:spPr>
-      </p:pic>
-      <p:pic>
-        <p:nvPicPr>
-          <p:cNvPr id="12" name="Picture 11"/>
-          <p:cNvPicPr>
-            <a:picLocks noChangeAspect="1"/>
-          </p:cNvPicPr>
-          <p:nvPr/>
-        </p:nvPicPr>
-        <p:blipFill rotWithShape="1">
-          <a:blip r:embed="rId2">
-            <a:extLst>
-              <a:ext uri="{28A0092B-C50C-407E-A947-70E740481C1C}">
-                <a14:useLocalDpi xmlns:a14="http://schemas.microsoft.com/office/drawing/2010/main" val="0"/>
-              </a:ext>
-            </a:extLst>
-          </a:blip>
-          <a:srcRect r="68876"/>
-          <a:stretch/>
-        </p:blipFill>
-        <p:spPr>
-          <a:xfrm>
-            <a:off x="2066198" y="10466018"/>
-            <a:ext cx="738954" cy="791423"/>
-          </a:xfrm>
-          <a:prstGeom prst="rect">
-            <a:avLst/>
-          </a:prstGeom>
-        </p:spPr>
-      </p:pic>
-      <p:sp>
-        <p:nvSpPr>
-          <p:cNvPr id="14" name="Rectangle 13"/>
-          <p:cNvSpPr/>
-          <p:nvPr/>
-        </p:nvSpPr>
-        <p:spPr>
-          <a:xfrm>
-            <a:off x="-1384395" y="11413525"/>
-            <a:ext cx="8209188" cy="769441"/>
-          </a:xfrm>
-          <a:prstGeom prst="rect">
-            <a:avLst/>
-          </a:prstGeom>
-        </p:spPr>
-        <p:txBody>
-          <a:bodyPr wrap="square">
-            <a:spAutoFit/>
-          </a:bodyPr>
-          <a:lstStyle/>
-          <a:p>
-            <a:pPr algn="ctr"/>
-            <a:r>
-              <a:rPr lang="en-US" sz="2200" dirty="0" smtClean="0"/>
-              <a:t>Species counts are: </a:t>
-            </a:r>
-            <a:r>
-              <a:rPr lang="en-US" sz="2200" dirty="0" err="1" smtClean="0"/>
-              <a:t>setosa</a:t>
-            </a:r>
-            <a:r>
-              <a:rPr lang="en-US" sz="2200" dirty="0" smtClean="0"/>
-              <a:t>=0, versicolor=38, </a:t>
-            </a:r>
-            <a:r>
-              <a:rPr lang="en-US" sz="2200" dirty="0" err="1" smtClean="0"/>
-              <a:t>virginica</a:t>
-            </a:r>
-            <a:r>
-              <a:rPr lang="en-US" sz="2200" dirty="0" smtClean="0"/>
-              <a:t>=3</a:t>
-            </a:r>
-          </a:p>
-          <a:p>
-            <a:pPr algn="ctr"/>
-            <a:r>
-              <a:rPr lang="en-US" sz="2200" dirty="0" smtClean="0"/>
-              <a:t>Prediction is </a:t>
-            </a:r>
-            <a:r>
-              <a:rPr lang="en-US" sz="2200" b="1" dirty="0" smtClean="0"/>
-              <a:t>versicolor</a:t>
-            </a:r>
-            <a:r>
-              <a:rPr lang="en-US" sz="2200" dirty="0" smtClean="0"/>
-              <a:t> as it is the majority class</a:t>
-            </a:r>
-          </a:p>
-        </p:txBody>
-      </p:sp>
-      <p:grpSp>
-        <p:nvGrpSpPr>
-          <p:cNvPr id="2" name="Group 1"/>
-          <p:cNvGrpSpPr/>
-          <p:nvPr/>
-        </p:nvGrpSpPr>
-        <p:grpSpPr>
-          <a:xfrm>
-            <a:off x="-2628527" y="-438505"/>
-            <a:ext cx="20328087" cy="6989666"/>
-            <a:chOff x="-2628527" y="-438505"/>
-            <a:chExt cx="20328087" cy="6989666"/>
-          </a:xfrm>
-        </p:grpSpPr>
-        <p:pic>
-          <p:nvPicPr>
-            <p:cNvPr id="23" name="Picture 22"/>
-            <p:cNvPicPr>
-              <a:picLocks noChangeAspect="1"/>
-            </p:cNvPicPr>
-            <p:nvPr/>
-          </p:nvPicPr>
-          <p:blipFill>
-            <a:blip r:embed="rId3">
-              <a:extLst>
-                <a:ext uri="{28A0092B-C50C-407E-A947-70E740481C1C}">
-                  <a14:useLocalDpi xmlns:a14="http://schemas.microsoft.com/office/drawing/2010/main" val="0"/>
-                </a:ext>
-              </a:extLst>
-            </a:blip>
-            <a:stretch>
-              <a:fillRect/>
-            </a:stretch>
-          </p:blipFill>
-          <p:spPr>
-            <a:xfrm>
-              <a:off x="10666236" y="1321027"/>
-              <a:ext cx="5857461" cy="4572920"/>
-            </a:xfrm>
-            <a:prstGeom prst="rect">
-              <a:avLst/>
-            </a:prstGeom>
-            <a:ln w="12700">
-              <a:noFill/>
-            </a:ln>
-          </p:spPr>
-        </p:pic>
-        <p:pic>
-          <p:nvPicPr>
-            <p:cNvPr id="4" name="Picture 3"/>
-            <p:cNvPicPr>
-              <a:picLocks noChangeAspect="1"/>
-            </p:cNvPicPr>
-            <p:nvPr/>
-          </p:nvPicPr>
-          <p:blipFill>
-            <a:blip r:embed="rId4">
-              <a:extLst>
-                <a:ext uri="{28A0092B-C50C-407E-A947-70E740481C1C}">
-                  <a14:useLocalDpi xmlns:a14="http://schemas.microsoft.com/office/drawing/2010/main" val="0"/>
-                </a:ext>
-              </a:extLst>
-            </a:blip>
-            <a:stretch>
-              <a:fillRect/>
-            </a:stretch>
-          </p:blipFill>
-          <p:spPr>
-            <a:xfrm>
-              <a:off x="-1694836" y="1321027"/>
-              <a:ext cx="6341807" cy="4572920"/>
-            </a:xfrm>
-            <a:prstGeom prst="rect">
-              <a:avLst/>
-            </a:prstGeom>
-            <a:ln w="12700">
-              <a:noFill/>
-            </a:ln>
-          </p:spPr>
-        </p:pic>
-        <p:pic>
-          <p:nvPicPr>
-            <p:cNvPr id="5" name="Picture 4"/>
-            <p:cNvPicPr>
-              <a:picLocks noChangeAspect="1"/>
-            </p:cNvPicPr>
-            <p:nvPr/>
-          </p:nvPicPr>
-          <p:blipFill>
-            <a:blip r:embed="rId5">
-              <a:extLst>
-                <a:ext uri="{28A0092B-C50C-407E-A947-70E740481C1C}">
-                  <a14:useLocalDpi xmlns:a14="http://schemas.microsoft.com/office/drawing/2010/main" val="0"/>
-                </a:ext>
-              </a:extLst>
-            </a:blip>
-            <a:stretch>
-              <a:fillRect/>
-            </a:stretch>
-          </p:blipFill>
-          <p:spPr>
-            <a:xfrm>
-              <a:off x="5114572" y="1321027"/>
-              <a:ext cx="5084063" cy="4572920"/>
-            </a:xfrm>
-            <a:prstGeom prst="rect">
-              <a:avLst/>
-            </a:prstGeom>
-            <a:ln w="12700">
-              <a:noFill/>
-            </a:ln>
-          </p:spPr>
-        </p:pic>
-        <p:sp>
-          <p:nvSpPr>
-            <p:cNvPr id="15" name="TextBox 14"/>
-            <p:cNvSpPr txBox="1"/>
-            <p:nvPr/>
-          </p:nvSpPr>
-          <p:spPr>
-            <a:xfrm>
-              <a:off x="14688369" y="990108"/>
-              <a:ext cx="1920240" cy="292447"/>
-            </a:xfrm>
-            <a:prstGeom prst="rect">
-              <a:avLst/>
-            </a:prstGeom>
-            <a:noFill/>
-          </p:spPr>
-          <p:txBody>
-            <a:bodyPr wrap="square" rtlCol="0">
-              <a:spAutoFit/>
-            </a:bodyPr>
-            <a:lstStyle/>
-            <a:p>
-              <a:r>
-                <a:rPr lang="en-US" sz="1300" dirty="0" smtClean="0"/>
-                <a:t>Decision Node </a:t>
-              </a:r>
-              <a:endParaRPr lang="en-US" sz="1300" dirty="0"/>
-            </a:p>
-          </p:txBody>
-        </p:sp>
-        <p:sp>
-          <p:nvSpPr>
-            <p:cNvPr id="16" name="TextBox 15"/>
-            <p:cNvSpPr txBox="1"/>
-            <p:nvPr/>
-          </p:nvSpPr>
-          <p:spPr>
-            <a:xfrm>
-              <a:off x="14691642" y="673841"/>
-              <a:ext cx="1554480" cy="292447"/>
-            </a:xfrm>
-            <a:prstGeom prst="rect">
-              <a:avLst/>
-            </a:prstGeom>
-            <a:noFill/>
-          </p:spPr>
-          <p:txBody>
-            <a:bodyPr wrap="square" rtlCol="0">
-              <a:spAutoFit/>
-            </a:bodyPr>
-            <a:lstStyle/>
-            <a:p>
-              <a:r>
-                <a:rPr lang="en-US" sz="1300" dirty="0" smtClean="0"/>
-                <a:t>Root Node</a:t>
-              </a:r>
-              <a:endParaRPr lang="en-US" sz="1300" dirty="0"/>
-            </a:p>
-          </p:txBody>
-        </p:sp>
-        <p:sp>
-          <p:nvSpPr>
-            <p:cNvPr id="17" name="Rectangle 16"/>
-            <p:cNvSpPr/>
-            <p:nvPr/>
-          </p:nvSpPr>
-          <p:spPr>
-            <a:xfrm>
-              <a:off x="14446546" y="1067850"/>
-              <a:ext cx="137160" cy="137188"/>
-            </a:xfrm>
-            <a:prstGeom prst="rect">
-              <a:avLst/>
-            </a:prstGeom>
-            <a:solidFill>
-              <a:srgbClr val="0000FF"/>
-            </a:solidFill>
-            <a:ln>
-              <a:solidFill>
-                <a:schemeClr val="tx1"/>
-              </a:solidFill>
-            </a:ln>
-          </p:spPr>
-          <p:style>
-            <a:lnRef idx="2">
-              <a:schemeClr val="accent1">
-                <a:shade val="50000"/>
-              </a:schemeClr>
-            </a:lnRef>
-            <a:fillRef idx="1">
-              <a:schemeClr val="accent1"/>
-            </a:fillRef>
-            <a:effectRef idx="0">
-              <a:schemeClr val="accent1"/>
-            </a:effectRef>
-            <a:fontRef idx="minor">
-              <a:schemeClr val="lt1"/>
-            </a:fontRef>
-          </p:style>
-          <p:txBody>
-            <a:bodyPr rtlCol="0" anchor="ctr"/>
-            <a:lstStyle/>
-            <a:p>
-              <a:pPr algn="ctr"/>
-              <a:endParaRPr lang="en-US">
-                <a:solidFill>
-                  <a:srgbClr val="0000FF"/>
-                </a:solidFill>
-              </a:endParaRPr>
-            </a:p>
-          </p:txBody>
-        </p:sp>
-        <p:sp>
-          <p:nvSpPr>
-            <p:cNvPr id="18" name="Rectangle 17"/>
-            <p:cNvSpPr/>
-            <p:nvPr/>
-          </p:nvSpPr>
-          <p:spPr>
-            <a:xfrm>
-              <a:off x="14347964" y="611847"/>
-              <a:ext cx="1999102" cy="1057257"/>
-            </a:xfrm>
-            <a:prstGeom prst="rect">
-              <a:avLst/>
-            </a:prstGeom>
-            <a:noFill/>
-            <a:ln w="6350">
-              <a:solidFill>
-                <a:schemeClr val="tx1">
-                  <a:alpha val="32000"/>
-                </a:schemeClr>
-              </a:solidFill>
-            </a:ln>
-          </p:spPr>
-          <p:style>
-            <a:lnRef idx="2">
-              <a:schemeClr val="accent1">
-                <a:shade val="50000"/>
-              </a:schemeClr>
-            </a:lnRef>
-            <a:fillRef idx="1">
-              <a:schemeClr val="accent1"/>
-            </a:fillRef>
-            <a:effectRef idx="0">
-              <a:schemeClr val="accent1"/>
-            </a:effectRef>
-            <a:fontRef idx="minor">
-              <a:schemeClr val="lt1"/>
-            </a:fontRef>
-          </p:style>
-          <p:txBody>
-            <a:bodyPr rtlCol="0" anchor="ctr"/>
-            <a:lstStyle/>
-            <a:p>
-              <a:pPr algn="ctr"/>
-              <a:endParaRPr lang="en-US"/>
-            </a:p>
-          </p:txBody>
-        </p:sp>
-        <p:sp>
-          <p:nvSpPr>
-            <p:cNvPr id="19" name="Rectangle 18"/>
-            <p:cNvSpPr/>
-            <p:nvPr/>
-          </p:nvSpPr>
-          <p:spPr>
-            <a:xfrm>
-              <a:off x="13800419" y="239564"/>
-              <a:ext cx="3094191" cy="400190"/>
-            </a:xfrm>
-            <a:prstGeom prst="rect">
-              <a:avLst/>
-            </a:prstGeom>
-          </p:spPr>
-          <p:txBody>
-            <a:bodyPr wrap="square">
-              <a:spAutoFit/>
-            </a:bodyPr>
-            <a:lstStyle/>
-            <a:p>
-              <a:pPr algn="ctr"/>
-              <a:r>
-                <a:rPr lang="en-US" sz="2000" dirty="0" smtClean="0"/>
-                <a:t>Type of Node</a:t>
-              </a:r>
-              <a:endParaRPr lang="en-US" sz="2000" dirty="0"/>
-            </a:p>
-          </p:txBody>
-        </p:sp>
-        <p:sp>
-          <p:nvSpPr>
-            <p:cNvPr id="20" name="Rectangle 19"/>
-            <p:cNvSpPr/>
-            <p:nvPr/>
-          </p:nvSpPr>
-          <p:spPr>
-            <a:xfrm>
-              <a:off x="14450625" y="1387955"/>
-              <a:ext cx="137160" cy="137188"/>
-            </a:xfrm>
-            <a:prstGeom prst="rect">
-              <a:avLst/>
-            </a:prstGeom>
-            <a:solidFill>
-              <a:srgbClr val="008000"/>
-            </a:solidFill>
-            <a:ln>
-              <a:solidFill>
-                <a:schemeClr val="tx1"/>
-              </a:solidFill>
-            </a:ln>
-          </p:spPr>
-          <p:style>
-            <a:lnRef idx="2">
-              <a:schemeClr val="accent1">
-                <a:shade val="50000"/>
-              </a:schemeClr>
-            </a:lnRef>
-            <a:fillRef idx="1">
-              <a:schemeClr val="accent1"/>
-            </a:fillRef>
-            <a:effectRef idx="0">
-              <a:schemeClr val="accent1"/>
-            </a:effectRef>
-            <a:fontRef idx="minor">
-              <a:schemeClr val="lt1"/>
-            </a:fontRef>
-          </p:style>
-          <p:txBody>
-            <a:bodyPr rtlCol="0" anchor="ctr"/>
-            <a:lstStyle/>
-            <a:p>
-              <a:pPr algn="ctr"/>
-              <a:endParaRPr lang="en-US"/>
-            </a:p>
-          </p:txBody>
-        </p:sp>
-        <p:sp>
-          <p:nvSpPr>
-            <p:cNvPr id="21" name="TextBox 20"/>
-            <p:cNvSpPr txBox="1"/>
-            <p:nvPr/>
-          </p:nvSpPr>
-          <p:spPr>
-            <a:xfrm>
-              <a:off x="14691642" y="1314075"/>
-              <a:ext cx="1920240" cy="292447"/>
-            </a:xfrm>
-            <a:prstGeom prst="rect">
-              <a:avLst/>
-            </a:prstGeom>
-            <a:noFill/>
-          </p:spPr>
-          <p:txBody>
-            <a:bodyPr wrap="square" rtlCol="0">
-              <a:spAutoFit/>
-            </a:bodyPr>
-            <a:lstStyle/>
-            <a:p>
-              <a:r>
-                <a:rPr lang="en-US" sz="1300" dirty="0" smtClean="0"/>
-                <a:t>Leaf/Terminal Node </a:t>
-              </a:r>
-              <a:endParaRPr lang="en-US" sz="1300" dirty="0"/>
-            </a:p>
-          </p:txBody>
-        </p:sp>
-        <p:sp>
-          <p:nvSpPr>
-            <p:cNvPr id="22" name="Rectangle 21"/>
-            <p:cNvSpPr/>
-            <p:nvPr/>
-          </p:nvSpPr>
-          <p:spPr>
-            <a:xfrm>
-              <a:off x="14450625" y="747746"/>
-              <a:ext cx="137160" cy="137188"/>
-            </a:xfrm>
-            <a:prstGeom prst="rect">
-              <a:avLst/>
-            </a:prstGeom>
-            <a:solidFill>
-              <a:srgbClr val="D2691E"/>
-            </a:solidFill>
-            <a:ln>
-              <a:solidFill>
-                <a:schemeClr val="tx1"/>
-              </a:solidFill>
-            </a:ln>
-          </p:spPr>
-          <p:style>
-            <a:lnRef idx="2">
-              <a:schemeClr val="accent1">
-                <a:shade val="50000"/>
-              </a:schemeClr>
-            </a:lnRef>
-            <a:fillRef idx="1">
-              <a:schemeClr val="accent1"/>
-            </a:fillRef>
-            <a:effectRef idx="0">
-              <a:schemeClr val="accent1"/>
-            </a:effectRef>
-            <a:fontRef idx="minor">
-              <a:schemeClr val="lt1"/>
-            </a:fontRef>
-          </p:style>
-          <p:txBody>
-            <a:bodyPr rtlCol="0" anchor="ctr"/>
-            <a:lstStyle/>
-            <a:p>
-              <a:pPr algn="ctr"/>
-              <a:endParaRPr lang="en-US">
-                <a:solidFill>
-                  <a:srgbClr val="0000FF"/>
-                </a:solidFill>
-              </a:endParaRPr>
-            </a:p>
-          </p:txBody>
-        </p:sp>
-        <p:sp>
-          <p:nvSpPr>
-            <p:cNvPr id="32" name="TextBox 31"/>
-            <p:cNvSpPr txBox="1"/>
-            <p:nvPr/>
-          </p:nvSpPr>
-          <p:spPr>
-            <a:xfrm>
-              <a:off x="3084603" y="-438505"/>
-              <a:ext cx="9144000" cy="1415772"/>
-            </a:xfrm>
-            <a:prstGeom prst="rect">
-              <a:avLst/>
-            </a:prstGeom>
-            <a:noFill/>
-          </p:spPr>
-          <p:txBody>
-            <a:bodyPr wrap="square" rtlCol="0">
-              <a:spAutoFit/>
-            </a:bodyPr>
-            <a:lstStyle/>
-            <a:p>
-              <a:pPr algn="ctr"/>
-              <a:r>
-                <a:rPr lang="en-US" sz="5000" b="1" dirty="0" smtClean="0"/>
-                <a:t>Depth of Classification Trees</a:t>
-              </a:r>
-              <a:endParaRPr lang="en-US" sz="5000" dirty="0" smtClean="0"/>
-            </a:p>
-            <a:p>
-              <a:endParaRPr lang="en-US" dirty="0"/>
-            </a:p>
-            <a:p>
-              <a:endParaRPr lang="en-US" dirty="0"/>
-            </a:p>
-          </p:txBody>
-        </p:sp>
-        <p:sp>
-          <p:nvSpPr>
-            <p:cNvPr id="35" name="Rectangle 34"/>
-            <p:cNvSpPr/>
-            <p:nvPr/>
-          </p:nvSpPr>
-          <p:spPr>
-            <a:xfrm>
-              <a:off x="-2628527" y="5997052"/>
-              <a:ext cx="8209188" cy="554109"/>
-            </a:xfrm>
-            <a:prstGeom prst="rect">
-              <a:avLst/>
-            </a:prstGeom>
-          </p:spPr>
-          <p:txBody>
-            <a:bodyPr wrap="square">
-              <a:spAutoFit/>
-            </a:bodyPr>
-            <a:lstStyle/>
-            <a:p>
-              <a:pPr algn="ctr"/>
-              <a:r>
-                <a:rPr lang="en-US" sz="3000" dirty="0" smtClean="0"/>
-                <a:t>Depth = 1</a:t>
-              </a:r>
-            </a:p>
-          </p:txBody>
-        </p:sp>
-        <p:sp>
-          <p:nvSpPr>
-            <p:cNvPr id="36" name="Rectangle 35"/>
-            <p:cNvSpPr/>
-            <p:nvPr/>
-          </p:nvSpPr>
-          <p:spPr>
-            <a:xfrm>
-              <a:off x="3552009" y="5997051"/>
-              <a:ext cx="8209188" cy="554109"/>
-            </a:xfrm>
-            <a:prstGeom prst="rect">
-              <a:avLst/>
-            </a:prstGeom>
-          </p:spPr>
-          <p:txBody>
-            <a:bodyPr wrap="square">
-              <a:spAutoFit/>
-            </a:bodyPr>
-            <a:lstStyle/>
-            <a:p>
-              <a:pPr algn="ctr"/>
-              <a:r>
-                <a:rPr lang="en-US" sz="3000" dirty="0" smtClean="0"/>
-                <a:t>Depth = 2</a:t>
-              </a:r>
-            </a:p>
-          </p:txBody>
-        </p:sp>
-        <p:sp>
-          <p:nvSpPr>
-            <p:cNvPr id="37" name="Rectangle 36"/>
-            <p:cNvSpPr/>
-            <p:nvPr/>
-          </p:nvSpPr>
-          <p:spPr>
-            <a:xfrm>
-              <a:off x="9490372" y="5960874"/>
-              <a:ext cx="8209188" cy="554109"/>
-            </a:xfrm>
-            <a:prstGeom prst="rect">
-              <a:avLst/>
-            </a:prstGeom>
-          </p:spPr>
-          <p:txBody>
-            <a:bodyPr wrap="square">
-              <a:spAutoFit/>
-            </a:bodyPr>
-            <a:lstStyle/>
-            <a:p>
-              <a:pPr algn="ctr"/>
-              <a:r>
-                <a:rPr lang="en-US" sz="3000" dirty="0" smtClean="0"/>
-                <a:t>Depth = 3</a:t>
-              </a:r>
-            </a:p>
-          </p:txBody>
-        </p:sp>
-      </p:grpSp>
     </p:spTree>
     <p:extLst>
       <p:ext uri="{BB962C8B-B14F-4D97-AF65-F5344CB8AC3E}">
-        <p14:creationId xmlns:p14="http://schemas.microsoft.com/office/powerpoint/2010/main" val="930359355"/>
+        <p14:creationId xmlns:p14="http://schemas.microsoft.com/office/powerpoint/2010/main" val="1341726735"/>
       </p:ext>
     </p:extLst>
   </p:cSld>
@@ -7530,369 +6854,339 @@
           <a:chExt cx="0" cy="0"/>
         </a:xfrm>
       </p:grpSpPr>
-      <p:grpSp>
-        <p:nvGrpSpPr>
-          <p:cNvPr id="2" name="Group 1"/>
-          <p:cNvGrpSpPr/>
+      <p:pic>
+        <p:nvPicPr>
+          <p:cNvPr id="15" name="Picture 14"/>
+          <p:cNvPicPr>
+            <a:picLocks noChangeAspect="1"/>
+          </p:cNvPicPr>
           <p:nvPr/>
-        </p:nvGrpSpPr>
-        <p:grpSpPr>
+        </p:nvPicPr>
+        <p:blipFill rotWithShape="1">
+          <a:blip r:embed="rId2">
+            <a:extLst>
+              <a:ext uri="{28A0092B-C50C-407E-A947-70E740481C1C}">
+                <a14:useLocalDpi xmlns:a14="http://schemas.microsoft.com/office/drawing/2010/main" val="0"/>
+              </a:ext>
+            </a:extLst>
+          </a:blip>
+          <a:srcRect l="8616" r="6058" b="8519"/>
+          <a:stretch/>
+        </p:blipFill>
+        <p:spPr>
+          <a:xfrm>
+            <a:off x="4671389" y="590550"/>
+            <a:ext cx="6241774" cy="2509510"/>
+          </a:xfrm>
+          <a:prstGeom prst="rect">
+            <a:avLst/>
+          </a:prstGeom>
+        </p:spPr>
+      </p:pic>
+      <p:pic>
+        <p:nvPicPr>
+          <p:cNvPr id="4" name="Picture 3"/>
+          <p:cNvPicPr>
+            <a:picLocks noChangeAspect="1"/>
+          </p:cNvPicPr>
+          <p:nvPr/>
+        </p:nvPicPr>
+        <p:blipFill>
+          <a:blip r:embed="rId3">
+            <a:extLst>
+              <a:ext uri="{28A0092B-C50C-407E-A947-70E740481C1C}">
+                <a14:useLocalDpi xmlns:a14="http://schemas.microsoft.com/office/drawing/2010/main" val="0"/>
+              </a:ext>
+            </a:extLst>
+          </a:blip>
+          <a:stretch>
+            <a:fillRect/>
+          </a:stretch>
+        </p:blipFill>
+        <p:spPr>
+          <a:xfrm>
+            <a:off x="514351" y="590550"/>
+            <a:ext cx="3805084" cy="2743200"/>
+          </a:xfrm>
+          <a:prstGeom prst="rect">
+            <a:avLst/>
+          </a:prstGeom>
+        </p:spPr>
+      </p:pic>
+      <p:sp>
+        <p:nvSpPr>
+          <p:cNvPr id="7" name="TextBox 6"/>
+          <p:cNvSpPr txBox="1"/>
+          <p:nvPr/>
+        </p:nvSpPr>
+        <p:spPr>
+          <a:xfrm>
+            <a:off x="5055702" y="2038350"/>
+            <a:ext cx="1333500" cy="646331"/>
+          </a:xfrm>
+          <a:prstGeom prst="rect">
+            <a:avLst/>
+          </a:prstGeom>
+          <a:noFill/>
+        </p:spPr>
+        <p:txBody>
+          <a:bodyPr wrap="square" rtlCol="0">
+            <a:spAutoFit/>
+          </a:bodyPr>
+          <a:lstStyle/>
+          <a:p>
+            <a:pPr algn="ctr"/>
+            <a:r>
+              <a:rPr lang="en-US" dirty="0" smtClean="0"/>
+              <a:t>Classified as </a:t>
+            </a:r>
+            <a:r>
+              <a:rPr lang="en-US" dirty="0" err="1" smtClean="0"/>
+              <a:t>Setosa</a:t>
+            </a:r>
+            <a:endParaRPr lang="en-US" dirty="0"/>
+          </a:p>
+        </p:txBody>
+      </p:sp>
+      <p:sp>
+        <p:nvSpPr>
+          <p:cNvPr id="8" name="TextBox 7"/>
+          <p:cNvSpPr txBox="1"/>
+          <p:nvPr/>
+        </p:nvSpPr>
+        <p:spPr>
+          <a:xfrm>
+            <a:off x="7236741" y="2038350"/>
+            <a:ext cx="2702389" cy="646331"/>
+          </a:xfrm>
+          <a:prstGeom prst="rect">
+            <a:avLst/>
+          </a:prstGeom>
+          <a:noFill/>
+        </p:spPr>
+        <p:txBody>
+          <a:bodyPr wrap="square" rtlCol="0">
+            <a:spAutoFit/>
+          </a:bodyPr>
+          <a:lstStyle/>
+          <a:p>
+            <a:pPr algn="ctr"/>
+            <a:r>
+              <a:rPr lang="en-US" dirty="0" smtClean="0"/>
+              <a:t>Classified as </a:t>
+            </a:r>
+          </a:p>
+          <a:p>
+            <a:pPr algn="ctr"/>
+            <a:r>
+              <a:rPr lang="en-US" dirty="0" err="1" smtClean="0"/>
+              <a:t>Virginica</a:t>
+            </a:r>
+            <a:endParaRPr lang="en-US" dirty="0"/>
+          </a:p>
+        </p:txBody>
+      </p:sp>
+      <p:sp>
+        <p:nvSpPr>
+          <p:cNvPr id="13" name="Triangle 12"/>
+          <p:cNvSpPr/>
+          <p:nvPr/>
+        </p:nvSpPr>
+        <p:spPr>
+          <a:xfrm flipH="1">
+            <a:off x="6510169" y="2838450"/>
+            <a:ext cx="180976" cy="247650"/>
+          </a:xfrm>
+          <a:prstGeom prst="triangle">
+            <a:avLst/>
+          </a:prstGeom>
+          <a:solidFill>
+            <a:schemeClr val="tx1"/>
+          </a:solidFill>
+          <a:ln w="50800">
+            <a:solidFill>
+              <a:schemeClr val="tx1"/>
+            </a:solidFill>
+          </a:ln>
+        </p:spPr>
+        <p:style>
+          <a:lnRef idx="2">
+            <a:schemeClr val="accent1">
+              <a:shade val="50000"/>
+            </a:schemeClr>
+          </a:lnRef>
+          <a:fillRef idx="1">
+            <a:schemeClr val="accent1"/>
+          </a:fillRef>
+          <a:effectRef idx="0">
+            <a:schemeClr val="accent1"/>
+          </a:effectRef>
+          <a:fontRef idx="minor">
+            <a:schemeClr val="lt1"/>
+          </a:fontRef>
+        </p:style>
+        <p:txBody>
+          <a:bodyPr rtlCol="0" anchor="ctr"/>
+          <a:lstStyle/>
+          <a:p>
+            <a:pPr algn="ctr"/>
+            <a:endParaRPr lang="en-US"/>
+          </a:p>
+        </p:txBody>
+      </p:sp>
+      <p:sp>
+        <p:nvSpPr>
+          <p:cNvPr id="14" name="TextBox 13"/>
+          <p:cNvSpPr txBox="1"/>
+          <p:nvPr/>
+        </p:nvSpPr>
+        <p:spPr>
+          <a:xfrm>
+            <a:off x="5964573" y="3100060"/>
+            <a:ext cx="1272168" cy="523220"/>
+          </a:xfrm>
+          <a:prstGeom prst="rect">
+            <a:avLst/>
+          </a:prstGeom>
+          <a:noFill/>
+        </p:spPr>
+        <p:txBody>
+          <a:bodyPr wrap="square" rtlCol="0">
+            <a:spAutoFit/>
+          </a:bodyPr>
+          <a:lstStyle/>
+          <a:p>
+            <a:pPr algn="ctr"/>
+            <a:r>
+              <a:rPr lang="en-US" sz="1400" dirty="0" smtClean="0"/>
+              <a:t>Split Point = 2.45</a:t>
+            </a:r>
+            <a:endParaRPr lang="en-US" sz="1400" dirty="0"/>
+          </a:p>
+        </p:txBody>
+      </p:sp>
+      <p:pic>
+        <p:nvPicPr>
+          <p:cNvPr id="24" name="Picture 23"/>
+          <p:cNvPicPr>
+            <a:picLocks noChangeAspect="1"/>
+          </p:cNvPicPr>
+          <p:nvPr/>
+        </p:nvPicPr>
+        <p:blipFill>
+          <a:blip r:embed="rId4">
+            <a:extLst>
+              <a:ext uri="{28A0092B-C50C-407E-A947-70E740481C1C}">
+                <a14:useLocalDpi xmlns:a14="http://schemas.microsoft.com/office/drawing/2010/main" val="0"/>
+              </a:ext>
+            </a:extLst>
+          </a:blip>
+          <a:stretch>
+            <a:fillRect/>
+          </a:stretch>
+        </p:blipFill>
+        <p:spPr>
           <a:xfrm>
             <a:off x="162397" y="122128"/>
-            <a:ext cx="10750766" cy="3703268"/>
-            <a:chOff x="162397" y="122128"/>
-            <a:chExt cx="10750766" cy="3703268"/>
-          </a:xfrm>
-        </p:grpSpPr>
-        <p:grpSp>
-          <p:nvGrpSpPr>
-            <p:cNvPr id="29" name="Group 28"/>
-            <p:cNvGrpSpPr/>
-            <p:nvPr/>
-          </p:nvGrpSpPr>
-          <p:grpSpPr>
-            <a:xfrm>
-              <a:off x="162397" y="122128"/>
-              <a:ext cx="10750766" cy="3501152"/>
-              <a:chOff x="162397" y="122128"/>
-              <a:chExt cx="10750766" cy="3501152"/>
-            </a:xfrm>
-          </p:grpSpPr>
-          <p:pic>
-            <p:nvPicPr>
-              <p:cNvPr id="15" name="Picture 14"/>
-              <p:cNvPicPr>
-                <a:picLocks noChangeAspect="1"/>
-              </p:cNvPicPr>
-              <p:nvPr/>
-            </p:nvPicPr>
-            <p:blipFill rotWithShape="1">
-              <a:blip r:embed="rId2">
-                <a:extLst>
-                  <a:ext uri="{28A0092B-C50C-407E-A947-70E740481C1C}">
-                    <a14:useLocalDpi xmlns:a14="http://schemas.microsoft.com/office/drawing/2010/main" val="0"/>
-                  </a:ext>
-                </a:extLst>
-              </a:blip>
-              <a:srcRect l="8616" r="6058" b="8519"/>
-              <a:stretch/>
-            </p:blipFill>
-            <p:spPr>
-              <a:xfrm>
-                <a:off x="4671389" y="590550"/>
-                <a:ext cx="6241774" cy="2509510"/>
-              </a:xfrm>
-              <a:prstGeom prst="rect">
-                <a:avLst/>
-              </a:prstGeom>
-            </p:spPr>
-          </p:pic>
-          <p:pic>
-            <p:nvPicPr>
-              <p:cNvPr id="4" name="Picture 3"/>
-              <p:cNvPicPr>
-                <a:picLocks noChangeAspect="1"/>
-              </p:cNvPicPr>
-              <p:nvPr/>
-            </p:nvPicPr>
-            <p:blipFill>
-              <a:blip r:embed="rId3">
-                <a:extLst>
-                  <a:ext uri="{28A0092B-C50C-407E-A947-70E740481C1C}">
-                    <a14:useLocalDpi xmlns:a14="http://schemas.microsoft.com/office/drawing/2010/main" val="0"/>
-                  </a:ext>
-                </a:extLst>
-              </a:blip>
-              <a:stretch>
-                <a:fillRect/>
-              </a:stretch>
-            </p:blipFill>
-            <p:spPr>
-              <a:xfrm>
-                <a:off x="514351" y="590550"/>
-                <a:ext cx="3805084" cy="2743200"/>
-              </a:xfrm>
-              <a:prstGeom prst="rect">
-                <a:avLst/>
-              </a:prstGeom>
-            </p:spPr>
-          </p:pic>
-          <p:sp>
-            <p:nvSpPr>
-              <p:cNvPr id="7" name="TextBox 6"/>
-              <p:cNvSpPr txBox="1"/>
-              <p:nvPr/>
-            </p:nvSpPr>
-            <p:spPr>
-              <a:xfrm>
-                <a:off x="5055702" y="2038350"/>
-                <a:ext cx="1333500" cy="646331"/>
-              </a:xfrm>
-              <a:prstGeom prst="rect">
-                <a:avLst/>
-              </a:prstGeom>
-              <a:noFill/>
-            </p:spPr>
-            <p:txBody>
-              <a:bodyPr wrap="square" rtlCol="0">
-                <a:spAutoFit/>
-              </a:bodyPr>
-              <a:lstStyle/>
-              <a:p>
-                <a:pPr algn="ctr"/>
-                <a:r>
-                  <a:rPr lang="en-US" dirty="0" smtClean="0"/>
-                  <a:t>Classified as </a:t>
-                </a:r>
-                <a:r>
-                  <a:rPr lang="en-US" dirty="0" err="1" smtClean="0"/>
-                  <a:t>Setosa</a:t>
-                </a:r>
-                <a:endParaRPr lang="en-US" dirty="0"/>
-              </a:p>
-            </p:txBody>
-          </p:sp>
-          <p:sp>
-            <p:nvSpPr>
-              <p:cNvPr id="8" name="TextBox 7"/>
-              <p:cNvSpPr txBox="1"/>
-              <p:nvPr/>
-            </p:nvSpPr>
-            <p:spPr>
-              <a:xfrm>
-                <a:off x="7236741" y="2038350"/>
-                <a:ext cx="2702389" cy="646331"/>
-              </a:xfrm>
-              <a:prstGeom prst="rect">
-                <a:avLst/>
-              </a:prstGeom>
-              <a:noFill/>
-            </p:spPr>
-            <p:txBody>
-              <a:bodyPr wrap="square" rtlCol="0">
-                <a:spAutoFit/>
-              </a:bodyPr>
-              <a:lstStyle/>
-              <a:p>
-                <a:pPr algn="ctr"/>
-                <a:r>
-                  <a:rPr lang="en-US" dirty="0" smtClean="0"/>
-                  <a:t>Classified as </a:t>
-                </a:r>
-              </a:p>
-              <a:p>
-                <a:pPr algn="ctr"/>
-                <a:r>
-                  <a:rPr lang="en-US" dirty="0" err="1" smtClean="0"/>
-                  <a:t>Virginica</a:t>
-                </a:r>
-                <a:endParaRPr lang="en-US" dirty="0"/>
-              </a:p>
-            </p:txBody>
-          </p:sp>
-          <p:sp>
-            <p:nvSpPr>
-              <p:cNvPr id="13" name="Triangle 12"/>
-              <p:cNvSpPr/>
-              <p:nvPr/>
-            </p:nvSpPr>
-            <p:spPr>
-              <a:xfrm flipH="1">
-                <a:off x="6510169" y="2838450"/>
-                <a:ext cx="180976" cy="247650"/>
-              </a:xfrm>
-              <a:prstGeom prst="triangle">
-                <a:avLst/>
-              </a:prstGeom>
-              <a:solidFill>
-                <a:schemeClr val="tx1"/>
-              </a:solidFill>
-              <a:ln w="50800">
-                <a:solidFill>
-                  <a:schemeClr val="tx1"/>
-                </a:solidFill>
-              </a:ln>
-            </p:spPr>
-            <p:style>
-              <a:lnRef idx="2">
-                <a:schemeClr val="accent1">
-                  <a:shade val="50000"/>
-                </a:schemeClr>
-              </a:lnRef>
-              <a:fillRef idx="1">
-                <a:schemeClr val="accent1"/>
-              </a:fillRef>
-              <a:effectRef idx="0">
-                <a:schemeClr val="accent1"/>
-              </a:effectRef>
-              <a:fontRef idx="minor">
-                <a:schemeClr val="lt1"/>
-              </a:fontRef>
-            </p:style>
-            <p:txBody>
-              <a:bodyPr rtlCol="0" anchor="ctr"/>
-              <a:lstStyle/>
-              <a:p>
-                <a:pPr algn="ctr"/>
-                <a:endParaRPr lang="en-US"/>
-              </a:p>
-            </p:txBody>
-          </p:sp>
-          <p:sp>
-            <p:nvSpPr>
-              <p:cNvPr id="14" name="TextBox 13"/>
-              <p:cNvSpPr txBox="1"/>
-              <p:nvPr/>
-            </p:nvSpPr>
-            <p:spPr>
-              <a:xfrm>
-                <a:off x="5964573" y="3100060"/>
-                <a:ext cx="1272168" cy="523220"/>
-              </a:xfrm>
-              <a:prstGeom prst="rect">
-                <a:avLst/>
-              </a:prstGeom>
-              <a:noFill/>
-            </p:spPr>
-            <p:txBody>
-              <a:bodyPr wrap="square" rtlCol="0">
-                <a:spAutoFit/>
-              </a:bodyPr>
-              <a:lstStyle/>
-              <a:p>
-                <a:pPr algn="ctr"/>
-                <a:r>
-                  <a:rPr lang="en-US" sz="1400" dirty="0" smtClean="0"/>
-                  <a:t>Split Point = 2.45</a:t>
-                </a:r>
-                <a:endParaRPr lang="en-US" sz="1400" dirty="0"/>
-              </a:p>
-            </p:txBody>
-          </p:sp>
-          <p:pic>
-            <p:nvPicPr>
-              <p:cNvPr id="24" name="Picture 23"/>
-              <p:cNvPicPr>
-                <a:picLocks noChangeAspect="1"/>
-              </p:cNvPicPr>
-              <p:nvPr/>
-            </p:nvPicPr>
-            <p:blipFill>
-              <a:blip r:embed="rId4">
-                <a:extLst>
-                  <a:ext uri="{28A0092B-C50C-407E-A947-70E740481C1C}">
-                    <a14:useLocalDpi xmlns:a14="http://schemas.microsoft.com/office/drawing/2010/main" val="0"/>
-                  </a:ext>
-                </a:extLst>
-              </a:blip>
-              <a:stretch>
-                <a:fillRect/>
-              </a:stretch>
-            </p:blipFill>
-            <p:spPr>
-              <a:xfrm>
-                <a:off x="162397" y="122128"/>
-                <a:ext cx="1034019" cy="1133856"/>
-              </a:xfrm>
-              <a:prstGeom prst="rect">
-                <a:avLst/>
-              </a:prstGeom>
-            </p:spPr>
-          </p:pic>
-          <p:pic>
-            <p:nvPicPr>
-              <p:cNvPr id="25" name="Picture 24"/>
-              <p:cNvPicPr>
-                <a:picLocks noChangeAspect="1"/>
-              </p:cNvPicPr>
-              <p:nvPr/>
-            </p:nvPicPr>
-            <p:blipFill>
-              <a:blip r:embed="rId5">
-                <a:extLst>
-                  <a:ext uri="{28A0092B-C50C-407E-A947-70E740481C1C}">
-                    <a14:useLocalDpi xmlns:a14="http://schemas.microsoft.com/office/drawing/2010/main" val="0"/>
-                  </a:ext>
-                </a:extLst>
-              </a:blip>
-              <a:stretch>
-                <a:fillRect/>
-              </a:stretch>
-            </p:blipFill>
-            <p:spPr>
-              <a:xfrm>
-                <a:off x="3995530" y="122128"/>
-                <a:ext cx="1034080" cy="1133922"/>
-              </a:xfrm>
-              <a:prstGeom prst="rect">
-                <a:avLst/>
-              </a:prstGeom>
-            </p:spPr>
-          </p:pic>
-        </p:grpSp>
-        <p:sp>
-          <p:nvSpPr>
-            <p:cNvPr id="11" name="TextBox 10"/>
-            <p:cNvSpPr txBox="1"/>
-            <p:nvPr/>
-          </p:nvSpPr>
-          <p:spPr>
-            <a:xfrm>
-              <a:off x="320466" y="3271398"/>
-              <a:ext cx="2095495" cy="553998"/>
-            </a:xfrm>
-            <a:prstGeom prst="rect">
-              <a:avLst/>
-            </a:prstGeom>
-            <a:noFill/>
-          </p:spPr>
-          <p:txBody>
-            <a:bodyPr wrap="square" rtlCol="0">
-              <a:spAutoFit/>
-            </a:bodyPr>
-            <a:lstStyle/>
-            <a:p>
-              <a:pPr algn="ctr"/>
-              <a:r>
-                <a:rPr lang="en-US" sz="1500" dirty="0" smtClean="0"/>
-                <a:t>Pure Node so no further splitting</a:t>
-              </a:r>
-              <a:endParaRPr lang="en-US" sz="1500" dirty="0"/>
-            </a:p>
-          </p:txBody>
-        </p:sp>
-        <p:sp>
-          <p:nvSpPr>
-            <p:cNvPr id="12" name="TextBox 11"/>
-            <p:cNvSpPr txBox="1"/>
-            <p:nvPr/>
-          </p:nvSpPr>
-          <p:spPr>
-            <a:xfrm>
-              <a:off x="2294693" y="3271398"/>
-              <a:ext cx="2095495" cy="553998"/>
-            </a:xfrm>
-            <a:prstGeom prst="rect">
-              <a:avLst/>
-            </a:prstGeom>
-            <a:noFill/>
-          </p:spPr>
-          <p:txBody>
-            <a:bodyPr wrap="square" rtlCol="0">
-              <a:spAutoFit/>
-            </a:bodyPr>
-            <a:lstStyle/>
-            <a:p>
-              <a:pPr algn="ctr"/>
-              <a:r>
-                <a:rPr lang="en-US" sz="1500" dirty="0" smtClean="0"/>
-                <a:t>Impure Node so can split further</a:t>
-              </a:r>
-              <a:endParaRPr lang="en-US" sz="1500" dirty="0"/>
-            </a:p>
-          </p:txBody>
-        </p:sp>
-      </p:grpSp>
+            <a:ext cx="1034019" cy="1133856"/>
+          </a:xfrm>
+          <a:prstGeom prst="rect">
+            <a:avLst/>
+          </a:prstGeom>
+        </p:spPr>
+      </p:pic>
+      <p:pic>
+        <p:nvPicPr>
+          <p:cNvPr id="25" name="Picture 24"/>
+          <p:cNvPicPr>
+            <a:picLocks noChangeAspect="1"/>
+          </p:cNvPicPr>
+          <p:nvPr/>
+        </p:nvPicPr>
+        <p:blipFill>
+          <a:blip r:embed="rId5">
+            <a:extLst>
+              <a:ext uri="{28A0092B-C50C-407E-A947-70E740481C1C}">
+                <a14:useLocalDpi xmlns:a14="http://schemas.microsoft.com/office/drawing/2010/main" val="0"/>
+              </a:ext>
+            </a:extLst>
+          </a:blip>
+          <a:stretch>
+            <a:fillRect/>
+          </a:stretch>
+        </p:blipFill>
+        <p:spPr>
+          <a:xfrm>
+            <a:off x="3995530" y="122128"/>
+            <a:ext cx="1034080" cy="1133922"/>
+          </a:xfrm>
+          <a:prstGeom prst="rect">
+            <a:avLst/>
+          </a:prstGeom>
+        </p:spPr>
+      </p:pic>
+      <p:sp>
+        <p:nvSpPr>
+          <p:cNvPr id="11" name="TextBox 10"/>
+          <p:cNvSpPr txBox="1"/>
+          <p:nvPr/>
+        </p:nvSpPr>
+        <p:spPr>
+          <a:xfrm>
+            <a:off x="320466" y="3271398"/>
+            <a:ext cx="2095495" cy="553998"/>
+          </a:xfrm>
+          <a:prstGeom prst="rect">
+            <a:avLst/>
+          </a:prstGeom>
+          <a:noFill/>
+        </p:spPr>
+        <p:txBody>
+          <a:bodyPr wrap="square" rtlCol="0">
+            <a:spAutoFit/>
+          </a:bodyPr>
+          <a:lstStyle/>
+          <a:p>
+            <a:pPr algn="ctr"/>
+            <a:r>
+              <a:rPr lang="en-US" sz="1500" dirty="0" smtClean="0"/>
+              <a:t>Pure Node so no further splitting</a:t>
+            </a:r>
+            <a:endParaRPr lang="en-US" sz="1500" dirty="0"/>
+          </a:p>
+        </p:txBody>
+      </p:sp>
+      <p:sp>
+        <p:nvSpPr>
+          <p:cNvPr id="12" name="TextBox 11"/>
+          <p:cNvSpPr txBox="1"/>
+          <p:nvPr/>
+        </p:nvSpPr>
+        <p:spPr>
+          <a:xfrm>
+            <a:off x="2294693" y="3271398"/>
+            <a:ext cx="2095495" cy="553998"/>
+          </a:xfrm>
+          <a:prstGeom prst="rect">
+            <a:avLst/>
+          </a:prstGeom>
+          <a:noFill/>
+        </p:spPr>
+        <p:txBody>
+          <a:bodyPr wrap="square" rtlCol="0">
+            <a:spAutoFit/>
+          </a:bodyPr>
+          <a:lstStyle/>
+          <a:p>
+            <a:pPr algn="ctr"/>
+            <a:r>
+              <a:rPr lang="en-US" sz="1500" dirty="0" smtClean="0"/>
+              <a:t>Impure Node so can split further</a:t>
+            </a:r>
+            <a:endParaRPr lang="en-US" sz="1500" dirty="0"/>
+          </a:p>
+        </p:txBody>
+      </p:sp>
     </p:spTree>
     <p:extLst>
       <p:ext uri="{BB962C8B-B14F-4D97-AF65-F5344CB8AC3E}">
@@ -8209,427 +7503,412 @@
           </p:spPr>
         </p:pic>
       </p:grpSp>
-      <p:grpSp>
-        <p:nvGrpSpPr>
-          <p:cNvPr id="4" name="Group 3"/>
-          <p:cNvGrpSpPr/>
+      <p:pic>
+        <p:nvPicPr>
+          <p:cNvPr id="63" name="Picture 62"/>
+          <p:cNvPicPr>
+            <a:picLocks noChangeAspect="1"/>
+          </p:cNvPicPr>
           <p:nvPr/>
-        </p:nvGrpSpPr>
-        <p:grpSpPr>
-          <a:xfrm>
-            <a:off x="162397" y="122128"/>
-            <a:ext cx="11816962" cy="5511229"/>
-            <a:chOff x="162397" y="122128"/>
-            <a:chExt cx="11816962" cy="5511229"/>
-          </a:xfrm>
-        </p:grpSpPr>
-        <p:pic>
-          <p:nvPicPr>
-            <p:cNvPr id="63" name="Picture 62"/>
-            <p:cNvPicPr>
-              <a:picLocks noChangeAspect="1"/>
-            </p:cNvPicPr>
-            <p:nvPr/>
-          </p:nvPicPr>
-          <p:blipFill rotWithShape="1">
-            <a:blip r:embed="rId7">
-              <a:extLst>
-                <a:ext uri="{28A0092B-C50C-407E-A947-70E740481C1C}">
-                  <a14:useLocalDpi xmlns:a14="http://schemas.microsoft.com/office/drawing/2010/main" val="0"/>
-                </a:ext>
-              </a:extLst>
-            </a:blip>
-            <a:srcRect l="11738" r="9191"/>
-            <a:stretch/>
-          </p:blipFill>
-          <p:spPr>
-            <a:xfrm>
-              <a:off x="6195196" y="590550"/>
-              <a:ext cx="5784163" cy="2743200"/>
-            </a:xfrm>
-            <a:prstGeom prst="rect">
-              <a:avLst/>
-            </a:prstGeom>
-          </p:spPr>
-        </p:pic>
-        <p:pic>
-          <p:nvPicPr>
-            <p:cNvPr id="2" name="Picture 1"/>
-            <p:cNvPicPr>
-              <a:picLocks noChangeAspect="1"/>
-            </p:cNvPicPr>
-            <p:nvPr/>
-          </p:nvPicPr>
-          <p:blipFill>
-            <a:blip r:embed="rId8">
-              <a:alphaModFix amt="30000"/>
-              <a:extLst>
-                <a:ext uri="{28A0092B-C50C-407E-A947-70E740481C1C}">
-                  <a14:useLocalDpi xmlns:a14="http://schemas.microsoft.com/office/drawing/2010/main" val="0"/>
-                </a:ext>
-              </a:extLst>
-            </a:blip>
-            <a:stretch>
-              <a:fillRect/>
-            </a:stretch>
-          </p:blipFill>
-          <p:spPr>
-            <a:xfrm>
-              <a:off x="514351" y="590550"/>
-              <a:ext cx="5029200" cy="4442756"/>
-            </a:xfrm>
-            <a:prstGeom prst="rect">
-              <a:avLst/>
-            </a:prstGeom>
-          </p:spPr>
-        </p:pic>
-        <p:sp>
-          <p:nvSpPr>
-            <p:cNvPr id="7" name="TextBox 6"/>
-            <p:cNvSpPr txBox="1"/>
-            <p:nvPr/>
-          </p:nvSpPr>
-          <p:spPr>
-            <a:xfrm>
-              <a:off x="6651991" y="2038350"/>
-              <a:ext cx="2095495" cy="646331"/>
-            </a:xfrm>
-            <a:prstGeom prst="rect">
-              <a:avLst/>
-            </a:prstGeom>
-            <a:noFill/>
-          </p:spPr>
-          <p:txBody>
-            <a:bodyPr wrap="square" rtlCol="0">
-              <a:spAutoFit/>
-            </a:bodyPr>
-            <a:lstStyle/>
-            <a:p>
-              <a:pPr algn="ctr"/>
-              <a:r>
-                <a:rPr lang="en-US" dirty="0" smtClean="0"/>
-                <a:t>Classified as Versicolor</a:t>
-              </a:r>
-              <a:endParaRPr lang="en-US" dirty="0"/>
-            </a:p>
-          </p:txBody>
-        </p:sp>
-        <p:sp>
-          <p:nvSpPr>
-            <p:cNvPr id="8" name="TextBox 7"/>
-            <p:cNvSpPr txBox="1"/>
-            <p:nvPr/>
-          </p:nvSpPr>
-          <p:spPr>
-            <a:xfrm>
-              <a:off x="9276970" y="2038350"/>
-              <a:ext cx="2702389" cy="646331"/>
-            </a:xfrm>
-            <a:prstGeom prst="rect">
-              <a:avLst/>
-            </a:prstGeom>
-            <a:noFill/>
-          </p:spPr>
-          <p:txBody>
-            <a:bodyPr wrap="square" rtlCol="0">
-              <a:spAutoFit/>
-            </a:bodyPr>
-            <a:lstStyle/>
-            <a:p>
-              <a:pPr algn="ctr"/>
-              <a:r>
-                <a:rPr lang="en-US" dirty="0" smtClean="0"/>
-                <a:t>Classified as </a:t>
-              </a:r>
-            </a:p>
-            <a:p>
-              <a:pPr algn="ctr"/>
-              <a:r>
-                <a:rPr lang="en-US" dirty="0" err="1" smtClean="0"/>
-                <a:t>Virginica</a:t>
-              </a:r>
-              <a:endParaRPr lang="en-US" dirty="0"/>
-            </a:p>
-          </p:txBody>
-        </p:sp>
-        <p:sp>
-          <p:nvSpPr>
-            <p:cNvPr id="13" name="Triangle 12"/>
-            <p:cNvSpPr/>
-            <p:nvPr/>
-          </p:nvSpPr>
-          <p:spPr>
-            <a:xfrm flipH="1">
-              <a:off x="9121332" y="2838450"/>
-              <a:ext cx="180976" cy="247650"/>
-            </a:xfrm>
-            <a:prstGeom prst="triangle">
-              <a:avLst/>
-            </a:prstGeom>
+        </p:nvPicPr>
+        <p:blipFill rotWithShape="1">
+          <a:blip r:embed="rId7">
+            <a:extLst>
+              <a:ext uri="{28A0092B-C50C-407E-A947-70E740481C1C}">
+                <a14:useLocalDpi xmlns:a14="http://schemas.microsoft.com/office/drawing/2010/main" val="0"/>
+              </a:ext>
+            </a:extLst>
+          </a:blip>
+          <a:srcRect l="11738" r="9191"/>
+          <a:stretch/>
+        </p:blipFill>
+        <p:spPr>
+          <a:xfrm>
+            <a:off x="6195196" y="590550"/>
+            <a:ext cx="5784163" cy="2743200"/>
+          </a:xfrm>
+          <a:prstGeom prst="rect">
+            <a:avLst/>
+          </a:prstGeom>
+        </p:spPr>
+      </p:pic>
+      <p:pic>
+        <p:nvPicPr>
+          <p:cNvPr id="2" name="Picture 1"/>
+          <p:cNvPicPr>
+            <a:picLocks noChangeAspect="1"/>
+          </p:cNvPicPr>
+          <p:nvPr/>
+        </p:nvPicPr>
+        <p:blipFill>
+          <a:blip r:embed="rId8">
+            <a:alphaModFix amt="30000"/>
+            <a:extLst>
+              <a:ext uri="{28A0092B-C50C-407E-A947-70E740481C1C}">
+                <a14:useLocalDpi xmlns:a14="http://schemas.microsoft.com/office/drawing/2010/main" val="0"/>
+              </a:ext>
+            </a:extLst>
+          </a:blip>
+          <a:stretch>
+            <a:fillRect/>
+          </a:stretch>
+        </p:blipFill>
+        <p:spPr>
+          <a:xfrm>
+            <a:off x="514351" y="590550"/>
+            <a:ext cx="5029200" cy="4442756"/>
+          </a:xfrm>
+          <a:prstGeom prst="rect">
+            <a:avLst/>
+          </a:prstGeom>
+        </p:spPr>
+      </p:pic>
+      <p:sp>
+        <p:nvSpPr>
+          <p:cNvPr id="7" name="TextBox 6"/>
+          <p:cNvSpPr txBox="1"/>
+          <p:nvPr/>
+        </p:nvSpPr>
+        <p:spPr>
+          <a:xfrm>
+            <a:off x="6651991" y="2038350"/>
+            <a:ext cx="2095495" cy="646331"/>
+          </a:xfrm>
+          <a:prstGeom prst="rect">
+            <a:avLst/>
+          </a:prstGeom>
+          <a:noFill/>
+        </p:spPr>
+        <p:txBody>
+          <a:bodyPr wrap="square" rtlCol="0">
+            <a:spAutoFit/>
+          </a:bodyPr>
+          <a:lstStyle/>
+          <a:p>
+            <a:pPr algn="ctr"/>
+            <a:r>
+              <a:rPr lang="en-US" dirty="0" smtClean="0"/>
+              <a:t>Classified as Versicolor</a:t>
+            </a:r>
+            <a:endParaRPr lang="en-US" dirty="0"/>
+          </a:p>
+        </p:txBody>
+      </p:sp>
+      <p:sp>
+        <p:nvSpPr>
+          <p:cNvPr id="8" name="TextBox 7"/>
+          <p:cNvSpPr txBox="1"/>
+          <p:nvPr/>
+        </p:nvSpPr>
+        <p:spPr>
+          <a:xfrm>
+            <a:off x="9276970" y="2038350"/>
+            <a:ext cx="2702389" cy="646331"/>
+          </a:xfrm>
+          <a:prstGeom prst="rect">
+            <a:avLst/>
+          </a:prstGeom>
+          <a:noFill/>
+        </p:spPr>
+        <p:txBody>
+          <a:bodyPr wrap="square" rtlCol="0">
+            <a:spAutoFit/>
+          </a:bodyPr>
+          <a:lstStyle/>
+          <a:p>
+            <a:pPr algn="ctr"/>
+            <a:r>
+              <a:rPr lang="en-US" dirty="0" smtClean="0"/>
+              <a:t>Classified as </a:t>
+            </a:r>
+          </a:p>
+          <a:p>
+            <a:pPr algn="ctr"/>
+            <a:r>
+              <a:rPr lang="en-US" dirty="0" err="1" smtClean="0"/>
+              <a:t>Virginica</a:t>
+            </a:r>
+            <a:endParaRPr lang="en-US" dirty="0"/>
+          </a:p>
+        </p:txBody>
+      </p:sp>
+      <p:sp>
+        <p:nvSpPr>
+          <p:cNvPr id="13" name="Triangle 12"/>
+          <p:cNvSpPr/>
+          <p:nvPr/>
+        </p:nvSpPr>
+        <p:spPr>
+          <a:xfrm flipH="1">
+            <a:off x="9121332" y="2838450"/>
+            <a:ext cx="180976" cy="247650"/>
+          </a:xfrm>
+          <a:prstGeom prst="triangle">
+            <a:avLst/>
+          </a:prstGeom>
+          <a:solidFill>
+            <a:schemeClr val="tx1"/>
+          </a:solidFill>
+          <a:ln w="50800">
             <a:solidFill>
               <a:schemeClr val="tx1"/>
             </a:solidFill>
-            <a:ln w="50800">
-              <a:solidFill>
-                <a:schemeClr val="tx1"/>
-              </a:solidFill>
-            </a:ln>
-          </p:spPr>
-          <p:style>
-            <a:lnRef idx="2">
-              <a:schemeClr val="accent1">
-                <a:shade val="50000"/>
-              </a:schemeClr>
-            </a:lnRef>
-            <a:fillRef idx="1">
-              <a:schemeClr val="accent1"/>
-            </a:fillRef>
-            <a:effectRef idx="0">
-              <a:schemeClr val="accent1"/>
-            </a:effectRef>
-            <a:fontRef idx="minor">
-              <a:schemeClr val="lt1"/>
-            </a:fontRef>
-          </p:style>
-          <p:txBody>
-            <a:bodyPr rtlCol="0" anchor="ctr"/>
-            <a:lstStyle/>
-            <a:p>
-              <a:pPr algn="ctr"/>
-              <a:endParaRPr lang="en-US"/>
-            </a:p>
-          </p:txBody>
-        </p:sp>
-        <p:sp>
-          <p:nvSpPr>
-            <p:cNvPr id="14" name="TextBox 13"/>
-            <p:cNvSpPr txBox="1"/>
-            <p:nvPr/>
-          </p:nvSpPr>
-          <p:spPr>
-            <a:xfrm>
-              <a:off x="8575736" y="3100060"/>
-              <a:ext cx="1272168" cy="523220"/>
-            </a:xfrm>
-            <a:prstGeom prst="rect">
-              <a:avLst/>
-            </a:prstGeom>
-            <a:noFill/>
-          </p:spPr>
-          <p:txBody>
-            <a:bodyPr wrap="square" rtlCol="0">
-              <a:spAutoFit/>
-            </a:bodyPr>
-            <a:lstStyle/>
-            <a:p>
-              <a:pPr algn="ctr"/>
-              <a:r>
-                <a:rPr lang="en-US" sz="1400" dirty="0" smtClean="0"/>
-                <a:t>Split Point = 4.95</a:t>
-              </a:r>
-              <a:endParaRPr lang="en-US" sz="1400" dirty="0"/>
-            </a:p>
-          </p:txBody>
-        </p:sp>
-        <p:pic>
-          <p:nvPicPr>
-            <p:cNvPr id="24" name="Picture 23"/>
-            <p:cNvPicPr>
-              <a:picLocks noChangeAspect="1"/>
-            </p:cNvPicPr>
-            <p:nvPr/>
-          </p:nvPicPr>
-          <p:blipFill>
-            <a:blip r:embed="rId5">
-              <a:extLst>
-                <a:ext uri="{28A0092B-C50C-407E-A947-70E740481C1C}">
-                  <a14:useLocalDpi xmlns:a14="http://schemas.microsoft.com/office/drawing/2010/main" val="0"/>
-                </a:ext>
-              </a:extLst>
-            </a:blip>
-            <a:stretch>
-              <a:fillRect/>
-            </a:stretch>
-          </p:blipFill>
-          <p:spPr>
-            <a:xfrm>
-              <a:off x="162397" y="122128"/>
-              <a:ext cx="1034019" cy="1133856"/>
-            </a:xfrm>
-            <a:prstGeom prst="rect">
-              <a:avLst/>
-            </a:prstGeom>
-          </p:spPr>
-        </p:pic>
-        <p:pic>
-          <p:nvPicPr>
-            <p:cNvPr id="25" name="Picture 24"/>
-            <p:cNvPicPr>
-              <a:picLocks noChangeAspect="1"/>
-            </p:cNvPicPr>
-            <p:nvPr/>
-          </p:nvPicPr>
-          <p:blipFill>
-            <a:blip r:embed="rId6">
-              <a:extLst>
-                <a:ext uri="{28A0092B-C50C-407E-A947-70E740481C1C}">
-                  <a14:useLocalDpi xmlns:a14="http://schemas.microsoft.com/office/drawing/2010/main" val="0"/>
-                </a:ext>
-              </a:extLst>
-            </a:blip>
-            <a:stretch>
-              <a:fillRect/>
-            </a:stretch>
-          </p:blipFill>
-          <p:spPr>
-            <a:xfrm>
-              <a:off x="5161117" y="122128"/>
-              <a:ext cx="1034080" cy="1133922"/>
-            </a:xfrm>
-            <a:prstGeom prst="rect">
-              <a:avLst/>
-            </a:prstGeom>
-          </p:spPr>
-        </p:pic>
-        <p:pic>
-          <p:nvPicPr>
-            <p:cNvPr id="57" name="Picture 56"/>
-            <p:cNvPicPr>
-              <a:picLocks noChangeAspect="1"/>
-            </p:cNvPicPr>
-            <p:nvPr/>
-          </p:nvPicPr>
-          <p:blipFill rotWithShape="1">
-            <a:blip r:embed="rId8">
-              <a:alphaModFix/>
-              <a:extLst>
-                <a:ext uri="{28A0092B-C50C-407E-A947-70E740481C1C}">
-                  <a14:useLocalDpi xmlns:a14="http://schemas.microsoft.com/office/drawing/2010/main" val="0"/>
-                </a:ext>
-              </a:extLst>
-            </a:blip>
-            <a:srcRect l="24513" t="35957"/>
-            <a:stretch/>
-          </p:blipFill>
-          <p:spPr>
-            <a:xfrm>
-              <a:off x="1715242" y="2188029"/>
-              <a:ext cx="3796394" cy="2845277"/>
-            </a:xfrm>
-            <a:prstGeom prst="rect">
-              <a:avLst/>
-            </a:prstGeom>
-          </p:spPr>
-        </p:pic>
-        <p:sp>
-          <p:nvSpPr>
-            <p:cNvPr id="60" name="TextBox 59"/>
-            <p:cNvSpPr txBox="1"/>
-            <p:nvPr/>
-          </p:nvSpPr>
-          <p:spPr>
-            <a:xfrm>
-              <a:off x="1597807" y="4946036"/>
-              <a:ext cx="2095495" cy="553998"/>
-            </a:xfrm>
-            <a:prstGeom prst="rect">
-              <a:avLst/>
-            </a:prstGeom>
-            <a:noFill/>
-          </p:spPr>
-          <p:txBody>
-            <a:bodyPr wrap="square" rtlCol="0">
-              <a:spAutoFit/>
-            </a:bodyPr>
-            <a:lstStyle/>
-            <a:p>
-              <a:pPr algn="ctr"/>
-              <a:r>
-                <a:rPr lang="en-US" sz="1500" dirty="0" smtClean="0"/>
-                <a:t>Impure Node so can split further</a:t>
-              </a:r>
-              <a:endParaRPr lang="en-US" sz="1500" dirty="0"/>
-            </a:p>
-          </p:txBody>
-        </p:sp>
-        <p:sp>
-          <p:nvSpPr>
-            <p:cNvPr id="61" name="TextBox 60"/>
-            <p:cNvSpPr txBox="1"/>
-            <p:nvPr/>
-          </p:nvSpPr>
-          <p:spPr>
-            <a:xfrm>
-              <a:off x="3572079" y="4946036"/>
-              <a:ext cx="2095495" cy="553998"/>
-            </a:xfrm>
-            <a:prstGeom prst="rect">
-              <a:avLst/>
-            </a:prstGeom>
-            <a:noFill/>
-          </p:spPr>
-          <p:txBody>
-            <a:bodyPr wrap="square" rtlCol="0">
-              <a:spAutoFit/>
-            </a:bodyPr>
-            <a:lstStyle/>
-            <a:p>
-              <a:pPr algn="ctr"/>
-              <a:r>
-                <a:rPr lang="en-US" sz="1500" dirty="0" smtClean="0"/>
-                <a:t>Impure Node so can split further</a:t>
-              </a:r>
-              <a:endParaRPr lang="en-US" sz="1500" dirty="0"/>
-            </a:p>
-          </p:txBody>
-        </p:sp>
-        <p:sp>
-          <p:nvSpPr>
-            <p:cNvPr id="10" name="Rectangle 9"/>
-            <p:cNvSpPr/>
-            <p:nvPr/>
-          </p:nvSpPr>
-          <p:spPr>
-            <a:xfrm>
-              <a:off x="1714499" y="2188029"/>
-              <a:ext cx="3890270" cy="3445328"/>
-            </a:xfrm>
-            <a:prstGeom prst="rect">
-              <a:avLst/>
-            </a:prstGeom>
-            <a:noFill/>
-            <a:ln w="12700">
-              <a:solidFill>
-                <a:schemeClr val="tx1"/>
-              </a:solidFill>
-            </a:ln>
-          </p:spPr>
-          <p:style>
-            <a:lnRef idx="2">
-              <a:schemeClr val="accent1">
-                <a:shade val="50000"/>
-              </a:schemeClr>
-            </a:lnRef>
-            <a:fillRef idx="1">
-              <a:schemeClr val="accent1"/>
-            </a:fillRef>
-            <a:effectRef idx="0">
-              <a:schemeClr val="accent1"/>
-            </a:effectRef>
-            <a:fontRef idx="minor">
-              <a:schemeClr val="lt1"/>
-            </a:fontRef>
-          </p:style>
-          <p:txBody>
-            <a:bodyPr rtlCol="0" anchor="ctr"/>
-            <a:lstStyle/>
-            <a:p>
-              <a:pPr algn="ctr"/>
-              <a:endParaRPr lang="en-US"/>
-            </a:p>
-          </p:txBody>
-        </p:sp>
-      </p:grpSp>
+          </a:ln>
+        </p:spPr>
+        <p:style>
+          <a:lnRef idx="2">
+            <a:schemeClr val="accent1">
+              <a:shade val="50000"/>
+            </a:schemeClr>
+          </a:lnRef>
+          <a:fillRef idx="1">
+            <a:schemeClr val="accent1"/>
+          </a:fillRef>
+          <a:effectRef idx="0">
+            <a:schemeClr val="accent1"/>
+          </a:effectRef>
+          <a:fontRef idx="minor">
+            <a:schemeClr val="lt1"/>
+          </a:fontRef>
+        </p:style>
+        <p:txBody>
+          <a:bodyPr rtlCol="0" anchor="ctr"/>
+          <a:lstStyle/>
+          <a:p>
+            <a:pPr algn="ctr"/>
+            <a:endParaRPr lang="en-US"/>
+          </a:p>
+        </p:txBody>
+      </p:sp>
+      <p:sp>
+        <p:nvSpPr>
+          <p:cNvPr id="14" name="TextBox 13"/>
+          <p:cNvSpPr txBox="1"/>
+          <p:nvPr/>
+        </p:nvSpPr>
+        <p:spPr>
+          <a:xfrm>
+            <a:off x="8575736" y="3100060"/>
+            <a:ext cx="1272168" cy="523220"/>
+          </a:xfrm>
+          <a:prstGeom prst="rect">
+            <a:avLst/>
+          </a:prstGeom>
+          <a:noFill/>
+        </p:spPr>
+        <p:txBody>
+          <a:bodyPr wrap="square" rtlCol="0">
+            <a:spAutoFit/>
+          </a:bodyPr>
+          <a:lstStyle/>
+          <a:p>
+            <a:pPr algn="ctr"/>
+            <a:r>
+              <a:rPr lang="en-US" sz="1400" dirty="0" smtClean="0"/>
+              <a:t>Split Point = 4.95</a:t>
+            </a:r>
+            <a:endParaRPr lang="en-US" sz="1400" dirty="0"/>
+          </a:p>
+        </p:txBody>
+      </p:sp>
+      <p:pic>
+        <p:nvPicPr>
+          <p:cNvPr id="24" name="Picture 23"/>
+          <p:cNvPicPr>
+            <a:picLocks noChangeAspect="1"/>
+          </p:cNvPicPr>
+          <p:nvPr/>
+        </p:nvPicPr>
+        <p:blipFill>
+          <a:blip r:embed="rId5">
+            <a:extLst>
+              <a:ext uri="{28A0092B-C50C-407E-A947-70E740481C1C}">
+                <a14:useLocalDpi xmlns:a14="http://schemas.microsoft.com/office/drawing/2010/main" val="0"/>
+              </a:ext>
+            </a:extLst>
+          </a:blip>
+          <a:stretch>
+            <a:fillRect/>
+          </a:stretch>
+        </p:blipFill>
+        <p:spPr>
+          <a:xfrm>
+            <a:off x="162397" y="122128"/>
+            <a:ext cx="1034019" cy="1133856"/>
+          </a:xfrm>
+          <a:prstGeom prst="rect">
+            <a:avLst/>
+          </a:prstGeom>
+        </p:spPr>
+      </p:pic>
+      <p:pic>
+        <p:nvPicPr>
+          <p:cNvPr id="25" name="Picture 24"/>
+          <p:cNvPicPr>
+            <a:picLocks noChangeAspect="1"/>
+          </p:cNvPicPr>
+          <p:nvPr/>
+        </p:nvPicPr>
+        <p:blipFill>
+          <a:blip r:embed="rId6">
+            <a:extLst>
+              <a:ext uri="{28A0092B-C50C-407E-A947-70E740481C1C}">
+                <a14:useLocalDpi xmlns:a14="http://schemas.microsoft.com/office/drawing/2010/main" val="0"/>
+              </a:ext>
+            </a:extLst>
+          </a:blip>
+          <a:stretch>
+            <a:fillRect/>
+          </a:stretch>
+        </p:blipFill>
+        <p:spPr>
+          <a:xfrm>
+            <a:off x="5161117" y="122128"/>
+            <a:ext cx="1034080" cy="1133922"/>
+          </a:xfrm>
+          <a:prstGeom prst="rect">
+            <a:avLst/>
+          </a:prstGeom>
+        </p:spPr>
+      </p:pic>
+      <p:pic>
+        <p:nvPicPr>
+          <p:cNvPr id="57" name="Picture 56"/>
+          <p:cNvPicPr>
+            <a:picLocks noChangeAspect="1"/>
+          </p:cNvPicPr>
+          <p:nvPr/>
+        </p:nvPicPr>
+        <p:blipFill rotWithShape="1">
+          <a:blip r:embed="rId8">
+            <a:alphaModFix/>
+            <a:extLst>
+              <a:ext uri="{28A0092B-C50C-407E-A947-70E740481C1C}">
+                <a14:useLocalDpi xmlns:a14="http://schemas.microsoft.com/office/drawing/2010/main" val="0"/>
+              </a:ext>
+            </a:extLst>
+          </a:blip>
+          <a:srcRect l="24513" t="35957"/>
+          <a:stretch/>
+        </p:blipFill>
+        <p:spPr>
+          <a:xfrm>
+            <a:off x="1715242" y="2188029"/>
+            <a:ext cx="3796394" cy="2845277"/>
+          </a:xfrm>
+          <a:prstGeom prst="rect">
+            <a:avLst/>
+          </a:prstGeom>
+        </p:spPr>
+      </p:pic>
+      <p:sp>
+        <p:nvSpPr>
+          <p:cNvPr id="60" name="TextBox 59"/>
+          <p:cNvSpPr txBox="1"/>
+          <p:nvPr/>
+        </p:nvSpPr>
+        <p:spPr>
+          <a:xfrm>
+            <a:off x="1597807" y="4946036"/>
+            <a:ext cx="2095495" cy="553998"/>
+          </a:xfrm>
+          <a:prstGeom prst="rect">
+            <a:avLst/>
+          </a:prstGeom>
+          <a:noFill/>
+        </p:spPr>
+        <p:txBody>
+          <a:bodyPr wrap="square" rtlCol="0">
+            <a:spAutoFit/>
+          </a:bodyPr>
+          <a:lstStyle/>
+          <a:p>
+            <a:pPr algn="ctr"/>
+            <a:r>
+              <a:rPr lang="en-US" sz="1500" dirty="0" smtClean="0"/>
+              <a:t>Impure Node so can split further</a:t>
+            </a:r>
+            <a:endParaRPr lang="en-US" sz="1500" dirty="0"/>
+          </a:p>
+        </p:txBody>
+      </p:sp>
+      <p:sp>
+        <p:nvSpPr>
+          <p:cNvPr id="61" name="TextBox 60"/>
+          <p:cNvSpPr txBox="1"/>
+          <p:nvPr/>
+        </p:nvSpPr>
+        <p:spPr>
+          <a:xfrm>
+            <a:off x="3572079" y="4946036"/>
+            <a:ext cx="2095495" cy="553998"/>
+          </a:xfrm>
+          <a:prstGeom prst="rect">
+            <a:avLst/>
+          </a:prstGeom>
+          <a:noFill/>
+        </p:spPr>
+        <p:txBody>
+          <a:bodyPr wrap="square" rtlCol="0">
+            <a:spAutoFit/>
+          </a:bodyPr>
+          <a:lstStyle/>
+          <a:p>
+            <a:pPr algn="ctr"/>
+            <a:r>
+              <a:rPr lang="en-US" sz="1500" dirty="0" smtClean="0"/>
+              <a:t>Impure Node so can split further</a:t>
+            </a:r>
+            <a:endParaRPr lang="en-US" sz="1500" dirty="0"/>
+          </a:p>
+        </p:txBody>
+      </p:sp>
+      <p:sp>
+        <p:nvSpPr>
+          <p:cNvPr id="10" name="Rectangle 9"/>
+          <p:cNvSpPr/>
+          <p:nvPr/>
+        </p:nvSpPr>
+        <p:spPr>
+          <a:xfrm>
+            <a:off x="1714499" y="2188029"/>
+            <a:ext cx="3890270" cy="3445328"/>
+          </a:xfrm>
+          <a:prstGeom prst="rect">
+            <a:avLst/>
+          </a:prstGeom>
+          <a:noFill/>
+          <a:ln w="12700">
+            <a:solidFill>
+              <a:schemeClr val="tx1"/>
+            </a:solidFill>
+          </a:ln>
+        </p:spPr>
+        <p:style>
+          <a:lnRef idx="2">
+            <a:schemeClr val="accent1">
+              <a:shade val="50000"/>
+            </a:schemeClr>
+          </a:lnRef>
+          <a:fillRef idx="1">
+            <a:schemeClr val="accent1"/>
+          </a:fillRef>
+          <a:effectRef idx="0">
+            <a:schemeClr val="accent1"/>
+          </a:effectRef>
+          <a:fontRef idx="minor">
+            <a:schemeClr val="lt1"/>
+          </a:fontRef>
+        </p:style>
+        <p:txBody>
+          <a:bodyPr rtlCol="0" anchor="ctr"/>
+          <a:lstStyle/>
+          <a:p>
+            <a:pPr algn="ctr"/>
+            <a:endParaRPr lang="en-US"/>
+          </a:p>
+        </p:txBody>
+      </p:sp>
     </p:spTree>
     <p:extLst>
       <p:ext uri="{BB962C8B-B14F-4D97-AF65-F5344CB8AC3E}">
@@ -8667,10 +7946,686 @@
           <a:chExt cx="0" cy="0"/>
         </a:xfrm>
       </p:grpSpPr>
+      <p:pic>
+        <p:nvPicPr>
+          <p:cNvPr id="10" name="Picture 9"/>
+          <p:cNvPicPr>
+            <a:picLocks noChangeAspect="1"/>
+          </p:cNvPicPr>
+          <p:nvPr/>
+        </p:nvPicPr>
+        <p:blipFill rotWithShape="1">
+          <a:blip r:embed="rId2">
+            <a:extLst>
+              <a:ext uri="{28A0092B-C50C-407E-A947-70E740481C1C}">
+                <a14:useLocalDpi xmlns:a14="http://schemas.microsoft.com/office/drawing/2010/main" val="0"/>
+              </a:ext>
+            </a:extLst>
+          </a:blip>
+          <a:srcRect l="68876"/>
+          <a:stretch/>
+        </p:blipFill>
+        <p:spPr>
+          <a:xfrm>
+            <a:off x="3731772" y="10466017"/>
+            <a:ext cx="738954" cy="791423"/>
+          </a:xfrm>
+          <a:prstGeom prst="rect">
+            <a:avLst/>
+          </a:prstGeom>
+        </p:spPr>
+      </p:pic>
+      <p:pic>
+        <p:nvPicPr>
+          <p:cNvPr id="12" name="Picture 11"/>
+          <p:cNvPicPr>
+            <a:picLocks noChangeAspect="1"/>
+          </p:cNvPicPr>
+          <p:nvPr/>
+        </p:nvPicPr>
+        <p:blipFill rotWithShape="1">
+          <a:blip r:embed="rId2">
+            <a:extLst>
+              <a:ext uri="{28A0092B-C50C-407E-A947-70E740481C1C}">
+                <a14:useLocalDpi xmlns:a14="http://schemas.microsoft.com/office/drawing/2010/main" val="0"/>
+              </a:ext>
+            </a:extLst>
+          </a:blip>
+          <a:srcRect r="68876"/>
+          <a:stretch/>
+        </p:blipFill>
+        <p:spPr>
+          <a:xfrm>
+            <a:off x="2066198" y="10466018"/>
+            <a:ext cx="738954" cy="791423"/>
+          </a:xfrm>
+          <a:prstGeom prst="rect">
+            <a:avLst/>
+          </a:prstGeom>
+        </p:spPr>
+      </p:pic>
+      <p:sp>
+        <p:nvSpPr>
+          <p:cNvPr id="14" name="Rectangle 13"/>
+          <p:cNvSpPr/>
+          <p:nvPr/>
+        </p:nvSpPr>
+        <p:spPr>
+          <a:xfrm>
+            <a:off x="-1384395" y="11413525"/>
+            <a:ext cx="8209188" cy="769441"/>
+          </a:xfrm>
+          <a:prstGeom prst="rect">
+            <a:avLst/>
+          </a:prstGeom>
+        </p:spPr>
+        <p:txBody>
+          <a:bodyPr wrap="square">
+            <a:spAutoFit/>
+          </a:bodyPr>
+          <a:lstStyle/>
+          <a:p>
+            <a:pPr algn="ctr"/>
+            <a:r>
+              <a:rPr lang="en-US" sz="2200" dirty="0" smtClean="0"/>
+              <a:t>Species counts are: </a:t>
+            </a:r>
+            <a:r>
+              <a:rPr lang="en-US" sz="2200" dirty="0" err="1" smtClean="0"/>
+              <a:t>setosa</a:t>
+            </a:r>
+            <a:r>
+              <a:rPr lang="en-US" sz="2200" dirty="0" smtClean="0"/>
+              <a:t>=0, versicolor=38, </a:t>
+            </a:r>
+            <a:r>
+              <a:rPr lang="en-US" sz="2200" dirty="0" err="1" smtClean="0"/>
+              <a:t>virginica</a:t>
+            </a:r>
+            <a:r>
+              <a:rPr lang="en-US" sz="2200" dirty="0" smtClean="0"/>
+              <a:t>=3</a:t>
+            </a:r>
+          </a:p>
+          <a:p>
+            <a:pPr algn="ctr"/>
+            <a:r>
+              <a:rPr lang="en-US" sz="2200" dirty="0" smtClean="0"/>
+              <a:t>Prediction is </a:t>
+            </a:r>
+            <a:r>
+              <a:rPr lang="en-US" sz="2200" b="1" dirty="0" smtClean="0"/>
+              <a:t>versicolor</a:t>
+            </a:r>
+            <a:r>
+              <a:rPr lang="en-US" sz="2200" dirty="0" smtClean="0"/>
+              <a:t> as it is the majority class</a:t>
+            </a:r>
+          </a:p>
+        </p:txBody>
+      </p:sp>
+      <p:grpSp>
+        <p:nvGrpSpPr>
+          <p:cNvPr id="2" name="Group 1"/>
+          <p:cNvGrpSpPr/>
+          <p:nvPr/>
+        </p:nvGrpSpPr>
+        <p:grpSpPr>
+          <a:xfrm>
+            <a:off x="-2367270" y="-422177"/>
+            <a:ext cx="20328087" cy="6989666"/>
+            <a:chOff x="-2628527" y="-438505"/>
+            <a:chExt cx="20328087" cy="6989666"/>
+          </a:xfrm>
+        </p:grpSpPr>
+        <p:pic>
+          <p:nvPicPr>
+            <p:cNvPr id="23" name="Picture 22"/>
+            <p:cNvPicPr>
+              <a:picLocks noChangeAspect="1"/>
+            </p:cNvPicPr>
+            <p:nvPr/>
+          </p:nvPicPr>
+          <p:blipFill>
+            <a:blip r:embed="rId3">
+              <a:extLst>
+                <a:ext uri="{28A0092B-C50C-407E-A947-70E740481C1C}">
+                  <a14:useLocalDpi xmlns:a14="http://schemas.microsoft.com/office/drawing/2010/main" val="0"/>
+                </a:ext>
+              </a:extLst>
+            </a:blip>
+            <a:stretch>
+              <a:fillRect/>
+            </a:stretch>
+          </p:blipFill>
+          <p:spPr>
+            <a:xfrm>
+              <a:off x="10666236" y="1321027"/>
+              <a:ext cx="5857461" cy="4572920"/>
+            </a:xfrm>
+            <a:prstGeom prst="rect">
+              <a:avLst/>
+            </a:prstGeom>
+            <a:ln w="12700">
+              <a:noFill/>
+            </a:ln>
+          </p:spPr>
+        </p:pic>
+        <p:pic>
+          <p:nvPicPr>
+            <p:cNvPr id="4" name="Picture 3"/>
+            <p:cNvPicPr>
+              <a:picLocks noChangeAspect="1"/>
+            </p:cNvPicPr>
+            <p:nvPr/>
+          </p:nvPicPr>
+          <p:blipFill>
+            <a:blip r:embed="rId4">
+              <a:extLst>
+                <a:ext uri="{28A0092B-C50C-407E-A947-70E740481C1C}">
+                  <a14:useLocalDpi xmlns:a14="http://schemas.microsoft.com/office/drawing/2010/main" val="0"/>
+                </a:ext>
+              </a:extLst>
+            </a:blip>
+            <a:stretch>
+              <a:fillRect/>
+            </a:stretch>
+          </p:blipFill>
+          <p:spPr>
+            <a:xfrm>
+              <a:off x="-1694836" y="1321027"/>
+              <a:ext cx="6341807" cy="4572920"/>
+            </a:xfrm>
+            <a:prstGeom prst="rect">
+              <a:avLst/>
+            </a:prstGeom>
+            <a:ln w="12700">
+              <a:noFill/>
+            </a:ln>
+          </p:spPr>
+        </p:pic>
+        <p:pic>
+          <p:nvPicPr>
+            <p:cNvPr id="5" name="Picture 4"/>
+            <p:cNvPicPr>
+              <a:picLocks noChangeAspect="1"/>
+            </p:cNvPicPr>
+            <p:nvPr/>
+          </p:nvPicPr>
+          <p:blipFill>
+            <a:blip r:embed="rId5">
+              <a:extLst>
+                <a:ext uri="{28A0092B-C50C-407E-A947-70E740481C1C}">
+                  <a14:useLocalDpi xmlns:a14="http://schemas.microsoft.com/office/drawing/2010/main" val="0"/>
+                </a:ext>
+              </a:extLst>
+            </a:blip>
+            <a:stretch>
+              <a:fillRect/>
+            </a:stretch>
+          </p:blipFill>
+          <p:spPr>
+            <a:xfrm>
+              <a:off x="5114572" y="1321027"/>
+              <a:ext cx="5084063" cy="4572920"/>
+            </a:xfrm>
+            <a:prstGeom prst="rect">
+              <a:avLst/>
+            </a:prstGeom>
+            <a:ln w="12700">
+              <a:noFill/>
+            </a:ln>
+          </p:spPr>
+        </p:pic>
+        <p:sp>
+          <p:nvSpPr>
+            <p:cNvPr id="15" name="TextBox 14"/>
+            <p:cNvSpPr txBox="1"/>
+            <p:nvPr/>
+          </p:nvSpPr>
+          <p:spPr>
+            <a:xfrm>
+              <a:off x="14688369" y="990108"/>
+              <a:ext cx="1920240" cy="292447"/>
+            </a:xfrm>
+            <a:prstGeom prst="rect">
+              <a:avLst/>
+            </a:prstGeom>
+            <a:noFill/>
+          </p:spPr>
+          <p:txBody>
+            <a:bodyPr wrap="square" rtlCol="0">
+              <a:spAutoFit/>
+            </a:bodyPr>
+            <a:lstStyle/>
+            <a:p>
+              <a:r>
+                <a:rPr lang="en-US" sz="1300" dirty="0" smtClean="0"/>
+                <a:t>Decision Node </a:t>
+              </a:r>
+              <a:endParaRPr lang="en-US" sz="1300" dirty="0"/>
+            </a:p>
+          </p:txBody>
+        </p:sp>
+        <p:sp>
+          <p:nvSpPr>
+            <p:cNvPr id="16" name="TextBox 15"/>
+            <p:cNvSpPr txBox="1"/>
+            <p:nvPr/>
+          </p:nvSpPr>
+          <p:spPr>
+            <a:xfrm>
+              <a:off x="14691642" y="673841"/>
+              <a:ext cx="1554480" cy="292447"/>
+            </a:xfrm>
+            <a:prstGeom prst="rect">
+              <a:avLst/>
+            </a:prstGeom>
+            <a:noFill/>
+          </p:spPr>
+          <p:txBody>
+            <a:bodyPr wrap="square" rtlCol="0">
+              <a:spAutoFit/>
+            </a:bodyPr>
+            <a:lstStyle/>
+            <a:p>
+              <a:r>
+                <a:rPr lang="en-US" sz="1300" dirty="0" smtClean="0"/>
+                <a:t>Root Node</a:t>
+              </a:r>
+              <a:endParaRPr lang="en-US" sz="1300" dirty="0"/>
+            </a:p>
+          </p:txBody>
+        </p:sp>
+        <p:sp>
+          <p:nvSpPr>
+            <p:cNvPr id="17" name="Rectangle 16"/>
+            <p:cNvSpPr/>
+            <p:nvPr/>
+          </p:nvSpPr>
+          <p:spPr>
+            <a:xfrm>
+              <a:off x="14446546" y="1067850"/>
+              <a:ext cx="137160" cy="137188"/>
+            </a:xfrm>
+            <a:prstGeom prst="rect">
+              <a:avLst/>
+            </a:prstGeom>
+            <a:solidFill>
+              <a:srgbClr val="0000FF"/>
+            </a:solidFill>
+            <a:ln>
+              <a:solidFill>
+                <a:schemeClr val="tx1"/>
+              </a:solidFill>
+            </a:ln>
+          </p:spPr>
+          <p:style>
+            <a:lnRef idx="2">
+              <a:schemeClr val="accent1">
+                <a:shade val="50000"/>
+              </a:schemeClr>
+            </a:lnRef>
+            <a:fillRef idx="1">
+              <a:schemeClr val="accent1"/>
+            </a:fillRef>
+            <a:effectRef idx="0">
+              <a:schemeClr val="accent1"/>
+            </a:effectRef>
+            <a:fontRef idx="minor">
+              <a:schemeClr val="lt1"/>
+            </a:fontRef>
+          </p:style>
+          <p:txBody>
+            <a:bodyPr rtlCol="0" anchor="ctr"/>
+            <a:lstStyle/>
+            <a:p>
+              <a:pPr algn="ctr"/>
+              <a:endParaRPr lang="en-US">
+                <a:solidFill>
+                  <a:srgbClr val="0000FF"/>
+                </a:solidFill>
+              </a:endParaRPr>
+            </a:p>
+          </p:txBody>
+        </p:sp>
+        <p:sp>
+          <p:nvSpPr>
+            <p:cNvPr id="18" name="Rectangle 17"/>
+            <p:cNvSpPr/>
+            <p:nvPr/>
+          </p:nvSpPr>
+          <p:spPr>
+            <a:xfrm>
+              <a:off x="14347964" y="611847"/>
+              <a:ext cx="1999102" cy="1057257"/>
+            </a:xfrm>
+            <a:prstGeom prst="rect">
+              <a:avLst/>
+            </a:prstGeom>
+            <a:noFill/>
+            <a:ln w="6350">
+              <a:solidFill>
+                <a:schemeClr val="tx1">
+                  <a:alpha val="32000"/>
+                </a:schemeClr>
+              </a:solidFill>
+            </a:ln>
+          </p:spPr>
+          <p:style>
+            <a:lnRef idx="2">
+              <a:schemeClr val="accent1">
+                <a:shade val="50000"/>
+              </a:schemeClr>
+            </a:lnRef>
+            <a:fillRef idx="1">
+              <a:schemeClr val="accent1"/>
+            </a:fillRef>
+            <a:effectRef idx="0">
+              <a:schemeClr val="accent1"/>
+            </a:effectRef>
+            <a:fontRef idx="minor">
+              <a:schemeClr val="lt1"/>
+            </a:fontRef>
+          </p:style>
+          <p:txBody>
+            <a:bodyPr rtlCol="0" anchor="ctr"/>
+            <a:lstStyle/>
+            <a:p>
+              <a:pPr algn="ctr"/>
+              <a:endParaRPr lang="en-US"/>
+            </a:p>
+          </p:txBody>
+        </p:sp>
+        <p:sp>
+          <p:nvSpPr>
+            <p:cNvPr id="19" name="Rectangle 18"/>
+            <p:cNvSpPr/>
+            <p:nvPr/>
+          </p:nvSpPr>
+          <p:spPr>
+            <a:xfrm>
+              <a:off x="13800419" y="239564"/>
+              <a:ext cx="3094191" cy="400190"/>
+            </a:xfrm>
+            <a:prstGeom prst="rect">
+              <a:avLst/>
+            </a:prstGeom>
+          </p:spPr>
+          <p:txBody>
+            <a:bodyPr wrap="square">
+              <a:spAutoFit/>
+            </a:bodyPr>
+            <a:lstStyle/>
+            <a:p>
+              <a:pPr algn="ctr"/>
+              <a:r>
+                <a:rPr lang="en-US" sz="2000" dirty="0" smtClean="0"/>
+                <a:t>Type of Node</a:t>
+              </a:r>
+              <a:endParaRPr lang="en-US" sz="2000" dirty="0"/>
+            </a:p>
+          </p:txBody>
+        </p:sp>
+        <p:sp>
+          <p:nvSpPr>
+            <p:cNvPr id="20" name="Rectangle 19"/>
+            <p:cNvSpPr/>
+            <p:nvPr/>
+          </p:nvSpPr>
+          <p:spPr>
+            <a:xfrm>
+              <a:off x="14450625" y="1387955"/>
+              <a:ext cx="137160" cy="137188"/>
+            </a:xfrm>
+            <a:prstGeom prst="rect">
+              <a:avLst/>
+            </a:prstGeom>
+            <a:solidFill>
+              <a:srgbClr val="008000"/>
+            </a:solidFill>
+            <a:ln>
+              <a:solidFill>
+                <a:schemeClr val="tx1"/>
+              </a:solidFill>
+            </a:ln>
+          </p:spPr>
+          <p:style>
+            <a:lnRef idx="2">
+              <a:schemeClr val="accent1">
+                <a:shade val="50000"/>
+              </a:schemeClr>
+            </a:lnRef>
+            <a:fillRef idx="1">
+              <a:schemeClr val="accent1"/>
+            </a:fillRef>
+            <a:effectRef idx="0">
+              <a:schemeClr val="accent1"/>
+            </a:effectRef>
+            <a:fontRef idx="minor">
+              <a:schemeClr val="lt1"/>
+            </a:fontRef>
+          </p:style>
+          <p:txBody>
+            <a:bodyPr rtlCol="0" anchor="ctr"/>
+            <a:lstStyle/>
+            <a:p>
+              <a:pPr algn="ctr"/>
+              <a:endParaRPr lang="en-US"/>
+            </a:p>
+          </p:txBody>
+        </p:sp>
+        <p:sp>
+          <p:nvSpPr>
+            <p:cNvPr id="21" name="TextBox 20"/>
+            <p:cNvSpPr txBox="1"/>
+            <p:nvPr/>
+          </p:nvSpPr>
+          <p:spPr>
+            <a:xfrm>
+              <a:off x="14691642" y="1314075"/>
+              <a:ext cx="1920240" cy="292447"/>
+            </a:xfrm>
+            <a:prstGeom prst="rect">
+              <a:avLst/>
+            </a:prstGeom>
+            <a:noFill/>
+          </p:spPr>
+          <p:txBody>
+            <a:bodyPr wrap="square" rtlCol="0">
+              <a:spAutoFit/>
+            </a:bodyPr>
+            <a:lstStyle/>
+            <a:p>
+              <a:r>
+                <a:rPr lang="en-US" sz="1300" dirty="0" smtClean="0"/>
+                <a:t>Leaf/Terminal Node </a:t>
+              </a:r>
+              <a:endParaRPr lang="en-US" sz="1300" dirty="0"/>
+            </a:p>
+          </p:txBody>
+        </p:sp>
+        <p:sp>
+          <p:nvSpPr>
+            <p:cNvPr id="22" name="Rectangle 21"/>
+            <p:cNvSpPr/>
+            <p:nvPr/>
+          </p:nvSpPr>
+          <p:spPr>
+            <a:xfrm>
+              <a:off x="14450625" y="747746"/>
+              <a:ext cx="137160" cy="137188"/>
+            </a:xfrm>
+            <a:prstGeom prst="rect">
+              <a:avLst/>
+            </a:prstGeom>
+            <a:solidFill>
+              <a:srgbClr val="D2691E"/>
+            </a:solidFill>
+            <a:ln>
+              <a:solidFill>
+                <a:schemeClr val="tx1"/>
+              </a:solidFill>
+            </a:ln>
+          </p:spPr>
+          <p:style>
+            <a:lnRef idx="2">
+              <a:schemeClr val="accent1">
+                <a:shade val="50000"/>
+              </a:schemeClr>
+            </a:lnRef>
+            <a:fillRef idx="1">
+              <a:schemeClr val="accent1"/>
+            </a:fillRef>
+            <a:effectRef idx="0">
+              <a:schemeClr val="accent1"/>
+            </a:effectRef>
+            <a:fontRef idx="minor">
+              <a:schemeClr val="lt1"/>
+            </a:fontRef>
+          </p:style>
+          <p:txBody>
+            <a:bodyPr rtlCol="0" anchor="ctr"/>
+            <a:lstStyle/>
+            <a:p>
+              <a:pPr algn="ctr"/>
+              <a:endParaRPr lang="en-US">
+                <a:solidFill>
+                  <a:srgbClr val="0000FF"/>
+                </a:solidFill>
+              </a:endParaRPr>
+            </a:p>
+          </p:txBody>
+        </p:sp>
+        <p:sp>
+          <p:nvSpPr>
+            <p:cNvPr id="32" name="TextBox 31"/>
+            <p:cNvSpPr txBox="1"/>
+            <p:nvPr/>
+          </p:nvSpPr>
+          <p:spPr>
+            <a:xfrm>
+              <a:off x="3084603" y="-438505"/>
+              <a:ext cx="9144000" cy="1415772"/>
+            </a:xfrm>
+            <a:prstGeom prst="rect">
+              <a:avLst/>
+            </a:prstGeom>
+            <a:noFill/>
+          </p:spPr>
+          <p:txBody>
+            <a:bodyPr wrap="square" rtlCol="0">
+              <a:spAutoFit/>
+            </a:bodyPr>
+            <a:lstStyle/>
+            <a:p>
+              <a:pPr algn="ctr"/>
+              <a:r>
+                <a:rPr lang="en-US" sz="5000" b="1" dirty="0" smtClean="0"/>
+                <a:t>Depth of Classification Trees</a:t>
+              </a:r>
+              <a:endParaRPr lang="en-US" sz="5000" dirty="0" smtClean="0"/>
+            </a:p>
+            <a:p>
+              <a:endParaRPr lang="en-US" dirty="0"/>
+            </a:p>
+            <a:p>
+              <a:endParaRPr lang="en-US" dirty="0"/>
+            </a:p>
+          </p:txBody>
+        </p:sp>
+        <p:sp>
+          <p:nvSpPr>
+            <p:cNvPr id="35" name="Rectangle 34"/>
+            <p:cNvSpPr/>
+            <p:nvPr/>
+          </p:nvSpPr>
+          <p:spPr>
+            <a:xfrm>
+              <a:off x="-2628527" y="5997052"/>
+              <a:ext cx="8209188" cy="554109"/>
+            </a:xfrm>
+            <a:prstGeom prst="rect">
+              <a:avLst/>
+            </a:prstGeom>
+          </p:spPr>
+          <p:txBody>
+            <a:bodyPr wrap="square">
+              <a:spAutoFit/>
+            </a:bodyPr>
+            <a:lstStyle/>
+            <a:p>
+              <a:pPr algn="ctr"/>
+              <a:r>
+                <a:rPr lang="en-US" sz="3000" dirty="0" smtClean="0"/>
+                <a:t>Depth = 1</a:t>
+              </a:r>
+            </a:p>
+          </p:txBody>
+        </p:sp>
+        <p:sp>
+          <p:nvSpPr>
+            <p:cNvPr id="36" name="Rectangle 35"/>
+            <p:cNvSpPr/>
+            <p:nvPr/>
+          </p:nvSpPr>
+          <p:spPr>
+            <a:xfrm>
+              <a:off x="3552009" y="5997051"/>
+              <a:ext cx="8209188" cy="554109"/>
+            </a:xfrm>
+            <a:prstGeom prst="rect">
+              <a:avLst/>
+            </a:prstGeom>
+          </p:spPr>
+          <p:txBody>
+            <a:bodyPr wrap="square">
+              <a:spAutoFit/>
+            </a:bodyPr>
+            <a:lstStyle/>
+            <a:p>
+              <a:pPr algn="ctr"/>
+              <a:r>
+                <a:rPr lang="en-US" sz="3000" dirty="0" smtClean="0"/>
+                <a:t>Depth = 2</a:t>
+              </a:r>
+            </a:p>
+          </p:txBody>
+        </p:sp>
+        <p:sp>
+          <p:nvSpPr>
+            <p:cNvPr id="37" name="Rectangle 36"/>
+            <p:cNvSpPr/>
+            <p:nvPr/>
+          </p:nvSpPr>
+          <p:spPr>
+            <a:xfrm>
+              <a:off x="9490372" y="5960874"/>
+              <a:ext cx="8209188" cy="554109"/>
+            </a:xfrm>
+            <a:prstGeom prst="rect">
+              <a:avLst/>
+            </a:prstGeom>
+          </p:spPr>
+          <p:txBody>
+            <a:bodyPr wrap="square">
+              <a:spAutoFit/>
+            </a:bodyPr>
+            <a:lstStyle/>
+            <a:p>
+              <a:pPr algn="ctr"/>
+              <a:r>
+                <a:rPr lang="en-US" sz="3000" dirty="0" smtClean="0"/>
+                <a:t>Depth = 3</a:t>
+              </a:r>
+            </a:p>
+          </p:txBody>
+        </p:sp>
+      </p:grpSp>
     </p:spTree>
     <p:extLst>
       <p:ext uri="{BB962C8B-B14F-4D97-AF65-F5344CB8AC3E}">
-        <p14:creationId xmlns:p14="http://schemas.microsoft.com/office/powerpoint/2010/main" val="31035766"/>
+        <p14:creationId xmlns:p14="http://schemas.microsoft.com/office/powerpoint/2010/main" val="930359355"/>
       </p:ext>
     </p:extLst>
   </p:cSld>
@@ -8697,10 +8652,831 @@
           <a:chExt cx="0" cy="0"/>
         </a:xfrm>
       </p:grpSpPr>
+      <p:sp>
+        <p:nvSpPr>
+          <p:cNvPr id="8" name="TextBox 7"/>
+          <p:cNvSpPr txBox="1"/>
+          <p:nvPr/>
+        </p:nvSpPr>
+        <p:spPr>
+          <a:xfrm>
+            <a:off x="14949626" y="1006436"/>
+            <a:ext cx="1920240" cy="292447"/>
+          </a:xfrm>
+          <a:prstGeom prst="rect">
+            <a:avLst/>
+          </a:prstGeom>
+          <a:noFill/>
+        </p:spPr>
+        <p:txBody>
+          <a:bodyPr wrap="square" rtlCol="0">
+            <a:spAutoFit/>
+          </a:bodyPr>
+          <a:lstStyle/>
+          <a:p>
+            <a:r>
+              <a:rPr lang="en-US" sz="1300" dirty="0" smtClean="0"/>
+              <a:t>Decision Node </a:t>
+            </a:r>
+            <a:endParaRPr lang="en-US" sz="1300" dirty="0"/>
+          </a:p>
+        </p:txBody>
+      </p:sp>
+      <p:sp>
+        <p:nvSpPr>
+          <p:cNvPr id="9" name="TextBox 8"/>
+          <p:cNvSpPr txBox="1"/>
+          <p:nvPr/>
+        </p:nvSpPr>
+        <p:spPr>
+          <a:xfrm>
+            <a:off x="14952899" y="690169"/>
+            <a:ext cx="1554480" cy="292447"/>
+          </a:xfrm>
+          <a:prstGeom prst="rect">
+            <a:avLst/>
+          </a:prstGeom>
+          <a:noFill/>
+        </p:spPr>
+        <p:txBody>
+          <a:bodyPr wrap="square" rtlCol="0">
+            <a:spAutoFit/>
+          </a:bodyPr>
+          <a:lstStyle/>
+          <a:p>
+            <a:r>
+              <a:rPr lang="en-US" sz="1300" dirty="0" smtClean="0"/>
+              <a:t>Root Node</a:t>
+            </a:r>
+            <a:endParaRPr lang="en-US" sz="1300" dirty="0"/>
+          </a:p>
+        </p:txBody>
+      </p:sp>
+      <p:sp>
+        <p:nvSpPr>
+          <p:cNvPr id="10" name="Rectangle 9"/>
+          <p:cNvSpPr/>
+          <p:nvPr/>
+        </p:nvSpPr>
+        <p:spPr>
+          <a:xfrm>
+            <a:off x="14707803" y="1084178"/>
+            <a:ext cx="137160" cy="137188"/>
+          </a:xfrm>
+          <a:prstGeom prst="rect">
+            <a:avLst/>
+          </a:prstGeom>
+          <a:solidFill>
+            <a:srgbClr val="0000FF"/>
+          </a:solidFill>
+          <a:ln>
+            <a:solidFill>
+              <a:schemeClr val="tx1"/>
+            </a:solidFill>
+          </a:ln>
+        </p:spPr>
+        <p:style>
+          <a:lnRef idx="2">
+            <a:schemeClr val="accent1">
+              <a:shade val="50000"/>
+            </a:schemeClr>
+          </a:lnRef>
+          <a:fillRef idx="1">
+            <a:schemeClr val="accent1"/>
+          </a:fillRef>
+          <a:effectRef idx="0">
+            <a:schemeClr val="accent1"/>
+          </a:effectRef>
+          <a:fontRef idx="minor">
+            <a:schemeClr val="lt1"/>
+          </a:fontRef>
+        </p:style>
+        <p:txBody>
+          <a:bodyPr rtlCol="0" anchor="ctr"/>
+          <a:lstStyle/>
+          <a:p>
+            <a:pPr algn="ctr"/>
+            <a:endParaRPr lang="en-US">
+              <a:solidFill>
+                <a:srgbClr val="0000FF"/>
+              </a:solidFill>
+            </a:endParaRPr>
+          </a:p>
+        </p:txBody>
+      </p:sp>
+      <p:sp>
+        <p:nvSpPr>
+          <p:cNvPr id="11" name="Rectangle 10"/>
+          <p:cNvSpPr/>
+          <p:nvPr/>
+        </p:nvSpPr>
+        <p:spPr>
+          <a:xfrm>
+            <a:off x="14609221" y="628175"/>
+            <a:ext cx="1999102" cy="1057257"/>
+          </a:xfrm>
+          <a:prstGeom prst="rect">
+            <a:avLst/>
+          </a:prstGeom>
+          <a:noFill/>
+          <a:ln w="6350">
+            <a:solidFill>
+              <a:schemeClr val="tx1">
+                <a:alpha val="32000"/>
+              </a:schemeClr>
+            </a:solidFill>
+          </a:ln>
+        </p:spPr>
+        <p:style>
+          <a:lnRef idx="2">
+            <a:schemeClr val="accent1">
+              <a:shade val="50000"/>
+            </a:schemeClr>
+          </a:lnRef>
+          <a:fillRef idx="1">
+            <a:schemeClr val="accent1"/>
+          </a:fillRef>
+          <a:effectRef idx="0">
+            <a:schemeClr val="accent1"/>
+          </a:effectRef>
+          <a:fontRef idx="minor">
+            <a:schemeClr val="lt1"/>
+          </a:fontRef>
+        </p:style>
+        <p:txBody>
+          <a:bodyPr rtlCol="0" anchor="ctr"/>
+          <a:lstStyle/>
+          <a:p>
+            <a:pPr algn="ctr"/>
+            <a:endParaRPr lang="en-US"/>
+          </a:p>
+        </p:txBody>
+      </p:sp>
+      <p:sp>
+        <p:nvSpPr>
+          <p:cNvPr id="12" name="Rectangle 11"/>
+          <p:cNvSpPr/>
+          <p:nvPr/>
+        </p:nvSpPr>
+        <p:spPr>
+          <a:xfrm>
+            <a:off x="14061676" y="255892"/>
+            <a:ext cx="3094191" cy="400190"/>
+          </a:xfrm>
+          <a:prstGeom prst="rect">
+            <a:avLst/>
+          </a:prstGeom>
+        </p:spPr>
+        <p:txBody>
+          <a:bodyPr wrap="square">
+            <a:spAutoFit/>
+          </a:bodyPr>
+          <a:lstStyle/>
+          <a:p>
+            <a:pPr algn="ctr"/>
+            <a:r>
+              <a:rPr lang="en-US" sz="2000" dirty="0" smtClean="0"/>
+              <a:t>Type of Node</a:t>
+            </a:r>
+            <a:endParaRPr lang="en-US" sz="2000" dirty="0"/>
+          </a:p>
+        </p:txBody>
+      </p:sp>
+      <p:sp>
+        <p:nvSpPr>
+          <p:cNvPr id="13" name="Rectangle 12"/>
+          <p:cNvSpPr/>
+          <p:nvPr/>
+        </p:nvSpPr>
+        <p:spPr>
+          <a:xfrm>
+            <a:off x="14711882" y="1404283"/>
+            <a:ext cx="137160" cy="137188"/>
+          </a:xfrm>
+          <a:prstGeom prst="rect">
+            <a:avLst/>
+          </a:prstGeom>
+          <a:solidFill>
+            <a:srgbClr val="008000"/>
+          </a:solidFill>
+          <a:ln>
+            <a:solidFill>
+              <a:schemeClr val="tx1"/>
+            </a:solidFill>
+          </a:ln>
+        </p:spPr>
+        <p:style>
+          <a:lnRef idx="2">
+            <a:schemeClr val="accent1">
+              <a:shade val="50000"/>
+            </a:schemeClr>
+          </a:lnRef>
+          <a:fillRef idx="1">
+            <a:schemeClr val="accent1"/>
+          </a:fillRef>
+          <a:effectRef idx="0">
+            <a:schemeClr val="accent1"/>
+          </a:effectRef>
+          <a:fontRef idx="minor">
+            <a:schemeClr val="lt1"/>
+          </a:fontRef>
+        </p:style>
+        <p:txBody>
+          <a:bodyPr rtlCol="0" anchor="ctr"/>
+          <a:lstStyle/>
+          <a:p>
+            <a:pPr algn="ctr"/>
+            <a:endParaRPr lang="en-US"/>
+          </a:p>
+        </p:txBody>
+      </p:sp>
+      <p:sp>
+        <p:nvSpPr>
+          <p:cNvPr id="14" name="TextBox 13"/>
+          <p:cNvSpPr txBox="1"/>
+          <p:nvPr/>
+        </p:nvSpPr>
+        <p:spPr>
+          <a:xfrm>
+            <a:off x="14952899" y="1330403"/>
+            <a:ext cx="1920240" cy="292447"/>
+          </a:xfrm>
+          <a:prstGeom prst="rect">
+            <a:avLst/>
+          </a:prstGeom>
+          <a:noFill/>
+        </p:spPr>
+        <p:txBody>
+          <a:bodyPr wrap="square" rtlCol="0">
+            <a:spAutoFit/>
+          </a:bodyPr>
+          <a:lstStyle/>
+          <a:p>
+            <a:r>
+              <a:rPr lang="en-US" sz="1300" dirty="0" smtClean="0"/>
+              <a:t>Leaf/Terminal Node </a:t>
+            </a:r>
+            <a:endParaRPr lang="en-US" sz="1300" dirty="0"/>
+          </a:p>
+        </p:txBody>
+      </p:sp>
+      <p:sp>
+        <p:nvSpPr>
+          <p:cNvPr id="15" name="Rectangle 14"/>
+          <p:cNvSpPr/>
+          <p:nvPr/>
+        </p:nvSpPr>
+        <p:spPr>
+          <a:xfrm>
+            <a:off x="14711882" y="764074"/>
+            <a:ext cx="137160" cy="137188"/>
+          </a:xfrm>
+          <a:prstGeom prst="rect">
+            <a:avLst/>
+          </a:prstGeom>
+          <a:solidFill>
+            <a:srgbClr val="D2691E"/>
+          </a:solidFill>
+          <a:ln>
+            <a:solidFill>
+              <a:schemeClr val="tx1"/>
+            </a:solidFill>
+          </a:ln>
+        </p:spPr>
+        <p:style>
+          <a:lnRef idx="2">
+            <a:schemeClr val="accent1">
+              <a:shade val="50000"/>
+            </a:schemeClr>
+          </a:lnRef>
+          <a:fillRef idx="1">
+            <a:schemeClr val="accent1"/>
+          </a:fillRef>
+          <a:effectRef idx="0">
+            <a:schemeClr val="accent1"/>
+          </a:effectRef>
+          <a:fontRef idx="minor">
+            <a:schemeClr val="lt1"/>
+          </a:fontRef>
+        </p:style>
+        <p:txBody>
+          <a:bodyPr rtlCol="0" anchor="ctr"/>
+          <a:lstStyle/>
+          <a:p>
+            <a:pPr algn="ctr"/>
+            <a:endParaRPr lang="en-US">
+              <a:solidFill>
+                <a:srgbClr val="0000FF"/>
+              </a:solidFill>
+            </a:endParaRPr>
+          </a:p>
+        </p:txBody>
+      </p:sp>
+      <p:sp>
+        <p:nvSpPr>
+          <p:cNvPr id="19" name="Rectangle 18"/>
+          <p:cNvSpPr/>
+          <p:nvPr/>
+        </p:nvSpPr>
+        <p:spPr>
+          <a:xfrm>
+            <a:off x="9751629" y="5977202"/>
+            <a:ext cx="8209188" cy="554109"/>
+          </a:xfrm>
+          <a:prstGeom prst="rect">
+            <a:avLst/>
+          </a:prstGeom>
+        </p:spPr>
+        <p:txBody>
+          <a:bodyPr wrap="square">
+            <a:spAutoFit/>
+          </a:bodyPr>
+          <a:lstStyle/>
+          <a:p>
+            <a:pPr algn="ctr"/>
+            <a:r>
+              <a:rPr lang="en-US" sz="3000" dirty="0" smtClean="0"/>
+              <a:t>Depth = 3</a:t>
+            </a:r>
+          </a:p>
+        </p:txBody>
+      </p:sp>
+      <p:grpSp>
+        <p:nvGrpSpPr>
+          <p:cNvPr id="27" name="Group 26"/>
+          <p:cNvGrpSpPr/>
+          <p:nvPr/>
+        </p:nvGrpSpPr>
+        <p:grpSpPr>
+          <a:xfrm>
+            <a:off x="761995" y="-677935"/>
+            <a:ext cx="7959383" cy="3841095"/>
+            <a:chOff x="761995" y="-677935"/>
+            <a:chExt cx="7959383" cy="3841095"/>
+          </a:xfrm>
+        </p:grpSpPr>
+        <p:grpSp>
+          <p:nvGrpSpPr>
+            <p:cNvPr id="24" name="Group 23"/>
+            <p:cNvGrpSpPr/>
+            <p:nvPr/>
+          </p:nvGrpSpPr>
+          <p:grpSpPr>
+            <a:xfrm>
+              <a:off x="941614" y="-130629"/>
+              <a:ext cx="7779764" cy="3293789"/>
+              <a:chOff x="941614" y="-130629"/>
+              <a:chExt cx="7779764" cy="3293789"/>
+            </a:xfrm>
+          </p:grpSpPr>
+          <p:pic>
+            <p:nvPicPr>
+              <p:cNvPr id="2" name="Picture 1"/>
+              <p:cNvPicPr>
+                <a:picLocks noChangeAspect="1"/>
+              </p:cNvPicPr>
+              <p:nvPr/>
+            </p:nvPicPr>
+            <p:blipFill>
+              <a:blip r:embed="rId2">
+                <a:extLst>
+                  <a:ext uri="{28A0092B-C50C-407E-A947-70E740481C1C}">
+                    <a14:useLocalDpi xmlns:a14="http://schemas.microsoft.com/office/drawing/2010/main" val="0"/>
+                  </a:ext>
+                </a:extLst>
+              </a:blip>
+              <a:stretch>
+                <a:fillRect/>
+              </a:stretch>
+            </p:blipFill>
+            <p:spPr>
+              <a:xfrm>
+                <a:off x="941614" y="-130629"/>
+                <a:ext cx="3805084" cy="2743200"/>
+              </a:xfrm>
+              <a:prstGeom prst="rect">
+                <a:avLst/>
+              </a:prstGeom>
+            </p:spPr>
+          </p:pic>
+          <p:pic>
+            <p:nvPicPr>
+              <p:cNvPr id="3" name="Picture 2"/>
+              <p:cNvPicPr>
+                <a:picLocks noChangeAspect="1"/>
+              </p:cNvPicPr>
+              <p:nvPr/>
+            </p:nvPicPr>
+            <p:blipFill>
+              <a:blip r:embed="rId3">
+                <a:extLst>
+                  <a:ext uri="{28A0092B-C50C-407E-A947-70E740481C1C}">
+                    <a14:useLocalDpi xmlns:a14="http://schemas.microsoft.com/office/drawing/2010/main" val="0"/>
+                  </a:ext>
+                </a:extLst>
+              </a:blip>
+              <a:stretch>
+                <a:fillRect/>
+              </a:stretch>
+            </p:blipFill>
+            <p:spPr>
+              <a:xfrm>
+                <a:off x="4916294" y="-130629"/>
+                <a:ext cx="3805084" cy="2743200"/>
+              </a:xfrm>
+              <a:prstGeom prst="rect">
+                <a:avLst/>
+              </a:prstGeom>
+            </p:spPr>
+          </p:pic>
+          <p:sp>
+            <p:nvSpPr>
+              <p:cNvPr id="17" name="Rectangle 16"/>
+              <p:cNvSpPr/>
+              <p:nvPr/>
+            </p:nvSpPr>
+            <p:spPr>
+              <a:xfrm>
+                <a:off x="1035295" y="2763050"/>
+                <a:ext cx="3617721" cy="400110"/>
+              </a:xfrm>
+              <a:prstGeom prst="rect">
+                <a:avLst/>
+              </a:prstGeom>
+            </p:spPr>
+            <p:txBody>
+              <a:bodyPr wrap="square">
+                <a:spAutoFit/>
+              </a:bodyPr>
+              <a:lstStyle/>
+              <a:p>
+                <a:pPr algn="ctr"/>
+                <a:r>
+                  <a:rPr lang="en-US" sz="2000" dirty="0"/>
+                  <a:t>criterion</a:t>
+                </a:r>
+                <a:r>
+                  <a:rPr lang="en-US" sz="2000" dirty="0" smtClean="0"/>
+                  <a:t>=</a:t>
+                </a:r>
+                <a:r>
+                  <a:rPr lang="en-US" sz="2000" dirty="0"/>
+                  <a:t> </a:t>
+                </a:r>
+                <a:r>
+                  <a:rPr lang="en-US" sz="2000" dirty="0" smtClean="0"/>
+                  <a:t>'</a:t>
+                </a:r>
+                <a:r>
+                  <a:rPr lang="en-US" sz="2000" dirty="0" err="1" smtClean="0"/>
+                  <a:t>gini</a:t>
+                </a:r>
+                <a:r>
+                  <a:rPr lang="en-US" sz="2000" dirty="0" smtClean="0"/>
+                  <a:t>'</a:t>
+                </a:r>
+                <a:endParaRPr lang="en-US" sz="2000" dirty="0" smtClean="0"/>
+              </a:p>
+            </p:txBody>
+          </p:sp>
+          <p:sp>
+            <p:nvSpPr>
+              <p:cNvPr id="21" name="Rectangle 20"/>
+              <p:cNvSpPr/>
+              <p:nvPr/>
+            </p:nvSpPr>
+            <p:spPr>
+              <a:xfrm>
+                <a:off x="5009975" y="2763050"/>
+                <a:ext cx="3617721" cy="400110"/>
+              </a:xfrm>
+              <a:prstGeom prst="rect">
+                <a:avLst/>
+              </a:prstGeom>
+            </p:spPr>
+            <p:txBody>
+              <a:bodyPr wrap="square">
+                <a:spAutoFit/>
+              </a:bodyPr>
+              <a:lstStyle/>
+              <a:p>
+                <a:pPr algn="ctr"/>
+                <a:r>
+                  <a:rPr lang="en-US" sz="2000" dirty="0"/>
+                  <a:t>criterion</a:t>
+                </a:r>
+                <a:r>
+                  <a:rPr lang="en-US" sz="2000" dirty="0" smtClean="0"/>
+                  <a:t>=</a:t>
+                </a:r>
+                <a:r>
+                  <a:rPr lang="en-US" sz="2000" dirty="0"/>
+                  <a:t> </a:t>
+                </a:r>
+                <a:r>
+                  <a:rPr lang="en-US" sz="2000" dirty="0" smtClean="0"/>
+                  <a:t>'entropy'</a:t>
+                </a:r>
+                <a:endParaRPr lang="en-US" sz="2000" dirty="0" smtClean="0"/>
+              </a:p>
+            </p:txBody>
+          </p:sp>
+        </p:grpSp>
+        <p:pic>
+          <p:nvPicPr>
+            <p:cNvPr id="25" name="Picture 24"/>
+            <p:cNvPicPr>
+              <a:picLocks noChangeAspect="1"/>
+            </p:cNvPicPr>
+            <p:nvPr/>
+          </p:nvPicPr>
+          <p:blipFill>
+            <a:blip r:embed="rId4">
+              <a:extLst>
+                <a:ext uri="{28A0092B-C50C-407E-A947-70E740481C1C}">
+                  <a14:useLocalDpi xmlns:a14="http://schemas.microsoft.com/office/drawing/2010/main" val="0"/>
+                </a:ext>
+              </a:extLst>
+            </a:blip>
+            <a:stretch>
+              <a:fillRect/>
+            </a:stretch>
+          </p:blipFill>
+          <p:spPr>
+            <a:xfrm>
+              <a:off x="761995" y="-677935"/>
+              <a:ext cx="1034019" cy="1133856"/>
+            </a:xfrm>
+            <a:prstGeom prst="rect">
+              <a:avLst/>
+            </a:prstGeom>
+          </p:spPr>
+        </p:pic>
+        <p:pic>
+          <p:nvPicPr>
+            <p:cNvPr id="26" name="Picture 25"/>
+            <p:cNvPicPr>
+              <a:picLocks noChangeAspect="1"/>
+            </p:cNvPicPr>
+            <p:nvPr/>
+          </p:nvPicPr>
+          <p:blipFill>
+            <a:blip r:embed="rId5">
+              <a:extLst>
+                <a:ext uri="{28A0092B-C50C-407E-A947-70E740481C1C}">
+                  <a14:useLocalDpi xmlns:a14="http://schemas.microsoft.com/office/drawing/2010/main" val="0"/>
+                </a:ext>
+              </a:extLst>
+            </a:blip>
+            <a:stretch>
+              <a:fillRect/>
+            </a:stretch>
+          </p:blipFill>
+          <p:spPr>
+            <a:xfrm>
+              <a:off x="4718330" y="-677935"/>
+              <a:ext cx="1034080" cy="1133922"/>
+            </a:xfrm>
+            <a:prstGeom prst="rect">
+              <a:avLst/>
+            </a:prstGeom>
+          </p:spPr>
+        </p:pic>
+      </p:grpSp>
+      <p:sp>
+        <p:nvSpPr>
+          <p:cNvPr id="31" name="Rectangle 30"/>
+          <p:cNvSpPr/>
+          <p:nvPr/>
+        </p:nvSpPr>
+        <p:spPr>
+          <a:xfrm>
+            <a:off x="6202001" y="4695825"/>
+            <a:ext cx="1463040" cy="282807"/>
+          </a:xfrm>
+          <a:prstGeom prst="rect">
+            <a:avLst/>
+          </a:prstGeom>
+          <a:noFill/>
+          <a:ln w="63500">
+            <a:solidFill>
+              <a:srgbClr val="FF0000"/>
+            </a:solidFill>
+          </a:ln>
+        </p:spPr>
+        <p:style>
+          <a:lnRef idx="2">
+            <a:schemeClr val="accent1">
+              <a:shade val="50000"/>
+            </a:schemeClr>
+          </a:lnRef>
+          <a:fillRef idx="1">
+            <a:schemeClr val="accent1"/>
+          </a:fillRef>
+          <a:effectRef idx="0">
+            <a:schemeClr val="accent1"/>
+          </a:effectRef>
+          <a:fontRef idx="minor">
+            <a:schemeClr val="lt1"/>
+          </a:fontRef>
+        </p:style>
+        <p:txBody>
+          <a:bodyPr rtlCol="0" anchor="ctr"/>
+          <a:lstStyle/>
+          <a:p>
+            <a:pPr algn="ctr"/>
+            <a:endParaRPr lang="en-US"/>
+          </a:p>
+        </p:txBody>
+      </p:sp>
+      <p:sp>
+        <p:nvSpPr>
+          <p:cNvPr id="32" name="Rectangle 31"/>
+          <p:cNvSpPr/>
+          <p:nvPr/>
+        </p:nvSpPr>
+        <p:spPr>
+          <a:xfrm>
+            <a:off x="2634713" y="5372866"/>
+            <a:ext cx="1463040" cy="282807"/>
+          </a:xfrm>
+          <a:prstGeom prst="rect">
+            <a:avLst/>
+          </a:prstGeom>
+          <a:noFill/>
+          <a:ln w="63500">
+            <a:solidFill>
+              <a:srgbClr val="FF0000"/>
+            </a:solidFill>
+          </a:ln>
+        </p:spPr>
+        <p:style>
+          <a:lnRef idx="2">
+            <a:schemeClr val="accent1">
+              <a:shade val="50000"/>
+            </a:schemeClr>
+          </a:lnRef>
+          <a:fillRef idx="1">
+            <a:schemeClr val="accent1"/>
+          </a:fillRef>
+          <a:effectRef idx="0">
+            <a:schemeClr val="accent1"/>
+          </a:effectRef>
+          <a:fontRef idx="minor">
+            <a:schemeClr val="lt1"/>
+          </a:fontRef>
+        </p:style>
+        <p:txBody>
+          <a:bodyPr rtlCol="0" anchor="ctr"/>
+          <a:lstStyle/>
+          <a:p>
+            <a:pPr algn="ctr"/>
+            <a:endParaRPr lang="en-US"/>
+          </a:p>
+        </p:txBody>
+      </p:sp>
+      <p:sp>
+        <p:nvSpPr>
+          <p:cNvPr id="33" name="Rectangle 32"/>
+          <p:cNvSpPr/>
+          <p:nvPr/>
+        </p:nvSpPr>
+        <p:spPr>
+          <a:xfrm>
+            <a:off x="4184774" y="6112852"/>
+            <a:ext cx="1463040" cy="282807"/>
+          </a:xfrm>
+          <a:prstGeom prst="rect">
+            <a:avLst/>
+          </a:prstGeom>
+          <a:noFill/>
+          <a:ln w="63500">
+            <a:solidFill>
+              <a:srgbClr val="FF0000"/>
+            </a:solidFill>
+          </a:ln>
+        </p:spPr>
+        <p:style>
+          <a:lnRef idx="2">
+            <a:schemeClr val="accent1">
+              <a:shade val="50000"/>
+            </a:schemeClr>
+          </a:lnRef>
+          <a:fillRef idx="1">
+            <a:schemeClr val="accent1"/>
+          </a:fillRef>
+          <a:effectRef idx="0">
+            <a:schemeClr val="accent1"/>
+          </a:effectRef>
+          <a:fontRef idx="minor">
+            <a:schemeClr val="lt1"/>
+          </a:fontRef>
+        </p:style>
+        <p:txBody>
+          <a:bodyPr rtlCol="0" anchor="ctr"/>
+          <a:lstStyle/>
+          <a:p>
+            <a:pPr algn="ctr"/>
+            <a:endParaRPr lang="en-US"/>
+          </a:p>
+        </p:txBody>
+      </p:sp>
+      <p:sp>
+        <p:nvSpPr>
+          <p:cNvPr id="34" name="Rectangle 33"/>
+          <p:cNvSpPr/>
+          <p:nvPr/>
+        </p:nvSpPr>
+        <p:spPr>
+          <a:xfrm>
+            <a:off x="547484" y="5231463"/>
+            <a:ext cx="1463040" cy="282807"/>
+          </a:xfrm>
+          <a:prstGeom prst="rect">
+            <a:avLst/>
+          </a:prstGeom>
+          <a:noFill/>
+          <a:ln w="63500">
+            <a:solidFill>
+              <a:srgbClr val="FF0000"/>
+            </a:solidFill>
+          </a:ln>
+        </p:spPr>
+        <p:style>
+          <a:lnRef idx="2">
+            <a:schemeClr val="accent1">
+              <a:shade val="50000"/>
+            </a:schemeClr>
+          </a:lnRef>
+          <a:fillRef idx="1">
+            <a:schemeClr val="accent1"/>
+          </a:fillRef>
+          <a:effectRef idx="0">
+            <a:schemeClr val="accent1"/>
+          </a:effectRef>
+          <a:fontRef idx="minor">
+            <a:schemeClr val="lt1"/>
+          </a:fontRef>
+        </p:style>
+        <p:txBody>
+          <a:bodyPr rtlCol="0" anchor="ctr"/>
+          <a:lstStyle/>
+          <a:p>
+            <a:pPr algn="ctr"/>
+            <a:endParaRPr lang="en-US"/>
+          </a:p>
+        </p:txBody>
+      </p:sp>
+      <p:sp>
+        <p:nvSpPr>
+          <p:cNvPr id="36" name="Rectangle 35"/>
+          <p:cNvSpPr/>
+          <p:nvPr/>
+        </p:nvSpPr>
+        <p:spPr>
+          <a:xfrm>
+            <a:off x="6319567" y="6531311"/>
+            <a:ext cx="1463040" cy="282807"/>
+          </a:xfrm>
+          <a:prstGeom prst="rect">
+            <a:avLst/>
+          </a:prstGeom>
+          <a:noFill/>
+          <a:ln w="63500">
+            <a:solidFill>
+              <a:srgbClr val="FF0000"/>
+            </a:solidFill>
+          </a:ln>
+        </p:spPr>
+        <p:style>
+          <a:lnRef idx="2">
+            <a:schemeClr val="accent1">
+              <a:shade val="50000"/>
+            </a:schemeClr>
+          </a:lnRef>
+          <a:fillRef idx="1">
+            <a:schemeClr val="accent1"/>
+          </a:fillRef>
+          <a:effectRef idx="0">
+            <a:schemeClr val="accent1"/>
+          </a:effectRef>
+          <a:fontRef idx="minor">
+            <a:schemeClr val="lt1"/>
+          </a:fontRef>
+        </p:style>
+        <p:txBody>
+          <a:bodyPr rtlCol="0" anchor="ctr"/>
+          <a:lstStyle/>
+          <a:p>
+            <a:pPr algn="ctr"/>
+            <a:endParaRPr lang="en-US"/>
+          </a:p>
+        </p:txBody>
+      </p:sp>
     </p:spTree>
     <p:extLst>
       <p:ext uri="{BB962C8B-B14F-4D97-AF65-F5344CB8AC3E}">
-        <p14:creationId xmlns:p14="http://schemas.microsoft.com/office/powerpoint/2010/main" val="1822941645"/>
+        <p14:creationId xmlns:p14="http://schemas.microsoft.com/office/powerpoint/2010/main" val="31035766"/>
       </p:ext>
     </p:extLst>
   </p:cSld>

</xml_diff>

<commit_message>
Updated decision tree tutorial (mostly on the blog) to be readable for students
</commit_message>
<xml_diff>
--- a/Sklearn/DecisionTrees/powerpoint/DecisionComparison.pptx
+++ b/Sklearn/DecisionTrees/powerpoint/DecisionComparison.pptx
@@ -5,7 +5,7 @@
     <p:sldMasterId id="2147483648" r:id="rId1"/>
   </p:sldMasterIdLst>
   <p:notesMasterIdLst>
-    <p:notesMasterId r:id="rId26"/>
+    <p:notesMasterId r:id="rId27"/>
   </p:notesMasterIdLst>
   <p:sldIdLst>
     <p:sldId id="256" r:id="rId2"/>
@@ -19,19 +19,20 @@
     <p:sldId id="277" r:id="rId10"/>
     <p:sldId id="276" r:id="rId11"/>
     <p:sldId id="275" r:id="rId12"/>
-    <p:sldId id="274" r:id="rId13"/>
-    <p:sldId id="273" r:id="rId14"/>
-    <p:sldId id="272" r:id="rId15"/>
-    <p:sldId id="271" r:id="rId16"/>
-    <p:sldId id="270" r:id="rId17"/>
-    <p:sldId id="269" r:id="rId18"/>
-    <p:sldId id="268" r:id="rId19"/>
-    <p:sldId id="261" r:id="rId20"/>
-    <p:sldId id="262" r:id="rId21"/>
-    <p:sldId id="264" r:id="rId22"/>
-    <p:sldId id="258" r:id="rId23"/>
-    <p:sldId id="265" r:id="rId24"/>
-    <p:sldId id="260" r:id="rId25"/>
+    <p:sldId id="280" r:id="rId13"/>
+    <p:sldId id="274" r:id="rId14"/>
+    <p:sldId id="273" r:id="rId15"/>
+    <p:sldId id="272" r:id="rId16"/>
+    <p:sldId id="271" r:id="rId17"/>
+    <p:sldId id="270" r:id="rId18"/>
+    <p:sldId id="269" r:id="rId19"/>
+    <p:sldId id="268" r:id="rId20"/>
+    <p:sldId id="261" r:id="rId21"/>
+    <p:sldId id="262" r:id="rId22"/>
+    <p:sldId id="264" r:id="rId23"/>
+    <p:sldId id="258" r:id="rId24"/>
+    <p:sldId id="265" r:id="rId25"/>
+    <p:sldId id="260" r:id="rId26"/>
   </p:sldIdLst>
   <p:sldSz cx="12192000" cy="6858000"/>
   <p:notesSz cx="6858000" cy="9144000"/>
@@ -220,7 +221,7 @@
           <a:p>
             <a:fld id="{1257FD7B-4E4A-644A-895D-BAD136711207}" type="datetimeFigureOut">
               <a:rPr lang="en-US" smtClean="0"/>
-              <a:t>10/9/18</a:t>
+              <a:t>10/15/18</a:t>
             </a:fld>
             <a:endParaRPr lang="en-US"/>
           </a:p>
@@ -572,6 +573,90 @@
 </p:notes>
 </file>
 
+<file path=ppt/notesSlides/notesSlide2.xml><?xml version="1.0" encoding="utf-8"?>
+<p:notes xmlns:a="http://schemas.openxmlformats.org/drawingml/2006/main" xmlns:r="http://schemas.openxmlformats.org/officeDocument/2006/relationships" xmlns:p="http://schemas.openxmlformats.org/presentationml/2006/main">
+  <p:cSld>
+    <p:spTree>
+      <p:nvGrpSpPr>
+        <p:cNvPr id="1" name=""/>
+        <p:cNvGrpSpPr/>
+        <p:nvPr/>
+      </p:nvGrpSpPr>
+      <p:grpSpPr>
+        <a:xfrm>
+          <a:off x="0" y="0"/>
+          <a:ext cx="0" cy="0"/>
+          <a:chOff x="0" y="0"/>
+          <a:chExt cx="0" cy="0"/>
+        </a:xfrm>
+      </p:grpSpPr>
+      <p:sp>
+        <p:nvSpPr>
+          <p:cNvPr id="2" name="Slide Image Placeholder 1"/>
+          <p:cNvSpPr>
+            <a:spLocks noGrp="1" noRot="1" noChangeAspect="1"/>
+          </p:cNvSpPr>
+          <p:nvPr>
+            <p:ph type="sldImg"/>
+          </p:nvPr>
+        </p:nvSpPr>
+        <p:spPr/>
+      </p:sp>
+      <p:sp>
+        <p:nvSpPr>
+          <p:cNvPr id="3" name="Notes Placeholder 2"/>
+          <p:cNvSpPr>
+            <a:spLocks noGrp="1"/>
+          </p:cNvSpPr>
+          <p:nvPr>
+            <p:ph type="body" idx="1"/>
+          </p:nvPr>
+        </p:nvSpPr>
+        <p:spPr/>
+        <p:txBody>
+          <a:bodyPr/>
+          <a:lstStyle/>
+          <a:p>
+            <a:endParaRPr lang="en-US" dirty="0"/>
+          </a:p>
+        </p:txBody>
+      </p:sp>
+      <p:sp>
+        <p:nvSpPr>
+          <p:cNvPr id="4" name="Slide Number Placeholder 3"/>
+          <p:cNvSpPr>
+            <a:spLocks noGrp="1"/>
+          </p:cNvSpPr>
+          <p:nvPr>
+            <p:ph type="sldNum" sz="quarter" idx="10"/>
+          </p:nvPr>
+        </p:nvSpPr>
+        <p:spPr/>
+        <p:txBody>
+          <a:bodyPr/>
+          <a:lstStyle/>
+          <a:p>
+            <a:fld id="{422B7439-6527-2E49-BE80-70AD13633956}" type="slidenum">
+              <a:rPr lang="en-US" smtClean="0"/>
+              <a:t>12</a:t>
+            </a:fld>
+            <a:endParaRPr lang="en-US"/>
+          </a:p>
+        </p:txBody>
+      </p:sp>
+    </p:spTree>
+    <p:extLst>
+      <p:ext uri="{BB962C8B-B14F-4D97-AF65-F5344CB8AC3E}">
+        <p14:creationId xmlns:p14="http://schemas.microsoft.com/office/powerpoint/2010/main" val="2001550284"/>
+      </p:ext>
+    </p:extLst>
+  </p:cSld>
+  <p:clrMapOvr>
+    <a:masterClrMapping/>
+  </p:clrMapOvr>
+</p:notes>
+</file>
+
 <file path=ppt/slideLayouts/slideLayout1.xml><?xml version="1.0" encoding="utf-8"?>
 <p:sldLayout xmlns:a="http://schemas.openxmlformats.org/drawingml/2006/main" xmlns:r="http://schemas.openxmlformats.org/officeDocument/2006/relationships" xmlns:p="http://schemas.openxmlformats.org/presentationml/2006/main" type="title" preserve="1">
   <p:cSld name="Title Slide">
@@ -703,7 +788,7 @@
           <a:p>
             <a:fld id="{B66C5E5C-AFE9-2848-A01D-417298715EDA}" type="datetimeFigureOut">
               <a:rPr lang="en-US" smtClean="0"/>
-              <a:t>10/9/18</a:t>
+              <a:t>10/15/18</a:t>
             </a:fld>
             <a:endParaRPr lang="en-US"/>
           </a:p>
@@ -873,7 +958,7 @@
           <a:p>
             <a:fld id="{B66C5E5C-AFE9-2848-A01D-417298715EDA}" type="datetimeFigureOut">
               <a:rPr lang="en-US" smtClean="0"/>
-              <a:t>10/9/18</a:t>
+              <a:t>10/15/18</a:t>
             </a:fld>
             <a:endParaRPr lang="en-US"/>
           </a:p>
@@ -1053,7 +1138,7 @@
           <a:p>
             <a:fld id="{B66C5E5C-AFE9-2848-A01D-417298715EDA}" type="datetimeFigureOut">
               <a:rPr lang="en-US" smtClean="0"/>
-              <a:t>10/9/18</a:t>
+              <a:t>10/15/18</a:t>
             </a:fld>
             <a:endParaRPr lang="en-US"/>
           </a:p>
@@ -1223,7 +1308,7 @@
           <a:p>
             <a:fld id="{B66C5E5C-AFE9-2848-A01D-417298715EDA}" type="datetimeFigureOut">
               <a:rPr lang="en-US" smtClean="0"/>
-              <a:t>10/9/18</a:t>
+              <a:t>10/15/18</a:t>
             </a:fld>
             <a:endParaRPr lang="en-US"/>
           </a:p>
@@ -1469,7 +1554,7 @@
           <a:p>
             <a:fld id="{B66C5E5C-AFE9-2848-A01D-417298715EDA}" type="datetimeFigureOut">
               <a:rPr lang="en-US" smtClean="0"/>
-              <a:t>10/9/18</a:t>
+              <a:t>10/15/18</a:t>
             </a:fld>
             <a:endParaRPr lang="en-US"/>
           </a:p>
@@ -1701,7 +1786,7 @@
           <a:p>
             <a:fld id="{B66C5E5C-AFE9-2848-A01D-417298715EDA}" type="datetimeFigureOut">
               <a:rPr lang="en-US" smtClean="0"/>
-              <a:t>10/9/18</a:t>
+              <a:t>10/15/18</a:t>
             </a:fld>
             <a:endParaRPr lang="en-US"/>
           </a:p>
@@ -2068,7 +2153,7 @@
           <a:p>
             <a:fld id="{B66C5E5C-AFE9-2848-A01D-417298715EDA}" type="datetimeFigureOut">
               <a:rPr lang="en-US" smtClean="0"/>
-              <a:t>10/9/18</a:t>
+              <a:t>10/15/18</a:t>
             </a:fld>
             <a:endParaRPr lang="en-US"/>
           </a:p>
@@ -2186,7 +2271,7 @@
           <a:p>
             <a:fld id="{B66C5E5C-AFE9-2848-A01D-417298715EDA}" type="datetimeFigureOut">
               <a:rPr lang="en-US" smtClean="0"/>
-              <a:t>10/9/18</a:t>
+              <a:t>10/15/18</a:t>
             </a:fld>
             <a:endParaRPr lang="en-US"/>
           </a:p>
@@ -2281,7 +2366,7 @@
           <a:p>
             <a:fld id="{B66C5E5C-AFE9-2848-A01D-417298715EDA}" type="datetimeFigureOut">
               <a:rPr lang="en-US" smtClean="0"/>
-              <a:t>10/9/18</a:t>
+              <a:t>10/15/18</a:t>
             </a:fld>
             <a:endParaRPr lang="en-US"/>
           </a:p>
@@ -2558,7 +2643,7 @@
           <a:p>
             <a:fld id="{B66C5E5C-AFE9-2848-A01D-417298715EDA}" type="datetimeFigureOut">
               <a:rPr lang="en-US" smtClean="0"/>
-              <a:t>10/9/18</a:t>
+              <a:t>10/15/18</a:t>
             </a:fld>
             <a:endParaRPr lang="en-US"/>
           </a:p>
@@ -2811,7 +2896,7 @@
           <a:p>
             <a:fld id="{B66C5E5C-AFE9-2848-A01D-417298715EDA}" type="datetimeFigureOut">
               <a:rPr lang="en-US" smtClean="0"/>
-              <a:t>10/9/18</a:t>
+              <a:t>10/15/18</a:t>
             </a:fld>
             <a:endParaRPr lang="en-US"/>
           </a:p>
@@ -3024,7 +3109,7 @@
           <a:p>
             <a:fld id="{B66C5E5C-AFE9-2848-A01D-417298715EDA}" type="datetimeFigureOut">
               <a:rPr lang="en-US" smtClean="0"/>
-              <a:t>10/9/18</a:t>
+              <a:t>10/15/18</a:t>
             </a:fld>
             <a:endParaRPr lang="en-US"/>
           </a:p>
@@ -3698,6 +3783,442 @@
           <a:chExt cx="0" cy="0"/>
         </a:xfrm>
       </p:grpSpPr>
+      <p:pic>
+        <p:nvPicPr>
+          <p:cNvPr id="12" name="Picture 11"/>
+          <p:cNvPicPr>
+            <a:picLocks noChangeAspect="1"/>
+          </p:cNvPicPr>
+          <p:nvPr/>
+        </p:nvPicPr>
+        <p:blipFill>
+          <a:blip r:embed="rId2">
+            <a:extLst>
+              <a:ext uri="{28A0092B-C50C-407E-A947-70E740481C1C}">
+                <a14:useLocalDpi xmlns:a14="http://schemas.microsoft.com/office/drawing/2010/main" val="0"/>
+              </a:ext>
+            </a:extLst>
+          </a:blip>
+          <a:stretch>
+            <a:fillRect/>
+          </a:stretch>
+        </p:blipFill>
+        <p:spPr>
+          <a:xfrm>
+            <a:off x="632586" y="-886968"/>
+            <a:ext cx="1034019" cy="1133856"/>
+          </a:xfrm>
+          <a:prstGeom prst="rect">
+            <a:avLst/>
+          </a:prstGeom>
+        </p:spPr>
+      </p:pic>
+      <p:pic>
+        <p:nvPicPr>
+          <p:cNvPr id="13" name="Picture 12"/>
+          <p:cNvPicPr>
+            <a:picLocks noChangeAspect="1"/>
+          </p:cNvPicPr>
+          <p:nvPr/>
+        </p:nvPicPr>
+        <p:blipFill>
+          <a:blip r:embed="rId3">
+            <a:extLst>
+              <a:ext uri="{28A0092B-C50C-407E-A947-70E740481C1C}">
+                <a14:useLocalDpi xmlns:a14="http://schemas.microsoft.com/office/drawing/2010/main" val="0"/>
+              </a:ext>
+            </a:extLst>
+          </a:blip>
+          <a:stretch>
+            <a:fillRect/>
+          </a:stretch>
+        </p:blipFill>
+        <p:spPr>
+          <a:xfrm>
+            <a:off x="11722520" y="-1559678"/>
+            <a:ext cx="1034080" cy="1133922"/>
+          </a:xfrm>
+          <a:prstGeom prst="rect">
+            <a:avLst/>
+          </a:prstGeom>
+        </p:spPr>
+      </p:pic>
+      <p:grpSp>
+        <p:nvGrpSpPr>
+          <p:cNvPr id="2" name="Group 1"/>
+          <p:cNvGrpSpPr/>
+          <p:nvPr/>
+        </p:nvGrpSpPr>
+        <p:grpSpPr>
+          <a:xfrm>
+            <a:off x="3750129" y="1009105"/>
+            <a:ext cx="6700157" cy="3979588"/>
+            <a:chOff x="3750129" y="1009105"/>
+            <a:chExt cx="6700157" cy="3979588"/>
+          </a:xfrm>
+        </p:grpSpPr>
+        <p:pic>
+          <p:nvPicPr>
+            <p:cNvPr id="6" name="Picture 5"/>
+            <p:cNvPicPr>
+              <a:picLocks noChangeAspect="1"/>
+            </p:cNvPicPr>
+            <p:nvPr/>
+          </p:nvPicPr>
+          <p:blipFill>
+            <a:blip r:embed="rId4">
+              <a:extLst>
+                <a:ext uri="{28A0092B-C50C-407E-A947-70E740481C1C}">
+                  <a14:useLocalDpi xmlns:a14="http://schemas.microsoft.com/office/drawing/2010/main" val="0"/>
+                </a:ext>
+              </a:extLst>
+            </a:blip>
+            <a:stretch>
+              <a:fillRect/>
+            </a:stretch>
+          </p:blipFill>
+          <p:spPr>
+            <a:xfrm>
+              <a:off x="3750129" y="1649185"/>
+              <a:ext cx="3805084" cy="2743200"/>
+            </a:xfrm>
+            <a:prstGeom prst="rect">
+              <a:avLst/>
+            </a:prstGeom>
+          </p:spPr>
+        </p:pic>
+        <p:grpSp>
+          <p:nvGrpSpPr>
+            <p:cNvPr id="18" name="Group 17"/>
+            <p:cNvGrpSpPr/>
+            <p:nvPr/>
+          </p:nvGrpSpPr>
+          <p:grpSpPr>
+            <a:xfrm>
+              <a:off x="5401210" y="1009105"/>
+              <a:ext cx="502920" cy="640080"/>
+              <a:chOff x="1242443" y="-1004266"/>
+              <a:chExt cx="502920" cy="640080"/>
+            </a:xfrm>
+          </p:grpSpPr>
+          <p:sp>
+            <p:nvSpPr>
+              <p:cNvPr id="19" name="Rectangle 18"/>
+              <p:cNvSpPr/>
+              <p:nvPr/>
+            </p:nvSpPr>
+            <p:spPr>
+              <a:xfrm>
+                <a:off x="1242443" y="-935686"/>
+                <a:ext cx="502920" cy="502920"/>
+              </a:xfrm>
+              <a:prstGeom prst="rect">
+                <a:avLst/>
+              </a:prstGeom>
+              <a:solidFill>
+                <a:schemeClr val="bg1"/>
+              </a:solidFill>
+              <a:ln>
+                <a:solidFill>
+                  <a:schemeClr val="tx1"/>
+                </a:solidFill>
+              </a:ln>
+            </p:spPr>
+            <p:style>
+              <a:lnRef idx="2">
+                <a:schemeClr val="accent1">
+                  <a:shade val="50000"/>
+                </a:schemeClr>
+              </a:lnRef>
+              <a:fillRef idx="1">
+                <a:schemeClr val="accent1"/>
+              </a:fillRef>
+              <a:effectRef idx="0">
+                <a:schemeClr val="accent1"/>
+              </a:effectRef>
+              <a:fontRef idx="minor">
+                <a:schemeClr val="lt1"/>
+              </a:fontRef>
+            </p:style>
+            <p:txBody>
+              <a:bodyPr rtlCol="0" anchor="ctr"/>
+              <a:lstStyle/>
+              <a:p>
+                <a:pPr algn="ctr"/>
+                <a:endParaRPr lang="en-US"/>
+              </a:p>
+            </p:txBody>
+          </p:sp>
+          <p:sp>
+            <p:nvSpPr>
+              <p:cNvPr id="20" name="TextBox 19"/>
+              <p:cNvSpPr txBox="1"/>
+              <p:nvPr/>
+            </p:nvSpPr>
+            <p:spPr>
+              <a:xfrm>
+                <a:off x="1265303" y="-1004266"/>
+                <a:ext cx="457200" cy="640080"/>
+              </a:xfrm>
+              <a:prstGeom prst="rect">
+                <a:avLst/>
+              </a:prstGeom>
+              <a:noFill/>
+            </p:spPr>
+            <p:txBody>
+              <a:bodyPr wrap="square" rtlCol="0">
+                <a:spAutoFit/>
+              </a:bodyPr>
+              <a:lstStyle/>
+              <a:p>
+                <a:pPr algn="ctr"/>
+                <a:r>
+                  <a:rPr lang="en-US" sz="3600" b="1" dirty="0" smtClean="0"/>
+                  <a:t>a</a:t>
+                </a:r>
+                <a:endParaRPr lang="en-US" sz="3600" b="1" dirty="0"/>
+              </a:p>
+            </p:txBody>
+          </p:sp>
+        </p:grpSp>
+        <p:grpSp>
+          <p:nvGrpSpPr>
+            <p:cNvPr id="21" name="Group 20"/>
+            <p:cNvGrpSpPr/>
+            <p:nvPr/>
+          </p:nvGrpSpPr>
+          <p:grpSpPr>
+            <a:xfrm>
+              <a:off x="6364083" y="4302894"/>
+              <a:ext cx="502920" cy="640080"/>
+              <a:chOff x="1242443" y="-1004266"/>
+              <a:chExt cx="502920" cy="640080"/>
+            </a:xfrm>
+          </p:grpSpPr>
+          <p:sp>
+            <p:nvSpPr>
+              <p:cNvPr id="22" name="Rectangle 21"/>
+              <p:cNvSpPr/>
+              <p:nvPr/>
+            </p:nvSpPr>
+            <p:spPr>
+              <a:xfrm>
+                <a:off x="1242443" y="-935686"/>
+                <a:ext cx="502920" cy="502920"/>
+              </a:xfrm>
+              <a:prstGeom prst="rect">
+                <a:avLst/>
+              </a:prstGeom>
+              <a:solidFill>
+                <a:schemeClr val="bg1"/>
+              </a:solidFill>
+              <a:ln>
+                <a:solidFill>
+                  <a:schemeClr val="tx1"/>
+                </a:solidFill>
+              </a:ln>
+            </p:spPr>
+            <p:style>
+              <a:lnRef idx="2">
+                <a:schemeClr val="accent1">
+                  <a:shade val="50000"/>
+                </a:schemeClr>
+              </a:lnRef>
+              <a:fillRef idx="1">
+                <a:schemeClr val="accent1"/>
+              </a:fillRef>
+              <a:effectRef idx="0">
+                <a:schemeClr val="accent1"/>
+              </a:effectRef>
+              <a:fontRef idx="minor">
+                <a:schemeClr val="lt1"/>
+              </a:fontRef>
+            </p:style>
+            <p:txBody>
+              <a:bodyPr rtlCol="0" anchor="ctr"/>
+              <a:lstStyle/>
+              <a:p>
+                <a:pPr algn="ctr"/>
+                <a:endParaRPr lang="en-US"/>
+              </a:p>
+            </p:txBody>
+          </p:sp>
+          <p:sp>
+            <p:nvSpPr>
+              <p:cNvPr id="23" name="TextBox 22"/>
+              <p:cNvSpPr txBox="1"/>
+              <p:nvPr/>
+            </p:nvSpPr>
+            <p:spPr>
+              <a:xfrm>
+                <a:off x="1265303" y="-1004266"/>
+                <a:ext cx="457200" cy="640080"/>
+              </a:xfrm>
+              <a:prstGeom prst="rect">
+                <a:avLst/>
+              </a:prstGeom>
+              <a:noFill/>
+            </p:spPr>
+            <p:txBody>
+              <a:bodyPr wrap="square" rtlCol="0">
+                <a:spAutoFit/>
+              </a:bodyPr>
+              <a:lstStyle/>
+              <a:p>
+                <a:pPr algn="ctr"/>
+                <a:r>
+                  <a:rPr lang="en-US" sz="3600" b="1" dirty="0" smtClean="0"/>
+                  <a:t>c</a:t>
+                </a:r>
+                <a:endParaRPr lang="en-US" sz="3600" b="1" dirty="0"/>
+              </a:p>
+            </p:txBody>
+          </p:sp>
+        </p:grpSp>
+        <p:grpSp>
+          <p:nvGrpSpPr>
+            <p:cNvPr id="24" name="Group 23"/>
+            <p:cNvGrpSpPr/>
+            <p:nvPr/>
+          </p:nvGrpSpPr>
+          <p:grpSpPr>
+            <a:xfrm>
+              <a:off x="4346730" y="4348613"/>
+              <a:ext cx="502920" cy="640080"/>
+              <a:chOff x="1242443" y="-1004266"/>
+              <a:chExt cx="502920" cy="640080"/>
+            </a:xfrm>
+          </p:grpSpPr>
+          <p:sp>
+            <p:nvSpPr>
+              <p:cNvPr id="25" name="Rectangle 24"/>
+              <p:cNvSpPr/>
+              <p:nvPr/>
+            </p:nvSpPr>
+            <p:spPr>
+              <a:xfrm>
+                <a:off x="1242443" y="-935686"/>
+                <a:ext cx="502920" cy="502920"/>
+              </a:xfrm>
+              <a:prstGeom prst="rect">
+                <a:avLst/>
+              </a:prstGeom>
+              <a:solidFill>
+                <a:schemeClr val="bg1"/>
+              </a:solidFill>
+              <a:ln>
+                <a:solidFill>
+                  <a:schemeClr val="tx1"/>
+                </a:solidFill>
+              </a:ln>
+            </p:spPr>
+            <p:style>
+              <a:lnRef idx="2">
+                <a:schemeClr val="accent1">
+                  <a:shade val="50000"/>
+                </a:schemeClr>
+              </a:lnRef>
+              <a:fillRef idx="1">
+                <a:schemeClr val="accent1"/>
+              </a:fillRef>
+              <a:effectRef idx="0">
+                <a:schemeClr val="accent1"/>
+              </a:effectRef>
+              <a:fontRef idx="minor">
+                <a:schemeClr val="lt1"/>
+              </a:fontRef>
+            </p:style>
+            <p:txBody>
+              <a:bodyPr rtlCol="0" anchor="ctr"/>
+              <a:lstStyle/>
+              <a:p>
+                <a:pPr algn="ctr"/>
+                <a:endParaRPr lang="en-US"/>
+              </a:p>
+            </p:txBody>
+          </p:sp>
+          <p:sp>
+            <p:nvSpPr>
+              <p:cNvPr id="26" name="TextBox 25"/>
+              <p:cNvSpPr txBox="1"/>
+              <p:nvPr/>
+            </p:nvSpPr>
+            <p:spPr>
+              <a:xfrm>
+                <a:off x="1265303" y="-1004266"/>
+                <a:ext cx="457200" cy="640080"/>
+              </a:xfrm>
+              <a:prstGeom prst="rect">
+                <a:avLst/>
+              </a:prstGeom>
+              <a:noFill/>
+            </p:spPr>
+            <p:txBody>
+              <a:bodyPr wrap="square" rtlCol="0">
+                <a:spAutoFit/>
+              </a:bodyPr>
+              <a:lstStyle/>
+              <a:p>
+                <a:pPr algn="ctr"/>
+                <a:r>
+                  <a:rPr lang="en-US" sz="3600" b="1" dirty="0" smtClean="0"/>
+                  <a:t>b</a:t>
+                </a:r>
+                <a:endParaRPr lang="en-US" sz="3600" b="1" dirty="0"/>
+              </a:p>
+            </p:txBody>
+          </p:sp>
+        </p:grpSp>
+        <p:sp>
+          <p:nvSpPr>
+            <p:cNvPr id="27" name="Rectangle 26"/>
+            <p:cNvSpPr/>
+            <p:nvPr/>
+          </p:nvSpPr>
+          <p:spPr>
+            <a:xfrm>
+              <a:off x="7578071" y="1077685"/>
+              <a:ext cx="2872215" cy="1384995"/>
+            </a:xfrm>
+            <a:prstGeom prst="rect">
+              <a:avLst/>
+            </a:prstGeom>
+          </p:spPr>
+          <p:txBody>
+            <a:bodyPr wrap="square">
+              <a:spAutoFit/>
+            </a:bodyPr>
+            <a:lstStyle/>
+            <a:p>
+              <a:pPr algn="ctr"/>
+              <a:r>
+                <a:rPr lang="en-US" sz="2800" b="1" dirty="0" smtClean="0"/>
+                <a:t>a</a:t>
+              </a:r>
+              <a:r>
+                <a:rPr lang="en-US" sz="2800" dirty="0" smtClean="0"/>
+                <a:t> is the parent node of the child nodes </a:t>
+              </a:r>
+              <a:r>
+                <a:rPr lang="en-US" sz="2800" b="1" dirty="0" smtClean="0"/>
+                <a:t>b</a:t>
+              </a:r>
+              <a:r>
+                <a:rPr lang="en-US" sz="2800" dirty="0" smtClean="0"/>
+                <a:t> and </a:t>
+              </a:r>
+              <a:r>
+                <a:rPr lang="en-US" sz="2800" b="1" dirty="0" smtClean="0"/>
+                <a:t>c</a:t>
+              </a:r>
+              <a:r>
+                <a:rPr lang="en-US" sz="2800" dirty="0" smtClean="0"/>
+                <a:t> </a:t>
+              </a:r>
+            </a:p>
+          </p:txBody>
+        </p:sp>
+      </p:grpSp>
     </p:spTree>
     <p:extLst>
       <p:ext uri="{BB962C8B-B14F-4D97-AF65-F5344CB8AC3E}">
@@ -3728,6 +4249,159 @@
           <a:chExt cx="0" cy="0"/>
         </a:xfrm>
       </p:grpSpPr>
+      <p:grpSp>
+        <p:nvGrpSpPr>
+          <p:cNvPr id="15" name="Group 14"/>
+          <p:cNvGrpSpPr/>
+          <p:nvPr/>
+        </p:nvGrpSpPr>
+        <p:grpSpPr>
+          <a:xfrm>
+            <a:off x="756125" y="1077685"/>
+            <a:ext cx="10951461" cy="1938992"/>
+            <a:chOff x="756125" y="1077685"/>
+            <a:chExt cx="10951461" cy="1938992"/>
+          </a:xfrm>
+        </p:grpSpPr>
+        <p:pic>
+          <p:nvPicPr>
+            <p:cNvPr id="2" name="Picture 1"/>
+            <p:cNvPicPr>
+              <a:picLocks noChangeAspect="1"/>
+            </p:cNvPicPr>
+            <p:nvPr/>
+          </p:nvPicPr>
+          <p:blipFill>
+            <a:blip r:embed="rId2">
+              <a:extLst>
+                <a:ext uri="{28A0092B-C50C-407E-A947-70E740481C1C}">
+                  <a14:useLocalDpi xmlns:a14="http://schemas.microsoft.com/office/drawing/2010/main" val="0"/>
+                </a:ext>
+              </a:extLst>
+            </a:blip>
+            <a:stretch>
+              <a:fillRect/>
+            </a:stretch>
+          </p:blipFill>
+          <p:spPr>
+            <a:xfrm>
+              <a:off x="756125" y="1077685"/>
+              <a:ext cx="5803900" cy="1397000"/>
+            </a:xfrm>
+            <a:prstGeom prst="rect">
+              <a:avLst/>
+            </a:prstGeom>
+            <a:ln w="12700">
+              <a:solidFill>
+                <a:schemeClr val="tx1"/>
+              </a:solidFill>
+            </a:ln>
+          </p:spPr>
+        </p:pic>
+        <p:sp>
+          <p:nvSpPr>
+            <p:cNvPr id="8" name="Rectangle 7"/>
+            <p:cNvSpPr/>
+            <p:nvPr/>
+          </p:nvSpPr>
+          <p:spPr>
+            <a:xfrm>
+              <a:off x="6874329" y="1077685"/>
+              <a:ext cx="4833257" cy="1938992"/>
+            </a:xfrm>
+            <a:prstGeom prst="rect">
+              <a:avLst/>
+            </a:prstGeom>
+            <a:ln w="12700">
+              <a:solidFill>
+                <a:schemeClr val="tx1"/>
+              </a:solidFill>
+            </a:ln>
+          </p:spPr>
+          <p:txBody>
+            <a:bodyPr wrap="square">
+              <a:spAutoFit/>
+            </a:bodyPr>
+            <a:lstStyle/>
+            <a:p>
+              <a:r>
+                <a:rPr lang="en-US" sz="2000" dirty="0" smtClean="0"/>
+                <a:t>f: feature split on</a:t>
+              </a:r>
+            </a:p>
+            <a:p>
+              <a:r>
+                <a:rPr lang="en-US" sz="2000" dirty="0" err="1" smtClean="0"/>
+                <a:t>D</a:t>
+              </a:r>
+              <a:r>
+                <a:rPr lang="en-US" sz="2000" baseline="-25000" dirty="0" err="1" smtClean="0"/>
+                <a:t>p</a:t>
+              </a:r>
+              <a:r>
+                <a:rPr lang="en-US" sz="2000" dirty="0" smtClean="0"/>
+                <a:t>: dataset of the parent node</a:t>
+              </a:r>
+            </a:p>
+            <a:p>
+              <a:r>
+                <a:rPr lang="en-US" sz="2000" dirty="0" err="1" smtClean="0"/>
+                <a:t>D</a:t>
+              </a:r>
+              <a:r>
+                <a:rPr lang="en-US" sz="2000" baseline="-25000" dirty="0" err="1" smtClean="0"/>
+                <a:t>j</a:t>
+              </a:r>
+              <a:r>
+                <a:rPr lang="en-US" sz="2000" dirty="0" smtClean="0"/>
+                <a:t>: dataset of the </a:t>
+              </a:r>
+              <a:r>
+                <a:rPr lang="en-US" sz="2000" dirty="0" err="1" smtClean="0"/>
+                <a:t>jth</a:t>
+              </a:r>
+              <a:r>
+                <a:rPr lang="en-US" sz="2000" dirty="0" smtClean="0"/>
+                <a:t> child node</a:t>
+              </a:r>
+            </a:p>
+            <a:p>
+              <a:r>
+                <a:rPr lang="en-US" sz="2000" dirty="0" smtClean="0"/>
+                <a:t>I: impurity criterion</a:t>
+              </a:r>
+            </a:p>
+            <a:p>
+              <a:r>
+                <a:rPr lang="en-US" sz="2000" dirty="0" smtClean="0"/>
+                <a:t>N: total number of samples</a:t>
+              </a:r>
+            </a:p>
+            <a:p>
+              <a:r>
+                <a:rPr lang="en-US" sz="2000" dirty="0" err="1" smtClean="0"/>
+                <a:t>N</a:t>
+              </a:r>
+              <a:r>
+                <a:rPr lang="en-US" sz="2000" baseline="-25000" dirty="0" err="1"/>
+                <a:t>j</a:t>
+              </a:r>
+              <a:r>
+                <a:rPr lang="en-US" sz="2000" dirty="0" smtClean="0"/>
+                <a:t>: number of samples at </a:t>
+              </a:r>
+              <a:r>
+                <a:rPr lang="en-US" sz="2000" dirty="0" err="1" smtClean="0"/>
+                <a:t>jth</a:t>
+              </a:r>
+              <a:r>
+                <a:rPr lang="en-US" sz="2000" dirty="0" smtClean="0"/>
+                <a:t> child node</a:t>
+              </a:r>
+            </a:p>
+          </p:txBody>
+        </p:sp>
+      </p:grpSp>
     </p:spTree>
     <p:extLst>
       <p:ext uri="{BB962C8B-B14F-4D97-AF65-F5344CB8AC3E}">
@@ -3758,48 +4432,239 @@
           <a:chExt cx="0" cy="0"/>
         </a:xfrm>
       </p:grpSpPr>
-      <p:sp>
-        <p:nvSpPr>
-          <p:cNvPr id="2" name="Title 1"/>
-          <p:cNvSpPr>
-            <a:spLocks noGrp="1"/>
-          </p:cNvSpPr>
-          <p:nvPr>
-            <p:ph type="title"/>
-          </p:nvPr>
-        </p:nvSpPr>
-        <p:spPr/>
-        <p:txBody>
-          <a:bodyPr/>
-          <a:lstStyle/>
-          <a:p>
-            <a:endParaRPr lang="en-US"/>
-          </a:p>
-        </p:txBody>
-      </p:sp>
-      <p:sp>
-        <p:nvSpPr>
-          <p:cNvPr id="3" name="Content Placeholder 2"/>
-          <p:cNvSpPr>
-            <a:spLocks noGrp="1"/>
-          </p:cNvSpPr>
-          <p:nvPr>
-            <p:ph idx="1"/>
-          </p:nvPr>
-        </p:nvSpPr>
-        <p:spPr/>
-        <p:txBody>
-          <a:bodyPr/>
-          <a:lstStyle/>
-          <a:p>
-            <a:endParaRPr lang="en-US"/>
-          </a:p>
-        </p:txBody>
-      </p:sp>
+      <p:pic>
+        <p:nvPicPr>
+          <p:cNvPr id="2" name="Picture 1"/>
+          <p:cNvPicPr>
+            <a:picLocks noChangeAspect="1"/>
+          </p:cNvPicPr>
+          <p:nvPr/>
+        </p:nvPicPr>
+        <p:blipFill>
+          <a:blip r:embed="rId3">
+            <a:extLst>
+              <a:ext uri="{28A0092B-C50C-407E-A947-70E740481C1C}">
+                <a14:useLocalDpi xmlns:a14="http://schemas.microsoft.com/office/drawing/2010/main" val="0"/>
+              </a:ext>
+            </a:extLst>
+          </a:blip>
+          <a:stretch>
+            <a:fillRect/>
+          </a:stretch>
+        </p:blipFill>
+        <p:spPr>
+          <a:xfrm>
+            <a:off x="756125" y="1077685"/>
+            <a:ext cx="5803900" cy="1397000"/>
+          </a:xfrm>
+          <a:prstGeom prst="rect">
+            <a:avLst/>
+          </a:prstGeom>
+          <a:ln w="12700">
+            <a:solidFill>
+              <a:schemeClr val="tx1"/>
+            </a:solidFill>
+          </a:ln>
+        </p:spPr>
+      </p:pic>
+      <p:grpSp>
+        <p:nvGrpSpPr>
+          <p:cNvPr id="6" name="Group 5"/>
+          <p:cNvGrpSpPr/>
+          <p:nvPr/>
+        </p:nvGrpSpPr>
+        <p:grpSpPr>
+          <a:xfrm>
+            <a:off x="467088" y="3931557"/>
+            <a:ext cx="11240498" cy="4256345"/>
+            <a:chOff x="467088" y="3931557"/>
+            <a:chExt cx="11240498" cy="4256345"/>
+          </a:xfrm>
+        </p:grpSpPr>
+        <p:sp>
+          <p:nvSpPr>
+            <p:cNvPr id="8" name="Rectangle 7"/>
+            <p:cNvSpPr/>
+            <p:nvPr/>
+          </p:nvSpPr>
+          <p:spPr>
+            <a:xfrm>
+              <a:off x="467088" y="5633357"/>
+              <a:ext cx="11240498" cy="2554545"/>
+            </a:xfrm>
+            <a:prstGeom prst="rect">
+              <a:avLst/>
+            </a:prstGeom>
+            <a:ln w="0">
+              <a:noFill/>
+            </a:ln>
+          </p:spPr>
+          <p:txBody>
+            <a:bodyPr wrap="square">
+              <a:spAutoFit/>
+            </a:bodyPr>
+            <a:lstStyle/>
+            <a:p>
+              <a:r>
+                <a:rPr lang="en-US" sz="2000" dirty="0" smtClean="0"/>
+                <a:t>f: feature split on</a:t>
+              </a:r>
+            </a:p>
+            <a:p>
+              <a:r>
+                <a:rPr lang="en-US" sz="2000" dirty="0" err="1" smtClean="0"/>
+                <a:t>D</a:t>
+              </a:r>
+              <a:r>
+                <a:rPr lang="en-US" sz="2000" baseline="-25000" dirty="0" err="1" smtClean="0"/>
+                <a:t>p</a:t>
+              </a:r>
+              <a:r>
+                <a:rPr lang="en-US" sz="2000" dirty="0" smtClean="0"/>
+                <a:t>: dataset of the parent node</a:t>
+              </a:r>
+            </a:p>
+            <a:p>
+              <a:r>
+                <a:rPr lang="en-US" sz="2000" dirty="0" err="1" smtClean="0"/>
+                <a:t>D</a:t>
+              </a:r>
+              <a:r>
+                <a:rPr lang="en-US" sz="2000" baseline="-25000" dirty="0" err="1" smtClean="0"/>
+                <a:t>left</a:t>
+              </a:r>
+              <a:r>
+                <a:rPr lang="en-US" sz="2000" dirty="0" smtClean="0"/>
+                <a:t>: dataset of the left child node</a:t>
+              </a:r>
+            </a:p>
+            <a:p>
+              <a:r>
+                <a:rPr lang="en-US" sz="2000" dirty="0" err="1" smtClean="0"/>
+                <a:t>D</a:t>
+              </a:r>
+              <a:r>
+                <a:rPr lang="en-US" sz="2000" baseline="-25000" dirty="0" err="1" smtClean="0"/>
+                <a:t>right</a:t>
+              </a:r>
+              <a:r>
+                <a:rPr lang="en-US" sz="2000" dirty="0" smtClean="0"/>
+                <a:t>: </a:t>
+              </a:r>
+              <a:r>
+                <a:rPr lang="en-US" sz="2000" dirty="0"/>
+                <a:t>dataset of the </a:t>
+              </a:r>
+              <a:r>
+                <a:rPr lang="en-US" sz="2000" dirty="0" smtClean="0"/>
+                <a:t>right </a:t>
+              </a:r>
+              <a:r>
+                <a:rPr lang="en-US" sz="2000" dirty="0"/>
+                <a:t>child </a:t>
+              </a:r>
+              <a:r>
+                <a:rPr lang="en-US" sz="2000" dirty="0" smtClean="0"/>
+                <a:t>node</a:t>
+              </a:r>
+            </a:p>
+            <a:p>
+              <a:r>
+                <a:rPr lang="en-US" sz="2000" dirty="0" smtClean="0"/>
+                <a:t>I: impurity criterion</a:t>
+              </a:r>
+            </a:p>
+            <a:p>
+              <a:r>
+                <a:rPr lang="en-US" sz="2000" dirty="0" smtClean="0"/>
+                <a:t>N: total number of samples</a:t>
+              </a:r>
+            </a:p>
+            <a:p>
+              <a:r>
+                <a:rPr lang="en-US" sz="2000" dirty="0" err="1" smtClean="0"/>
+                <a:t>N</a:t>
+              </a:r>
+              <a:r>
+                <a:rPr lang="en-US" sz="2000" baseline="-25000" dirty="0" err="1" smtClean="0"/>
+                <a:t>left</a:t>
+              </a:r>
+              <a:r>
+                <a:rPr lang="en-US" sz="2000" dirty="0" smtClean="0"/>
+                <a:t>: number of samples at left child node</a:t>
+              </a:r>
+            </a:p>
+            <a:p>
+              <a:r>
+                <a:rPr lang="en-US" sz="2000" dirty="0" err="1" smtClean="0"/>
+                <a:t>N</a:t>
+              </a:r>
+              <a:r>
+                <a:rPr lang="en-US" sz="2000" baseline="-25000" dirty="0" err="1" smtClean="0"/>
+                <a:t>right</a:t>
+              </a:r>
+              <a:r>
+                <a:rPr lang="en-US" sz="2000" dirty="0" smtClean="0"/>
+                <a:t>: </a:t>
+              </a:r>
+              <a:r>
+                <a:rPr lang="en-US" sz="2000" dirty="0"/>
+                <a:t>number of samples at </a:t>
+              </a:r>
+              <a:r>
+                <a:rPr lang="en-US" sz="2000" dirty="0" smtClean="0"/>
+                <a:t>right </a:t>
+              </a:r>
+              <a:r>
+                <a:rPr lang="en-US" sz="2000" dirty="0"/>
+                <a:t>child </a:t>
+              </a:r>
+              <a:r>
+                <a:rPr lang="en-US" sz="2000" dirty="0" smtClean="0"/>
+                <a:t>node</a:t>
+              </a:r>
+              <a:endParaRPr lang="en-US" sz="2000" dirty="0"/>
+            </a:p>
+          </p:txBody>
+        </p:sp>
+        <p:pic>
+          <p:nvPicPr>
+            <p:cNvPr id="3" name="Picture 2"/>
+            <p:cNvPicPr>
+              <a:picLocks noChangeAspect="1"/>
+            </p:cNvPicPr>
+            <p:nvPr/>
+          </p:nvPicPr>
+          <p:blipFill>
+            <a:blip r:embed="rId4">
+              <a:extLst>
+                <a:ext uri="{28A0092B-C50C-407E-A947-70E740481C1C}">
+                  <a14:useLocalDpi xmlns:a14="http://schemas.microsoft.com/office/drawing/2010/main" val="0"/>
+                </a:ext>
+              </a:extLst>
+            </a:blip>
+            <a:stretch>
+              <a:fillRect/>
+            </a:stretch>
+          </p:blipFill>
+          <p:spPr>
+            <a:xfrm>
+              <a:off x="467088" y="3931557"/>
+              <a:ext cx="11240498" cy="1399032"/>
+            </a:xfrm>
+            <a:prstGeom prst="rect">
+              <a:avLst/>
+            </a:prstGeom>
+            <a:ln w="0">
+              <a:noFill/>
+            </a:ln>
+          </p:spPr>
+        </p:pic>
+      </p:grpSp>
     </p:spTree>
     <p:extLst>
       <p:ext uri="{BB962C8B-B14F-4D97-AF65-F5344CB8AC3E}">
-        <p14:creationId xmlns:p14="http://schemas.microsoft.com/office/powerpoint/2010/main" val="1712686614"/>
+        <p14:creationId xmlns:p14="http://schemas.microsoft.com/office/powerpoint/2010/main" val="1524353251"/>
       </p:ext>
     </p:extLst>
   </p:cSld>
@@ -3867,7 +4732,7 @@
     </p:spTree>
     <p:extLst>
       <p:ext uri="{BB962C8B-B14F-4D97-AF65-F5344CB8AC3E}">
-        <p14:creationId xmlns:p14="http://schemas.microsoft.com/office/powerpoint/2010/main" val="780668191"/>
+        <p14:creationId xmlns:p14="http://schemas.microsoft.com/office/powerpoint/2010/main" val="1712686614"/>
       </p:ext>
     </p:extLst>
   </p:cSld>
@@ -3935,7 +4800,7 @@
     </p:spTree>
     <p:extLst>
       <p:ext uri="{BB962C8B-B14F-4D97-AF65-F5344CB8AC3E}">
-        <p14:creationId xmlns:p14="http://schemas.microsoft.com/office/powerpoint/2010/main" val="781507149"/>
+        <p14:creationId xmlns:p14="http://schemas.microsoft.com/office/powerpoint/2010/main" val="780668191"/>
       </p:ext>
     </p:extLst>
   </p:cSld>
@@ -4003,7 +4868,7 @@
     </p:spTree>
     <p:extLst>
       <p:ext uri="{BB962C8B-B14F-4D97-AF65-F5344CB8AC3E}">
-        <p14:creationId xmlns:p14="http://schemas.microsoft.com/office/powerpoint/2010/main" val="1947692910"/>
+        <p14:creationId xmlns:p14="http://schemas.microsoft.com/office/powerpoint/2010/main" val="781507149"/>
       </p:ext>
     </p:extLst>
   </p:cSld>
@@ -4071,7 +4936,7 @@
     </p:spTree>
     <p:extLst>
       <p:ext uri="{BB962C8B-B14F-4D97-AF65-F5344CB8AC3E}">
-        <p14:creationId xmlns:p14="http://schemas.microsoft.com/office/powerpoint/2010/main" val="412184355"/>
+        <p14:creationId xmlns:p14="http://schemas.microsoft.com/office/powerpoint/2010/main" val="1947692910"/>
       </p:ext>
     </p:extLst>
   </p:cSld>
@@ -4139,7 +5004,7 @@
     </p:spTree>
     <p:extLst>
       <p:ext uri="{BB962C8B-B14F-4D97-AF65-F5344CB8AC3E}">
-        <p14:creationId xmlns:p14="http://schemas.microsoft.com/office/powerpoint/2010/main" val="1578406478"/>
+        <p14:creationId xmlns:p14="http://schemas.microsoft.com/office/powerpoint/2010/main" val="412184355"/>
       </p:ext>
     </p:extLst>
   </p:cSld>
@@ -4207,7 +5072,7 @@
     </p:spTree>
     <p:extLst>
       <p:ext uri="{BB962C8B-B14F-4D97-AF65-F5344CB8AC3E}">
-        <p14:creationId xmlns:p14="http://schemas.microsoft.com/office/powerpoint/2010/main" val="721245678"/>
+        <p14:creationId xmlns:p14="http://schemas.microsoft.com/office/powerpoint/2010/main" val="1578406478"/>
       </p:ext>
     </p:extLst>
   </p:cSld>
@@ -4234,10 +5099,48 @@
           <a:chExt cx="0" cy="0"/>
         </a:xfrm>
       </p:grpSpPr>
+      <p:sp>
+        <p:nvSpPr>
+          <p:cNvPr id="2" name="Title 1"/>
+          <p:cNvSpPr>
+            <a:spLocks noGrp="1"/>
+          </p:cNvSpPr>
+          <p:nvPr>
+            <p:ph type="title"/>
+          </p:nvPr>
+        </p:nvSpPr>
+        <p:spPr/>
+        <p:txBody>
+          <a:bodyPr/>
+          <a:lstStyle/>
+          <a:p>
+            <a:endParaRPr lang="en-US"/>
+          </a:p>
+        </p:txBody>
+      </p:sp>
+      <p:sp>
+        <p:nvSpPr>
+          <p:cNvPr id="3" name="Content Placeholder 2"/>
+          <p:cNvSpPr>
+            <a:spLocks noGrp="1"/>
+          </p:cNvSpPr>
+          <p:nvPr>
+            <p:ph idx="1"/>
+          </p:nvPr>
+        </p:nvSpPr>
+        <p:spPr/>
+        <p:txBody>
+          <a:bodyPr/>
+          <a:lstStyle/>
+          <a:p>
+            <a:endParaRPr lang="en-US"/>
+          </a:p>
+        </p:txBody>
+      </p:sp>
     </p:spTree>
     <p:extLst>
       <p:ext uri="{BB962C8B-B14F-4D97-AF65-F5344CB8AC3E}">
-        <p14:creationId xmlns:p14="http://schemas.microsoft.com/office/powerpoint/2010/main" val="1437185423"/>
+        <p14:creationId xmlns:p14="http://schemas.microsoft.com/office/powerpoint/2010/main" val="721245678"/>
       </p:ext>
     </p:extLst>
   </p:cSld>
@@ -4612,6 +5515,36 @@
 </file>
 
 <file path=ppt/slides/slide20.xml><?xml version="1.0" encoding="utf-8"?>
+<p:sld xmlns:a="http://schemas.openxmlformats.org/drawingml/2006/main" xmlns:r="http://schemas.openxmlformats.org/officeDocument/2006/relationships" xmlns:p="http://schemas.openxmlformats.org/presentationml/2006/main">
+  <p:cSld>
+    <p:spTree>
+      <p:nvGrpSpPr>
+        <p:cNvPr id="1" name=""/>
+        <p:cNvGrpSpPr/>
+        <p:nvPr/>
+      </p:nvGrpSpPr>
+      <p:grpSpPr>
+        <a:xfrm>
+          <a:off x="0" y="0"/>
+          <a:ext cx="0" cy="0"/>
+          <a:chOff x="0" y="0"/>
+          <a:chExt cx="0" cy="0"/>
+        </a:xfrm>
+      </p:grpSpPr>
+    </p:spTree>
+    <p:extLst>
+      <p:ext uri="{BB962C8B-B14F-4D97-AF65-F5344CB8AC3E}">
+        <p14:creationId xmlns:p14="http://schemas.microsoft.com/office/powerpoint/2010/main" val="1437185423"/>
+      </p:ext>
+    </p:extLst>
+  </p:cSld>
+  <p:clrMapOvr>
+    <a:masterClrMapping/>
+  </p:clrMapOvr>
+</p:sld>
+</file>
+
+<file path=ppt/slides/slide21.xml><?xml version="1.0" encoding="utf-8"?>
 <p:sld xmlns:a="http://schemas.openxmlformats.org/drawingml/2006/main" xmlns:r="http://schemas.openxmlformats.org/officeDocument/2006/relationships" xmlns:p="http://schemas.openxmlformats.org/presentationml/2006/main">
   <p:cSld>
     <p:spTree>
@@ -4911,7 +5844,7 @@
 </p:sld>
 </file>
 
-<file path=ppt/slides/slide21.xml><?xml version="1.0" encoding="utf-8"?>
+<file path=ppt/slides/slide22.xml><?xml version="1.0" encoding="utf-8"?>
 <p:sld xmlns:a="http://schemas.openxmlformats.org/drawingml/2006/main" xmlns:r="http://schemas.openxmlformats.org/officeDocument/2006/relationships" xmlns:p="http://schemas.openxmlformats.org/presentationml/2006/main">
   <p:cSld>
     <p:spTree>
@@ -5120,7 +6053,7 @@
 </p:sld>
 </file>
 
-<file path=ppt/slides/slide22.xml><?xml version="1.0" encoding="utf-8"?>
+<file path=ppt/slides/slide23.xml><?xml version="1.0" encoding="utf-8"?>
 <p:sld xmlns:a="http://schemas.openxmlformats.org/drawingml/2006/main" xmlns:r="http://schemas.openxmlformats.org/officeDocument/2006/relationships" xmlns:p="http://schemas.openxmlformats.org/presentationml/2006/main">
   <p:cSld>
     <p:spTree>
@@ -5391,7 +6324,7 @@
 </p:sld>
 </file>
 
-<file path=ppt/slides/slide23.xml><?xml version="1.0" encoding="utf-8"?>
+<file path=ppt/slides/slide24.xml><?xml version="1.0" encoding="utf-8"?>
 <p:sld xmlns:a="http://schemas.openxmlformats.org/drawingml/2006/main" xmlns:r="http://schemas.openxmlformats.org/officeDocument/2006/relationships" xmlns:p="http://schemas.openxmlformats.org/presentationml/2006/main">
   <p:cSld>
     <p:spTree>
@@ -5656,7 +6589,7 @@
 </p:sld>
 </file>
 
-<file path=ppt/slides/slide24.xml><?xml version="1.0" encoding="utf-8"?>
+<file path=ppt/slides/slide25.xml><?xml version="1.0" encoding="utf-8"?>
 <p:sld xmlns:a="http://schemas.openxmlformats.org/drawingml/2006/main" xmlns:r="http://schemas.openxmlformats.org/officeDocument/2006/relationships" xmlns:p="http://schemas.openxmlformats.org/presentationml/2006/main">
   <p:cSld>
     <p:spTree>
@@ -9135,7 +10068,6 @@
                   <a:rPr lang="en-US" sz="2000" dirty="0" smtClean="0"/>
                   <a:t>'</a:t>
                 </a:r>
-                <a:endParaRPr lang="en-US" sz="2000" dirty="0" smtClean="0"/>
               </a:p>
             </p:txBody>
           </p:sp>
@@ -9177,7 +10109,6 @@
                   <a:rPr lang="en-US" sz="2000" dirty="0" smtClean="0"/>
                   <a:t>'entropy'</a:t>
                 </a:r>
-                <a:endParaRPr lang="en-US" sz="2000" dirty="0" smtClean="0"/>
               </a:p>
             </p:txBody>
           </p:sp>
@@ -9473,6 +10404,99 @@
           </a:p>
         </p:txBody>
       </p:sp>
+      <p:grpSp>
+        <p:nvGrpSpPr>
+          <p:cNvPr id="28" name="Group 27"/>
+          <p:cNvGrpSpPr/>
+          <p:nvPr/>
+        </p:nvGrpSpPr>
+        <p:grpSpPr>
+          <a:xfrm>
+            <a:off x="7840573" y="-1340509"/>
+            <a:ext cx="502920" cy="640080"/>
+            <a:chOff x="1242443" y="-1004266"/>
+            <a:chExt cx="502920" cy="640080"/>
+          </a:xfrm>
+        </p:grpSpPr>
+        <p:sp>
+          <p:nvSpPr>
+            <p:cNvPr id="29" name="Rectangle 28"/>
+            <p:cNvSpPr/>
+            <p:nvPr/>
+          </p:nvSpPr>
+          <p:spPr>
+            <a:xfrm>
+              <a:off x="1242443" y="-935686"/>
+              <a:ext cx="502920" cy="502920"/>
+            </a:xfrm>
+            <a:prstGeom prst="rect">
+              <a:avLst/>
+            </a:prstGeom>
+            <a:solidFill>
+              <a:schemeClr val="bg1"/>
+            </a:solidFill>
+            <a:ln>
+              <a:solidFill>
+                <a:schemeClr val="tx1"/>
+              </a:solidFill>
+            </a:ln>
+          </p:spPr>
+          <p:style>
+            <a:lnRef idx="2">
+              <a:schemeClr val="accent1">
+                <a:shade val="50000"/>
+              </a:schemeClr>
+            </a:lnRef>
+            <a:fillRef idx="1">
+              <a:schemeClr val="accent1"/>
+            </a:fillRef>
+            <a:effectRef idx="0">
+              <a:schemeClr val="accent1"/>
+            </a:effectRef>
+            <a:fontRef idx="minor">
+              <a:schemeClr val="lt1"/>
+            </a:fontRef>
+          </p:style>
+          <p:txBody>
+            <a:bodyPr rtlCol="0" anchor="ctr"/>
+            <a:lstStyle/>
+            <a:p>
+              <a:pPr algn="ctr"/>
+              <a:endParaRPr lang="en-US"/>
+            </a:p>
+          </p:txBody>
+        </p:sp>
+        <p:sp>
+          <p:nvSpPr>
+            <p:cNvPr id="30" name="TextBox 29"/>
+            <p:cNvSpPr txBox="1"/>
+            <p:nvPr/>
+          </p:nvSpPr>
+          <p:spPr>
+            <a:xfrm>
+              <a:off x="1265303" y="-1004266"/>
+              <a:ext cx="457200" cy="640080"/>
+            </a:xfrm>
+            <a:prstGeom prst="rect">
+              <a:avLst/>
+            </a:prstGeom>
+            <a:noFill/>
+          </p:spPr>
+          <p:txBody>
+            <a:bodyPr wrap="square" rtlCol="0">
+              <a:spAutoFit/>
+            </a:bodyPr>
+            <a:lstStyle/>
+            <a:p>
+              <a:pPr algn="ctr"/>
+              <a:r>
+                <a:rPr lang="en-US" sz="3600" b="1" dirty="0"/>
+                <a:t>D</a:t>
+              </a:r>
+            </a:p>
+          </p:txBody>
+        </p:sp>
+      </p:grpSp>
     </p:spTree>
     <p:extLst>
       <p:ext uri="{BB962C8B-B14F-4D97-AF65-F5344CB8AC3E}">

</xml_diff>

<commit_message>
Updated decision tree calc
</commit_message>
<xml_diff>
--- a/Sklearn/DecisionTrees/powerpoint/DecisionComparison.pptx
+++ b/Sklearn/DecisionTrees/powerpoint/DecisionComparison.pptx
@@ -5,7 +5,7 @@
     <p:sldMasterId id="2147483648" r:id="rId1"/>
   </p:sldMasterIdLst>
   <p:notesMasterIdLst>
-    <p:notesMasterId r:id="rId27"/>
+    <p:notesMasterId r:id="rId30"/>
   </p:notesMasterIdLst>
   <p:sldIdLst>
     <p:sldId id="256" r:id="rId2"/>
@@ -20,19 +20,22 @@
     <p:sldId id="276" r:id="rId11"/>
     <p:sldId id="275" r:id="rId12"/>
     <p:sldId id="280" r:id="rId13"/>
-    <p:sldId id="274" r:id="rId14"/>
-    <p:sldId id="273" r:id="rId15"/>
-    <p:sldId id="272" r:id="rId16"/>
-    <p:sldId id="271" r:id="rId17"/>
-    <p:sldId id="270" r:id="rId18"/>
-    <p:sldId id="269" r:id="rId19"/>
-    <p:sldId id="268" r:id="rId20"/>
-    <p:sldId id="261" r:id="rId21"/>
-    <p:sldId id="262" r:id="rId22"/>
-    <p:sldId id="264" r:id="rId23"/>
-    <p:sldId id="258" r:id="rId24"/>
-    <p:sldId id="265" r:id="rId25"/>
-    <p:sldId id="260" r:id="rId26"/>
+    <p:sldId id="281" r:id="rId14"/>
+    <p:sldId id="283" r:id="rId15"/>
+    <p:sldId id="282" r:id="rId16"/>
+    <p:sldId id="274" r:id="rId17"/>
+    <p:sldId id="273" r:id="rId18"/>
+    <p:sldId id="272" r:id="rId19"/>
+    <p:sldId id="271" r:id="rId20"/>
+    <p:sldId id="270" r:id="rId21"/>
+    <p:sldId id="269" r:id="rId22"/>
+    <p:sldId id="268" r:id="rId23"/>
+    <p:sldId id="261" r:id="rId24"/>
+    <p:sldId id="262" r:id="rId25"/>
+    <p:sldId id="264" r:id="rId26"/>
+    <p:sldId id="258" r:id="rId27"/>
+    <p:sldId id="265" r:id="rId28"/>
+    <p:sldId id="260" r:id="rId29"/>
   </p:sldIdLst>
   <p:sldSz cx="12192000" cy="6858000"/>
   <p:notesSz cx="6858000" cy="9144000"/>
@@ -221,7 +224,7 @@
           <a:p>
             <a:fld id="{1257FD7B-4E4A-644A-895D-BAD136711207}" type="datetimeFigureOut">
               <a:rPr lang="en-US" smtClean="0"/>
-              <a:t>10/15/18</a:t>
+              <a:t>10/16/18</a:t>
             </a:fld>
             <a:endParaRPr lang="en-US"/>
           </a:p>
@@ -657,6 +660,174 @@
 </p:notes>
 </file>
 
+<file path=ppt/notesSlides/notesSlide3.xml><?xml version="1.0" encoding="utf-8"?>
+<p:notes xmlns:a="http://schemas.openxmlformats.org/drawingml/2006/main" xmlns:r="http://schemas.openxmlformats.org/officeDocument/2006/relationships" xmlns:p="http://schemas.openxmlformats.org/presentationml/2006/main">
+  <p:cSld>
+    <p:spTree>
+      <p:nvGrpSpPr>
+        <p:cNvPr id="1" name=""/>
+        <p:cNvGrpSpPr/>
+        <p:nvPr/>
+      </p:nvGrpSpPr>
+      <p:grpSpPr>
+        <a:xfrm>
+          <a:off x="0" y="0"/>
+          <a:ext cx="0" cy="0"/>
+          <a:chOff x="0" y="0"/>
+          <a:chExt cx="0" cy="0"/>
+        </a:xfrm>
+      </p:grpSpPr>
+      <p:sp>
+        <p:nvSpPr>
+          <p:cNvPr id="2" name="Slide Image Placeholder 1"/>
+          <p:cNvSpPr>
+            <a:spLocks noGrp="1" noRot="1" noChangeAspect="1"/>
+          </p:cNvSpPr>
+          <p:nvPr>
+            <p:ph type="sldImg"/>
+          </p:nvPr>
+        </p:nvSpPr>
+        <p:spPr/>
+      </p:sp>
+      <p:sp>
+        <p:nvSpPr>
+          <p:cNvPr id="3" name="Notes Placeholder 2"/>
+          <p:cNvSpPr>
+            <a:spLocks noGrp="1"/>
+          </p:cNvSpPr>
+          <p:nvPr>
+            <p:ph type="body" idx="1"/>
+          </p:nvPr>
+        </p:nvSpPr>
+        <p:spPr/>
+        <p:txBody>
+          <a:bodyPr/>
+          <a:lstStyle/>
+          <a:p>
+            <a:endParaRPr lang="en-US" dirty="0"/>
+          </a:p>
+        </p:txBody>
+      </p:sp>
+      <p:sp>
+        <p:nvSpPr>
+          <p:cNvPr id="4" name="Slide Number Placeholder 3"/>
+          <p:cNvSpPr>
+            <a:spLocks noGrp="1"/>
+          </p:cNvSpPr>
+          <p:nvPr>
+            <p:ph type="sldNum" sz="quarter" idx="10"/>
+          </p:nvPr>
+        </p:nvSpPr>
+        <p:spPr/>
+        <p:txBody>
+          <a:bodyPr/>
+          <a:lstStyle/>
+          <a:p>
+            <a:fld id="{422B7439-6527-2E49-BE80-70AD13633956}" type="slidenum">
+              <a:rPr lang="en-US" smtClean="0"/>
+              <a:t>13</a:t>
+            </a:fld>
+            <a:endParaRPr lang="en-US"/>
+          </a:p>
+        </p:txBody>
+      </p:sp>
+    </p:spTree>
+    <p:extLst>
+      <p:ext uri="{BB962C8B-B14F-4D97-AF65-F5344CB8AC3E}">
+        <p14:creationId xmlns:p14="http://schemas.microsoft.com/office/powerpoint/2010/main" val="459178725"/>
+      </p:ext>
+    </p:extLst>
+  </p:cSld>
+  <p:clrMapOvr>
+    <a:masterClrMapping/>
+  </p:clrMapOvr>
+</p:notes>
+</file>
+
+<file path=ppt/notesSlides/notesSlide4.xml><?xml version="1.0" encoding="utf-8"?>
+<p:notes xmlns:a="http://schemas.openxmlformats.org/drawingml/2006/main" xmlns:r="http://schemas.openxmlformats.org/officeDocument/2006/relationships" xmlns:p="http://schemas.openxmlformats.org/presentationml/2006/main">
+  <p:cSld>
+    <p:spTree>
+      <p:nvGrpSpPr>
+        <p:cNvPr id="1" name=""/>
+        <p:cNvGrpSpPr/>
+        <p:nvPr/>
+      </p:nvGrpSpPr>
+      <p:grpSpPr>
+        <a:xfrm>
+          <a:off x="0" y="0"/>
+          <a:ext cx="0" cy="0"/>
+          <a:chOff x="0" y="0"/>
+          <a:chExt cx="0" cy="0"/>
+        </a:xfrm>
+      </p:grpSpPr>
+      <p:sp>
+        <p:nvSpPr>
+          <p:cNvPr id="2" name="Slide Image Placeholder 1"/>
+          <p:cNvSpPr>
+            <a:spLocks noGrp="1" noRot="1" noChangeAspect="1"/>
+          </p:cNvSpPr>
+          <p:nvPr>
+            <p:ph type="sldImg"/>
+          </p:nvPr>
+        </p:nvSpPr>
+        <p:spPr/>
+      </p:sp>
+      <p:sp>
+        <p:nvSpPr>
+          <p:cNvPr id="3" name="Notes Placeholder 2"/>
+          <p:cNvSpPr>
+            <a:spLocks noGrp="1"/>
+          </p:cNvSpPr>
+          <p:nvPr>
+            <p:ph type="body" idx="1"/>
+          </p:nvPr>
+        </p:nvSpPr>
+        <p:spPr/>
+        <p:txBody>
+          <a:bodyPr/>
+          <a:lstStyle/>
+          <a:p>
+            <a:endParaRPr lang="en-US" dirty="0"/>
+          </a:p>
+        </p:txBody>
+      </p:sp>
+      <p:sp>
+        <p:nvSpPr>
+          <p:cNvPr id="4" name="Slide Number Placeholder 3"/>
+          <p:cNvSpPr>
+            <a:spLocks noGrp="1"/>
+          </p:cNvSpPr>
+          <p:nvPr>
+            <p:ph type="sldNum" sz="quarter" idx="10"/>
+          </p:nvPr>
+        </p:nvSpPr>
+        <p:spPr/>
+        <p:txBody>
+          <a:bodyPr/>
+          <a:lstStyle/>
+          <a:p>
+            <a:fld id="{422B7439-6527-2E49-BE80-70AD13633956}" type="slidenum">
+              <a:rPr lang="en-US" smtClean="0"/>
+              <a:t>14</a:t>
+            </a:fld>
+            <a:endParaRPr lang="en-US"/>
+          </a:p>
+        </p:txBody>
+      </p:sp>
+    </p:spTree>
+    <p:extLst>
+      <p:ext uri="{BB962C8B-B14F-4D97-AF65-F5344CB8AC3E}">
+        <p14:creationId xmlns:p14="http://schemas.microsoft.com/office/powerpoint/2010/main" val="1048070825"/>
+      </p:ext>
+    </p:extLst>
+  </p:cSld>
+  <p:clrMapOvr>
+    <a:masterClrMapping/>
+  </p:clrMapOvr>
+</p:notes>
+</file>
+
 <file path=ppt/slideLayouts/slideLayout1.xml><?xml version="1.0" encoding="utf-8"?>
 <p:sldLayout xmlns:a="http://schemas.openxmlformats.org/drawingml/2006/main" xmlns:r="http://schemas.openxmlformats.org/officeDocument/2006/relationships" xmlns:p="http://schemas.openxmlformats.org/presentationml/2006/main" type="title" preserve="1">
   <p:cSld name="Title Slide">
@@ -788,7 +959,7 @@
           <a:p>
             <a:fld id="{B66C5E5C-AFE9-2848-A01D-417298715EDA}" type="datetimeFigureOut">
               <a:rPr lang="en-US" smtClean="0"/>
-              <a:t>10/15/18</a:t>
+              <a:t>10/16/18</a:t>
             </a:fld>
             <a:endParaRPr lang="en-US"/>
           </a:p>
@@ -958,7 +1129,7 @@
           <a:p>
             <a:fld id="{B66C5E5C-AFE9-2848-A01D-417298715EDA}" type="datetimeFigureOut">
               <a:rPr lang="en-US" smtClean="0"/>
-              <a:t>10/15/18</a:t>
+              <a:t>10/16/18</a:t>
             </a:fld>
             <a:endParaRPr lang="en-US"/>
           </a:p>
@@ -1138,7 +1309,7 @@
           <a:p>
             <a:fld id="{B66C5E5C-AFE9-2848-A01D-417298715EDA}" type="datetimeFigureOut">
               <a:rPr lang="en-US" smtClean="0"/>
-              <a:t>10/15/18</a:t>
+              <a:t>10/16/18</a:t>
             </a:fld>
             <a:endParaRPr lang="en-US"/>
           </a:p>
@@ -1308,7 +1479,7 @@
           <a:p>
             <a:fld id="{B66C5E5C-AFE9-2848-A01D-417298715EDA}" type="datetimeFigureOut">
               <a:rPr lang="en-US" smtClean="0"/>
-              <a:t>10/15/18</a:t>
+              <a:t>10/16/18</a:t>
             </a:fld>
             <a:endParaRPr lang="en-US"/>
           </a:p>
@@ -1554,7 +1725,7 @@
           <a:p>
             <a:fld id="{B66C5E5C-AFE9-2848-A01D-417298715EDA}" type="datetimeFigureOut">
               <a:rPr lang="en-US" smtClean="0"/>
-              <a:t>10/15/18</a:t>
+              <a:t>10/16/18</a:t>
             </a:fld>
             <a:endParaRPr lang="en-US"/>
           </a:p>
@@ -1786,7 +1957,7 @@
           <a:p>
             <a:fld id="{B66C5E5C-AFE9-2848-A01D-417298715EDA}" type="datetimeFigureOut">
               <a:rPr lang="en-US" smtClean="0"/>
-              <a:t>10/15/18</a:t>
+              <a:t>10/16/18</a:t>
             </a:fld>
             <a:endParaRPr lang="en-US"/>
           </a:p>
@@ -2153,7 +2324,7 @@
           <a:p>
             <a:fld id="{B66C5E5C-AFE9-2848-A01D-417298715EDA}" type="datetimeFigureOut">
               <a:rPr lang="en-US" smtClean="0"/>
-              <a:t>10/15/18</a:t>
+              <a:t>10/16/18</a:t>
             </a:fld>
             <a:endParaRPr lang="en-US"/>
           </a:p>
@@ -2271,7 +2442,7 @@
           <a:p>
             <a:fld id="{B66C5E5C-AFE9-2848-A01D-417298715EDA}" type="datetimeFigureOut">
               <a:rPr lang="en-US" smtClean="0"/>
-              <a:t>10/15/18</a:t>
+              <a:t>10/16/18</a:t>
             </a:fld>
             <a:endParaRPr lang="en-US"/>
           </a:p>
@@ -2366,7 +2537,7 @@
           <a:p>
             <a:fld id="{B66C5E5C-AFE9-2848-A01D-417298715EDA}" type="datetimeFigureOut">
               <a:rPr lang="en-US" smtClean="0"/>
-              <a:t>10/15/18</a:t>
+              <a:t>10/16/18</a:t>
             </a:fld>
             <a:endParaRPr lang="en-US"/>
           </a:p>
@@ -2643,7 +2814,7 @@
           <a:p>
             <a:fld id="{B66C5E5C-AFE9-2848-A01D-417298715EDA}" type="datetimeFigureOut">
               <a:rPr lang="en-US" smtClean="0"/>
-              <a:t>10/15/18</a:t>
+              <a:t>10/16/18</a:t>
             </a:fld>
             <a:endParaRPr lang="en-US"/>
           </a:p>
@@ -2896,7 +3067,7 @@
           <a:p>
             <a:fld id="{B66C5E5C-AFE9-2848-A01D-417298715EDA}" type="datetimeFigureOut">
               <a:rPr lang="en-US" smtClean="0"/>
-              <a:t>10/15/18</a:t>
+              <a:t>10/16/18</a:t>
             </a:fld>
             <a:endParaRPr lang="en-US"/>
           </a:p>
@@ -3109,7 +3280,7 @@
           <a:p>
             <a:fld id="{B66C5E5C-AFE9-2848-A01D-417298715EDA}" type="datetimeFigureOut">
               <a:rPr lang="en-US" smtClean="0"/>
-              <a:t>10/15/18</a:t>
+              <a:t>10/16/18</a:t>
             </a:fld>
             <a:endParaRPr lang="en-US"/>
           </a:p>
@@ -4432,234 +4603,253 @@
           <a:chExt cx="0" cy="0"/>
         </a:xfrm>
       </p:grpSpPr>
-      <p:pic>
-        <p:nvPicPr>
-          <p:cNvPr id="2" name="Picture 1"/>
-          <p:cNvPicPr>
-            <a:picLocks noChangeAspect="1"/>
-          </p:cNvPicPr>
-          <p:nvPr/>
-        </p:nvPicPr>
-        <p:blipFill>
-          <a:blip r:embed="rId3">
-            <a:extLst>
-              <a:ext uri="{28A0092B-C50C-407E-A947-70E740481C1C}">
-                <a14:useLocalDpi xmlns:a14="http://schemas.microsoft.com/office/drawing/2010/main" val="0"/>
-              </a:ext>
-            </a:extLst>
-          </a:blip>
-          <a:stretch>
-            <a:fillRect/>
-          </a:stretch>
-        </p:blipFill>
-        <p:spPr>
-          <a:xfrm>
-            <a:off x="756125" y="1077685"/>
-            <a:ext cx="5803900" cy="1397000"/>
-          </a:xfrm>
-          <a:prstGeom prst="rect">
-            <a:avLst/>
-          </a:prstGeom>
-          <a:ln w="12700">
-            <a:solidFill>
-              <a:schemeClr val="tx1"/>
-            </a:solidFill>
-          </a:ln>
-        </p:spPr>
-      </p:pic>
       <p:grpSp>
         <p:nvGrpSpPr>
-          <p:cNvPr id="6" name="Group 5"/>
+          <p:cNvPr id="4" name="Group 3"/>
           <p:cNvGrpSpPr/>
           <p:nvPr/>
         </p:nvGrpSpPr>
         <p:grpSpPr>
           <a:xfrm>
-            <a:off x="467088" y="3931557"/>
-            <a:ext cx="11240498" cy="4256345"/>
-            <a:chOff x="467088" y="3931557"/>
-            <a:chExt cx="11240498" cy="4256345"/>
+            <a:off x="271145" y="579573"/>
+            <a:ext cx="11240498" cy="5697886"/>
+            <a:chOff x="467088" y="2490016"/>
+            <a:chExt cx="11240498" cy="5697886"/>
           </a:xfrm>
         </p:grpSpPr>
+        <p:grpSp>
+          <p:nvGrpSpPr>
+            <p:cNvPr id="6" name="Group 5"/>
+            <p:cNvGrpSpPr/>
+            <p:nvPr/>
+          </p:nvGrpSpPr>
+          <p:grpSpPr>
+            <a:xfrm>
+              <a:off x="467088" y="3931557"/>
+              <a:ext cx="11240498" cy="4256345"/>
+              <a:chOff x="467088" y="3931557"/>
+              <a:chExt cx="11240498" cy="4256345"/>
+            </a:xfrm>
+          </p:grpSpPr>
+          <p:sp>
+            <p:nvSpPr>
+              <p:cNvPr id="8" name="Rectangle 7"/>
+              <p:cNvSpPr/>
+              <p:nvPr/>
+            </p:nvSpPr>
+            <p:spPr>
+              <a:xfrm>
+                <a:off x="467088" y="5633357"/>
+                <a:ext cx="11240498" cy="2554545"/>
+              </a:xfrm>
+              <a:prstGeom prst="rect">
+                <a:avLst/>
+              </a:prstGeom>
+              <a:ln w="0">
+                <a:noFill/>
+              </a:ln>
+            </p:spPr>
+            <p:txBody>
+              <a:bodyPr wrap="square">
+                <a:spAutoFit/>
+              </a:bodyPr>
+              <a:lstStyle/>
+              <a:p>
+                <a:r>
+                  <a:rPr lang="en-US" sz="2000" dirty="0" smtClean="0"/>
+                  <a:t>f: feature split on</a:t>
+                </a:r>
+              </a:p>
+              <a:p>
+                <a:r>
+                  <a:rPr lang="en-US" sz="2000" dirty="0" err="1" smtClean="0"/>
+                  <a:t>D</a:t>
+                </a:r>
+                <a:r>
+                  <a:rPr lang="en-US" sz="2000" baseline="-25000" dirty="0" err="1" smtClean="0"/>
+                  <a:t>p</a:t>
+                </a:r>
+                <a:r>
+                  <a:rPr lang="en-US" sz="2000" dirty="0" smtClean="0"/>
+                  <a:t>: dataset of the parent node</a:t>
+                </a:r>
+              </a:p>
+              <a:p>
+                <a:r>
+                  <a:rPr lang="en-US" sz="2000" dirty="0" err="1" smtClean="0"/>
+                  <a:t>D</a:t>
+                </a:r>
+                <a:r>
+                  <a:rPr lang="en-US" sz="2000" baseline="-25000" dirty="0" err="1" smtClean="0"/>
+                  <a:t>left</a:t>
+                </a:r>
+                <a:r>
+                  <a:rPr lang="en-US" sz="2000" dirty="0" smtClean="0"/>
+                  <a:t>: dataset of the left child node</a:t>
+                </a:r>
+              </a:p>
+              <a:p>
+                <a:r>
+                  <a:rPr lang="en-US" sz="2000" dirty="0" err="1" smtClean="0"/>
+                  <a:t>D</a:t>
+                </a:r>
+                <a:r>
+                  <a:rPr lang="en-US" sz="2000" baseline="-25000" dirty="0" err="1" smtClean="0"/>
+                  <a:t>right</a:t>
+                </a:r>
+                <a:r>
+                  <a:rPr lang="en-US" sz="2000" dirty="0" smtClean="0"/>
+                  <a:t>: </a:t>
+                </a:r>
+                <a:r>
+                  <a:rPr lang="en-US" sz="2000" dirty="0"/>
+                  <a:t>dataset of the </a:t>
+                </a:r>
+                <a:r>
+                  <a:rPr lang="en-US" sz="2000" dirty="0" smtClean="0"/>
+                  <a:t>right </a:t>
+                </a:r>
+                <a:r>
+                  <a:rPr lang="en-US" sz="2000" dirty="0"/>
+                  <a:t>child </a:t>
+                </a:r>
+                <a:r>
+                  <a:rPr lang="en-US" sz="2000" dirty="0" smtClean="0"/>
+                  <a:t>node</a:t>
+                </a:r>
+              </a:p>
+              <a:p>
+                <a:r>
+                  <a:rPr lang="en-US" sz="2000" dirty="0" smtClean="0"/>
+                  <a:t>I: impurity </a:t>
+                </a:r>
+                <a:r>
+                  <a:rPr lang="en-US" sz="2000" dirty="0" smtClean="0"/>
+                  <a:t>criterion (Gini Index or Entropy)</a:t>
+                </a:r>
+                <a:endParaRPr lang="en-US" sz="2000" dirty="0" smtClean="0"/>
+              </a:p>
+              <a:p>
+                <a:r>
+                  <a:rPr lang="en-US" sz="2000" dirty="0" smtClean="0"/>
+                  <a:t>N: total number of samples</a:t>
+                </a:r>
+              </a:p>
+              <a:p>
+                <a:r>
+                  <a:rPr lang="en-US" sz="2000" dirty="0" err="1" smtClean="0"/>
+                  <a:t>N</a:t>
+                </a:r>
+                <a:r>
+                  <a:rPr lang="en-US" sz="2000" baseline="-25000" dirty="0" err="1" smtClean="0"/>
+                  <a:t>left</a:t>
+                </a:r>
+                <a:r>
+                  <a:rPr lang="en-US" sz="2000" dirty="0" smtClean="0"/>
+                  <a:t>: number of samples at left child node</a:t>
+                </a:r>
+              </a:p>
+              <a:p>
+                <a:r>
+                  <a:rPr lang="en-US" sz="2000" dirty="0" err="1" smtClean="0"/>
+                  <a:t>N</a:t>
+                </a:r>
+                <a:r>
+                  <a:rPr lang="en-US" sz="2000" baseline="-25000" dirty="0" err="1" smtClean="0"/>
+                  <a:t>right</a:t>
+                </a:r>
+                <a:r>
+                  <a:rPr lang="en-US" sz="2000" dirty="0" smtClean="0"/>
+                  <a:t>: </a:t>
+                </a:r>
+                <a:r>
+                  <a:rPr lang="en-US" sz="2000" dirty="0"/>
+                  <a:t>number of samples at </a:t>
+                </a:r>
+                <a:r>
+                  <a:rPr lang="en-US" sz="2000" dirty="0" smtClean="0"/>
+                  <a:t>right </a:t>
+                </a:r>
+                <a:r>
+                  <a:rPr lang="en-US" sz="2000" dirty="0"/>
+                  <a:t>child </a:t>
+                </a:r>
+                <a:r>
+                  <a:rPr lang="en-US" sz="2000" dirty="0" smtClean="0"/>
+                  <a:t>node</a:t>
+                </a:r>
+                <a:endParaRPr lang="en-US" sz="2000" dirty="0"/>
+              </a:p>
+            </p:txBody>
+          </p:sp>
+          <p:pic>
+            <p:nvPicPr>
+              <p:cNvPr id="3" name="Picture 2"/>
+              <p:cNvPicPr>
+                <a:picLocks noChangeAspect="1"/>
+              </p:cNvPicPr>
+              <p:nvPr/>
+            </p:nvPicPr>
+            <p:blipFill>
+              <a:blip r:embed="rId3">
+                <a:extLst>
+                  <a:ext uri="{28A0092B-C50C-407E-A947-70E740481C1C}">
+                    <a14:useLocalDpi xmlns:a14="http://schemas.microsoft.com/office/drawing/2010/main" val="0"/>
+                  </a:ext>
+                </a:extLst>
+              </a:blip>
+              <a:stretch>
+                <a:fillRect/>
+              </a:stretch>
+            </p:blipFill>
+            <p:spPr>
+              <a:xfrm>
+                <a:off x="467088" y="3931557"/>
+                <a:ext cx="11240498" cy="1399032"/>
+              </a:xfrm>
+              <a:prstGeom prst="rect">
+                <a:avLst/>
+              </a:prstGeom>
+              <a:ln w="0">
+                <a:noFill/>
+              </a:ln>
+            </p:spPr>
+          </p:pic>
+        </p:grpSp>
         <p:sp>
           <p:nvSpPr>
-            <p:cNvPr id="8" name="Rectangle 7"/>
-            <p:cNvSpPr/>
+            <p:cNvPr id="12" name="TextBox 11"/>
+            <p:cNvSpPr txBox="1"/>
             <p:nvPr/>
           </p:nvSpPr>
           <p:spPr>
             <a:xfrm>
-              <a:off x="467088" y="5633357"/>
-              <a:ext cx="11240498" cy="2554545"/>
+              <a:off x="2180103" y="2490016"/>
+              <a:ext cx="7814468" cy="1138773"/>
             </a:xfrm>
             <a:prstGeom prst="rect">
               <a:avLst/>
             </a:prstGeom>
-            <a:ln w="0">
-              <a:noFill/>
-            </a:ln>
+            <a:noFill/>
           </p:spPr>
           <p:txBody>
-            <a:bodyPr wrap="square">
+            <a:bodyPr wrap="square" rtlCol="0">
               <a:spAutoFit/>
             </a:bodyPr>
             <a:lstStyle/>
             <a:p>
+              <a:pPr algn="ctr"/>
               <a:r>
-                <a:rPr lang="en-US" sz="2000" dirty="0" smtClean="0"/>
-                <a:t>f: feature split on</a:t>
+                <a:rPr lang="en-US" sz="5000" b="1" dirty="0" smtClean="0"/>
+                <a:t>Information Gain</a:t>
               </a:r>
+              <a:endParaRPr lang="en-US" sz="5000" dirty="0"/>
             </a:p>
             <a:p>
-              <a:r>
-                <a:rPr lang="en-US" sz="2000" dirty="0" err="1" smtClean="0"/>
-                <a:t>D</a:t>
-              </a:r>
-              <a:r>
-                <a:rPr lang="en-US" sz="2000" baseline="-25000" dirty="0" err="1" smtClean="0"/>
-                <a:t>p</a:t>
-              </a:r>
-              <a:r>
-                <a:rPr lang="en-US" sz="2000" dirty="0" smtClean="0"/>
-                <a:t>: dataset of the parent node</a:t>
-              </a:r>
-            </a:p>
-            <a:p>
-              <a:r>
-                <a:rPr lang="en-US" sz="2000" dirty="0" err="1" smtClean="0"/>
-                <a:t>D</a:t>
-              </a:r>
-              <a:r>
-                <a:rPr lang="en-US" sz="2000" baseline="-25000" dirty="0" err="1" smtClean="0"/>
-                <a:t>left</a:t>
-              </a:r>
-              <a:r>
-                <a:rPr lang="en-US" sz="2000" dirty="0" smtClean="0"/>
-                <a:t>: dataset of the left child node</a:t>
-              </a:r>
-            </a:p>
-            <a:p>
-              <a:r>
-                <a:rPr lang="en-US" sz="2000" dirty="0" err="1" smtClean="0"/>
-                <a:t>D</a:t>
-              </a:r>
-              <a:r>
-                <a:rPr lang="en-US" sz="2000" baseline="-25000" dirty="0" err="1" smtClean="0"/>
-                <a:t>right</a:t>
-              </a:r>
-              <a:r>
-                <a:rPr lang="en-US" sz="2000" dirty="0" smtClean="0"/>
-                <a:t>: </a:t>
-              </a:r>
-              <a:r>
-                <a:rPr lang="en-US" sz="2000" dirty="0"/>
-                <a:t>dataset of the </a:t>
-              </a:r>
-              <a:r>
-                <a:rPr lang="en-US" sz="2000" dirty="0" smtClean="0"/>
-                <a:t>right </a:t>
-              </a:r>
-              <a:r>
-                <a:rPr lang="en-US" sz="2000" dirty="0"/>
-                <a:t>child </a:t>
-              </a:r>
-              <a:r>
-                <a:rPr lang="en-US" sz="2000" dirty="0" smtClean="0"/>
-                <a:t>node</a:t>
-              </a:r>
-            </a:p>
-            <a:p>
-              <a:r>
-                <a:rPr lang="en-US" sz="2000" dirty="0" smtClean="0"/>
-                <a:t>I: impurity criterion</a:t>
-              </a:r>
-            </a:p>
-            <a:p>
-              <a:r>
-                <a:rPr lang="en-US" sz="2000" dirty="0" smtClean="0"/>
-                <a:t>N: total number of samples</a:t>
-              </a:r>
-            </a:p>
-            <a:p>
-              <a:r>
-                <a:rPr lang="en-US" sz="2000" dirty="0" err="1" smtClean="0"/>
-                <a:t>N</a:t>
-              </a:r>
-              <a:r>
-                <a:rPr lang="en-US" sz="2000" baseline="-25000" dirty="0" err="1" smtClean="0"/>
-                <a:t>left</a:t>
-              </a:r>
-              <a:r>
-                <a:rPr lang="en-US" sz="2000" dirty="0" smtClean="0"/>
-                <a:t>: number of samples at left child node</a:t>
-              </a:r>
-            </a:p>
-            <a:p>
-              <a:r>
-                <a:rPr lang="en-US" sz="2000" dirty="0" err="1" smtClean="0"/>
-                <a:t>N</a:t>
-              </a:r>
-              <a:r>
-                <a:rPr lang="en-US" sz="2000" baseline="-25000" dirty="0" err="1" smtClean="0"/>
-                <a:t>right</a:t>
-              </a:r>
-              <a:r>
-                <a:rPr lang="en-US" sz="2000" dirty="0" smtClean="0"/>
-                <a:t>: </a:t>
-              </a:r>
-              <a:r>
-                <a:rPr lang="en-US" sz="2000" dirty="0"/>
-                <a:t>number of samples at </a:t>
-              </a:r>
-              <a:r>
-                <a:rPr lang="en-US" sz="2000" dirty="0" smtClean="0"/>
-                <a:t>right </a:t>
-              </a:r>
-              <a:r>
-                <a:rPr lang="en-US" sz="2000" dirty="0"/>
-                <a:t>child </a:t>
-              </a:r>
-              <a:r>
-                <a:rPr lang="en-US" sz="2000" dirty="0" smtClean="0"/>
-                <a:t>node</a:t>
-              </a:r>
-              <a:endParaRPr lang="en-US" sz="2000" dirty="0"/>
+              <a:endParaRPr lang="en-US" dirty="0"/>
             </a:p>
           </p:txBody>
         </p:sp>
-        <p:pic>
-          <p:nvPicPr>
-            <p:cNvPr id="3" name="Picture 2"/>
-            <p:cNvPicPr>
-              <a:picLocks noChangeAspect="1"/>
-            </p:cNvPicPr>
-            <p:nvPr/>
-          </p:nvPicPr>
-          <p:blipFill>
-            <a:blip r:embed="rId4">
-              <a:extLst>
-                <a:ext uri="{28A0092B-C50C-407E-A947-70E740481C1C}">
-                  <a14:useLocalDpi xmlns:a14="http://schemas.microsoft.com/office/drawing/2010/main" val="0"/>
-                </a:ext>
-              </a:extLst>
-            </a:blip>
-            <a:stretch>
-              <a:fillRect/>
-            </a:stretch>
-          </p:blipFill>
-          <p:spPr>
-            <a:xfrm>
-              <a:off x="467088" y="3931557"/>
-              <a:ext cx="11240498" cy="1399032"/>
-            </a:xfrm>
-            <a:prstGeom prst="rect">
-              <a:avLst/>
-            </a:prstGeom>
-            <a:ln w="0">
-              <a:noFill/>
-            </a:ln>
-          </p:spPr>
-        </p:pic>
       </p:grpSp>
     </p:spTree>
     <p:extLst>
@@ -4691,48 +4881,299 @@
           <a:chExt cx="0" cy="0"/>
         </a:xfrm>
       </p:grpSpPr>
-      <p:sp>
-        <p:nvSpPr>
-          <p:cNvPr id="2" name="Title 1"/>
-          <p:cNvSpPr>
-            <a:spLocks noGrp="1"/>
-          </p:cNvSpPr>
-          <p:nvPr>
-            <p:ph type="title"/>
-          </p:nvPr>
-        </p:nvSpPr>
-        <p:spPr/>
-        <p:txBody>
-          <a:bodyPr/>
+      <p:grpSp>
+        <p:nvGrpSpPr>
+          <p:cNvPr id="16" name="Group 15"/>
+          <p:cNvGrpSpPr/>
+          <p:nvPr/>
+        </p:nvGrpSpPr>
+        <p:grpSpPr>
+          <a:xfrm>
+            <a:off x="1458528" y="1738754"/>
+            <a:ext cx="9412514" cy="4661588"/>
+            <a:chOff x="1442199" y="448798"/>
+            <a:chExt cx="9412514" cy="4661588"/>
+          </a:xfrm>
+        </p:grpSpPr>
+        <p:sp>
+          <p:nvSpPr>
+            <p:cNvPr id="8" name="Rectangle 7"/>
+            <p:cNvSpPr/>
+            <p:nvPr/>
+          </p:nvSpPr>
+          <p:spPr>
+            <a:xfrm>
+              <a:off x="1442199" y="3086138"/>
+              <a:ext cx="3925365" cy="646331"/>
+            </a:xfrm>
+            <a:prstGeom prst="rect">
+              <a:avLst/>
+            </a:prstGeom>
+            <a:ln w="0">
+              <a:noFill/>
+            </a:ln>
+          </p:spPr>
+          <p:txBody>
+            <a:bodyPr wrap="square">
+              <a:spAutoFit/>
+            </a:bodyPr>
+            <a:lstStyle/>
+            <a:p>
+              <a:r>
+                <a:rPr lang="en-US" dirty="0" err="1" smtClean="0"/>
+                <a:t>p</a:t>
+              </a:r>
+              <a:r>
+                <a:rPr lang="en-US" baseline="-25000" dirty="0" err="1" smtClean="0"/>
+                <a:t>j</a:t>
+              </a:r>
+              <a:r>
+                <a:rPr lang="en-US" dirty="0" smtClean="0"/>
+                <a:t>: proportion of the samples that belongs to class c for a particular node</a:t>
+              </a:r>
+            </a:p>
+          </p:txBody>
+        </p:sp>
+        <p:pic>
+          <p:nvPicPr>
+            <p:cNvPr id="4" name="Picture 3"/>
+            <p:cNvPicPr>
+              <a:picLocks noChangeAspect="1"/>
+            </p:cNvPicPr>
+            <p:nvPr/>
+          </p:nvPicPr>
+          <p:blipFill>
+            <a:blip r:embed="rId3">
+              <a:extLst>
+                <a:ext uri="{28A0092B-C50C-407E-A947-70E740481C1C}">
+                  <a14:useLocalDpi xmlns:a14="http://schemas.microsoft.com/office/drawing/2010/main" val="0"/>
+                </a:ext>
+              </a:extLst>
+            </a:blip>
+            <a:stretch>
+              <a:fillRect/>
+            </a:stretch>
+          </p:blipFill>
+          <p:spPr>
+            <a:xfrm>
+              <a:off x="1442199" y="1440761"/>
+              <a:ext cx="3479800" cy="1638300"/>
+            </a:xfrm>
+            <a:prstGeom prst="rect">
+              <a:avLst/>
+            </a:prstGeom>
+          </p:spPr>
+        </p:pic>
+        <p:pic>
+          <p:nvPicPr>
+            <p:cNvPr id="5" name="Picture 4"/>
+            <p:cNvPicPr>
+              <a:picLocks noChangeAspect="1"/>
+            </p:cNvPicPr>
+            <p:nvPr/>
+          </p:nvPicPr>
+          <p:blipFill>
+            <a:blip r:embed="rId4">
+              <a:extLst>
+                <a:ext uri="{28A0092B-C50C-407E-A947-70E740481C1C}">
+                  <a14:useLocalDpi xmlns:a14="http://schemas.microsoft.com/office/drawing/2010/main" val="0"/>
+                </a:ext>
+              </a:extLst>
+            </a:blip>
+            <a:stretch>
+              <a:fillRect/>
+            </a:stretch>
+          </p:blipFill>
+          <p:spPr>
+            <a:xfrm>
+              <a:off x="6244613" y="1440761"/>
+              <a:ext cx="4610100" cy="1638300"/>
+            </a:xfrm>
+            <a:prstGeom prst="rect">
+              <a:avLst/>
+            </a:prstGeom>
+          </p:spPr>
+        </p:pic>
+        <p:sp>
+          <p:nvSpPr>
+            <p:cNvPr id="11" name="TextBox 10"/>
+            <p:cNvSpPr txBox="1"/>
+            <p:nvPr/>
+          </p:nvSpPr>
+          <p:spPr>
+            <a:xfrm>
+              <a:off x="1836965" y="448799"/>
+              <a:ext cx="2690268" cy="984885"/>
+            </a:xfrm>
+            <a:prstGeom prst="rect">
+              <a:avLst/>
+            </a:prstGeom>
+            <a:noFill/>
+          </p:spPr>
+          <p:txBody>
+            <a:bodyPr wrap="square" rtlCol="0">
+              <a:spAutoFit/>
+            </a:bodyPr>
+            <a:lstStyle/>
+            <a:p>
+              <a:pPr algn="ctr"/>
+              <a:r>
+                <a:rPr lang="en-US" sz="4000" b="1" dirty="0" smtClean="0"/>
+                <a:t>Gini Index</a:t>
+              </a:r>
+              <a:endParaRPr lang="en-US" sz="4000" dirty="0"/>
+            </a:p>
+            <a:p>
+              <a:endParaRPr lang="en-US" dirty="0"/>
+            </a:p>
+          </p:txBody>
+        </p:sp>
+        <p:sp>
+          <p:nvSpPr>
+            <p:cNvPr id="12" name="TextBox 11"/>
+            <p:cNvSpPr txBox="1"/>
+            <p:nvPr/>
+          </p:nvSpPr>
+          <p:spPr>
+            <a:xfrm>
+              <a:off x="6563473" y="448798"/>
+              <a:ext cx="3972379" cy="984885"/>
+            </a:xfrm>
+            <a:prstGeom prst="rect">
+              <a:avLst/>
+            </a:prstGeom>
+            <a:noFill/>
+          </p:spPr>
+          <p:txBody>
+            <a:bodyPr wrap="square" rtlCol="0">
+              <a:spAutoFit/>
+            </a:bodyPr>
+            <a:lstStyle/>
+            <a:p>
+              <a:pPr algn="ctr"/>
+              <a:r>
+                <a:rPr lang="en-US" sz="4000" b="1" dirty="0" smtClean="0"/>
+                <a:t>Entropy</a:t>
+              </a:r>
+              <a:endParaRPr lang="en-US" sz="4000" dirty="0"/>
+            </a:p>
+            <a:p>
+              <a:endParaRPr lang="en-US" dirty="0"/>
+            </a:p>
+          </p:txBody>
+        </p:sp>
+        <p:sp>
+          <p:nvSpPr>
+            <p:cNvPr id="13" name="Rectangle 12"/>
+            <p:cNvSpPr/>
+            <p:nvPr/>
+          </p:nvSpPr>
+          <p:spPr>
+            <a:xfrm>
+              <a:off x="6364197" y="3079061"/>
+              <a:ext cx="4490516" cy="2031325"/>
+            </a:xfrm>
+            <a:prstGeom prst="rect">
+              <a:avLst/>
+            </a:prstGeom>
+            <a:ln w="0">
+              <a:noFill/>
+            </a:ln>
+          </p:spPr>
+          <p:txBody>
+            <a:bodyPr wrap="square">
+              <a:spAutoFit/>
+            </a:bodyPr>
+            <a:lstStyle/>
+            <a:p>
+              <a:r>
+                <a:rPr lang="en-US" dirty="0" err="1" smtClean="0"/>
+                <a:t>p</a:t>
+              </a:r>
+              <a:r>
+                <a:rPr lang="en-US" baseline="-25000" dirty="0" err="1" smtClean="0"/>
+                <a:t>j</a:t>
+              </a:r>
+              <a:r>
+                <a:rPr lang="en-US" dirty="0" smtClean="0"/>
+                <a:t>: proportion of the samples that belongs to class c for a particular node.</a:t>
+              </a:r>
+            </a:p>
+            <a:p>
+              <a:endParaRPr lang="en-US" dirty="0"/>
+            </a:p>
+            <a:p>
+              <a:r>
+                <a:rPr lang="en-US" dirty="0" smtClean="0"/>
+                <a:t>*This is the the definition of entropy for all non-empty classes (</a:t>
+              </a:r>
+              <a:r>
+                <a:rPr lang="en-US" dirty="0"/>
+                <a:t>p ≠ </a:t>
+              </a:r>
+              <a:r>
+                <a:rPr lang="en-US" dirty="0" smtClean="0"/>
+                <a:t>0</a:t>
+              </a:r>
+              <a:r>
+                <a:rPr lang="en-US" dirty="0"/>
+                <a:t>). The entropy </a:t>
+              </a:r>
+              <a:r>
+                <a:rPr lang="en-US" dirty="0" smtClean="0"/>
+                <a:t>is 0 </a:t>
+              </a:r>
+              <a:r>
+                <a:rPr lang="en-US" dirty="0"/>
+                <a:t>if all samples at a node belong to the same </a:t>
+              </a:r>
+              <a:r>
+                <a:rPr lang="en-US" dirty="0" smtClean="0"/>
+                <a:t>class. </a:t>
+              </a:r>
+              <a:endParaRPr lang="en-US" dirty="0"/>
+            </a:p>
+          </p:txBody>
+        </p:sp>
+      </p:grpSp>
+      <p:sp>
+        <p:nvSpPr>
+          <p:cNvPr id="17" name="TextBox 16"/>
+          <p:cNvSpPr txBox="1"/>
+          <p:nvPr/>
+        </p:nvSpPr>
+        <p:spPr>
+          <a:xfrm>
+            <a:off x="1853294" y="599981"/>
+            <a:ext cx="7814468" cy="1138773"/>
+          </a:xfrm>
+          <a:prstGeom prst="rect">
+            <a:avLst/>
+          </a:prstGeom>
+          <a:noFill/>
+        </p:spPr>
+        <p:txBody>
+          <a:bodyPr wrap="square" rtlCol="0">
+            <a:spAutoFit/>
+          </a:bodyPr>
           <a:lstStyle/>
           <a:p>
-            <a:endParaRPr lang="en-US"/>
-          </a:p>
-        </p:txBody>
-      </p:sp>
-      <p:sp>
-        <p:nvSpPr>
-          <p:cNvPr id="3" name="Content Placeholder 2"/>
-          <p:cNvSpPr>
-            <a:spLocks noGrp="1"/>
-          </p:cNvSpPr>
-          <p:nvPr>
-            <p:ph idx="1"/>
-          </p:nvPr>
-        </p:nvSpPr>
-        <p:spPr/>
-        <p:txBody>
-          <a:bodyPr/>
-          <a:lstStyle/>
-          <a:p>
-            <a:endParaRPr lang="en-US"/>
+            <a:pPr algn="ctr"/>
+            <a:r>
+              <a:rPr lang="en-US" sz="5000" b="1" dirty="0" smtClean="0"/>
+              <a:t>Impurity Criterion</a:t>
+            </a:r>
+            <a:endParaRPr lang="en-US" sz="5000" dirty="0"/>
+          </a:p>
+          <a:p>
+            <a:endParaRPr lang="en-US" dirty="0"/>
           </a:p>
         </p:txBody>
       </p:sp>
     </p:spTree>
     <p:extLst>
       <p:ext uri="{BB962C8B-B14F-4D97-AF65-F5344CB8AC3E}">
-        <p14:creationId xmlns:p14="http://schemas.microsoft.com/office/powerpoint/2010/main" val="1712686614"/>
+        <p14:creationId xmlns:p14="http://schemas.microsoft.com/office/powerpoint/2010/main" val="913477704"/>
       </p:ext>
     </p:extLst>
   </p:cSld>
@@ -4759,48 +5200,132 @@
           <a:chExt cx="0" cy="0"/>
         </a:xfrm>
       </p:grpSpPr>
-      <p:sp>
-        <p:nvSpPr>
-          <p:cNvPr id="2" name="Title 1"/>
-          <p:cNvSpPr>
-            <a:spLocks noGrp="1"/>
-          </p:cNvSpPr>
-          <p:nvPr>
-            <p:ph type="title"/>
-          </p:nvPr>
-        </p:nvSpPr>
-        <p:spPr/>
-        <p:txBody>
-          <a:bodyPr/>
-          <a:lstStyle/>
-          <a:p>
-            <a:endParaRPr lang="en-US"/>
-          </a:p>
-        </p:txBody>
-      </p:sp>
-      <p:sp>
-        <p:nvSpPr>
-          <p:cNvPr id="3" name="Content Placeholder 2"/>
-          <p:cNvSpPr>
-            <a:spLocks noGrp="1"/>
-          </p:cNvSpPr>
-          <p:nvPr>
-            <p:ph idx="1"/>
-          </p:nvPr>
-        </p:nvSpPr>
-        <p:spPr/>
-        <p:txBody>
-          <a:bodyPr/>
-          <a:lstStyle/>
-          <a:p>
-            <a:endParaRPr lang="en-US"/>
-          </a:p>
-        </p:txBody>
-      </p:sp>
+      <p:grpSp>
+        <p:nvGrpSpPr>
+          <p:cNvPr id="9" name="Group 8"/>
+          <p:cNvGrpSpPr/>
+          <p:nvPr/>
+        </p:nvGrpSpPr>
+        <p:grpSpPr>
+          <a:xfrm>
+            <a:off x="-2965532" y="547306"/>
+            <a:ext cx="9797541" cy="4651752"/>
+            <a:chOff x="-2965532" y="547306"/>
+            <a:chExt cx="9797541" cy="4651752"/>
+          </a:xfrm>
+        </p:grpSpPr>
+        <p:pic>
+          <p:nvPicPr>
+            <p:cNvPr id="21" name="Picture 20"/>
+            <p:cNvPicPr>
+              <a:picLocks noChangeAspect="1"/>
+            </p:cNvPicPr>
+            <p:nvPr/>
+          </p:nvPicPr>
+          <p:blipFill>
+            <a:blip r:embed="rId3">
+              <a:extLst>
+                <a:ext uri="{28A0092B-C50C-407E-A947-70E740481C1C}">
+                  <a14:useLocalDpi xmlns:a14="http://schemas.microsoft.com/office/drawing/2010/main" val="0"/>
+                </a:ext>
+              </a:extLst>
+            </a:blip>
+            <a:stretch>
+              <a:fillRect/>
+            </a:stretch>
+          </p:blipFill>
+          <p:spPr>
+            <a:xfrm>
+              <a:off x="-2552701" y="547306"/>
+              <a:ext cx="3805084" cy="2743200"/>
+            </a:xfrm>
+            <a:prstGeom prst="rect">
+              <a:avLst/>
+            </a:prstGeom>
+          </p:spPr>
+        </p:pic>
+        <p:pic>
+          <p:nvPicPr>
+            <p:cNvPr id="7" name="Picture 6"/>
+            <p:cNvPicPr>
+              <a:picLocks noChangeAspect="1"/>
+            </p:cNvPicPr>
+            <p:nvPr/>
+          </p:nvPicPr>
+          <p:blipFill>
+            <a:blip r:embed="rId4">
+              <a:extLst>
+                <a:ext uri="{28A0092B-C50C-407E-A947-70E740481C1C}">
+                  <a14:useLocalDpi xmlns:a14="http://schemas.microsoft.com/office/drawing/2010/main" val="0"/>
+                </a:ext>
+              </a:extLst>
+            </a:blip>
+            <a:stretch>
+              <a:fillRect/>
+            </a:stretch>
+          </p:blipFill>
+          <p:spPr>
+            <a:xfrm>
+              <a:off x="1434509" y="547306"/>
+              <a:ext cx="5397500" cy="3759200"/>
+            </a:xfrm>
+            <a:prstGeom prst="rect">
+              <a:avLst/>
+            </a:prstGeom>
+          </p:spPr>
+        </p:pic>
+        <p:sp>
+          <p:nvSpPr>
+            <p:cNvPr id="28" name="Rectangle 27"/>
+            <p:cNvSpPr/>
+            <p:nvPr/>
+          </p:nvSpPr>
+          <p:spPr>
+            <a:xfrm>
+              <a:off x="-2965532" y="4306506"/>
+              <a:ext cx="8435829" cy="892552"/>
+            </a:xfrm>
+            <a:prstGeom prst="rect">
+              <a:avLst/>
+            </a:prstGeom>
+            <a:ln w="0">
+              <a:noFill/>
+            </a:ln>
+          </p:spPr>
+          <p:txBody>
+            <a:bodyPr wrap="square">
+              <a:spAutoFit/>
+            </a:bodyPr>
+            <a:lstStyle/>
+            <a:p>
+              <a:pPr algn="ctr"/>
+              <a:r>
+                <a:rPr lang="en-US" sz="2600" b="1" dirty="0" smtClean="0"/>
+                <a:t>Information Gain</a:t>
+              </a:r>
+            </a:p>
+            <a:p>
+              <a:pPr algn="ctr"/>
+              <a:r>
+                <a:rPr lang="en-US" sz="2600" b="1" dirty="0" smtClean="0"/>
+                <a:t>.665 </a:t>
+              </a:r>
+              <a:r>
+                <a:rPr lang="mr-IN" sz="2600" b="1" dirty="0" smtClean="0"/>
+                <a:t>–</a:t>
+              </a:r>
+              <a:r>
+                <a:rPr lang="en-US" sz="2600" b="1" dirty="0" smtClean="0"/>
+                <a:t> (0.000 + .497)</a:t>
+              </a:r>
+            </a:p>
+          </p:txBody>
+        </p:sp>
+      </p:grpSp>
     </p:spTree>
     <p:extLst>
       <p:ext uri="{BB962C8B-B14F-4D97-AF65-F5344CB8AC3E}">
-        <p14:creationId xmlns:p14="http://schemas.microsoft.com/office/powerpoint/2010/main" val="780668191"/>
+        <p14:creationId xmlns:p14="http://schemas.microsoft.com/office/powerpoint/2010/main" val="1971730126"/>
       </p:ext>
     </p:extLst>
   </p:cSld>
@@ -4827,48 +5352,10 @@
           <a:chExt cx="0" cy="0"/>
         </a:xfrm>
       </p:grpSpPr>
-      <p:sp>
-        <p:nvSpPr>
-          <p:cNvPr id="2" name="Title 1"/>
-          <p:cNvSpPr>
-            <a:spLocks noGrp="1"/>
-          </p:cNvSpPr>
-          <p:nvPr>
-            <p:ph type="title"/>
-          </p:nvPr>
-        </p:nvSpPr>
-        <p:spPr/>
-        <p:txBody>
-          <a:bodyPr/>
-          <a:lstStyle/>
-          <a:p>
-            <a:endParaRPr lang="en-US"/>
-          </a:p>
-        </p:txBody>
-      </p:sp>
-      <p:sp>
-        <p:nvSpPr>
-          <p:cNvPr id="3" name="Content Placeholder 2"/>
-          <p:cNvSpPr>
-            <a:spLocks noGrp="1"/>
-          </p:cNvSpPr>
-          <p:nvPr>
-            <p:ph idx="1"/>
-          </p:nvPr>
-        </p:nvSpPr>
-        <p:spPr/>
-        <p:txBody>
-          <a:bodyPr/>
-          <a:lstStyle/>
-          <a:p>
-            <a:endParaRPr lang="en-US"/>
-          </a:p>
-        </p:txBody>
-      </p:sp>
     </p:spTree>
     <p:extLst>
       <p:ext uri="{BB962C8B-B14F-4D97-AF65-F5344CB8AC3E}">
-        <p14:creationId xmlns:p14="http://schemas.microsoft.com/office/powerpoint/2010/main" val="781507149"/>
+        <p14:creationId xmlns:p14="http://schemas.microsoft.com/office/powerpoint/2010/main" val="2092350290"/>
       </p:ext>
     </p:extLst>
   </p:cSld>
@@ -4929,14 +5416,14 @@
           <a:bodyPr/>
           <a:lstStyle/>
           <a:p>
-            <a:endParaRPr lang="en-US"/>
+            <a:endParaRPr lang="en-US" dirty="0"/>
           </a:p>
         </p:txBody>
       </p:sp>
     </p:spTree>
     <p:extLst>
       <p:ext uri="{BB962C8B-B14F-4D97-AF65-F5344CB8AC3E}">
-        <p14:creationId xmlns:p14="http://schemas.microsoft.com/office/powerpoint/2010/main" val="1947692910"/>
+        <p14:creationId xmlns:p14="http://schemas.microsoft.com/office/powerpoint/2010/main" val="1712686614"/>
       </p:ext>
     </p:extLst>
   </p:cSld>
@@ -5004,7 +5491,7 @@
     </p:spTree>
     <p:extLst>
       <p:ext uri="{BB962C8B-B14F-4D97-AF65-F5344CB8AC3E}">
-        <p14:creationId xmlns:p14="http://schemas.microsoft.com/office/powerpoint/2010/main" val="412184355"/>
+        <p14:creationId xmlns:p14="http://schemas.microsoft.com/office/powerpoint/2010/main" val="780668191"/>
       </p:ext>
     </p:extLst>
   </p:cSld>
@@ -5072,7 +5559,7 @@
     </p:spTree>
     <p:extLst>
       <p:ext uri="{BB962C8B-B14F-4D97-AF65-F5344CB8AC3E}">
-        <p14:creationId xmlns:p14="http://schemas.microsoft.com/office/powerpoint/2010/main" val="1578406478"/>
+        <p14:creationId xmlns:p14="http://schemas.microsoft.com/office/powerpoint/2010/main" val="781507149"/>
       </p:ext>
     </p:extLst>
   </p:cSld>
@@ -5140,7 +5627,7 @@
     </p:spTree>
     <p:extLst>
       <p:ext uri="{BB962C8B-B14F-4D97-AF65-F5344CB8AC3E}">
-        <p14:creationId xmlns:p14="http://schemas.microsoft.com/office/powerpoint/2010/main" val="721245678"/>
+        <p14:creationId xmlns:p14="http://schemas.microsoft.com/office/powerpoint/2010/main" val="1947692910"/>
       </p:ext>
     </p:extLst>
   </p:cSld>
@@ -5531,6 +6018,210 @@
           <a:chExt cx="0" cy="0"/>
         </a:xfrm>
       </p:grpSpPr>
+      <p:sp>
+        <p:nvSpPr>
+          <p:cNvPr id="2" name="Title 1"/>
+          <p:cNvSpPr>
+            <a:spLocks noGrp="1"/>
+          </p:cNvSpPr>
+          <p:nvPr>
+            <p:ph type="title"/>
+          </p:nvPr>
+        </p:nvSpPr>
+        <p:spPr/>
+        <p:txBody>
+          <a:bodyPr/>
+          <a:lstStyle/>
+          <a:p>
+            <a:endParaRPr lang="en-US"/>
+          </a:p>
+        </p:txBody>
+      </p:sp>
+      <p:sp>
+        <p:nvSpPr>
+          <p:cNvPr id="3" name="Content Placeholder 2"/>
+          <p:cNvSpPr>
+            <a:spLocks noGrp="1"/>
+          </p:cNvSpPr>
+          <p:nvPr>
+            <p:ph idx="1"/>
+          </p:nvPr>
+        </p:nvSpPr>
+        <p:spPr/>
+        <p:txBody>
+          <a:bodyPr/>
+          <a:lstStyle/>
+          <a:p>
+            <a:endParaRPr lang="en-US"/>
+          </a:p>
+        </p:txBody>
+      </p:sp>
+    </p:spTree>
+    <p:extLst>
+      <p:ext uri="{BB962C8B-B14F-4D97-AF65-F5344CB8AC3E}">
+        <p14:creationId xmlns:p14="http://schemas.microsoft.com/office/powerpoint/2010/main" val="412184355"/>
+      </p:ext>
+    </p:extLst>
+  </p:cSld>
+  <p:clrMapOvr>
+    <a:masterClrMapping/>
+  </p:clrMapOvr>
+</p:sld>
+</file>
+
+<file path=ppt/slides/slide21.xml><?xml version="1.0" encoding="utf-8"?>
+<p:sld xmlns:a="http://schemas.openxmlformats.org/drawingml/2006/main" xmlns:r="http://schemas.openxmlformats.org/officeDocument/2006/relationships" xmlns:p="http://schemas.openxmlformats.org/presentationml/2006/main">
+  <p:cSld>
+    <p:spTree>
+      <p:nvGrpSpPr>
+        <p:cNvPr id="1" name=""/>
+        <p:cNvGrpSpPr/>
+        <p:nvPr/>
+      </p:nvGrpSpPr>
+      <p:grpSpPr>
+        <a:xfrm>
+          <a:off x="0" y="0"/>
+          <a:ext cx="0" cy="0"/>
+          <a:chOff x="0" y="0"/>
+          <a:chExt cx="0" cy="0"/>
+        </a:xfrm>
+      </p:grpSpPr>
+      <p:sp>
+        <p:nvSpPr>
+          <p:cNvPr id="2" name="Title 1"/>
+          <p:cNvSpPr>
+            <a:spLocks noGrp="1"/>
+          </p:cNvSpPr>
+          <p:nvPr>
+            <p:ph type="title"/>
+          </p:nvPr>
+        </p:nvSpPr>
+        <p:spPr/>
+        <p:txBody>
+          <a:bodyPr/>
+          <a:lstStyle/>
+          <a:p>
+            <a:endParaRPr lang="en-US"/>
+          </a:p>
+        </p:txBody>
+      </p:sp>
+      <p:sp>
+        <p:nvSpPr>
+          <p:cNvPr id="3" name="Content Placeholder 2"/>
+          <p:cNvSpPr>
+            <a:spLocks noGrp="1"/>
+          </p:cNvSpPr>
+          <p:nvPr>
+            <p:ph idx="1"/>
+          </p:nvPr>
+        </p:nvSpPr>
+        <p:spPr/>
+        <p:txBody>
+          <a:bodyPr/>
+          <a:lstStyle/>
+          <a:p>
+            <a:endParaRPr lang="en-US"/>
+          </a:p>
+        </p:txBody>
+      </p:sp>
+    </p:spTree>
+    <p:extLst>
+      <p:ext uri="{BB962C8B-B14F-4D97-AF65-F5344CB8AC3E}">
+        <p14:creationId xmlns:p14="http://schemas.microsoft.com/office/powerpoint/2010/main" val="1578406478"/>
+      </p:ext>
+    </p:extLst>
+  </p:cSld>
+  <p:clrMapOvr>
+    <a:masterClrMapping/>
+  </p:clrMapOvr>
+</p:sld>
+</file>
+
+<file path=ppt/slides/slide22.xml><?xml version="1.0" encoding="utf-8"?>
+<p:sld xmlns:a="http://schemas.openxmlformats.org/drawingml/2006/main" xmlns:r="http://schemas.openxmlformats.org/officeDocument/2006/relationships" xmlns:p="http://schemas.openxmlformats.org/presentationml/2006/main">
+  <p:cSld>
+    <p:spTree>
+      <p:nvGrpSpPr>
+        <p:cNvPr id="1" name=""/>
+        <p:cNvGrpSpPr/>
+        <p:nvPr/>
+      </p:nvGrpSpPr>
+      <p:grpSpPr>
+        <a:xfrm>
+          <a:off x="0" y="0"/>
+          <a:ext cx="0" cy="0"/>
+          <a:chOff x="0" y="0"/>
+          <a:chExt cx="0" cy="0"/>
+        </a:xfrm>
+      </p:grpSpPr>
+      <p:sp>
+        <p:nvSpPr>
+          <p:cNvPr id="2" name="Title 1"/>
+          <p:cNvSpPr>
+            <a:spLocks noGrp="1"/>
+          </p:cNvSpPr>
+          <p:nvPr>
+            <p:ph type="title"/>
+          </p:nvPr>
+        </p:nvSpPr>
+        <p:spPr/>
+        <p:txBody>
+          <a:bodyPr/>
+          <a:lstStyle/>
+          <a:p>
+            <a:endParaRPr lang="en-US"/>
+          </a:p>
+        </p:txBody>
+      </p:sp>
+      <p:sp>
+        <p:nvSpPr>
+          <p:cNvPr id="3" name="Content Placeholder 2"/>
+          <p:cNvSpPr>
+            <a:spLocks noGrp="1"/>
+          </p:cNvSpPr>
+          <p:nvPr>
+            <p:ph idx="1"/>
+          </p:nvPr>
+        </p:nvSpPr>
+        <p:spPr/>
+        <p:txBody>
+          <a:bodyPr/>
+          <a:lstStyle/>
+          <a:p>
+            <a:endParaRPr lang="en-US"/>
+          </a:p>
+        </p:txBody>
+      </p:sp>
+    </p:spTree>
+    <p:extLst>
+      <p:ext uri="{BB962C8B-B14F-4D97-AF65-F5344CB8AC3E}">
+        <p14:creationId xmlns:p14="http://schemas.microsoft.com/office/powerpoint/2010/main" val="721245678"/>
+      </p:ext>
+    </p:extLst>
+  </p:cSld>
+  <p:clrMapOvr>
+    <a:masterClrMapping/>
+  </p:clrMapOvr>
+</p:sld>
+</file>
+
+<file path=ppt/slides/slide23.xml><?xml version="1.0" encoding="utf-8"?>
+<p:sld xmlns:a="http://schemas.openxmlformats.org/drawingml/2006/main" xmlns:r="http://schemas.openxmlformats.org/officeDocument/2006/relationships" xmlns:p="http://schemas.openxmlformats.org/presentationml/2006/main">
+  <p:cSld>
+    <p:spTree>
+      <p:nvGrpSpPr>
+        <p:cNvPr id="1" name=""/>
+        <p:cNvGrpSpPr/>
+        <p:nvPr/>
+      </p:nvGrpSpPr>
+      <p:grpSpPr>
+        <a:xfrm>
+          <a:off x="0" y="0"/>
+          <a:ext cx="0" cy="0"/>
+          <a:chOff x="0" y="0"/>
+          <a:chExt cx="0" cy="0"/>
+        </a:xfrm>
+      </p:grpSpPr>
     </p:spTree>
     <p:extLst>
       <p:ext uri="{BB962C8B-B14F-4D97-AF65-F5344CB8AC3E}">
@@ -5544,7 +6235,7 @@
 </p:sld>
 </file>
 
-<file path=ppt/slides/slide21.xml><?xml version="1.0" encoding="utf-8"?>
+<file path=ppt/slides/slide24.xml><?xml version="1.0" encoding="utf-8"?>
 <p:sld xmlns:a="http://schemas.openxmlformats.org/drawingml/2006/main" xmlns:r="http://schemas.openxmlformats.org/officeDocument/2006/relationships" xmlns:p="http://schemas.openxmlformats.org/presentationml/2006/main">
   <p:cSld>
     <p:spTree>
@@ -5844,7 +6535,7 @@
 </p:sld>
 </file>
 
-<file path=ppt/slides/slide22.xml><?xml version="1.0" encoding="utf-8"?>
+<file path=ppt/slides/slide25.xml><?xml version="1.0" encoding="utf-8"?>
 <p:sld xmlns:a="http://schemas.openxmlformats.org/drawingml/2006/main" xmlns:r="http://schemas.openxmlformats.org/officeDocument/2006/relationships" xmlns:p="http://schemas.openxmlformats.org/presentationml/2006/main">
   <p:cSld>
     <p:spTree>
@@ -6053,7 +6744,7 @@
 </p:sld>
 </file>
 
-<file path=ppt/slides/slide23.xml><?xml version="1.0" encoding="utf-8"?>
+<file path=ppt/slides/slide26.xml><?xml version="1.0" encoding="utf-8"?>
 <p:sld xmlns:a="http://schemas.openxmlformats.org/drawingml/2006/main" xmlns:r="http://schemas.openxmlformats.org/officeDocument/2006/relationships" xmlns:p="http://schemas.openxmlformats.org/presentationml/2006/main">
   <p:cSld>
     <p:spTree>
@@ -6324,7 +7015,7 @@
 </p:sld>
 </file>
 
-<file path=ppt/slides/slide24.xml><?xml version="1.0" encoding="utf-8"?>
+<file path=ppt/slides/slide27.xml><?xml version="1.0" encoding="utf-8"?>
 <p:sld xmlns:a="http://schemas.openxmlformats.org/drawingml/2006/main" xmlns:r="http://schemas.openxmlformats.org/officeDocument/2006/relationships" xmlns:p="http://schemas.openxmlformats.org/presentationml/2006/main">
   <p:cSld>
     <p:spTree>
@@ -6589,7 +7280,7 @@
 </p:sld>
 </file>
 
-<file path=ppt/slides/slide25.xml><?xml version="1.0" encoding="utf-8"?>
+<file path=ppt/slides/slide28.xml><?xml version="1.0" encoding="utf-8"?>
 <p:sld xmlns:a="http://schemas.openxmlformats.org/drawingml/2006/main" xmlns:r="http://schemas.openxmlformats.org/officeDocument/2006/relationships" xmlns:p="http://schemas.openxmlformats.org/presentationml/2006/main">
   <p:cSld>
     <p:spTree>
@@ -8997,15 +9688,558 @@
           </a:p>
         </p:txBody>
       </p:sp>
+      <p:pic>
+        <p:nvPicPr>
+          <p:cNvPr id="23" name="Picture 22"/>
+          <p:cNvPicPr>
+            <a:picLocks noChangeAspect="1"/>
+          </p:cNvPicPr>
+          <p:nvPr/>
+        </p:nvPicPr>
+        <p:blipFill>
+          <a:blip r:embed="rId3">
+            <a:extLst>
+              <a:ext uri="{28A0092B-C50C-407E-A947-70E740481C1C}">
+                <a14:useLocalDpi xmlns:a14="http://schemas.microsoft.com/office/drawing/2010/main" val="0"/>
+              </a:ext>
+            </a:extLst>
+          </a:blip>
+          <a:stretch>
+            <a:fillRect/>
+          </a:stretch>
+        </p:blipFill>
+        <p:spPr>
+          <a:xfrm>
+            <a:off x="11079893" y="9126427"/>
+            <a:ext cx="5857461" cy="4572920"/>
+          </a:xfrm>
+          <a:prstGeom prst="rect">
+            <a:avLst/>
+          </a:prstGeom>
+          <a:ln w="12700">
+            <a:noFill/>
+          </a:ln>
+        </p:spPr>
+      </p:pic>
+      <p:pic>
+        <p:nvPicPr>
+          <p:cNvPr id="4" name="Picture 3"/>
+          <p:cNvPicPr>
+            <a:picLocks noChangeAspect="1"/>
+          </p:cNvPicPr>
+          <p:nvPr/>
+        </p:nvPicPr>
+        <p:blipFill>
+          <a:blip r:embed="rId4">
+            <a:extLst>
+              <a:ext uri="{28A0092B-C50C-407E-A947-70E740481C1C}">
+                <a14:useLocalDpi xmlns:a14="http://schemas.microsoft.com/office/drawing/2010/main" val="0"/>
+              </a:ext>
+            </a:extLst>
+          </a:blip>
+          <a:stretch>
+            <a:fillRect/>
+          </a:stretch>
+        </p:blipFill>
+        <p:spPr>
+          <a:xfrm>
+            <a:off x="-1281179" y="9126427"/>
+            <a:ext cx="6341807" cy="4572920"/>
+          </a:xfrm>
+          <a:prstGeom prst="rect">
+            <a:avLst/>
+          </a:prstGeom>
+          <a:ln w="12700">
+            <a:noFill/>
+          </a:ln>
+        </p:spPr>
+      </p:pic>
+      <p:pic>
+        <p:nvPicPr>
+          <p:cNvPr id="5" name="Picture 4"/>
+          <p:cNvPicPr>
+            <a:picLocks noChangeAspect="1"/>
+          </p:cNvPicPr>
+          <p:nvPr/>
+        </p:nvPicPr>
+        <p:blipFill>
+          <a:blip r:embed="rId5">
+            <a:extLst>
+              <a:ext uri="{28A0092B-C50C-407E-A947-70E740481C1C}">
+                <a14:useLocalDpi xmlns:a14="http://schemas.microsoft.com/office/drawing/2010/main" val="0"/>
+              </a:ext>
+            </a:extLst>
+          </a:blip>
+          <a:stretch>
+            <a:fillRect/>
+          </a:stretch>
+        </p:blipFill>
+        <p:spPr>
+          <a:xfrm>
+            <a:off x="5528229" y="9126427"/>
+            <a:ext cx="5084063" cy="4572920"/>
+          </a:xfrm>
+          <a:prstGeom prst="rect">
+            <a:avLst/>
+          </a:prstGeom>
+          <a:ln w="12700">
+            <a:noFill/>
+          </a:ln>
+        </p:spPr>
+      </p:pic>
+      <p:sp>
+        <p:nvSpPr>
+          <p:cNvPr id="15" name="TextBox 14"/>
+          <p:cNvSpPr txBox="1"/>
+          <p:nvPr/>
+        </p:nvSpPr>
+        <p:spPr>
+          <a:xfrm>
+            <a:off x="15102026" y="8795508"/>
+            <a:ext cx="1920240" cy="292447"/>
+          </a:xfrm>
+          <a:prstGeom prst="rect">
+            <a:avLst/>
+          </a:prstGeom>
+          <a:noFill/>
+        </p:spPr>
+        <p:txBody>
+          <a:bodyPr wrap="square" rtlCol="0">
+            <a:spAutoFit/>
+          </a:bodyPr>
+          <a:lstStyle/>
+          <a:p>
+            <a:r>
+              <a:rPr lang="en-US" sz="1300" dirty="0" smtClean="0"/>
+              <a:t>Decision Node </a:t>
+            </a:r>
+            <a:endParaRPr lang="en-US" sz="1300" dirty="0"/>
+          </a:p>
+        </p:txBody>
+      </p:sp>
+      <p:sp>
+        <p:nvSpPr>
+          <p:cNvPr id="16" name="TextBox 15"/>
+          <p:cNvSpPr txBox="1"/>
+          <p:nvPr/>
+        </p:nvSpPr>
+        <p:spPr>
+          <a:xfrm>
+            <a:off x="15105299" y="8479241"/>
+            <a:ext cx="1554480" cy="292447"/>
+          </a:xfrm>
+          <a:prstGeom prst="rect">
+            <a:avLst/>
+          </a:prstGeom>
+          <a:noFill/>
+        </p:spPr>
+        <p:txBody>
+          <a:bodyPr wrap="square" rtlCol="0">
+            <a:spAutoFit/>
+          </a:bodyPr>
+          <a:lstStyle/>
+          <a:p>
+            <a:r>
+              <a:rPr lang="en-US" sz="1300" dirty="0" smtClean="0"/>
+              <a:t>Root Node</a:t>
+            </a:r>
+            <a:endParaRPr lang="en-US" sz="1300" dirty="0"/>
+          </a:p>
+        </p:txBody>
+      </p:sp>
+      <p:sp>
+        <p:nvSpPr>
+          <p:cNvPr id="17" name="Rectangle 16"/>
+          <p:cNvSpPr/>
+          <p:nvPr/>
+        </p:nvSpPr>
+        <p:spPr>
+          <a:xfrm>
+            <a:off x="14860203" y="8873250"/>
+            <a:ext cx="137160" cy="137188"/>
+          </a:xfrm>
+          <a:prstGeom prst="rect">
+            <a:avLst/>
+          </a:prstGeom>
+          <a:solidFill>
+            <a:srgbClr val="0000FF"/>
+          </a:solidFill>
+          <a:ln>
+            <a:solidFill>
+              <a:schemeClr val="tx1"/>
+            </a:solidFill>
+          </a:ln>
+        </p:spPr>
+        <p:style>
+          <a:lnRef idx="2">
+            <a:schemeClr val="accent1">
+              <a:shade val="50000"/>
+            </a:schemeClr>
+          </a:lnRef>
+          <a:fillRef idx="1">
+            <a:schemeClr val="accent1"/>
+          </a:fillRef>
+          <a:effectRef idx="0">
+            <a:schemeClr val="accent1"/>
+          </a:effectRef>
+          <a:fontRef idx="minor">
+            <a:schemeClr val="lt1"/>
+          </a:fontRef>
+        </p:style>
+        <p:txBody>
+          <a:bodyPr rtlCol="0" anchor="ctr"/>
+          <a:lstStyle/>
+          <a:p>
+            <a:pPr algn="ctr"/>
+            <a:endParaRPr lang="en-US">
+              <a:solidFill>
+                <a:srgbClr val="0000FF"/>
+              </a:solidFill>
+            </a:endParaRPr>
+          </a:p>
+        </p:txBody>
+      </p:sp>
+      <p:sp>
+        <p:nvSpPr>
+          <p:cNvPr id="18" name="Rectangle 17"/>
+          <p:cNvSpPr/>
+          <p:nvPr/>
+        </p:nvSpPr>
+        <p:spPr>
+          <a:xfrm>
+            <a:off x="14761621" y="8417247"/>
+            <a:ext cx="1999102" cy="1057257"/>
+          </a:xfrm>
+          <a:prstGeom prst="rect">
+            <a:avLst/>
+          </a:prstGeom>
+          <a:noFill/>
+          <a:ln w="6350">
+            <a:solidFill>
+              <a:schemeClr val="tx1">
+                <a:alpha val="32000"/>
+              </a:schemeClr>
+            </a:solidFill>
+          </a:ln>
+        </p:spPr>
+        <p:style>
+          <a:lnRef idx="2">
+            <a:schemeClr val="accent1">
+              <a:shade val="50000"/>
+            </a:schemeClr>
+          </a:lnRef>
+          <a:fillRef idx="1">
+            <a:schemeClr val="accent1"/>
+          </a:fillRef>
+          <a:effectRef idx="0">
+            <a:schemeClr val="accent1"/>
+          </a:effectRef>
+          <a:fontRef idx="minor">
+            <a:schemeClr val="lt1"/>
+          </a:fontRef>
+        </p:style>
+        <p:txBody>
+          <a:bodyPr rtlCol="0" anchor="ctr"/>
+          <a:lstStyle/>
+          <a:p>
+            <a:pPr algn="ctr"/>
+            <a:endParaRPr lang="en-US"/>
+          </a:p>
+        </p:txBody>
+      </p:sp>
+      <p:sp>
+        <p:nvSpPr>
+          <p:cNvPr id="19" name="Rectangle 18"/>
+          <p:cNvSpPr/>
+          <p:nvPr/>
+        </p:nvSpPr>
+        <p:spPr>
+          <a:xfrm>
+            <a:off x="14214076" y="8044964"/>
+            <a:ext cx="3094191" cy="400190"/>
+          </a:xfrm>
+          <a:prstGeom prst="rect">
+            <a:avLst/>
+          </a:prstGeom>
+        </p:spPr>
+        <p:txBody>
+          <a:bodyPr wrap="square">
+            <a:spAutoFit/>
+          </a:bodyPr>
+          <a:lstStyle/>
+          <a:p>
+            <a:pPr algn="ctr"/>
+            <a:r>
+              <a:rPr lang="en-US" sz="2000" dirty="0" smtClean="0"/>
+              <a:t>Type of Node</a:t>
+            </a:r>
+            <a:endParaRPr lang="en-US" sz="2000" dirty="0"/>
+          </a:p>
+        </p:txBody>
+      </p:sp>
+      <p:sp>
+        <p:nvSpPr>
+          <p:cNvPr id="20" name="Rectangle 19"/>
+          <p:cNvSpPr/>
+          <p:nvPr/>
+        </p:nvSpPr>
+        <p:spPr>
+          <a:xfrm>
+            <a:off x="14864282" y="9193355"/>
+            <a:ext cx="137160" cy="137188"/>
+          </a:xfrm>
+          <a:prstGeom prst="rect">
+            <a:avLst/>
+          </a:prstGeom>
+          <a:solidFill>
+            <a:srgbClr val="008000"/>
+          </a:solidFill>
+          <a:ln>
+            <a:solidFill>
+              <a:schemeClr val="tx1"/>
+            </a:solidFill>
+          </a:ln>
+        </p:spPr>
+        <p:style>
+          <a:lnRef idx="2">
+            <a:schemeClr val="accent1">
+              <a:shade val="50000"/>
+            </a:schemeClr>
+          </a:lnRef>
+          <a:fillRef idx="1">
+            <a:schemeClr val="accent1"/>
+          </a:fillRef>
+          <a:effectRef idx="0">
+            <a:schemeClr val="accent1"/>
+          </a:effectRef>
+          <a:fontRef idx="minor">
+            <a:schemeClr val="lt1"/>
+          </a:fontRef>
+        </p:style>
+        <p:txBody>
+          <a:bodyPr rtlCol="0" anchor="ctr"/>
+          <a:lstStyle/>
+          <a:p>
+            <a:pPr algn="ctr"/>
+            <a:endParaRPr lang="en-US"/>
+          </a:p>
+        </p:txBody>
+      </p:sp>
+      <p:sp>
+        <p:nvSpPr>
+          <p:cNvPr id="21" name="TextBox 20"/>
+          <p:cNvSpPr txBox="1"/>
+          <p:nvPr/>
+        </p:nvSpPr>
+        <p:spPr>
+          <a:xfrm>
+            <a:off x="15105299" y="9119475"/>
+            <a:ext cx="1920240" cy="292447"/>
+          </a:xfrm>
+          <a:prstGeom prst="rect">
+            <a:avLst/>
+          </a:prstGeom>
+          <a:noFill/>
+        </p:spPr>
+        <p:txBody>
+          <a:bodyPr wrap="square" rtlCol="0">
+            <a:spAutoFit/>
+          </a:bodyPr>
+          <a:lstStyle/>
+          <a:p>
+            <a:r>
+              <a:rPr lang="en-US" sz="1300" dirty="0" smtClean="0"/>
+              <a:t>Leaf/Terminal Node </a:t>
+            </a:r>
+            <a:endParaRPr lang="en-US" sz="1300" dirty="0"/>
+          </a:p>
+        </p:txBody>
+      </p:sp>
+      <p:sp>
+        <p:nvSpPr>
+          <p:cNvPr id="22" name="Rectangle 21"/>
+          <p:cNvSpPr/>
+          <p:nvPr/>
+        </p:nvSpPr>
+        <p:spPr>
+          <a:xfrm>
+            <a:off x="14864282" y="8553146"/>
+            <a:ext cx="137160" cy="137188"/>
+          </a:xfrm>
+          <a:prstGeom prst="rect">
+            <a:avLst/>
+          </a:prstGeom>
+          <a:solidFill>
+            <a:srgbClr val="D2691E"/>
+          </a:solidFill>
+          <a:ln>
+            <a:solidFill>
+              <a:schemeClr val="tx1"/>
+            </a:solidFill>
+          </a:ln>
+        </p:spPr>
+        <p:style>
+          <a:lnRef idx="2">
+            <a:schemeClr val="accent1">
+              <a:shade val="50000"/>
+            </a:schemeClr>
+          </a:lnRef>
+          <a:fillRef idx="1">
+            <a:schemeClr val="accent1"/>
+          </a:fillRef>
+          <a:effectRef idx="0">
+            <a:schemeClr val="accent1"/>
+          </a:effectRef>
+          <a:fontRef idx="minor">
+            <a:schemeClr val="lt1"/>
+          </a:fontRef>
+        </p:style>
+        <p:txBody>
+          <a:bodyPr rtlCol="0" anchor="ctr"/>
+          <a:lstStyle/>
+          <a:p>
+            <a:pPr algn="ctr"/>
+            <a:endParaRPr lang="en-US">
+              <a:solidFill>
+                <a:srgbClr val="0000FF"/>
+              </a:solidFill>
+            </a:endParaRPr>
+          </a:p>
+        </p:txBody>
+      </p:sp>
+      <p:sp>
+        <p:nvSpPr>
+          <p:cNvPr id="32" name="TextBox 31"/>
+          <p:cNvSpPr txBox="1"/>
+          <p:nvPr/>
+        </p:nvSpPr>
+        <p:spPr>
+          <a:xfrm>
+            <a:off x="3498260" y="7366895"/>
+            <a:ext cx="9144000" cy="1415772"/>
+          </a:xfrm>
+          <a:prstGeom prst="rect">
+            <a:avLst/>
+          </a:prstGeom>
+          <a:noFill/>
+        </p:spPr>
+        <p:txBody>
+          <a:bodyPr wrap="square" rtlCol="0">
+            <a:spAutoFit/>
+          </a:bodyPr>
+          <a:lstStyle/>
+          <a:p>
+            <a:pPr algn="ctr"/>
+            <a:r>
+              <a:rPr lang="en-US" sz="5000" b="1" dirty="0" smtClean="0"/>
+              <a:t>Depth of Classification Trees</a:t>
+            </a:r>
+            <a:endParaRPr lang="en-US" sz="5000" dirty="0" smtClean="0"/>
+          </a:p>
+          <a:p>
+            <a:endParaRPr lang="en-US" dirty="0"/>
+          </a:p>
+          <a:p>
+            <a:endParaRPr lang="en-US" dirty="0"/>
+          </a:p>
+        </p:txBody>
+      </p:sp>
+      <p:sp>
+        <p:nvSpPr>
+          <p:cNvPr id="35" name="Rectangle 34"/>
+          <p:cNvSpPr/>
+          <p:nvPr/>
+        </p:nvSpPr>
+        <p:spPr>
+          <a:xfrm>
+            <a:off x="-2214870" y="13802452"/>
+            <a:ext cx="8209188" cy="554109"/>
+          </a:xfrm>
+          <a:prstGeom prst="rect">
+            <a:avLst/>
+          </a:prstGeom>
+        </p:spPr>
+        <p:txBody>
+          <a:bodyPr wrap="square">
+            <a:spAutoFit/>
+          </a:bodyPr>
+          <a:lstStyle/>
+          <a:p>
+            <a:pPr algn="ctr"/>
+            <a:r>
+              <a:rPr lang="en-US" sz="3000" dirty="0" smtClean="0"/>
+              <a:t>Depth = 1</a:t>
+            </a:r>
+          </a:p>
+        </p:txBody>
+      </p:sp>
+      <p:sp>
+        <p:nvSpPr>
+          <p:cNvPr id="36" name="Rectangle 35"/>
+          <p:cNvSpPr/>
+          <p:nvPr/>
+        </p:nvSpPr>
+        <p:spPr>
+          <a:xfrm>
+            <a:off x="3965666" y="13802451"/>
+            <a:ext cx="8209188" cy="554109"/>
+          </a:xfrm>
+          <a:prstGeom prst="rect">
+            <a:avLst/>
+          </a:prstGeom>
+        </p:spPr>
+        <p:txBody>
+          <a:bodyPr wrap="square">
+            <a:spAutoFit/>
+          </a:bodyPr>
+          <a:lstStyle/>
+          <a:p>
+            <a:pPr algn="ctr"/>
+            <a:r>
+              <a:rPr lang="en-US" sz="3000" dirty="0" smtClean="0"/>
+              <a:t>Depth = 2</a:t>
+            </a:r>
+          </a:p>
+        </p:txBody>
+      </p:sp>
+      <p:sp>
+        <p:nvSpPr>
+          <p:cNvPr id="37" name="Rectangle 36"/>
+          <p:cNvSpPr/>
+          <p:nvPr/>
+        </p:nvSpPr>
+        <p:spPr>
+          <a:xfrm>
+            <a:off x="9904029" y="13766274"/>
+            <a:ext cx="8209188" cy="554109"/>
+          </a:xfrm>
+          <a:prstGeom prst="rect">
+            <a:avLst/>
+          </a:prstGeom>
+        </p:spPr>
+        <p:txBody>
+          <a:bodyPr wrap="square">
+            <a:spAutoFit/>
+          </a:bodyPr>
+          <a:lstStyle/>
+          <a:p>
+            <a:pPr algn="ctr"/>
+            <a:r>
+              <a:rPr lang="en-US" sz="3000" dirty="0" smtClean="0"/>
+              <a:t>Depth = 3</a:t>
+            </a:r>
+          </a:p>
+        </p:txBody>
+      </p:sp>
       <p:grpSp>
         <p:nvGrpSpPr>
-          <p:cNvPr id="2" name="Group 1"/>
+          <p:cNvPr id="24" name="Group 23"/>
           <p:cNvGrpSpPr/>
           <p:nvPr/>
         </p:nvGrpSpPr>
         <p:grpSpPr>
           <a:xfrm>
-            <a:off x="-2367270" y="-422177"/>
+            <a:off x="-2214870" y="-269777"/>
             <a:ext cx="20328087" cy="6989666"/>
             <a:chOff x="-2628527" y="-438505"/>
             <a:chExt cx="20328087" cy="6989666"/>
@@ -9013,7 +10247,7 @@
         </p:grpSpPr>
         <p:pic>
           <p:nvPicPr>
-            <p:cNvPr id="23" name="Picture 22"/>
+            <p:cNvPr id="25" name="Picture 24"/>
             <p:cNvPicPr>
               <a:picLocks noChangeAspect="1"/>
             </p:cNvPicPr>
@@ -9046,7 +10280,7 @@
         </p:pic>
         <p:pic>
           <p:nvPicPr>
-            <p:cNvPr id="4" name="Picture 3"/>
+            <p:cNvPr id="26" name="Picture 25"/>
             <p:cNvPicPr>
               <a:picLocks noChangeAspect="1"/>
             </p:cNvPicPr>
@@ -9079,7 +10313,7 @@
         </p:pic>
         <p:pic>
           <p:nvPicPr>
-            <p:cNvPr id="5" name="Picture 4"/>
+            <p:cNvPr id="27" name="Picture 26"/>
             <p:cNvPicPr>
               <a:picLocks noChangeAspect="1"/>
             </p:cNvPicPr>
@@ -9112,7 +10346,7 @@
         </p:pic>
         <p:sp>
           <p:nvSpPr>
-            <p:cNvPr id="15" name="TextBox 14"/>
+            <p:cNvPr id="28" name="TextBox 27"/>
             <p:cNvSpPr txBox="1"/>
             <p:nvPr/>
           </p:nvSpPr>
@@ -9142,7 +10376,7 @@
         </p:sp>
         <p:sp>
           <p:nvSpPr>
-            <p:cNvPr id="16" name="TextBox 15"/>
+            <p:cNvPr id="29" name="TextBox 28"/>
             <p:cNvSpPr txBox="1"/>
             <p:nvPr/>
           </p:nvSpPr>
@@ -9172,7 +10406,7 @@
         </p:sp>
         <p:sp>
           <p:nvSpPr>
-            <p:cNvPr id="17" name="Rectangle 16"/>
+            <p:cNvPr id="30" name="Rectangle 29"/>
             <p:cNvSpPr/>
             <p:nvPr/>
           </p:nvSpPr>
@@ -9224,7 +10458,7 @@
         </p:sp>
         <p:sp>
           <p:nvSpPr>
-            <p:cNvPr id="18" name="Rectangle 17"/>
+            <p:cNvPr id="31" name="Rectangle 30"/>
             <p:cNvSpPr/>
             <p:nvPr/>
           </p:nvSpPr>
@@ -9272,7 +10506,7 @@
         </p:sp>
         <p:sp>
           <p:nvSpPr>
-            <p:cNvPr id="19" name="Rectangle 18"/>
+            <p:cNvPr id="33" name="Rectangle 32"/>
             <p:cNvSpPr/>
             <p:nvPr/>
           </p:nvSpPr>
@@ -9302,7 +10536,7 @@
         </p:sp>
         <p:sp>
           <p:nvSpPr>
-            <p:cNvPr id="20" name="Rectangle 19"/>
+            <p:cNvPr id="34" name="Rectangle 33"/>
             <p:cNvSpPr/>
             <p:nvPr/>
           </p:nvSpPr>
@@ -9350,7 +10584,7 @@
         </p:sp>
         <p:sp>
           <p:nvSpPr>
-            <p:cNvPr id="21" name="TextBox 20"/>
+            <p:cNvPr id="38" name="TextBox 37"/>
             <p:cNvSpPr txBox="1"/>
             <p:nvPr/>
           </p:nvSpPr>
@@ -9380,7 +10614,7 @@
         </p:sp>
         <p:sp>
           <p:nvSpPr>
-            <p:cNvPr id="22" name="Rectangle 21"/>
+            <p:cNvPr id="39" name="Rectangle 38"/>
             <p:cNvSpPr/>
             <p:nvPr/>
           </p:nvSpPr>
@@ -9432,7 +10666,7 @@
         </p:sp>
         <p:sp>
           <p:nvSpPr>
-            <p:cNvPr id="32" name="TextBox 31"/>
+            <p:cNvPr id="40" name="TextBox 39"/>
             <p:cNvSpPr txBox="1"/>
             <p:nvPr/>
           </p:nvSpPr>
@@ -9469,7 +10703,7 @@
         </p:sp>
         <p:sp>
           <p:nvSpPr>
-            <p:cNvPr id="35" name="Rectangle 34"/>
+            <p:cNvPr id="41" name="Rectangle 40"/>
             <p:cNvSpPr/>
             <p:nvPr/>
           </p:nvSpPr>
@@ -9498,7 +10732,7 @@
         </p:sp>
         <p:sp>
           <p:nvSpPr>
-            <p:cNvPr id="36" name="Rectangle 35"/>
+            <p:cNvPr id="42" name="Rectangle 41"/>
             <p:cNvSpPr/>
             <p:nvPr/>
           </p:nvSpPr>
@@ -9527,7 +10761,7 @@
         </p:sp>
         <p:sp>
           <p:nvSpPr>
-            <p:cNvPr id="37" name="Rectangle 36"/>
+            <p:cNvPr id="43" name="Rectangle 42"/>
             <p:cNvSpPr/>
             <p:nvPr/>
           </p:nvSpPr>

</xml_diff>

<commit_message>
Added calculation image for gini, will edit and make for entropy
</commit_message>
<xml_diff>
--- a/Sklearn/DecisionTrees/powerpoint/DecisionComparison.pptx
+++ b/Sklearn/DecisionTrees/powerpoint/DecisionComparison.pptx
@@ -224,7 +224,7 @@
           <a:p>
             <a:fld id="{1257FD7B-4E4A-644A-895D-BAD136711207}" type="datetimeFigureOut">
               <a:rPr lang="en-US" smtClean="0"/>
-              <a:t>10/16/18</a:t>
+              <a:t>10/19/18</a:t>
             </a:fld>
             <a:endParaRPr lang="en-US"/>
           </a:p>
@@ -788,6 +788,23 @@
           <a:bodyPr/>
           <a:lstStyle/>
           <a:p>
+            <a:r>
+              <a:rPr lang="en-US" dirty="0" smtClean="0"/>
+              <a:t>Make a split at Some</a:t>
+            </a:r>
+            <a:r>
+              <a:rPr lang="en-US" baseline="0" dirty="0" smtClean="0"/>
+              <a:t> Really Wrong Point to show less information gain. </a:t>
+            </a:r>
+          </a:p>
+          <a:p>
+            <a:endParaRPr lang="en-US" baseline="0" dirty="0" smtClean="0"/>
+          </a:p>
+          <a:p>
+            <a:r>
+              <a:rPr lang="en-US" baseline="0" dirty="0" smtClean="0"/>
+              <a:t>Look up which of them is better for what kind of split. </a:t>
+            </a:r>
             <a:endParaRPr lang="en-US" dirty="0"/>
           </a:p>
         </p:txBody>
@@ -819,6 +836,90 @@
     <p:extLst>
       <p:ext uri="{BB962C8B-B14F-4D97-AF65-F5344CB8AC3E}">
         <p14:creationId xmlns:p14="http://schemas.microsoft.com/office/powerpoint/2010/main" val="1048070825"/>
+      </p:ext>
+    </p:extLst>
+  </p:cSld>
+  <p:clrMapOvr>
+    <a:masterClrMapping/>
+  </p:clrMapOvr>
+</p:notes>
+</file>
+
+<file path=ppt/notesSlides/notesSlide5.xml><?xml version="1.0" encoding="utf-8"?>
+<p:notes xmlns:a="http://schemas.openxmlformats.org/drawingml/2006/main" xmlns:r="http://schemas.openxmlformats.org/officeDocument/2006/relationships" xmlns:p="http://schemas.openxmlformats.org/presentationml/2006/main">
+  <p:cSld>
+    <p:spTree>
+      <p:nvGrpSpPr>
+        <p:cNvPr id="1" name=""/>
+        <p:cNvGrpSpPr/>
+        <p:nvPr/>
+      </p:nvGrpSpPr>
+      <p:grpSpPr>
+        <a:xfrm>
+          <a:off x="0" y="0"/>
+          <a:ext cx="0" cy="0"/>
+          <a:chOff x="0" y="0"/>
+          <a:chExt cx="0" cy="0"/>
+        </a:xfrm>
+      </p:grpSpPr>
+      <p:sp>
+        <p:nvSpPr>
+          <p:cNvPr id="2" name="Slide Image Placeholder 1"/>
+          <p:cNvSpPr>
+            <a:spLocks noGrp="1" noRot="1" noChangeAspect="1"/>
+          </p:cNvSpPr>
+          <p:nvPr>
+            <p:ph type="sldImg"/>
+          </p:nvPr>
+        </p:nvSpPr>
+        <p:spPr/>
+      </p:sp>
+      <p:sp>
+        <p:nvSpPr>
+          <p:cNvPr id="3" name="Notes Placeholder 2"/>
+          <p:cNvSpPr>
+            <a:spLocks noGrp="1"/>
+          </p:cNvSpPr>
+          <p:nvPr>
+            <p:ph type="body" idx="1"/>
+          </p:nvPr>
+        </p:nvSpPr>
+        <p:spPr/>
+        <p:txBody>
+          <a:bodyPr/>
+          <a:lstStyle/>
+          <a:p>
+            <a:endParaRPr lang="en-US" dirty="0"/>
+          </a:p>
+        </p:txBody>
+      </p:sp>
+      <p:sp>
+        <p:nvSpPr>
+          <p:cNvPr id="4" name="Slide Number Placeholder 3"/>
+          <p:cNvSpPr>
+            <a:spLocks noGrp="1"/>
+          </p:cNvSpPr>
+          <p:nvPr>
+            <p:ph type="sldNum" sz="quarter" idx="10"/>
+          </p:nvPr>
+        </p:nvSpPr>
+        <p:spPr/>
+        <p:txBody>
+          <a:bodyPr/>
+          <a:lstStyle/>
+          <a:p>
+            <a:fld id="{422B7439-6527-2E49-BE80-70AD13633956}" type="slidenum">
+              <a:rPr lang="en-US" smtClean="0"/>
+              <a:t>15</a:t>
+            </a:fld>
+            <a:endParaRPr lang="en-US"/>
+          </a:p>
+        </p:txBody>
+      </p:sp>
+    </p:spTree>
+    <p:extLst>
+      <p:ext uri="{BB962C8B-B14F-4D97-AF65-F5344CB8AC3E}">
+        <p14:creationId xmlns:p14="http://schemas.microsoft.com/office/powerpoint/2010/main" val="857610451"/>
       </p:ext>
     </p:extLst>
   </p:cSld>
@@ -959,7 +1060,7 @@
           <a:p>
             <a:fld id="{B66C5E5C-AFE9-2848-A01D-417298715EDA}" type="datetimeFigureOut">
               <a:rPr lang="en-US" smtClean="0"/>
-              <a:t>10/16/18</a:t>
+              <a:t>10/19/18</a:t>
             </a:fld>
             <a:endParaRPr lang="en-US"/>
           </a:p>
@@ -1129,7 +1230,7 @@
           <a:p>
             <a:fld id="{B66C5E5C-AFE9-2848-A01D-417298715EDA}" type="datetimeFigureOut">
               <a:rPr lang="en-US" smtClean="0"/>
-              <a:t>10/16/18</a:t>
+              <a:t>10/19/18</a:t>
             </a:fld>
             <a:endParaRPr lang="en-US"/>
           </a:p>
@@ -1309,7 +1410,7 @@
           <a:p>
             <a:fld id="{B66C5E5C-AFE9-2848-A01D-417298715EDA}" type="datetimeFigureOut">
               <a:rPr lang="en-US" smtClean="0"/>
-              <a:t>10/16/18</a:t>
+              <a:t>10/19/18</a:t>
             </a:fld>
             <a:endParaRPr lang="en-US"/>
           </a:p>
@@ -1479,7 +1580,7 @@
           <a:p>
             <a:fld id="{B66C5E5C-AFE9-2848-A01D-417298715EDA}" type="datetimeFigureOut">
               <a:rPr lang="en-US" smtClean="0"/>
-              <a:t>10/16/18</a:t>
+              <a:t>10/19/18</a:t>
             </a:fld>
             <a:endParaRPr lang="en-US"/>
           </a:p>
@@ -1725,7 +1826,7 @@
           <a:p>
             <a:fld id="{B66C5E5C-AFE9-2848-A01D-417298715EDA}" type="datetimeFigureOut">
               <a:rPr lang="en-US" smtClean="0"/>
-              <a:t>10/16/18</a:t>
+              <a:t>10/19/18</a:t>
             </a:fld>
             <a:endParaRPr lang="en-US"/>
           </a:p>
@@ -1957,7 +2058,7 @@
           <a:p>
             <a:fld id="{B66C5E5C-AFE9-2848-A01D-417298715EDA}" type="datetimeFigureOut">
               <a:rPr lang="en-US" smtClean="0"/>
-              <a:t>10/16/18</a:t>
+              <a:t>10/19/18</a:t>
             </a:fld>
             <a:endParaRPr lang="en-US"/>
           </a:p>
@@ -2324,7 +2425,7 @@
           <a:p>
             <a:fld id="{B66C5E5C-AFE9-2848-A01D-417298715EDA}" type="datetimeFigureOut">
               <a:rPr lang="en-US" smtClean="0"/>
-              <a:t>10/16/18</a:t>
+              <a:t>10/19/18</a:t>
             </a:fld>
             <a:endParaRPr lang="en-US"/>
           </a:p>
@@ -2442,7 +2543,7 @@
           <a:p>
             <a:fld id="{B66C5E5C-AFE9-2848-A01D-417298715EDA}" type="datetimeFigureOut">
               <a:rPr lang="en-US" smtClean="0"/>
-              <a:t>10/16/18</a:t>
+              <a:t>10/19/18</a:t>
             </a:fld>
             <a:endParaRPr lang="en-US"/>
           </a:p>
@@ -2537,7 +2638,7 @@
           <a:p>
             <a:fld id="{B66C5E5C-AFE9-2848-A01D-417298715EDA}" type="datetimeFigureOut">
               <a:rPr lang="en-US" smtClean="0"/>
-              <a:t>10/16/18</a:t>
+              <a:t>10/19/18</a:t>
             </a:fld>
             <a:endParaRPr lang="en-US"/>
           </a:p>
@@ -2814,7 +2915,7 @@
           <a:p>
             <a:fld id="{B66C5E5C-AFE9-2848-A01D-417298715EDA}" type="datetimeFigureOut">
               <a:rPr lang="en-US" smtClean="0"/>
-              <a:t>10/16/18</a:t>
+              <a:t>10/19/18</a:t>
             </a:fld>
             <a:endParaRPr lang="en-US"/>
           </a:p>
@@ -3067,7 +3168,7 @@
           <a:p>
             <a:fld id="{B66C5E5C-AFE9-2848-A01D-417298715EDA}" type="datetimeFigureOut">
               <a:rPr lang="en-US" smtClean="0"/>
-              <a:t>10/16/18</a:t>
+              <a:t>10/19/18</a:t>
             </a:fld>
             <a:endParaRPr lang="en-US"/>
           </a:p>
@@ -3280,7 +3381,7 @@
           <a:p>
             <a:fld id="{B66C5E5C-AFE9-2848-A01D-417298715EDA}" type="datetimeFigureOut">
               <a:rPr lang="en-US" smtClean="0"/>
-              <a:t>10/16/18</a:t>
+              <a:t>10/19/18</a:t>
             </a:fld>
             <a:endParaRPr lang="en-US"/>
           </a:p>
@@ -4721,13 +4822,8 @@
               <a:p>
                 <a:r>
                   <a:rPr lang="en-US" sz="2000" dirty="0" smtClean="0"/>
-                  <a:t>I: impurity </a:t>
+                  <a:t>I: impurity criterion (Gini Index or Entropy)</a:t>
                 </a:r>
-                <a:r>
-                  <a:rPr lang="en-US" sz="2000" dirty="0" smtClean="0"/>
-                  <a:t>criterion (Gini Index or Entropy)</a:t>
-                </a:r>
-                <a:endParaRPr lang="en-US" sz="2000" dirty="0" smtClean="0"/>
               </a:p>
               <a:p>
                 <a:r>
@@ -5208,7 +5304,7 @@
         </p:nvGrpSpPr>
         <p:grpSpPr>
           <a:xfrm>
-            <a:off x="-2965532" y="547306"/>
+            <a:off x="-541309" y="611101"/>
             <a:ext cx="9797541" cy="4651752"/>
             <a:chOff x="-2965532" y="547306"/>
             <a:chExt cx="9797541" cy="4651752"/>
@@ -5352,6 +5448,556 @@
           <a:chExt cx="0" cy="0"/>
         </a:xfrm>
       </p:grpSpPr>
+      <p:sp>
+        <p:nvSpPr>
+          <p:cNvPr id="22" name="Rectangle 21"/>
+          <p:cNvSpPr/>
+          <p:nvPr/>
+        </p:nvSpPr>
+        <p:spPr>
+          <a:xfrm>
+            <a:off x="-7284720" y="5830670"/>
+            <a:ext cx="26517600" cy="5492800"/>
+          </a:xfrm>
+          <a:prstGeom prst="rect">
+            <a:avLst/>
+          </a:prstGeom>
+          <a:noFill/>
+          <a:ln w="101600">
+            <a:solidFill>
+              <a:schemeClr val="tx1"/>
+            </a:solidFill>
+          </a:ln>
+        </p:spPr>
+        <p:style>
+          <a:lnRef idx="2">
+            <a:schemeClr val="accent1">
+              <a:shade val="50000"/>
+            </a:schemeClr>
+          </a:lnRef>
+          <a:fillRef idx="1">
+            <a:schemeClr val="accent1"/>
+          </a:fillRef>
+          <a:effectRef idx="0">
+            <a:schemeClr val="accent1"/>
+          </a:effectRef>
+          <a:fontRef idx="minor">
+            <a:schemeClr val="lt1"/>
+          </a:fontRef>
+        </p:style>
+        <p:txBody>
+          <a:bodyPr rtlCol="0" anchor="ctr"/>
+          <a:lstStyle/>
+          <a:p>
+            <a:pPr algn="ctr"/>
+            <a:endParaRPr lang="en-US"/>
+          </a:p>
+        </p:txBody>
+      </p:sp>
+      <p:pic>
+        <p:nvPicPr>
+          <p:cNvPr id="11" name="Picture 10"/>
+          <p:cNvPicPr>
+            <a:picLocks noChangeAspect="1"/>
+          </p:cNvPicPr>
+          <p:nvPr/>
+        </p:nvPicPr>
+        <p:blipFill>
+          <a:blip r:embed="rId3">
+            <a:extLst>
+              <a:ext uri="{28A0092B-C50C-407E-A947-70E740481C1C}">
+                <a14:useLocalDpi xmlns:a14="http://schemas.microsoft.com/office/drawing/2010/main" val="0"/>
+              </a:ext>
+            </a:extLst>
+          </a:blip>
+          <a:stretch>
+            <a:fillRect/>
+          </a:stretch>
+        </p:blipFill>
+        <p:spPr>
+          <a:xfrm>
+            <a:off x="4127811" y="6071920"/>
+            <a:ext cx="5340096" cy="5010304"/>
+          </a:xfrm>
+          <a:prstGeom prst="rect">
+            <a:avLst/>
+          </a:prstGeom>
+          <a:ln w="12700">
+            <a:solidFill>
+              <a:schemeClr val="tx1"/>
+            </a:solidFill>
+          </a:ln>
+        </p:spPr>
+      </p:pic>
+      <p:pic>
+        <p:nvPicPr>
+          <p:cNvPr id="12" name="Picture 11"/>
+          <p:cNvPicPr>
+            <a:picLocks noChangeAspect="1"/>
+          </p:cNvPicPr>
+          <p:nvPr/>
+        </p:nvPicPr>
+        <p:blipFill>
+          <a:blip r:embed="rId4">
+            <a:extLst>
+              <a:ext uri="{28A0092B-C50C-407E-A947-70E740481C1C}">
+                <a14:useLocalDpi xmlns:a14="http://schemas.microsoft.com/office/drawing/2010/main" val="0"/>
+              </a:ext>
+            </a:extLst>
+          </a:blip>
+          <a:stretch>
+            <a:fillRect/>
+          </a:stretch>
+        </p:blipFill>
+        <p:spPr>
+          <a:xfrm>
+            <a:off x="-1934702" y="6647686"/>
+            <a:ext cx="5352485" cy="3858768"/>
+          </a:xfrm>
+          <a:prstGeom prst="rect">
+            <a:avLst/>
+          </a:prstGeom>
+          <a:ln w="12700">
+            <a:solidFill>
+              <a:schemeClr val="tx1"/>
+            </a:solidFill>
+          </a:ln>
+        </p:spPr>
+      </p:pic>
+      <p:sp>
+        <p:nvSpPr>
+          <p:cNvPr id="13" name="Rectangle 12"/>
+          <p:cNvSpPr/>
+          <p:nvPr/>
+        </p:nvSpPr>
+        <p:spPr>
+          <a:xfrm>
+            <a:off x="4114800" y="10027920"/>
+            <a:ext cx="2583941" cy="1143150"/>
+          </a:xfrm>
+          <a:prstGeom prst="rect">
+            <a:avLst/>
+          </a:prstGeom>
+          <a:noFill/>
+          <a:ln w="76200">
+            <a:solidFill>
+              <a:srgbClr val="FF0000"/>
+            </a:solidFill>
+          </a:ln>
+        </p:spPr>
+        <p:style>
+          <a:lnRef idx="2">
+            <a:schemeClr val="accent1">
+              <a:shade val="50000"/>
+            </a:schemeClr>
+          </a:lnRef>
+          <a:fillRef idx="1">
+            <a:schemeClr val="accent1"/>
+          </a:fillRef>
+          <a:effectRef idx="0">
+            <a:schemeClr val="accent1"/>
+          </a:effectRef>
+          <a:fontRef idx="minor">
+            <a:schemeClr val="lt1"/>
+          </a:fontRef>
+        </p:style>
+        <p:txBody>
+          <a:bodyPr rtlCol="0" anchor="ctr"/>
+          <a:lstStyle/>
+          <a:p>
+            <a:pPr algn="ctr"/>
+            <a:endParaRPr lang="en-US"/>
+          </a:p>
+        </p:txBody>
+      </p:sp>
+      <p:pic>
+        <p:nvPicPr>
+          <p:cNvPr id="19" name="Picture 18"/>
+          <p:cNvPicPr>
+            <a:picLocks noChangeAspect="1"/>
+          </p:cNvPicPr>
+          <p:nvPr/>
+        </p:nvPicPr>
+        <p:blipFill rotWithShape="1">
+          <a:blip r:embed="rId5">
+            <a:extLst>
+              <a:ext uri="{28A0092B-C50C-407E-A947-70E740481C1C}">
+                <a14:useLocalDpi xmlns:a14="http://schemas.microsoft.com/office/drawing/2010/main" val="0"/>
+              </a:ext>
+            </a:extLst>
+          </a:blip>
+          <a:srcRect l="10143" r="7620"/>
+          <a:stretch/>
+        </p:blipFill>
+        <p:spPr>
+          <a:xfrm>
+            <a:off x="10130449" y="6647686"/>
+            <a:ext cx="8462214" cy="3858768"/>
+          </a:xfrm>
+          <a:prstGeom prst="rect">
+            <a:avLst/>
+          </a:prstGeom>
+          <a:ln w="12700">
+            <a:solidFill>
+              <a:schemeClr val="tx1"/>
+            </a:solidFill>
+          </a:ln>
+        </p:spPr>
+      </p:pic>
+      <p:pic>
+        <p:nvPicPr>
+          <p:cNvPr id="8" name="Picture 7"/>
+          <p:cNvPicPr>
+            <a:picLocks noChangeAspect="1"/>
+          </p:cNvPicPr>
+          <p:nvPr/>
+        </p:nvPicPr>
+        <p:blipFill>
+          <a:blip r:embed="rId6">
+            <a:extLst>
+              <a:ext uri="{28A0092B-C50C-407E-A947-70E740481C1C}">
+                <a14:useLocalDpi xmlns:a14="http://schemas.microsoft.com/office/drawing/2010/main" val="0"/>
+              </a:ext>
+            </a:extLst>
+          </a:blip>
+          <a:stretch>
+            <a:fillRect/>
+          </a:stretch>
+        </p:blipFill>
+        <p:spPr>
+          <a:xfrm>
+            <a:off x="4130928" y="-1727791"/>
+            <a:ext cx="5336979" cy="5020056"/>
+          </a:xfrm>
+          <a:prstGeom prst="rect">
+            <a:avLst/>
+          </a:prstGeom>
+          <a:ln w="12700">
+            <a:solidFill>
+              <a:schemeClr val="tx1"/>
+            </a:solidFill>
+          </a:ln>
+        </p:spPr>
+      </p:pic>
+      <p:pic>
+        <p:nvPicPr>
+          <p:cNvPr id="10" name="Picture 9"/>
+          <p:cNvPicPr>
+            <a:picLocks noChangeAspect="1"/>
+          </p:cNvPicPr>
+          <p:nvPr/>
+        </p:nvPicPr>
+        <p:blipFill>
+          <a:blip r:embed="rId7">
+            <a:extLst>
+              <a:ext uri="{28A0092B-C50C-407E-A947-70E740481C1C}">
+                <a14:useLocalDpi xmlns:a14="http://schemas.microsoft.com/office/drawing/2010/main" val="0"/>
+              </a:ext>
+            </a:extLst>
+          </a:blip>
+          <a:stretch>
+            <a:fillRect/>
+          </a:stretch>
+        </p:blipFill>
+        <p:spPr>
+          <a:xfrm>
+            <a:off x="-1899455" y="-1145978"/>
+            <a:ext cx="5349240" cy="3856429"/>
+          </a:xfrm>
+          <a:prstGeom prst="rect">
+            <a:avLst/>
+          </a:prstGeom>
+          <a:ln w="12700">
+            <a:solidFill>
+              <a:schemeClr val="tx1"/>
+            </a:solidFill>
+          </a:ln>
+        </p:spPr>
+      </p:pic>
+      <p:sp>
+        <p:nvSpPr>
+          <p:cNvPr id="14" name="Rectangle 13"/>
+          <p:cNvSpPr/>
+          <p:nvPr/>
+        </p:nvSpPr>
+        <p:spPr>
+          <a:xfrm>
+            <a:off x="4114800" y="2237507"/>
+            <a:ext cx="2551285" cy="1131657"/>
+          </a:xfrm>
+          <a:prstGeom prst="rect">
+            <a:avLst/>
+          </a:prstGeom>
+          <a:noFill/>
+          <a:ln w="76200">
+            <a:solidFill>
+              <a:srgbClr val="FF0000"/>
+            </a:solidFill>
+          </a:ln>
+        </p:spPr>
+        <p:style>
+          <a:lnRef idx="2">
+            <a:schemeClr val="accent1">
+              <a:shade val="50000"/>
+            </a:schemeClr>
+          </a:lnRef>
+          <a:fillRef idx="1">
+            <a:schemeClr val="accent1"/>
+          </a:fillRef>
+          <a:effectRef idx="0">
+            <a:schemeClr val="accent1"/>
+          </a:effectRef>
+          <a:fontRef idx="minor">
+            <a:schemeClr val="lt1"/>
+          </a:fontRef>
+        </p:style>
+        <p:txBody>
+          <a:bodyPr rtlCol="0" anchor="ctr"/>
+          <a:lstStyle/>
+          <a:p>
+            <a:pPr algn="ctr"/>
+            <a:endParaRPr lang="en-US"/>
+          </a:p>
+        </p:txBody>
+      </p:sp>
+      <p:pic>
+        <p:nvPicPr>
+          <p:cNvPr id="20" name="Picture 19"/>
+          <p:cNvPicPr>
+            <a:picLocks noChangeAspect="1"/>
+          </p:cNvPicPr>
+          <p:nvPr/>
+        </p:nvPicPr>
+        <p:blipFill rotWithShape="1">
+          <a:blip r:embed="rId8">
+            <a:extLst>
+              <a:ext uri="{28A0092B-C50C-407E-A947-70E740481C1C}">
+                <a14:useLocalDpi xmlns:a14="http://schemas.microsoft.com/office/drawing/2010/main" val="0"/>
+              </a:ext>
+            </a:extLst>
+          </a:blip>
+          <a:srcRect l="10143" r="7620"/>
+          <a:stretch/>
+        </p:blipFill>
+        <p:spPr>
+          <a:xfrm>
+            <a:off x="10135580" y="-1145978"/>
+            <a:ext cx="8457083" cy="3856429"/>
+          </a:xfrm>
+          <a:prstGeom prst="rect">
+            <a:avLst/>
+          </a:prstGeom>
+          <a:ln w="12700">
+            <a:solidFill>
+              <a:schemeClr val="tx1"/>
+            </a:solidFill>
+          </a:ln>
+        </p:spPr>
+      </p:pic>
+      <p:sp>
+        <p:nvSpPr>
+          <p:cNvPr id="23" name="Rectangle 22"/>
+          <p:cNvSpPr/>
+          <p:nvPr/>
+        </p:nvSpPr>
+        <p:spPr>
+          <a:xfrm>
+            <a:off x="-7137167" y="-332080"/>
+            <a:ext cx="4937760" cy="2255520"/>
+          </a:xfrm>
+          <a:prstGeom prst="rect">
+            <a:avLst/>
+          </a:prstGeom>
+          <a:solidFill>
+            <a:schemeClr val="bg1"/>
+          </a:solidFill>
+          <a:ln>
+            <a:solidFill>
+              <a:schemeClr val="bg1"/>
+            </a:solidFill>
+          </a:ln>
+        </p:spPr>
+        <p:style>
+          <a:lnRef idx="2">
+            <a:schemeClr val="accent1">
+              <a:shade val="50000"/>
+            </a:schemeClr>
+          </a:lnRef>
+          <a:fillRef idx="1">
+            <a:schemeClr val="accent1"/>
+          </a:fillRef>
+          <a:effectRef idx="0">
+            <a:schemeClr val="accent1"/>
+          </a:effectRef>
+          <a:fontRef idx="minor">
+            <a:schemeClr val="lt1"/>
+          </a:fontRef>
+        </p:style>
+        <p:txBody>
+          <a:bodyPr rtlCol="0" anchor="ctr"/>
+          <a:lstStyle/>
+          <a:p>
+            <a:pPr algn="ctr"/>
+            <a:r>
+              <a:rPr lang="en-US" sz="4000" dirty="0" smtClean="0">
+                <a:solidFill>
+                  <a:schemeClr val="tx1"/>
+                </a:solidFill>
+              </a:rPr>
+              <a:t>Splitting Scenario 1</a:t>
+            </a:r>
+          </a:p>
+          <a:p>
+            <a:pPr algn="ctr"/>
+            <a:r>
+              <a:rPr lang="en-US" sz="4000" dirty="0" smtClean="0">
+                <a:solidFill>
+                  <a:schemeClr val="tx1"/>
+                </a:solidFill>
+              </a:rPr>
+              <a:t>(Favored)</a:t>
+            </a:r>
+            <a:endParaRPr lang="en-US" sz="4000" dirty="0">
+              <a:solidFill>
+                <a:schemeClr val="tx1"/>
+              </a:solidFill>
+            </a:endParaRPr>
+          </a:p>
+        </p:txBody>
+      </p:sp>
+      <p:sp>
+        <p:nvSpPr>
+          <p:cNvPr id="25" name="Rectangle 24"/>
+          <p:cNvSpPr/>
+          <p:nvPr/>
+        </p:nvSpPr>
+        <p:spPr>
+          <a:xfrm>
+            <a:off x="-7137167" y="7538160"/>
+            <a:ext cx="4937760" cy="2255520"/>
+          </a:xfrm>
+          <a:prstGeom prst="rect">
+            <a:avLst/>
+          </a:prstGeom>
+          <a:solidFill>
+            <a:schemeClr val="bg1"/>
+          </a:solidFill>
+          <a:ln>
+            <a:solidFill>
+              <a:schemeClr val="bg1"/>
+            </a:solidFill>
+          </a:ln>
+        </p:spPr>
+        <p:style>
+          <a:lnRef idx="2">
+            <a:schemeClr val="accent1">
+              <a:shade val="50000"/>
+            </a:schemeClr>
+          </a:lnRef>
+          <a:fillRef idx="1">
+            <a:schemeClr val="accent1"/>
+          </a:fillRef>
+          <a:effectRef idx="0">
+            <a:schemeClr val="accent1"/>
+          </a:effectRef>
+          <a:fontRef idx="minor">
+            <a:schemeClr val="lt1"/>
+          </a:fontRef>
+        </p:style>
+        <p:txBody>
+          <a:bodyPr rtlCol="0" anchor="ctr"/>
+          <a:lstStyle/>
+          <a:p>
+            <a:pPr algn="ctr"/>
+            <a:r>
+              <a:rPr lang="en-US" sz="4000" dirty="0" smtClean="0">
+                <a:solidFill>
+                  <a:schemeClr val="tx1"/>
+                </a:solidFill>
+              </a:rPr>
+              <a:t>Splitting Scenario 2</a:t>
+            </a:r>
+          </a:p>
+          <a:p>
+            <a:pPr algn="ctr"/>
+            <a:r>
+              <a:rPr lang="en-US" sz="4000" dirty="0" smtClean="0">
+                <a:solidFill>
+                  <a:schemeClr val="tx1"/>
+                </a:solidFill>
+              </a:rPr>
+              <a:t>(Note impossible with entropy via </a:t>
+            </a:r>
+            <a:r>
+              <a:rPr lang="en-US" sz="4000" dirty="0" err="1" smtClean="0">
+                <a:solidFill>
+                  <a:schemeClr val="tx1"/>
+                </a:solidFill>
+              </a:rPr>
+              <a:t>Kullback-leibler</a:t>
+            </a:r>
+            <a:r>
+              <a:rPr lang="en-US" sz="4000" smtClean="0">
+                <a:solidFill>
+                  <a:schemeClr val="tx1"/>
+                </a:solidFill>
+              </a:rPr>
+              <a:t> divergence)</a:t>
+            </a:r>
+            <a:endParaRPr lang="en-US" sz="4000" dirty="0">
+              <a:solidFill>
+                <a:schemeClr val="tx1"/>
+              </a:solidFill>
+            </a:endParaRPr>
+          </a:p>
+        </p:txBody>
+      </p:sp>
+      <p:sp>
+        <p:nvSpPr>
+          <p:cNvPr id="26" name="Rectangle 25"/>
+          <p:cNvSpPr/>
+          <p:nvPr/>
+        </p:nvSpPr>
+        <p:spPr>
+          <a:xfrm>
+            <a:off x="-7284720" y="-1950720"/>
+            <a:ext cx="26517600" cy="5492800"/>
+          </a:xfrm>
+          <a:prstGeom prst="rect">
+            <a:avLst/>
+          </a:prstGeom>
+          <a:noFill/>
+          <a:ln w="101600">
+            <a:solidFill>
+              <a:schemeClr val="tx1"/>
+            </a:solidFill>
+          </a:ln>
+        </p:spPr>
+        <p:style>
+          <a:lnRef idx="2">
+            <a:schemeClr val="accent1">
+              <a:shade val="50000"/>
+            </a:schemeClr>
+          </a:lnRef>
+          <a:fillRef idx="1">
+            <a:schemeClr val="accent1"/>
+          </a:fillRef>
+          <a:effectRef idx="0">
+            <a:schemeClr val="accent1"/>
+          </a:effectRef>
+          <a:fontRef idx="minor">
+            <a:schemeClr val="lt1"/>
+          </a:fontRef>
+        </p:style>
+        <p:txBody>
+          <a:bodyPr rtlCol="0" anchor="ctr"/>
+          <a:lstStyle/>
+          <a:p>
+            <a:pPr algn="ctr"/>
+            <a:endParaRPr lang="en-US"/>
+          </a:p>
+        </p:txBody>
+      </p:sp>
     </p:spTree>
     <p:extLst>
       <p:ext uri="{BB962C8B-B14F-4D97-AF65-F5344CB8AC3E}">

</xml_diff>